<commit_message>
Add instructions for manual testing to DG
</commit_message>
<xml_diff>
--- a/docs/assets/DG Diagrams.pptx
+++ b/docs/assets/DG Diagrams.pptx
@@ -8,6 +8,7 @@
     <p:sldId id="256" r:id="rId2"/>
     <p:sldId id="260" r:id="rId3"/>
     <p:sldId id="261" r:id="rId4"/>
+    <p:sldId id="262" r:id="rId5"/>
   </p:sldIdLst>
   <p:sldSz cx="9144000" cy="6858000" type="screen4x3"/>
   <p:notesSz cx="6858000" cy="9144000"/>
@@ -304,7 +305,7 @@
           <a:p>
             <a:fld id="{78C97017-6FC3-485B-9764-EAC9E56C1D49}" type="datetimeFigureOut">
               <a:rPr lang="en-US" smtClean="0"/>
-              <a:t>10/19/21</a:t>
+              <a:t>10/20/2021</a:t>
             </a:fld>
             <a:endParaRPr lang="en-US"/>
           </a:p>
@@ -472,7 +473,7 @@
           <a:p>
             <a:fld id="{78C97017-6FC3-485B-9764-EAC9E56C1D49}" type="datetimeFigureOut">
               <a:rPr lang="en-US" smtClean="0"/>
-              <a:t>10/19/21</a:t>
+              <a:t>10/20/2021</a:t>
             </a:fld>
             <a:endParaRPr lang="en-US"/>
           </a:p>
@@ -650,7 +651,7 @@
           <a:p>
             <a:fld id="{78C97017-6FC3-485B-9764-EAC9E56C1D49}" type="datetimeFigureOut">
               <a:rPr lang="en-US" smtClean="0"/>
-              <a:t>10/19/21</a:t>
+              <a:t>10/20/2021</a:t>
             </a:fld>
             <a:endParaRPr lang="en-US"/>
           </a:p>
@@ -818,7 +819,7 @@
           <a:p>
             <a:fld id="{78C97017-6FC3-485B-9764-EAC9E56C1D49}" type="datetimeFigureOut">
               <a:rPr lang="en-US" smtClean="0"/>
-              <a:t>10/19/21</a:t>
+              <a:t>10/20/2021</a:t>
             </a:fld>
             <a:endParaRPr lang="en-US"/>
           </a:p>
@@ -1063,7 +1064,7 @@
           <a:p>
             <a:fld id="{78C97017-6FC3-485B-9764-EAC9E56C1D49}" type="datetimeFigureOut">
               <a:rPr lang="en-US" smtClean="0"/>
-              <a:t>10/19/21</a:t>
+              <a:t>10/20/2021</a:t>
             </a:fld>
             <a:endParaRPr lang="en-US"/>
           </a:p>
@@ -1348,7 +1349,7 @@
           <a:p>
             <a:fld id="{78C97017-6FC3-485B-9764-EAC9E56C1D49}" type="datetimeFigureOut">
               <a:rPr lang="en-US" smtClean="0"/>
-              <a:t>10/19/21</a:t>
+              <a:t>10/20/2021</a:t>
             </a:fld>
             <a:endParaRPr lang="en-US"/>
           </a:p>
@@ -1767,7 +1768,7 @@
           <a:p>
             <a:fld id="{78C97017-6FC3-485B-9764-EAC9E56C1D49}" type="datetimeFigureOut">
               <a:rPr lang="en-US" smtClean="0"/>
-              <a:t>10/19/21</a:t>
+              <a:t>10/20/2021</a:t>
             </a:fld>
             <a:endParaRPr lang="en-US"/>
           </a:p>
@@ -1884,7 +1885,7 @@
           <a:p>
             <a:fld id="{78C97017-6FC3-485B-9764-EAC9E56C1D49}" type="datetimeFigureOut">
               <a:rPr lang="en-US" smtClean="0"/>
-              <a:t>10/19/21</a:t>
+              <a:t>10/20/2021</a:t>
             </a:fld>
             <a:endParaRPr lang="en-US"/>
           </a:p>
@@ -1979,7 +1980,7 @@
           <a:p>
             <a:fld id="{78C97017-6FC3-485B-9764-EAC9E56C1D49}" type="datetimeFigureOut">
               <a:rPr lang="en-US" smtClean="0"/>
-              <a:t>10/19/21</a:t>
+              <a:t>10/20/2021</a:t>
             </a:fld>
             <a:endParaRPr lang="en-US"/>
           </a:p>
@@ -2254,7 +2255,7 @@
           <a:p>
             <a:fld id="{78C97017-6FC3-485B-9764-EAC9E56C1D49}" type="datetimeFigureOut">
               <a:rPr lang="en-US" smtClean="0"/>
-              <a:t>10/19/21</a:t>
+              <a:t>10/20/2021</a:t>
             </a:fld>
             <a:endParaRPr lang="en-US"/>
           </a:p>
@@ -2506,7 +2507,7 @@
           <a:p>
             <a:fld id="{78C97017-6FC3-485B-9764-EAC9E56C1D49}" type="datetimeFigureOut">
               <a:rPr lang="en-US" smtClean="0"/>
-              <a:t>10/19/21</a:t>
+              <a:t>10/20/2021</a:t>
             </a:fld>
             <a:endParaRPr lang="en-US"/>
           </a:p>
@@ -2717,7 +2718,7 @@
           <a:p>
             <a:fld id="{78C97017-6FC3-485B-9764-EAC9E56C1D49}" type="datetimeFigureOut">
               <a:rPr lang="en-US" smtClean="0"/>
-              <a:t>10/19/21</a:t>
+              <a:t>10/20/2021</a:t>
             </a:fld>
             <a:endParaRPr lang="en-US"/>
           </a:p>
@@ -5684,6 +5685,36 @@
     <p:extLst>
       <p:ext uri="{BB962C8B-B14F-4D97-AF65-F5344CB8AC3E}">
         <p14:creationId xmlns:p14="http://schemas.microsoft.com/office/powerpoint/2010/main" val="1870380684"/>
+      </p:ext>
+    </p:extLst>
+  </p:cSld>
+  <p:clrMapOvr>
+    <a:masterClrMapping/>
+  </p:clrMapOvr>
+</p:sld>
+</file>
+
+<file path=ppt/slides/slide4.xml><?xml version="1.0" encoding="utf-8"?>
+<p:sld xmlns:a="http://schemas.openxmlformats.org/drawingml/2006/main" xmlns:r="http://schemas.openxmlformats.org/officeDocument/2006/relationships" xmlns:p="http://schemas.openxmlformats.org/presentationml/2006/main">
+  <p:cSld>
+    <p:spTree>
+      <p:nvGrpSpPr>
+        <p:cNvPr id="1" name=""/>
+        <p:cNvGrpSpPr/>
+        <p:nvPr/>
+      </p:nvGrpSpPr>
+      <p:grpSpPr>
+        <a:xfrm>
+          <a:off x="0" y="0"/>
+          <a:ext cx="0" cy="0"/>
+          <a:chOff x="0" y="0"/>
+          <a:chExt cx="0" cy="0"/>
+        </a:xfrm>
+      </p:grpSpPr>
+    </p:spTree>
+    <p:extLst>
+      <p:ext uri="{BB962C8B-B14F-4D97-AF65-F5344CB8AC3E}">
+        <p14:creationId xmlns:p14="http://schemas.microsoft.com/office/powerpoint/2010/main" val="713777501"/>
       </p:ext>
     </p:extLst>
   </p:cSld>

</xml_diff>

<commit_message>
update UG with newer timetable add sequence diagram
</commit_message>
<xml_diff>
--- a/docs/assets/DG Diagrams.pptx
+++ b/docs/assets/DG Diagrams.pptx
@@ -4,6 +4,9 @@
   <p:sldMasterIdLst>
     <p:sldMasterId id="2147483648" r:id="rId1"/>
   </p:sldMasterIdLst>
+  <p:notesMasterIdLst>
+    <p:notesMasterId r:id="rId6"/>
+  </p:notesMasterIdLst>
   <p:sldIdLst>
     <p:sldId id="256" r:id="rId2"/>
     <p:sldId id="260" r:id="rId3"/>
@@ -126,6 +129,440 @@
 </p:presentation>
 </file>
 
+<file path=ppt/notesMasters/notesMaster1.xml><?xml version="1.0" encoding="utf-8"?>
+<p:notesMaster xmlns:a="http://schemas.openxmlformats.org/drawingml/2006/main" xmlns:r="http://schemas.openxmlformats.org/officeDocument/2006/relationships" xmlns:p="http://schemas.openxmlformats.org/presentationml/2006/main">
+  <p:cSld>
+    <p:bg>
+      <p:bgRef idx="1001">
+        <a:schemeClr val="bg1"/>
+      </p:bgRef>
+    </p:bg>
+    <p:spTree>
+      <p:nvGrpSpPr>
+        <p:cNvPr id="1" name=""/>
+        <p:cNvGrpSpPr/>
+        <p:nvPr/>
+      </p:nvGrpSpPr>
+      <p:grpSpPr>
+        <a:xfrm>
+          <a:off x="0" y="0"/>
+          <a:ext cx="0" cy="0"/>
+          <a:chOff x="0" y="0"/>
+          <a:chExt cx="0" cy="0"/>
+        </a:xfrm>
+      </p:grpSpPr>
+      <p:sp>
+        <p:nvSpPr>
+          <p:cNvPr id="2" name="Header Placeholder 1"/>
+          <p:cNvSpPr>
+            <a:spLocks noGrp="1"/>
+          </p:cNvSpPr>
+          <p:nvPr>
+            <p:ph type="hdr" sz="quarter"/>
+          </p:nvPr>
+        </p:nvSpPr>
+        <p:spPr>
+          <a:xfrm>
+            <a:off x="0" y="0"/>
+            <a:ext cx="2971800" cy="458788"/>
+          </a:xfrm>
+          <a:prstGeom prst="rect">
+            <a:avLst/>
+          </a:prstGeom>
+        </p:spPr>
+        <p:txBody>
+          <a:bodyPr vert="horz" lIns="91440" tIns="45720" rIns="91440" bIns="45720" rtlCol="0"/>
+          <a:lstStyle>
+            <a:lvl1pPr algn="l">
+              <a:defRPr sz="1200"/>
+            </a:lvl1pPr>
+          </a:lstStyle>
+          <a:p>
+            <a:endParaRPr lang="en-US"/>
+          </a:p>
+        </p:txBody>
+      </p:sp>
+      <p:sp>
+        <p:nvSpPr>
+          <p:cNvPr id="3" name="Date Placeholder 2"/>
+          <p:cNvSpPr>
+            <a:spLocks noGrp="1"/>
+          </p:cNvSpPr>
+          <p:nvPr>
+            <p:ph type="dt" idx="1"/>
+          </p:nvPr>
+        </p:nvSpPr>
+        <p:spPr>
+          <a:xfrm>
+            <a:off x="3884613" y="0"/>
+            <a:ext cx="2971800" cy="458788"/>
+          </a:xfrm>
+          <a:prstGeom prst="rect">
+            <a:avLst/>
+          </a:prstGeom>
+        </p:spPr>
+        <p:txBody>
+          <a:bodyPr vert="horz" lIns="91440" tIns="45720" rIns="91440" bIns="45720" rtlCol="0"/>
+          <a:lstStyle>
+            <a:lvl1pPr algn="r">
+              <a:defRPr sz="1200"/>
+            </a:lvl1pPr>
+          </a:lstStyle>
+          <a:p>
+            <a:fld id="{31B455B7-35F4-3248-9980-DA268DAEE9E9}" type="datetimeFigureOut">
+              <a:rPr lang="en-US" smtClean="0"/>
+              <a:t>10/20/21</a:t>
+            </a:fld>
+            <a:endParaRPr lang="en-US"/>
+          </a:p>
+        </p:txBody>
+      </p:sp>
+      <p:sp>
+        <p:nvSpPr>
+          <p:cNvPr id="4" name="Slide Image Placeholder 3"/>
+          <p:cNvSpPr>
+            <a:spLocks noGrp="1" noRot="1" noChangeAspect="1"/>
+          </p:cNvSpPr>
+          <p:nvPr>
+            <p:ph type="sldImg" idx="2"/>
+          </p:nvPr>
+        </p:nvSpPr>
+        <p:spPr>
+          <a:xfrm>
+            <a:off x="1371600" y="1143000"/>
+            <a:ext cx="4114800" cy="3086100"/>
+          </a:xfrm>
+          <a:prstGeom prst="rect">
+            <a:avLst/>
+          </a:prstGeom>
+          <a:noFill/>
+          <a:ln w="12700">
+            <a:solidFill>
+              <a:prstClr val="black"/>
+            </a:solidFill>
+          </a:ln>
+        </p:spPr>
+        <p:txBody>
+          <a:bodyPr vert="horz" lIns="91440" tIns="45720" rIns="91440" bIns="45720" rtlCol="0" anchor="ctr"/>
+          <a:lstStyle/>
+          <a:p>
+            <a:endParaRPr lang="en-US"/>
+          </a:p>
+        </p:txBody>
+      </p:sp>
+      <p:sp>
+        <p:nvSpPr>
+          <p:cNvPr id="5" name="Notes Placeholder 4"/>
+          <p:cNvSpPr>
+            <a:spLocks noGrp="1"/>
+          </p:cNvSpPr>
+          <p:nvPr>
+            <p:ph type="body" sz="quarter" idx="3"/>
+          </p:nvPr>
+        </p:nvSpPr>
+        <p:spPr>
+          <a:xfrm>
+            <a:off x="685800" y="4400550"/>
+            <a:ext cx="5486400" cy="3600450"/>
+          </a:xfrm>
+          <a:prstGeom prst="rect">
+            <a:avLst/>
+          </a:prstGeom>
+        </p:spPr>
+        <p:txBody>
+          <a:bodyPr vert="horz" lIns="91440" tIns="45720" rIns="91440" bIns="45720" rtlCol="0"/>
+          <a:lstStyle/>
+          <a:p>
+            <a:pPr lvl="0"/>
+            <a:r>
+              <a:rPr lang="en-GB"/>
+              <a:t>Click to edit Master text styles</a:t>
+            </a:r>
+          </a:p>
+          <a:p>
+            <a:pPr lvl="1"/>
+            <a:r>
+              <a:rPr lang="en-GB"/>
+              <a:t>Second level</a:t>
+            </a:r>
+          </a:p>
+          <a:p>
+            <a:pPr lvl="2"/>
+            <a:r>
+              <a:rPr lang="en-GB"/>
+              <a:t>Third level</a:t>
+            </a:r>
+          </a:p>
+          <a:p>
+            <a:pPr lvl="3"/>
+            <a:r>
+              <a:rPr lang="en-GB"/>
+              <a:t>Fourth level</a:t>
+            </a:r>
+          </a:p>
+          <a:p>
+            <a:pPr lvl="4"/>
+            <a:r>
+              <a:rPr lang="en-GB"/>
+              <a:t>Fifth level</a:t>
+            </a:r>
+            <a:endParaRPr lang="en-US"/>
+          </a:p>
+        </p:txBody>
+      </p:sp>
+      <p:sp>
+        <p:nvSpPr>
+          <p:cNvPr id="6" name="Footer Placeholder 5"/>
+          <p:cNvSpPr>
+            <a:spLocks noGrp="1"/>
+          </p:cNvSpPr>
+          <p:nvPr>
+            <p:ph type="ftr" sz="quarter" idx="4"/>
+          </p:nvPr>
+        </p:nvSpPr>
+        <p:spPr>
+          <a:xfrm>
+            <a:off x="0" y="8685213"/>
+            <a:ext cx="2971800" cy="458787"/>
+          </a:xfrm>
+          <a:prstGeom prst="rect">
+            <a:avLst/>
+          </a:prstGeom>
+        </p:spPr>
+        <p:txBody>
+          <a:bodyPr vert="horz" lIns="91440" tIns="45720" rIns="91440" bIns="45720" rtlCol="0" anchor="b"/>
+          <a:lstStyle>
+            <a:lvl1pPr algn="l">
+              <a:defRPr sz="1200"/>
+            </a:lvl1pPr>
+          </a:lstStyle>
+          <a:p>
+            <a:endParaRPr lang="en-US"/>
+          </a:p>
+        </p:txBody>
+      </p:sp>
+      <p:sp>
+        <p:nvSpPr>
+          <p:cNvPr id="7" name="Slide Number Placeholder 6"/>
+          <p:cNvSpPr>
+            <a:spLocks noGrp="1"/>
+          </p:cNvSpPr>
+          <p:nvPr>
+            <p:ph type="sldNum" sz="quarter" idx="5"/>
+          </p:nvPr>
+        </p:nvSpPr>
+        <p:spPr>
+          <a:xfrm>
+            <a:off x="3884613" y="8685213"/>
+            <a:ext cx="2971800" cy="458787"/>
+          </a:xfrm>
+          <a:prstGeom prst="rect">
+            <a:avLst/>
+          </a:prstGeom>
+        </p:spPr>
+        <p:txBody>
+          <a:bodyPr vert="horz" lIns="91440" tIns="45720" rIns="91440" bIns="45720" rtlCol="0" anchor="b"/>
+          <a:lstStyle>
+            <a:lvl1pPr algn="r">
+              <a:defRPr sz="1200"/>
+            </a:lvl1pPr>
+          </a:lstStyle>
+          <a:p>
+            <a:fld id="{8FC7C363-02C1-0D4B-B7C2-AACF0B0B3D8D}" type="slidenum">
+              <a:rPr lang="en-US" smtClean="0"/>
+              <a:t>‹#›</a:t>
+            </a:fld>
+            <a:endParaRPr lang="en-US"/>
+          </a:p>
+        </p:txBody>
+      </p:sp>
+    </p:spTree>
+    <p:extLst>
+      <p:ext uri="{BB962C8B-B14F-4D97-AF65-F5344CB8AC3E}">
+        <p14:creationId xmlns:p14="http://schemas.microsoft.com/office/powerpoint/2010/main" val="491903121"/>
+      </p:ext>
+    </p:extLst>
+  </p:cSld>
+  <p:clrMap bg1="lt1" tx1="dk1" bg2="lt2" tx2="dk2" accent1="accent1" accent2="accent2" accent3="accent3" accent4="accent4" accent5="accent5" accent6="accent6" hlink="hlink" folHlink="folHlink"/>
+  <p:notesStyle>
+    <a:lvl1pPr marL="0" algn="l" defTabSz="914400" rtl="0" eaLnBrk="1" latinLnBrk="0" hangingPunct="1">
+      <a:defRPr sz="1200" kern="1200">
+        <a:solidFill>
+          <a:schemeClr val="tx1"/>
+        </a:solidFill>
+        <a:latin typeface="+mn-lt"/>
+        <a:ea typeface="+mn-ea"/>
+        <a:cs typeface="+mn-cs"/>
+      </a:defRPr>
+    </a:lvl1pPr>
+    <a:lvl2pPr marL="457200" algn="l" defTabSz="914400" rtl="0" eaLnBrk="1" latinLnBrk="0" hangingPunct="1">
+      <a:defRPr sz="1200" kern="1200">
+        <a:solidFill>
+          <a:schemeClr val="tx1"/>
+        </a:solidFill>
+        <a:latin typeface="+mn-lt"/>
+        <a:ea typeface="+mn-ea"/>
+        <a:cs typeface="+mn-cs"/>
+      </a:defRPr>
+    </a:lvl2pPr>
+    <a:lvl3pPr marL="914400" algn="l" defTabSz="914400" rtl="0" eaLnBrk="1" latinLnBrk="0" hangingPunct="1">
+      <a:defRPr sz="1200" kern="1200">
+        <a:solidFill>
+          <a:schemeClr val="tx1"/>
+        </a:solidFill>
+        <a:latin typeface="+mn-lt"/>
+        <a:ea typeface="+mn-ea"/>
+        <a:cs typeface="+mn-cs"/>
+      </a:defRPr>
+    </a:lvl3pPr>
+    <a:lvl4pPr marL="1371600" algn="l" defTabSz="914400" rtl="0" eaLnBrk="1" latinLnBrk="0" hangingPunct="1">
+      <a:defRPr sz="1200" kern="1200">
+        <a:solidFill>
+          <a:schemeClr val="tx1"/>
+        </a:solidFill>
+        <a:latin typeface="+mn-lt"/>
+        <a:ea typeface="+mn-ea"/>
+        <a:cs typeface="+mn-cs"/>
+      </a:defRPr>
+    </a:lvl4pPr>
+    <a:lvl5pPr marL="1828800" algn="l" defTabSz="914400" rtl="0" eaLnBrk="1" latinLnBrk="0" hangingPunct="1">
+      <a:defRPr sz="1200" kern="1200">
+        <a:solidFill>
+          <a:schemeClr val="tx1"/>
+        </a:solidFill>
+        <a:latin typeface="+mn-lt"/>
+        <a:ea typeface="+mn-ea"/>
+        <a:cs typeface="+mn-cs"/>
+      </a:defRPr>
+    </a:lvl5pPr>
+    <a:lvl6pPr marL="2286000" algn="l" defTabSz="914400" rtl="0" eaLnBrk="1" latinLnBrk="0" hangingPunct="1">
+      <a:defRPr sz="1200" kern="1200">
+        <a:solidFill>
+          <a:schemeClr val="tx1"/>
+        </a:solidFill>
+        <a:latin typeface="+mn-lt"/>
+        <a:ea typeface="+mn-ea"/>
+        <a:cs typeface="+mn-cs"/>
+      </a:defRPr>
+    </a:lvl6pPr>
+    <a:lvl7pPr marL="2743200" algn="l" defTabSz="914400" rtl="0" eaLnBrk="1" latinLnBrk="0" hangingPunct="1">
+      <a:defRPr sz="1200" kern="1200">
+        <a:solidFill>
+          <a:schemeClr val="tx1"/>
+        </a:solidFill>
+        <a:latin typeface="+mn-lt"/>
+        <a:ea typeface="+mn-ea"/>
+        <a:cs typeface="+mn-cs"/>
+      </a:defRPr>
+    </a:lvl7pPr>
+    <a:lvl8pPr marL="3200400" algn="l" defTabSz="914400" rtl="0" eaLnBrk="1" latinLnBrk="0" hangingPunct="1">
+      <a:defRPr sz="1200" kern="1200">
+        <a:solidFill>
+          <a:schemeClr val="tx1"/>
+        </a:solidFill>
+        <a:latin typeface="+mn-lt"/>
+        <a:ea typeface="+mn-ea"/>
+        <a:cs typeface="+mn-cs"/>
+      </a:defRPr>
+    </a:lvl8pPr>
+    <a:lvl9pPr marL="3657600" algn="l" defTabSz="914400" rtl="0" eaLnBrk="1" latinLnBrk="0" hangingPunct="1">
+      <a:defRPr sz="1200" kern="1200">
+        <a:solidFill>
+          <a:schemeClr val="tx1"/>
+        </a:solidFill>
+        <a:latin typeface="+mn-lt"/>
+        <a:ea typeface="+mn-ea"/>
+        <a:cs typeface="+mn-cs"/>
+      </a:defRPr>
+    </a:lvl9pPr>
+  </p:notesStyle>
+</p:notesMaster>
+</file>
+
+<file path=ppt/notesSlides/notesSlide1.xml><?xml version="1.0" encoding="utf-8"?>
+<p:notes xmlns:a="http://schemas.openxmlformats.org/drawingml/2006/main" xmlns:r="http://schemas.openxmlformats.org/officeDocument/2006/relationships" xmlns:p="http://schemas.openxmlformats.org/presentationml/2006/main">
+  <p:cSld>
+    <p:spTree>
+      <p:nvGrpSpPr>
+        <p:cNvPr id="1" name=""/>
+        <p:cNvGrpSpPr/>
+        <p:nvPr/>
+      </p:nvGrpSpPr>
+      <p:grpSpPr>
+        <a:xfrm>
+          <a:off x="0" y="0"/>
+          <a:ext cx="0" cy="0"/>
+          <a:chOff x="0" y="0"/>
+          <a:chExt cx="0" cy="0"/>
+        </a:xfrm>
+      </p:grpSpPr>
+      <p:sp>
+        <p:nvSpPr>
+          <p:cNvPr id="2" name="Slide Image Placeholder 1"/>
+          <p:cNvSpPr>
+            <a:spLocks noGrp="1" noRot="1" noChangeAspect="1"/>
+          </p:cNvSpPr>
+          <p:nvPr>
+            <p:ph type="sldImg"/>
+          </p:nvPr>
+        </p:nvSpPr>
+        <p:spPr/>
+      </p:sp>
+      <p:sp>
+        <p:nvSpPr>
+          <p:cNvPr id="3" name="Notes Placeholder 2"/>
+          <p:cNvSpPr>
+            <a:spLocks noGrp="1"/>
+          </p:cNvSpPr>
+          <p:nvPr>
+            <p:ph type="body" idx="1"/>
+          </p:nvPr>
+        </p:nvSpPr>
+        <p:spPr/>
+        <p:txBody>
+          <a:bodyPr/>
+          <a:lstStyle/>
+          <a:p>
+            <a:endParaRPr lang="en-US" dirty="0"/>
+          </a:p>
+        </p:txBody>
+      </p:sp>
+      <p:sp>
+        <p:nvSpPr>
+          <p:cNvPr id="4" name="Slide Number Placeholder 3"/>
+          <p:cNvSpPr>
+            <a:spLocks noGrp="1"/>
+          </p:cNvSpPr>
+          <p:nvPr>
+            <p:ph type="sldNum" sz="quarter" idx="5"/>
+          </p:nvPr>
+        </p:nvSpPr>
+        <p:spPr/>
+        <p:txBody>
+          <a:bodyPr/>
+          <a:lstStyle/>
+          <a:p>
+            <a:fld id="{8FC7C363-02C1-0D4B-B7C2-AACF0B0B3D8D}" type="slidenum">
+              <a:rPr lang="en-US" smtClean="0"/>
+              <a:t>3</a:t>
+            </a:fld>
+            <a:endParaRPr lang="en-US"/>
+          </a:p>
+        </p:txBody>
+      </p:sp>
+    </p:spTree>
+    <p:extLst>
+      <p:ext uri="{BB962C8B-B14F-4D97-AF65-F5344CB8AC3E}">
+        <p14:creationId xmlns:p14="http://schemas.microsoft.com/office/powerpoint/2010/main" val="3951499403"/>
+      </p:ext>
+    </p:extLst>
+  </p:cSld>
+  <p:clrMapOvr>
+    <a:masterClrMapping/>
+  </p:clrMapOvr>
+</p:notes>
+</file>
+
 <file path=ppt/slideLayouts/slideLayout1.xml><?xml version="1.0" encoding="utf-8"?>
 <p:sldLayout xmlns:a="http://schemas.openxmlformats.org/drawingml/2006/main" xmlns:r="http://schemas.openxmlformats.org/officeDocument/2006/relationships" xmlns:p="http://schemas.openxmlformats.org/presentationml/2006/main" type="title" preserve="1">
   <p:cSld name="Title Slide">
@@ -305,7 +742,7 @@
           <a:p>
             <a:fld id="{78C97017-6FC3-485B-9764-EAC9E56C1D49}" type="datetimeFigureOut">
               <a:rPr lang="en-US" smtClean="0"/>
-              <a:t>10/20/2021</a:t>
+              <a:t>10/20/21</a:t>
             </a:fld>
             <a:endParaRPr lang="en-US"/>
           </a:p>
@@ -473,7 +910,7 @@
           <a:p>
             <a:fld id="{78C97017-6FC3-485B-9764-EAC9E56C1D49}" type="datetimeFigureOut">
               <a:rPr lang="en-US" smtClean="0"/>
-              <a:t>10/20/2021</a:t>
+              <a:t>10/20/21</a:t>
             </a:fld>
             <a:endParaRPr lang="en-US"/>
           </a:p>
@@ -651,7 +1088,7 @@
           <a:p>
             <a:fld id="{78C97017-6FC3-485B-9764-EAC9E56C1D49}" type="datetimeFigureOut">
               <a:rPr lang="en-US" smtClean="0"/>
-              <a:t>10/20/2021</a:t>
+              <a:t>10/20/21</a:t>
             </a:fld>
             <a:endParaRPr lang="en-US"/>
           </a:p>
@@ -819,7 +1256,7 @@
           <a:p>
             <a:fld id="{78C97017-6FC3-485B-9764-EAC9E56C1D49}" type="datetimeFigureOut">
               <a:rPr lang="en-US" smtClean="0"/>
-              <a:t>10/20/2021</a:t>
+              <a:t>10/20/21</a:t>
             </a:fld>
             <a:endParaRPr lang="en-US"/>
           </a:p>
@@ -1064,7 +1501,7 @@
           <a:p>
             <a:fld id="{78C97017-6FC3-485B-9764-EAC9E56C1D49}" type="datetimeFigureOut">
               <a:rPr lang="en-US" smtClean="0"/>
-              <a:t>10/20/2021</a:t>
+              <a:t>10/20/21</a:t>
             </a:fld>
             <a:endParaRPr lang="en-US"/>
           </a:p>
@@ -1349,7 +1786,7 @@
           <a:p>
             <a:fld id="{78C97017-6FC3-485B-9764-EAC9E56C1D49}" type="datetimeFigureOut">
               <a:rPr lang="en-US" smtClean="0"/>
-              <a:t>10/20/2021</a:t>
+              <a:t>10/20/21</a:t>
             </a:fld>
             <a:endParaRPr lang="en-US"/>
           </a:p>
@@ -1768,7 +2205,7 @@
           <a:p>
             <a:fld id="{78C97017-6FC3-485B-9764-EAC9E56C1D49}" type="datetimeFigureOut">
               <a:rPr lang="en-US" smtClean="0"/>
-              <a:t>10/20/2021</a:t>
+              <a:t>10/20/21</a:t>
             </a:fld>
             <a:endParaRPr lang="en-US"/>
           </a:p>
@@ -1885,7 +2322,7 @@
           <a:p>
             <a:fld id="{78C97017-6FC3-485B-9764-EAC9E56C1D49}" type="datetimeFigureOut">
               <a:rPr lang="en-US" smtClean="0"/>
-              <a:t>10/20/2021</a:t>
+              <a:t>10/20/21</a:t>
             </a:fld>
             <a:endParaRPr lang="en-US"/>
           </a:p>
@@ -1980,7 +2417,7 @@
           <a:p>
             <a:fld id="{78C97017-6FC3-485B-9764-EAC9E56C1D49}" type="datetimeFigureOut">
               <a:rPr lang="en-US" smtClean="0"/>
-              <a:t>10/20/2021</a:t>
+              <a:t>10/20/21</a:t>
             </a:fld>
             <a:endParaRPr lang="en-US"/>
           </a:p>
@@ -2255,7 +2692,7 @@
           <a:p>
             <a:fld id="{78C97017-6FC3-485B-9764-EAC9E56C1D49}" type="datetimeFigureOut">
               <a:rPr lang="en-US" smtClean="0"/>
-              <a:t>10/20/2021</a:t>
+              <a:t>10/20/21</a:t>
             </a:fld>
             <a:endParaRPr lang="en-US"/>
           </a:p>
@@ -2507,7 +2944,7 @@
           <a:p>
             <a:fld id="{78C97017-6FC3-485B-9764-EAC9E56C1D49}" type="datetimeFigureOut">
               <a:rPr lang="en-US" smtClean="0"/>
-              <a:t>10/20/2021</a:t>
+              <a:t>10/20/21</a:t>
             </a:fld>
             <a:endParaRPr lang="en-US"/>
           </a:p>
@@ -2718,7 +3155,7 @@
           <a:p>
             <a:fld id="{78C97017-6FC3-485B-9764-EAC9E56C1D49}" type="datetimeFigureOut">
               <a:rPr lang="en-US" smtClean="0"/>
-              <a:t>10/20/2021</a:t>
+              <a:t>10/20/21</a:t>
             </a:fld>
             <a:endParaRPr lang="en-US"/>
           </a:p>
@@ -3659,8 +4096,8 @@
         </p:nvSpPr>
         <p:spPr>
           <a:xfrm>
-            <a:off x="4447365" y="1379179"/>
-            <a:ext cx="4481733" cy="4343400"/>
+            <a:off x="4413180" y="1379179"/>
+            <a:ext cx="4647812" cy="4343400"/>
           </a:xfrm>
           <a:prstGeom prst="rect">
             <a:avLst/>
@@ -4690,8 +5127,8 @@
         </p:nvSpPr>
         <p:spPr>
           <a:xfrm>
-            <a:off x="7722569" y="1745640"/>
-            <a:ext cx="1121967" cy="374120"/>
+            <a:off x="8074534" y="1730578"/>
+            <a:ext cx="919732" cy="374120"/>
           </a:xfrm>
           <a:prstGeom prst="rect">
             <a:avLst/>
@@ -4975,7 +5412,7 @@
         </p:nvSpPr>
         <p:spPr>
           <a:xfrm>
-            <a:off x="6373260" y="2798705"/>
+            <a:off x="6772110" y="3125040"/>
             <a:ext cx="1121967" cy="374120"/>
           </a:xfrm>
           <a:prstGeom prst="rect">
@@ -5026,34 +5463,35 @@
       </p:sp>
       <p:cxnSp>
         <p:nvCxnSpPr>
-          <p:cNvPr id="99" name="Straight Arrow Connector 98">
+          <p:cNvPr id="103" name="Straight Connector 102">
             <a:extLst>
               <a:ext uri="{FF2B5EF4-FFF2-40B4-BE49-F238E27FC236}">
-                <a16:creationId xmlns:a16="http://schemas.microsoft.com/office/drawing/2014/main" id="{C4EC64CE-0EE4-4941-AB2F-1D7EC3AB49DE}"/>
+                <a16:creationId xmlns:a16="http://schemas.microsoft.com/office/drawing/2014/main" id="{B6BF0837-72BE-F64B-8DFD-D0313A5A9ECA}"/>
               </a:ext>
             </a:extLst>
           </p:cNvPr>
           <p:cNvCxnSpPr>
             <a:cxnSpLocks/>
+            <a:stCxn id="102" idx="0"/>
           </p:cNvCxnSpPr>
           <p:nvPr/>
         </p:nvCxnSpPr>
         <p:spPr>
           <a:xfrm>
-            <a:off x="5346757" y="2976458"/>
-            <a:ext cx="1026503" cy="0"/>
-          </a:xfrm>
-          <a:prstGeom prst="straightConnector1">
+            <a:off x="7295656" y="3499160"/>
+            <a:ext cx="19260" cy="2278152"/>
+          </a:xfrm>
+          <a:prstGeom prst="line">
             <a:avLst/>
           </a:prstGeom>
           <a:ln w="9525" cap="flat" cmpd="sng" algn="ctr">
             <a:solidFill>
               <a:schemeClr val="accent2"/>
             </a:solidFill>
-            <a:prstDash val="solid"/>
+            <a:prstDash val="dash"/>
             <a:round/>
             <a:headEnd type="none" w="med" len="med"/>
-            <a:tailEnd type="arrow" w="med" len="med"/>
+            <a:tailEnd type="none" w="med" len="med"/>
           </a:ln>
         </p:spPr>
         <p:style>
@@ -5071,47 +5509,12 @@
           </a:fontRef>
         </p:style>
       </p:cxnSp>
-      <p:sp>
-        <p:nvSpPr>
-          <p:cNvPr id="101" name="TextBox 100">
+      <p:cxnSp>
+        <p:nvCxnSpPr>
+          <p:cNvPr id="99" name="Straight Arrow Connector 98">
             <a:extLst>
               <a:ext uri="{FF2B5EF4-FFF2-40B4-BE49-F238E27FC236}">
-                <a16:creationId xmlns:a16="http://schemas.microsoft.com/office/drawing/2014/main" id="{DD67DB58-55EE-2542-B93A-57F0EEDD45E7}"/>
-              </a:ext>
-            </a:extLst>
-          </p:cNvPr>
-          <p:cNvSpPr txBox="1"/>
-          <p:nvPr/>
-        </p:nvSpPr>
-        <p:spPr>
-          <a:xfrm>
-            <a:off x="5380610" y="2733769"/>
-            <a:ext cx="992650" cy="215444"/>
-          </a:xfrm>
-          <a:prstGeom prst="rect">
-            <a:avLst/>
-          </a:prstGeom>
-          <a:noFill/>
-        </p:spPr>
-        <p:txBody>
-          <a:bodyPr wrap="square" rtlCol="0">
-            <a:spAutoFit/>
-          </a:bodyPr>
-          <a:lstStyle/>
-          <a:p>
-            <a:r>
-              <a:rPr lang="en-US" sz="800" dirty="0"/>
-              <a:t>addLesson(lesson)</a:t>
-            </a:r>
-          </a:p>
-        </p:txBody>
-      </p:sp>
-      <p:cxnSp>
-        <p:nvCxnSpPr>
-          <p:cNvPr id="103" name="Straight Connector 102">
-            <a:extLst>
-              <a:ext uri="{FF2B5EF4-FFF2-40B4-BE49-F238E27FC236}">
-                <a16:creationId xmlns:a16="http://schemas.microsoft.com/office/drawing/2014/main" id="{B6BF0837-72BE-F64B-8DFD-D0313A5A9ECA}"/>
+                <a16:creationId xmlns:a16="http://schemas.microsoft.com/office/drawing/2014/main" id="{C4EC64CE-0EE4-4941-AB2F-1D7EC3AB49DE}"/>
               </a:ext>
             </a:extLst>
           </p:cNvPr>
@@ -5121,21 +5524,21 @@
           <p:nvPr/>
         </p:nvCxnSpPr>
         <p:spPr>
-          <a:xfrm>
-            <a:off x="6909980" y="3172825"/>
-            <a:ext cx="0" cy="2604487"/>
-          </a:xfrm>
-          <a:prstGeom prst="line">
+          <a:xfrm flipV="1">
+            <a:off x="5368968" y="3368277"/>
+            <a:ext cx="1403142" cy="208"/>
+          </a:xfrm>
+          <a:prstGeom prst="straightConnector1">
             <a:avLst/>
           </a:prstGeom>
           <a:ln w="9525" cap="flat" cmpd="sng" algn="ctr">
             <a:solidFill>
               <a:schemeClr val="accent2"/>
             </a:solidFill>
-            <a:prstDash val="dash"/>
+            <a:prstDash val="solid"/>
             <a:round/>
             <a:headEnd type="none" w="med" len="med"/>
-            <a:tailEnd type="none" w="med" len="med"/>
+            <a:tailEnd type="arrow" w="med" len="med"/>
           </a:ln>
         </p:spPr>
         <p:style>
@@ -5155,6 +5558,41 @@
       </p:cxnSp>
       <p:sp>
         <p:nvSpPr>
+          <p:cNvPr id="101" name="TextBox 100">
+            <a:extLst>
+              <a:ext uri="{FF2B5EF4-FFF2-40B4-BE49-F238E27FC236}">
+                <a16:creationId xmlns:a16="http://schemas.microsoft.com/office/drawing/2014/main" id="{DD67DB58-55EE-2542-B93A-57F0EEDD45E7}"/>
+              </a:ext>
+            </a:extLst>
+          </p:cNvPr>
+          <p:cNvSpPr txBox="1"/>
+          <p:nvPr/>
+        </p:nvSpPr>
+        <p:spPr>
+          <a:xfrm>
+            <a:off x="5555413" y="2872640"/>
+            <a:ext cx="992650" cy="215444"/>
+          </a:xfrm>
+          <a:prstGeom prst="rect">
+            <a:avLst/>
+          </a:prstGeom>
+          <a:noFill/>
+        </p:spPr>
+        <p:txBody>
+          <a:bodyPr wrap="square" rtlCol="0">
+            <a:spAutoFit/>
+          </a:bodyPr>
+          <a:lstStyle/>
+          <a:p>
+            <a:r>
+              <a:rPr lang="en-US" sz="800" dirty="0"/>
+              <a:t>addLesson(lesson)</a:t>
+            </a:r>
+          </a:p>
+        </p:txBody>
+      </p:sp>
+      <p:sp>
+        <p:nvSpPr>
           <p:cNvPr id="102" name="Rectangle 101">
             <a:extLst>
               <a:ext uri="{FF2B5EF4-FFF2-40B4-BE49-F238E27FC236}">
@@ -5167,7 +5605,7 @@
         </p:nvSpPr>
         <p:spPr>
           <a:xfrm>
-            <a:off x="6851979" y="3184675"/>
+            <a:off x="7238507" y="3499160"/>
             <a:ext cx="114298" cy="625322"/>
           </a:xfrm>
           <a:prstGeom prst="rect">
@@ -5213,13 +5651,14 @@
           </p:cNvPr>
           <p:cNvCxnSpPr>
             <a:cxnSpLocks/>
+            <a:stCxn id="102" idx="2"/>
           </p:cNvCxnSpPr>
           <p:nvPr/>
         </p:nvCxnSpPr>
         <p:spPr>
           <a:xfrm flipH="1">
-            <a:off x="5353960" y="3803651"/>
-            <a:ext cx="1491301" cy="1"/>
+            <a:off x="5368970" y="4124482"/>
+            <a:ext cx="1926686" cy="13783"/>
           </a:xfrm>
           <a:prstGeom prst="straightConnector1">
             <a:avLst/>
@@ -5265,7 +5704,7 @@
         </p:nvCxnSpPr>
         <p:spPr>
           <a:xfrm flipV="1">
-            <a:off x="5351720" y="3765555"/>
+            <a:off x="5359804" y="4101416"/>
             <a:ext cx="93742" cy="38096"/>
           </a:xfrm>
           <a:prstGeom prst="line">
@@ -5308,7 +5747,7 @@
         </p:nvCxnSpPr>
         <p:spPr>
           <a:xfrm>
-            <a:off x="5353958" y="3803652"/>
+            <a:off x="5362042" y="4139513"/>
             <a:ext cx="93600" cy="39600"/>
           </a:xfrm>
           <a:prstGeom prst="line">
@@ -5351,7 +5790,7 @@
         </p:nvCxnSpPr>
         <p:spPr>
           <a:xfrm>
-            <a:off x="8305800" y="2119760"/>
+            <a:off x="8534400" y="2119760"/>
             <a:ext cx="0" cy="3657552"/>
           </a:xfrm>
           <a:prstGeom prst="line">
@@ -5398,8 +5837,8 @@
         </p:nvCxnSpPr>
         <p:spPr>
           <a:xfrm>
-            <a:off x="6964039" y="3276601"/>
-            <a:ext cx="1284612" cy="0"/>
+            <a:off x="7352805" y="3600380"/>
+            <a:ext cx="1129802" cy="0"/>
           </a:xfrm>
           <a:prstGeom prst="straightConnector1">
             <a:avLst/>
@@ -5445,8 +5884,8 @@
         </p:nvCxnSpPr>
         <p:spPr>
           <a:xfrm flipH="1">
-            <a:off x="6966278" y="3749513"/>
-            <a:ext cx="1314669" cy="0"/>
+            <a:off x="7358400" y="4063780"/>
+            <a:ext cx="1108769" cy="0"/>
           </a:xfrm>
           <a:prstGeom prst="straightConnector1">
             <a:avLst/>
@@ -5492,7 +5931,7 @@
         </p:nvCxnSpPr>
         <p:spPr>
           <a:xfrm flipV="1">
-            <a:off x="6964039" y="3711417"/>
+            <a:off x="7358398" y="4018520"/>
             <a:ext cx="93742" cy="38096"/>
           </a:xfrm>
           <a:prstGeom prst="line">
@@ -5535,7 +5974,7 @@
         </p:nvCxnSpPr>
         <p:spPr>
           <a:xfrm>
-            <a:off x="6966277" y="3749514"/>
+            <a:off x="7360636" y="4056617"/>
             <a:ext cx="93600" cy="39600"/>
           </a:xfrm>
           <a:prstGeom prst="line">
@@ -5576,7 +6015,7 @@
         </p:nvSpPr>
         <p:spPr>
           <a:xfrm>
-            <a:off x="8248651" y="3276600"/>
+            <a:off x="8472508" y="3590867"/>
             <a:ext cx="114298" cy="472913"/>
           </a:xfrm>
           <a:prstGeom prst="rect">
@@ -5625,7 +6064,7 @@
         </p:nvSpPr>
         <p:spPr>
           <a:xfrm>
-            <a:off x="7472991" y="3057706"/>
+            <a:off x="7814411" y="3373512"/>
             <a:ext cx="747086" cy="215444"/>
           </a:xfrm>
           <a:prstGeom prst="rect">
@@ -5677,6 +6116,276 @@
             <a:r>
               <a:rPr lang="en-US" dirty="0"/>
               <a:t>Timetable add</a:t>
+            </a:r>
+          </a:p>
+        </p:txBody>
+      </p:sp>
+      <p:sp>
+        <p:nvSpPr>
+          <p:cNvPr id="51" name="Rectangle 50">
+            <a:extLst>
+              <a:ext uri="{FF2B5EF4-FFF2-40B4-BE49-F238E27FC236}">
+                <a16:creationId xmlns:a16="http://schemas.microsoft.com/office/drawing/2014/main" id="{81B1B538-744C-9344-905D-C7654BA4560D}"/>
+              </a:ext>
+            </a:extLst>
+          </p:cNvPr>
+          <p:cNvSpPr/>
+          <p:nvPr/>
+        </p:nvSpPr>
+        <p:spPr>
+          <a:xfrm>
+            <a:off x="5299690" y="3085805"/>
+            <a:ext cx="114298" cy="106450"/>
+          </a:xfrm>
+          <a:prstGeom prst="rect">
+            <a:avLst/>
+          </a:prstGeom>
+          <a:ln w="12700">
+            <a:solidFill>
+              <a:schemeClr val="accent2"/>
+            </a:solidFill>
+          </a:ln>
+        </p:spPr>
+        <p:style>
+          <a:lnRef idx="2">
+            <a:schemeClr val="accent6"/>
+          </a:lnRef>
+          <a:fillRef idx="1">
+            <a:schemeClr val="lt1"/>
+          </a:fillRef>
+          <a:effectRef idx="0">
+            <a:schemeClr val="accent6"/>
+          </a:effectRef>
+          <a:fontRef idx="minor">
+            <a:schemeClr val="dk1"/>
+          </a:fontRef>
+        </p:style>
+        <p:txBody>
+          <a:bodyPr rtlCol="0" anchor="ctr"/>
+          <a:lstStyle/>
+          <a:p>
+            <a:pPr algn="ctr"/>
+            <a:endParaRPr lang="en-US"/>
+          </a:p>
+        </p:txBody>
+      </p:sp>
+      <p:cxnSp>
+        <p:nvCxnSpPr>
+          <p:cNvPr id="17" name="Curved Connector 16">
+            <a:extLst>
+              <a:ext uri="{FF2B5EF4-FFF2-40B4-BE49-F238E27FC236}">
+                <a16:creationId xmlns:a16="http://schemas.microsoft.com/office/drawing/2014/main" id="{7A0E6004-29F4-E041-AD62-68F3E9DEEBA4}"/>
+              </a:ext>
+            </a:extLst>
+          </p:cNvPr>
+          <p:cNvCxnSpPr>
+            <a:cxnSpLocks/>
+          </p:cNvCxnSpPr>
+          <p:nvPr/>
+        </p:nvCxnSpPr>
+        <p:spPr>
+          <a:xfrm rot="16200000" flipH="1">
+            <a:off x="5289762" y="2996007"/>
+            <a:ext cx="162613" cy="57149"/>
+          </a:xfrm>
+          <a:prstGeom prst="curvedConnector4">
+            <a:avLst>
+              <a:gd name="adj1" fmla="val 6204"/>
+              <a:gd name="adj2" fmla="val 500007"/>
+            </a:avLst>
+          </a:prstGeom>
+          <a:ln w="9525" cap="flat" cmpd="sng" algn="ctr">
+            <a:solidFill>
+              <a:schemeClr val="accent2"/>
+            </a:solidFill>
+            <a:prstDash val="solid"/>
+            <a:round/>
+            <a:headEnd type="none" w="med" len="med"/>
+            <a:tailEnd type="arrow" w="med" len="med"/>
+          </a:ln>
+        </p:spPr>
+        <p:style>
+          <a:lnRef idx="0">
+            <a:scrgbClr r="0" g="0" b="0"/>
+          </a:lnRef>
+          <a:fillRef idx="0">
+            <a:scrgbClr r="0" g="0" b="0"/>
+          </a:fillRef>
+          <a:effectRef idx="0">
+            <a:scrgbClr r="0" g="0" b="0"/>
+          </a:effectRef>
+          <a:fontRef idx="minor">
+            <a:schemeClr val="tx1"/>
+          </a:fontRef>
+        </p:style>
+      </p:cxnSp>
+      <p:cxnSp>
+        <p:nvCxnSpPr>
+          <p:cNvPr id="95" name="Elbow Connector 94">
+            <a:extLst>
+              <a:ext uri="{FF2B5EF4-FFF2-40B4-BE49-F238E27FC236}">
+                <a16:creationId xmlns:a16="http://schemas.microsoft.com/office/drawing/2014/main" id="{32BE6738-A16F-7E48-9972-9547383140CD}"/>
+              </a:ext>
+            </a:extLst>
+          </p:cNvPr>
+          <p:cNvCxnSpPr>
+            <a:cxnSpLocks/>
+          </p:cNvCxnSpPr>
+          <p:nvPr/>
+        </p:nvCxnSpPr>
+        <p:spPr>
+          <a:xfrm flipH="1">
+            <a:off x="5361488" y="3189330"/>
+            <a:ext cx="62228" cy="167124"/>
+          </a:xfrm>
+          <a:prstGeom prst="bentConnector4">
+            <a:avLst>
+              <a:gd name="adj1" fmla="val -202494"/>
+              <a:gd name="adj2" fmla="val 65924"/>
+            </a:avLst>
+          </a:prstGeom>
+          <a:ln w="9525" cap="flat" cmpd="sng" algn="ctr">
+            <a:solidFill>
+              <a:schemeClr val="accent2"/>
+            </a:solidFill>
+            <a:prstDash val="dash"/>
+            <a:round/>
+            <a:headEnd type="none" w="med" len="med"/>
+            <a:tailEnd type="none" w="med" len="med"/>
+          </a:ln>
+        </p:spPr>
+        <p:style>
+          <a:lnRef idx="0">
+            <a:scrgbClr r="0" g="0" b="0"/>
+          </a:lnRef>
+          <a:fillRef idx="0">
+            <a:scrgbClr r="0" g="0" b="0"/>
+          </a:fillRef>
+          <a:effectRef idx="0">
+            <a:scrgbClr r="0" g="0" b="0"/>
+          </a:effectRef>
+          <a:fontRef idx="minor">
+            <a:schemeClr val="tx1"/>
+          </a:fontRef>
+        </p:style>
+      </p:cxnSp>
+      <p:cxnSp>
+        <p:nvCxnSpPr>
+          <p:cNvPr id="120" name="Straight Connector 119">
+            <a:extLst>
+              <a:ext uri="{FF2B5EF4-FFF2-40B4-BE49-F238E27FC236}">
+                <a16:creationId xmlns:a16="http://schemas.microsoft.com/office/drawing/2014/main" id="{2710091E-4F5A-4D45-9A38-8D752CC98518}"/>
+              </a:ext>
+            </a:extLst>
+          </p:cNvPr>
+          <p:cNvCxnSpPr>
+            <a:cxnSpLocks/>
+          </p:cNvCxnSpPr>
+          <p:nvPr/>
+        </p:nvCxnSpPr>
+        <p:spPr>
+          <a:xfrm flipV="1">
+            <a:off x="5338749" y="3264333"/>
+            <a:ext cx="93742" cy="38096"/>
+          </a:xfrm>
+          <a:prstGeom prst="line">
+            <a:avLst/>
+          </a:prstGeom>
+          <a:ln>
+            <a:solidFill>
+              <a:schemeClr val="accent2"/>
+            </a:solidFill>
+          </a:ln>
+        </p:spPr>
+        <p:style>
+          <a:lnRef idx="1">
+            <a:schemeClr val="accent1"/>
+          </a:lnRef>
+          <a:fillRef idx="0">
+            <a:schemeClr val="accent1"/>
+          </a:fillRef>
+          <a:effectRef idx="0">
+            <a:schemeClr val="accent1"/>
+          </a:effectRef>
+          <a:fontRef idx="minor">
+            <a:schemeClr val="tx1"/>
+          </a:fontRef>
+        </p:style>
+      </p:cxnSp>
+      <p:cxnSp>
+        <p:nvCxnSpPr>
+          <p:cNvPr id="121" name="Straight Connector 120">
+            <a:extLst>
+              <a:ext uri="{FF2B5EF4-FFF2-40B4-BE49-F238E27FC236}">
+                <a16:creationId xmlns:a16="http://schemas.microsoft.com/office/drawing/2014/main" id="{93B062F3-D947-2745-9C86-EB1D2828E3E5}"/>
+              </a:ext>
+            </a:extLst>
+          </p:cNvPr>
+          <p:cNvCxnSpPr>
+            <a:cxnSpLocks/>
+          </p:cNvCxnSpPr>
+          <p:nvPr/>
+        </p:nvCxnSpPr>
+        <p:spPr>
+          <a:xfrm>
+            <a:off x="5340987" y="3302430"/>
+            <a:ext cx="93600" cy="39600"/>
+          </a:xfrm>
+          <a:prstGeom prst="line">
+            <a:avLst/>
+          </a:prstGeom>
+          <a:ln>
+            <a:solidFill>
+              <a:schemeClr val="accent2"/>
+            </a:solidFill>
+          </a:ln>
+        </p:spPr>
+        <p:style>
+          <a:lnRef idx="1">
+            <a:schemeClr val="accent1"/>
+          </a:lnRef>
+          <a:fillRef idx="0">
+            <a:schemeClr val="accent1"/>
+          </a:fillRef>
+          <a:effectRef idx="0">
+            <a:schemeClr val="accent1"/>
+          </a:effectRef>
+          <a:fontRef idx="minor">
+            <a:schemeClr val="tx1"/>
+          </a:fontRef>
+        </p:style>
+      </p:cxnSp>
+      <p:sp>
+        <p:nvSpPr>
+          <p:cNvPr id="109" name="TextBox 108">
+            <a:extLst>
+              <a:ext uri="{FF2B5EF4-FFF2-40B4-BE49-F238E27FC236}">
+                <a16:creationId xmlns:a16="http://schemas.microsoft.com/office/drawing/2014/main" id="{9276B4C0-2EBD-314E-B34A-F6E33FE3F7E4}"/>
+              </a:ext>
+            </a:extLst>
+          </p:cNvPr>
+          <p:cNvSpPr txBox="1"/>
+          <p:nvPr/>
+        </p:nvSpPr>
+        <p:spPr>
+          <a:xfrm>
+            <a:off x="5490947" y="3154473"/>
+            <a:ext cx="1397052" cy="215444"/>
+          </a:xfrm>
+          <a:prstGeom prst="rect">
+            <a:avLst/>
+          </a:prstGeom>
+          <a:noFill/>
+        </p:spPr>
+        <p:txBody>
+          <a:bodyPr wrap="square" rtlCol="0">
+            <a:spAutoFit/>
+          </a:bodyPr>
+          <a:lstStyle/>
+          <a:p>
+            <a:r>
+              <a:rPr lang="en-US" sz="800" dirty="0"/>
+              <a:t>new Lesson(Lesson Details)</a:t>
             </a:r>
           </a:p>
         </p:txBody>
@@ -6007,4 +6716,299 @@
   <a:objectDefaults/>
   <a:extraClrSchemeLst/>
 </a:theme>
+</file>
+
+<file path=ppt/theme/theme2.xml><?xml version="1.0" encoding="utf-8"?>
+<a:theme xmlns:a="http://schemas.openxmlformats.org/drawingml/2006/main" name="Office Theme">
+  <a:themeElements>
+    <a:clrScheme name="Office">
+      <a:dk1>
+        <a:sysClr val="windowText" lastClr="000000"/>
+      </a:dk1>
+      <a:lt1>
+        <a:sysClr val="window" lastClr="FFFFFF"/>
+      </a:lt1>
+      <a:dk2>
+        <a:srgbClr val="44546A"/>
+      </a:dk2>
+      <a:lt2>
+        <a:srgbClr val="E7E6E6"/>
+      </a:lt2>
+      <a:accent1>
+        <a:srgbClr val="4472C4"/>
+      </a:accent1>
+      <a:accent2>
+        <a:srgbClr val="ED7D31"/>
+      </a:accent2>
+      <a:accent3>
+        <a:srgbClr val="A5A5A5"/>
+      </a:accent3>
+      <a:accent4>
+        <a:srgbClr val="FFC000"/>
+      </a:accent4>
+      <a:accent5>
+        <a:srgbClr val="5B9BD5"/>
+      </a:accent5>
+      <a:accent6>
+        <a:srgbClr val="70AD47"/>
+      </a:accent6>
+      <a:hlink>
+        <a:srgbClr val="0563C1"/>
+      </a:hlink>
+      <a:folHlink>
+        <a:srgbClr val="954F72"/>
+      </a:folHlink>
+    </a:clrScheme>
+    <a:fontScheme name="Office">
+      <a:majorFont>
+        <a:latin typeface="Calibri Light" panose="020F0302020204030204"/>
+        <a:ea typeface=""/>
+        <a:cs typeface=""/>
+        <a:font script="Jpan" typeface="游ゴシック Light"/>
+        <a:font script="Hang" typeface="맑은 고딕"/>
+        <a:font script="Hans" typeface="等线 Light"/>
+        <a:font script="Hant" typeface="新細明體"/>
+        <a:font script="Arab" typeface="Times New Roman"/>
+        <a:font script="Hebr" typeface="Times New Roman"/>
+        <a:font script="Thai" typeface="Angsana New"/>
+        <a:font script="Ethi" typeface="Nyala"/>
+        <a:font script="Beng" typeface="Vrinda"/>
+        <a:font script="Gujr" typeface="Shruti"/>
+        <a:font script="Khmr" typeface="MoolBoran"/>
+        <a:font script="Knda" typeface="Tunga"/>
+        <a:font script="Guru" typeface="Raavi"/>
+        <a:font script="Cans" typeface="Euphemia"/>
+        <a:font script="Cher" typeface="Plantagenet Cherokee"/>
+        <a:font script="Yiii" typeface="Microsoft Yi Baiti"/>
+        <a:font script="Tibt" typeface="Microsoft Himalaya"/>
+        <a:font script="Thaa" typeface="MV Boli"/>
+        <a:font script="Deva" typeface="Mangal"/>
+        <a:font script="Telu" typeface="Gautami"/>
+        <a:font script="Taml" typeface="Latha"/>
+        <a:font script="Syrc" typeface="Estrangelo Edessa"/>
+        <a:font script="Orya" typeface="Kalinga"/>
+        <a:font script="Mlym" typeface="Kartika"/>
+        <a:font script="Laoo" typeface="DokChampa"/>
+        <a:font script="Sinh" typeface="Iskoola Pota"/>
+        <a:font script="Mong" typeface="Mongolian Baiti"/>
+        <a:font script="Viet" typeface="Times New Roman"/>
+        <a:font script="Uigh" typeface="Microsoft Uighur"/>
+        <a:font script="Geor" typeface="Sylfaen"/>
+        <a:font script="Armn" typeface="Arial"/>
+        <a:font script="Bugi" typeface="Leelawadee UI"/>
+        <a:font script="Bopo" typeface="Microsoft JhengHei"/>
+        <a:font script="Java" typeface="Javanese Text"/>
+        <a:font script="Lisu" typeface="Segoe UI"/>
+        <a:font script="Mymr" typeface="Myanmar Text"/>
+        <a:font script="Nkoo" typeface="Ebrima"/>
+        <a:font script="Olck" typeface="Nirmala UI"/>
+        <a:font script="Osma" typeface="Ebrima"/>
+        <a:font script="Phag" typeface="Phagspa"/>
+        <a:font script="Syrn" typeface="Estrangelo Edessa"/>
+        <a:font script="Syrj" typeface="Estrangelo Edessa"/>
+        <a:font script="Syre" typeface="Estrangelo Edessa"/>
+        <a:font script="Sora" typeface="Nirmala UI"/>
+        <a:font script="Tale" typeface="Microsoft Tai Le"/>
+        <a:font script="Talu" typeface="Microsoft New Tai Lue"/>
+        <a:font script="Tfng" typeface="Ebrima"/>
+      </a:majorFont>
+      <a:minorFont>
+        <a:latin typeface="Calibri" panose="020F0502020204030204"/>
+        <a:ea typeface=""/>
+        <a:cs typeface=""/>
+        <a:font script="Jpan" typeface="游ゴシック"/>
+        <a:font script="Hang" typeface="맑은 고딕"/>
+        <a:font script="Hans" typeface="等线"/>
+        <a:font script="Hant" typeface="新細明體"/>
+        <a:font script="Arab" typeface="Arial"/>
+        <a:font script="Hebr" typeface="Arial"/>
+        <a:font script="Thai" typeface="Cordia New"/>
+        <a:font script="Ethi" typeface="Nyala"/>
+        <a:font script="Beng" typeface="Vrinda"/>
+        <a:font script="Gujr" typeface="Shruti"/>
+        <a:font script="Khmr" typeface="DaunPenh"/>
+        <a:font script="Knda" typeface="Tunga"/>
+        <a:font script="Guru" typeface="Raavi"/>
+        <a:font script="Cans" typeface="Euphemia"/>
+        <a:font script="Cher" typeface="Plantagenet Cherokee"/>
+        <a:font script="Yiii" typeface="Microsoft Yi Baiti"/>
+        <a:font script="Tibt" typeface="Microsoft Himalaya"/>
+        <a:font script="Thaa" typeface="MV Boli"/>
+        <a:font script="Deva" typeface="Mangal"/>
+        <a:font script="Telu" typeface="Gautami"/>
+        <a:font script="Taml" typeface="Latha"/>
+        <a:font script="Syrc" typeface="Estrangelo Edessa"/>
+        <a:font script="Orya" typeface="Kalinga"/>
+        <a:font script="Mlym" typeface="Kartika"/>
+        <a:font script="Laoo" typeface="DokChampa"/>
+        <a:font script="Sinh" typeface="Iskoola Pota"/>
+        <a:font script="Mong" typeface="Mongolian Baiti"/>
+        <a:font script="Viet" typeface="Arial"/>
+        <a:font script="Uigh" typeface="Microsoft Uighur"/>
+        <a:font script="Geor" typeface="Sylfaen"/>
+        <a:font script="Armn" typeface="Arial"/>
+        <a:font script="Bugi" typeface="Leelawadee UI"/>
+        <a:font script="Bopo" typeface="Microsoft JhengHei"/>
+        <a:font script="Java" typeface="Javanese Text"/>
+        <a:font script="Lisu" typeface="Segoe UI"/>
+        <a:font script="Mymr" typeface="Myanmar Text"/>
+        <a:font script="Nkoo" typeface="Ebrima"/>
+        <a:font script="Olck" typeface="Nirmala UI"/>
+        <a:font script="Osma" typeface="Ebrima"/>
+        <a:font script="Phag" typeface="Phagspa"/>
+        <a:font script="Syrn" typeface="Estrangelo Edessa"/>
+        <a:font script="Syrj" typeface="Estrangelo Edessa"/>
+        <a:font script="Syre" typeface="Estrangelo Edessa"/>
+        <a:font script="Sora" typeface="Nirmala UI"/>
+        <a:font script="Tale" typeface="Microsoft Tai Le"/>
+        <a:font script="Talu" typeface="Microsoft New Tai Lue"/>
+        <a:font script="Tfng" typeface="Ebrima"/>
+      </a:minorFont>
+    </a:fontScheme>
+    <a:fmtScheme name="Office">
+      <a:fillStyleLst>
+        <a:solidFill>
+          <a:schemeClr val="phClr"/>
+        </a:solidFill>
+        <a:gradFill rotWithShape="1">
+          <a:gsLst>
+            <a:gs pos="0">
+              <a:schemeClr val="phClr">
+                <a:lumMod val="110000"/>
+                <a:satMod val="105000"/>
+                <a:tint val="67000"/>
+              </a:schemeClr>
+            </a:gs>
+            <a:gs pos="50000">
+              <a:schemeClr val="phClr">
+                <a:lumMod val="105000"/>
+                <a:satMod val="103000"/>
+                <a:tint val="73000"/>
+              </a:schemeClr>
+            </a:gs>
+            <a:gs pos="100000">
+              <a:schemeClr val="phClr">
+                <a:lumMod val="105000"/>
+                <a:satMod val="109000"/>
+                <a:tint val="81000"/>
+              </a:schemeClr>
+            </a:gs>
+          </a:gsLst>
+          <a:lin ang="5400000" scaled="0"/>
+        </a:gradFill>
+        <a:gradFill rotWithShape="1">
+          <a:gsLst>
+            <a:gs pos="0">
+              <a:schemeClr val="phClr">
+                <a:satMod val="103000"/>
+                <a:lumMod val="102000"/>
+                <a:tint val="94000"/>
+              </a:schemeClr>
+            </a:gs>
+            <a:gs pos="50000">
+              <a:schemeClr val="phClr">
+                <a:satMod val="110000"/>
+                <a:lumMod val="100000"/>
+                <a:shade val="100000"/>
+              </a:schemeClr>
+            </a:gs>
+            <a:gs pos="100000">
+              <a:schemeClr val="phClr">
+                <a:lumMod val="99000"/>
+                <a:satMod val="120000"/>
+                <a:shade val="78000"/>
+              </a:schemeClr>
+            </a:gs>
+          </a:gsLst>
+          <a:lin ang="5400000" scaled="0"/>
+        </a:gradFill>
+      </a:fillStyleLst>
+      <a:lnStyleLst>
+        <a:ln w="6350" cap="flat" cmpd="sng" algn="ctr">
+          <a:solidFill>
+            <a:schemeClr val="phClr"/>
+          </a:solidFill>
+          <a:prstDash val="solid"/>
+          <a:miter lim="800000"/>
+        </a:ln>
+        <a:ln w="12700" cap="flat" cmpd="sng" algn="ctr">
+          <a:solidFill>
+            <a:schemeClr val="phClr"/>
+          </a:solidFill>
+          <a:prstDash val="solid"/>
+          <a:miter lim="800000"/>
+        </a:ln>
+        <a:ln w="19050" cap="flat" cmpd="sng" algn="ctr">
+          <a:solidFill>
+            <a:schemeClr val="phClr"/>
+          </a:solidFill>
+          <a:prstDash val="solid"/>
+          <a:miter lim="800000"/>
+        </a:ln>
+      </a:lnStyleLst>
+      <a:effectStyleLst>
+        <a:effectStyle>
+          <a:effectLst/>
+        </a:effectStyle>
+        <a:effectStyle>
+          <a:effectLst/>
+        </a:effectStyle>
+        <a:effectStyle>
+          <a:effectLst>
+            <a:outerShdw blurRad="57150" dist="19050" dir="5400000" algn="ctr" rotWithShape="0">
+              <a:srgbClr val="000000">
+                <a:alpha val="63000"/>
+              </a:srgbClr>
+            </a:outerShdw>
+          </a:effectLst>
+        </a:effectStyle>
+      </a:effectStyleLst>
+      <a:bgFillStyleLst>
+        <a:solidFill>
+          <a:schemeClr val="phClr"/>
+        </a:solidFill>
+        <a:solidFill>
+          <a:schemeClr val="phClr">
+            <a:tint val="95000"/>
+            <a:satMod val="170000"/>
+          </a:schemeClr>
+        </a:solidFill>
+        <a:gradFill rotWithShape="1">
+          <a:gsLst>
+            <a:gs pos="0">
+              <a:schemeClr val="phClr">
+                <a:tint val="93000"/>
+                <a:satMod val="150000"/>
+                <a:shade val="98000"/>
+                <a:lumMod val="102000"/>
+              </a:schemeClr>
+            </a:gs>
+            <a:gs pos="50000">
+              <a:schemeClr val="phClr">
+                <a:tint val="98000"/>
+                <a:satMod val="130000"/>
+                <a:shade val="90000"/>
+                <a:lumMod val="103000"/>
+              </a:schemeClr>
+            </a:gs>
+            <a:gs pos="100000">
+              <a:schemeClr val="phClr">
+                <a:shade val="63000"/>
+                <a:satMod val="120000"/>
+              </a:schemeClr>
+            </a:gs>
+          </a:gsLst>
+          <a:lin ang="5400000" scaled="0"/>
+        </a:gradFill>
+      </a:bgFillStyleLst>
+    </a:fmtScheme>
+  </a:themeElements>
+  <a:objectDefaults/>
+  <a:extraClrSchemeLst/>
+  <a:extLst>
+    <a:ext uri="{05A4C25C-085E-4340-85A3-A5531E510DB2}">
+      <thm15:themeFamily xmlns:thm15="http://schemas.microsoft.com/office/thememl/2012/main" name="Office Theme" id="{62F939B6-93AF-4DB8-9C6B-D6C7DFDC589F}" vid="{4A3C46E8-61CC-4603-A589-7422A47A8E4A}"/>
+    </a:ext>
+  </a:extLst>
+</a:theme>
 </file>
</xml_diff>

<commit_message>
Add sequence diagram to planner add
</commit_message>
<xml_diff>
--- a/docs/assets/DG Diagrams.pptx
+++ b/docs/assets/DG Diagrams.pptx
@@ -211,7 +211,7 @@
           <a:p>
             <a:fld id="{31B455B7-35F4-3248-9980-DA268DAEE9E9}" type="datetimeFigureOut">
               <a:rPr lang="en-US" smtClean="0"/>
-              <a:t>10/20/21</a:t>
+              <a:t>10/20/2021</a:t>
             </a:fld>
             <a:endParaRPr lang="en-US"/>
           </a:p>
@@ -742,7 +742,7 @@
           <a:p>
             <a:fld id="{78C97017-6FC3-485B-9764-EAC9E56C1D49}" type="datetimeFigureOut">
               <a:rPr lang="en-US" smtClean="0"/>
-              <a:t>10/20/21</a:t>
+              <a:t>10/20/2021</a:t>
             </a:fld>
             <a:endParaRPr lang="en-US"/>
           </a:p>
@@ -910,7 +910,7 @@
           <a:p>
             <a:fld id="{78C97017-6FC3-485B-9764-EAC9E56C1D49}" type="datetimeFigureOut">
               <a:rPr lang="en-US" smtClean="0"/>
-              <a:t>10/20/21</a:t>
+              <a:t>10/20/2021</a:t>
             </a:fld>
             <a:endParaRPr lang="en-US"/>
           </a:p>
@@ -1088,7 +1088,7 @@
           <a:p>
             <a:fld id="{78C97017-6FC3-485B-9764-EAC9E56C1D49}" type="datetimeFigureOut">
               <a:rPr lang="en-US" smtClean="0"/>
-              <a:t>10/20/21</a:t>
+              <a:t>10/20/2021</a:t>
             </a:fld>
             <a:endParaRPr lang="en-US"/>
           </a:p>
@@ -1256,7 +1256,7 @@
           <a:p>
             <a:fld id="{78C97017-6FC3-485B-9764-EAC9E56C1D49}" type="datetimeFigureOut">
               <a:rPr lang="en-US" smtClean="0"/>
-              <a:t>10/20/21</a:t>
+              <a:t>10/20/2021</a:t>
             </a:fld>
             <a:endParaRPr lang="en-US"/>
           </a:p>
@@ -1501,7 +1501,7 @@
           <a:p>
             <a:fld id="{78C97017-6FC3-485B-9764-EAC9E56C1D49}" type="datetimeFigureOut">
               <a:rPr lang="en-US" smtClean="0"/>
-              <a:t>10/20/21</a:t>
+              <a:t>10/20/2021</a:t>
             </a:fld>
             <a:endParaRPr lang="en-US"/>
           </a:p>
@@ -1786,7 +1786,7 @@
           <a:p>
             <a:fld id="{78C97017-6FC3-485B-9764-EAC9E56C1D49}" type="datetimeFigureOut">
               <a:rPr lang="en-US" smtClean="0"/>
-              <a:t>10/20/21</a:t>
+              <a:t>10/20/2021</a:t>
             </a:fld>
             <a:endParaRPr lang="en-US"/>
           </a:p>
@@ -2205,7 +2205,7 @@
           <a:p>
             <a:fld id="{78C97017-6FC3-485B-9764-EAC9E56C1D49}" type="datetimeFigureOut">
               <a:rPr lang="en-US" smtClean="0"/>
-              <a:t>10/20/21</a:t>
+              <a:t>10/20/2021</a:t>
             </a:fld>
             <a:endParaRPr lang="en-US"/>
           </a:p>
@@ -2322,7 +2322,7 @@
           <a:p>
             <a:fld id="{78C97017-6FC3-485B-9764-EAC9E56C1D49}" type="datetimeFigureOut">
               <a:rPr lang="en-US" smtClean="0"/>
-              <a:t>10/20/21</a:t>
+              <a:t>10/20/2021</a:t>
             </a:fld>
             <a:endParaRPr lang="en-US"/>
           </a:p>
@@ -2417,7 +2417,7 @@
           <a:p>
             <a:fld id="{78C97017-6FC3-485B-9764-EAC9E56C1D49}" type="datetimeFigureOut">
               <a:rPr lang="en-US" smtClean="0"/>
-              <a:t>10/20/21</a:t>
+              <a:t>10/20/2021</a:t>
             </a:fld>
             <a:endParaRPr lang="en-US"/>
           </a:p>
@@ -2692,7 +2692,7 @@
           <a:p>
             <a:fld id="{78C97017-6FC3-485B-9764-EAC9E56C1D49}" type="datetimeFigureOut">
               <a:rPr lang="en-US" smtClean="0"/>
-              <a:t>10/20/21</a:t>
+              <a:t>10/20/2021</a:t>
             </a:fld>
             <a:endParaRPr lang="en-US"/>
           </a:p>
@@ -2944,7 +2944,7 @@
           <a:p>
             <a:fld id="{78C97017-6FC3-485B-9764-EAC9E56C1D49}" type="datetimeFigureOut">
               <a:rPr lang="en-US" smtClean="0"/>
-              <a:t>10/20/21</a:t>
+              <a:t>10/20/2021</a:t>
             </a:fld>
             <a:endParaRPr lang="en-US"/>
           </a:p>
@@ -3155,7 +3155,7 @@
           <a:p>
             <a:fld id="{78C97017-6FC3-485B-9764-EAC9E56C1D49}" type="datetimeFigureOut">
               <a:rPr lang="en-US" smtClean="0"/>
-              <a:t>10/20/21</a:t>
+              <a:t>10/20/2021</a:t>
             </a:fld>
             <a:endParaRPr lang="en-US"/>
           </a:p>
@@ -6420,6 +6420,3530 @@
           <a:chExt cx="0" cy="0"/>
         </a:xfrm>
       </p:grpSpPr>
+      <p:sp>
+        <p:nvSpPr>
+          <p:cNvPr id="2" name="TextBox 1">
+            <a:extLst>
+              <a:ext uri="{FF2B5EF4-FFF2-40B4-BE49-F238E27FC236}">
+                <a16:creationId xmlns:a16="http://schemas.microsoft.com/office/drawing/2014/main" id="{231CEFC0-7A1F-4161-AE29-8E67B66794D4}"/>
+              </a:ext>
+            </a:extLst>
+          </p:cNvPr>
+          <p:cNvSpPr txBox="1"/>
+          <p:nvPr/>
+        </p:nvSpPr>
+        <p:spPr>
+          <a:xfrm>
+            <a:off x="3676308" y="411966"/>
+            <a:ext cx="1313180" cy="369332"/>
+          </a:xfrm>
+          <a:prstGeom prst="rect">
+            <a:avLst/>
+          </a:prstGeom>
+          <a:noFill/>
+        </p:spPr>
+        <p:txBody>
+          <a:bodyPr wrap="none" rtlCol="0">
+            <a:spAutoFit/>
+          </a:bodyPr>
+          <a:lstStyle/>
+          <a:p>
+            <a:r>
+              <a:rPr lang="en-US" dirty="0"/>
+              <a:t>Planner add</a:t>
+            </a:r>
+          </a:p>
+        </p:txBody>
+      </p:sp>
+      <p:sp>
+        <p:nvSpPr>
+          <p:cNvPr id="4" name="Rectangle 3">
+            <a:extLst>
+              <a:ext uri="{FF2B5EF4-FFF2-40B4-BE49-F238E27FC236}">
+                <a16:creationId xmlns:a16="http://schemas.microsoft.com/office/drawing/2014/main" id="{1FD98BC2-4A42-4154-8E4E-D4AD5A36EFC7}"/>
+              </a:ext>
+            </a:extLst>
+          </p:cNvPr>
+          <p:cNvSpPr/>
+          <p:nvPr/>
+        </p:nvSpPr>
+        <p:spPr>
+          <a:xfrm>
+            <a:off x="304800" y="1143000"/>
+            <a:ext cx="1143000" cy="304800"/>
+          </a:xfrm>
+          <a:prstGeom prst="rect">
+            <a:avLst/>
+          </a:prstGeom>
+          <a:solidFill>
+            <a:schemeClr val="accent1">
+              <a:lumMod val="50000"/>
+            </a:schemeClr>
+          </a:solidFill>
+          <a:ln w="12700">
+            <a:solidFill>
+              <a:schemeClr val="accent2"/>
+            </a:solidFill>
+          </a:ln>
+        </p:spPr>
+        <p:style>
+          <a:lnRef idx="2">
+            <a:schemeClr val="accent1">
+              <a:shade val="50000"/>
+            </a:schemeClr>
+          </a:lnRef>
+          <a:fillRef idx="1">
+            <a:schemeClr val="accent1"/>
+          </a:fillRef>
+          <a:effectRef idx="0">
+            <a:schemeClr val="accent1"/>
+          </a:effectRef>
+          <a:fontRef idx="minor">
+            <a:schemeClr val="lt1"/>
+          </a:fontRef>
+        </p:style>
+        <p:txBody>
+          <a:bodyPr rtlCol="0" anchor="ctr"/>
+          <a:lstStyle/>
+          <a:p>
+            <a:pPr algn="ctr"/>
+            <a:r>
+              <a:rPr lang="en-US" sz="800" dirty="0"/>
+              <a:t>:Parser</a:t>
+            </a:r>
+          </a:p>
+        </p:txBody>
+      </p:sp>
+      <p:cxnSp>
+        <p:nvCxnSpPr>
+          <p:cNvPr id="5" name="Straight Connector 4">
+            <a:extLst>
+              <a:ext uri="{FF2B5EF4-FFF2-40B4-BE49-F238E27FC236}">
+                <a16:creationId xmlns:a16="http://schemas.microsoft.com/office/drawing/2014/main" id="{6EEC574A-8E61-45DD-8185-FF663D92E959}"/>
+              </a:ext>
+            </a:extLst>
+          </p:cNvPr>
+          <p:cNvCxnSpPr>
+            <a:cxnSpLocks/>
+          </p:cNvCxnSpPr>
+          <p:nvPr/>
+        </p:nvCxnSpPr>
+        <p:spPr>
+          <a:xfrm>
+            <a:off x="876300" y="1447800"/>
+            <a:ext cx="0" cy="1828800"/>
+          </a:xfrm>
+          <a:prstGeom prst="line">
+            <a:avLst/>
+          </a:prstGeom>
+          <a:ln w="9525" cap="flat" cmpd="sng" algn="ctr">
+            <a:solidFill>
+              <a:schemeClr val="accent2"/>
+            </a:solidFill>
+            <a:prstDash val="dash"/>
+            <a:round/>
+            <a:headEnd type="none" w="med" len="med"/>
+            <a:tailEnd type="none" w="med" len="med"/>
+          </a:ln>
+        </p:spPr>
+        <p:style>
+          <a:lnRef idx="0">
+            <a:scrgbClr r="0" g="0" b="0"/>
+          </a:lnRef>
+          <a:fillRef idx="0">
+            <a:scrgbClr r="0" g="0" b="0"/>
+          </a:fillRef>
+          <a:effectRef idx="0">
+            <a:scrgbClr r="0" g="0" b="0"/>
+          </a:effectRef>
+          <a:fontRef idx="minor">
+            <a:schemeClr val="tx1"/>
+          </a:fontRef>
+        </p:style>
+      </p:cxnSp>
+      <p:sp>
+        <p:nvSpPr>
+          <p:cNvPr id="7" name="Rectangle 6">
+            <a:extLst>
+              <a:ext uri="{FF2B5EF4-FFF2-40B4-BE49-F238E27FC236}">
+                <a16:creationId xmlns:a16="http://schemas.microsoft.com/office/drawing/2014/main" id="{C52B6B4A-32C9-4104-BDFB-5C819E0C04C5}"/>
+              </a:ext>
+            </a:extLst>
+          </p:cNvPr>
+          <p:cNvSpPr/>
+          <p:nvPr/>
+        </p:nvSpPr>
+        <p:spPr>
+          <a:xfrm>
+            <a:off x="828676" y="1676400"/>
+            <a:ext cx="94498" cy="1447798"/>
+          </a:xfrm>
+          <a:prstGeom prst="rect">
+            <a:avLst/>
+          </a:prstGeom>
+          <a:ln w="12700">
+            <a:solidFill>
+              <a:schemeClr val="accent2"/>
+            </a:solidFill>
+          </a:ln>
+        </p:spPr>
+        <p:style>
+          <a:lnRef idx="2">
+            <a:schemeClr val="accent6"/>
+          </a:lnRef>
+          <a:fillRef idx="1">
+            <a:schemeClr val="lt1"/>
+          </a:fillRef>
+          <a:effectRef idx="0">
+            <a:schemeClr val="accent6"/>
+          </a:effectRef>
+          <a:fontRef idx="minor">
+            <a:schemeClr val="dk1"/>
+          </a:fontRef>
+        </p:style>
+        <p:txBody>
+          <a:bodyPr rtlCol="0" anchor="ctr"/>
+          <a:lstStyle/>
+          <a:p>
+            <a:pPr algn="ctr"/>
+            <a:endParaRPr lang="en-US"/>
+          </a:p>
+        </p:txBody>
+      </p:sp>
+      <p:cxnSp>
+        <p:nvCxnSpPr>
+          <p:cNvPr id="8" name="Straight Arrow Connector 7">
+            <a:extLst>
+              <a:ext uri="{FF2B5EF4-FFF2-40B4-BE49-F238E27FC236}">
+                <a16:creationId xmlns:a16="http://schemas.microsoft.com/office/drawing/2014/main" id="{02059A8E-43BA-4FE5-9504-9904338B0653}"/>
+              </a:ext>
+            </a:extLst>
+          </p:cNvPr>
+          <p:cNvCxnSpPr/>
+          <p:nvPr/>
+        </p:nvCxnSpPr>
+        <p:spPr>
+          <a:xfrm>
+            <a:off x="0" y="1673352"/>
+            <a:ext cx="857251" cy="0"/>
+          </a:xfrm>
+          <a:prstGeom prst="straightConnector1">
+            <a:avLst/>
+          </a:prstGeom>
+          <a:ln w="9525" cap="flat" cmpd="sng" algn="ctr">
+            <a:solidFill>
+              <a:schemeClr val="accent2"/>
+            </a:solidFill>
+            <a:prstDash val="solid"/>
+            <a:round/>
+            <a:headEnd type="none" w="med" len="med"/>
+            <a:tailEnd type="arrow" w="med" len="med"/>
+          </a:ln>
+        </p:spPr>
+        <p:style>
+          <a:lnRef idx="0">
+            <a:scrgbClr r="0" g="0" b="0"/>
+          </a:lnRef>
+          <a:fillRef idx="0">
+            <a:scrgbClr r="0" g="0" b="0"/>
+          </a:fillRef>
+          <a:effectRef idx="0">
+            <a:scrgbClr r="0" g="0" b="0"/>
+          </a:effectRef>
+          <a:fontRef idx="minor">
+            <a:schemeClr val="tx1"/>
+          </a:fontRef>
+        </p:style>
+      </p:cxnSp>
+      <p:sp>
+        <p:nvSpPr>
+          <p:cNvPr id="9" name="TextBox 8">
+            <a:extLst>
+              <a:ext uri="{FF2B5EF4-FFF2-40B4-BE49-F238E27FC236}">
+                <a16:creationId xmlns:a16="http://schemas.microsoft.com/office/drawing/2014/main" id="{9835AEB7-63EB-4B1E-B403-B36C8240D6D6}"/>
+              </a:ext>
+            </a:extLst>
+          </p:cNvPr>
+          <p:cNvSpPr txBox="1"/>
+          <p:nvPr/>
+        </p:nvSpPr>
+        <p:spPr>
+          <a:xfrm>
+            <a:off x="-10288" y="1670047"/>
+            <a:ext cx="857251" cy="338554"/>
+          </a:xfrm>
+          <a:prstGeom prst="rect">
+            <a:avLst/>
+          </a:prstGeom>
+          <a:noFill/>
+        </p:spPr>
+        <p:txBody>
+          <a:bodyPr wrap="square" rtlCol="0">
+            <a:spAutoFit/>
+          </a:bodyPr>
+          <a:lstStyle/>
+          <a:p>
+            <a:r>
+              <a:rPr lang="en-US" sz="800" dirty="0"/>
+              <a:t>parseCommand(input : String)</a:t>
+            </a:r>
+          </a:p>
+        </p:txBody>
+      </p:sp>
+      <p:sp>
+        <p:nvSpPr>
+          <p:cNvPr id="11" name="TextBox 10">
+            <a:extLst>
+              <a:ext uri="{FF2B5EF4-FFF2-40B4-BE49-F238E27FC236}">
+                <a16:creationId xmlns:a16="http://schemas.microsoft.com/office/drawing/2014/main" id="{93C27ADE-B729-426B-9195-BABA12E372B2}"/>
+              </a:ext>
+            </a:extLst>
+          </p:cNvPr>
+          <p:cNvSpPr txBox="1"/>
+          <p:nvPr/>
+        </p:nvSpPr>
+        <p:spPr>
+          <a:xfrm>
+            <a:off x="966784" y="1569720"/>
+            <a:ext cx="1624014" cy="338554"/>
+          </a:xfrm>
+          <a:prstGeom prst="rect">
+            <a:avLst/>
+          </a:prstGeom>
+          <a:noFill/>
+        </p:spPr>
+        <p:txBody>
+          <a:bodyPr wrap="square" rtlCol="0">
+            <a:spAutoFit/>
+          </a:bodyPr>
+          <a:lstStyle/>
+          <a:p>
+            <a:r>
+              <a:rPr lang="en-US" sz="800" dirty="0"/>
+              <a:t>parseSubCommand(</a:t>
+            </a:r>
+            <a:r>
+              <a:rPr lang="en-US" sz="800" dirty="0" err="1"/>
+              <a:t>subInput</a:t>
+            </a:r>
+            <a:r>
+              <a:rPr lang="en-US" sz="800" dirty="0"/>
+              <a:t> : String, </a:t>
+            </a:r>
+            <a:r>
+              <a:rPr lang="en-US" sz="800" dirty="0" err="1"/>
+              <a:t>commandWord</a:t>
+            </a:r>
+            <a:r>
+              <a:rPr lang="en-US" sz="800" dirty="0"/>
+              <a:t> : String)</a:t>
+            </a:r>
+          </a:p>
+        </p:txBody>
+      </p:sp>
+      <p:sp>
+        <p:nvSpPr>
+          <p:cNvPr id="14" name="Rectangle 13">
+            <a:extLst>
+              <a:ext uri="{FF2B5EF4-FFF2-40B4-BE49-F238E27FC236}">
+                <a16:creationId xmlns:a16="http://schemas.microsoft.com/office/drawing/2014/main" id="{7A0A803C-5D0C-48A5-9D98-3BAC9B952BA7}"/>
+              </a:ext>
+            </a:extLst>
+          </p:cNvPr>
+          <p:cNvSpPr/>
+          <p:nvPr/>
+        </p:nvSpPr>
+        <p:spPr>
+          <a:xfrm>
+            <a:off x="886588" y="2030194"/>
+            <a:ext cx="95232" cy="783814"/>
+          </a:xfrm>
+          <a:prstGeom prst="rect">
+            <a:avLst/>
+          </a:prstGeom>
+          <a:ln w="12700">
+            <a:solidFill>
+              <a:schemeClr val="accent2"/>
+            </a:solidFill>
+          </a:ln>
+        </p:spPr>
+        <p:style>
+          <a:lnRef idx="2">
+            <a:schemeClr val="accent6"/>
+          </a:lnRef>
+          <a:fillRef idx="1">
+            <a:schemeClr val="lt1"/>
+          </a:fillRef>
+          <a:effectRef idx="0">
+            <a:schemeClr val="accent6"/>
+          </a:effectRef>
+          <a:fontRef idx="minor">
+            <a:schemeClr val="dk1"/>
+          </a:fontRef>
+        </p:style>
+        <p:txBody>
+          <a:bodyPr rtlCol="0" anchor="ctr"/>
+          <a:lstStyle/>
+          <a:p>
+            <a:pPr algn="ctr"/>
+            <a:endParaRPr lang="en-US"/>
+          </a:p>
+        </p:txBody>
+      </p:sp>
+      <p:cxnSp>
+        <p:nvCxnSpPr>
+          <p:cNvPr id="15" name="Curved Connector 16">
+            <a:extLst>
+              <a:ext uri="{FF2B5EF4-FFF2-40B4-BE49-F238E27FC236}">
+                <a16:creationId xmlns:a16="http://schemas.microsoft.com/office/drawing/2014/main" id="{46663309-2E43-4EA5-92C4-23FD688BF991}"/>
+              </a:ext>
+            </a:extLst>
+          </p:cNvPr>
+          <p:cNvCxnSpPr>
+            <a:cxnSpLocks/>
+          </p:cNvCxnSpPr>
+          <p:nvPr/>
+        </p:nvCxnSpPr>
+        <p:spPr>
+          <a:xfrm rot="16200000" flipH="1">
+            <a:off x="866429" y="1918789"/>
+            <a:ext cx="162613" cy="57149"/>
+          </a:xfrm>
+          <a:prstGeom prst="curvedConnector4">
+            <a:avLst>
+              <a:gd name="adj1" fmla="val 6204"/>
+              <a:gd name="adj2" fmla="val 500007"/>
+            </a:avLst>
+          </a:prstGeom>
+          <a:ln w="9525" cap="flat" cmpd="sng" algn="ctr">
+            <a:solidFill>
+              <a:schemeClr val="accent2"/>
+            </a:solidFill>
+            <a:prstDash val="solid"/>
+            <a:round/>
+            <a:headEnd type="none" w="med" len="med"/>
+            <a:tailEnd type="arrow" w="med" len="med"/>
+          </a:ln>
+        </p:spPr>
+        <p:style>
+          <a:lnRef idx="0">
+            <a:scrgbClr r="0" g="0" b="0"/>
+          </a:lnRef>
+          <a:fillRef idx="0">
+            <a:scrgbClr r="0" g="0" b="0"/>
+          </a:fillRef>
+          <a:effectRef idx="0">
+            <a:scrgbClr r="0" g="0" b="0"/>
+          </a:effectRef>
+          <a:fontRef idx="minor">
+            <a:schemeClr val="tx1"/>
+          </a:fontRef>
+        </p:style>
+      </p:cxnSp>
+      <p:cxnSp>
+        <p:nvCxnSpPr>
+          <p:cNvPr id="16" name="Straight Arrow Connector 15">
+            <a:extLst>
+              <a:ext uri="{FF2B5EF4-FFF2-40B4-BE49-F238E27FC236}">
+                <a16:creationId xmlns:a16="http://schemas.microsoft.com/office/drawing/2014/main" id="{C36A9E4C-D451-4E9F-A8F8-866E30C11318}"/>
+              </a:ext>
+            </a:extLst>
+          </p:cNvPr>
+          <p:cNvCxnSpPr>
+            <a:cxnSpLocks/>
+          </p:cNvCxnSpPr>
+          <p:nvPr/>
+        </p:nvCxnSpPr>
+        <p:spPr>
+          <a:xfrm>
+            <a:off x="976310" y="2209800"/>
+            <a:ext cx="1719263" cy="0"/>
+          </a:xfrm>
+          <a:prstGeom prst="straightConnector1">
+            <a:avLst/>
+          </a:prstGeom>
+          <a:ln w="9525" cap="flat" cmpd="sng" algn="ctr">
+            <a:solidFill>
+              <a:schemeClr val="accent2"/>
+            </a:solidFill>
+            <a:prstDash val="solid"/>
+            <a:round/>
+            <a:headEnd type="none" w="med" len="med"/>
+            <a:tailEnd type="arrow" w="med" len="med"/>
+          </a:ln>
+        </p:spPr>
+        <p:style>
+          <a:lnRef idx="0">
+            <a:scrgbClr r="0" g="0" b="0"/>
+          </a:lnRef>
+          <a:fillRef idx="0">
+            <a:scrgbClr r="0" g="0" b="0"/>
+          </a:fillRef>
+          <a:effectRef idx="0">
+            <a:scrgbClr r="0" g="0" b="0"/>
+          </a:effectRef>
+          <a:fontRef idx="minor">
+            <a:schemeClr val="tx1"/>
+          </a:fontRef>
+        </p:style>
+      </p:cxnSp>
+      <p:sp>
+        <p:nvSpPr>
+          <p:cNvPr id="18" name="TextBox 17">
+            <a:extLst>
+              <a:ext uri="{FF2B5EF4-FFF2-40B4-BE49-F238E27FC236}">
+                <a16:creationId xmlns:a16="http://schemas.microsoft.com/office/drawing/2014/main" id="{7F62D833-DEE1-471A-8777-509E4FF19CCE}"/>
+              </a:ext>
+            </a:extLst>
+          </p:cNvPr>
+          <p:cNvSpPr txBox="1"/>
+          <p:nvPr/>
+        </p:nvSpPr>
+        <p:spPr>
+          <a:xfrm>
+            <a:off x="969632" y="2204611"/>
+            <a:ext cx="1752600" cy="338554"/>
+          </a:xfrm>
+          <a:prstGeom prst="rect">
+            <a:avLst/>
+          </a:prstGeom>
+          <a:noFill/>
+        </p:spPr>
+        <p:txBody>
+          <a:bodyPr wrap="square" rtlCol="0">
+            <a:spAutoFit/>
+          </a:bodyPr>
+          <a:lstStyle/>
+          <a:p>
+            <a:r>
+              <a:rPr lang="en-US" sz="800" dirty="0"/>
+              <a:t>new </a:t>
+            </a:r>
+            <a:r>
+              <a:rPr lang="en-US" sz="800" dirty="0" err="1"/>
+              <a:t>PlannerCommand</a:t>
+            </a:r>
+            <a:r>
+              <a:rPr lang="en-US" sz="800" dirty="0"/>
+              <a:t>(subcommand : String, </a:t>
+            </a:r>
+            <a:r>
+              <a:rPr lang="en-US" sz="800" dirty="0" err="1"/>
+              <a:t>parsedArguments</a:t>
+            </a:r>
+            <a:r>
+              <a:rPr lang="en-US" sz="800" dirty="0"/>
+              <a:t> : String[])</a:t>
+            </a:r>
+          </a:p>
+        </p:txBody>
+      </p:sp>
+      <p:sp>
+        <p:nvSpPr>
+          <p:cNvPr id="20" name="Rectangle 19">
+            <a:extLst>
+              <a:ext uri="{FF2B5EF4-FFF2-40B4-BE49-F238E27FC236}">
+                <a16:creationId xmlns:a16="http://schemas.microsoft.com/office/drawing/2014/main" id="{1465DAA2-65A0-42CB-9AEA-2AD84C424845}"/>
+              </a:ext>
+            </a:extLst>
+          </p:cNvPr>
+          <p:cNvSpPr/>
+          <p:nvPr/>
+        </p:nvSpPr>
+        <p:spPr>
+          <a:xfrm>
+            <a:off x="2695573" y="2047184"/>
+            <a:ext cx="1504929" cy="304800"/>
+          </a:xfrm>
+          <a:prstGeom prst="rect">
+            <a:avLst/>
+          </a:prstGeom>
+          <a:solidFill>
+            <a:schemeClr val="accent1">
+              <a:lumMod val="50000"/>
+            </a:schemeClr>
+          </a:solidFill>
+          <a:ln w="12700">
+            <a:solidFill>
+              <a:schemeClr val="accent2"/>
+            </a:solidFill>
+          </a:ln>
+        </p:spPr>
+        <p:style>
+          <a:lnRef idx="2">
+            <a:schemeClr val="accent1">
+              <a:shade val="50000"/>
+            </a:schemeClr>
+          </a:lnRef>
+          <a:fillRef idx="1">
+            <a:schemeClr val="accent1"/>
+          </a:fillRef>
+          <a:effectRef idx="0">
+            <a:schemeClr val="accent1"/>
+          </a:effectRef>
+          <a:fontRef idx="minor">
+            <a:schemeClr val="lt1"/>
+          </a:fontRef>
+        </p:style>
+        <p:txBody>
+          <a:bodyPr rtlCol="0" anchor="ctr"/>
+          <a:lstStyle/>
+          <a:p>
+            <a:pPr algn="ctr"/>
+            <a:r>
+              <a:rPr lang="en-US" sz="800" dirty="0"/>
+              <a:t>:</a:t>
+            </a:r>
+            <a:r>
+              <a:rPr lang="en-US" sz="800" dirty="0" err="1"/>
+              <a:t>PlannerCommand</a:t>
+            </a:r>
+            <a:endParaRPr lang="en-US" sz="800" dirty="0"/>
+          </a:p>
+        </p:txBody>
+      </p:sp>
+      <p:sp>
+        <p:nvSpPr>
+          <p:cNvPr id="21" name="Rectangle 20">
+            <a:extLst>
+              <a:ext uri="{FF2B5EF4-FFF2-40B4-BE49-F238E27FC236}">
+                <a16:creationId xmlns:a16="http://schemas.microsoft.com/office/drawing/2014/main" id="{EB588744-6C13-4C5E-859F-24B790DF788A}"/>
+              </a:ext>
+            </a:extLst>
+          </p:cNvPr>
+          <p:cNvSpPr/>
+          <p:nvPr/>
+        </p:nvSpPr>
+        <p:spPr>
+          <a:xfrm>
+            <a:off x="3404217" y="2351984"/>
+            <a:ext cx="117301" cy="284655"/>
+          </a:xfrm>
+          <a:prstGeom prst="rect">
+            <a:avLst/>
+          </a:prstGeom>
+          <a:ln w="12700">
+            <a:solidFill>
+              <a:schemeClr val="accent2"/>
+            </a:solidFill>
+          </a:ln>
+        </p:spPr>
+        <p:style>
+          <a:lnRef idx="2">
+            <a:schemeClr val="accent6"/>
+          </a:lnRef>
+          <a:fillRef idx="1">
+            <a:schemeClr val="lt1"/>
+          </a:fillRef>
+          <a:effectRef idx="0">
+            <a:schemeClr val="accent6"/>
+          </a:effectRef>
+          <a:fontRef idx="minor">
+            <a:schemeClr val="dk1"/>
+          </a:fontRef>
+        </p:style>
+        <p:txBody>
+          <a:bodyPr rtlCol="0" anchor="ctr"/>
+          <a:lstStyle/>
+          <a:p>
+            <a:pPr algn="ctr"/>
+            <a:endParaRPr lang="en-US"/>
+          </a:p>
+        </p:txBody>
+      </p:sp>
+      <p:cxnSp>
+        <p:nvCxnSpPr>
+          <p:cNvPr id="22" name="Straight Connector 21">
+            <a:extLst>
+              <a:ext uri="{FF2B5EF4-FFF2-40B4-BE49-F238E27FC236}">
+                <a16:creationId xmlns:a16="http://schemas.microsoft.com/office/drawing/2014/main" id="{87456D04-AA43-448F-89E1-3C5678E057B4}"/>
+              </a:ext>
+            </a:extLst>
+          </p:cNvPr>
+          <p:cNvCxnSpPr>
+            <a:cxnSpLocks/>
+            <a:stCxn id="21" idx="2"/>
+          </p:cNvCxnSpPr>
+          <p:nvPr/>
+        </p:nvCxnSpPr>
+        <p:spPr>
+          <a:xfrm flipH="1">
+            <a:off x="3454711" y="2636639"/>
+            <a:ext cx="8157" cy="4221361"/>
+          </a:xfrm>
+          <a:prstGeom prst="line">
+            <a:avLst/>
+          </a:prstGeom>
+          <a:ln w="9525" cap="flat" cmpd="sng" algn="ctr">
+            <a:solidFill>
+              <a:schemeClr val="accent2"/>
+            </a:solidFill>
+            <a:prstDash val="dash"/>
+            <a:round/>
+            <a:headEnd type="none" w="med" len="med"/>
+            <a:tailEnd type="none" w="med" len="med"/>
+          </a:ln>
+        </p:spPr>
+        <p:style>
+          <a:lnRef idx="0">
+            <a:scrgbClr r="0" g="0" b="0"/>
+          </a:lnRef>
+          <a:fillRef idx="0">
+            <a:scrgbClr r="0" g="0" b="0"/>
+          </a:fillRef>
+          <a:effectRef idx="0">
+            <a:scrgbClr r="0" g="0" b="0"/>
+          </a:effectRef>
+          <a:fontRef idx="minor">
+            <a:schemeClr val="tx1"/>
+          </a:fontRef>
+        </p:style>
+      </p:cxnSp>
+      <p:grpSp>
+        <p:nvGrpSpPr>
+          <p:cNvPr id="29" name="Group 28">
+            <a:extLst>
+              <a:ext uri="{FF2B5EF4-FFF2-40B4-BE49-F238E27FC236}">
+                <a16:creationId xmlns:a16="http://schemas.microsoft.com/office/drawing/2014/main" id="{8EA99A0A-911A-4A4E-8F2B-852B1C25EFA8}"/>
+              </a:ext>
+            </a:extLst>
+          </p:cNvPr>
+          <p:cNvGrpSpPr/>
+          <p:nvPr/>
+        </p:nvGrpSpPr>
+        <p:grpSpPr>
+          <a:xfrm>
+            <a:off x="981823" y="2604108"/>
+            <a:ext cx="2422393" cy="109578"/>
+            <a:chOff x="5359804" y="4101416"/>
+            <a:chExt cx="1935852" cy="77697"/>
+          </a:xfrm>
+        </p:grpSpPr>
+        <p:cxnSp>
+          <p:nvCxnSpPr>
+            <p:cNvPr id="30" name="Straight Arrow Connector 29">
+              <a:extLst>
+                <a:ext uri="{FF2B5EF4-FFF2-40B4-BE49-F238E27FC236}">
+                  <a16:creationId xmlns:a16="http://schemas.microsoft.com/office/drawing/2014/main" id="{511E4A94-44FE-496E-8365-1B0F84A6319B}"/>
+                </a:ext>
+              </a:extLst>
+            </p:cNvPr>
+            <p:cNvCxnSpPr>
+              <a:cxnSpLocks/>
+            </p:cNvCxnSpPr>
+            <p:nvPr/>
+          </p:nvCxnSpPr>
+          <p:spPr>
+            <a:xfrm flipH="1">
+              <a:off x="5368970" y="4124482"/>
+              <a:ext cx="1926686" cy="13783"/>
+            </a:xfrm>
+            <a:prstGeom prst="straightConnector1">
+              <a:avLst/>
+            </a:prstGeom>
+            <a:ln w="9525" cap="flat" cmpd="sng" algn="ctr">
+              <a:solidFill>
+                <a:schemeClr val="accent2"/>
+              </a:solidFill>
+              <a:prstDash val="dash"/>
+              <a:round/>
+              <a:headEnd type="none" w="med" len="med"/>
+              <a:tailEnd type="none" w="med" len="med"/>
+            </a:ln>
+          </p:spPr>
+          <p:style>
+            <a:lnRef idx="0">
+              <a:scrgbClr r="0" g="0" b="0"/>
+            </a:lnRef>
+            <a:fillRef idx="0">
+              <a:scrgbClr r="0" g="0" b="0"/>
+            </a:fillRef>
+            <a:effectRef idx="0">
+              <a:scrgbClr r="0" g="0" b="0"/>
+            </a:effectRef>
+            <a:fontRef idx="minor">
+              <a:schemeClr val="tx1"/>
+            </a:fontRef>
+          </p:style>
+        </p:cxnSp>
+        <p:cxnSp>
+          <p:nvCxnSpPr>
+            <p:cNvPr id="31" name="Straight Connector 30">
+              <a:extLst>
+                <a:ext uri="{FF2B5EF4-FFF2-40B4-BE49-F238E27FC236}">
+                  <a16:creationId xmlns:a16="http://schemas.microsoft.com/office/drawing/2014/main" id="{F27AFF03-7063-4653-98DD-FB66201B4FA5}"/>
+                </a:ext>
+              </a:extLst>
+            </p:cNvPr>
+            <p:cNvCxnSpPr>
+              <a:cxnSpLocks/>
+            </p:cNvCxnSpPr>
+            <p:nvPr/>
+          </p:nvCxnSpPr>
+          <p:spPr>
+            <a:xfrm flipV="1">
+              <a:off x="5359804" y="4101416"/>
+              <a:ext cx="93742" cy="38096"/>
+            </a:xfrm>
+            <a:prstGeom prst="line">
+              <a:avLst/>
+            </a:prstGeom>
+            <a:ln>
+              <a:solidFill>
+                <a:schemeClr val="accent2"/>
+              </a:solidFill>
+            </a:ln>
+          </p:spPr>
+          <p:style>
+            <a:lnRef idx="1">
+              <a:schemeClr val="accent1"/>
+            </a:lnRef>
+            <a:fillRef idx="0">
+              <a:schemeClr val="accent1"/>
+            </a:fillRef>
+            <a:effectRef idx="0">
+              <a:schemeClr val="accent1"/>
+            </a:effectRef>
+            <a:fontRef idx="minor">
+              <a:schemeClr val="tx1"/>
+            </a:fontRef>
+          </p:style>
+        </p:cxnSp>
+        <p:cxnSp>
+          <p:nvCxnSpPr>
+            <p:cNvPr id="32" name="Straight Connector 31">
+              <a:extLst>
+                <a:ext uri="{FF2B5EF4-FFF2-40B4-BE49-F238E27FC236}">
+                  <a16:creationId xmlns:a16="http://schemas.microsoft.com/office/drawing/2014/main" id="{23CB1B41-54AD-4014-A0A4-26B59C860E86}"/>
+                </a:ext>
+              </a:extLst>
+            </p:cNvPr>
+            <p:cNvCxnSpPr>
+              <a:cxnSpLocks/>
+            </p:cNvCxnSpPr>
+            <p:nvPr/>
+          </p:nvCxnSpPr>
+          <p:spPr>
+            <a:xfrm>
+              <a:off x="5362042" y="4139513"/>
+              <a:ext cx="93600" cy="39600"/>
+            </a:xfrm>
+            <a:prstGeom prst="line">
+              <a:avLst/>
+            </a:prstGeom>
+            <a:ln>
+              <a:solidFill>
+                <a:schemeClr val="accent2"/>
+              </a:solidFill>
+            </a:ln>
+          </p:spPr>
+          <p:style>
+            <a:lnRef idx="1">
+              <a:schemeClr val="accent1"/>
+            </a:lnRef>
+            <a:fillRef idx="0">
+              <a:schemeClr val="accent1"/>
+            </a:fillRef>
+            <a:effectRef idx="0">
+              <a:schemeClr val="accent1"/>
+            </a:effectRef>
+            <a:fontRef idx="minor">
+              <a:schemeClr val="tx1"/>
+            </a:fontRef>
+          </p:style>
+        </p:cxnSp>
+      </p:grpSp>
+      <p:sp>
+        <p:nvSpPr>
+          <p:cNvPr id="34" name="TextBox 33">
+            <a:extLst>
+              <a:ext uri="{FF2B5EF4-FFF2-40B4-BE49-F238E27FC236}">
+                <a16:creationId xmlns:a16="http://schemas.microsoft.com/office/drawing/2014/main" id="{0B927B75-430A-4F7F-9B76-EB7C6B97A450}"/>
+              </a:ext>
+            </a:extLst>
+          </p:cNvPr>
+          <p:cNvSpPr txBox="1"/>
+          <p:nvPr/>
+        </p:nvSpPr>
+        <p:spPr>
+          <a:xfrm>
+            <a:off x="1887008" y="2618379"/>
+            <a:ext cx="652240" cy="215444"/>
+          </a:xfrm>
+          <a:prstGeom prst="rect">
+            <a:avLst/>
+          </a:prstGeom>
+          <a:noFill/>
+        </p:spPr>
+        <p:txBody>
+          <a:bodyPr wrap="square" rtlCol="0">
+            <a:spAutoFit/>
+          </a:bodyPr>
+          <a:lstStyle/>
+          <a:p>
+            <a:r>
+              <a:rPr lang="en-US" sz="800" dirty="0"/>
+              <a:t>command</a:t>
+            </a:r>
+          </a:p>
+        </p:txBody>
+      </p:sp>
+      <p:grpSp>
+        <p:nvGrpSpPr>
+          <p:cNvPr id="214" name="Group 213">
+            <a:extLst>
+              <a:ext uri="{FF2B5EF4-FFF2-40B4-BE49-F238E27FC236}">
+                <a16:creationId xmlns:a16="http://schemas.microsoft.com/office/drawing/2014/main" id="{60E26FD0-3576-471D-B79E-81C79B29B497}"/>
+              </a:ext>
+            </a:extLst>
+          </p:cNvPr>
+          <p:cNvGrpSpPr/>
+          <p:nvPr/>
+        </p:nvGrpSpPr>
+        <p:grpSpPr>
+          <a:xfrm>
+            <a:off x="3485733" y="6003172"/>
+            <a:ext cx="113349" cy="229735"/>
+            <a:chOff x="892968" y="2808822"/>
+            <a:chExt cx="113349" cy="229735"/>
+          </a:xfrm>
+        </p:grpSpPr>
+        <p:cxnSp>
+          <p:nvCxnSpPr>
+            <p:cNvPr id="37" name="Straight Connector 36">
+              <a:extLst>
+                <a:ext uri="{FF2B5EF4-FFF2-40B4-BE49-F238E27FC236}">
+                  <a16:creationId xmlns:a16="http://schemas.microsoft.com/office/drawing/2014/main" id="{183F2BEF-40D2-4955-9040-32B88FE9D9A9}"/>
+                </a:ext>
+              </a:extLst>
+            </p:cNvPr>
+            <p:cNvCxnSpPr>
+              <a:cxnSpLocks/>
+            </p:cNvCxnSpPr>
+            <p:nvPr/>
+          </p:nvCxnSpPr>
+          <p:spPr>
+            <a:xfrm flipV="1">
+              <a:off x="927250" y="2899492"/>
+              <a:ext cx="79067" cy="64572"/>
+            </a:xfrm>
+            <a:prstGeom prst="line">
+              <a:avLst/>
+            </a:prstGeom>
+            <a:ln>
+              <a:solidFill>
+                <a:schemeClr val="accent2"/>
+              </a:solidFill>
+            </a:ln>
+          </p:spPr>
+          <p:style>
+            <a:lnRef idx="1">
+              <a:schemeClr val="accent1"/>
+            </a:lnRef>
+            <a:fillRef idx="0">
+              <a:schemeClr val="accent1"/>
+            </a:fillRef>
+            <a:effectRef idx="0">
+              <a:schemeClr val="accent1"/>
+            </a:effectRef>
+            <a:fontRef idx="minor">
+              <a:schemeClr val="tx1"/>
+            </a:fontRef>
+          </p:style>
+        </p:cxnSp>
+        <p:cxnSp>
+          <p:nvCxnSpPr>
+            <p:cNvPr id="38" name="Straight Connector 37">
+              <a:extLst>
+                <a:ext uri="{FF2B5EF4-FFF2-40B4-BE49-F238E27FC236}">
+                  <a16:creationId xmlns:a16="http://schemas.microsoft.com/office/drawing/2014/main" id="{73F3630B-AC12-4BA1-A2B7-3EC721B370E2}"/>
+                </a:ext>
+              </a:extLst>
+            </p:cNvPr>
+            <p:cNvCxnSpPr>
+              <a:cxnSpLocks/>
+            </p:cNvCxnSpPr>
+            <p:nvPr/>
+          </p:nvCxnSpPr>
+          <p:spPr>
+            <a:xfrm>
+              <a:off x="927310" y="2971435"/>
+              <a:ext cx="78948" cy="67122"/>
+            </a:xfrm>
+            <a:prstGeom prst="line">
+              <a:avLst/>
+            </a:prstGeom>
+            <a:ln>
+              <a:solidFill>
+                <a:schemeClr val="accent2"/>
+              </a:solidFill>
+            </a:ln>
+          </p:spPr>
+          <p:style>
+            <a:lnRef idx="1">
+              <a:schemeClr val="accent1"/>
+            </a:lnRef>
+            <a:fillRef idx="0">
+              <a:schemeClr val="accent1"/>
+            </a:fillRef>
+            <a:effectRef idx="0">
+              <a:schemeClr val="accent1"/>
+            </a:effectRef>
+            <a:fontRef idx="minor">
+              <a:schemeClr val="tx1"/>
+            </a:fontRef>
+          </p:style>
+        </p:cxnSp>
+        <p:cxnSp>
+          <p:nvCxnSpPr>
+            <p:cNvPr id="69" name="Curved Connector 16">
+              <a:extLst>
+                <a:ext uri="{FF2B5EF4-FFF2-40B4-BE49-F238E27FC236}">
+                  <a16:creationId xmlns:a16="http://schemas.microsoft.com/office/drawing/2014/main" id="{5DB44956-D500-404F-99AD-9FB7E1A6B429}"/>
+                </a:ext>
+              </a:extLst>
+            </p:cNvPr>
+            <p:cNvCxnSpPr>
+              <a:cxnSpLocks/>
+            </p:cNvCxnSpPr>
+            <p:nvPr/>
+          </p:nvCxnSpPr>
+          <p:spPr>
+            <a:xfrm rot="16200000" flipH="1">
+              <a:off x="840236" y="2861554"/>
+              <a:ext cx="162613" cy="57149"/>
+            </a:xfrm>
+            <a:prstGeom prst="curvedConnector4">
+              <a:avLst>
+                <a:gd name="adj1" fmla="val 6204"/>
+                <a:gd name="adj2" fmla="val 500007"/>
+              </a:avLst>
+            </a:prstGeom>
+            <a:ln w="9525" cap="flat" cmpd="sng" algn="ctr">
+              <a:solidFill>
+                <a:schemeClr val="accent2"/>
+              </a:solidFill>
+              <a:prstDash val="dash"/>
+              <a:round/>
+              <a:headEnd type="none" w="med" len="med"/>
+              <a:tailEnd type="none" w="med" len="med"/>
+            </a:ln>
+          </p:spPr>
+          <p:style>
+            <a:lnRef idx="0">
+              <a:scrgbClr r="0" g="0" b="0"/>
+            </a:lnRef>
+            <a:fillRef idx="0">
+              <a:scrgbClr r="0" g="0" b="0"/>
+            </a:fillRef>
+            <a:effectRef idx="0">
+              <a:scrgbClr r="0" g="0" b="0"/>
+            </a:effectRef>
+            <a:fontRef idx="minor">
+              <a:schemeClr val="tx1"/>
+            </a:fontRef>
+          </p:style>
+        </p:cxnSp>
+      </p:grpSp>
+      <p:sp>
+        <p:nvSpPr>
+          <p:cNvPr id="73" name="TextBox 72">
+            <a:extLst>
+              <a:ext uri="{FF2B5EF4-FFF2-40B4-BE49-F238E27FC236}">
+                <a16:creationId xmlns:a16="http://schemas.microsoft.com/office/drawing/2014/main" id="{41BDDB96-6C07-45EB-80F9-4694663E3C3E}"/>
+              </a:ext>
+            </a:extLst>
+          </p:cNvPr>
+          <p:cNvSpPr txBox="1"/>
+          <p:nvPr/>
+        </p:nvSpPr>
+        <p:spPr>
+          <a:xfrm>
+            <a:off x="1131588" y="2808822"/>
+            <a:ext cx="652240" cy="215444"/>
+          </a:xfrm>
+          <a:prstGeom prst="rect">
+            <a:avLst/>
+          </a:prstGeom>
+          <a:noFill/>
+        </p:spPr>
+        <p:txBody>
+          <a:bodyPr wrap="square" rtlCol="0">
+            <a:spAutoFit/>
+          </a:bodyPr>
+          <a:lstStyle/>
+          <a:p>
+            <a:r>
+              <a:rPr lang="en-US" sz="800" dirty="0"/>
+              <a:t>command</a:t>
+            </a:r>
+          </a:p>
+        </p:txBody>
+      </p:sp>
+      <p:cxnSp>
+        <p:nvCxnSpPr>
+          <p:cNvPr id="78" name="Straight Arrow Connector 77">
+            <a:extLst>
+              <a:ext uri="{FF2B5EF4-FFF2-40B4-BE49-F238E27FC236}">
+                <a16:creationId xmlns:a16="http://schemas.microsoft.com/office/drawing/2014/main" id="{33052DB0-5977-4E84-97A7-3B376ABD9A00}"/>
+              </a:ext>
+            </a:extLst>
+          </p:cNvPr>
+          <p:cNvCxnSpPr>
+            <a:cxnSpLocks/>
+            <a:stCxn id="7" idx="2"/>
+          </p:cNvCxnSpPr>
+          <p:nvPr/>
+        </p:nvCxnSpPr>
+        <p:spPr>
+          <a:xfrm flipH="1">
+            <a:off x="24049" y="3124198"/>
+            <a:ext cx="851876" cy="0"/>
+          </a:xfrm>
+          <a:prstGeom prst="straightConnector1">
+            <a:avLst/>
+          </a:prstGeom>
+          <a:ln w="9525" cap="flat" cmpd="sng" algn="ctr">
+            <a:solidFill>
+              <a:schemeClr val="accent2"/>
+            </a:solidFill>
+            <a:prstDash val="dash"/>
+            <a:round/>
+            <a:headEnd type="none" w="med" len="med"/>
+            <a:tailEnd type="none" w="med" len="med"/>
+          </a:ln>
+        </p:spPr>
+        <p:style>
+          <a:lnRef idx="0">
+            <a:scrgbClr r="0" g="0" b="0"/>
+          </a:lnRef>
+          <a:fillRef idx="0">
+            <a:scrgbClr r="0" g="0" b="0"/>
+          </a:fillRef>
+          <a:effectRef idx="0">
+            <a:scrgbClr r="0" g="0" b="0"/>
+          </a:effectRef>
+          <a:fontRef idx="minor">
+            <a:schemeClr val="tx1"/>
+          </a:fontRef>
+        </p:style>
+      </p:cxnSp>
+      <p:grpSp>
+        <p:nvGrpSpPr>
+          <p:cNvPr id="82" name="Group 81">
+            <a:extLst>
+              <a:ext uri="{FF2B5EF4-FFF2-40B4-BE49-F238E27FC236}">
+                <a16:creationId xmlns:a16="http://schemas.microsoft.com/office/drawing/2014/main" id="{CEB34F2A-B69B-42B4-A5CB-52E96B018E80}"/>
+              </a:ext>
+            </a:extLst>
+          </p:cNvPr>
+          <p:cNvGrpSpPr/>
+          <p:nvPr/>
+        </p:nvGrpSpPr>
+        <p:grpSpPr>
+          <a:xfrm>
+            <a:off x="23674" y="3085349"/>
+            <a:ext cx="95838" cy="77697"/>
+            <a:chOff x="3438865" y="4381504"/>
+            <a:chExt cx="95838" cy="77697"/>
+          </a:xfrm>
+        </p:grpSpPr>
+        <p:cxnSp>
+          <p:nvCxnSpPr>
+            <p:cNvPr id="83" name="Straight Connector 82">
+              <a:extLst>
+                <a:ext uri="{FF2B5EF4-FFF2-40B4-BE49-F238E27FC236}">
+                  <a16:creationId xmlns:a16="http://schemas.microsoft.com/office/drawing/2014/main" id="{1B085482-1A64-4765-9731-E9FD1638E250}"/>
+                </a:ext>
+              </a:extLst>
+            </p:cNvPr>
+            <p:cNvCxnSpPr>
+              <a:cxnSpLocks/>
+            </p:cNvCxnSpPr>
+            <p:nvPr/>
+          </p:nvCxnSpPr>
+          <p:spPr>
+            <a:xfrm flipV="1">
+              <a:off x="3438865" y="4381504"/>
+              <a:ext cx="93742" cy="38096"/>
+            </a:xfrm>
+            <a:prstGeom prst="line">
+              <a:avLst/>
+            </a:prstGeom>
+            <a:ln>
+              <a:solidFill>
+                <a:schemeClr val="accent2"/>
+              </a:solidFill>
+            </a:ln>
+          </p:spPr>
+          <p:style>
+            <a:lnRef idx="1">
+              <a:schemeClr val="accent1"/>
+            </a:lnRef>
+            <a:fillRef idx="0">
+              <a:schemeClr val="accent1"/>
+            </a:fillRef>
+            <a:effectRef idx="0">
+              <a:schemeClr val="accent1"/>
+            </a:effectRef>
+            <a:fontRef idx="minor">
+              <a:schemeClr val="tx1"/>
+            </a:fontRef>
+          </p:style>
+        </p:cxnSp>
+        <p:cxnSp>
+          <p:nvCxnSpPr>
+            <p:cNvPr id="84" name="Straight Connector 83">
+              <a:extLst>
+                <a:ext uri="{FF2B5EF4-FFF2-40B4-BE49-F238E27FC236}">
+                  <a16:creationId xmlns:a16="http://schemas.microsoft.com/office/drawing/2014/main" id="{AE81B9FD-ADB3-489F-8A73-4924EDC7E4FA}"/>
+                </a:ext>
+              </a:extLst>
+            </p:cNvPr>
+            <p:cNvCxnSpPr>
+              <a:cxnSpLocks/>
+            </p:cNvCxnSpPr>
+            <p:nvPr/>
+          </p:nvCxnSpPr>
+          <p:spPr>
+            <a:xfrm>
+              <a:off x="3441103" y="4419601"/>
+              <a:ext cx="93600" cy="39600"/>
+            </a:xfrm>
+            <a:prstGeom prst="line">
+              <a:avLst/>
+            </a:prstGeom>
+            <a:ln>
+              <a:solidFill>
+                <a:schemeClr val="accent2"/>
+              </a:solidFill>
+            </a:ln>
+          </p:spPr>
+          <p:style>
+            <a:lnRef idx="1">
+              <a:schemeClr val="accent1"/>
+            </a:lnRef>
+            <a:fillRef idx="0">
+              <a:schemeClr val="accent1"/>
+            </a:fillRef>
+            <a:effectRef idx="0">
+              <a:schemeClr val="accent1"/>
+            </a:effectRef>
+            <a:fontRef idx="minor">
+              <a:schemeClr val="tx1"/>
+            </a:fontRef>
+          </p:style>
+        </p:cxnSp>
+      </p:grpSp>
+      <p:sp>
+        <p:nvSpPr>
+          <p:cNvPr id="85" name="TextBox 84">
+            <a:extLst>
+              <a:ext uri="{FF2B5EF4-FFF2-40B4-BE49-F238E27FC236}">
+                <a16:creationId xmlns:a16="http://schemas.microsoft.com/office/drawing/2014/main" id="{57092EA9-5445-4F8C-AA7A-A514A1AD8521}"/>
+              </a:ext>
+            </a:extLst>
+          </p:cNvPr>
+          <p:cNvSpPr txBox="1"/>
+          <p:nvPr/>
+        </p:nvSpPr>
+        <p:spPr>
+          <a:xfrm>
+            <a:off x="143399" y="2930835"/>
+            <a:ext cx="652240" cy="215444"/>
+          </a:xfrm>
+          <a:prstGeom prst="rect">
+            <a:avLst/>
+          </a:prstGeom>
+          <a:noFill/>
+        </p:spPr>
+        <p:txBody>
+          <a:bodyPr wrap="square" rtlCol="0">
+            <a:spAutoFit/>
+          </a:bodyPr>
+          <a:lstStyle/>
+          <a:p>
+            <a:r>
+              <a:rPr lang="en-US" sz="800" dirty="0"/>
+              <a:t>command</a:t>
+            </a:r>
+          </a:p>
+        </p:txBody>
+      </p:sp>
+      <p:cxnSp>
+        <p:nvCxnSpPr>
+          <p:cNvPr id="87" name="Straight Arrow Connector 86">
+            <a:extLst>
+              <a:ext uri="{FF2B5EF4-FFF2-40B4-BE49-F238E27FC236}">
+                <a16:creationId xmlns:a16="http://schemas.microsoft.com/office/drawing/2014/main" id="{DE978A6A-75A8-4869-A83B-C66D6D40EEBD}"/>
+              </a:ext>
+            </a:extLst>
+          </p:cNvPr>
+          <p:cNvCxnSpPr>
+            <a:cxnSpLocks/>
+          </p:cNvCxnSpPr>
+          <p:nvPr/>
+        </p:nvCxnSpPr>
+        <p:spPr>
+          <a:xfrm flipV="1">
+            <a:off x="23674" y="3451017"/>
+            <a:ext cx="3372386" cy="7161"/>
+          </a:xfrm>
+          <a:prstGeom prst="straightConnector1">
+            <a:avLst/>
+          </a:prstGeom>
+          <a:ln w="9525" cap="flat" cmpd="sng" algn="ctr">
+            <a:solidFill>
+              <a:schemeClr val="accent2"/>
+            </a:solidFill>
+            <a:prstDash val="solid"/>
+            <a:round/>
+            <a:headEnd type="none" w="med" len="med"/>
+            <a:tailEnd type="arrow" w="med" len="med"/>
+          </a:ln>
+        </p:spPr>
+        <p:style>
+          <a:lnRef idx="0">
+            <a:scrgbClr r="0" g="0" b="0"/>
+          </a:lnRef>
+          <a:fillRef idx="0">
+            <a:scrgbClr r="0" g="0" b="0"/>
+          </a:fillRef>
+          <a:effectRef idx="0">
+            <a:scrgbClr r="0" g="0" b="0"/>
+          </a:effectRef>
+          <a:fontRef idx="minor">
+            <a:schemeClr val="tx1"/>
+          </a:fontRef>
+        </p:style>
+      </p:cxnSp>
+      <p:sp>
+        <p:nvSpPr>
+          <p:cNvPr id="89" name="TextBox 88">
+            <a:extLst>
+              <a:ext uri="{FF2B5EF4-FFF2-40B4-BE49-F238E27FC236}">
+                <a16:creationId xmlns:a16="http://schemas.microsoft.com/office/drawing/2014/main" id="{CBCF2D11-4CE4-44BD-A1F8-19A590E8D881}"/>
+              </a:ext>
+            </a:extLst>
+          </p:cNvPr>
+          <p:cNvSpPr txBox="1"/>
+          <p:nvPr/>
+        </p:nvSpPr>
+        <p:spPr>
+          <a:xfrm>
+            <a:off x="1192929" y="3246999"/>
+            <a:ext cx="1033876" cy="215444"/>
+          </a:xfrm>
+          <a:prstGeom prst="rect">
+            <a:avLst/>
+          </a:prstGeom>
+          <a:noFill/>
+        </p:spPr>
+        <p:txBody>
+          <a:bodyPr wrap="square" rtlCol="0">
+            <a:spAutoFit/>
+          </a:bodyPr>
+          <a:lstStyle/>
+          <a:p>
+            <a:r>
+              <a:rPr lang="en-US" sz="800" dirty="0" err="1"/>
+              <a:t>executeCommand</a:t>
+            </a:r>
+            <a:r>
+              <a:rPr lang="en-US" sz="800" dirty="0"/>
+              <a:t>()</a:t>
+            </a:r>
+          </a:p>
+        </p:txBody>
+      </p:sp>
+      <p:sp>
+        <p:nvSpPr>
+          <p:cNvPr id="90" name="Rectangle 89">
+            <a:extLst>
+              <a:ext uri="{FF2B5EF4-FFF2-40B4-BE49-F238E27FC236}">
+                <a16:creationId xmlns:a16="http://schemas.microsoft.com/office/drawing/2014/main" id="{331281C3-02A9-4438-87C6-D32D558CBAB0}"/>
+              </a:ext>
+            </a:extLst>
+          </p:cNvPr>
+          <p:cNvSpPr/>
+          <p:nvPr/>
+        </p:nvSpPr>
+        <p:spPr>
+          <a:xfrm>
+            <a:off x="3397079" y="3451017"/>
+            <a:ext cx="124439" cy="2774344"/>
+          </a:xfrm>
+          <a:prstGeom prst="rect">
+            <a:avLst/>
+          </a:prstGeom>
+          <a:ln w="12700">
+            <a:solidFill>
+              <a:schemeClr val="accent2"/>
+            </a:solidFill>
+          </a:ln>
+        </p:spPr>
+        <p:style>
+          <a:lnRef idx="2">
+            <a:schemeClr val="accent6"/>
+          </a:lnRef>
+          <a:fillRef idx="1">
+            <a:schemeClr val="lt1"/>
+          </a:fillRef>
+          <a:effectRef idx="0">
+            <a:schemeClr val="accent6"/>
+          </a:effectRef>
+          <a:fontRef idx="minor">
+            <a:schemeClr val="dk1"/>
+          </a:fontRef>
+        </p:style>
+        <p:txBody>
+          <a:bodyPr rtlCol="0" anchor="ctr"/>
+          <a:lstStyle/>
+          <a:p>
+            <a:pPr algn="ctr"/>
+            <a:endParaRPr lang="en-US"/>
+          </a:p>
+        </p:txBody>
+      </p:sp>
+      <p:sp>
+        <p:nvSpPr>
+          <p:cNvPr id="94" name="TextBox 93">
+            <a:extLst>
+              <a:ext uri="{FF2B5EF4-FFF2-40B4-BE49-F238E27FC236}">
+                <a16:creationId xmlns:a16="http://schemas.microsoft.com/office/drawing/2014/main" id="{9B0B3B15-9199-4924-A07A-6F325752C751}"/>
+              </a:ext>
+            </a:extLst>
+          </p:cNvPr>
+          <p:cNvSpPr txBox="1"/>
+          <p:nvPr/>
+        </p:nvSpPr>
+        <p:spPr>
+          <a:xfrm>
+            <a:off x="3518809" y="3386887"/>
+            <a:ext cx="1158415" cy="215444"/>
+          </a:xfrm>
+          <a:prstGeom prst="rect">
+            <a:avLst/>
+          </a:prstGeom>
+          <a:noFill/>
+        </p:spPr>
+        <p:txBody>
+          <a:bodyPr wrap="square" rtlCol="0">
+            <a:spAutoFit/>
+          </a:bodyPr>
+          <a:lstStyle/>
+          <a:p>
+            <a:r>
+              <a:rPr lang="en-US" sz="800" dirty="0" err="1"/>
+              <a:t>handleAddCommand</a:t>
+            </a:r>
+            <a:r>
+              <a:rPr lang="en-US" sz="800" dirty="0"/>
+              <a:t>()</a:t>
+            </a:r>
+          </a:p>
+        </p:txBody>
+      </p:sp>
+      <p:cxnSp>
+        <p:nvCxnSpPr>
+          <p:cNvPr id="95" name="Curved Connector 16">
+            <a:extLst>
+              <a:ext uri="{FF2B5EF4-FFF2-40B4-BE49-F238E27FC236}">
+                <a16:creationId xmlns:a16="http://schemas.microsoft.com/office/drawing/2014/main" id="{4071B015-A036-4E89-B37B-60A8A58F8853}"/>
+              </a:ext>
+            </a:extLst>
+          </p:cNvPr>
+          <p:cNvCxnSpPr>
+            <a:cxnSpLocks/>
+          </p:cNvCxnSpPr>
+          <p:nvPr/>
+        </p:nvCxnSpPr>
+        <p:spPr>
+          <a:xfrm rot="16200000" flipH="1">
+            <a:off x="3466221" y="3636934"/>
+            <a:ext cx="162613" cy="57149"/>
+          </a:xfrm>
+          <a:prstGeom prst="curvedConnector4">
+            <a:avLst>
+              <a:gd name="adj1" fmla="val 6204"/>
+              <a:gd name="adj2" fmla="val 500007"/>
+            </a:avLst>
+          </a:prstGeom>
+          <a:ln w="9525" cap="flat" cmpd="sng" algn="ctr">
+            <a:solidFill>
+              <a:schemeClr val="accent2"/>
+            </a:solidFill>
+            <a:prstDash val="solid"/>
+            <a:round/>
+            <a:headEnd type="none" w="med" len="med"/>
+            <a:tailEnd type="arrow" w="med" len="med"/>
+          </a:ln>
+        </p:spPr>
+        <p:style>
+          <a:lnRef idx="0">
+            <a:scrgbClr r="0" g="0" b="0"/>
+          </a:lnRef>
+          <a:fillRef idx="0">
+            <a:scrgbClr r="0" g="0" b="0"/>
+          </a:fillRef>
+          <a:effectRef idx="0">
+            <a:scrgbClr r="0" g="0" b="0"/>
+          </a:effectRef>
+          <a:fontRef idx="minor">
+            <a:schemeClr val="tx1"/>
+          </a:fontRef>
+        </p:style>
+      </p:cxnSp>
+      <p:sp>
+        <p:nvSpPr>
+          <p:cNvPr id="96" name="Rectangle 95">
+            <a:extLst>
+              <a:ext uri="{FF2B5EF4-FFF2-40B4-BE49-F238E27FC236}">
+                <a16:creationId xmlns:a16="http://schemas.microsoft.com/office/drawing/2014/main" id="{519BD547-D24B-475F-B0B8-3F7ADDE4A8C2}"/>
+              </a:ext>
+            </a:extLst>
+          </p:cNvPr>
+          <p:cNvSpPr/>
+          <p:nvPr/>
+        </p:nvSpPr>
+        <p:spPr>
+          <a:xfrm>
+            <a:off x="3464653" y="3746815"/>
+            <a:ext cx="124439" cy="2277106"/>
+          </a:xfrm>
+          <a:prstGeom prst="rect">
+            <a:avLst/>
+          </a:prstGeom>
+          <a:ln w="12700">
+            <a:solidFill>
+              <a:schemeClr val="accent2"/>
+            </a:solidFill>
+          </a:ln>
+        </p:spPr>
+        <p:style>
+          <a:lnRef idx="2">
+            <a:schemeClr val="accent6"/>
+          </a:lnRef>
+          <a:fillRef idx="1">
+            <a:schemeClr val="lt1"/>
+          </a:fillRef>
+          <a:effectRef idx="0">
+            <a:schemeClr val="accent6"/>
+          </a:effectRef>
+          <a:fontRef idx="minor">
+            <a:schemeClr val="dk1"/>
+          </a:fontRef>
+        </p:style>
+        <p:txBody>
+          <a:bodyPr rtlCol="0" anchor="ctr"/>
+          <a:lstStyle/>
+          <a:p>
+            <a:pPr algn="ctr"/>
+            <a:endParaRPr lang="en-US"/>
+          </a:p>
+        </p:txBody>
+      </p:sp>
+      <p:cxnSp>
+        <p:nvCxnSpPr>
+          <p:cNvPr id="97" name="Straight Arrow Connector 96">
+            <a:extLst>
+              <a:ext uri="{FF2B5EF4-FFF2-40B4-BE49-F238E27FC236}">
+                <a16:creationId xmlns:a16="http://schemas.microsoft.com/office/drawing/2014/main" id="{07561EAB-B760-409A-A8CD-99EE2E2F251C}"/>
+              </a:ext>
+            </a:extLst>
+          </p:cNvPr>
+          <p:cNvCxnSpPr>
+            <a:cxnSpLocks/>
+          </p:cNvCxnSpPr>
+          <p:nvPr/>
+        </p:nvCxnSpPr>
+        <p:spPr>
+          <a:xfrm flipV="1">
+            <a:off x="3592140" y="3817161"/>
+            <a:ext cx="1397348" cy="1"/>
+          </a:xfrm>
+          <a:prstGeom prst="straightConnector1">
+            <a:avLst/>
+          </a:prstGeom>
+          <a:ln w="9525" cap="flat" cmpd="sng" algn="ctr">
+            <a:solidFill>
+              <a:schemeClr val="accent2"/>
+            </a:solidFill>
+            <a:prstDash val="solid"/>
+            <a:round/>
+            <a:headEnd type="none" w="med" len="med"/>
+            <a:tailEnd type="arrow" w="med" len="med"/>
+          </a:ln>
+        </p:spPr>
+        <p:style>
+          <a:lnRef idx="0">
+            <a:scrgbClr r="0" g="0" b="0"/>
+          </a:lnRef>
+          <a:fillRef idx="0">
+            <a:scrgbClr r="0" g="0" b="0"/>
+          </a:fillRef>
+          <a:effectRef idx="0">
+            <a:scrgbClr r="0" g="0" b="0"/>
+          </a:effectRef>
+          <a:fontRef idx="minor">
+            <a:schemeClr val="tx1"/>
+          </a:fontRef>
+        </p:style>
+      </p:cxnSp>
+      <p:sp>
+        <p:nvSpPr>
+          <p:cNvPr id="99" name="Rectangle 98">
+            <a:extLst>
+              <a:ext uri="{FF2B5EF4-FFF2-40B4-BE49-F238E27FC236}">
+                <a16:creationId xmlns:a16="http://schemas.microsoft.com/office/drawing/2014/main" id="{43E610C6-C037-4545-9EEC-A1FE22811C4A}"/>
+              </a:ext>
+            </a:extLst>
+          </p:cNvPr>
+          <p:cNvSpPr/>
+          <p:nvPr/>
+        </p:nvSpPr>
+        <p:spPr>
+          <a:xfrm>
+            <a:off x="4974249" y="3665508"/>
+            <a:ext cx="816952" cy="296885"/>
+          </a:xfrm>
+          <a:prstGeom prst="rect">
+            <a:avLst/>
+          </a:prstGeom>
+          <a:solidFill>
+            <a:schemeClr val="accent1">
+              <a:lumMod val="50000"/>
+            </a:schemeClr>
+          </a:solidFill>
+          <a:ln w="12700">
+            <a:solidFill>
+              <a:schemeClr val="accent2"/>
+            </a:solidFill>
+          </a:ln>
+        </p:spPr>
+        <p:style>
+          <a:lnRef idx="2">
+            <a:schemeClr val="accent1">
+              <a:shade val="50000"/>
+            </a:schemeClr>
+          </a:lnRef>
+          <a:fillRef idx="1">
+            <a:schemeClr val="accent1"/>
+          </a:fillRef>
+          <a:effectRef idx="0">
+            <a:schemeClr val="accent1"/>
+          </a:effectRef>
+          <a:fontRef idx="minor">
+            <a:schemeClr val="lt1"/>
+          </a:fontRef>
+        </p:style>
+        <p:txBody>
+          <a:bodyPr rtlCol="0" anchor="ctr"/>
+          <a:lstStyle/>
+          <a:p>
+            <a:pPr algn="ctr"/>
+            <a:r>
+              <a:rPr lang="en-US" sz="800" dirty="0"/>
+              <a:t>:Event</a:t>
+            </a:r>
+          </a:p>
+        </p:txBody>
+      </p:sp>
+      <p:sp>
+        <p:nvSpPr>
+          <p:cNvPr id="100" name="Rectangle 99">
+            <a:extLst>
+              <a:ext uri="{FF2B5EF4-FFF2-40B4-BE49-F238E27FC236}">
+                <a16:creationId xmlns:a16="http://schemas.microsoft.com/office/drawing/2014/main" id="{385A11EA-FE17-4897-B074-CD4202D067CD}"/>
+              </a:ext>
+            </a:extLst>
+          </p:cNvPr>
+          <p:cNvSpPr/>
+          <p:nvPr/>
+        </p:nvSpPr>
+        <p:spPr>
+          <a:xfrm>
+            <a:off x="5324074" y="3962393"/>
+            <a:ext cx="124433" cy="152407"/>
+          </a:xfrm>
+          <a:prstGeom prst="rect">
+            <a:avLst/>
+          </a:prstGeom>
+          <a:ln w="12700">
+            <a:solidFill>
+              <a:schemeClr val="accent2"/>
+            </a:solidFill>
+          </a:ln>
+        </p:spPr>
+        <p:style>
+          <a:lnRef idx="2">
+            <a:schemeClr val="accent6"/>
+          </a:lnRef>
+          <a:fillRef idx="1">
+            <a:schemeClr val="lt1"/>
+          </a:fillRef>
+          <a:effectRef idx="0">
+            <a:schemeClr val="accent6"/>
+          </a:effectRef>
+          <a:fontRef idx="minor">
+            <a:schemeClr val="dk1"/>
+          </a:fontRef>
+        </p:style>
+        <p:txBody>
+          <a:bodyPr rtlCol="0" anchor="ctr"/>
+          <a:lstStyle/>
+          <a:p>
+            <a:pPr algn="ctr"/>
+            <a:endParaRPr lang="en-US"/>
+          </a:p>
+        </p:txBody>
+      </p:sp>
+      <p:cxnSp>
+        <p:nvCxnSpPr>
+          <p:cNvPr id="101" name="Straight Connector 100">
+            <a:extLst>
+              <a:ext uri="{FF2B5EF4-FFF2-40B4-BE49-F238E27FC236}">
+                <a16:creationId xmlns:a16="http://schemas.microsoft.com/office/drawing/2014/main" id="{295A3361-0D18-4A54-B724-ACC40FD0CCB3}"/>
+              </a:ext>
+            </a:extLst>
+          </p:cNvPr>
+          <p:cNvCxnSpPr>
+            <a:cxnSpLocks/>
+            <a:stCxn id="100" idx="2"/>
+          </p:cNvCxnSpPr>
+          <p:nvPr/>
+        </p:nvCxnSpPr>
+        <p:spPr>
+          <a:xfrm>
+            <a:off x="5386291" y="4114800"/>
+            <a:ext cx="0" cy="144478"/>
+          </a:xfrm>
+          <a:prstGeom prst="line">
+            <a:avLst/>
+          </a:prstGeom>
+          <a:ln w="9525" cap="flat" cmpd="sng" algn="ctr">
+            <a:solidFill>
+              <a:schemeClr val="accent2"/>
+            </a:solidFill>
+            <a:prstDash val="dash"/>
+            <a:round/>
+            <a:headEnd type="none" w="med" len="med"/>
+            <a:tailEnd type="none" w="med" len="med"/>
+          </a:ln>
+        </p:spPr>
+        <p:style>
+          <a:lnRef idx="0">
+            <a:scrgbClr r="0" g="0" b="0"/>
+          </a:lnRef>
+          <a:fillRef idx="0">
+            <a:scrgbClr r="0" g="0" b="0"/>
+          </a:fillRef>
+          <a:effectRef idx="0">
+            <a:scrgbClr r="0" g="0" b="0"/>
+          </a:effectRef>
+          <a:fontRef idx="minor">
+            <a:schemeClr val="tx1"/>
+          </a:fontRef>
+        </p:style>
+      </p:cxnSp>
+      <p:grpSp>
+        <p:nvGrpSpPr>
+          <p:cNvPr id="112" name="Group 111">
+            <a:extLst>
+              <a:ext uri="{FF2B5EF4-FFF2-40B4-BE49-F238E27FC236}">
+                <a16:creationId xmlns:a16="http://schemas.microsoft.com/office/drawing/2014/main" id="{552C1515-6772-4ED8-A810-3FFD3F8922F3}"/>
+              </a:ext>
+            </a:extLst>
+          </p:cNvPr>
+          <p:cNvGrpSpPr/>
+          <p:nvPr/>
+        </p:nvGrpSpPr>
+        <p:grpSpPr>
+          <a:xfrm>
+            <a:off x="3586770" y="4087853"/>
+            <a:ext cx="1743601" cy="85111"/>
+            <a:chOff x="5359804" y="4101416"/>
+            <a:chExt cx="1935852" cy="77697"/>
+          </a:xfrm>
+        </p:grpSpPr>
+        <p:cxnSp>
+          <p:nvCxnSpPr>
+            <p:cNvPr id="113" name="Straight Arrow Connector 112">
+              <a:extLst>
+                <a:ext uri="{FF2B5EF4-FFF2-40B4-BE49-F238E27FC236}">
+                  <a16:creationId xmlns:a16="http://schemas.microsoft.com/office/drawing/2014/main" id="{8EF26139-4DA5-4E8A-BADE-200EC267CEC4}"/>
+                </a:ext>
+              </a:extLst>
+            </p:cNvPr>
+            <p:cNvCxnSpPr>
+              <a:cxnSpLocks/>
+            </p:cNvCxnSpPr>
+            <p:nvPr/>
+          </p:nvCxnSpPr>
+          <p:spPr>
+            <a:xfrm flipH="1">
+              <a:off x="5368970" y="4124482"/>
+              <a:ext cx="1926686" cy="13783"/>
+            </a:xfrm>
+            <a:prstGeom prst="straightConnector1">
+              <a:avLst/>
+            </a:prstGeom>
+            <a:ln w="9525" cap="flat" cmpd="sng" algn="ctr">
+              <a:solidFill>
+                <a:schemeClr val="accent2"/>
+              </a:solidFill>
+              <a:prstDash val="dash"/>
+              <a:round/>
+              <a:headEnd type="none" w="med" len="med"/>
+              <a:tailEnd type="none" w="med" len="med"/>
+            </a:ln>
+          </p:spPr>
+          <p:style>
+            <a:lnRef idx="0">
+              <a:scrgbClr r="0" g="0" b="0"/>
+            </a:lnRef>
+            <a:fillRef idx="0">
+              <a:scrgbClr r="0" g="0" b="0"/>
+            </a:fillRef>
+            <a:effectRef idx="0">
+              <a:scrgbClr r="0" g="0" b="0"/>
+            </a:effectRef>
+            <a:fontRef idx="minor">
+              <a:schemeClr val="tx1"/>
+            </a:fontRef>
+          </p:style>
+        </p:cxnSp>
+        <p:cxnSp>
+          <p:nvCxnSpPr>
+            <p:cNvPr id="114" name="Straight Connector 113">
+              <a:extLst>
+                <a:ext uri="{FF2B5EF4-FFF2-40B4-BE49-F238E27FC236}">
+                  <a16:creationId xmlns:a16="http://schemas.microsoft.com/office/drawing/2014/main" id="{F0084B4B-87FE-427C-B978-D9EC1C059F91}"/>
+                </a:ext>
+              </a:extLst>
+            </p:cNvPr>
+            <p:cNvCxnSpPr>
+              <a:cxnSpLocks/>
+            </p:cNvCxnSpPr>
+            <p:nvPr/>
+          </p:nvCxnSpPr>
+          <p:spPr>
+            <a:xfrm flipV="1">
+              <a:off x="5359804" y="4101416"/>
+              <a:ext cx="93742" cy="38096"/>
+            </a:xfrm>
+            <a:prstGeom prst="line">
+              <a:avLst/>
+            </a:prstGeom>
+            <a:ln>
+              <a:solidFill>
+                <a:schemeClr val="accent2"/>
+              </a:solidFill>
+            </a:ln>
+          </p:spPr>
+          <p:style>
+            <a:lnRef idx="1">
+              <a:schemeClr val="accent1"/>
+            </a:lnRef>
+            <a:fillRef idx="0">
+              <a:schemeClr val="accent1"/>
+            </a:fillRef>
+            <a:effectRef idx="0">
+              <a:schemeClr val="accent1"/>
+            </a:effectRef>
+            <a:fontRef idx="minor">
+              <a:schemeClr val="tx1"/>
+            </a:fontRef>
+          </p:style>
+        </p:cxnSp>
+        <p:cxnSp>
+          <p:nvCxnSpPr>
+            <p:cNvPr id="115" name="Straight Connector 114">
+              <a:extLst>
+                <a:ext uri="{FF2B5EF4-FFF2-40B4-BE49-F238E27FC236}">
+                  <a16:creationId xmlns:a16="http://schemas.microsoft.com/office/drawing/2014/main" id="{4F9761F2-5C68-45BD-BAF3-6EBEAFF1DE32}"/>
+                </a:ext>
+              </a:extLst>
+            </p:cNvPr>
+            <p:cNvCxnSpPr>
+              <a:cxnSpLocks/>
+            </p:cNvCxnSpPr>
+            <p:nvPr/>
+          </p:nvCxnSpPr>
+          <p:spPr>
+            <a:xfrm>
+              <a:off x="5362042" y="4139513"/>
+              <a:ext cx="93600" cy="39600"/>
+            </a:xfrm>
+            <a:prstGeom prst="line">
+              <a:avLst/>
+            </a:prstGeom>
+            <a:ln>
+              <a:solidFill>
+                <a:schemeClr val="accent2"/>
+              </a:solidFill>
+            </a:ln>
+          </p:spPr>
+          <p:style>
+            <a:lnRef idx="1">
+              <a:schemeClr val="accent1"/>
+            </a:lnRef>
+            <a:fillRef idx="0">
+              <a:schemeClr val="accent1"/>
+            </a:fillRef>
+            <a:effectRef idx="0">
+              <a:schemeClr val="accent1"/>
+            </a:effectRef>
+            <a:fontRef idx="minor">
+              <a:schemeClr val="tx1"/>
+            </a:fontRef>
+          </p:style>
+        </p:cxnSp>
+      </p:grpSp>
+      <p:sp>
+        <p:nvSpPr>
+          <p:cNvPr id="116" name="TextBox 115">
+            <a:extLst>
+              <a:ext uri="{FF2B5EF4-FFF2-40B4-BE49-F238E27FC236}">
+                <a16:creationId xmlns:a16="http://schemas.microsoft.com/office/drawing/2014/main" id="{A03ED92C-1948-4857-9E28-448CF478036F}"/>
+              </a:ext>
+            </a:extLst>
+          </p:cNvPr>
+          <p:cNvSpPr txBox="1"/>
+          <p:nvPr/>
+        </p:nvSpPr>
+        <p:spPr>
+          <a:xfrm>
+            <a:off x="4262819" y="3935830"/>
+            <a:ext cx="432283" cy="215444"/>
+          </a:xfrm>
+          <a:prstGeom prst="rect">
+            <a:avLst/>
+          </a:prstGeom>
+          <a:noFill/>
+        </p:spPr>
+        <p:txBody>
+          <a:bodyPr wrap="square" rtlCol="0">
+            <a:spAutoFit/>
+          </a:bodyPr>
+          <a:lstStyle/>
+          <a:p>
+            <a:r>
+              <a:rPr lang="en-US" sz="800" dirty="0"/>
+              <a:t>event</a:t>
+            </a:r>
+          </a:p>
+        </p:txBody>
+      </p:sp>
+      <p:cxnSp>
+        <p:nvCxnSpPr>
+          <p:cNvPr id="117" name="Straight Arrow Connector 116">
+            <a:extLst>
+              <a:ext uri="{FF2B5EF4-FFF2-40B4-BE49-F238E27FC236}">
+                <a16:creationId xmlns:a16="http://schemas.microsoft.com/office/drawing/2014/main" id="{DDA22E6E-1BE0-4A0A-B90D-E9BE620AF92F}"/>
+              </a:ext>
+            </a:extLst>
+          </p:cNvPr>
+          <p:cNvCxnSpPr>
+            <a:cxnSpLocks/>
+            <a:endCxn id="119" idx="1"/>
+          </p:cNvCxnSpPr>
+          <p:nvPr/>
+        </p:nvCxnSpPr>
+        <p:spPr>
+          <a:xfrm flipV="1">
+            <a:off x="3526872" y="2417886"/>
+            <a:ext cx="2638827" cy="7264"/>
+          </a:xfrm>
+          <a:prstGeom prst="straightConnector1">
+            <a:avLst/>
+          </a:prstGeom>
+          <a:ln w="9525" cap="flat" cmpd="sng" algn="ctr">
+            <a:solidFill>
+              <a:schemeClr val="accent2"/>
+            </a:solidFill>
+            <a:prstDash val="solid"/>
+            <a:round/>
+            <a:headEnd type="none" w="med" len="med"/>
+            <a:tailEnd type="arrow" w="med" len="med"/>
+          </a:ln>
+        </p:spPr>
+        <p:style>
+          <a:lnRef idx="0">
+            <a:scrgbClr r="0" g="0" b="0"/>
+          </a:lnRef>
+          <a:fillRef idx="0">
+            <a:scrgbClr r="0" g="0" b="0"/>
+          </a:fillRef>
+          <a:effectRef idx="0">
+            <a:scrgbClr r="0" g="0" b="0"/>
+          </a:effectRef>
+          <a:fontRef idx="minor">
+            <a:schemeClr val="tx1"/>
+          </a:fontRef>
+        </p:style>
+      </p:cxnSp>
+      <p:sp>
+        <p:nvSpPr>
+          <p:cNvPr id="119" name="Rectangle 118">
+            <a:extLst>
+              <a:ext uri="{FF2B5EF4-FFF2-40B4-BE49-F238E27FC236}">
+                <a16:creationId xmlns:a16="http://schemas.microsoft.com/office/drawing/2014/main" id="{4DE329DD-18E9-4F6E-B844-AB37228C7A53}"/>
+              </a:ext>
+            </a:extLst>
+          </p:cNvPr>
+          <p:cNvSpPr/>
+          <p:nvPr/>
+        </p:nvSpPr>
+        <p:spPr>
+          <a:xfrm>
+            <a:off x="6165699" y="2265486"/>
+            <a:ext cx="914400" cy="304800"/>
+          </a:xfrm>
+          <a:prstGeom prst="rect">
+            <a:avLst/>
+          </a:prstGeom>
+          <a:solidFill>
+            <a:schemeClr val="accent1">
+              <a:lumMod val="50000"/>
+            </a:schemeClr>
+          </a:solidFill>
+          <a:ln w="12700">
+            <a:solidFill>
+              <a:schemeClr val="accent2"/>
+            </a:solidFill>
+          </a:ln>
+        </p:spPr>
+        <p:style>
+          <a:lnRef idx="2">
+            <a:schemeClr val="accent1">
+              <a:shade val="50000"/>
+            </a:schemeClr>
+          </a:lnRef>
+          <a:fillRef idx="1">
+            <a:schemeClr val="accent1"/>
+          </a:fillRef>
+          <a:effectRef idx="0">
+            <a:schemeClr val="accent1"/>
+          </a:effectRef>
+          <a:fontRef idx="minor">
+            <a:schemeClr val="lt1"/>
+          </a:fontRef>
+        </p:style>
+        <p:txBody>
+          <a:bodyPr rtlCol="0" anchor="ctr"/>
+          <a:lstStyle/>
+          <a:p>
+            <a:pPr algn="ctr"/>
+            <a:r>
+              <a:rPr lang="en-US" sz="800" dirty="0"/>
+              <a:t>:Planner</a:t>
+            </a:r>
+          </a:p>
+        </p:txBody>
+      </p:sp>
+      <p:sp>
+        <p:nvSpPr>
+          <p:cNvPr id="120" name="Rectangle 119">
+            <a:extLst>
+              <a:ext uri="{FF2B5EF4-FFF2-40B4-BE49-F238E27FC236}">
+                <a16:creationId xmlns:a16="http://schemas.microsoft.com/office/drawing/2014/main" id="{E23DFF91-D214-4183-8D84-48C80D2596CA}"/>
+              </a:ext>
+            </a:extLst>
+          </p:cNvPr>
+          <p:cNvSpPr/>
+          <p:nvPr/>
+        </p:nvSpPr>
+        <p:spPr>
+          <a:xfrm>
+            <a:off x="6564248" y="2570286"/>
+            <a:ext cx="107415" cy="453980"/>
+          </a:xfrm>
+          <a:prstGeom prst="rect">
+            <a:avLst/>
+          </a:prstGeom>
+          <a:ln w="12700">
+            <a:solidFill>
+              <a:schemeClr val="accent2"/>
+            </a:solidFill>
+          </a:ln>
+        </p:spPr>
+        <p:style>
+          <a:lnRef idx="2">
+            <a:schemeClr val="accent6"/>
+          </a:lnRef>
+          <a:fillRef idx="1">
+            <a:schemeClr val="lt1"/>
+          </a:fillRef>
+          <a:effectRef idx="0">
+            <a:schemeClr val="accent6"/>
+          </a:effectRef>
+          <a:fontRef idx="minor">
+            <a:schemeClr val="dk1"/>
+          </a:fontRef>
+        </p:style>
+        <p:txBody>
+          <a:bodyPr rtlCol="0" anchor="ctr"/>
+          <a:lstStyle/>
+          <a:p>
+            <a:pPr algn="ctr"/>
+            <a:endParaRPr lang="en-US"/>
+          </a:p>
+        </p:txBody>
+      </p:sp>
+      <p:cxnSp>
+        <p:nvCxnSpPr>
+          <p:cNvPr id="121" name="Straight Arrow Connector 120">
+            <a:extLst>
+              <a:ext uri="{FF2B5EF4-FFF2-40B4-BE49-F238E27FC236}">
+                <a16:creationId xmlns:a16="http://schemas.microsoft.com/office/drawing/2014/main" id="{C6F941EA-4AAB-4C0F-A457-E70D35F450DA}"/>
+              </a:ext>
+            </a:extLst>
+          </p:cNvPr>
+          <p:cNvCxnSpPr>
+            <a:cxnSpLocks/>
+          </p:cNvCxnSpPr>
+          <p:nvPr/>
+        </p:nvCxnSpPr>
+        <p:spPr>
+          <a:xfrm>
+            <a:off x="6681549" y="2656078"/>
+            <a:ext cx="1160549" cy="0"/>
+          </a:xfrm>
+          <a:prstGeom prst="straightConnector1">
+            <a:avLst/>
+          </a:prstGeom>
+          <a:ln w="9525" cap="flat" cmpd="sng" algn="ctr">
+            <a:solidFill>
+              <a:schemeClr val="accent2"/>
+            </a:solidFill>
+            <a:prstDash val="solid"/>
+            <a:round/>
+            <a:headEnd type="none" w="med" len="med"/>
+            <a:tailEnd type="arrow" w="med" len="med"/>
+          </a:ln>
+        </p:spPr>
+        <p:style>
+          <a:lnRef idx="0">
+            <a:scrgbClr r="0" g="0" b="0"/>
+          </a:lnRef>
+          <a:fillRef idx="0">
+            <a:scrgbClr r="0" g="0" b="0"/>
+          </a:fillRef>
+          <a:effectRef idx="0">
+            <a:scrgbClr r="0" g="0" b="0"/>
+          </a:effectRef>
+          <a:fontRef idx="minor">
+            <a:schemeClr val="tx1"/>
+          </a:fontRef>
+        </p:style>
+      </p:cxnSp>
+      <p:sp>
+        <p:nvSpPr>
+          <p:cNvPr id="124" name="Rectangle 123">
+            <a:extLst>
+              <a:ext uri="{FF2B5EF4-FFF2-40B4-BE49-F238E27FC236}">
+                <a16:creationId xmlns:a16="http://schemas.microsoft.com/office/drawing/2014/main" id="{2171A0C4-736B-4E08-A701-1711E0606BED}"/>
+              </a:ext>
+            </a:extLst>
+          </p:cNvPr>
+          <p:cNvSpPr/>
+          <p:nvPr/>
+        </p:nvSpPr>
+        <p:spPr>
+          <a:xfrm>
+            <a:off x="7842098" y="2497485"/>
+            <a:ext cx="914400" cy="304800"/>
+          </a:xfrm>
+          <a:prstGeom prst="rect">
+            <a:avLst/>
+          </a:prstGeom>
+          <a:solidFill>
+            <a:schemeClr val="accent1">
+              <a:lumMod val="50000"/>
+            </a:schemeClr>
+          </a:solidFill>
+          <a:ln w="12700">
+            <a:solidFill>
+              <a:schemeClr val="accent2"/>
+            </a:solidFill>
+          </a:ln>
+        </p:spPr>
+        <p:style>
+          <a:lnRef idx="2">
+            <a:schemeClr val="accent1">
+              <a:shade val="50000"/>
+            </a:schemeClr>
+          </a:lnRef>
+          <a:fillRef idx="1">
+            <a:schemeClr val="accent1"/>
+          </a:fillRef>
+          <a:effectRef idx="0">
+            <a:schemeClr val="accent1"/>
+          </a:effectRef>
+          <a:fontRef idx="minor">
+            <a:schemeClr val="lt1"/>
+          </a:fontRef>
+        </p:style>
+        <p:txBody>
+          <a:bodyPr rtlCol="0" anchor="ctr"/>
+          <a:lstStyle/>
+          <a:p>
+            <a:pPr algn="ctr"/>
+            <a:r>
+              <a:rPr lang="en-US" sz="800" dirty="0"/>
+              <a:t>:</a:t>
+            </a:r>
+            <a:r>
+              <a:rPr lang="en-US" sz="800" dirty="0" err="1"/>
+              <a:t>PlannerStorage</a:t>
+            </a:r>
+            <a:endParaRPr lang="en-US" sz="800" dirty="0"/>
+          </a:p>
+        </p:txBody>
+      </p:sp>
+      <p:sp>
+        <p:nvSpPr>
+          <p:cNvPr id="125" name="Rectangle 124">
+            <a:extLst>
+              <a:ext uri="{FF2B5EF4-FFF2-40B4-BE49-F238E27FC236}">
+                <a16:creationId xmlns:a16="http://schemas.microsoft.com/office/drawing/2014/main" id="{EB7C3D99-52FE-44AE-82A2-1CC51EA4B8DB}"/>
+              </a:ext>
+            </a:extLst>
+          </p:cNvPr>
+          <p:cNvSpPr/>
+          <p:nvPr/>
+        </p:nvSpPr>
+        <p:spPr>
+          <a:xfrm>
+            <a:off x="8238026" y="2802286"/>
+            <a:ext cx="107415" cy="215444"/>
+          </a:xfrm>
+          <a:prstGeom prst="rect">
+            <a:avLst/>
+          </a:prstGeom>
+          <a:ln w="12700">
+            <a:solidFill>
+              <a:schemeClr val="accent2"/>
+            </a:solidFill>
+          </a:ln>
+        </p:spPr>
+        <p:style>
+          <a:lnRef idx="2">
+            <a:schemeClr val="accent6"/>
+          </a:lnRef>
+          <a:fillRef idx="1">
+            <a:schemeClr val="lt1"/>
+          </a:fillRef>
+          <a:effectRef idx="0">
+            <a:schemeClr val="accent6"/>
+          </a:effectRef>
+          <a:fontRef idx="minor">
+            <a:schemeClr val="dk1"/>
+          </a:fontRef>
+        </p:style>
+        <p:txBody>
+          <a:bodyPr rtlCol="0" anchor="ctr"/>
+          <a:lstStyle/>
+          <a:p>
+            <a:pPr algn="ctr"/>
+            <a:endParaRPr lang="en-US"/>
+          </a:p>
+        </p:txBody>
+      </p:sp>
+      <p:sp>
+        <p:nvSpPr>
+          <p:cNvPr id="126" name="TextBox 125">
+            <a:extLst>
+              <a:ext uri="{FF2B5EF4-FFF2-40B4-BE49-F238E27FC236}">
+                <a16:creationId xmlns:a16="http://schemas.microsoft.com/office/drawing/2014/main" id="{5755E8BB-8D0C-4A11-8D38-228E21912E22}"/>
+              </a:ext>
+            </a:extLst>
+          </p:cNvPr>
+          <p:cNvSpPr txBox="1"/>
+          <p:nvPr/>
+        </p:nvSpPr>
+        <p:spPr>
+          <a:xfrm>
+            <a:off x="4533747" y="2212524"/>
+            <a:ext cx="796624" cy="215444"/>
+          </a:xfrm>
+          <a:prstGeom prst="rect">
+            <a:avLst/>
+          </a:prstGeom>
+          <a:noFill/>
+        </p:spPr>
+        <p:txBody>
+          <a:bodyPr wrap="square" rtlCol="0">
+            <a:spAutoFit/>
+          </a:bodyPr>
+          <a:lstStyle/>
+          <a:p>
+            <a:r>
+              <a:rPr lang="en-US" sz="800" dirty="0"/>
+              <a:t>new Planner()</a:t>
+            </a:r>
+          </a:p>
+        </p:txBody>
+      </p:sp>
+      <p:sp>
+        <p:nvSpPr>
+          <p:cNvPr id="127" name="TextBox 126">
+            <a:extLst>
+              <a:ext uri="{FF2B5EF4-FFF2-40B4-BE49-F238E27FC236}">
+                <a16:creationId xmlns:a16="http://schemas.microsoft.com/office/drawing/2014/main" id="{F0B2009D-9FA1-47A9-A1F8-8C153A023AF2}"/>
+              </a:ext>
+            </a:extLst>
+          </p:cNvPr>
+          <p:cNvSpPr txBox="1"/>
+          <p:nvPr/>
+        </p:nvSpPr>
+        <p:spPr>
+          <a:xfrm>
+            <a:off x="6713937" y="2604891"/>
+            <a:ext cx="1109604" cy="215444"/>
+          </a:xfrm>
+          <a:prstGeom prst="rect">
+            <a:avLst/>
+          </a:prstGeom>
+          <a:noFill/>
+        </p:spPr>
+        <p:txBody>
+          <a:bodyPr wrap="square" rtlCol="0">
+            <a:spAutoFit/>
+          </a:bodyPr>
+          <a:lstStyle/>
+          <a:p>
+            <a:r>
+              <a:rPr lang="en-US" sz="800" dirty="0"/>
+              <a:t>new </a:t>
+            </a:r>
+            <a:r>
+              <a:rPr lang="en-US" sz="800" dirty="0" err="1"/>
+              <a:t>PlannerStorage</a:t>
+            </a:r>
+            <a:r>
+              <a:rPr lang="en-US" sz="800" dirty="0"/>
+              <a:t>()</a:t>
+            </a:r>
+          </a:p>
+        </p:txBody>
+      </p:sp>
+      <p:cxnSp>
+        <p:nvCxnSpPr>
+          <p:cNvPr id="132" name="Straight Connector 131">
+            <a:extLst>
+              <a:ext uri="{FF2B5EF4-FFF2-40B4-BE49-F238E27FC236}">
+                <a16:creationId xmlns:a16="http://schemas.microsoft.com/office/drawing/2014/main" id="{F55B89A4-E0C5-4D2E-BCE6-7840C059468E}"/>
+              </a:ext>
+            </a:extLst>
+          </p:cNvPr>
+          <p:cNvCxnSpPr>
+            <a:cxnSpLocks/>
+            <a:stCxn id="120" idx="2"/>
+          </p:cNvCxnSpPr>
+          <p:nvPr/>
+        </p:nvCxnSpPr>
+        <p:spPr>
+          <a:xfrm>
+            <a:off x="6617956" y="3024266"/>
+            <a:ext cx="4942" cy="2514945"/>
+          </a:xfrm>
+          <a:prstGeom prst="line">
+            <a:avLst/>
+          </a:prstGeom>
+          <a:ln w="9525" cap="flat" cmpd="sng" algn="ctr">
+            <a:solidFill>
+              <a:schemeClr val="accent2"/>
+            </a:solidFill>
+            <a:prstDash val="dash"/>
+            <a:round/>
+            <a:headEnd type="none" w="med" len="med"/>
+            <a:tailEnd type="none" w="med" len="med"/>
+          </a:ln>
+        </p:spPr>
+        <p:style>
+          <a:lnRef idx="0">
+            <a:scrgbClr r="0" g="0" b="0"/>
+          </a:lnRef>
+          <a:fillRef idx="0">
+            <a:scrgbClr r="0" g="0" b="0"/>
+          </a:fillRef>
+          <a:effectRef idx="0">
+            <a:scrgbClr r="0" g="0" b="0"/>
+          </a:effectRef>
+          <a:fontRef idx="minor">
+            <a:schemeClr val="tx1"/>
+          </a:fontRef>
+        </p:style>
+      </p:cxnSp>
+      <p:cxnSp>
+        <p:nvCxnSpPr>
+          <p:cNvPr id="134" name="Straight Connector 133">
+            <a:extLst>
+              <a:ext uri="{FF2B5EF4-FFF2-40B4-BE49-F238E27FC236}">
+                <a16:creationId xmlns:a16="http://schemas.microsoft.com/office/drawing/2014/main" id="{4C0CC9B7-1540-4039-858A-CC901A517C73}"/>
+              </a:ext>
+            </a:extLst>
+          </p:cNvPr>
+          <p:cNvCxnSpPr>
+            <a:cxnSpLocks/>
+            <a:stCxn id="125" idx="2"/>
+          </p:cNvCxnSpPr>
+          <p:nvPr/>
+        </p:nvCxnSpPr>
+        <p:spPr>
+          <a:xfrm>
+            <a:off x="8291734" y="3017730"/>
+            <a:ext cx="0" cy="2385218"/>
+          </a:xfrm>
+          <a:prstGeom prst="line">
+            <a:avLst/>
+          </a:prstGeom>
+          <a:ln w="9525" cap="flat" cmpd="sng" algn="ctr">
+            <a:solidFill>
+              <a:schemeClr val="accent2"/>
+            </a:solidFill>
+            <a:prstDash val="dash"/>
+            <a:round/>
+            <a:headEnd type="none" w="med" len="med"/>
+            <a:tailEnd type="none" w="med" len="med"/>
+          </a:ln>
+        </p:spPr>
+        <p:style>
+          <a:lnRef idx="0">
+            <a:scrgbClr r="0" g="0" b="0"/>
+          </a:lnRef>
+          <a:fillRef idx="0">
+            <a:scrgbClr r="0" g="0" b="0"/>
+          </a:fillRef>
+          <a:effectRef idx="0">
+            <a:scrgbClr r="0" g="0" b="0"/>
+          </a:effectRef>
+          <a:fontRef idx="minor">
+            <a:schemeClr val="tx1"/>
+          </a:fontRef>
+        </p:style>
+      </p:cxnSp>
+      <p:cxnSp>
+        <p:nvCxnSpPr>
+          <p:cNvPr id="149" name="Straight Arrow Connector 148">
+            <a:extLst>
+              <a:ext uri="{FF2B5EF4-FFF2-40B4-BE49-F238E27FC236}">
+                <a16:creationId xmlns:a16="http://schemas.microsoft.com/office/drawing/2014/main" id="{2D6890F5-78EE-4E20-BCB8-2D7D5A520DC3}"/>
+              </a:ext>
+            </a:extLst>
+          </p:cNvPr>
+          <p:cNvCxnSpPr>
+            <a:cxnSpLocks/>
+          </p:cNvCxnSpPr>
+          <p:nvPr/>
+        </p:nvCxnSpPr>
+        <p:spPr>
+          <a:xfrm flipV="1">
+            <a:off x="3595026" y="4352579"/>
+            <a:ext cx="2958174" cy="6092"/>
+          </a:xfrm>
+          <a:prstGeom prst="straightConnector1">
+            <a:avLst/>
+          </a:prstGeom>
+          <a:ln w="9525" cap="flat" cmpd="sng" algn="ctr">
+            <a:solidFill>
+              <a:schemeClr val="accent2"/>
+            </a:solidFill>
+            <a:prstDash val="solid"/>
+            <a:round/>
+            <a:headEnd type="none" w="med" len="med"/>
+            <a:tailEnd type="arrow" w="med" len="med"/>
+          </a:ln>
+        </p:spPr>
+        <p:style>
+          <a:lnRef idx="0">
+            <a:scrgbClr r="0" g="0" b="0"/>
+          </a:lnRef>
+          <a:fillRef idx="0">
+            <a:scrgbClr r="0" g="0" b="0"/>
+          </a:fillRef>
+          <a:effectRef idx="0">
+            <a:scrgbClr r="0" g="0" b="0"/>
+          </a:effectRef>
+          <a:fontRef idx="minor">
+            <a:schemeClr val="tx1"/>
+          </a:fontRef>
+        </p:style>
+      </p:cxnSp>
+      <p:sp>
+        <p:nvSpPr>
+          <p:cNvPr id="155" name="Rectangle 154">
+            <a:extLst>
+              <a:ext uri="{FF2B5EF4-FFF2-40B4-BE49-F238E27FC236}">
+                <a16:creationId xmlns:a16="http://schemas.microsoft.com/office/drawing/2014/main" id="{47783DE4-670B-42E8-AC7A-82BFEBF9F05F}"/>
+              </a:ext>
+            </a:extLst>
+          </p:cNvPr>
+          <p:cNvSpPr/>
+          <p:nvPr/>
+        </p:nvSpPr>
+        <p:spPr>
+          <a:xfrm>
+            <a:off x="6552169" y="4346041"/>
+            <a:ext cx="116386" cy="1056907"/>
+          </a:xfrm>
+          <a:prstGeom prst="rect">
+            <a:avLst/>
+          </a:prstGeom>
+          <a:ln w="12700">
+            <a:solidFill>
+              <a:schemeClr val="accent2"/>
+            </a:solidFill>
+          </a:ln>
+        </p:spPr>
+        <p:style>
+          <a:lnRef idx="2">
+            <a:schemeClr val="accent6"/>
+          </a:lnRef>
+          <a:fillRef idx="1">
+            <a:schemeClr val="lt1"/>
+          </a:fillRef>
+          <a:effectRef idx="0">
+            <a:schemeClr val="accent6"/>
+          </a:effectRef>
+          <a:fontRef idx="minor">
+            <a:schemeClr val="dk1"/>
+          </a:fontRef>
+        </p:style>
+        <p:txBody>
+          <a:bodyPr rtlCol="0" anchor="ctr"/>
+          <a:lstStyle/>
+          <a:p>
+            <a:pPr algn="ctr"/>
+            <a:endParaRPr lang="en-US"/>
+          </a:p>
+        </p:txBody>
+      </p:sp>
+      <p:sp>
+        <p:nvSpPr>
+          <p:cNvPr id="161" name="TextBox 160">
+            <a:extLst>
+              <a:ext uri="{FF2B5EF4-FFF2-40B4-BE49-F238E27FC236}">
+                <a16:creationId xmlns:a16="http://schemas.microsoft.com/office/drawing/2014/main" id="{2286318C-7674-48AB-9F63-935D6F818837}"/>
+              </a:ext>
+            </a:extLst>
+          </p:cNvPr>
+          <p:cNvSpPr txBox="1"/>
+          <p:nvPr/>
+        </p:nvSpPr>
+        <p:spPr>
+          <a:xfrm>
+            <a:off x="3954777" y="4316454"/>
+            <a:ext cx="2168916" cy="215444"/>
+          </a:xfrm>
+          <a:prstGeom prst="rect">
+            <a:avLst/>
+          </a:prstGeom>
+          <a:noFill/>
+        </p:spPr>
+        <p:txBody>
+          <a:bodyPr wrap="square" rtlCol="0">
+            <a:spAutoFit/>
+          </a:bodyPr>
+          <a:lstStyle/>
+          <a:p>
+            <a:r>
+              <a:rPr lang="en-US" sz="800" dirty="0" err="1"/>
+              <a:t>addEvent</a:t>
+            </a:r>
+            <a:r>
+              <a:rPr lang="en-US" sz="800" dirty="0"/>
+              <a:t>(event : Event, </a:t>
+            </a:r>
+            <a:r>
+              <a:rPr lang="en-US" sz="800" dirty="0" err="1"/>
+              <a:t>allowConflict</a:t>
+            </a:r>
+            <a:r>
+              <a:rPr lang="en-US" sz="800" dirty="0"/>
+              <a:t> : </a:t>
+            </a:r>
+            <a:r>
+              <a:rPr lang="en-US" sz="800" dirty="0" err="1"/>
+              <a:t>boolean</a:t>
+            </a:r>
+            <a:endParaRPr lang="en-US" sz="800" dirty="0"/>
+          </a:p>
+        </p:txBody>
+      </p:sp>
+      <p:cxnSp>
+        <p:nvCxnSpPr>
+          <p:cNvPr id="179" name="Straight Arrow Connector 178">
+            <a:extLst>
+              <a:ext uri="{FF2B5EF4-FFF2-40B4-BE49-F238E27FC236}">
+                <a16:creationId xmlns:a16="http://schemas.microsoft.com/office/drawing/2014/main" id="{F552E860-3483-4238-893D-69396BF9EC0C}"/>
+              </a:ext>
+            </a:extLst>
+          </p:cNvPr>
+          <p:cNvCxnSpPr>
+            <a:cxnSpLocks/>
+          </p:cNvCxnSpPr>
+          <p:nvPr/>
+        </p:nvCxnSpPr>
+        <p:spPr>
+          <a:xfrm>
+            <a:off x="6678553" y="5034761"/>
+            <a:ext cx="1551047" cy="0"/>
+          </a:xfrm>
+          <a:prstGeom prst="straightConnector1">
+            <a:avLst/>
+          </a:prstGeom>
+          <a:ln w="9525" cap="flat" cmpd="sng" algn="ctr">
+            <a:solidFill>
+              <a:schemeClr val="accent2"/>
+            </a:solidFill>
+            <a:prstDash val="solid"/>
+            <a:round/>
+            <a:headEnd type="none" w="med" len="med"/>
+            <a:tailEnd type="arrow" w="med" len="med"/>
+          </a:ln>
+        </p:spPr>
+        <p:style>
+          <a:lnRef idx="0">
+            <a:scrgbClr r="0" g="0" b="0"/>
+          </a:lnRef>
+          <a:fillRef idx="0">
+            <a:scrgbClr r="0" g="0" b="0"/>
+          </a:fillRef>
+          <a:effectRef idx="0">
+            <a:scrgbClr r="0" g="0" b="0"/>
+          </a:effectRef>
+          <a:fontRef idx="minor">
+            <a:schemeClr val="tx1"/>
+          </a:fontRef>
+        </p:style>
+      </p:cxnSp>
+      <p:sp>
+        <p:nvSpPr>
+          <p:cNvPr id="180" name="Rectangle 179">
+            <a:extLst>
+              <a:ext uri="{FF2B5EF4-FFF2-40B4-BE49-F238E27FC236}">
+                <a16:creationId xmlns:a16="http://schemas.microsoft.com/office/drawing/2014/main" id="{9DA94F6B-DFB8-461D-9320-EB0A3B268B9A}"/>
+              </a:ext>
+            </a:extLst>
+          </p:cNvPr>
+          <p:cNvSpPr/>
+          <p:nvPr/>
+        </p:nvSpPr>
+        <p:spPr>
+          <a:xfrm>
+            <a:off x="8219057" y="5029200"/>
+            <a:ext cx="126384" cy="274341"/>
+          </a:xfrm>
+          <a:prstGeom prst="rect">
+            <a:avLst/>
+          </a:prstGeom>
+          <a:ln w="12700">
+            <a:solidFill>
+              <a:schemeClr val="accent2"/>
+            </a:solidFill>
+          </a:ln>
+        </p:spPr>
+        <p:style>
+          <a:lnRef idx="2">
+            <a:schemeClr val="accent6"/>
+          </a:lnRef>
+          <a:fillRef idx="1">
+            <a:schemeClr val="lt1"/>
+          </a:fillRef>
+          <a:effectRef idx="0">
+            <a:schemeClr val="accent6"/>
+          </a:effectRef>
+          <a:fontRef idx="minor">
+            <a:schemeClr val="dk1"/>
+          </a:fontRef>
+        </p:style>
+        <p:txBody>
+          <a:bodyPr rtlCol="0" anchor="ctr"/>
+          <a:lstStyle/>
+          <a:p>
+            <a:pPr algn="ctr"/>
+            <a:endParaRPr lang="en-US"/>
+          </a:p>
+        </p:txBody>
+      </p:sp>
+      <p:sp>
+        <p:nvSpPr>
+          <p:cNvPr id="185" name="TextBox 184">
+            <a:extLst>
+              <a:ext uri="{FF2B5EF4-FFF2-40B4-BE49-F238E27FC236}">
+                <a16:creationId xmlns:a16="http://schemas.microsoft.com/office/drawing/2014/main" id="{64759F62-428B-4667-938A-8E51AD6130C5}"/>
+              </a:ext>
+            </a:extLst>
+          </p:cNvPr>
+          <p:cNvSpPr txBox="1"/>
+          <p:nvPr/>
+        </p:nvSpPr>
+        <p:spPr>
+          <a:xfrm>
+            <a:off x="6879326" y="5007964"/>
+            <a:ext cx="1204634" cy="215444"/>
+          </a:xfrm>
+          <a:prstGeom prst="rect">
+            <a:avLst/>
+          </a:prstGeom>
+          <a:noFill/>
+        </p:spPr>
+        <p:txBody>
+          <a:bodyPr wrap="square" rtlCol="0">
+            <a:spAutoFit/>
+          </a:bodyPr>
+          <a:lstStyle/>
+          <a:p>
+            <a:r>
+              <a:rPr lang="en-US" sz="800" dirty="0" err="1"/>
+              <a:t>writeToFile</a:t>
+            </a:r>
+            <a:r>
+              <a:rPr lang="en-US" sz="800" dirty="0"/>
+              <a:t>(data : String)</a:t>
+            </a:r>
+          </a:p>
+        </p:txBody>
+      </p:sp>
+      <p:cxnSp>
+        <p:nvCxnSpPr>
+          <p:cNvPr id="186" name="Straight Arrow Connector 185">
+            <a:extLst>
+              <a:ext uri="{FF2B5EF4-FFF2-40B4-BE49-F238E27FC236}">
+                <a16:creationId xmlns:a16="http://schemas.microsoft.com/office/drawing/2014/main" id="{069F6679-006B-47E0-942A-F622E3FB6DBB}"/>
+              </a:ext>
+            </a:extLst>
+          </p:cNvPr>
+          <p:cNvCxnSpPr>
+            <a:cxnSpLocks/>
+            <a:endCxn id="188" idx="1"/>
+          </p:cNvCxnSpPr>
+          <p:nvPr/>
+        </p:nvCxnSpPr>
+        <p:spPr>
+          <a:xfrm>
+            <a:off x="3595026" y="5565718"/>
+            <a:ext cx="4260952" cy="0"/>
+          </a:xfrm>
+          <a:prstGeom prst="straightConnector1">
+            <a:avLst/>
+          </a:prstGeom>
+          <a:ln w="9525" cap="flat" cmpd="sng" algn="ctr">
+            <a:solidFill>
+              <a:schemeClr val="accent2"/>
+            </a:solidFill>
+            <a:prstDash val="solid"/>
+            <a:round/>
+            <a:headEnd type="none" w="med" len="med"/>
+            <a:tailEnd type="arrow" w="med" len="med"/>
+          </a:ln>
+        </p:spPr>
+        <p:style>
+          <a:lnRef idx="0">
+            <a:scrgbClr r="0" g="0" b="0"/>
+          </a:lnRef>
+          <a:fillRef idx="0">
+            <a:scrgbClr r="0" g="0" b="0"/>
+          </a:fillRef>
+          <a:effectRef idx="0">
+            <a:scrgbClr r="0" g="0" b="0"/>
+          </a:effectRef>
+          <a:fontRef idx="minor">
+            <a:schemeClr val="tx1"/>
+          </a:fontRef>
+        </p:style>
+      </p:cxnSp>
+      <p:sp>
+        <p:nvSpPr>
+          <p:cNvPr id="188" name="Rectangle 187">
+            <a:extLst>
+              <a:ext uri="{FF2B5EF4-FFF2-40B4-BE49-F238E27FC236}">
+                <a16:creationId xmlns:a16="http://schemas.microsoft.com/office/drawing/2014/main" id="{80C966DA-73B0-4070-B317-E313144BA720}"/>
+              </a:ext>
+            </a:extLst>
+          </p:cNvPr>
+          <p:cNvSpPr/>
+          <p:nvPr/>
+        </p:nvSpPr>
+        <p:spPr>
+          <a:xfrm>
+            <a:off x="7855978" y="5457996"/>
+            <a:ext cx="900520" cy="215444"/>
+          </a:xfrm>
+          <a:prstGeom prst="rect">
+            <a:avLst/>
+          </a:prstGeom>
+          <a:solidFill>
+            <a:schemeClr val="accent1">
+              <a:lumMod val="50000"/>
+            </a:schemeClr>
+          </a:solidFill>
+          <a:ln w="12700">
+            <a:solidFill>
+              <a:schemeClr val="accent2"/>
+            </a:solidFill>
+          </a:ln>
+        </p:spPr>
+        <p:style>
+          <a:lnRef idx="2">
+            <a:schemeClr val="accent1">
+              <a:shade val="50000"/>
+            </a:schemeClr>
+          </a:lnRef>
+          <a:fillRef idx="1">
+            <a:schemeClr val="accent1"/>
+          </a:fillRef>
+          <a:effectRef idx="0">
+            <a:schemeClr val="accent1"/>
+          </a:effectRef>
+          <a:fontRef idx="minor">
+            <a:schemeClr val="lt1"/>
+          </a:fontRef>
+        </p:style>
+        <p:txBody>
+          <a:bodyPr rtlCol="0" anchor="ctr"/>
+          <a:lstStyle/>
+          <a:p>
+            <a:pPr algn="ctr"/>
+            <a:r>
+              <a:rPr lang="en-US" sz="800" dirty="0"/>
+              <a:t>:</a:t>
+            </a:r>
+            <a:r>
+              <a:rPr lang="en-US" sz="800" dirty="0" err="1"/>
+              <a:t>CommandResult</a:t>
+            </a:r>
+            <a:endParaRPr lang="en-US" sz="800" dirty="0"/>
+          </a:p>
+        </p:txBody>
+      </p:sp>
+      <p:sp>
+        <p:nvSpPr>
+          <p:cNvPr id="189" name="Rectangle 188">
+            <a:extLst>
+              <a:ext uri="{FF2B5EF4-FFF2-40B4-BE49-F238E27FC236}">
+                <a16:creationId xmlns:a16="http://schemas.microsoft.com/office/drawing/2014/main" id="{6661E8E7-423B-45AD-8331-3ADF47DDB951}"/>
+              </a:ext>
+            </a:extLst>
+          </p:cNvPr>
+          <p:cNvSpPr/>
+          <p:nvPr/>
+        </p:nvSpPr>
+        <p:spPr>
+          <a:xfrm>
+            <a:off x="8238026" y="5673439"/>
+            <a:ext cx="126384" cy="181273"/>
+          </a:xfrm>
+          <a:prstGeom prst="rect">
+            <a:avLst/>
+          </a:prstGeom>
+          <a:ln w="12700">
+            <a:solidFill>
+              <a:schemeClr val="accent2"/>
+            </a:solidFill>
+          </a:ln>
+        </p:spPr>
+        <p:style>
+          <a:lnRef idx="2">
+            <a:schemeClr val="accent6"/>
+          </a:lnRef>
+          <a:fillRef idx="1">
+            <a:schemeClr val="lt1"/>
+          </a:fillRef>
+          <a:effectRef idx="0">
+            <a:schemeClr val="accent6"/>
+          </a:effectRef>
+          <a:fontRef idx="minor">
+            <a:schemeClr val="dk1"/>
+          </a:fontRef>
+        </p:style>
+        <p:txBody>
+          <a:bodyPr rtlCol="0" anchor="ctr"/>
+          <a:lstStyle/>
+          <a:p>
+            <a:pPr algn="ctr"/>
+            <a:endParaRPr lang="en-US"/>
+          </a:p>
+        </p:txBody>
+      </p:sp>
+      <p:sp>
+        <p:nvSpPr>
+          <p:cNvPr id="195" name="TextBox 194">
+            <a:extLst>
+              <a:ext uri="{FF2B5EF4-FFF2-40B4-BE49-F238E27FC236}">
+                <a16:creationId xmlns:a16="http://schemas.microsoft.com/office/drawing/2014/main" id="{7D13F901-06F0-4D2C-89A4-4E2BB0C15672}"/>
+              </a:ext>
+            </a:extLst>
+          </p:cNvPr>
+          <p:cNvSpPr txBox="1"/>
+          <p:nvPr/>
+        </p:nvSpPr>
+        <p:spPr>
+          <a:xfrm>
+            <a:off x="4050791" y="5352178"/>
+            <a:ext cx="2165920" cy="215444"/>
+          </a:xfrm>
+          <a:prstGeom prst="rect">
+            <a:avLst/>
+          </a:prstGeom>
+          <a:noFill/>
+        </p:spPr>
+        <p:txBody>
+          <a:bodyPr wrap="square" rtlCol="0">
+            <a:spAutoFit/>
+          </a:bodyPr>
+          <a:lstStyle/>
+          <a:p>
+            <a:r>
+              <a:rPr lang="en-US" sz="800" dirty="0"/>
+              <a:t>new </a:t>
+            </a:r>
+            <a:r>
+              <a:rPr lang="en-US" sz="800" dirty="0" err="1"/>
+              <a:t>CommandResult</a:t>
+            </a:r>
+            <a:r>
+              <a:rPr lang="en-US" sz="800" dirty="0"/>
+              <a:t>(</a:t>
+            </a:r>
+            <a:r>
+              <a:rPr lang="en-US" sz="800" dirty="0" err="1"/>
+              <a:t>feedbackToUser</a:t>
+            </a:r>
+            <a:r>
+              <a:rPr lang="en-US" sz="800" dirty="0"/>
+              <a:t> : String)</a:t>
+            </a:r>
+          </a:p>
+        </p:txBody>
+      </p:sp>
+      <p:cxnSp>
+        <p:nvCxnSpPr>
+          <p:cNvPr id="196" name="Straight Connector 195">
+            <a:extLst>
+              <a:ext uri="{FF2B5EF4-FFF2-40B4-BE49-F238E27FC236}">
+                <a16:creationId xmlns:a16="http://schemas.microsoft.com/office/drawing/2014/main" id="{BEA52D25-14FA-42A5-83E5-D8C563323617}"/>
+              </a:ext>
+            </a:extLst>
+          </p:cNvPr>
+          <p:cNvCxnSpPr>
+            <a:cxnSpLocks/>
+          </p:cNvCxnSpPr>
+          <p:nvPr/>
+        </p:nvCxnSpPr>
+        <p:spPr>
+          <a:xfrm>
+            <a:off x="8305225" y="5854712"/>
+            <a:ext cx="0" cy="927088"/>
+          </a:xfrm>
+          <a:prstGeom prst="line">
+            <a:avLst/>
+          </a:prstGeom>
+          <a:ln w="9525" cap="flat" cmpd="sng" algn="ctr">
+            <a:solidFill>
+              <a:schemeClr val="accent2"/>
+            </a:solidFill>
+            <a:prstDash val="dash"/>
+            <a:round/>
+            <a:headEnd type="none" w="med" len="med"/>
+            <a:tailEnd type="none" w="med" len="med"/>
+          </a:ln>
+        </p:spPr>
+        <p:style>
+          <a:lnRef idx="0">
+            <a:scrgbClr r="0" g="0" b="0"/>
+          </a:lnRef>
+          <a:fillRef idx="0">
+            <a:scrgbClr r="0" g="0" b="0"/>
+          </a:fillRef>
+          <a:effectRef idx="0">
+            <a:scrgbClr r="0" g="0" b="0"/>
+          </a:effectRef>
+          <a:fontRef idx="minor">
+            <a:schemeClr val="tx1"/>
+          </a:fontRef>
+        </p:style>
+      </p:cxnSp>
+      <p:grpSp>
+        <p:nvGrpSpPr>
+          <p:cNvPr id="210" name="Group 209">
+            <a:extLst>
+              <a:ext uri="{FF2B5EF4-FFF2-40B4-BE49-F238E27FC236}">
+                <a16:creationId xmlns:a16="http://schemas.microsoft.com/office/drawing/2014/main" id="{2FCD730F-F986-46F5-9F12-953DAD5EB69A}"/>
+              </a:ext>
+            </a:extLst>
+          </p:cNvPr>
+          <p:cNvGrpSpPr/>
+          <p:nvPr/>
+        </p:nvGrpSpPr>
+        <p:grpSpPr>
+          <a:xfrm>
+            <a:off x="3586770" y="5834497"/>
+            <a:ext cx="4710200" cy="76014"/>
+            <a:chOff x="3586770" y="5834497"/>
+            <a:chExt cx="4710200" cy="76014"/>
+          </a:xfrm>
+        </p:grpSpPr>
+        <p:cxnSp>
+          <p:nvCxnSpPr>
+            <p:cNvPr id="199" name="Straight Arrow Connector 198">
+              <a:extLst>
+                <a:ext uri="{FF2B5EF4-FFF2-40B4-BE49-F238E27FC236}">
+                  <a16:creationId xmlns:a16="http://schemas.microsoft.com/office/drawing/2014/main" id="{837C101A-6E61-4090-9625-44B002B040A4}"/>
+                </a:ext>
+              </a:extLst>
+            </p:cNvPr>
+            <p:cNvCxnSpPr>
+              <a:cxnSpLocks/>
+            </p:cNvCxnSpPr>
+            <p:nvPr/>
+          </p:nvCxnSpPr>
+          <p:spPr>
+            <a:xfrm flipH="1">
+              <a:off x="3609072" y="5857427"/>
+              <a:ext cx="4687898" cy="20306"/>
+            </a:xfrm>
+            <a:prstGeom prst="straightConnector1">
+              <a:avLst/>
+            </a:prstGeom>
+            <a:ln w="9525" cap="flat" cmpd="sng" algn="ctr">
+              <a:solidFill>
+                <a:schemeClr val="accent2"/>
+              </a:solidFill>
+              <a:prstDash val="dash"/>
+              <a:round/>
+              <a:headEnd type="none" w="med" len="med"/>
+              <a:tailEnd type="none" w="med" len="med"/>
+            </a:ln>
+          </p:spPr>
+          <p:style>
+            <a:lnRef idx="0">
+              <a:scrgbClr r="0" g="0" b="0"/>
+            </a:lnRef>
+            <a:fillRef idx="0">
+              <a:scrgbClr r="0" g="0" b="0"/>
+            </a:fillRef>
+            <a:effectRef idx="0">
+              <a:scrgbClr r="0" g="0" b="0"/>
+            </a:effectRef>
+            <a:fontRef idx="minor">
+              <a:schemeClr val="tx1"/>
+            </a:fontRef>
+          </p:style>
+        </p:cxnSp>
+        <p:cxnSp>
+          <p:nvCxnSpPr>
+            <p:cNvPr id="200" name="Straight Connector 199">
+              <a:extLst>
+                <a:ext uri="{FF2B5EF4-FFF2-40B4-BE49-F238E27FC236}">
+                  <a16:creationId xmlns:a16="http://schemas.microsoft.com/office/drawing/2014/main" id="{68A7A3A7-8331-4027-A8B4-6272DB6E52BF}"/>
+                </a:ext>
+              </a:extLst>
+            </p:cNvPr>
+            <p:cNvCxnSpPr>
+              <a:cxnSpLocks/>
+            </p:cNvCxnSpPr>
+            <p:nvPr/>
+          </p:nvCxnSpPr>
+          <p:spPr>
+            <a:xfrm flipV="1">
+              <a:off x="3586770" y="5834497"/>
+              <a:ext cx="84432" cy="45074"/>
+            </a:xfrm>
+            <a:prstGeom prst="line">
+              <a:avLst/>
+            </a:prstGeom>
+            <a:ln>
+              <a:solidFill>
+                <a:schemeClr val="accent2"/>
+              </a:solidFill>
+            </a:ln>
+          </p:spPr>
+          <p:style>
+            <a:lnRef idx="1">
+              <a:schemeClr val="accent1"/>
+            </a:lnRef>
+            <a:fillRef idx="0">
+              <a:schemeClr val="accent1"/>
+            </a:fillRef>
+            <a:effectRef idx="0">
+              <a:schemeClr val="accent1"/>
+            </a:effectRef>
+            <a:fontRef idx="minor">
+              <a:schemeClr val="tx1"/>
+            </a:fontRef>
+          </p:style>
+        </p:cxnSp>
+        <p:cxnSp>
+          <p:nvCxnSpPr>
+            <p:cNvPr id="201" name="Straight Connector 200">
+              <a:extLst>
+                <a:ext uri="{FF2B5EF4-FFF2-40B4-BE49-F238E27FC236}">
+                  <a16:creationId xmlns:a16="http://schemas.microsoft.com/office/drawing/2014/main" id="{E4AE8481-889B-4986-8853-CB30B33A2F9B}"/>
+                </a:ext>
+              </a:extLst>
+            </p:cNvPr>
+            <p:cNvCxnSpPr>
+              <a:cxnSpLocks/>
+            </p:cNvCxnSpPr>
+            <p:nvPr/>
+          </p:nvCxnSpPr>
+          <p:spPr>
+            <a:xfrm>
+              <a:off x="3592215" y="5879572"/>
+              <a:ext cx="78987" cy="30939"/>
+            </a:xfrm>
+            <a:prstGeom prst="line">
+              <a:avLst/>
+            </a:prstGeom>
+            <a:ln>
+              <a:solidFill>
+                <a:schemeClr val="accent2"/>
+              </a:solidFill>
+            </a:ln>
+          </p:spPr>
+          <p:style>
+            <a:lnRef idx="1">
+              <a:schemeClr val="accent1"/>
+            </a:lnRef>
+            <a:fillRef idx="0">
+              <a:schemeClr val="accent1"/>
+            </a:fillRef>
+            <a:effectRef idx="0">
+              <a:schemeClr val="accent1"/>
+            </a:effectRef>
+            <a:fontRef idx="minor">
+              <a:schemeClr val="tx1"/>
+            </a:fontRef>
+          </p:style>
+        </p:cxnSp>
+      </p:grpSp>
+      <p:sp>
+        <p:nvSpPr>
+          <p:cNvPr id="202" name="TextBox 201">
+            <a:extLst>
+              <a:ext uri="{FF2B5EF4-FFF2-40B4-BE49-F238E27FC236}">
+                <a16:creationId xmlns:a16="http://schemas.microsoft.com/office/drawing/2014/main" id="{B8337A21-3AE6-401D-8358-BB9B8C63A643}"/>
+              </a:ext>
+            </a:extLst>
+          </p:cNvPr>
+          <p:cNvSpPr txBox="1"/>
+          <p:nvPr/>
+        </p:nvSpPr>
+        <p:spPr>
+          <a:xfrm>
+            <a:off x="4687948" y="5688796"/>
+            <a:ext cx="453640" cy="215444"/>
+          </a:xfrm>
+          <a:prstGeom prst="rect">
+            <a:avLst/>
+          </a:prstGeom>
+          <a:noFill/>
+        </p:spPr>
+        <p:txBody>
+          <a:bodyPr wrap="square" rtlCol="0">
+            <a:spAutoFit/>
+          </a:bodyPr>
+          <a:lstStyle/>
+          <a:p>
+            <a:r>
+              <a:rPr lang="en-US" sz="800" dirty="0"/>
+              <a:t>result</a:t>
+            </a:r>
+          </a:p>
+        </p:txBody>
+      </p:sp>
+      <p:sp>
+        <p:nvSpPr>
+          <p:cNvPr id="215" name="TextBox 214">
+            <a:extLst>
+              <a:ext uri="{FF2B5EF4-FFF2-40B4-BE49-F238E27FC236}">
+                <a16:creationId xmlns:a16="http://schemas.microsoft.com/office/drawing/2014/main" id="{694BEE43-111F-482D-BD07-2C06E4F5CAFA}"/>
+              </a:ext>
+            </a:extLst>
+          </p:cNvPr>
+          <p:cNvSpPr txBox="1"/>
+          <p:nvPr/>
+        </p:nvSpPr>
+        <p:spPr>
+          <a:xfrm>
+            <a:off x="3745585" y="5950341"/>
+            <a:ext cx="453640" cy="215444"/>
+          </a:xfrm>
+          <a:prstGeom prst="rect">
+            <a:avLst/>
+          </a:prstGeom>
+          <a:noFill/>
+        </p:spPr>
+        <p:txBody>
+          <a:bodyPr wrap="square" rtlCol="0">
+            <a:spAutoFit/>
+          </a:bodyPr>
+          <a:lstStyle/>
+          <a:p>
+            <a:r>
+              <a:rPr lang="en-US" sz="800" dirty="0"/>
+              <a:t>result</a:t>
+            </a:r>
+          </a:p>
+        </p:txBody>
+      </p:sp>
+      <p:grpSp>
+        <p:nvGrpSpPr>
+          <p:cNvPr id="216" name="Group 215">
+            <a:extLst>
+              <a:ext uri="{FF2B5EF4-FFF2-40B4-BE49-F238E27FC236}">
+                <a16:creationId xmlns:a16="http://schemas.microsoft.com/office/drawing/2014/main" id="{FB46356C-7BB3-47F1-BA7E-1EDB61880F78}"/>
+              </a:ext>
+            </a:extLst>
+          </p:cNvPr>
+          <p:cNvGrpSpPr/>
+          <p:nvPr/>
+        </p:nvGrpSpPr>
+        <p:grpSpPr>
+          <a:xfrm>
+            <a:off x="-1060" y="6175565"/>
+            <a:ext cx="3453895" cy="146888"/>
+            <a:chOff x="3586770" y="5834497"/>
+            <a:chExt cx="4710200" cy="76014"/>
+          </a:xfrm>
+        </p:grpSpPr>
+        <p:cxnSp>
+          <p:nvCxnSpPr>
+            <p:cNvPr id="217" name="Straight Arrow Connector 216">
+              <a:extLst>
+                <a:ext uri="{FF2B5EF4-FFF2-40B4-BE49-F238E27FC236}">
+                  <a16:creationId xmlns:a16="http://schemas.microsoft.com/office/drawing/2014/main" id="{9E1E46D9-B7BC-4FB8-8F48-BAEB4367C531}"/>
+                </a:ext>
+              </a:extLst>
+            </p:cNvPr>
+            <p:cNvCxnSpPr>
+              <a:cxnSpLocks/>
+            </p:cNvCxnSpPr>
+            <p:nvPr/>
+          </p:nvCxnSpPr>
+          <p:spPr>
+            <a:xfrm flipH="1">
+              <a:off x="3609072" y="5857427"/>
+              <a:ext cx="4687898" cy="20306"/>
+            </a:xfrm>
+            <a:prstGeom prst="straightConnector1">
+              <a:avLst/>
+            </a:prstGeom>
+            <a:ln w="9525" cap="flat" cmpd="sng" algn="ctr">
+              <a:solidFill>
+                <a:schemeClr val="accent2"/>
+              </a:solidFill>
+              <a:prstDash val="dash"/>
+              <a:round/>
+              <a:headEnd type="none" w="med" len="med"/>
+              <a:tailEnd type="none" w="med" len="med"/>
+            </a:ln>
+          </p:spPr>
+          <p:style>
+            <a:lnRef idx="0">
+              <a:scrgbClr r="0" g="0" b="0"/>
+            </a:lnRef>
+            <a:fillRef idx="0">
+              <a:scrgbClr r="0" g="0" b="0"/>
+            </a:fillRef>
+            <a:effectRef idx="0">
+              <a:scrgbClr r="0" g="0" b="0"/>
+            </a:effectRef>
+            <a:fontRef idx="minor">
+              <a:schemeClr val="tx1"/>
+            </a:fontRef>
+          </p:style>
+        </p:cxnSp>
+        <p:cxnSp>
+          <p:nvCxnSpPr>
+            <p:cNvPr id="218" name="Straight Connector 217">
+              <a:extLst>
+                <a:ext uri="{FF2B5EF4-FFF2-40B4-BE49-F238E27FC236}">
+                  <a16:creationId xmlns:a16="http://schemas.microsoft.com/office/drawing/2014/main" id="{BF91D808-47EC-443D-8A7C-F9BB8EEE492A}"/>
+                </a:ext>
+              </a:extLst>
+            </p:cNvPr>
+            <p:cNvCxnSpPr>
+              <a:cxnSpLocks/>
+            </p:cNvCxnSpPr>
+            <p:nvPr/>
+          </p:nvCxnSpPr>
+          <p:spPr>
+            <a:xfrm flipV="1">
+              <a:off x="3586770" y="5834497"/>
+              <a:ext cx="84432" cy="45074"/>
+            </a:xfrm>
+            <a:prstGeom prst="line">
+              <a:avLst/>
+            </a:prstGeom>
+            <a:ln>
+              <a:solidFill>
+                <a:schemeClr val="accent2"/>
+              </a:solidFill>
+            </a:ln>
+          </p:spPr>
+          <p:style>
+            <a:lnRef idx="1">
+              <a:schemeClr val="accent1"/>
+            </a:lnRef>
+            <a:fillRef idx="0">
+              <a:schemeClr val="accent1"/>
+            </a:fillRef>
+            <a:effectRef idx="0">
+              <a:schemeClr val="accent1"/>
+            </a:effectRef>
+            <a:fontRef idx="minor">
+              <a:schemeClr val="tx1"/>
+            </a:fontRef>
+          </p:style>
+        </p:cxnSp>
+        <p:cxnSp>
+          <p:nvCxnSpPr>
+            <p:cNvPr id="219" name="Straight Connector 218">
+              <a:extLst>
+                <a:ext uri="{FF2B5EF4-FFF2-40B4-BE49-F238E27FC236}">
+                  <a16:creationId xmlns:a16="http://schemas.microsoft.com/office/drawing/2014/main" id="{C72D3995-E974-44B2-BA3F-9DC98C9B21B6}"/>
+                </a:ext>
+              </a:extLst>
+            </p:cNvPr>
+            <p:cNvCxnSpPr>
+              <a:cxnSpLocks/>
+            </p:cNvCxnSpPr>
+            <p:nvPr/>
+          </p:nvCxnSpPr>
+          <p:spPr>
+            <a:xfrm>
+              <a:off x="3592215" y="5879572"/>
+              <a:ext cx="78987" cy="30939"/>
+            </a:xfrm>
+            <a:prstGeom prst="line">
+              <a:avLst/>
+            </a:prstGeom>
+            <a:ln>
+              <a:solidFill>
+                <a:schemeClr val="accent2"/>
+              </a:solidFill>
+            </a:ln>
+          </p:spPr>
+          <p:style>
+            <a:lnRef idx="1">
+              <a:schemeClr val="accent1"/>
+            </a:lnRef>
+            <a:fillRef idx="0">
+              <a:schemeClr val="accent1"/>
+            </a:fillRef>
+            <a:effectRef idx="0">
+              <a:schemeClr val="accent1"/>
+            </a:effectRef>
+            <a:fontRef idx="minor">
+              <a:schemeClr val="tx1"/>
+            </a:fontRef>
+          </p:style>
+        </p:cxnSp>
+      </p:grpSp>
+      <p:sp>
+        <p:nvSpPr>
+          <p:cNvPr id="220" name="TextBox 219">
+            <a:extLst>
+              <a:ext uri="{FF2B5EF4-FFF2-40B4-BE49-F238E27FC236}">
+                <a16:creationId xmlns:a16="http://schemas.microsoft.com/office/drawing/2014/main" id="{27E07F9D-1144-4CA6-910F-88430DB0164C}"/>
+              </a:ext>
+            </a:extLst>
+          </p:cNvPr>
+          <p:cNvSpPr txBox="1"/>
+          <p:nvPr/>
+        </p:nvSpPr>
+        <p:spPr>
+          <a:xfrm>
+            <a:off x="1246510" y="6043669"/>
+            <a:ext cx="453640" cy="215444"/>
+          </a:xfrm>
+          <a:prstGeom prst="rect">
+            <a:avLst/>
+          </a:prstGeom>
+          <a:noFill/>
+        </p:spPr>
+        <p:txBody>
+          <a:bodyPr wrap="square" rtlCol="0">
+            <a:spAutoFit/>
+          </a:bodyPr>
+          <a:lstStyle/>
+          <a:p>
+            <a:r>
+              <a:rPr lang="en-US" sz="800" dirty="0"/>
+              <a:t>result</a:t>
+            </a:r>
+          </a:p>
+        </p:txBody>
+      </p:sp>
+      <p:sp>
+        <p:nvSpPr>
+          <p:cNvPr id="221" name="Rectangle 220">
+            <a:extLst>
+              <a:ext uri="{FF2B5EF4-FFF2-40B4-BE49-F238E27FC236}">
+                <a16:creationId xmlns:a16="http://schemas.microsoft.com/office/drawing/2014/main" id="{5521BC5C-BED6-47F0-8DD4-052D20909C5C}"/>
+              </a:ext>
+            </a:extLst>
+          </p:cNvPr>
+          <p:cNvSpPr/>
+          <p:nvPr/>
+        </p:nvSpPr>
+        <p:spPr>
+          <a:xfrm>
+            <a:off x="6123693" y="4495800"/>
+            <a:ext cx="2632805" cy="443267"/>
+          </a:xfrm>
+          <a:prstGeom prst="rect">
+            <a:avLst/>
+          </a:prstGeom>
+        </p:spPr>
+        <p:style>
+          <a:lnRef idx="2">
+            <a:schemeClr val="accent6">
+              <a:shade val="50000"/>
+            </a:schemeClr>
+          </a:lnRef>
+          <a:fillRef idx="1">
+            <a:schemeClr val="accent6"/>
+          </a:fillRef>
+          <a:effectRef idx="0">
+            <a:schemeClr val="accent6"/>
+          </a:effectRef>
+          <a:fontRef idx="minor">
+            <a:schemeClr val="lt1"/>
+          </a:fontRef>
+        </p:style>
+        <p:txBody>
+          <a:bodyPr rtlCol="0" anchor="ctr"/>
+          <a:lstStyle/>
+          <a:p>
+            <a:pPr algn="ctr"/>
+            <a:endParaRPr lang="en-SG"/>
+          </a:p>
+        </p:txBody>
+      </p:sp>
+      <p:sp>
+        <p:nvSpPr>
+          <p:cNvPr id="222" name="Rectangle: Single Corner Snipped 221">
+            <a:extLst>
+              <a:ext uri="{FF2B5EF4-FFF2-40B4-BE49-F238E27FC236}">
+                <a16:creationId xmlns:a16="http://schemas.microsoft.com/office/drawing/2014/main" id="{F9F0B843-5E9C-4B4D-A0BC-5910E297038B}"/>
+              </a:ext>
+            </a:extLst>
+          </p:cNvPr>
+          <p:cNvSpPr/>
+          <p:nvPr/>
+        </p:nvSpPr>
+        <p:spPr>
+          <a:xfrm rot="10800000" flipH="1">
+            <a:off x="6123439" y="4500611"/>
+            <a:ext cx="335712" cy="206117"/>
+          </a:xfrm>
+          <a:prstGeom prst="snip1Rect">
+            <a:avLst>
+              <a:gd name="adj" fmla="val 50000"/>
+            </a:avLst>
+          </a:prstGeom>
+        </p:spPr>
+        <p:style>
+          <a:lnRef idx="2">
+            <a:schemeClr val="accent1">
+              <a:shade val="50000"/>
+            </a:schemeClr>
+          </a:lnRef>
+          <a:fillRef idx="1">
+            <a:schemeClr val="accent1"/>
+          </a:fillRef>
+          <a:effectRef idx="0">
+            <a:schemeClr val="accent1"/>
+          </a:effectRef>
+          <a:fontRef idx="minor">
+            <a:schemeClr val="lt1"/>
+          </a:fontRef>
+        </p:style>
+        <p:txBody>
+          <a:bodyPr rtlCol="0" anchor="ctr"/>
+          <a:lstStyle/>
+          <a:p>
+            <a:pPr algn="ctr"/>
+            <a:endParaRPr lang="en-SG"/>
+          </a:p>
+        </p:txBody>
+      </p:sp>
+      <p:sp>
+        <p:nvSpPr>
+          <p:cNvPr id="223" name="TextBox 222">
+            <a:extLst>
+              <a:ext uri="{FF2B5EF4-FFF2-40B4-BE49-F238E27FC236}">
+                <a16:creationId xmlns:a16="http://schemas.microsoft.com/office/drawing/2014/main" id="{103D9480-8AE7-4EA5-92B5-295514DD7C81}"/>
+              </a:ext>
+            </a:extLst>
+          </p:cNvPr>
+          <p:cNvSpPr txBox="1"/>
+          <p:nvPr/>
+        </p:nvSpPr>
+        <p:spPr>
+          <a:xfrm>
+            <a:off x="6123438" y="4491285"/>
+            <a:ext cx="306976" cy="215444"/>
+          </a:xfrm>
+          <a:prstGeom prst="rect">
+            <a:avLst/>
+          </a:prstGeom>
+          <a:noFill/>
+        </p:spPr>
+        <p:txBody>
+          <a:bodyPr wrap="square" rtlCol="0">
+            <a:spAutoFit/>
+          </a:bodyPr>
+          <a:lstStyle/>
+          <a:p>
+            <a:r>
+              <a:rPr lang="en-US" sz="800" dirty="0"/>
+              <a:t>ref</a:t>
+            </a:r>
+          </a:p>
+        </p:txBody>
+      </p:sp>
+      <p:sp>
+        <p:nvSpPr>
+          <p:cNvPr id="224" name="TextBox 223">
+            <a:extLst>
+              <a:ext uri="{FF2B5EF4-FFF2-40B4-BE49-F238E27FC236}">
+                <a16:creationId xmlns:a16="http://schemas.microsoft.com/office/drawing/2014/main" id="{2C4675AC-3B62-447B-91DD-68786DBA4520}"/>
+              </a:ext>
+            </a:extLst>
+          </p:cNvPr>
+          <p:cNvSpPr txBox="1"/>
+          <p:nvPr/>
+        </p:nvSpPr>
+        <p:spPr>
+          <a:xfrm>
+            <a:off x="7195997" y="4491285"/>
+            <a:ext cx="494818" cy="215444"/>
+          </a:xfrm>
+          <a:prstGeom prst="rect">
+            <a:avLst/>
+          </a:prstGeom>
+          <a:noFill/>
+        </p:spPr>
+        <p:txBody>
+          <a:bodyPr wrap="square" rtlCol="0">
+            <a:spAutoFit/>
+          </a:bodyPr>
+          <a:lstStyle/>
+          <a:p>
+            <a:r>
+              <a:rPr lang="en-US" sz="800" dirty="0"/>
+              <a:t>conflict</a:t>
+            </a:r>
+          </a:p>
+        </p:txBody>
+      </p:sp>
     </p:spTree>
     <p:extLst>
       <p:ext uri="{BB962C8B-B14F-4D97-AF65-F5344CB8AC3E}">

</xml_diff>

<commit_message>
Ignore spelling error on screenshots
</commit_message>
<xml_diff>
--- a/docs/assets/DG Diagrams.pptx
+++ b/docs/assets/DG Diagrams.pptx
@@ -179,7 +179,7 @@
             </a:lvl1pPr>
           </a:lstStyle>
           <a:p>
-            <a:endParaRPr lang="en-US"/>
+            <a:endParaRPr lang="en-US" dirty="0"/>
           </a:p>
         </p:txBody>
       </p:sp>
@@ -214,7 +214,7 @@
               <a:rPr lang="en-US" smtClean="0"/>
               <a:t>10/20/2021</a:t>
             </a:fld>
-            <a:endParaRPr lang="en-US"/>
+            <a:endParaRPr lang="en-US" dirty="0"/>
           </a:p>
         </p:txBody>
       </p:sp>
@@ -247,7 +247,7 @@
           <a:bodyPr vert="horz" lIns="91440" tIns="45720" rIns="91440" bIns="45720" rtlCol="0" anchor="ctr"/>
           <a:lstStyle/>
           <a:p>
-            <a:endParaRPr lang="en-US"/>
+            <a:endParaRPr lang="en-US" dirty="0"/>
           </a:p>
         </p:txBody>
       </p:sp>
@@ -338,7 +338,7 @@
             </a:lvl1pPr>
           </a:lstStyle>
           <a:p>
-            <a:endParaRPr lang="en-US"/>
+            <a:endParaRPr lang="en-US" dirty="0"/>
           </a:p>
         </p:txBody>
       </p:sp>
@@ -373,7 +373,7 @@
               <a:rPr lang="en-US" smtClean="0"/>
               <a:t>‹#›</a:t>
             </a:fld>
-            <a:endParaRPr lang="en-US"/>
+            <a:endParaRPr lang="en-US" dirty="0"/>
           </a:p>
         </p:txBody>
       </p:sp>
@@ -547,7 +547,7 @@
               <a:rPr lang="en-US" smtClean="0"/>
               <a:t>3</a:t>
             </a:fld>
-            <a:endParaRPr lang="en-US"/>
+            <a:endParaRPr lang="en-US" dirty="0"/>
           </a:p>
         </p:txBody>
       </p:sp>
@@ -745,7 +745,7 @@
               <a:rPr lang="en-US" smtClean="0"/>
               <a:t>10/20/2021</a:t>
             </a:fld>
-            <a:endParaRPr lang="en-US"/>
+            <a:endParaRPr lang="en-US" dirty="0"/>
           </a:p>
         </p:txBody>
       </p:sp>
@@ -764,7 +764,7 @@
           <a:bodyPr/>
           <a:lstStyle/>
           <a:p>
-            <a:endParaRPr lang="en-US"/>
+            <a:endParaRPr lang="en-US" dirty="0"/>
           </a:p>
         </p:txBody>
       </p:sp>
@@ -787,7 +787,7 @@
               <a:rPr lang="en-US" smtClean="0"/>
               <a:t>‹#›</a:t>
             </a:fld>
-            <a:endParaRPr lang="en-US"/>
+            <a:endParaRPr lang="en-US" dirty="0"/>
           </a:p>
         </p:txBody>
       </p:sp>
@@ -913,7 +913,7 @@
               <a:rPr lang="en-US" smtClean="0"/>
               <a:t>10/20/2021</a:t>
             </a:fld>
-            <a:endParaRPr lang="en-US"/>
+            <a:endParaRPr lang="en-US" dirty="0"/>
           </a:p>
         </p:txBody>
       </p:sp>
@@ -932,7 +932,7 @@
           <a:bodyPr/>
           <a:lstStyle/>
           <a:p>
-            <a:endParaRPr lang="en-US"/>
+            <a:endParaRPr lang="en-US" dirty="0"/>
           </a:p>
         </p:txBody>
       </p:sp>
@@ -955,7 +955,7 @@
               <a:rPr lang="en-US" smtClean="0"/>
               <a:t>‹#›</a:t>
             </a:fld>
-            <a:endParaRPr lang="en-US"/>
+            <a:endParaRPr lang="en-US" dirty="0"/>
           </a:p>
         </p:txBody>
       </p:sp>
@@ -1091,7 +1091,7 @@
               <a:rPr lang="en-US" smtClean="0"/>
               <a:t>10/20/2021</a:t>
             </a:fld>
-            <a:endParaRPr lang="en-US"/>
+            <a:endParaRPr lang="en-US" dirty="0"/>
           </a:p>
         </p:txBody>
       </p:sp>
@@ -1110,7 +1110,7 @@
           <a:bodyPr/>
           <a:lstStyle/>
           <a:p>
-            <a:endParaRPr lang="en-US"/>
+            <a:endParaRPr lang="en-US" dirty="0"/>
           </a:p>
         </p:txBody>
       </p:sp>
@@ -1133,7 +1133,7 @@
               <a:rPr lang="en-US" smtClean="0"/>
               <a:t>‹#›</a:t>
             </a:fld>
-            <a:endParaRPr lang="en-US"/>
+            <a:endParaRPr lang="en-US" dirty="0"/>
           </a:p>
         </p:txBody>
       </p:sp>
@@ -1259,7 +1259,7 @@
               <a:rPr lang="en-US" smtClean="0"/>
               <a:t>10/20/2021</a:t>
             </a:fld>
-            <a:endParaRPr lang="en-US"/>
+            <a:endParaRPr lang="en-US" dirty="0"/>
           </a:p>
         </p:txBody>
       </p:sp>
@@ -1278,7 +1278,7 @@
           <a:bodyPr/>
           <a:lstStyle/>
           <a:p>
-            <a:endParaRPr lang="en-US"/>
+            <a:endParaRPr lang="en-US" dirty="0"/>
           </a:p>
         </p:txBody>
       </p:sp>
@@ -1301,7 +1301,7 @@
               <a:rPr lang="en-US" smtClean="0"/>
               <a:t>‹#›</a:t>
             </a:fld>
-            <a:endParaRPr lang="en-US"/>
+            <a:endParaRPr lang="en-US" dirty="0"/>
           </a:p>
         </p:txBody>
       </p:sp>
@@ -1504,7 +1504,7 @@
               <a:rPr lang="en-US" smtClean="0"/>
               <a:t>10/20/2021</a:t>
             </a:fld>
-            <a:endParaRPr lang="en-US"/>
+            <a:endParaRPr lang="en-US" dirty="0"/>
           </a:p>
         </p:txBody>
       </p:sp>
@@ -1523,7 +1523,7 @@
           <a:bodyPr/>
           <a:lstStyle/>
           <a:p>
-            <a:endParaRPr lang="en-US"/>
+            <a:endParaRPr lang="en-US" dirty="0"/>
           </a:p>
         </p:txBody>
       </p:sp>
@@ -1546,7 +1546,7 @@
               <a:rPr lang="en-US" smtClean="0"/>
               <a:t>‹#›</a:t>
             </a:fld>
-            <a:endParaRPr lang="en-US"/>
+            <a:endParaRPr lang="en-US" dirty="0"/>
           </a:p>
         </p:txBody>
       </p:sp>
@@ -1789,7 +1789,7 @@
               <a:rPr lang="en-US" smtClean="0"/>
               <a:t>10/20/2021</a:t>
             </a:fld>
-            <a:endParaRPr lang="en-US"/>
+            <a:endParaRPr lang="en-US" dirty="0"/>
           </a:p>
         </p:txBody>
       </p:sp>
@@ -1808,7 +1808,7 @@
           <a:bodyPr/>
           <a:lstStyle/>
           <a:p>
-            <a:endParaRPr lang="en-US"/>
+            <a:endParaRPr lang="en-US" dirty="0"/>
           </a:p>
         </p:txBody>
       </p:sp>
@@ -1831,7 +1831,7 @@
               <a:rPr lang="en-US" smtClean="0"/>
               <a:t>‹#›</a:t>
             </a:fld>
-            <a:endParaRPr lang="en-US"/>
+            <a:endParaRPr lang="en-US" dirty="0"/>
           </a:p>
         </p:txBody>
       </p:sp>
@@ -2208,7 +2208,7 @@
               <a:rPr lang="en-US" smtClean="0"/>
               <a:t>10/20/2021</a:t>
             </a:fld>
-            <a:endParaRPr lang="en-US"/>
+            <a:endParaRPr lang="en-US" dirty="0"/>
           </a:p>
         </p:txBody>
       </p:sp>
@@ -2227,7 +2227,7 @@
           <a:bodyPr/>
           <a:lstStyle/>
           <a:p>
-            <a:endParaRPr lang="en-US"/>
+            <a:endParaRPr lang="en-US" dirty="0"/>
           </a:p>
         </p:txBody>
       </p:sp>
@@ -2250,7 +2250,7 @@
               <a:rPr lang="en-US" smtClean="0"/>
               <a:t>‹#›</a:t>
             </a:fld>
-            <a:endParaRPr lang="en-US"/>
+            <a:endParaRPr lang="en-US" dirty="0"/>
           </a:p>
         </p:txBody>
       </p:sp>
@@ -2325,7 +2325,7 @@
               <a:rPr lang="en-US" smtClean="0"/>
               <a:t>10/20/2021</a:t>
             </a:fld>
-            <a:endParaRPr lang="en-US"/>
+            <a:endParaRPr lang="en-US" dirty="0"/>
           </a:p>
         </p:txBody>
       </p:sp>
@@ -2344,7 +2344,7 @@
           <a:bodyPr/>
           <a:lstStyle/>
           <a:p>
-            <a:endParaRPr lang="en-US"/>
+            <a:endParaRPr lang="en-US" dirty="0"/>
           </a:p>
         </p:txBody>
       </p:sp>
@@ -2367,7 +2367,7 @@
               <a:rPr lang="en-US" smtClean="0"/>
               <a:t>‹#›</a:t>
             </a:fld>
-            <a:endParaRPr lang="en-US"/>
+            <a:endParaRPr lang="en-US" dirty="0"/>
           </a:p>
         </p:txBody>
       </p:sp>
@@ -2420,7 +2420,7 @@
               <a:rPr lang="en-US" smtClean="0"/>
               <a:t>10/20/2021</a:t>
             </a:fld>
-            <a:endParaRPr lang="en-US"/>
+            <a:endParaRPr lang="en-US" dirty="0"/>
           </a:p>
         </p:txBody>
       </p:sp>
@@ -2439,7 +2439,7 @@
           <a:bodyPr/>
           <a:lstStyle/>
           <a:p>
-            <a:endParaRPr lang="en-US"/>
+            <a:endParaRPr lang="en-US" dirty="0"/>
           </a:p>
         </p:txBody>
       </p:sp>
@@ -2462,7 +2462,7 @@
               <a:rPr lang="en-US" smtClean="0"/>
               <a:t>‹#›</a:t>
             </a:fld>
-            <a:endParaRPr lang="en-US"/>
+            <a:endParaRPr lang="en-US" dirty="0"/>
           </a:p>
         </p:txBody>
       </p:sp>
@@ -2695,7 +2695,7 @@
               <a:rPr lang="en-US" smtClean="0"/>
               <a:t>10/20/2021</a:t>
             </a:fld>
-            <a:endParaRPr lang="en-US"/>
+            <a:endParaRPr lang="en-US" dirty="0"/>
           </a:p>
         </p:txBody>
       </p:sp>
@@ -2714,7 +2714,7 @@
           <a:bodyPr/>
           <a:lstStyle/>
           <a:p>
-            <a:endParaRPr lang="en-US"/>
+            <a:endParaRPr lang="en-US" dirty="0"/>
           </a:p>
         </p:txBody>
       </p:sp>
@@ -2737,7 +2737,7 @@
               <a:rPr lang="en-US" smtClean="0"/>
               <a:t>‹#›</a:t>
             </a:fld>
-            <a:endParaRPr lang="en-US"/>
+            <a:endParaRPr lang="en-US" dirty="0"/>
           </a:p>
         </p:txBody>
       </p:sp>
@@ -2859,7 +2859,7 @@
             </a:lvl9pPr>
           </a:lstStyle>
           <a:p>
-            <a:endParaRPr lang="en-US"/>
+            <a:endParaRPr lang="en-US" dirty="0"/>
           </a:p>
         </p:txBody>
       </p:sp>
@@ -2947,7 +2947,7 @@
               <a:rPr lang="en-US" smtClean="0"/>
               <a:t>10/20/2021</a:t>
             </a:fld>
-            <a:endParaRPr lang="en-US"/>
+            <a:endParaRPr lang="en-US" dirty="0"/>
           </a:p>
         </p:txBody>
       </p:sp>
@@ -2966,7 +2966,7 @@
           <a:bodyPr/>
           <a:lstStyle/>
           <a:p>
-            <a:endParaRPr lang="en-US"/>
+            <a:endParaRPr lang="en-US" dirty="0"/>
           </a:p>
         </p:txBody>
       </p:sp>
@@ -2989,7 +2989,7 @@
               <a:rPr lang="en-US" smtClean="0"/>
               <a:t>‹#›</a:t>
             </a:fld>
-            <a:endParaRPr lang="en-US"/>
+            <a:endParaRPr lang="en-US" dirty="0"/>
           </a:p>
         </p:txBody>
       </p:sp>
@@ -3158,7 +3158,7 @@
               <a:rPr lang="en-US" smtClean="0"/>
               <a:t>10/20/2021</a:t>
             </a:fld>
-            <a:endParaRPr lang="en-US"/>
+            <a:endParaRPr lang="en-US" dirty="0"/>
           </a:p>
         </p:txBody>
       </p:sp>
@@ -3195,7 +3195,7 @@
             </a:lvl1pPr>
           </a:lstStyle>
           <a:p>
-            <a:endParaRPr lang="en-US"/>
+            <a:endParaRPr lang="en-US" dirty="0"/>
           </a:p>
         </p:txBody>
       </p:sp>
@@ -3236,7 +3236,7 @@
               <a:rPr lang="en-US" smtClean="0"/>
               <a:t>‹#›</a:t>
             </a:fld>
-            <a:endParaRPr lang="en-US"/>
+            <a:endParaRPr lang="en-US" dirty="0"/>
           </a:p>
         </p:txBody>
       </p:sp>
@@ -3645,7 +3645,7 @@
           <a:lstStyle/>
           <a:p>
             <a:pPr algn="ctr"/>
-            <a:endParaRPr lang="en-US"/>
+            <a:endParaRPr lang="en-US" dirty="0"/>
           </a:p>
         </p:txBody>
       </p:sp>
@@ -4361,7 +4361,7 @@
           <a:lstStyle/>
           <a:p>
             <a:pPr algn="ctr"/>
-            <a:endParaRPr lang="en-US"/>
+            <a:endParaRPr lang="en-US" dirty="0"/>
           </a:p>
         </p:txBody>
       </p:sp>
@@ -4811,7 +4811,7 @@
           <a:lstStyle/>
           <a:p>
             <a:pPr algn="ctr"/>
-            <a:endParaRPr lang="en-US"/>
+            <a:endParaRPr lang="en-US" dirty="0"/>
           </a:p>
         </p:txBody>
       </p:sp>
@@ -5110,7 +5110,7 @@
           <a:lstStyle/>
           <a:p>
             <a:pPr algn="ctr"/>
-            <a:endParaRPr lang="en-US"/>
+            <a:endParaRPr lang="en-US" dirty="0"/>
           </a:p>
         </p:txBody>
       </p:sp>
@@ -5637,7 +5637,7 @@
           <a:lstStyle/>
           <a:p>
             <a:pPr algn="ctr"/>
-            <a:endParaRPr lang="en-US"/>
+            <a:endParaRPr lang="en-US" dirty="0"/>
           </a:p>
         </p:txBody>
       </p:sp>
@@ -6047,7 +6047,7 @@
           <a:lstStyle/>
           <a:p>
             <a:pPr algn="ctr"/>
-            <a:endParaRPr lang="en-US"/>
+            <a:endParaRPr lang="en-US" dirty="0"/>
           </a:p>
         </p:txBody>
       </p:sp>
@@ -6166,7 +6166,7 @@
           <a:lstStyle/>
           <a:p>
             <a:pPr algn="ctr"/>
-            <a:endParaRPr lang="en-US"/>
+            <a:endParaRPr lang="en-US" dirty="0"/>
           </a:p>
         </p:txBody>
       </p:sp>
@@ -6607,7 +6607,7 @@
           <a:lstStyle/>
           <a:p>
             <a:pPr algn="ctr"/>
-            <a:endParaRPr lang="en-US"/>
+            <a:endParaRPr lang="en-US" dirty="0"/>
           </a:p>
         </p:txBody>
       </p:sp>
@@ -6721,23 +6721,7 @@
           <a:p>
             <a:r>
               <a:rPr lang="en-US" sz="800" dirty="0"/>
-              <a:t>parseSubCommand(</a:t>
-            </a:r>
-            <a:r>
-              <a:rPr lang="en-US" sz="800" dirty="0" err="1"/>
-              <a:t>subInput</a:t>
-            </a:r>
-            <a:r>
-              <a:rPr lang="en-US" sz="800" dirty="0"/>
-              <a:t> : String, </a:t>
-            </a:r>
-            <a:r>
-              <a:rPr lang="en-US" sz="800" dirty="0" err="1"/>
-              <a:t>commandWord</a:t>
-            </a:r>
-            <a:r>
-              <a:rPr lang="en-US" sz="800" dirty="0"/>
-              <a:t> : String)</a:t>
+              <a:t>parseSubCommand(subInput : String, commandWord : String)</a:t>
             </a:r>
           </a:p>
         </p:txBody>
@@ -6787,7 +6771,7 @@
           <a:lstStyle/>
           <a:p>
             <a:pPr algn="ctr"/>
-            <a:endParaRPr lang="en-US"/>
+            <a:endParaRPr lang="en-US" dirty="0"/>
           </a:p>
         </p:txBody>
       </p:sp>
@@ -6918,23 +6902,7 @@
           <a:p>
             <a:r>
               <a:rPr lang="en-US" sz="800" dirty="0"/>
-              <a:t>new </a:t>
-            </a:r>
-            <a:r>
-              <a:rPr lang="en-US" sz="800" dirty="0" err="1"/>
-              <a:t>PlannerCommand</a:t>
-            </a:r>
-            <a:r>
-              <a:rPr lang="en-US" sz="800" dirty="0"/>
-              <a:t>(subcommand : String, </a:t>
-            </a:r>
-            <a:r>
-              <a:rPr lang="en-US" sz="800" dirty="0" err="1"/>
-              <a:t>parsedArguments</a:t>
-            </a:r>
-            <a:r>
-              <a:rPr lang="en-US" sz="800" dirty="0"/>
-              <a:t> : String[])</a:t>
+              <a:t>new PlannerCommand(subcommand : String, parsedArguments : String[])</a:t>
             </a:r>
           </a:p>
         </p:txBody>
@@ -6993,13 +6961,8 @@
             <a:pPr algn="ctr"/>
             <a:r>
               <a:rPr lang="en-US" sz="800" dirty="0"/>
-              <a:t>:</a:t>
-            </a:r>
-            <a:r>
-              <a:rPr lang="en-US" sz="800" dirty="0" err="1"/>
-              <a:t>PlannerCommand</a:t>
-            </a:r>
-            <a:endParaRPr lang="en-US" sz="800" dirty="0"/>
+              <a:t>:PlannerCommand</a:t>
+            </a:r>
           </a:p>
         </p:txBody>
       </p:sp>
@@ -7048,7 +7011,7 @@
           <a:lstStyle/>
           <a:p>
             <a:pPr algn="ctr"/>
-            <a:endParaRPr lang="en-US"/>
+            <a:endParaRPr lang="en-US" dirty="0"/>
           </a:p>
         </p:txBody>
       </p:sp>
@@ -7747,12 +7710,8 @@
           <a:lstStyle/>
           <a:p>
             <a:r>
-              <a:rPr lang="en-US" sz="800" dirty="0" err="1"/>
-              <a:t>executeCommand</a:t>
-            </a:r>
-            <a:r>
               <a:rPr lang="en-US" sz="800" dirty="0"/>
-              <a:t>()</a:t>
+              <a:t>executeCommand()</a:t>
             </a:r>
           </a:p>
         </p:txBody>
@@ -7802,7 +7761,7 @@
           <a:lstStyle/>
           <a:p>
             <a:pPr algn="ctr"/>
-            <a:endParaRPr lang="en-US"/>
+            <a:endParaRPr lang="en-US" dirty="0"/>
           </a:p>
         </p:txBody>
       </p:sp>
@@ -7835,12 +7794,8 @@
           <a:lstStyle/>
           <a:p>
             <a:r>
-              <a:rPr lang="en-US" sz="800" dirty="0" err="1"/>
-              <a:t>handleAddCommand</a:t>
-            </a:r>
-            <a:r>
               <a:rPr lang="en-US" sz="800" dirty="0"/>
-              <a:t>()</a:t>
+              <a:t>handleAddCommand()</a:t>
             </a:r>
           </a:p>
         </p:txBody>
@@ -7940,7 +7895,7 @@
           <a:lstStyle/>
           <a:p>
             <a:pPr algn="ctr"/>
-            <a:endParaRPr lang="en-US"/>
+            <a:endParaRPr lang="en-US" dirty="0"/>
           </a:p>
         </p:txBody>
       </p:sp>
@@ -8095,7 +8050,7 @@
           <a:lstStyle/>
           <a:p>
             <a:pPr algn="ctr"/>
-            <a:endParaRPr lang="en-US"/>
+            <a:endParaRPr lang="en-US" dirty="0"/>
           </a:p>
         </p:txBody>
       </p:sp>
@@ -8488,7 +8443,7 @@
           <a:lstStyle/>
           <a:p>
             <a:pPr algn="ctr"/>
-            <a:endParaRPr lang="en-US"/>
+            <a:endParaRPr lang="en-US" dirty="0"/>
           </a:p>
         </p:txBody>
       </p:sp>
@@ -8593,13 +8548,8 @@
             <a:pPr algn="ctr"/>
             <a:r>
               <a:rPr lang="en-US" sz="800" dirty="0"/>
-              <a:t>:</a:t>
-            </a:r>
-            <a:r>
-              <a:rPr lang="en-US" sz="800" dirty="0" err="1"/>
-              <a:t>PlannerStorage</a:t>
-            </a:r>
-            <a:endParaRPr lang="en-US" sz="800" dirty="0"/>
+              <a:t>:PlannerStorage</a:t>
+            </a:r>
           </a:p>
         </p:txBody>
       </p:sp>
@@ -8648,7 +8598,7 @@
           <a:lstStyle/>
           <a:p>
             <a:pPr algn="ctr"/>
-            <a:endParaRPr lang="en-US"/>
+            <a:endParaRPr lang="en-US" dirty="0"/>
           </a:p>
         </p:txBody>
       </p:sp>
@@ -8717,15 +8667,7 @@
           <a:p>
             <a:r>
               <a:rPr lang="en-US" sz="800" dirty="0"/>
-              <a:t>new </a:t>
-            </a:r>
-            <a:r>
-              <a:rPr lang="en-US" sz="800" dirty="0" err="1"/>
-              <a:t>PlannerStorage</a:t>
-            </a:r>
-            <a:r>
-              <a:rPr lang="en-US" sz="800" dirty="0"/>
-              <a:t>()</a:t>
+              <a:t>new PlannerStorage()</a:t>
             </a:r>
           </a:p>
         </p:txBody>
@@ -8918,7 +8860,7 @@
           <a:lstStyle/>
           <a:p>
             <a:pPr algn="ctr"/>
-            <a:endParaRPr lang="en-US"/>
+            <a:endParaRPr lang="en-US" dirty="0"/>
           </a:p>
         </p:txBody>
       </p:sp>
@@ -8951,26 +8893,9 @@
           <a:lstStyle/>
           <a:p>
             <a:r>
-              <a:rPr lang="en-US" sz="800" dirty="0" err="1"/>
-              <a:t>addEvent</a:t>
-            </a:r>
-            <a:r>
               <a:rPr lang="en-US" sz="800" dirty="0"/>
-              <a:t>(event : Event, </a:t>
-            </a:r>
-            <a:r>
-              <a:rPr lang="en-US" sz="800" dirty="0" err="1"/>
-              <a:t>allowConflict</a:t>
-            </a:r>
-            <a:r>
-              <a:rPr lang="en-US" sz="800" dirty="0"/>
-              <a:t> : </a:t>
-            </a:r>
-            <a:r>
-              <a:rPr lang="en-US" sz="800" dirty="0" err="1"/>
-              <a:t>boolean</a:t>
-            </a:r>
-            <a:endParaRPr lang="en-US" sz="800" dirty="0"/>
+              <a:t>addEvent(event : Event, allowConflict : boolean</a:t>
+            </a:r>
           </a:p>
         </p:txBody>
       </p:sp>
@@ -9066,7 +8991,7 @@
           <a:lstStyle/>
           <a:p>
             <a:pPr algn="ctr"/>
-            <a:endParaRPr lang="en-US"/>
+            <a:endParaRPr lang="en-US" dirty="0"/>
           </a:p>
         </p:txBody>
       </p:sp>
@@ -9099,12 +9024,8 @@
           <a:lstStyle/>
           <a:p>
             <a:r>
-              <a:rPr lang="en-US" sz="800" dirty="0" err="1"/>
-              <a:t>writeToFile</a:t>
-            </a:r>
-            <a:r>
               <a:rPr lang="en-US" sz="800" dirty="0"/>
-              <a:t>(data : String)</a:t>
+              <a:t>writeToFile(data : String)</a:t>
             </a:r>
           </a:p>
         </p:txBody>
@@ -9211,13 +9132,8 @@
             <a:pPr algn="ctr"/>
             <a:r>
               <a:rPr lang="en-US" sz="800" dirty="0"/>
-              <a:t>:</a:t>
-            </a:r>
-            <a:r>
-              <a:rPr lang="en-US" sz="800" dirty="0" err="1"/>
-              <a:t>CommandResult</a:t>
-            </a:r>
-            <a:endParaRPr lang="en-US" sz="800" dirty="0"/>
+              <a:t>:CommandResult</a:t>
+            </a:r>
           </a:p>
         </p:txBody>
       </p:sp>
@@ -9266,7 +9182,7 @@
           <a:lstStyle/>
           <a:p>
             <a:pPr algn="ctr"/>
-            <a:endParaRPr lang="en-US"/>
+            <a:endParaRPr lang="en-US" dirty="0"/>
           </a:p>
         </p:txBody>
       </p:sp>
@@ -9300,23 +9216,7 @@
           <a:p>
             <a:r>
               <a:rPr lang="en-US" sz="800" dirty="0"/>
-              <a:t>new </a:t>
-            </a:r>
-            <a:r>
-              <a:rPr lang="en-US" sz="800" dirty="0" err="1"/>
-              <a:t>CommandResult</a:t>
-            </a:r>
-            <a:r>
-              <a:rPr lang="en-US" sz="800" dirty="0"/>
-              <a:t>(</a:t>
-            </a:r>
-            <a:r>
-              <a:rPr lang="en-US" sz="800" dirty="0" err="1"/>
-              <a:t>feedbackToUser</a:t>
-            </a:r>
-            <a:r>
-              <a:rPr lang="en-US" sz="800" dirty="0"/>
-              <a:t> : String)</a:t>
+              <a:t>new CommandResult(feedbackToUser : String)</a:t>
             </a:r>
           </a:p>
         </p:txBody>
@@ -9826,7 +9726,7 @@
           <a:lstStyle/>
           <a:p>
             <a:pPr algn="ctr"/>
-            <a:endParaRPr lang="en-SG">
+            <a:endParaRPr lang="en-SG" dirty="0">
               <a:solidFill>
                 <a:schemeClr val="bg1"/>
               </a:solidFill>
@@ -9878,7 +9778,7 @@
           <a:lstStyle/>
           <a:p>
             <a:pPr algn="ctr"/>
-            <a:endParaRPr lang="en-SG"/>
+            <a:endParaRPr lang="en-SG" dirty="0"/>
           </a:p>
         </p:txBody>
       </p:sp>
@@ -10066,7 +9966,7 @@
           <a:lstStyle/>
           <a:p>
             <a:pPr algn="ctr"/>
-            <a:endParaRPr lang="en-SG"/>
+            <a:endParaRPr lang="en-SG" dirty="0"/>
           </a:p>
         </p:txBody>
       </p:sp>
@@ -10114,7 +10014,7 @@
           <a:lstStyle/>
           <a:p>
             <a:pPr algn="ctr"/>
-            <a:endParaRPr lang="en-SG"/>
+            <a:endParaRPr lang="en-SG" dirty="0"/>
           </a:p>
         </p:txBody>
       </p:sp>
@@ -10146,21 +10046,13 @@
           </a:bodyPr>
           <a:lstStyle/>
           <a:p>
-            <a:r>
-              <a:rPr lang="en-US" sz="800" b="1" dirty="0" err="1">
-                <a:solidFill>
-                  <a:schemeClr val="bg1"/>
-                </a:solidFill>
-              </a:rPr>
-              <a:t>sd</a:t>
-            </a:r>
             <a:r>
               <a:rPr lang="en-US" sz="800" b="1" dirty="0">
                 <a:solidFill>
                   <a:schemeClr val="bg1"/>
                 </a:solidFill>
               </a:rPr>
-              <a:t> conflict</a:t>
+              <a:t>sd conflict</a:t>
             </a:r>
           </a:p>
         </p:txBody>
@@ -10269,7 +10161,7 @@
           <a:lstStyle/>
           <a:p>
             <a:pPr algn="ctr"/>
-            <a:endParaRPr lang="en-SG">
+            <a:endParaRPr lang="en-SG" dirty="0">
               <a:solidFill>
                 <a:schemeClr val="bg1"/>
               </a:solidFill>
@@ -10322,7 +10214,7 @@
           <a:lstStyle/>
           <a:p>
             <a:pPr algn="ctr"/>
-            <a:endParaRPr lang="en-SG">
+            <a:endParaRPr lang="en-SG" dirty="0">
               <a:solidFill>
                 <a:schemeClr val="bg1"/>
               </a:solidFill>
@@ -10421,7 +10313,7 @@
           <a:lstStyle/>
           <a:p>
             <a:pPr algn="ctr"/>
-            <a:endParaRPr lang="en-SG"/>
+            <a:endParaRPr lang="en-SG" dirty="0"/>
           </a:p>
         </p:txBody>
       </p:sp>
@@ -10494,23 +10386,7 @@
           <a:p>
             <a:r>
               <a:rPr lang="en-US" sz="800" b="1" dirty="0"/>
-              <a:t>[</a:t>
-            </a:r>
-            <a:r>
-              <a:rPr lang="en-US" sz="800" b="1" dirty="0" err="1"/>
-              <a:t>hasTimeConflict</a:t>
-            </a:r>
-            <a:r>
-              <a:rPr lang="en-US" sz="800" b="1" dirty="0"/>
-              <a:t> &amp;&amp; !</a:t>
-            </a:r>
-            <a:r>
-              <a:rPr lang="en-US" sz="800" b="1" dirty="0" err="1"/>
-              <a:t>allowConflict</a:t>
-            </a:r>
-            <a:r>
-              <a:rPr lang="en-US" sz="800" b="1" dirty="0"/>
-              <a:t>]</a:t>
+              <a:t>[hasTimeConflict &amp;&amp; !allowConflict]</a:t>
             </a:r>
           </a:p>
         </p:txBody>
@@ -10610,7 +10486,7 @@
           <a:lstStyle/>
           <a:p>
             <a:pPr algn="ctr"/>
-            <a:endParaRPr lang="en-US"/>
+            <a:endParaRPr lang="en-US" dirty="0"/>
           </a:p>
         </p:txBody>
       </p:sp>
@@ -10643,12 +10519,8 @@
           <a:lstStyle/>
           <a:p>
             <a:r>
-              <a:rPr lang="en-US" sz="800" dirty="0" err="1"/>
-              <a:t>hasTimeConflict</a:t>
-            </a:r>
-            <a:r>
               <a:rPr lang="en-US" sz="800" dirty="0"/>
-              <a:t>(event : Event)</a:t>
+              <a:t>hasTimeConflict(event : Event)</a:t>
             </a:r>
           </a:p>
         </p:txBody>
@@ -10839,10 +10711,9 @@
           <a:lstStyle/>
           <a:p>
             <a:r>
-              <a:rPr lang="en-US" sz="800" dirty="0" err="1"/>
+              <a:rPr lang="en-US" sz="800" dirty="0"/>
               <a:t>hasTimeConflict</a:t>
             </a:r>
-            <a:endParaRPr lang="en-US" sz="800" dirty="0"/>
           </a:p>
         </p:txBody>
       </p:sp>
@@ -10900,13 +10771,8 @@
             <a:pPr algn="ctr"/>
             <a:r>
               <a:rPr lang="en-US" sz="800" dirty="0"/>
-              <a:t>:</a:t>
-            </a:r>
-            <a:r>
-              <a:rPr lang="en-US" sz="800" dirty="0" err="1"/>
-              <a:t>PlannerCommand</a:t>
-            </a:r>
-            <a:endParaRPr lang="en-US" sz="800" dirty="0"/>
+              <a:t>:PlannerCommand</a:t>
+            </a:r>
           </a:p>
         </p:txBody>
       </p:sp>
@@ -11052,7 +10918,7 @@
           <a:lstStyle/>
           <a:p>
             <a:pPr algn="ctr"/>
-            <a:endParaRPr lang="en-US"/>
+            <a:endParaRPr lang="en-US" dirty="0"/>
           </a:p>
         </p:txBody>
       </p:sp>
@@ -11085,12 +10951,8 @@
           <a:lstStyle/>
           <a:p>
             <a:r>
-              <a:rPr lang="en-US" sz="800" dirty="0" err="1"/>
-              <a:t>getReplyFromPrompt</a:t>
-            </a:r>
-            <a:r>
               <a:rPr lang="en-US" sz="800" dirty="0"/>
-              <a:t>()</a:t>
+              <a:t>getReplyFromPrompt()</a:t>
             </a:r>
           </a:p>
         </p:txBody>
@@ -11246,7 +11108,7 @@
           <a:lstStyle/>
           <a:p>
             <a:pPr algn="ctr"/>
-            <a:endParaRPr lang="en-US"/>
+            <a:endParaRPr lang="en-US" dirty="0"/>
           </a:p>
         </p:txBody>
       </p:sp>
@@ -11342,7 +11204,7 @@
           <a:lstStyle/>
           <a:p>
             <a:pPr algn="ctr"/>
-            <a:endParaRPr lang="en-US"/>
+            <a:endParaRPr lang="en-US" dirty="0"/>
           </a:p>
         </p:txBody>
       </p:sp>
@@ -11422,12 +11284,8 @@
           <a:lstStyle/>
           <a:p>
             <a:r>
-              <a:rPr lang="en-US" sz="800" dirty="0" err="1"/>
-              <a:t>getReply</a:t>
-            </a:r>
-            <a:r>
               <a:rPr lang="en-US" sz="800" dirty="0"/>
-              <a:t>()</a:t>
+              <a:t>getReply()</a:t>
             </a:r>
           </a:p>
         </p:txBody>
@@ -11896,7 +11754,7 @@
           <a:lstStyle/>
           <a:p>
             <a:pPr algn="ctr"/>
-            <a:endParaRPr lang="en-SG"/>
+            <a:endParaRPr lang="en-SG" dirty="0"/>
           </a:p>
         </p:txBody>
       </p:sp>
@@ -11969,15 +11827,7 @@
           <a:p>
             <a:r>
               <a:rPr lang="en-US" sz="800" b="1" dirty="0"/>
-              <a:t>[</a:t>
-            </a:r>
-            <a:r>
-              <a:rPr lang="en-US" sz="800" b="1" dirty="0" err="1"/>
-              <a:t>reply.equals</a:t>
-            </a:r>
-            <a:r>
-              <a:rPr lang="en-US" sz="800" b="1" dirty="0"/>
-              <a:t>(“yes”)]</a:t>
+              <a:t>[reply.equals(“yes”)]</a:t>
             </a:r>
           </a:p>
         </p:txBody>
@@ -12122,7 +11972,7 @@
           <a:lstStyle/>
           <a:p>
             <a:pPr algn="ctr"/>
-            <a:endParaRPr lang="en-US"/>
+            <a:endParaRPr lang="en-US" dirty="0"/>
           </a:p>
         </p:txBody>
       </p:sp>
@@ -12155,26 +12005,9 @@
           <a:lstStyle/>
           <a:p>
             <a:r>
-              <a:rPr lang="en-US" sz="800" dirty="0" err="1"/>
-              <a:t>addEvent</a:t>
-            </a:r>
-            <a:r>
               <a:rPr lang="en-US" sz="800" dirty="0"/>
-              <a:t>(event : Event, </a:t>
-            </a:r>
-            <a:r>
-              <a:rPr lang="en-US" sz="800" dirty="0" err="1"/>
-              <a:t>allowConflict</a:t>
-            </a:r>
-            <a:r>
-              <a:rPr lang="en-US" sz="800" dirty="0"/>
-              <a:t> : </a:t>
-            </a:r>
-            <a:r>
-              <a:rPr lang="en-US" sz="800" dirty="0" err="1"/>
-              <a:t>boolean</a:t>
-            </a:r>
-            <a:endParaRPr lang="en-US" sz="800" dirty="0"/>
+              <a:t>addEvent(event : Event, allowConflict : boolean</a:t>
+            </a:r>
           </a:p>
         </p:txBody>
       </p:sp>

</xml_diff>

<commit_message>
Make timetable methods non static and fix exam end time getter in module list
</commit_message>
<xml_diff>
--- a/docs/assets/DG Diagrams.pptx
+++ b/docs/assets/DG Diagrams.pptx
@@ -10,9 +10,9 @@
   <p:sldIdLst>
     <p:sldId id="256" r:id="rId2"/>
     <p:sldId id="260" r:id="rId3"/>
-    <p:sldId id="261" r:id="rId4"/>
-    <p:sldId id="262" r:id="rId5"/>
-    <p:sldId id="263" r:id="rId6"/>
+    <p:sldId id="265" r:id="rId4"/>
+    <p:sldId id="263" r:id="rId5"/>
+    <p:sldId id="264" r:id="rId6"/>
   </p:sldIdLst>
   <p:sldSz cx="9144000" cy="6858000" type="screen4x3"/>
   <p:notesSz cx="6858000" cy="9144000"/>
@@ -179,7 +179,7 @@
             </a:lvl1pPr>
           </a:lstStyle>
           <a:p>
-            <a:endParaRPr lang="en-US" dirty="0"/>
+            <a:endParaRPr lang="en-US"/>
           </a:p>
         </p:txBody>
       </p:sp>
@@ -212,9 +212,9 @@
           <a:p>
             <a:fld id="{31B455B7-35F4-3248-9980-DA268DAEE9E9}" type="datetimeFigureOut">
               <a:rPr lang="en-US" smtClean="0"/>
-              <a:t>10/20/2021</a:t>
+              <a:t>10/20/21</a:t>
             </a:fld>
-            <a:endParaRPr lang="en-US" dirty="0"/>
+            <a:endParaRPr lang="en-US"/>
           </a:p>
         </p:txBody>
       </p:sp>
@@ -247,7 +247,7 @@
           <a:bodyPr vert="horz" lIns="91440" tIns="45720" rIns="91440" bIns="45720" rtlCol="0" anchor="ctr"/>
           <a:lstStyle/>
           <a:p>
-            <a:endParaRPr lang="en-US" dirty="0"/>
+            <a:endParaRPr lang="en-US"/>
           </a:p>
         </p:txBody>
       </p:sp>
@@ -338,7 +338,7 @@
             </a:lvl1pPr>
           </a:lstStyle>
           <a:p>
-            <a:endParaRPr lang="en-US" dirty="0"/>
+            <a:endParaRPr lang="en-US"/>
           </a:p>
         </p:txBody>
       </p:sp>
@@ -373,7 +373,7 @@
               <a:rPr lang="en-US" smtClean="0"/>
               <a:t>‹#›</a:t>
             </a:fld>
-            <a:endParaRPr lang="en-US" dirty="0"/>
+            <a:endParaRPr lang="en-US"/>
           </a:p>
         </p:txBody>
       </p:sp>
@@ -743,9 +743,9 @@
           <a:p>
             <a:fld id="{78C97017-6FC3-485B-9764-EAC9E56C1D49}" type="datetimeFigureOut">
               <a:rPr lang="en-US" smtClean="0"/>
-              <a:t>10/20/2021</a:t>
+              <a:t>10/20/21</a:t>
             </a:fld>
-            <a:endParaRPr lang="en-US" dirty="0"/>
+            <a:endParaRPr lang="en-US"/>
           </a:p>
         </p:txBody>
       </p:sp>
@@ -764,7 +764,7 @@
           <a:bodyPr/>
           <a:lstStyle/>
           <a:p>
-            <a:endParaRPr lang="en-US" dirty="0"/>
+            <a:endParaRPr lang="en-US"/>
           </a:p>
         </p:txBody>
       </p:sp>
@@ -787,7 +787,7 @@
               <a:rPr lang="en-US" smtClean="0"/>
               <a:t>‹#›</a:t>
             </a:fld>
-            <a:endParaRPr lang="en-US" dirty="0"/>
+            <a:endParaRPr lang="en-US"/>
           </a:p>
         </p:txBody>
       </p:sp>
@@ -911,9 +911,9 @@
           <a:p>
             <a:fld id="{78C97017-6FC3-485B-9764-EAC9E56C1D49}" type="datetimeFigureOut">
               <a:rPr lang="en-US" smtClean="0"/>
-              <a:t>10/20/2021</a:t>
+              <a:t>10/20/21</a:t>
             </a:fld>
-            <a:endParaRPr lang="en-US" dirty="0"/>
+            <a:endParaRPr lang="en-US"/>
           </a:p>
         </p:txBody>
       </p:sp>
@@ -932,7 +932,7 @@
           <a:bodyPr/>
           <a:lstStyle/>
           <a:p>
-            <a:endParaRPr lang="en-US" dirty="0"/>
+            <a:endParaRPr lang="en-US"/>
           </a:p>
         </p:txBody>
       </p:sp>
@@ -955,7 +955,7 @@
               <a:rPr lang="en-US" smtClean="0"/>
               <a:t>‹#›</a:t>
             </a:fld>
-            <a:endParaRPr lang="en-US" dirty="0"/>
+            <a:endParaRPr lang="en-US"/>
           </a:p>
         </p:txBody>
       </p:sp>
@@ -1089,9 +1089,9 @@
           <a:p>
             <a:fld id="{78C97017-6FC3-485B-9764-EAC9E56C1D49}" type="datetimeFigureOut">
               <a:rPr lang="en-US" smtClean="0"/>
-              <a:t>10/20/2021</a:t>
+              <a:t>10/20/21</a:t>
             </a:fld>
-            <a:endParaRPr lang="en-US" dirty="0"/>
+            <a:endParaRPr lang="en-US"/>
           </a:p>
         </p:txBody>
       </p:sp>
@@ -1110,7 +1110,7 @@
           <a:bodyPr/>
           <a:lstStyle/>
           <a:p>
-            <a:endParaRPr lang="en-US" dirty="0"/>
+            <a:endParaRPr lang="en-US"/>
           </a:p>
         </p:txBody>
       </p:sp>
@@ -1133,7 +1133,7 @@
               <a:rPr lang="en-US" smtClean="0"/>
               <a:t>‹#›</a:t>
             </a:fld>
-            <a:endParaRPr lang="en-US" dirty="0"/>
+            <a:endParaRPr lang="en-US"/>
           </a:p>
         </p:txBody>
       </p:sp>
@@ -1257,9 +1257,9 @@
           <a:p>
             <a:fld id="{78C97017-6FC3-485B-9764-EAC9E56C1D49}" type="datetimeFigureOut">
               <a:rPr lang="en-US" smtClean="0"/>
-              <a:t>10/20/2021</a:t>
+              <a:t>10/20/21</a:t>
             </a:fld>
-            <a:endParaRPr lang="en-US" dirty="0"/>
+            <a:endParaRPr lang="en-US"/>
           </a:p>
         </p:txBody>
       </p:sp>
@@ -1278,7 +1278,7 @@
           <a:bodyPr/>
           <a:lstStyle/>
           <a:p>
-            <a:endParaRPr lang="en-US" dirty="0"/>
+            <a:endParaRPr lang="en-US"/>
           </a:p>
         </p:txBody>
       </p:sp>
@@ -1301,7 +1301,7 @@
               <a:rPr lang="en-US" smtClean="0"/>
               <a:t>‹#›</a:t>
             </a:fld>
-            <a:endParaRPr lang="en-US" dirty="0"/>
+            <a:endParaRPr lang="en-US"/>
           </a:p>
         </p:txBody>
       </p:sp>
@@ -1502,9 +1502,9 @@
           <a:p>
             <a:fld id="{78C97017-6FC3-485B-9764-EAC9E56C1D49}" type="datetimeFigureOut">
               <a:rPr lang="en-US" smtClean="0"/>
-              <a:t>10/20/2021</a:t>
+              <a:t>10/20/21</a:t>
             </a:fld>
-            <a:endParaRPr lang="en-US" dirty="0"/>
+            <a:endParaRPr lang="en-US"/>
           </a:p>
         </p:txBody>
       </p:sp>
@@ -1523,7 +1523,7 @@
           <a:bodyPr/>
           <a:lstStyle/>
           <a:p>
-            <a:endParaRPr lang="en-US" dirty="0"/>
+            <a:endParaRPr lang="en-US"/>
           </a:p>
         </p:txBody>
       </p:sp>
@@ -1546,7 +1546,7 @@
               <a:rPr lang="en-US" smtClean="0"/>
               <a:t>‹#›</a:t>
             </a:fld>
-            <a:endParaRPr lang="en-US" dirty="0"/>
+            <a:endParaRPr lang="en-US"/>
           </a:p>
         </p:txBody>
       </p:sp>
@@ -1787,9 +1787,9 @@
           <a:p>
             <a:fld id="{78C97017-6FC3-485B-9764-EAC9E56C1D49}" type="datetimeFigureOut">
               <a:rPr lang="en-US" smtClean="0"/>
-              <a:t>10/20/2021</a:t>
+              <a:t>10/20/21</a:t>
             </a:fld>
-            <a:endParaRPr lang="en-US" dirty="0"/>
+            <a:endParaRPr lang="en-US"/>
           </a:p>
         </p:txBody>
       </p:sp>
@@ -1808,7 +1808,7 @@
           <a:bodyPr/>
           <a:lstStyle/>
           <a:p>
-            <a:endParaRPr lang="en-US" dirty="0"/>
+            <a:endParaRPr lang="en-US"/>
           </a:p>
         </p:txBody>
       </p:sp>
@@ -1831,7 +1831,7 @@
               <a:rPr lang="en-US" smtClean="0"/>
               <a:t>‹#›</a:t>
             </a:fld>
-            <a:endParaRPr lang="en-US" dirty="0"/>
+            <a:endParaRPr lang="en-US"/>
           </a:p>
         </p:txBody>
       </p:sp>
@@ -2206,9 +2206,9 @@
           <a:p>
             <a:fld id="{78C97017-6FC3-485B-9764-EAC9E56C1D49}" type="datetimeFigureOut">
               <a:rPr lang="en-US" smtClean="0"/>
-              <a:t>10/20/2021</a:t>
+              <a:t>10/20/21</a:t>
             </a:fld>
-            <a:endParaRPr lang="en-US" dirty="0"/>
+            <a:endParaRPr lang="en-US"/>
           </a:p>
         </p:txBody>
       </p:sp>
@@ -2227,7 +2227,7 @@
           <a:bodyPr/>
           <a:lstStyle/>
           <a:p>
-            <a:endParaRPr lang="en-US" dirty="0"/>
+            <a:endParaRPr lang="en-US"/>
           </a:p>
         </p:txBody>
       </p:sp>
@@ -2250,7 +2250,7 @@
               <a:rPr lang="en-US" smtClean="0"/>
               <a:t>‹#›</a:t>
             </a:fld>
-            <a:endParaRPr lang="en-US" dirty="0"/>
+            <a:endParaRPr lang="en-US"/>
           </a:p>
         </p:txBody>
       </p:sp>
@@ -2323,9 +2323,9 @@
           <a:p>
             <a:fld id="{78C97017-6FC3-485B-9764-EAC9E56C1D49}" type="datetimeFigureOut">
               <a:rPr lang="en-US" smtClean="0"/>
-              <a:t>10/20/2021</a:t>
+              <a:t>10/20/21</a:t>
             </a:fld>
-            <a:endParaRPr lang="en-US" dirty="0"/>
+            <a:endParaRPr lang="en-US"/>
           </a:p>
         </p:txBody>
       </p:sp>
@@ -2344,7 +2344,7 @@
           <a:bodyPr/>
           <a:lstStyle/>
           <a:p>
-            <a:endParaRPr lang="en-US" dirty="0"/>
+            <a:endParaRPr lang="en-US"/>
           </a:p>
         </p:txBody>
       </p:sp>
@@ -2367,7 +2367,7 @@
               <a:rPr lang="en-US" smtClean="0"/>
               <a:t>‹#›</a:t>
             </a:fld>
-            <a:endParaRPr lang="en-US" dirty="0"/>
+            <a:endParaRPr lang="en-US"/>
           </a:p>
         </p:txBody>
       </p:sp>
@@ -2418,9 +2418,9 @@
           <a:p>
             <a:fld id="{78C97017-6FC3-485B-9764-EAC9E56C1D49}" type="datetimeFigureOut">
               <a:rPr lang="en-US" smtClean="0"/>
-              <a:t>10/20/2021</a:t>
+              <a:t>10/20/21</a:t>
             </a:fld>
-            <a:endParaRPr lang="en-US" dirty="0"/>
+            <a:endParaRPr lang="en-US"/>
           </a:p>
         </p:txBody>
       </p:sp>
@@ -2439,7 +2439,7 @@
           <a:bodyPr/>
           <a:lstStyle/>
           <a:p>
-            <a:endParaRPr lang="en-US" dirty="0"/>
+            <a:endParaRPr lang="en-US"/>
           </a:p>
         </p:txBody>
       </p:sp>
@@ -2462,7 +2462,7 @@
               <a:rPr lang="en-US" smtClean="0"/>
               <a:t>‹#›</a:t>
             </a:fld>
-            <a:endParaRPr lang="en-US" dirty="0"/>
+            <a:endParaRPr lang="en-US"/>
           </a:p>
         </p:txBody>
       </p:sp>
@@ -2693,9 +2693,9 @@
           <a:p>
             <a:fld id="{78C97017-6FC3-485B-9764-EAC9E56C1D49}" type="datetimeFigureOut">
               <a:rPr lang="en-US" smtClean="0"/>
-              <a:t>10/20/2021</a:t>
+              <a:t>10/20/21</a:t>
             </a:fld>
-            <a:endParaRPr lang="en-US" dirty="0"/>
+            <a:endParaRPr lang="en-US"/>
           </a:p>
         </p:txBody>
       </p:sp>
@@ -2714,7 +2714,7 @@
           <a:bodyPr/>
           <a:lstStyle/>
           <a:p>
-            <a:endParaRPr lang="en-US" dirty="0"/>
+            <a:endParaRPr lang="en-US"/>
           </a:p>
         </p:txBody>
       </p:sp>
@@ -2737,7 +2737,7 @@
               <a:rPr lang="en-US" smtClean="0"/>
               <a:t>‹#›</a:t>
             </a:fld>
-            <a:endParaRPr lang="en-US" dirty="0"/>
+            <a:endParaRPr lang="en-US"/>
           </a:p>
         </p:txBody>
       </p:sp>
@@ -2859,7 +2859,7 @@
             </a:lvl9pPr>
           </a:lstStyle>
           <a:p>
-            <a:endParaRPr lang="en-US" dirty="0"/>
+            <a:endParaRPr lang="en-US"/>
           </a:p>
         </p:txBody>
       </p:sp>
@@ -2945,9 +2945,9 @@
           <a:p>
             <a:fld id="{78C97017-6FC3-485B-9764-EAC9E56C1D49}" type="datetimeFigureOut">
               <a:rPr lang="en-US" smtClean="0"/>
-              <a:t>10/20/2021</a:t>
+              <a:t>10/20/21</a:t>
             </a:fld>
-            <a:endParaRPr lang="en-US" dirty="0"/>
+            <a:endParaRPr lang="en-US"/>
           </a:p>
         </p:txBody>
       </p:sp>
@@ -2966,7 +2966,7 @@
           <a:bodyPr/>
           <a:lstStyle/>
           <a:p>
-            <a:endParaRPr lang="en-US" dirty="0"/>
+            <a:endParaRPr lang="en-US"/>
           </a:p>
         </p:txBody>
       </p:sp>
@@ -2989,7 +2989,7 @@
               <a:rPr lang="en-US" smtClean="0"/>
               <a:t>‹#›</a:t>
             </a:fld>
-            <a:endParaRPr lang="en-US" dirty="0"/>
+            <a:endParaRPr lang="en-US"/>
           </a:p>
         </p:txBody>
       </p:sp>
@@ -3156,9 +3156,9 @@
           <a:p>
             <a:fld id="{78C97017-6FC3-485B-9764-EAC9E56C1D49}" type="datetimeFigureOut">
               <a:rPr lang="en-US" smtClean="0"/>
-              <a:t>10/20/2021</a:t>
+              <a:t>10/20/21</a:t>
             </a:fld>
-            <a:endParaRPr lang="en-US" dirty="0"/>
+            <a:endParaRPr lang="en-US"/>
           </a:p>
         </p:txBody>
       </p:sp>
@@ -3195,7 +3195,7 @@
             </a:lvl1pPr>
           </a:lstStyle>
           <a:p>
-            <a:endParaRPr lang="en-US" dirty="0"/>
+            <a:endParaRPr lang="en-US"/>
           </a:p>
         </p:txBody>
       </p:sp>
@@ -3236,7 +3236,7 @@
               <a:rPr lang="en-US" smtClean="0"/>
               <a:t>‹#›</a:t>
             </a:fld>
-            <a:endParaRPr lang="en-US" dirty="0"/>
+            <a:endParaRPr lang="en-US"/>
           </a:p>
         </p:txBody>
       </p:sp>
@@ -3645,7 +3645,7 @@
           <a:lstStyle/>
           <a:p>
             <a:pPr algn="ctr"/>
-            <a:endParaRPr lang="en-US" dirty="0"/>
+            <a:endParaRPr lang="en-US"/>
           </a:p>
         </p:txBody>
       </p:sp>
@@ -4028,10 +4028,10 @@
       </p:grpSpPr>
       <p:sp>
         <p:nvSpPr>
-          <p:cNvPr id="2" name="Rectangle 1">
-            <a:extLst>
-              <a:ext uri="{FF2B5EF4-FFF2-40B4-BE49-F238E27FC236}">
-                <a16:creationId xmlns:a16="http://schemas.microsoft.com/office/drawing/2014/main" id="{0C5D1DA1-73DB-2B4C-82A1-9724BAD1B1DE}"/>
+          <p:cNvPr id="145" name="Rectangle 144">
+            <a:extLst>
+              <a:ext uri="{FF2B5EF4-FFF2-40B4-BE49-F238E27FC236}">
+                <a16:creationId xmlns:a16="http://schemas.microsoft.com/office/drawing/2014/main" id="{B91C5734-92C8-6C40-900A-1B3409BA4D11}"/>
               </a:ext>
             </a:extLst>
           </p:cNvPr>
@@ -4040,17 +4040,14 @@
         </p:nvSpPr>
         <p:spPr>
           <a:xfrm>
-            <a:off x="381000" y="1379179"/>
-            <a:ext cx="3837765" cy="4343400"/>
+            <a:off x="609600" y="1177139"/>
+            <a:ext cx="1143000" cy="304800"/>
           </a:xfrm>
           <a:prstGeom prst="rect">
             <a:avLst/>
           </a:prstGeom>
           <a:solidFill>
-            <a:schemeClr val="accent1">
-              <a:lumMod val="60000"/>
-              <a:lumOff val="40000"/>
-            </a:schemeClr>
+            <a:schemeClr val="accent6"/>
           </a:solidFill>
           <a:ln w="12700">
             <a:solidFill>
@@ -4079,189 +4076,6 @@
           <a:lstStyle/>
           <a:p>
             <a:pPr algn="ctr"/>
-            <a:endParaRPr lang="en-US" dirty="0"/>
-          </a:p>
-        </p:txBody>
-      </p:sp>
-      <p:sp>
-        <p:nvSpPr>
-          <p:cNvPr id="3" name="Rectangle 2">
-            <a:extLst>
-              <a:ext uri="{FF2B5EF4-FFF2-40B4-BE49-F238E27FC236}">
-                <a16:creationId xmlns:a16="http://schemas.microsoft.com/office/drawing/2014/main" id="{6D4D3352-CF76-AF4F-92C8-A20064C118FE}"/>
-              </a:ext>
-            </a:extLst>
-          </p:cNvPr>
-          <p:cNvSpPr/>
-          <p:nvPr/>
-        </p:nvSpPr>
-        <p:spPr>
-          <a:xfrm>
-            <a:off x="4413180" y="1379179"/>
-            <a:ext cx="4647812" cy="4343400"/>
-          </a:xfrm>
-          <a:prstGeom prst="rect">
-            <a:avLst/>
-          </a:prstGeom>
-          <a:solidFill>
-            <a:schemeClr val="accent2">
-              <a:lumMod val="60000"/>
-              <a:lumOff val="40000"/>
-            </a:schemeClr>
-          </a:solidFill>
-          <a:ln w="12700">
-            <a:solidFill>
-              <a:schemeClr val="accent2"/>
-            </a:solidFill>
-          </a:ln>
-        </p:spPr>
-        <p:style>
-          <a:lnRef idx="2">
-            <a:schemeClr val="accent1">
-              <a:shade val="50000"/>
-            </a:schemeClr>
-          </a:lnRef>
-          <a:fillRef idx="1">
-            <a:schemeClr val="accent1"/>
-          </a:fillRef>
-          <a:effectRef idx="0">
-            <a:schemeClr val="accent1"/>
-          </a:effectRef>
-          <a:fontRef idx="minor">
-            <a:schemeClr val="lt1"/>
-          </a:fontRef>
-        </p:style>
-        <p:txBody>
-          <a:bodyPr rtlCol="0" anchor="ctr"/>
-          <a:lstStyle/>
-          <a:p>
-            <a:pPr algn="ctr"/>
-            <a:endParaRPr lang="en-US" dirty="0"/>
-          </a:p>
-        </p:txBody>
-      </p:sp>
-      <p:sp>
-        <p:nvSpPr>
-          <p:cNvPr id="4" name="TextBox 3">
-            <a:extLst>
-              <a:ext uri="{FF2B5EF4-FFF2-40B4-BE49-F238E27FC236}">
-                <a16:creationId xmlns:a16="http://schemas.microsoft.com/office/drawing/2014/main" id="{7E5AB0D4-F8DE-E641-8E4B-BAB3A46961CA}"/>
-              </a:ext>
-            </a:extLst>
-          </p:cNvPr>
-          <p:cNvSpPr txBox="1"/>
-          <p:nvPr/>
-        </p:nvSpPr>
-        <p:spPr>
-          <a:xfrm>
-            <a:off x="1890186" y="1394419"/>
-            <a:ext cx="838200" cy="276999"/>
-          </a:xfrm>
-          <a:prstGeom prst="rect">
-            <a:avLst/>
-          </a:prstGeom>
-          <a:noFill/>
-        </p:spPr>
-        <p:txBody>
-          <a:bodyPr wrap="square" rtlCol="0">
-            <a:spAutoFit/>
-          </a:bodyPr>
-          <a:lstStyle/>
-          <a:p>
-            <a:r>
-              <a:rPr lang="en-US" sz="1200" dirty="0"/>
-              <a:t>Command</a:t>
-            </a:r>
-          </a:p>
-        </p:txBody>
-      </p:sp>
-      <p:sp>
-        <p:nvSpPr>
-          <p:cNvPr id="5" name="TextBox 4">
-            <a:extLst>
-              <a:ext uri="{FF2B5EF4-FFF2-40B4-BE49-F238E27FC236}">
-                <a16:creationId xmlns:a16="http://schemas.microsoft.com/office/drawing/2014/main" id="{FC90EC1C-26EF-EA42-A983-4F878F666DD7}"/>
-              </a:ext>
-            </a:extLst>
-          </p:cNvPr>
-          <p:cNvSpPr txBox="1"/>
-          <p:nvPr/>
-        </p:nvSpPr>
-        <p:spPr>
-          <a:xfrm>
-            <a:off x="6269131" y="1476038"/>
-            <a:ext cx="838200" cy="276999"/>
-          </a:xfrm>
-          <a:prstGeom prst="rect">
-            <a:avLst/>
-          </a:prstGeom>
-          <a:noFill/>
-        </p:spPr>
-        <p:txBody>
-          <a:bodyPr wrap="square" rtlCol="0">
-            <a:spAutoFit/>
-          </a:bodyPr>
-          <a:lstStyle/>
-          <a:p>
-            <a:r>
-              <a:rPr lang="en-US" sz="1200" dirty="0"/>
-              <a:t>Timetable</a:t>
-            </a:r>
-          </a:p>
-        </p:txBody>
-      </p:sp>
-      <p:sp>
-        <p:nvSpPr>
-          <p:cNvPr id="6" name="Rectangle 5">
-            <a:extLst>
-              <a:ext uri="{FF2B5EF4-FFF2-40B4-BE49-F238E27FC236}">
-                <a16:creationId xmlns:a16="http://schemas.microsoft.com/office/drawing/2014/main" id="{4B1A462D-5FD0-2745-846B-5E372FECA0CE}"/>
-              </a:ext>
-            </a:extLst>
-          </p:cNvPr>
-          <p:cNvSpPr/>
-          <p:nvPr/>
-        </p:nvSpPr>
-        <p:spPr>
-          <a:xfrm>
-            <a:off x="609600" y="1752600"/>
-            <a:ext cx="1143000" cy="304800"/>
-          </a:xfrm>
-          <a:prstGeom prst="rect">
-            <a:avLst/>
-          </a:prstGeom>
-          <a:solidFill>
-            <a:schemeClr val="accent1">
-              <a:lumMod val="50000"/>
-            </a:schemeClr>
-          </a:solidFill>
-          <a:ln w="12700">
-            <a:solidFill>
-              <a:schemeClr val="accent2"/>
-            </a:solidFill>
-          </a:ln>
-        </p:spPr>
-        <p:style>
-          <a:lnRef idx="2">
-            <a:schemeClr val="accent1">
-              <a:shade val="50000"/>
-            </a:schemeClr>
-          </a:lnRef>
-          <a:fillRef idx="1">
-            <a:schemeClr val="accent1"/>
-          </a:fillRef>
-          <a:effectRef idx="0">
-            <a:schemeClr val="accent1"/>
-          </a:effectRef>
-          <a:fontRef idx="minor">
-            <a:schemeClr val="lt1"/>
-          </a:fontRef>
-        </p:style>
-        <p:txBody>
-          <a:bodyPr rtlCol="0" anchor="ctr"/>
-          <a:lstStyle/>
-          <a:p>
-            <a:pPr algn="ctr"/>
             <a:r>
               <a:rPr lang="en-US" sz="800" dirty="0"/>
               <a:t>:Parser</a:t>
@@ -4271,10 +4085,10 @@
       </p:sp>
       <p:cxnSp>
         <p:nvCxnSpPr>
-          <p:cNvPr id="8" name="Straight Connector 7">
-            <a:extLst>
-              <a:ext uri="{FF2B5EF4-FFF2-40B4-BE49-F238E27FC236}">
-                <a16:creationId xmlns:a16="http://schemas.microsoft.com/office/drawing/2014/main" id="{05FDED9C-0535-074D-A76C-F2E927F7EBBC}"/>
+          <p:cNvPr id="146" name="Straight Connector 145">
+            <a:extLst>
+              <a:ext uri="{FF2B5EF4-FFF2-40B4-BE49-F238E27FC236}">
+                <a16:creationId xmlns:a16="http://schemas.microsoft.com/office/drawing/2014/main" id="{37F8D2BB-ACF4-5147-A3DA-5CEC43A2D6B6}"/>
               </a:ext>
             </a:extLst>
           </p:cNvPr>
@@ -4285,8 +4099,8 @@
         </p:nvCxnSpPr>
         <p:spPr>
           <a:xfrm>
-            <a:off x="1143000" y="2057400"/>
-            <a:ext cx="0" cy="3719912"/>
+            <a:off x="1143000" y="1481939"/>
+            <a:ext cx="0" cy="1413661"/>
           </a:xfrm>
           <a:prstGeom prst="line">
             <a:avLst/>
@@ -4318,10 +4132,10 @@
       </p:cxnSp>
       <p:sp>
         <p:nvSpPr>
-          <p:cNvPr id="9" name="Rectangle 8">
-            <a:extLst>
-              <a:ext uri="{FF2B5EF4-FFF2-40B4-BE49-F238E27FC236}">
-                <a16:creationId xmlns:a16="http://schemas.microsoft.com/office/drawing/2014/main" id="{B334A720-FF53-4E46-8BA5-C1C27775B33F}"/>
+          <p:cNvPr id="147" name="Rectangle 146">
+            <a:extLst>
+              <a:ext uri="{FF2B5EF4-FFF2-40B4-BE49-F238E27FC236}">
+                <a16:creationId xmlns:a16="http://schemas.microsoft.com/office/drawing/2014/main" id="{CF50AE64-DE8A-E34D-82D8-01D2C31E9778}"/>
               </a:ext>
             </a:extLst>
           </p:cNvPr>
@@ -4330,8 +4144,8 @@
         </p:nvSpPr>
         <p:spPr>
           <a:xfrm>
-            <a:off x="1085851" y="2362200"/>
-            <a:ext cx="114298" cy="2895600"/>
+            <a:off x="1085851" y="1786739"/>
+            <a:ext cx="114298" cy="1022388"/>
           </a:xfrm>
           <a:prstGeom prst="rect">
             <a:avLst/>
@@ -4361,26 +4175,28 @@
           <a:lstStyle/>
           <a:p>
             <a:pPr algn="ctr"/>
-            <a:endParaRPr lang="en-US" dirty="0"/>
+            <a:endParaRPr lang="en-US"/>
           </a:p>
         </p:txBody>
       </p:sp>
       <p:cxnSp>
         <p:nvCxnSpPr>
-          <p:cNvPr id="11" name="Straight Arrow Connector 10">
-            <a:extLst>
-              <a:ext uri="{FF2B5EF4-FFF2-40B4-BE49-F238E27FC236}">
-                <a16:creationId xmlns:a16="http://schemas.microsoft.com/office/drawing/2014/main" id="{CF1E55E1-AA14-C34A-90FA-AD200EA06FE0}"/>
-              </a:ext>
-            </a:extLst>
-          </p:cNvPr>
-          <p:cNvCxnSpPr/>
+          <p:cNvPr id="148" name="Straight Arrow Connector 147">
+            <a:extLst>
+              <a:ext uri="{FF2B5EF4-FFF2-40B4-BE49-F238E27FC236}">
+                <a16:creationId xmlns:a16="http://schemas.microsoft.com/office/drawing/2014/main" id="{6FACA0DF-D96D-D24C-8E20-BDB1EC2AE152}"/>
+              </a:ext>
+            </a:extLst>
+          </p:cNvPr>
+          <p:cNvCxnSpPr>
+            <a:cxnSpLocks/>
+          </p:cNvCxnSpPr>
           <p:nvPr/>
         </p:nvCxnSpPr>
         <p:spPr>
           <a:xfrm>
-            <a:off x="228600" y="2362200"/>
-            <a:ext cx="857251" cy="0"/>
+            <a:off x="11491" y="1798965"/>
+            <a:ext cx="1074360" cy="0"/>
           </a:xfrm>
           <a:prstGeom prst="straightConnector1">
             <a:avLst/>
@@ -4410,47 +4226,12 @@
           </a:fontRef>
         </p:style>
       </p:cxnSp>
-      <p:sp>
-        <p:nvSpPr>
-          <p:cNvPr id="12" name="TextBox 11">
-            <a:extLst>
-              <a:ext uri="{FF2B5EF4-FFF2-40B4-BE49-F238E27FC236}">
-                <a16:creationId xmlns:a16="http://schemas.microsoft.com/office/drawing/2014/main" id="{D8B1A527-42E6-6A41-8372-32CBD76BA54F}"/>
-              </a:ext>
-            </a:extLst>
-          </p:cNvPr>
-          <p:cNvSpPr txBox="1"/>
-          <p:nvPr/>
-        </p:nvSpPr>
-        <p:spPr>
-          <a:xfrm>
-            <a:off x="55263" y="2124198"/>
-            <a:ext cx="1219197" cy="215444"/>
-          </a:xfrm>
-          <a:prstGeom prst="rect">
-            <a:avLst/>
-          </a:prstGeom>
-          <a:noFill/>
-        </p:spPr>
-        <p:txBody>
-          <a:bodyPr wrap="square" rtlCol="0">
-            <a:spAutoFit/>
-          </a:bodyPr>
-          <a:lstStyle/>
-          <a:p>
-            <a:r>
-              <a:rPr lang="en-US" sz="800" dirty="0"/>
-              <a:t>parseCommand(input)</a:t>
-            </a:r>
-          </a:p>
-        </p:txBody>
-      </p:sp>
       <p:cxnSp>
         <p:nvCxnSpPr>
-          <p:cNvPr id="14" name="Straight Arrow Connector 13">
-            <a:extLst>
-              <a:ext uri="{FF2B5EF4-FFF2-40B4-BE49-F238E27FC236}">
-                <a16:creationId xmlns:a16="http://schemas.microsoft.com/office/drawing/2014/main" id="{21158ADE-B6B8-1C47-B186-3AE03536B3BD}"/>
+          <p:cNvPr id="149" name="Straight Arrow Connector 148">
+            <a:extLst>
+              <a:ext uri="{FF2B5EF4-FFF2-40B4-BE49-F238E27FC236}">
+                <a16:creationId xmlns:a16="http://schemas.microsoft.com/office/drawing/2014/main" id="{00644D7D-6AF2-9646-ACB9-42BFDA9B215F}"/>
               </a:ext>
             </a:extLst>
           </p:cNvPr>
@@ -4461,7 +4242,7 @@
         </p:nvCxnSpPr>
         <p:spPr>
           <a:xfrm flipH="1">
-            <a:off x="228600" y="5257800"/>
+            <a:off x="299946" y="2809127"/>
             <a:ext cx="857252" cy="0"/>
           </a:xfrm>
           <a:prstGeom prst="straightConnector1">
@@ -4494,10 +4275,10 @@
       </p:cxnSp>
       <p:cxnSp>
         <p:nvCxnSpPr>
-          <p:cNvPr id="21" name="Straight Connector 20">
-            <a:extLst>
-              <a:ext uri="{FF2B5EF4-FFF2-40B4-BE49-F238E27FC236}">
-                <a16:creationId xmlns:a16="http://schemas.microsoft.com/office/drawing/2014/main" id="{CD0C96CD-C808-5C4A-9A91-B10059AFEF73}"/>
+          <p:cNvPr id="150" name="Straight Connector 149">
+            <a:extLst>
+              <a:ext uri="{FF2B5EF4-FFF2-40B4-BE49-F238E27FC236}">
+                <a16:creationId xmlns:a16="http://schemas.microsoft.com/office/drawing/2014/main" id="{A7954D1C-24B8-E34E-AFFD-0A318A802012}"/>
               </a:ext>
             </a:extLst>
           </p:cNvPr>
@@ -4508,7 +4289,7 @@
         </p:nvCxnSpPr>
         <p:spPr>
           <a:xfrm flipV="1">
-            <a:off x="245377" y="5219702"/>
+            <a:off x="321469" y="2765068"/>
             <a:ext cx="93742" cy="38097"/>
           </a:xfrm>
           <a:prstGeom prst="line">
@@ -4537,10 +4318,10 @@
       </p:cxnSp>
       <p:cxnSp>
         <p:nvCxnSpPr>
-          <p:cNvPr id="29" name="Straight Connector 28">
-            <a:extLst>
-              <a:ext uri="{FF2B5EF4-FFF2-40B4-BE49-F238E27FC236}">
-                <a16:creationId xmlns:a16="http://schemas.microsoft.com/office/drawing/2014/main" id="{B6DF571A-2068-4D43-AC81-C5F2E60082FD}"/>
+          <p:cNvPr id="152" name="Straight Connector 151">
+            <a:extLst>
+              <a:ext uri="{FF2B5EF4-FFF2-40B4-BE49-F238E27FC236}">
+                <a16:creationId xmlns:a16="http://schemas.microsoft.com/office/drawing/2014/main" id="{7A5AAA07-F257-8C4F-AF4F-61C9C040ACCF}"/>
               </a:ext>
             </a:extLst>
           </p:cNvPr>
@@ -4551,7 +4332,7 @@
         </p:nvCxnSpPr>
         <p:spPr>
           <a:xfrm>
-            <a:off x="247615" y="5257800"/>
+            <a:off x="321611" y="2814607"/>
             <a:ext cx="93600" cy="39600"/>
           </a:xfrm>
           <a:prstGeom prst="line">
@@ -4580,10 +4361,10 @@
       </p:cxnSp>
       <p:sp>
         <p:nvSpPr>
-          <p:cNvPr id="44" name="Rectangle 43">
-            <a:extLst>
-              <a:ext uri="{FF2B5EF4-FFF2-40B4-BE49-F238E27FC236}">
-                <a16:creationId xmlns:a16="http://schemas.microsoft.com/office/drawing/2014/main" id="{74CF6D1B-DD69-044F-A2E8-417C0CBDA0C8}"/>
+          <p:cNvPr id="153" name="Rectangle 152">
+            <a:extLst>
+              <a:ext uri="{FF2B5EF4-FFF2-40B4-BE49-F238E27FC236}">
+                <a16:creationId xmlns:a16="http://schemas.microsoft.com/office/drawing/2014/main" id="{D79FECE7-8A6A-7543-89A7-28718CE6F467}"/>
               </a:ext>
             </a:extLst>
           </p:cNvPr>
@@ -4592,8 +4373,8 @@
         </p:nvSpPr>
         <p:spPr>
           <a:xfrm>
-            <a:off x="2630674" y="1785589"/>
-            <a:ext cx="1504929" cy="304800"/>
+            <a:off x="2792718" y="1926661"/>
+            <a:ext cx="1172685" cy="304800"/>
           </a:xfrm>
           <a:prstGeom prst="rect">
             <a:avLst/>
@@ -4632,29 +4413,30 @@
             <a:pPr algn="ctr"/>
             <a:r>
               <a:rPr lang="en-US" sz="800" dirty="0"/>
-              <a:t>TimetableCommand</a:t>
+              <a:t>:TimetableCommand</a:t>
             </a:r>
           </a:p>
         </p:txBody>
       </p:sp>
       <p:cxnSp>
         <p:nvCxnSpPr>
-          <p:cNvPr id="45" name="Straight Arrow Connector 44">
-            <a:extLst>
-              <a:ext uri="{FF2B5EF4-FFF2-40B4-BE49-F238E27FC236}">
-                <a16:creationId xmlns:a16="http://schemas.microsoft.com/office/drawing/2014/main" id="{E14A224B-FBCF-CB40-8622-7C8BDBC4501F}"/>
+          <p:cNvPr id="154" name="Straight Arrow Connector 153">
+            <a:extLst>
+              <a:ext uri="{FF2B5EF4-FFF2-40B4-BE49-F238E27FC236}">
+                <a16:creationId xmlns:a16="http://schemas.microsoft.com/office/drawing/2014/main" id="{B91A8FFF-FED5-F644-848A-E8292FA87745}"/>
               </a:ext>
             </a:extLst>
           </p:cNvPr>
           <p:cNvCxnSpPr>
             <a:cxnSpLocks/>
+            <a:endCxn id="153" idx="1"/>
           </p:cNvCxnSpPr>
           <p:nvPr/>
         </p:nvCxnSpPr>
         <p:spPr>
-          <a:xfrm>
-            <a:off x="1200149" y="2476375"/>
-            <a:ext cx="2126656" cy="2"/>
+          <a:xfrm flipV="1">
+            <a:off x="1280838" y="2079061"/>
+            <a:ext cx="1511880" cy="10988"/>
           </a:xfrm>
           <a:prstGeom prst="straightConnector1">
             <a:avLst/>
@@ -4686,10 +4468,10 @@
       </p:cxnSp>
       <p:sp>
         <p:nvSpPr>
-          <p:cNvPr id="48" name="TextBox 47">
-            <a:extLst>
-              <a:ext uri="{FF2B5EF4-FFF2-40B4-BE49-F238E27FC236}">
-                <a16:creationId xmlns:a16="http://schemas.microsoft.com/office/drawing/2014/main" id="{23578EB3-280E-D846-9D34-AE13B6BD8EE8}"/>
+          <p:cNvPr id="155" name="TextBox 154">
+            <a:extLst>
+              <a:ext uri="{FF2B5EF4-FFF2-40B4-BE49-F238E27FC236}">
+                <a16:creationId xmlns:a16="http://schemas.microsoft.com/office/drawing/2014/main" id="{842871A1-0E89-9B43-8493-EDA30B4653AE}"/>
               </a:ext>
             </a:extLst>
           </p:cNvPr>
@@ -4698,8 +4480,8 @@
         </p:nvSpPr>
         <p:spPr>
           <a:xfrm>
-            <a:off x="1295401" y="2213525"/>
-            <a:ext cx="2514591" cy="215444"/>
+            <a:off x="1408312" y="1594802"/>
+            <a:ext cx="1575917" cy="338554"/>
           </a:xfrm>
           <a:prstGeom prst="rect">
             <a:avLst/>
@@ -4714,29 +4496,38 @@
           <a:p>
             <a:r>
               <a:rPr lang="en-US" sz="800" dirty="0"/>
-              <a:t>parseSubCommand(subInput, “timetable”)</a:t>
+              <a:t>parseSubCommand(</a:t>
+            </a:r>
+            <a:r>
+              <a:rPr lang="en-US" sz="800" dirty="0" err="1"/>
+              <a:t>subInput</a:t>
+            </a:r>
+            <a:r>
+              <a:rPr lang="en-US" sz="800" dirty="0"/>
+              <a:t> : String, commandWord : String)</a:t>
             </a:r>
           </a:p>
         </p:txBody>
       </p:sp>
       <p:cxnSp>
         <p:nvCxnSpPr>
-          <p:cNvPr id="47" name="Straight Connector 46">
-            <a:extLst>
-              <a:ext uri="{FF2B5EF4-FFF2-40B4-BE49-F238E27FC236}">
-                <a16:creationId xmlns:a16="http://schemas.microsoft.com/office/drawing/2014/main" id="{E272A0C2-0AA5-3D4C-8A36-FA991A735EFE}"/>
+          <p:cNvPr id="156" name="Straight Connector 155">
+            <a:extLst>
+              <a:ext uri="{FF2B5EF4-FFF2-40B4-BE49-F238E27FC236}">
+                <a16:creationId xmlns:a16="http://schemas.microsoft.com/office/drawing/2014/main" id="{9990EC0C-D330-AC45-BB08-C9B4A9F49768}"/>
               </a:ext>
             </a:extLst>
           </p:cNvPr>
           <p:cNvCxnSpPr>
             <a:cxnSpLocks/>
+            <a:stCxn id="158" idx="0"/>
           </p:cNvCxnSpPr>
           <p:nvPr/>
         </p:nvCxnSpPr>
         <p:spPr>
-          <a:xfrm>
-            <a:off x="3388311" y="2095413"/>
-            <a:ext cx="0" cy="3681899"/>
+          <a:xfrm flipH="1">
+            <a:off x="3334974" y="2230720"/>
+            <a:ext cx="7761" cy="4504066"/>
           </a:xfrm>
           <a:prstGeom prst="line">
             <a:avLst/>
@@ -4768,10 +4559,10 @@
       </p:cxnSp>
       <p:sp>
         <p:nvSpPr>
-          <p:cNvPr id="50" name="Rectangle 49">
-            <a:extLst>
-              <a:ext uri="{FF2B5EF4-FFF2-40B4-BE49-F238E27FC236}">
-                <a16:creationId xmlns:a16="http://schemas.microsoft.com/office/drawing/2014/main" id="{432D5EBF-7635-B44C-AC80-0FCA4C390815}"/>
+          <p:cNvPr id="158" name="Rectangle 157">
+            <a:extLst>
+              <a:ext uri="{FF2B5EF4-FFF2-40B4-BE49-F238E27FC236}">
+                <a16:creationId xmlns:a16="http://schemas.microsoft.com/office/drawing/2014/main" id="{76BFF369-43E6-D945-B7E0-0CEC7D07E661}"/>
               </a:ext>
             </a:extLst>
           </p:cNvPr>
@@ -4780,8 +4571,8 @@
         </p:nvSpPr>
         <p:spPr>
           <a:xfrm>
-            <a:off x="3326805" y="2476376"/>
-            <a:ext cx="114298" cy="2248009"/>
+            <a:off x="3285586" y="2230720"/>
+            <a:ext cx="114298" cy="233456"/>
           </a:xfrm>
           <a:prstGeom prst="rect">
             <a:avLst/>
@@ -4811,16 +4602,16 @@
           <a:lstStyle/>
           <a:p>
             <a:pPr algn="ctr"/>
-            <a:endParaRPr lang="en-US" dirty="0"/>
+            <a:endParaRPr lang="en-US"/>
           </a:p>
         </p:txBody>
       </p:sp>
       <p:cxnSp>
         <p:nvCxnSpPr>
-          <p:cNvPr id="54" name="Straight Arrow Connector 53">
-            <a:extLst>
-              <a:ext uri="{FF2B5EF4-FFF2-40B4-BE49-F238E27FC236}">
-                <a16:creationId xmlns:a16="http://schemas.microsoft.com/office/drawing/2014/main" id="{9495EBD0-A9B2-8F4B-A28A-69B0A1AFFD0D}"/>
+          <p:cNvPr id="159" name="Straight Arrow Connector 158">
+            <a:extLst>
+              <a:ext uri="{FF2B5EF4-FFF2-40B4-BE49-F238E27FC236}">
+                <a16:creationId xmlns:a16="http://schemas.microsoft.com/office/drawing/2014/main" id="{64115E5F-8B29-6549-A28D-B0F0C65DB48F}"/>
               </a:ext>
             </a:extLst>
           </p:cNvPr>
@@ -4831,8 +4622,8 @@
         </p:nvCxnSpPr>
         <p:spPr>
           <a:xfrm flipH="1">
-            <a:off x="1225266" y="4724393"/>
-            <a:ext cx="2101539" cy="0"/>
+            <a:off x="1267997" y="2462671"/>
+            <a:ext cx="2057663" cy="1505"/>
           </a:xfrm>
           <a:prstGeom prst="straightConnector1">
             <a:avLst/>
@@ -4864,10 +4655,10 @@
       </p:cxnSp>
       <p:cxnSp>
         <p:nvCxnSpPr>
-          <p:cNvPr id="55" name="Straight Connector 54">
-            <a:extLst>
-              <a:ext uri="{FF2B5EF4-FFF2-40B4-BE49-F238E27FC236}">
-                <a16:creationId xmlns:a16="http://schemas.microsoft.com/office/drawing/2014/main" id="{46B07D57-F809-FE47-BE1A-F3553BFA72F9}"/>
+          <p:cNvPr id="160" name="Straight Connector 159">
+            <a:extLst>
+              <a:ext uri="{FF2B5EF4-FFF2-40B4-BE49-F238E27FC236}">
+                <a16:creationId xmlns:a16="http://schemas.microsoft.com/office/drawing/2014/main" id="{7DD73967-D422-584F-9D48-5644658238B4}"/>
               </a:ext>
             </a:extLst>
           </p:cNvPr>
@@ -4878,7 +4669,7 @@
         </p:nvCxnSpPr>
         <p:spPr>
           <a:xfrm flipV="1">
-            <a:off x="1203648" y="4686297"/>
+            <a:off x="1270825" y="2424575"/>
             <a:ext cx="93742" cy="38096"/>
           </a:xfrm>
           <a:prstGeom prst="line">
@@ -4907,10 +4698,10 @@
       </p:cxnSp>
       <p:cxnSp>
         <p:nvCxnSpPr>
-          <p:cNvPr id="57" name="Straight Connector 56">
-            <a:extLst>
-              <a:ext uri="{FF2B5EF4-FFF2-40B4-BE49-F238E27FC236}">
-                <a16:creationId xmlns:a16="http://schemas.microsoft.com/office/drawing/2014/main" id="{51266CF5-3B2C-4548-800A-D1EC5C1D399D}"/>
+          <p:cNvPr id="161" name="Straight Connector 160">
+            <a:extLst>
+              <a:ext uri="{FF2B5EF4-FFF2-40B4-BE49-F238E27FC236}">
+                <a16:creationId xmlns:a16="http://schemas.microsoft.com/office/drawing/2014/main" id="{C662DA8C-488D-DD49-8BE9-7FDFF281FFFB}"/>
               </a:ext>
             </a:extLst>
           </p:cNvPr>
@@ -4921,7 +4712,7 @@
         </p:nvCxnSpPr>
         <p:spPr>
           <a:xfrm>
-            <a:off x="1205886" y="4724394"/>
+            <a:off x="1263865" y="2464177"/>
             <a:ext cx="93600" cy="39600"/>
           </a:xfrm>
           <a:prstGeom prst="line">
@@ -4950,10 +4741,10 @@
       </p:cxnSp>
       <p:sp>
         <p:nvSpPr>
-          <p:cNvPr id="66" name="Rectangle 65">
-            <a:extLst>
-              <a:ext uri="{FF2B5EF4-FFF2-40B4-BE49-F238E27FC236}">
-                <a16:creationId xmlns:a16="http://schemas.microsoft.com/office/drawing/2014/main" id="{76D174DB-0E83-0147-869A-B1841DF2DDC6}"/>
+          <p:cNvPr id="162" name="Rectangle 161">
+            <a:extLst>
+              <a:ext uri="{FF2B5EF4-FFF2-40B4-BE49-F238E27FC236}">
+                <a16:creationId xmlns:a16="http://schemas.microsoft.com/office/drawing/2014/main" id="{A9ECADE7-84E6-BC43-AD74-5D3B78AA0B4D}"/>
               </a:ext>
             </a:extLst>
           </p:cNvPr>
@@ -4962,7 +4753,7 @@
         </p:nvSpPr>
         <p:spPr>
           <a:xfrm>
-            <a:off x="4719584" y="1728742"/>
+            <a:off x="4695538" y="616658"/>
             <a:ext cx="1121967" cy="374120"/>
           </a:xfrm>
           <a:prstGeom prst="rect">
@@ -5020,22 +4811,23 @@
       </p:sp>
       <p:cxnSp>
         <p:nvCxnSpPr>
-          <p:cNvPr id="68" name="Straight Connector 67">
-            <a:extLst>
-              <a:ext uri="{FF2B5EF4-FFF2-40B4-BE49-F238E27FC236}">
-                <a16:creationId xmlns:a16="http://schemas.microsoft.com/office/drawing/2014/main" id="{24C89C59-3044-EF49-9A10-A94E538760AB}"/>
+          <p:cNvPr id="163" name="Straight Connector 162">
+            <a:extLst>
+              <a:ext uri="{FF2B5EF4-FFF2-40B4-BE49-F238E27FC236}">
+                <a16:creationId xmlns:a16="http://schemas.microsoft.com/office/drawing/2014/main" id="{20CCA115-ED3B-9949-A6F4-1BF80AE4D6B1}"/>
               </a:ext>
             </a:extLst>
           </p:cNvPr>
           <p:cNvCxnSpPr>
             <a:cxnSpLocks/>
+            <a:stCxn id="162" idx="2"/>
           </p:cNvCxnSpPr>
           <p:nvPr/>
         </p:nvCxnSpPr>
         <p:spPr>
           <a:xfrm>
-            <a:off x="5274836" y="2102862"/>
-            <a:ext cx="0" cy="3674450"/>
+            <a:off x="5256522" y="990778"/>
+            <a:ext cx="52399" cy="4648022"/>
           </a:xfrm>
           <a:prstGeom prst="line">
             <a:avLst/>
@@ -5067,10 +4859,10 @@
       </p:cxnSp>
       <p:sp>
         <p:nvSpPr>
-          <p:cNvPr id="69" name="Rectangle 68">
-            <a:extLst>
-              <a:ext uri="{FF2B5EF4-FFF2-40B4-BE49-F238E27FC236}">
-                <a16:creationId xmlns:a16="http://schemas.microsoft.com/office/drawing/2014/main" id="{52722C1B-64D1-364B-B9EE-CA832FA69E42}"/>
+          <p:cNvPr id="164" name="Rectangle 163">
+            <a:extLst>
+              <a:ext uri="{FF2B5EF4-FFF2-40B4-BE49-F238E27FC236}">
+                <a16:creationId xmlns:a16="http://schemas.microsoft.com/office/drawing/2014/main" id="{29523C36-FA47-9D41-8DB9-2BB25645521B}"/>
               </a:ext>
             </a:extLst>
           </p:cNvPr>
@@ -5079,8 +4871,8 @@
         </p:nvSpPr>
         <p:spPr>
           <a:xfrm>
-            <a:off x="5232459" y="2895600"/>
-            <a:ext cx="114298" cy="1524000"/>
+            <a:off x="5232459" y="3400613"/>
+            <a:ext cx="114298" cy="1722622"/>
           </a:xfrm>
           <a:prstGeom prst="rect">
             <a:avLst/>
@@ -5110,16 +4902,16 @@
           <a:lstStyle/>
           <a:p>
             <a:pPr algn="ctr"/>
-            <a:endParaRPr lang="en-US" dirty="0"/>
-          </a:p>
-        </p:txBody>
-      </p:sp>
-      <p:sp>
-        <p:nvSpPr>
-          <p:cNvPr id="70" name="Rectangle 69">
-            <a:extLst>
-              <a:ext uri="{FF2B5EF4-FFF2-40B4-BE49-F238E27FC236}">
-                <a16:creationId xmlns:a16="http://schemas.microsoft.com/office/drawing/2014/main" id="{B3AC6BEB-F679-8447-B67B-1D9774FBCB9E}"/>
+            <a:endParaRPr lang="en-US"/>
+          </a:p>
+        </p:txBody>
+      </p:sp>
+      <p:sp>
+        <p:nvSpPr>
+          <p:cNvPr id="165" name="Rectangle 164">
+            <a:extLst>
+              <a:ext uri="{FF2B5EF4-FFF2-40B4-BE49-F238E27FC236}">
+                <a16:creationId xmlns:a16="http://schemas.microsoft.com/office/drawing/2014/main" id="{643819BC-D1E4-7142-BA63-6D7997C632F5}"/>
               </a:ext>
             </a:extLst>
           </p:cNvPr>
@@ -5128,7 +4920,7 @@
         </p:nvSpPr>
         <p:spPr>
           <a:xfrm>
-            <a:off x="8074534" y="1730578"/>
+            <a:off x="8074534" y="645060"/>
             <a:ext cx="919732" cy="374120"/>
           </a:xfrm>
           <a:prstGeom prst="rect">
@@ -5186,10 +4978,10 @@
       </p:sp>
       <p:cxnSp>
         <p:nvCxnSpPr>
-          <p:cNvPr id="76" name="Straight Arrow Connector 75">
-            <a:extLst>
-              <a:ext uri="{FF2B5EF4-FFF2-40B4-BE49-F238E27FC236}">
-                <a16:creationId xmlns:a16="http://schemas.microsoft.com/office/drawing/2014/main" id="{3EEDF3C7-3C3C-6A4A-9D61-2384A29D77AA}"/>
+          <p:cNvPr id="166" name="Straight Arrow Connector 165">
+            <a:extLst>
+              <a:ext uri="{FF2B5EF4-FFF2-40B4-BE49-F238E27FC236}">
+                <a16:creationId xmlns:a16="http://schemas.microsoft.com/office/drawing/2014/main" id="{3082F966-32C7-5E4C-9ADD-1306C6F98A3E}"/>
               </a:ext>
             </a:extLst>
           </p:cNvPr>
@@ -5199,9 +4991,9 @@
           <p:nvPr/>
         </p:nvCxnSpPr>
         <p:spPr>
-          <a:xfrm>
-            <a:off x="3438865" y="2895600"/>
-            <a:ext cx="1793594" cy="0"/>
+          <a:xfrm flipV="1">
+            <a:off x="3400954" y="3400613"/>
+            <a:ext cx="1831505" cy="10827"/>
           </a:xfrm>
           <a:prstGeom prst="straightConnector1">
             <a:avLst/>
@@ -5233,10 +5025,10 @@
       </p:cxnSp>
       <p:sp>
         <p:nvSpPr>
-          <p:cNvPr id="79" name="TextBox 78">
-            <a:extLst>
-              <a:ext uri="{FF2B5EF4-FFF2-40B4-BE49-F238E27FC236}">
-                <a16:creationId xmlns:a16="http://schemas.microsoft.com/office/drawing/2014/main" id="{AB267F3E-B358-0546-84FF-4EAAAD33400A}"/>
+          <p:cNvPr id="167" name="TextBox 166">
+            <a:extLst>
+              <a:ext uri="{FF2B5EF4-FFF2-40B4-BE49-F238E27FC236}">
+                <a16:creationId xmlns:a16="http://schemas.microsoft.com/office/drawing/2014/main" id="{A4BF28F9-F9C5-F645-ACEF-30FBB081A985}"/>
               </a:ext>
             </a:extLst>
           </p:cNvPr>
@@ -5245,8 +5037,8 @@
         </p:nvSpPr>
         <p:spPr>
           <a:xfrm>
-            <a:off x="3992957" y="2690983"/>
-            <a:ext cx="1453253" cy="215444"/>
+            <a:off x="3919244" y="3055687"/>
+            <a:ext cx="1332134" cy="338554"/>
           </a:xfrm>
           <a:prstGeom prst="rect">
             <a:avLst/>
@@ -5261,17 +5053,17 @@
           <a:p>
             <a:r>
               <a:rPr lang="en-US" sz="800" dirty="0"/>
-              <a:t>inputLesson(Lesson Details)</a:t>
+              <a:t>inputLesson(lessonDetails : String[])</a:t>
             </a:r>
           </a:p>
         </p:txBody>
       </p:sp>
       <p:cxnSp>
         <p:nvCxnSpPr>
-          <p:cNvPr id="82" name="Straight Arrow Connector 81">
-            <a:extLst>
-              <a:ext uri="{FF2B5EF4-FFF2-40B4-BE49-F238E27FC236}">
-                <a16:creationId xmlns:a16="http://schemas.microsoft.com/office/drawing/2014/main" id="{10539CDB-DCB7-F242-8293-79C260A0BA19}"/>
+          <p:cNvPr id="168" name="Straight Arrow Connector 167">
+            <a:extLst>
+              <a:ext uri="{FF2B5EF4-FFF2-40B4-BE49-F238E27FC236}">
+                <a16:creationId xmlns:a16="http://schemas.microsoft.com/office/drawing/2014/main" id="{809B84CA-E1F5-0A48-B56E-E4F5A1EB9853}"/>
               </a:ext>
             </a:extLst>
           </p:cNvPr>
@@ -5281,9 +5073,9 @@
           <p:nvPr/>
         </p:nvCxnSpPr>
         <p:spPr>
-          <a:xfrm flipH="1">
-            <a:off x="3441103" y="4419600"/>
-            <a:ext cx="1786353" cy="0"/>
+          <a:xfrm flipH="1" flipV="1">
+            <a:off x="3493647" y="5118633"/>
+            <a:ext cx="1821640" cy="7"/>
           </a:xfrm>
           <a:prstGeom prst="straightConnector1">
             <a:avLst/>
@@ -5315,10 +5107,10 @@
       </p:cxnSp>
       <p:cxnSp>
         <p:nvCxnSpPr>
-          <p:cNvPr id="83" name="Straight Connector 82">
-            <a:extLst>
-              <a:ext uri="{FF2B5EF4-FFF2-40B4-BE49-F238E27FC236}">
-                <a16:creationId xmlns:a16="http://schemas.microsoft.com/office/drawing/2014/main" id="{E412B2CE-BDA0-2D41-A564-FBCF1F18876A}"/>
+          <p:cNvPr id="169" name="Straight Connector 168">
+            <a:extLst>
+              <a:ext uri="{FF2B5EF4-FFF2-40B4-BE49-F238E27FC236}">
+                <a16:creationId xmlns:a16="http://schemas.microsoft.com/office/drawing/2014/main" id="{2DE54979-B1D0-9844-A9FF-5FD1E702CBF1}"/>
               </a:ext>
             </a:extLst>
           </p:cNvPr>
@@ -5329,7 +5121,7 @@
         </p:nvCxnSpPr>
         <p:spPr>
           <a:xfrm flipV="1">
-            <a:off x="3438865" y="4381504"/>
+            <a:off x="3474453" y="5080537"/>
             <a:ext cx="93742" cy="38096"/>
           </a:xfrm>
           <a:prstGeom prst="line">
@@ -5358,10 +5150,10 @@
       </p:cxnSp>
       <p:cxnSp>
         <p:nvCxnSpPr>
-          <p:cNvPr id="84" name="Straight Connector 83">
-            <a:extLst>
-              <a:ext uri="{FF2B5EF4-FFF2-40B4-BE49-F238E27FC236}">
-                <a16:creationId xmlns:a16="http://schemas.microsoft.com/office/drawing/2014/main" id="{ECDBB37E-99E1-FA45-9AA0-4120B2CB0636}"/>
+          <p:cNvPr id="170" name="Straight Connector 169">
+            <a:extLst>
+              <a:ext uri="{FF2B5EF4-FFF2-40B4-BE49-F238E27FC236}">
+                <a16:creationId xmlns:a16="http://schemas.microsoft.com/office/drawing/2014/main" id="{6BA62D8D-DE09-7945-9CB6-2E2D5F372DF2}"/>
               </a:ext>
             </a:extLst>
           </p:cNvPr>
@@ -5372,7 +5164,7 @@
         </p:nvCxnSpPr>
         <p:spPr>
           <a:xfrm>
-            <a:off x="3441103" y="4419601"/>
+            <a:off x="3476691" y="5118634"/>
             <a:ext cx="93600" cy="39600"/>
           </a:xfrm>
           <a:prstGeom prst="line">
@@ -5401,10 +5193,10 @@
       </p:cxnSp>
       <p:sp>
         <p:nvSpPr>
-          <p:cNvPr id="98" name="Rectangle 97">
-            <a:extLst>
-              <a:ext uri="{FF2B5EF4-FFF2-40B4-BE49-F238E27FC236}">
-                <a16:creationId xmlns:a16="http://schemas.microsoft.com/office/drawing/2014/main" id="{FE873D9D-1E06-3C4F-823B-E32E33EE5B83}"/>
+          <p:cNvPr id="171" name="Rectangle 170">
+            <a:extLst>
+              <a:ext uri="{FF2B5EF4-FFF2-40B4-BE49-F238E27FC236}">
+                <a16:creationId xmlns:a16="http://schemas.microsoft.com/office/drawing/2014/main" id="{4501B3E8-1B40-DC43-A955-FBDD94C1D9ED}"/>
               </a:ext>
             </a:extLst>
           </p:cNvPr>
@@ -5413,7 +5205,7 @@
         </p:nvSpPr>
         <p:spPr>
           <a:xfrm>
-            <a:off x="6772110" y="3125040"/>
+            <a:off x="6760780" y="3353908"/>
             <a:ext cx="1121967" cy="374120"/>
           </a:xfrm>
           <a:prstGeom prst="rect">
@@ -5464,23 +5256,23 @@
       </p:sp>
       <p:cxnSp>
         <p:nvCxnSpPr>
-          <p:cNvPr id="103" name="Straight Connector 102">
-            <a:extLst>
-              <a:ext uri="{FF2B5EF4-FFF2-40B4-BE49-F238E27FC236}">
-                <a16:creationId xmlns:a16="http://schemas.microsoft.com/office/drawing/2014/main" id="{B6BF0837-72BE-F64B-8DFD-D0313A5A9ECA}"/>
+          <p:cNvPr id="172" name="Straight Connector 171">
+            <a:extLst>
+              <a:ext uri="{FF2B5EF4-FFF2-40B4-BE49-F238E27FC236}">
+                <a16:creationId xmlns:a16="http://schemas.microsoft.com/office/drawing/2014/main" id="{1AB886B5-8767-544F-B4EB-4005B7AAE1F7}"/>
               </a:ext>
             </a:extLst>
           </p:cNvPr>
           <p:cNvCxnSpPr>
             <a:cxnSpLocks/>
-            <a:stCxn id="102" idx="0"/>
+            <a:stCxn id="175" idx="0"/>
           </p:cNvCxnSpPr>
           <p:nvPr/>
         </p:nvCxnSpPr>
         <p:spPr>
           <a:xfrm>
-            <a:off x="7295656" y="3499160"/>
-            <a:ext cx="19260" cy="2278152"/>
+            <a:off x="7292917" y="3719295"/>
+            <a:ext cx="0" cy="485379"/>
           </a:xfrm>
           <a:prstGeom prst="line">
             <a:avLst/>
@@ -5512,10 +5304,10 @@
       </p:cxnSp>
       <p:cxnSp>
         <p:nvCxnSpPr>
-          <p:cNvPr id="99" name="Straight Arrow Connector 98">
-            <a:extLst>
-              <a:ext uri="{FF2B5EF4-FFF2-40B4-BE49-F238E27FC236}">
-                <a16:creationId xmlns:a16="http://schemas.microsoft.com/office/drawing/2014/main" id="{C4EC64CE-0EE4-4941-AB2F-1D7EC3AB49DE}"/>
+          <p:cNvPr id="173" name="Straight Arrow Connector 172">
+            <a:extLst>
+              <a:ext uri="{FF2B5EF4-FFF2-40B4-BE49-F238E27FC236}">
+                <a16:creationId xmlns:a16="http://schemas.microsoft.com/office/drawing/2014/main" id="{ED359B54-9372-1146-A643-A9CFB0041F33}"/>
               </a:ext>
             </a:extLst>
           </p:cNvPr>
@@ -5525,9 +5317,9 @@
           <p:nvPr/>
         </p:nvCxnSpPr>
         <p:spPr>
-          <a:xfrm flipV="1">
-            <a:off x="5368968" y="3368277"/>
-            <a:ext cx="1403142" cy="208"/>
+          <a:xfrm>
+            <a:off x="5341874" y="3566361"/>
+            <a:ext cx="1430236" cy="0"/>
           </a:xfrm>
           <a:prstGeom prst="straightConnector1">
             <a:avLst/>
@@ -5559,10 +5351,10 @@
       </p:cxnSp>
       <p:sp>
         <p:nvSpPr>
-          <p:cNvPr id="101" name="TextBox 100">
-            <a:extLst>
-              <a:ext uri="{FF2B5EF4-FFF2-40B4-BE49-F238E27FC236}">
-                <a16:creationId xmlns:a16="http://schemas.microsoft.com/office/drawing/2014/main" id="{DD67DB58-55EE-2542-B93A-57F0EEDD45E7}"/>
+          <p:cNvPr id="174" name="TextBox 173">
+            <a:extLst>
+              <a:ext uri="{FF2B5EF4-FFF2-40B4-BE49-F238E27FC236}">
+                <a16:creationId xmlns:a16="http://schemas.microsoft.com/office/drawing/2014/main" id="{1F95F0E4-CB56-0E40-8D1B-DAEFF3EAD8C4}"/>
               </a:ext>
             </a:extLst>
           </p:cNvPr>
@@ -5571,7 +5363,7 @@
         </p:nvSpPr>
         <p:spPr>
           <a:xfrm>
-            <a:off x="5555413" y="2872640"/>
+            <a:off x="5591681" y="4201464"/>
             <a:ext cx="992650" cy="215444"/>
           </a:xfrm>
           <a:prstGeom prst="rect">
@@ -5594,10 +5386,10 @@
       </p:sp>
       <p:sp>
         <p:nvSpPr>
-          <p:cNvPr id="102" name="Rectangle 101">
-            <a:extLst>
-              <a:ext uri="{FF2B5EF4-FFF2-40B4-BE49-F238E27FC236}">
-                <a16:creationId xmlns:a16="http://schemas.microsoft.com/office/drawing/2014/main" id="{7D66F112-BC28-764A-8343-B2FA41A2A1FB}"/>
+          <p:cNvPr id="175" name="Rectangle 174">
+            <a:extLst>
+              <a:ext uri="{FF2B5EF4-FFF2-40B4-BE49-F238E27FC236}">
+                <a16:creationId xmlns:a16="http://schemas.microsoft.com/office/drawing/2014/main" id="{96FFC4D1-5508-D24D-A0F2-C1D6AB11DA10}"/>
               </a:ext>
             </a:extLst>
           </p:cNvPr>
@@ -5606,8 +5398,8 @@
         </p:nvSpPr>
         <p:spPr>
           <a:xfrm>
-            <a:off x="7238507" y="3499160"/>
-            <a:ext cx="114298" cy="625322"/>
+            <a:off x="7235768" y="3719295"/>
+            <a:ext cx="114298" cy="374117"/>
           </a:xfrm>
           <a:prstGeom prst="rect">
             <a:avLst/>
@@ -5637,29 +5429,29 @@
           <a:lstStyle/>
           <a:p>
             <a:pPr algn="ctr"/>
-            <a:endParaRPr lang="en-US" dirty="0"/>
+            <a:endParaRPr lang="en-US"/>
           </a:p>
         </p:txBody>
       </p:sp>
       <p:cxnSp>
         <p:nvCxnSpPr>
-          <p:cNvPr id="125" name="Straight Arrow Connector 124">
-            <a:extLst>
-              <a:ext uri="{FF2B5EF4-FFF2-40B4-BE49-F238E27FC236}">
-                <a16:creationId xmlns:a16="http://schemas.microsoft.com/office/drawing/2014/main" id="{C5C1D507-E194-6447-8615-7C93E536F484}"/>
+          <p:cNvPr id="176" name="Straight Arrow Connector 175">
+            <a:extLst>
+              <a:ext uri="{FF2B5EF4-FFF2-40B4-BE49-F238E27FC236}">
+                <a16:creationId xmlns:a16="http://schemas.microsoft.com/office/drawing/2014/main" id="{95258165-4E5C-294D-A62A-C53B0D50D003}"/>
               </a:ext>
             </a:extLst>
           </p:cNvPr>
           <p:cNvCxnSpPr>
             <a:cxnSpLocks/>
-            <a:stCxn id="102" idx="2"/>
+            <a:stCxn id="175" idx="2"/>
           </p:cNvCxnSpPr>
           <p:nvPr/>
         </p:nvCxnSpPr>
         <p:spPr>
           <a:xfrm flipH="1">
-            <a:off x="5368970" y="4124482"/>
-            <a:ext cx="1926686" cy="13783"/>
+            <a:off x="5361102" y="4093412"/>
+            <a:ext cx="1931815" cy="0"/>
           </a:xfrm>
           <a:prstGeom prst="straightConnector1">
             <a:avLst/>
@@ -5691,10 +5483,10 @@
       </p:cxnSp>
       <p:cxnSp>
         <p:nvCxnSpPr>
-          <p:cNvPr id="126" name="Straight Connector 125">
-            <a:extLst>
-              <a:ext uri="{FF2B5EF4-FFF2-40B4-BE49-F238E27FC236}">
-                <a16:creationId xmlns:a16="http://schemas.microsoft.com/office/drawing/2014/main" id="{F452E062-701C-0E47-8BAE-670C93FFFEE4}"/>
+          <p:cNvPr id="177" name="Straight Connector 176">
+            <a:extLst>
+              <a:ext uri="{FF2B5EF4-FFF2-40B4-BE49-F238E27FC236}">
+                <a16:creationId xmlns:a16="http://schemas.microsoft.com/office/drawing/2014/main" id="{C3A29331-A57C-9F47-989B-D5A6F17CCE24}"/>
               </a:ext>
             </a:extLst>
           </p:cNvPr>
@@ -5705,8 +5497,8 @@
         </p:nvCxnSpPr>
         <p:spPr>
           <a:xfrm flipV="1">
-            <a:off x="5359804" y="4101416"/>
-            <a:ext cx="93742" cy="38096"/>
+            <a:off x="5356873" y="4058642"/>
+            <a:ext cx="76377" cy="27948"/>
           </a:xfrm>
           <a:prstGeom prst="line">
             <a:avLst/>
@@ -5734,10 +5526,10 @@
       </p:cxnSp>
       <p:cxnSp>
         <p:nvCxnSpPr>
-          <p:cNvPr id="127" name="Straight Connector 126">
-            <a:extLst>
-              <a:ext uri="{FF2B5EF4-FFF2-40B4-BE49-F238E27FC236}">
-                <a16:creationId xmlns:a16="http://schemas.microsoft.com/office/drawing/2014/main" id="{638F40BF-AAD1-7244-8940-B82C07835CD9}"/>
+          <p:cNvPr id="178" name="Straight Connector 177">
+            <a:extLst>
+              <a:ext uri="{FF2B5EF4-FFF2-40B4-BE49-F238E27FC236}">
+                <a16:creationId xmlns:a16="http://schemas.microsoft.com/office/drawing/2014/main" id="{7F24C928-D158-BE49-8308-76C113E8E4BF}"/>
               </a:ext>
             </a:extLst>
           </p:cNvPr>
@@ -5748,7 +5540,7 @@
         </p:nvCxnSpPr>
         <p:spPr>
           <a:xfrm>
-            <a:off x="5362042" y="4139513"/>
+            <a:off x="5349044" y="4096988"/>
             <a:ext cx="93600" cy="39600"/>
           </a:xfrm>
           <a:prstGeom prst="line">
@@ -5777,10 +5569,10 @@
       </p:cxnSp>
       <p:cxnSp>
         <p:nvCxnSpPr>
-          <p:cNvPr id="133" name="Straight Connector 132">
-            <a:extLst>
-              <a:ext uri="{FF2B5EF4-FFF2-40B4-BE49-F238E27FC236}">
-                <a16:creationId xmlns:a16="http://schemas.microsoft.com/office/drawing/2014/main" id="{67BA9C80-22C7-AF4A-9B1A-675CD75CFC40}"/>
+          <p:cNvPr id="179" name="Straight Connector 178">
+            <a:extLst>
+              <a:ext uri="{FF2B5EF4-FFF2-40B4-BE49-F238E27FC236}">
+                <a16:creationId xmlns:a16="http://schemas.microsoft.com/office/drawing/2014/main" id="{EE1EE312-9204-A240-B59E-F3BDA8591FDB}"/>
               </a:ext>
             </a:extLst>
           </p:cNvPr>
@@ -5791,8 +5583,8 @@
         </p:nvCxnSpPr>
         <p:spPr>
           <a:xfrm>
-            <a:off x="8534400" y="2119760"/>
-            <a:ext cx="0" cy="3657552"/>
+            <a:off x="8556103" y="1040486"/>
+            <a:ext cx="0" cy="4293514"/>
           </a:xfrm>
           <a:prstGeom prst="line">
             <a:avLst/>
@@ -5824,10 +5616,10 @@
       </p:cxnSp>
       <p:cxnSp>
         <p:nvCxnSpPr>
-          <p:cNvPr id="135" name="Straight Arrow Connector 134">
-            <a:extLst>
-              <a:ext uri="{FF2B5EF4-FFF2-40B4-BE49-F238E27FC236}">
-                <a16:creationId xmlns:a16="http://schemas.microsoft.com/office/drawing/2014/main" id="{94FC1C4B-DAF9-7147-9D15-74AD2C16DF59}"/>
+          <p:cNvPr id="180" name="Straight Arrow Connector 179">
+            <a:extLst>
+              <a:ext uri="{FF2B5EF4-FFF2-40B4-BE49-F238E27FC236}">
+                <a16:creationId xmlns:a16="http://schemas.microsoft.com/office/drawing/2014/main" id="{34C90F96-F359-4448-844B-D88E6A6992C6}"/>
               </a:ext>
             </a:extLst>
           </p:cNvPr>
@@ -5838,8 +5630,8 @@
         </p:nvCxnSpPr>
         <p:spPr>
           <a:xfrm>
-            <a:off x="7352805" y="3600380"/>
-            <a:ext cx="1129802" cy="0"/>
+            <a:off x="5343743" y="4739029"/>
+            <a:ext cx="3157532" cy="0"/>
           </a:xfrm>
           <a:prstGeom prst="straightConnector1">
             <a:avLst/>
@@ -5871,22 +5663,23 @@
       </p:cxnSp>
       <p:cxnSp>
         <p:nvCxnSpPr>
-          <p:cNvPr id="136" name="Straight Arrow Connector 135">
-            <a:extLst>
-              <a:ext uri="{FF2B5EF4-FFF2-40B4-BE49-F238E27FC236}">
-                <a16:creationId xmlns:a16="http://schemas.microsoft.com/office/drawing/2014/main" id="{6FEB09FD-AA65-1446-92AC-7FFEED096FA6}"/>
+          <p:cNvPr id="181" name="Straight Arrow Connector 180">
+            <a:extLst>
+              <a:ext uri="{FF2B5EF4-FFF2-40B4-BE49-F238E27FC236}">
+                <a16:creationId xmlns:a16="http://schemas.microsoft.com/office/drawing/2014/main" id="{A280A67B-D028-5E49-B860-05FD05A2D01C}"/>
               </a:ext>
             </a:extLst>
           </p:cNvPr>
           <p:cNvCxnSpPr>
             <a:cxnSpLocks/>
+            <a:stCxn id="184" idx="2"/>
           </p:cNvCxnSpPr>
           <p:nvPr/>
         </p:nvCxnSpPr>
         <p:spPr>
           <a:xfrm flipH="1">
-            <a:off x="7358400" y="4063780"/>
-            <a:ext cx="1108769" cy="0"/>
+            <a:off x="5361102" y="4962038"/>
+            <a:ext cx="3195001" cy="0"/>
           </a:xfrm>
           <a:prstGeom prst="straightConnector1">
             <a:avLst/>
@@ -5918,10 +5711,10 @@
       </p:cxnSp>
       <p:cxnSp>
         <p:nvCxnSpPr>
-          <p:cNvPr id="137" name="Straight Connector 136">
-            <a:extLst>
-              <a:ext uri="{FF2B5EF4-FFF2-40B4-BE49-F238E27FC236}">
-                <a16:creationId xmlns:a16="http://schemas.microsoft.com/office/drawing/2014/main" id="{22CC3FAB-7DFE-9F4D-9127-85AE74940705}"/>
+          <p:cNvPr id="182" name="Straight Connector 181">
+            <a:extLst>
+              <a:ext uri="{FF2B5EF4-FFF2-40B4-BE49-F238E27FC236}">
+                <a16:creationId xmlns:a16="http://schemas.microsoft.com/office/drawing/2014/main" id="{45D1D77F-6160-0646-B715-591B5390DE4A}"/>
               </a:ext>
             </a:extLst>
           </p:cNvPr>
@@ -5932,7 +5725,7 @@
         </p:nvCxnSpPr>
         <p:spPr>
           <a:xfrm flipV="1">
-            <a:off x="7358398" y="4018520"/>
+            <a:off x="5352468" y="4925226"/>
             <a:ext cx="93742" cy="38096"/>
           </a:xfrm>
           <a:prstGeom prst="line">
@@ -5961,10 +5754,10 @@
       </p:cxnSp>
       <p:cxnSp>
         <p:nvCxnSpPr>
-          <p:cNvPr id="138" name="Straight Connector 137">
-            <a:extLst>
-              <a:ext uri="{FF2B5EF4-FFF2-40B4-BE49-F238E27FC236}">
-                <a16:creationId xmlns:a16="http://schemas.microsoft.com/office/drawing/2014/main" id="{DBFB772D-E317-6148-BEAD-AFAE5B8ADFEB}"/>
+          <p:cNvPr id="183" name="Straight Connector 182">
+            <a:extLst>
+              <a:ext uri="{FF2B5EF4-FFF2-40B4-BE49-F238E27FC236}">
+                <a16:creationId xmlns:a16="http://schemas.microsoft.com/office/drawing/2014/main" id="{55150F64-70BC-1A43-B876-F56D7015AEF9}"/>
               </a:ext>
             </a:extLst>
           </p:cNvPr>
@@ -5975,7 +5768,7 @@
         </p:nvCxnSpPr>
         <p:spPr>
           <a:xfrm>
-            <a:off x="7360636" y="4056617"/>
+            <a:off x="5354706" y="4963323"/>
             <a:ext cx="93600" cy="39600"/>
           </a:xfrm>
           <a:prstGeom prst="line">
@@ -6004,10 +5797,10 @@
       </p:cxnSp>
       <p:sp>
         <p:nvSpPr>
-          <p:cNvPr id="139" name="Rectangle 138">
-            <a:extLst>
-              <a:ext uri="{FF2B5EF4-FFF2-40B4-BE49-F238E27FC236}">
-                <a16:creationId xmlns:a16="http://schemas.microsoft.com/office/drawing/2014/main" id="{641F27B1-93EB-A24B-AD2A-447887C05397}"/>
+          <p:cNvPr id="184" name="Rectangle 183">
+            <a:extLst>
+              <a:ext uri="{FF2B5EF4-FFF2-40B4-BE49-F238E27FC236}">
+                <a16:creationId xmlns:a16="http://schemas.microsoft.com/office/drawing/2014/main" id="{68078BD7-A728-4447-B48F-139A95D9A010}"/>
               </a:ext>
             </a:extLst>
           </p:cNvPr>
@@ -6016,8 +5809,8 @@
         </p:nvSpPr>
         <p:spPr>
           <a:xfrm>
-            <a:off x="8472508" y="3590867"/>
-            <a:ext cx="114298" cy="472913"/>
+            <a:off x="8498954" y="4736916"/>
+            <a:ext cx="114298" cy="225122"/>
           </a:xfrm>
           <a:prstGeom prst="rect">
             <a:avLst/>
@@ -6047,16 +5840,16 @@
           <a:lstStyle/>
           <a:p>
             <a:pPr algn="ctr"/>
-            <a:endParaRPr lang="en-US" dirty="0"/>
-          </a:p>
-        </p:txBody>
-      </p:sp>
-      <p:sp>
-        <p:nvSpPr>
-          <p:cNvPr id="151" name="TextBox 150">
-            <a:extLst>
-              <a:ext uri="{FF2B5EF4-FFF2-40B4-BE49-F238E27FC236}">
-                <a16:creationId xmlns:a16="http://schemas.microsoft.com/office/drawing/2014/main" id="{4F7236D7-BA99-EF42-A7B3-4C3E42E15011}"/>
+            <a:endParaRPr lang="en-US"/>
+          </a:p>
+        </p:txBody>
+      </p:sp>
+      <p:sp>
+        <p:nvSpPr>
+          <p:cNvPr id="185" name="TextBox 184">
+            <a:extLst>
+              <a:ext uri="{FF2B5EF4-FFF2-40B4-BE49-F238E27FC236}">
+                <a16:creationId xmlns:a16="http://schemas.microsoft.com/office/drawing/2014/main" id="{CD08500C-17BB-934F-8CC0-68E0E6EDEA97}"/>
               </a:ext>
             </a:extLst>
           </p:cNvPr>
@@ -6065,7 +5858,7 @@
         </p:nvSpPr>
         <p:spPr>
           <a:xfrm>
-            <a:off x="7814411" y="3373512"/>
+            <a:off x="7084614" y="4555733"/>
             <a:ext cx="747086" cy="215444"/>
           </a:xfrm>
           <a:prstGeom prst="rect">
@@ -6088,10 +5881,10 @@
       </p:sp>
       <p:sp>
         <p:nvSpPr>
-          <p:cNvPr id="157" name="TextBox 156">
-            <a:extLst>
-              <a:ext uri="{FF2B5EF4-FFF2-40B4-BE49-F238E27FC236}">
-                <a16:creationId xmlns:a16="http://schemas.microsoft.com/office/drawing/2014/main" id="{0AA4F582-D7A1-EE4F-8BEE-60AE7E1AFC30}"/>
+          <p:cNvPr id="186" name="TextBox 185">
+            <a:extLst>
+              <a:ext uri="{FF2B5EF4-FFF2-40B4-BE49-F238E27FC236}">
+                <a16:creationId xmlns:a16="http://schemas.microsoft.com/office/drawing/2014/main" id="{400429F5-BEB6-7348-A7CF-09D90D9CA1B8}"/>
               </a:ext>
             </a:extLst>
           </p:cNvPr>
@@ -6100,7 +5893,7 @@
         </p:nvSpPr>
         <p:spPr>
           <a:xfrm>
-            <a:off x="3676308" y="411966"/>
+            <a:off x="3764821" y="189493"/>
             <a:ext cx="1530355" cy="369332"/>
           </a:xfrm>
           <a:prstGeom prst="rect">
@@ -6123,10 +5916,10 @@
       </p:sp>
       <p:sp>
         <p:nvSpPr>
-          <p:cNvPr id="51" name="Rectangle 50">
-            <a:extLst>
-              <a:ext uri="{FF2B5EF4-FFF2-40B4-BE49-F238E27FC236}">
-                <a16:creationId xmlns:a16="http://schemas.microsoft.com/office/drawing/2014/main" id="{81B1B538-744C-9344-905D-C7654BA4560D}"/>
+          <p:cNvPr id="187" name="Rectangle 186">
+            <a:extLst>
+              <a:ext uri="{FF2B5EF4-FFF2-40B4-BE49-F238E27FC236}">
+                <a16:creationId xmlns:a16="http://schemas.microsoft.com/office/drawing/2014/main" id="{FFDAE97A-8693-7744-8C47-B561C949EA2F}"/>
               </a:ext>
             </a:extLst>
           </p:cNvPr>
@@ -6135,7 +5928,7 @@
         </p:nvSpPr>
         <p:spPr>
           <a:xfrm>
-            <a:off x="5299690" y="3085805"/>
+            <a:off x="5315286" y="4343995"/>
             <a:ext cx="114298" cy="106450"/>
           </a:xfrm>
           <a:prstGeom prst="rect">
@@ -6166,16 +5959,16 @@
           <a:lstStyle/>
           <a:p>
             <a:pPr algn="ctr"/>
-            <a:endParaRPr lang="en-US" dirty="0"/>
+            <a:endParaRPr lang="en-US"/>
           </a:p>
         </p:txBody>
       </p:sp>
       <p:cxnSp>
         <p:nvCxnSpPr>
-          <p:cNvPr id="17" name="Curved Connector 16">
-            <a:extLst>
-              <a:ext uri="{FF2B5EF4-FFF2-40B4-BE49-F238E27FC236}">
-                <a16:creationId xmlns:a16="http://schemas.microsoft.com/office/drawing/2014/main" id="{7A0E6004-29F4-E041-AD62-68F3E9DEEBA4}"/>
+          <p:cNvPr id="188" name="Curved Connector 187">
+            <a:extLst>
+              <a:ext uri="{FF2B5EF4-FFF2-40B4-BE49-F238E27FC236}">
+                <a16:creationId xmlns:a16="http://schemas.microsoft.com/office/drawing/2014/main" id="{0D1094BF-09FA-6240-A922-C428AE964E8A}"/>
               </a:ext>
             </a:extLst>
           </p:cNvPr>
@@ -6186,7 +5979,7 @@
         </p:nvCxnSpPr>
         <p:spPr>
           <a:xfrm rot="16200000" flipH="1">
-            <a:off x="5289762" y="2996007"/>
+            <a:off x="5305358" y="4254197"/>
             <a:ext cx="162613" cy="57149"/>
           </a:xfrm>
           <a:prstGeom prst="curvedConnector4">
@@ -6222,10 +6015,10 @@
       </p:cxnSp>
       <p:cxnSp>
         <p:nvCxnSpPr>
-          <p:cNvPr id="95" name="Elbow Connector 94">
-            <a:extLst>
-              <a:ext uri="{FF2B5EF4-FFF2-40B4-BE49-F238E27FC236}">
-                <a16:creationId xmlns:a16="http://schemas.microsoft.com/office/drawing/2014/main" id="{32BE6738-A16F-7E48-9972-9547383140CD}"/>
+          <p:cNvPr id="189" name="Elbow Connector 188">
+            <a:extLst>
+              <a:ext uri="{FF2B5EF4-FFF2-40B4-BE49-F238E27FC236}">
+                <a16:creationId xmlns:a16="http://schemas.microsoft.com/office/drawing/2014/main" id="{6B239C60-300A-4C4D-A387-31021816A7B9}"/>
               </a:ext>
             </a:extLst>
           </p:cNvPr>
@@ -6236,7 +6029,7 @@
         </p:nvCxnSpPr>
         <p:spPr>
           <a:xfrm flipH="1">
-            <a:off x="5361488" y="3189330"/>
+            <a:off x="5377084" y="4447520"/>
             <a:ext cx="62228" cy="167124"/>
           </a:xfrm>
           <a:prstGeom prst="bentConnector4">
@@ -6272,10 +6065,10 @@
       </p:cxnSp>
       <p:cxnSp>
         <p:nvCxnSpPr>
-          <p:cNvPr id="120" name="Straight Connector 119">
-            <a:extLst>
-              <a:ext uri="{FF2B5EF4-FFF2-40B4-BE49-F238E27FC236}">
-                <a16:creationId xmlns:a16="http://schemas.microsoft.com/office/drawing/2014/main" id="{2710091E-4F5A-4D45-9A38-8D752CC98518}"/>
+          <p:cNvPr id="190" name="Straight Connector 189">
+            <a:extLst>
+              <a:ext uri="{FF2B5EF4-FFF2-40B4-BE49-F238E27FC236}">
+                <a16:creationId xmlns:a16="http://schemas.microsoft.com/office/drawing/2014/main" id="{05A4D7C0-BFE9-8041-9B5A-85369D65F70D}"/>
               </a:ext>
             </a:extLst>
           </p:cNvPr>
@@ -6286,7 +6079,7 @@
         </p:nvCxnSpPr>
         <p:spPr>
           <a:xfrm flipV="1">
-            <a:off x="5338749" y="3264333"/>
+            <a:off x="5354345" y="4522523"/>
             <a:ext cx="93742" cy="38096"/>
           </a:xfrm>
           <a:prstGeom prst="line">
@@ -6315,10 +6108,10 @@
       </p:cxnSp>
       <p:cxnSp>
         <p:nvCxnSpPr>
-          <p:cNvPr id="121" name="Straight Connector 120">
-            <a:extLst>
-              <a:ext uri="{FF2B5EF4-FFF2-40B4-BE49-F238E27FC236}">
-                <a16:creationId xmlns:a16="http://schemas.microsoft.com/office/drawing/2014/main" id="{93B062F3-D947-2745-9C86-EB1D2828E3E5}"/>
+          <p:cNvPr id="191" name="Straight Connector 190">
+            <a:extLst>
+              <a:ext uri="{FF2B5EF4-FFF2-40B4-BE49-F238E27FC236}">
+                <a16:creationId xmlns:a16="http://schemas.microsoft.com/office/drawing/2014/main" id="{69C22157-7084-5A43-9F57-3ECA2D786C18}"/>
               </a:ext>
             </a:extLst>
           </p:cNvPr>
@@ -6329,7 +6122,7 @@
         </p:nvCxnSpPr>
         <p:spPr>
           <a:xfrm>
-            <a:off x="5340987" y="3302430"/>
+            <a:off x="5356583" y="4560620"/>
             <a:ext cx="93600" cy="39600"/>
           </a:xfrm>
           <a:prstGeom prst="line">
@@ -6358,10 +6151,10 @@
       </p:cxnSp>
       <p:sp>
         <p:nvSpPr>
-          <p:cNvPr id="109" name="TextBox 108">
-            <a:extLst>
-              <a:ext uri="{FF2B5EF4-FFF2-40B4-BE49-F238E27FC236}">
-                <a16:creationId xmlns:a16="http://schemas.microsoft.com/office/drawing/2014/main" id="{9276B4C0-2EBD-314E-B34A-F6E33FE3F7E4}"/>
+          <p:cNvPr id="192" name="TextBox 191">
+            <a:extLst>
+              <a:ext uri="{FF2B5EF4-FFF2-40B4-BE49-F238E27FC236}">
+                <a16:creationId xmlns:a16="http://schemas.microsoft.com/office/drawing/2014/main" id="{5EB83254-EA39-C543-95B9-D0FCE53ADA18}"/>
               </a:ext>
             </a:extLst>
           </p:cNvPr>
@@ -6370,8 +6163,8 @@
         </p:nvSpPr>
         <p:spPr>
           <a:xfrm>
-            <a:off x="5490947" y="3154473"/>
-            <a:ext cx="1397052" cy="215444"/>
+            <a:off x="5308921" y="3274116"/>
+            <a:ext cx="1397052" cy="338554"/>
           </a:xfrm>
           <a:prstGeom prst="rect">
             <a:avLst/>
@@ -6386,7 +6179,1162 @@
           <a:p>
             <a:r>
               <a:rPr lang="en-US" sz="800" dirty="0"/>
-              <a:t>new Lesson(Lesson Details)</a:t>
+              <a:t>new Lesson(lessonDetails : String[])</a:t>
+            </a:r>
+          </a:p>
+        </p:txBody>
+      </p:sp>
+      <p:sp>
+        <p:nvSpPr>
+          <p:cNvPr id="193" name="Rectangle 192">
+            <a:extLst>
+              <a:ext uri="{FF2B5EF4-FFF2-40B4-BE49-F238E27FC236}">
+                <a16:creationId xmlns:a16="http://schemas.microsoft.com/office/drawing/2014/main" id="{F8DB18D1-1C58-DF40-9EE9-BDB9FE59B4D4}"/>
+              </a:ext>
+            </a:extLst>
+          </p:cNvPr>
+          <p:cNvSpPr/>
+          <p:nvPr/>
+        </p:nvSpPr>
+        <p:spPr>
+          <a:xfrm>
+            <a:off x="1157198" y="1988596"/>
+            <a:ext cx="114298" cy="617165"/>
+          </a:xfrm>
+          <a:prstGeom prst="rect">
+            <a:avLst/>
+          </a:prstGeom>
+          <a:ln w="12700">
+            <a:solidFill>
+              <a:schemeClr val="accent2"/>
+            </a:solidFill>
+          </a:ln>
+        </p:spPr>
+        <p:style>
+          <a:lnRef idx="2">
+            <a:schemeClr val="accent6"/>
+          </a:lnRef>
+          <a:fillRef idx="1">
+            <a:schemeClr val="lt1"/>
+          </a:fillRef>
+          <a:effectRef idx="0">
+            <a:schemeClr val="accent6"/>
+          </a:effectRef>
+          <a:fontRef idx="minor">
+            <a:schemeClr val="dk1"/>
+          </a:fontRef>
+        </p:style>
+        <p:txBody>
+          <a:bodyPr rtlCol="0" anchor="ctr"/>
+          <a:lstStyle/>
+          <a:p>
+            <a:pPr algn="ctr"/>
+            <a:endParaRPr lang="en-US"/>
+          </a:p>
+        </p:txBody>
+      </p:sp>
+      <p:cxnSp>
+        <p:nvCxnSpPr>
+          <p:cNvPr id="194" name="Curved Connector 193">
+            <a:extLst>
+              <a:ext uri="{FF2B5EF4-FFF2-40B4-BE49-F238E27FC236}">
+                <a16:creationId xmlns:a16="http://schemas.microsoft.com/office/drawing/2014/main" id="{7A47A5CD-446A-9D40-B1A3-91D65D307E09}"/>
+              </a:ext>
+            </a:extLst>
+          </p:cNvPr>
+          <p:cNvCxnSpPr>
+            <a:cxnSpLocks/>
+          </p:cNvCxnSpPr>
+          <p:nvPr/>
+        </p:nvCxnSpPr>
+        <p:spPr>
+          <a:xfrm rot="16200000" flipH="1">
+            <a:off x="1161219" y="1922940"/>
+            <a:ext cx="162613" cy="57149"/>
+          </a:xfrm>
+          <a:prstGeom prst="curvedConnector4">
+            <a:avLst>
+              <a:gd name="adj1" fmla="val 6204"/>
+              <a:gd name="adj2" fmla="val 500007"/>
+            </a:avLst>
+          </a:prstGeom>
+          <a:ln w="9525" cap="flat" cmpd="sng" algn="ctr">
+            <a:solidFill>
+              <a:schemeClr val="accent2"/>
+            </a:solidFill>
+            <a:prstDash val="solid"/>
+            <a:round/>
+            <a:headEnd type="none" w="med" len="med"/>
+            <a:tailEnd type="arrow" w="med" len="med"/>
+          </a:ln>
+        </p:spPr>
+        <p:style>
+          <a:lnRef idx="0">
+            <a:scrgbClr r="0" g="0" b="0"/>
+          </a:lnRef>
+          <a:fillRef idx="0">
+            <a:scrgbClr r="0" g="0" b="0"/>
+          </a:fillRef>
+          <a:effectRef idx="0">
+            <a:scrgbClr r="0" g="0" b="0"/>
+          </a:effectRef>
+          <a:fontRef idx="minor">
+            <a:schemeClr val="tx1"/>
+          </a:fontRef>
+        </p:style>
+      </p:cxnSp>
+      <p:sp>
+        <p:nvSpPr>
+          <p:cNvPr id="198" name="TextBox 197">
+            <a:extLst>
+              <a:ext uri="{FF2B5EF4-FFF2-40B4-BE49-F238E27FC236}">
+                <a16:creationId xmlns:a16="http://schemas.microsoft.com/office/drawing/2014/main" id="{2831CD29-9ABA-D247-A558-3B529D70E956}"/>
+              </a:ext>
+            </a:extLst>
+          </p:cNvPr>
+          <p:cNvSpPr txBox="1"/>
+          <p:nvPr/>
+        </p:nvSpPr>
+        <p:spPr>
+          <a:xfrm>
+            <a:off x="5980315" y="3863345"/>
+            <a:ext cx="456609" cy="215444"/>
+          </a:xfrm>
+          <a:prstGeom prst="rect">
+            <a:avLst/>
+          </a:prstGeom>
+          <a:noFill/>
+        </p:spPr>
+        <p:txBody>
+          <a:bodyPr wrap="square" rtlCol="0">
+            <a:spAutoFit/>
+          </a:bodyPr>
+          <a:lstStyle/>
+          <a:p>
+            <a:r>
+              <a:rPr lang="en-US" sz="800" dirty="0"/>
+              <a:t>lesson</a:t>
+            </a:r>
+          </a:p>
+        </p:txBody>
+      </p:sp>
+      <p:cxnSp>
+        <p:nvCxnSpPr>
+          <p:cNvPr id="202" name="Straight Arrow Connector 201">
+            <a:extLst>
+              <a:ext uri="{FF2B5EF4-FFF2-40B4-BE49-F238E27FC236}">
+                <a16:creationId xmlns:a16="http://schemas.microsoft.com/office/drawing/2014/main" id="{01D93FEE-ACC1-664F-9AED-D7090823B794}"/>
+              </a:ext>
+            </a:extLst>
+          </p:cNvPr>
+          <p:cNvCxnSpPr/>
+          <p:nvPr/>
+        </p:nvCxnSpPr>
+        <p:spPr>
+          <a:xfrm>
+            <a:off x="3393225" y="5888014"/>
+            <a:ext cx="1634928" cy="12317"/>
+          </a:xfrm>
+          <a:prstGeom prst="straightConnector1">
+            <a:avLst/>
+          </a:prstGeom>
+          <a:ln w="9525" cap="flat" cmpd="sng" algn="ctr">
+            <a:solidFill>
+              <a:schemeClr val="accent2"/>
+            </a:solidFill>
+            <a:prstDash val="solid"/>
+            <a:round/>
+            <a:headEnd type="none" w="med" len="med"/>
+            <a:tailEnd type="arrow" w="med" len="med"/>
+          </a:ln>
+        </p:spPr>
+        <p:style>
+          <a:lnRef idx="0">
+            <a:scrgbClr r="0" g="0" b="0"/>
+          </a:lnRef>
+          <a:fillRef idx="0">
+            <a:scrgbClr r="0" g="0" b="0"/>
+          </a:fillRef>
+          <a:effectRef idx="0">
+            <a:scrgbClr r="0" g="0" b="0"/>
+          </a:effectRef>
+          <a:fontRef idx="minor">
+            <a:schemeClr val="tx1"/>
+          </a:fontRef>
+        </p:style>
+      </p:cxnSp>
+      <p:sp>
+        <p:nvSpPr>
+          <p:cNvPr id="203" name="Rectangle 202">
+            <a:extLst>
+              <a:ext uri="{FF2B5EF4-FFF2-40B4-BE49-F238E27FC236}">
+                <a16:creationId xmlns:a16="http://schemas.microsoft.com/office/drawing/2014/main" id="{F8FA46AA-D6D4-B649-9222-4D643B1DDF4F}"/>
+              </a:ext>
+            </a:extLst>
+          </p:cNvPr>
+          <p:cNvSpPr/>
+          <p:nvPr/>
+        </p:nvSpPr>
+        <p:spPr>
+          <a:xfrm>
+            <a:off x="5026094" y="5803966"/>
+            <a:ext cx="906218" cy="237939"/>
+          </a:xfrm>
+          <a:prstGeom prst="rect">
+            <a:avLst/>
+          </a:prstGeom>
+          <a:solidFill>
+            <a:schemeClr val="accent1">
+              <a:lumMod val="50000"/>
+            </a:schemeClr>
+          </a:solidFill>
+          <a:ln w="12700">
+            <a:solidFill>
+              <a:schemeClr val="accent2"/>
+            </a:solidFill>
+          </a:ln>
+        </p:spPr>
+        <p:style>
+          <a:lnRef idx="2">
+            <a:schemeClr val="accent1">
+              <a:shade val="50000"/>
+            </a:schemeClr>
+          </a:lnRef>
+          <a:fillRef idx="1">
+            <a:schemeClr val="accent1"/>
+          </a:fillRef>
+          <a:effectRef idx="0">
+            <a:schemeClr val="accent1"/>
+          </a:effectRef>
+          <a:fontRef idx="minor">
+            <a:schemeClr val="lt1"/>
+          </a:fontRef>
+        </p:style>
+        <p:txBody>
+          <a:bodyPr rtlCol="0" anchor="ctr"/>
+          <a:lstStyle/>
+          <a:p>
+            <a:pPr algn="ctr"/>
+            <a:r>
+              <a:rPr lang="en-US" sz="800" dirty="0"/>
+              <a:t>:CommandResult</a:t>
+            </a:r>
+          </a:p>
+        </p:txBody>
+      </p:sp>
+      <p:sp>
+        <p:nvSpPr>
+          <p:cNvPr id="204" name="Rectangle 203">
+            <a:extLst>
+              <a:ext uri="{FF2B5EF4-FFF2-40B4-BE49-F238E27FC236}">
+                <a16:creationId xmlns:a16="http://schemas.microsoft.com/office/drawing/2014/main" id="{DE54ED3D-FCEA-6041-AF3B-A0F65427BC24}"/>
+              </a:ext>
+            </a:extLst>
+          </p:cNvPr>
+          <p:cNvSpPr/>
+          <p:nvPr/>
+        </p:nvSpPr>
+        <p:spPr>
+          <a:xfrm>
+            <a:off x="5392618" y="6036443"/>
+            <a:ext cx="87041" cy="204900"/>
+          </a:xfrm>
+          <a:prstGeom prst="rect">
+            <a:avLst/>
+          </a:prstGeom>
+          <a:solidFill>
+            <a:schemeClr val="bg1"/>
+          </a:solidFill>
+          <a:ln w="12700">
+            <a:solidFill>
+              <a:schemeClr val="accent2"/>
+            </a:solidFill>
+          </a:ln>
+        </p:spPr>
+        <p:style>
+          <a:lnRef idx="2">
+            <a:schemeClr val="accent1">
+              <a:shade val="50000"/>
+            </a:schemeClr>
+          </a:lnRef>
+          <a:fillRef idx="1">
+            <a:schemeClr val="accent1"/>
+          </a:fillRef>
+          <a:effectRef idx="0">
+            <a:schemeClr val="accent1"/>
+          </a:effectRef>
+          <a:fontRef idx="minor">
+            <a:schemeClr val="lt1"/>
+          </a:fontRef>
+        </p:style>
+        <p:txBody>
+          <a:bodyPr rtlCol="0" anchor="ctr"/>
+          <a:lstStyle/>
+          <a:p>
+            <a:pPr algn="ctr"/>
+            <a:endParaRPr lang="en-US"/>
+          </a:p>
+        </p:txBody>
+      </p:sp>
+      <p:cxnSp>
+        <p:nvCxnSpPr>
+          <p:cNvPr id="205" name="Straight Connector 204">
+            <a:extLst>
+              <a:ext uri="{FF2B5EF4-FFF2-40B4-BE49-F238E27FC236}">
+                <a16:creationId xmlns:a16="http://schemas.microsoft.com/office/drawing/2014/main" id="{7773828F-55D8-B645-81DC-F91567000CAD}"/>
+              </a:ext>
+            </a:extLst>
+          </p:cNvPr>
+          <p:cNvCxnSpPr>
+            <a:cxnSpLocks/>
+            <a:stCxn id="204" idx="2"/>
+          </p:cNvCxnSpPr>
+          <p:nvPr/>
+        </p:nvCxnSpPr>
+        <p:spPr>
+          <a:xfrm flipH="1">
+            <a:off x="5434923" y="6241343"/>
+            <a:ext cx="1216" cy="493443"/>
+          </a:xfrm>
+          <a:prstGeom prst="line">
+            <a:avLst/>
+          </a:prstGeom>
+          <a:ln w="9525" cap="flat" cmpd="sng" algn="ctr">
+            <a:solidFill>
+              <a:schemeClr val="accent2"/>
+            </a:solidFill>
+            <a:prstDash val="dash"/>
+            <a:round/>
+            <a:headEnd type="none" w="med" len="med"/>
+            <a:tailEnd type="none" w="med" len="med"/>
+          </a:ln>
+        </p:spPr>
+        <p:style>
+          <a:lnRef idx="0">
+            <a:scrgbClr r="0" g="0" b="0"/>
+          </a:lnRef>
+          <a:fillRef idx="0">
+            <a:scrgbClr r="0" g="0" b="0"/>
+          </a:fillRef>
+          <a:effectRef idx="0">
+            <a:scrgbClr r="0" g="0" b="0"/>
+          </a:effectRef>
+          <a:fontRef idx="minor">
+            <a:schemeClr val="tx1"/>
+          </a:fontRef>
+        </p:style>
+      </p:cxnSp>
+      <p:cxnSp>
+        <p:nvCxnSpPr>
+          <p:cNvPr id="206" name="Straight Arrow Connector 205">
+            <a:extLst>
+              <a:ext uri="{FF2B5EF4-FFF2-40B4-BE49-F238E27FC236}">
+                <a16:creationId xmlns:a16="http://schemas.microsoft.com/office/drawing/2014/main" id="{B3AC615D-32A4-324F-BA89-38CDF8CB93F3}"/>
+              </a:ext>
+            </a:extLst>
+          </p:cNvPr>
+          <p:cNvCxnSpPr>
+            <a:cxnSpLocks/>
+            <a:stCxn id="204" idx="2"/>
+          </p:cNvCxnSpPr>
+          <p:nvPr/>
+        </p:nvCxnSpPr>
+        <p:spPr>
+          <a:xfrm flipH="1">
+            <a:off x="3485389" y="6241343"/>
+            <a:ext cx="1950750" cy="0"/>
+          </a:xfrm>
+          <a:prstGeom prst="straightConnector1">
+            <a:avLst/>
+          </a:prstGeom>
+          <a:ln w="9525" cap="flat" cmpd="sng" algn="ctr">
+            <a:solidFill>
+              <a:schemeClr val="accent2"/>
+            </a:solidFill>
+            <a:prstDash val="dash"/>
+            <a:round/>
+            <a:headEnd type="none" w="med" len="med"/>
+            <a:tailEnd type="none" w="med" len="med"/>
+          </a:ln>
+        </p:spPr>
+        <p:style>
+          <a:lnRef idx="0">
+            <a:scrgbClr r="0" g="0" b="0"/>
+          </a:lnRef>
+          <a:fillRef idx="0">
+            <a:scrgbClr r="0" g="0" b="0"/>
+          </a:fillRef>
+          <a:effectRef idx="0">
+            <a:scrgbClr r="0" g="0" b="0"/>
+          </a:effectRef>
+          <a:fontRef idx="minor">
+            <a:schemeClr val="tx1"/>
+          </a:fontRef>
+        </p:style>
+      </p:cxnSp>
+      <p:cxnSp>
+        <p:nvCxnSpPr>
+          <p:cNvPr id="207" name="Straight Connector 206">
+            <a:extLst>
+              <a:ext uri="{FF2B5EF4-FFF2-40B4-BE49-F238E27FC236}">
+                <a16:creationId xmlns:a16="http://schemas.microsoft.com/office/drawing/2014/main" id="{8CE44CE9-CED1-BE45-998B-5AACA8CED33F}"/>
+              </a:ext>
+            </a:extLst>
+          </p:cNvPr>
+          <p:cNvCxnSpPr>
+            <a:cxnSpLocks/>
+          </p:cNvCxnSpPr>
+          <p:nvPr/>
+        </p:nvCxnSpPr>
+        <p:spPr>
+          <a:xfrm flipV="1">
+            <a:off x="3492349" y="6196263"/>
+            <a:ext cx="93742" cy="38096"/>
+          </a:xfrm>
+          <a:prstGeom prst="line">
+            <a:avLst/>
+          </a:prstGeom>
+          <a:ln>
+            <a:solidFill>
+              <a:schemeClr val="accent2"/>
+            </a:solidFill>
+          </a:ln>
+        </p:spPr>
+        <p:style>
+          <a:lnRef idx="1">
+            <a:schemeClr val="accent1"/>
+          </a:lnRef>
+          <a:fillRef idx="0">
+            <a:schemeClr val="accent1"/>
+          </a:fillRef>
+          <a:effectRef idx="0">
+            <a:schemeClr val="accent1"/>
+          </a:effectRef>
+          <a:fontRef idx="minor">
+            <a:schemeClr val="tx1"/>
+          </a:fontRef>
+        </p:style>
+      </p:cxnSp>
+      <p:cxnSp>
+        <p:nvCxnSpPr>
+          <p:cNvPr id="208" name="Straight Connector 207">
+            <a:extLst>
+              <a:ext uri="{FF2B5EF4-FFF2-40B4-BE49-F238E27FC236}">
+                <a16:creationId xmlns:a16="http://schemas.microsoft.com/office/drawing/2014/main" id="{B3E4D4D5-5612-C940-899E-13A5C79F4A16}"/>
+              </a:ext>
+            </a:extLst>
+          </p:cNvPr>
+          <p:cNvCxnSpPr>
+            <a:cxnSpLocks/>
+          </p:cNvCxnSpPr>
+          <p:nvPr/>
+        </p:nvCxnSpPr>
+        <p:spPr>
+          <a:xfrm>
+            <a:off x="3485389" y="6235865"/>
+            <a:ext cx="93600" cy="39600"/>
+          </a:xfrm>
+          <a:prstGeom prst="line">
+            <a:avLst/>
+          </a:prstGeom>
+          <a:ln>
+            <a:solidFill>
+              <a:schemeClr val="accent2"/>
+            </a:solidFill>
+          </a:ln>
+        </p:spPr>
+        <p:style>
+          <a:lnRef idx="1">
+            <a:schemeClr val="accent1"/>
+          </a:lnRef>
+          <a:fillRef idx="0">
+            <a:schemeClr val="accent1"/>
+          </a:fillRef>
+          <a:effectRef idx="0">
+            <a:schemeClr val="accent1"/>
+          </a:effectRef>
+          <a:fontRef idx="minor">
+            <a:schemeClr val="tx1"/>
+          </a:fontRef>
+        </p:style>
+      </p:cxnSp>
+      <p:sp>
+        <p:nvSpPr>
+          <p:cNvPr id="209" name="Rectangle 208">
+            <a:extLst>
+              <a:ext uri="{FF2B5EF4-FFF2-40B4-BE49-F238E27FC236}">
+                <a16:creationId xmlns:a16="http://schemas.microsoft.com/office/drawing/2014/main" id="{5311845D-45E8-BD45-AD32-9BC9EE1C3A80}"/>
+              </a:ext>
+            </a:extLst>
+          </p:cNvPr>
+          <p:cNvSpPr/>
+          <p:nvPr/>
+        </p:nvSpPr>
+        <p:spPr>
+          <a:xfrm>
+            <a:off x="3292173" y="3067915"/>
+            <a:ext cx="114298" cy="3482275"/>
+          </a:xfrm>
+          <a:prstGeom prst="rect">
+            <a:avLst/>
+          </a:prstGeom>
+          <a:ln w="12700">
+            <a:solidFill>
+              <a:schemeClr val="accent2"/>
+            </a:solidFill>
+          </a:ln>
+        </p:spPr>
+        <p:style>
+          <a:lnRef idx="2">
+            <a:schemeClr val="accent6"/>
+          </a:lnRef>
+          <a:fillRef idx="1">
+            <a:schemeClr val="lt1"/>
+          </a:fillRef>
+          <a:effectRef idx="0">
+            <a:schemeClr val="accent6"/>
+          </a:effectRef>
+          <a:fontRef idx="minor">
+            <a:schemeClr val="dk1"/>
+          </a:fontRef>
+        </p:style>
+        <p:txBody>
+          <a:bodyPr rtlCol="0" anchor="ctr"/>
+          <a:lstStyle/>
+          <a:p>
+            <a:pPr algn="ctr"/>
+            <a:endParaRPr lang="en-US"/>
+          </a:p>
+        </p:txBody>
+      </p:sp>
+      <p:sp>
+        <p:nvSpPr>
+          <p:cNvPr id="210" name="Rectangle 209">
+            <a:extLst>
+              <a:ext uri="{FF2B5EF4-FFF2-40B4-BE49-F238E27FC236}">
+                <a16:creationId xmlns:a16="http://schemas.microsoft.com/office/drawing/2014/main" id="{13303D34-A8AA-7B46-A3CF-818F86EAFE4B}"/>
+              </a:ext>
+            </a:extLst>
+          </p:cNvPr>
+          <p:cNvSpPr/>
+          <p:nvPr/>
+        </p:nvSpPr>
+        <p:spPr>
+          <a:xfrm>
+            <a:off x="3366660" y="3224964"/>
+            <a:ext cx="114298" cy="3135017"/>
+          </a:xfrm>
+          <a:prstGeom prst="rect">
+            <a:avLst/>
+          </a:prstGeom>
+          <a:ln w="12700">
+            <a:solidFill>
+              <a:schemeClr val="accent2"/>
+            </a:solidFill>
+          </a:ln>
+        </p:spPr>
+        <p:style>
+          <a:lnRef idx="2">
+            <a:schemeClr val="accent6"/>
+          </a:lnRef>
+          <a:fillRef idx="1">
+            <a:schemeClr val="lt1"/>
+          </a:fillRef>
+          <a:effectRef idx="0">
+            <a:schemeClr val="accent6"/>
+          </a:effectRef>
+          <a:fontRef idx="minor">
+            <a:schemeClr val="dk1"/>
+          </a:fontRef>
+        </p:style>
+        <p:txBody>
+          <a:bodyPr rtlCol="0" anchor="ctr"/>
+          <a:lstStyle/>
+          <a:p>
+            <a:pPr algn="ctr"/>
+            <a:endParaRPr lang="en-US"/>
+          </a:p>
+        </p:txBody>
+      </p:sp>
+      <p:cxnSp>
+        <p:nvCxnSpPr>
+          <p:cNvPr id="211" name="Curved Connector 210">
+            <a:extLst>
+              <a:ext uri="{FF2B5EF4-FFF2-40B4-BE49-F238E27FC236}">
+                <a16:creationId xmlns:a16="http://schemas.microsoft.com/office/drawing/2014/main" id="{C75D700A-79E3-8A45-8D52-20ACD8810922}"/>
+              </a:ext>
+            </a:extLst>
+          </p:cNvPr>
+          <p:cNvCxnSpPr>
+            <a:cxnSpLocks/>
+          </p:cNvCxnSpPr>
+          <p:nvPr/>
+        </p:nvCxnSpPr>
+        <p:spPr>
+          <a:xfrm rot="16200000" flipH="1">
+            <a:off x="3368504" y="3171629"/>
+            <a:ext cx="162613" cy="57149"/>
+          </a:xfrm>
+          <a:prstGeom prst="curvedConnector4">
+            <a:avLst>
+              <a:gd name="adj1" fmla="val 6204"/>
+              <a:gd name="adj2" fmla="val 500007"/>
+            </a:avLst>
+          </a:prstGeom>
+          <a:ln w="9525" cap="flat" cmpd="sng" algn="ctr">
+            <a:solidFill>
+              <a:schemeClr val="accent2"/>
+            </a:solidFill>
+            <a:prstDash val="solid"/>
+            <a:round/>
+            <a:headEnd type="none" w="med" len="med"/>
+            <a:tailEnd type="arrow" w="med" len="med"/>
+          </a:ln>
+        </p:spPr>
+        <p:style>
+          <a:lnRef idx="0">
+            <a:scrgbClr r="0" g="0" b="0"/>
+          </a:lnRef>
+          <a:fillRef idx="0">
+            <a:scrgbClr r="0" g="0" b="0"/>
+          </a:fillRef>
+          <a:effectRef idx="0">
+            <a:scrgbClr r="0" g="0" b="0"/>
+          </a:effectRef>
+          <a:fontRef idx="minor">
+            <a:schemeClr val="tx1"/>
+          </a:fontRef>
+        </p:style>
+      </p:cxnSp>
+      <p:cxnSp>
+        <p:nvCxnSpPr>
+          <p:cNvPr id="212" name="Elbow Connector 211">
+            <a:extLst>
+              <a:ext uri="{FF2B5EF4-FFF2-40B4-BE49-F238E27FC236}">
+                <a16:creationId xmlns:a16="http://schemas.microsoft.com/office/drawing/2014/main" id="{2FBEE2D6-3D6C-0244-BE2D-F058E088289E}"/>
+              </a:ext>
+            </a:extLst>
+          </p:cNvPr>
+          <p:cNvCxnSpPr>
+            <a:cxnSpLocks/>
+          </p:cNvCxnSpPr>
+          <p:nvPr/>
+        </p:nvCxnSpPr>
+        <p:spPr>
+          <a:xfrm flipH="1">
+            <a:off x="3431419" y="6311809"/>
+            <a:ext cx="62228" cy="167124"/>
+          </a:xfrm>
+          <a:prstGeom prst="bentConnector4">
+            <a:avLst>
+              <a:gd name="adj1" fmla="val -202494"/>
+              <a:gd name="adj2" fmla="val 65924"/>
+            </a:avLst>
+          </a:prstGeom>
+          <a:ln w="9525" cap="flat" cmpd="sng" algn="ctr">
+            <a:solidFill>
+              <a:schemeClr val="accent2"/>
+            </a:solidFill>
+            <a:prstDash val="dash"/>
+            <a:round/>
+            <a:headEnd type="none" w="med" len="med"/>
+            <a:tailEnd type="none" w="med" len="med"/>
+          </a:ln>
+        </p:spPr>
+        <p:style>
+          <a:lnRef idx="0">
+            <a:scrgbClr r="0" g="0" b="0"/>
+          </a:lnRef>
+          <a:fillRef idx="0">
+            <a:scrgbClr r="0" g="0" b="0"/>
+          </a:fillRef>
+          <a:effectRef idx="0">
+            <a:scrgbClr r="0" g="0" b="0"/>
+          </a:effectRef>
+          <a:fontRef idx="minor">
+            <a:schemeClr val="tx1"/>
+          </a:fontRef>
+        </p:style>
+      </p:cxnSp>
+      <p:cxnSp>
+        <p:nvCxnSpPr>
+          <p:cNvPr id="213" name="Straight Connector 212">
+            <a:extLst>
+              <a:ext uri="{FF2B5EF4-FFF2-40B4-BE49-F238E27FC236}">
+                <a16:creationId xmlns:a16="http://schemas.microsoft.com/office/drawing/2014/main" id="{44670303-ACCD-2E4A-A56B-EE74975E2301}"/>
+              </a:ext>
+            </a:extLst>
+          </p:cNvPr>
+          <p:cNvCxnSpPr>
+            <a:cxnSpLocks/>
+          </p:cNvCxnSpPr>
+          <p:nvPr/>
+        </p:nvCxnSpPr>
+        <p:spPr>
+          <a:xfrm flipV="1">
+            <a:off x="3408680" y="6386812"/>
+            <a:ext cx="93742" cy="38096"/>
+          </a:xfrm>
+          <a:prstGeom prst="line">
+            <a:avLst/>
+          </a:prstGeom>
+          <a:ln>
+            <a:solidFill>
+              <a:schemeClr val="accent2"/>
+            </a:solidFill>
+          </a:ln>
+        </p:spPr>
+        <p:style>
+          <a:lnRef idx="1">
+            <a:schemeClr val="accent1"/>
+          </a:lnRef>
+          <a:fillRef idx="0">
+            <a:schemeClr val="accent1"/>
+          </a:fillRef>
+          <a:effectRef idx="0">
+            <a:schemeClr val="accent1"/>
+          </a:effectRef>
+          <a:fontRef idx="minor">
+            <a:schemeClr val="tx1"/>
+          </a:fontRef>
+        </p:style>
+      </p:cxnSp>
+      <p:cxnSp>
+        <p:nvCxnSpPr>
+          <p:cNvPr id="214" name="Straight Connector 213">
+            <a:extLst>
+              <a:ext uri="{FF2B5EF4-FFF2-40B4-BE49-F238E27FC236}">
+                <a16:creationId xmlns:a16="http://schemas.microsoft.com/office/drawing/2014/main" id="{A41BA6E5-3C4C-3844-B5EF-7B42856AF52C}"/>
+              </a:ext>
+            </a:extLst>
+          </p:cNvPr>
+          <p:cNvCxnSpPr>
+            <a:cxnSpLocks/>
+          </p:cNvCxnSpPr>
+          <p:nvPr/>
+        </p:nvCxnSpPr>
+        <p:spPr>
+          <a:xfrm>
+            <a:off x="3410918" y="6424909"/>
+            <a:ext cx="93600" cy="39600"/>
+          </a:xfrm>
+          <a:prstGeom prst="line">
+            <a:avLst/>
+          </a:prstGeom>
+          <a:ln>
+            <a:solidFill>
+              <a:schemeClr val="accent2"/>
+            </a:solidFill>
+          </a:ln>
+        </p:spPr>
+        <p:style>
+          <a:lnRef idx="1">
+            <a:schemeClr val="accent1"/>
+          </a:lnRef>
+          <a:fillRef idx="0">
+            <a:schemeClr val="accent1"/>
+          </a:fillRef>
+          <a:effectRef idx="0">
+            <a:schemeClr val="accent1"/>
+          </a:effectRef>
+          <a:fontRef idx="minor">
+            <a:schemeClr val="tx1"/>
+          </a:fontRef>
+        </p:style>
+      </p:cxnSp>
+      <p:cxnSp>
+        <p:nvCxnSpPr>
+          <p:cNvPr id="216" name="Straight Arrow Connector 215">
+            <a:extLst>
+              <a:ext uri="{FF2B5EF4-FFF2-40B4-BE49-F238E27FC236}">
+                <a16:creationId xmlns:a16="http://schemas.microsoft.com/office/drawing/2014/main" id="{A9F98146-A901-4043-95E1-C6F1F7797E7A}"/>
+              </a:ext>
+            </a:extLst>
+          </p:cNvPr>
+          <p:cNvCxnSpPr>
+            <a:cxnSpLocks/>
+          </p:cNvCxnSpPr>
+          <p:nvPr/>
+        </p:nvCxnSpPr>
+        <p:spPr>
+          <a:xfrm>
+            <a:off x="76200" y="3067915"/>
+            <a:ext cx="3215973" cy="12823"/>
+          </a:xfrm>
+          <a:prstGeom prst="straightConnector1">
+            <a:avLst/>
+          </a:prstGeom>
+          <a:ln w="9525" cap="flat" cmpd="sng" algn="ctr">
+            <a:solidFill>
+              <a:schemeClr val="accent2"/>
+            </a:solidFill>
+            <a:prstDash val="solid"/>
+            <a:round/>
+            <a:headEnd type="none" w="med" len="med"/>
+            <a:tailEnd type="arrow" w="med" len="med"/>
+          </a:ln>
+        </p:spPr>
+        <p:style>
+          <a:lnRef idx="0">
+            <a:scrgbClr r="0" g="0" b="0"/>
+          </a:lnRef>
+          <a:fillRef idx="0">
+            <a:scrgbClr r="0" g="0" b="0"/>
+          </a:fillRef>
+          <a:effectRef idx="0">
+            <a:scrgbClr r="0" g="0" b="0"/>
+          </a:effectRef>
+          <a:fontRef idx="minor">
+            <a:schemeClr val="tx1"/>
+          </a:fontRef>
+        </p:style>
+      </p:cxnSp>
+      <p:cxnSp>
+        <p:nvCxnSpPr>
+          <p:cNvPr id="219" name="Straight Arrow Connector 218">
+            <a:extLst>
+              <a:ext uri="{FF2B5EF4-FFF2-40B4-BE49-F238E27FC236}">
+                <a16:creationId xmlns:a16="http://schemas.microsoft.com/office/drawing/2014/main" id="{F6F02770-6ACA-1749-A8FF-8082C12844B4}"/>
+              </a:ext>
+            </a:extLst>
+          </p:cNvPr>
+          <p:cNvCxnSpPr>
+            <a:cxnSpLocks/>
+            <a:stCxn id="209" idx="2"/>
+          </p:cNvCxnSpPr>
+          <p:nvPr/>
+        </p:nvCxnSpPr>
+        <p:spPr>
+          <a:xfrm flipH="1">
+            <a:off x="287780" y="6550190"/>
+            <a:ext cx="3061542" cy="0"/>
+          </a:xfrm>
+          <a:prstGeom prst="straightConnector1">
+            <a:avLst/>
+          </a:prstGeom>
+          <a:ln w="9525" cap="flat" cmpd="sng" algn="ctr">
+            <a:solidFill>
+              <a:schemeClr val="accent2"/>
+            </a:solidFill>
+            <a:prstDash val="dash"/>
+            <a:round/>
+            <a:headEnd type="none" w="med" len="med"/>
+            <a:tailEnd type="none" w="med" len="med"/>
+          </a:ln>
+        </p:spPr>
+        <p:style>
+          <a:lnRef idx="0">
+            <a:scrgbClr r="0" g="0" b="0"/>
+          </a:lnRef>
+          <a:fillRef idx="0">
+            <a:scrgbClr r="0" g="0" b="0"/>
+          </a:fillRef>
+          <a:effectRef idx="0">
+            <a:scrgbClr r="0" g="0" b="0"/>
+          </a:effectRef>
+          <a:fontRef idx="minor">
+            <a:schemeClr val="tx1"/>
+          </a:fontRef>
+        </p:style>
+      </p:cxnSp>
+      <p:cxnSp>
+        <p:nvCxnSpPr>
+          <p:cNvPr id="220" name="Straight Connector 219">
+            <a:extLst>
+              <a:ext uri="{FF2B5EF4-FFF2-40B4-BE49-F238E27FC236}">
+                <a16:creationId xmlns:a16="http://schemas.microsoft.com/office/drawing/2014/main" id="{A68E3A92-CFB9-5446-87CD-D34AC2298A84}"/>
+              </a:ext>
+            </a:extLst>
+          </p:cNvPr>
+          <p:cNvCxnSpPr>
+            <a:cxnSpLocks/>
+          </p:cNvCxnSpPr>
+          <p:nvPr/>
+        </p:nvCxnSpPr>
+        <p:spPr>
+          <a:xfrm flipV="1">
+            <a:off x="294739" y="6505110"/>
+            <a:ext cx="93742" cy="38096"/>
+          </a:xfrm>
+          <a:prstGeom prst="line">
+            <a:avLst/>
+          </a:prstGeom>
+          <a:ln>
+            <a:solidFill>
+              <a:schemeClr val="accent2"/>
+            </a:solidFill>
+          </a:ln>
+        </p:spPr>
+        <p:style>
+          <a:lnRef idx="1">
+            <a:schemeClr val="accent1"/>
+          </a:lnRef>
+          <a:fillRef idx="0">
+            <a:schemeClr val="accent1"/>
+          </a:fillRef>
+          <a:effectRef idx="0">
+            <a:schemeClr val="accent1"/>
+          </a:effectRef>
+          <a:fontRef idx="minor">
+            <a:schemeClr val="tx1"/>
+          </a:fontRef>
+        </p:style>
+      </p:cxnSp>
+      <p:cxnSp>
+        <p:nvCxnSpPr>
+          <p:cNvPr id="221" name="Straight Connector 220">
+            <a:extLst>
+              <a:ext uri="{FF2B5EF4-FFF2-40B4-BE49-F238E27FC236}">
+                <a16:creationId xmlns:a16="http://schemas.microsoft.com/office/drawing/2014/main" id="{84227BD9-2D76-E04F-A0B7-118CE59F51FB}"/>
+              </a:ext>
+            </a:extLst>
+          </p:cNvPr>
+          <p:cNvCxnSpPr>
+            <a:cxnSpLocks/>
+          </p:cNvCxnSpPr>
+          <p:nvPr/>
+        </p:nvCxnSpPr>
+        <p:spPr>
+          <a:xfrm>
+            <a:off x="287779" y="6544712"/>
+            <a:ext cx="93600" cy="39600"/>
+          </a:xfrm>
+          <a:prstGeom prst="line">
+            <a:avLst/>
+          </a:prstGeom>
+          <a:ln>
+            <a:solidFill>
+              <a:schemeClr val="accent2"/>
+            </a:solidFill>
+          </a:ln>
+        </p:spPr>
+        <p:style>
+          <a:lnRef idx="1">
+            <a:schemeClr val="accent1"/>
+          </a:lnRef>
+          <a:fillRef idx="0">
+            <a:schemeClr val="accent1"/>
+          </a:fillRef>
+          <a:effectRef idx="0">
+            <a:schemeClr val="accent1"/>
+          </a:effectRef>
+          <a:fontRef idx="minor">
+            <a:schemeClr val="tx1"/>
+          </a:fontRef>
+        </p:style>
+      </p:cxnSp>
+      <p:sp>
+        <p:nvSpPr>
+          <p:cNvPr id="223" name="TextBox 222">
+            <a:extLst>
+              <a:ext uri="{FF2B5EF4-FFF2-40B4-BE49-F238E27FC236}">
+                <a16:creationId xmlns:a16="http://schemas.microsoft.com/office/drawing/2014/main" id="{44BE36D2-F753-2A40-B1D0-4B3B6620DEE9}"/>
+              </a:ext>
+            </a:extLst>
+          </p:cNvPr>
+          <p:cNvSpPr txBox="1"/>
+          <p:nvPr/>
+        </p:nvSpPr>
+        <p:spPr>
+          <a:xfrm>
+            <a:off x="3830381" y="6223499"/>
+            <a:ext cx="477556" cy="215444"/>
+          </a:xfrm>
+          <a:prstGeom prst="rect">
+            <a:avLst/>
+          </a:prstGeom>
+          <a:noFill/>
+        </p:spPr>
+        <p:txBody>
+          <a:bodyPr wrap="square" rtlCol="0">
+            <a:spAutoFit/>
+          </a:bodyPr>
+          <a:lstStyle/>
+          <a:p>
+            <a:r>
+              <a:rPr lang="en-US" sz="800" dirty="0"/>
+              <a:t>result</a:t>
+            </a:r>
+          </a:p>
+        </p:txBody>
+      </p:sp>
+      <p:sp>
+        <p:nvSpPr>
+          <p:cNvPr id="224" name="TextBox 223">
+            <a:extLst>
+              <a:ext uri="{FF2B5EF4-FFF2-40B4-BE49-F238E27FC236}">
+                <a16:creationId xmlns:a16="http://schemas.microsoft.com/office/drawing/2014/main" id="{39FE1F3C-728A-034A-B8D6-A42B1BAE7C11}"/>
+              </a:ext>
+            </a:extLst>
+          </p:cNvPr>
+          <p:cNvSpPr txBox="1"/>
+          <p:nvPr/>
+        </p:nvSpPr>
+        <p:spPr>
+          <a:xfrm>
+            <a:off x="1880962" y="6334859"/>
+            <a:ext cx="477556" cy="215444"/>
+          </a:xfrm>
+          <a:prstGeom prst="rect">
+            <a:avLst/>
+          </a:prstGeom>
+          <a:noFill/>
+        </p:spPr>
+        <p:txBody>
+          <a:bodyPr wrap="square" rtlCol="0">
+            <a:spAutoFit/>
+          </a:bodyPr>
+          <a:lstStyle/>
+          <a:p>
+            <a:r>
+              <a:rPr lang="en-US" sz="800" dirty="0"/>
+              <a:t>result</a:t>
+            </a:r>
+          </a:p>
+        </p:txBody>
+      </p:sp>
+      <p:sp>
+        <p:nvSpPr>
+          <p:cNvPr id="225" name="TextBox 224">
+            <a:extLst>
+              <a:ext uri="{FF2B5EF4-FFF2-40B4-BE49-F238E27FC236}">
+                <a16:creationId xmlns:a16="http://schemas.microsoft.com/office/drawing/2014/main" id="{AFC40989-1521-4F4D-8EF4-5617A3447D7A}"/>
+              </a:ext>
+            </a:extLst>
+          </p:cNvPr>
+          <p:cNvSpPr txBox="1"/>
+          <p:nvPr/>
+        </p:nvSpPr>
+        <p:spPr>
+          <a:xfrm>
+            <a:off x="1862570" y="2478344"/>
+            <a:ext cx="614963" cy="215444"/>
+          </a:xfrm>
+          <a:prstGeom prst="rect">
+            <a:avLst/>
+          </a:prstGeom>
+          <a:noFill/>
+        </p:spPr>
+        <p:txBody>
+          <a:bodyPr wrap="square" rtlCol="0">
+            <a:spAutoFit/>
+          </a:bodyPr>
+          <a:lstStyle/>
+          <a:p>
+            <a:r>
+              <a:rPr lang="en-US" sz="800" dirty="0"/>
+              <a:t>command</a:t>
+            </a:r>
+          </a:p>
+        </p:txBody>
+      </p:sp>
+      <p:sp>
+        <p:nvSpPr>
+          <p:cNvPr id="226" name="TextBox 225">
+            <a:extLst>
+              <a:ext uri="{FF2B5EF4-FFF2-40B4-BE49-F238E27FC236}">
+                <a16:creationId xmlns:a16="http://schemas.microsoft.com/office/drawing/2014/main" id="{447F73C9-C8F1-A645-8785-61439B25A9E0}"/>
+              </a:ext>
+            </a:extLst>
+          </p:cNvPr>
+          <p:cNvSpPr txBox="1"/>
+          <p:nvPr/>
+        </p:nvSpPr>
+        <p:spPr>
+          <a:xfrm>
+            <a:off x="423224" y="2818350"/>
+            <a:ext cx="614963" cy="215444"/>
+          </a:xfrm>
+          <a:prstGeom prst="rect">
+            <a:avLst/>
+          </a:prstGeom>
+          <a:noFill/>
+        </p:spPr>
+        <p:txBody>
+          <a:bodyPr wrap="square" rtlCol="0">
+            <a:spAutoFit/>
+          </a:bodyPr>
+          <a:lstStyle/>
+          <a:p>
+            <a:r>
+              <a:rPr lang="en-US" sz="800" dirty="0"/>
+              <a:t>command</a:t>
+            </a:r>
+          </a:p>
+        </p:txBody>
+      </p:sp>
+      <p:sp>
+        <p:nvSpPr>
+          <p:cNvPr id="229" name="TextBox 228">
+            <a:extLst>
+              <a:ext uri="{FF2B5EF4-FFF2-40B4-BE49-F238E27FC236}">
+                <a16:creationId xmlns:a16="http://schemas.microsoft.com/office/drawing/2014/main" id="{58B611AE-196C-8947-B95F-0B6C5CC69A6A}"/>
+              </a:ext>
+            </a:extLst>
+          </p:cNvPr>
+          <p:cNvSpPr txBox="1"/>
+          <p:nvPr/>
+        </p:nvSpPr>
+        <p:spPr>
+          <a:xfrm>
+            <a:off x="16398" y="1474955"/>
+            <a:ext cx="1142996" cy="338554"/>
+          </a:xfrm>
+          <a:prstGeom prst="rect">
+            <a:avLst/>
+          </a:prstGeom>
+          <a:noFill/>
+        </p:spPr>
+        <p:txBody>
+          <a:bodyPr wrap="square" rtlCol="0">
+            <a:spAutoFit/>
+          </a:bodyPr>
+          <a:lstStyle/>
+          <a:p>
+            <a:r>
+              <a:rPr lang="en-US" sz="800" dirty="0"/>
+              <a:t>parseCommand(input :</a:t>
+            </a:r>
+          </a:p>
+          <a:p>
+            <a:r>
+              <a:rPr lang="en-US" sz="800" dirty="0"/>
+              <a:t>String)</a:t>
+            </a:r>
+          </a:p>
+        </p:txBody>
+      </p:sp>
+      <p:sp>
+        <p:nvSpPr>
+          <p:cNvPr id="231" name="TextBox 230">
+            <a:extLst>
+              <a:ext uri="{FF2B5EF4-FFF2-40B4-BE49-F238E27FC236}">
+                <a16:creationId xmlns:a16="http://schemas.microsoft.com/office/drawing/2014/main" id="{486F4697-76A7-DA48-B378-E06A11089767}"/>
+              </a:ext>
+            </a:extLst>
+          </p:cNvPr>
+          <p:cNvSpPr txBox="1"/>
+          <p:nvPr/>
+        </p:nvSpPr>
+        <p:spPr>
+          <a:xfrm>
+            <a:off x="1848022" y="2835200"/>
+            <a:ext cx="1142996" cy="215444"/>
+          </a:xfrm>
+          <a:prstGeom prst="rect">
+            <a:avLst/>
+          </a:prstGeom>
+          <a:noFill/>
+        </p:spPr>
+        <p:txBody>
+          <a:bodyPr wrap="square" rtlCol="0">
+            <a:spAutoFit/>
+          </a:bodyPr>
+          <a:lstStyle/>
+          <a:p>
+            <a:r>
+              <a:rPr lang="en-US" sz="800" dirty="0"/>
+              <a:t>executeCommand()</a:t>
             </a:r>
           </a:p>
         </p:txBody>
@@ -6394,7 +7342,7 @@
     </p:spTree>
     <p:extLst>
       <p:ext uri="{BB962C8B-B14F-4D97-AF65-F5344CB8AC3E}">
-        <p14:creationId xmlns:p14="http://schemas.microsoft.com/office/powerpoint/2010/main" val="1870380684"/>
+        <p14:creationId xmlns:p14="http://schemas.microsoft.com/office/powerpoint/2010/main" val="3352127586"/>
       </p:ext>
     </p:extLst>
   </p:cSld>
@@ -9859,7 +10807,7 @@
     </p:spTree>
     <p:extLst>
       <p:ext uri="{BB962C8B-B14F-4D97-AF65-F5344CB8AC3E}">
-        <p14:creationId xmlns:p14="http://schemas.microsoft.com/office/powerpoint/2010/main" val="713777501"/>
+        <p14:creationId xmlns:p14="http://schemas.microsoft.com/office/powerpoint/2010/main" val="4070985661"/>
       </p:ext>
     </p:extLst>
   </p:cSld>

</xml_diff>

<commit_message>
Refine sequence diag for planner add
</commit_message>
<xml_diff>
--- a/docs/assets/DG Diagrams.pptx
+++ b/docs/assets/DG Diagrams.pptx
@@ -8879,7 +8879,7 @@
         <p:spPr>
           <a:xfrm>
             <a:off x="3954777" y="4316454"/>
-            <a:ext cx="2168916" cy="215444"/>
+            <a:ext cx="2256992" cy="215444"/>
           </a:xfrm>
           <a:prstGeom prst="rect">
             <a:avLst/>
@@ -8894,7 +8894,7 @@
           <a:p>
             <a:r>
               <a:rPr lang="en-US" sz="800" dirty="0"/>
-              <a:t>addEvent(event : Event, allowConflict : boolean</a:t>
+              <a:t>addEvent(event : Event, allowConflict : boolean)</a:t>
             </a:r>
           </a:p>
         </p:txBody>
@@ -9494,10 +9494,10 @@
       </p:sp>
       <p:grpSp>
         <p:nvGrpSpPr>
-          <p:cNvPr id="216" name="Group 215">
-            <a:extLst>
-              <a:ext uri="{FF2B5EF4-FFF2-40B4-BE49-F238E27FC236}">
-                <a16:creationId xmlns:a16="http://schemas.microsoft.com/office/drawing/2014/main" id="{FB46356C-7BB3-47F1-BA7E-1EDB61880F78}"/>
+          <p:cNvPr id="28" name="Group 27">
+            <a:extLst>
+              <a:ext uri="{FF2B5EF4-FFF2-40B4-BE49-F238E27FC236}">
+                <a16:creationId xmlns:a16="http://schemas.microsoft.com/office/drawing/2014/main" id="{78F8C092-7133-4FD3-8A79-79B1622BA7B8}"/>
               </a:ext>
             </a:extLst>
           </p:cNvPr>
@@ -9506,10 +9506,10 @@
         </p:nvGrpSpPr>
         <p:grpSpPr>
           <a:xfrm>
-            <a:off x="-1060" y="6175565"/>
-            <a:ext cx="3453895" cy="146888"/>
-            <a:chOff x="3586770" y="5834497"/>
-            <a:chExt cx="4710200" cy="76014"/>
+            <a:off x="-5856" y="6130676"/>
+            <a:ext cx="3455771" cy="158815"/>
+            <a:chOff x="-1060" y="6165785"/>
+            <a:chExt cx="3455771" cy="158815"/>
           </a:xfrm>
         </p:grpSpPr>
         <p:cxnSp>
@@ -9528,8 +9528,8 @@
           </p:nvCxnSpPr>
           <p:spPr>
             <a:xfrm flipH="1">
-              <a:off x="3609072" y="5857427"/>
-              <a:ext cx="4687898" cy="20306"/>
+              <a:off x="15294" y="6259113"/>
+              <a:ext cx="3439417" cy="0"/>
             </a:xfrm>
             <a:prstGeom prst="straightConnector1">
               <a:avLst/>
@@ -9575,8 +9575,8 @@
           </p:nvCxnSpPr>
           <p:spPr>
             <a:xfrm flipV="1">
-              <a:off x="3586770" y="5834497"/>
-              <a:ext cx="84432" cy="45074"/>
+              <a:off x="-1060" y="6165785"/>
+              <a:ext cx="144459" cy="96880"/>
             </a:xfrm>
             <a:prstGeom prst="line">
               <a:avLst/>
@@ -9618,8 +9618,8 @@
           </p:nvCxnSpPr>
           <p:spPr>
             <a:xfrm>
-              <a:off x="3592215" y="5879572"/>
-              <a:ext cx="78987" cy="30939"/>
+              <a:off x="2933" y="6262667"/>
+              <a:ext cx="114483" cy="61933"/>
             </a:xfrm>
             <a:prstGeom prst="line">
               <a:avLst/>
@@ -10130,8 +10130,8 @@
         </p:nvSpPr>
         <p:spPr>
           <a:xfrm>
-            <a:off x="762002" y="2292076"/>
-            <a:ext cx="7467594" cy="3803924"/>
+            <a:off x="744362" y="2158311"/>
+            <a:ext cx="7467594" cy="3937689"/>
           </a:xfrm>
           <a:prstGeom prst="rect">
             <a:avLst/>
@@ -10283,7 +10283,7 @@
         </p:nvSpPr>
         <p:spPr>
           <a:xfrm rot="10800000" flipH="1">
-            <a:off x="762002" y="2298650"/>
+            <a:off x="767770" y="2165301"/>
             <a:ext cx="375230" cy="253548"/>
           </a:xfrm>
           <a:prstGeom prst="snip1Rect">
@@ -10331,7 +10331,7 @@
         </p:nvSpPr>
         <p:spPr>
           <a:xfrm>
-            <a:off x="762002" y="2307041"/>
+            <a:off x="758954" y="2160198"/>
             <a:ext cx="838200" cy="215444"/>
           </a:xfrm>
           <a:prstGeom prst="rect">
@@ -10370,7 +10370,7 @@
         </p:nvSpPr>
         <p:spPr>
           <a:xfrm>
-            <a:off x="1099607" y="2292076"/>
+            <a:off x="1095294" y="2169348"/>
             <a:ext cx="1765725" cy="215444"/>
           </a:xfrm>
           <a:prstGeom prst="rect">
@@ -10936,7 +10936,7 @@
         </p:nvSpPr>
         <p:spPr>
           <a:xfrm>
-            <a:off x="3004845" y="2271997"/>
+            <a:off x="3033455" y="2342241"/>
             <a:ext cx="1524000" cy="215444"/>
           </a:xfrm>
           <a:prstGeom prst="rect">
@@ -11129,7 +11129,7 @@
         <p:spPr>
           <a:xfrm>
             <a:off x="4097523" y="2870373"/>
-            <a:ext cx="0" cy="505175"/>
+            <a:ext cx="565" cy="371755"/>
           </a:xfrm>
           <a:prstGeom prst="line">
             <a:avLst/>
@@ -12006,7 +12006,7 @@
           <a:p>
             <a:r>
               <a:rPr lang="en-US" sz="800" dirty="0"/>
-              <a:t>addEvent(event : Event, allowConflict : boolean</a:t>
+              <a:t>addEvent(event : Event, allowConflict : boolean)</a:t>
             </a:r>
           </a:p>
         </p:txBody>
@@ -12083,10 +12083,10 @@
       </p:sp>
       <p:grpSp>
         <p:nvGrpSpPr>
-          <p:cNvPr id="75" name="Group 74">
-            <a:extLst>
-              <a:ext uri="{FF2B5EF4-FFF2-40B4-BE49-F238E27FC236}">
-                <a16:creationId xmlns:a16="http://schemas.microsoft.com/office/drawing/2014/main" id="{CE4621DC-EC4E-4DAC-B3EE-C071DE1CCA26}"/>
+          <p:cNvPr id="80" name="Group 79">
+            <a:extLst>
+              <a:ext uri="{FF2B5EF4-FFF2-40B4-BE49-F238E27FC236}">
+                <a16:creationId xmlns:a16="http://schemas.microsoft.com/office/drawing/2014/main" id="{41C427C3-DEF9-4D00-ACA1-8167C8E1A210}"/>
               </a:ext>
             </a:extLst>
           </p:cNvPr>
@@ -12096,9 +12096,9 @@
         <p:grpSpPr>
           <a:xfrm>
             <a:off x="381004" y="4960393"/>
-            <a:ext cx="2438396" cy="143144"/>
-            <a:chOff x="5359804" y="4101416"/>
-            <a:chExt cx="1935852" cy="77697"/>
+            <a:ext cx="2449891" cy="143144"/>
+            <a:chOff x="381004" y="4960393"/>
+            <a:chExt cx="2449891" cy="143144"/>
           </a:xfrm>
         </p:grpSpPr>
         <p:cxnSp>
@@ -12117,8 +12117,8 @@
           </p:nvCxnSpPr>
           <p:spPr>
             <a:xfrm flipH="1">
-              <a:off x="5368970" y="4124482"/>
-              <a:ext cx="1926686" cy="13783"/>
+              <a:off x="392550" y="5024005"/>
+              <a:ext cx="2438345" cy="4276"/>
             </a:xfrm>
             <a:prstGeom prst="straightConnector1">
               <a:avLst/>
@@ -12164,8 +12164,8 @@
           </p:nvCxnSpPr>
           <p:spPr>
             <a:xfrm flipV="1">
-              <a:off x="5359804" y="4101416"/>
-              <a:ext cx="93742" cy="38096"/>
+              <a:off x="381004" y="4960393"/>
+              <a:ext cx="118077" cy="70186"/>
             </a:xfrm>
             <a:prstGeom prst="line">
               <a:avLst/>
@@ -12207,8 +12207,8 @@
           </p:nvCxnSpPr>
           <p:spPr>
             <a:xfrm>
-              <a:off x="5362042" y="4139513"/>
-              <a:ext cx="93600" cy="39600"/>
+              <a:off x="383823" y="5030580"/>
+              <a:ext cx="117898" cy="72957"/>
             </a:xfrm>
             <a:prstGeom prst="line">
               <a:avLst/>
@@ -12235,6 +12235,230 @@
           </p:style>
         </p:cxnSp>
       </p:grpSp>
+      <p:grpSp>
+        <p:nvGrpSpPr>
+          <p:cNvPr id="51" name="Group 50">
+            <a:extLst>
+              <a:ext uri="{FF2B5EF4-FFF2-40B4-BE49-F238E27FC236}">
+                <a16:creationId xmlns:a16="http://schemas.microsoft.com/office/drawing/2014/main" id="{1DA55581-2724-4465-8C6A-58FFD769E3C3}"/>
+              </a:ext>
+            </a:extLst>
+          </p:cNvPr>
+          <p:cNvGrpSpPr/>
+          <p:nvPr/>
+        </p:nvGrpSpPr>
+        <p:grpSpPr>
+          <a:xfrm>
+            <a:off x="2814885" y="2203047"/>
+            <a:ext cx="3388769" cy="107146"/>
+            <a:chOff x="2814885" y="2203047"/>
+            <a:chExt cx="3388769" cy="107146"/>
+          </a:xfrm>
+        </p:grpSpPr>
+        <p:cxnSp>
+          <p:nvCxnSpPr>
+            <p:cNvPr id="62" name="Straight Arrow Connector 61">
+              <a:extLst>
+                <a:ext uri="{FF2B5EF4-FFF2-40B4-BE49-F238E27FC236}">
+                  <a16:creationId xmlns:a16="http://schemas.microsoft.com/office/drawing/2014/main" id="{88E8EA04-53AD-4730-9505-668212522FFC}"/>
+                </a:ext>
+              </a:extLst>
+            </p:cNvPr>
+            <p:cNvCxnSpPr>
+              <a:cxnSpLocks/>
+            </p:cNvCxnSpPr>
+            <p:nvPr/>
+          </p:nvCxnSpPr>
+          <p:spPr>
+            <a:xfrm flipH="1">
+              <a:off x="2830895" y="2246826"/>
+              <a:ext cx="3372759" cy="8585"/>
+            </a:xfrm>
+            <a:prstGeom prst="straightConnector1">
+              <a:avLst/>
+            </a:prstGeom>
+            <a:ln w="9525" cap="flat" cmpd="sng" algn="ctr">
+              <a:solidFill>
+                <a:schemeClr val="accent2"/>
+              </a:solidFill>
+              <a:prstDash val="dash"/>
+              <a:round/>
+              <a:headEnd type="none" w="med" len="med"/>
+              <a:tailEnd type="none" w="med" len="med"/>
+            </a:ln>
+          </p:spPr>
+          <p:style>
+            <a:lnRef idx="0">
+              <a:scrgbClr r="0" g="0" b="0"/>
+            </a:lnRef>
+            <a:fillRef idx="0">
+              <a:scrgbClr r="0" g="0" b="0"/>
+            </a:fillRef>
+            <a:effectRef idx="0">
+              <a:scrgbClr r="0" g="0" b="0"/>
+            </a:effectRef>
+            <a:fontRef idx="minor">
+              <a:schemeClr val="tx1"/>
+            </a:fontRef>
+          </p:style>
+        </p:cxnSp>
+        <p:cxnSp>
+          <p:nvCxnSpPr>
+            <p:cNvPr id="64" name="Straight Connector 63">
+              <a:extLst>
+                <a:ext uri="{FF2B5EF4-FFF2-40B4-BE49-F238E27FC236}">
+                  <a16:creationId xmlns:a16="http://schemas.microsoft.com/office/drawing/2014/main" id="{36F9E168-868E-430B-AC90-DA119B86F441}"/>
+                </a:ext>
+              </a:extLst>
+            </p:cNvPr>
+            <p:cNvCxnSpPr>
+              <a:cxnSpLocks/>
+            </p:cNvCxnSpPr>
+            <p:nvPr/>
+          </p:nvCxnSpPr>
+          <p:spPr>
+            <a:xfrm flipV="1">
+              <a:off x="2814885" y="2203047"/>
+              <a:ext cx="87868" cy="55706"/>
+            </a:xfrm>
+            <a:prstGeom prst="line">
+              <a:avLst/>
+            </a:prstGeom>
+            <a:ln>
+              <a:solidFill>
+                <a:schemeClr val="accent2"/>
+              </a:solidFill>
+            </a:ln>
+          </p:spPr>
+          <p:style>
+            <a:lnRef idx="1">
+              <a:schemeClr val="accent1"/>
+            </a:lnRef>
+            <a:fillRef idx="0">
+              <a:schemeClr val="accent1"/>
+            </a:fillRef>
+            <a:effectRef idx="0">
+              <a:schemeClr val="accent1"/>
+            </a:effectRef>
+            <a:fontRef idx="minor">
+              <a:schemeClr val="tx1"/>
+            </a:fontRef>
+          </p:style>
+        </p:cxnSp>
+        <p:cxnSp>
+          <p:nvCxnSpPr>
+            <p:cNvPr id="66" name="Straight Connector 65">
+              <a:extLst>
+                <a:ext uri="{FF2B5EF4-FFF2-40B4-BE49-F238E27FC236}">
+                  <a16:creationId xmlns:a16="http://schemas.microsoft.com/office/drawing/2014/main" id="{CE897322-8D46-42FF-A0F1-04E5DA2C4D4C}"/>
+                </a:ext>
+              </a:extLst>
+            </p:cNvPr>
+            <p:cNvCxnSpPr>
+              <a:cxnSpLocks/>
+            </p:cNvCxnSpPr>
+            <p:nvPr/>
+          </p:nvCxnSpPr>
+          <p:spPr>
+            <a:xfrm>
+              <a:off x="2818794" y="2258756"/>
+              <a:ext cx="90290" cy="51437"/>
+            </a:xfrm>
+            <a:prstGeom prst="line">
+              <a:avLst/>
+            </a:prstGeom>
+            <a:ln>
+              <a:solidFill>
+                <a:schemeClr val="accent2"/>
+              </a:solidFill>
+            </a:ln>
+          </p:spPr>
+          <p:style>
+            <a:lnRef idx="1">
+              <a:schemeClr val="accent1"/>
+            </a:lnRef>
+            <a:fillRef idx="0">
+              <a:schemeClr val="accent1"/>
+            </a:fillRef>
+            <a:effectRef idx="0">
+              <a:schemeClr val="accent1"/>
+            </a:effectRef>
+            <a:fontRef idx="minor">
+              <a:schemeClr val="tx1"/>
+            </a:fontRef>
+          </p:style>
+        </p:cxnSp>
+      </p:grpSp>
+      <p:sp>
+        <p:nvSpPr>
+          <p:cNvPr id="72" name="TextBox 71">
+            <a:extLst>
+              <a:ext uri="{FF2B5EF4-FFF2-40B4-BE49-F238E27FC236}">
+                <a16:creationId xmlns:a16="http://schemas.microsoft.com/office/drawing/2014/main" id="{0E4D02DB-DDE1-4D7E-AD78-AB899B1773C8}"/>
+              </a:ext>
+            </a:extLst>
+          </p:cNvPr>
+          <p:cNvSpPr txBox="1"/>
+          <p:nvPr/>
+        </p:nvSpPr>
+        <p:spPr>
+          <a:xfrm>
+            <a:off x="4957056" y="2202471"/>
+            <a:ext cx="683650" cy="215444"/>
+          </a:xfrm>
+          <a:prstGeom prst="rect">
+            <a:avLst/>
+          </a:prstGeom>
+          <a:noFill/>
+        </p:spPr>
+        <p:txBody>
+          <a:bodyPr wrap="square" rtlCol="0">
+            <a:spAutoFit/>
+          </a:bodyPr>
+          <a:lstStyle/>
+          <a:p>
+            <a:r>
+              <a:rPr lang="en-US" sz="800" dirty="0"/>
+              <a:t>exception</a:t>
+            </a:r>
+          </a:p>
+        </p:txBody>
+      </p:sp>
+      <p:sp>
+        <p:nvSpPr>
+          <p:cNvPr id="79" name="TextBox 78">
+            <a:extLst>
+              <a:ext uri="{FF2B5EF4-FFF2-40B4-BE49-F238E27FC236}">
+                <a16:creationId xmlns:a16="http://schemas.microsoft.com/office/drawing/2014/main" id="{56BEA755-97D3-4B0A-88D1-23114AFEFBE0}"/>
+              </a:ext>
+            </a:extLst>
+          </p:cNvPr>
+          <p:cNvSpPr txBox="1"/>
+          <p:nvPr/>
+        </p:nvSpPr>
+        <p:spPr>
+          <a:xfrm>
+            <a:off x="3918330" y="2966222"/>
+            <a:ext cx="419349" cy="523220"/>
+          </a:xfrm>
+          <a:prstGeom prst="rect">
+            <a:avLst/>
+          </a:prstGeom>
+          <a:noFill/>
+        </p:spPr>
+        <p:txBody>
+          <a:bodyPr wrap="square" rtlCol="0">
+            <a:spAutoFit/>
+          </a:bodyPr>
+          <a:lstStyle/>
+          <a:p>
+            <a:r>
+              <a:rPr lang="en-US" sz="2800" dirty="0"/>
+              <a:t>X</a:t>
+            </a:r>
+          </a:p>
+        </p:txBody>
+      </p:sp>
     </p:spTree>
     <p:extLst>
       <p:ext uri="{BB962C8B-B14F-4D97-AF65-F5344CB8AC3E}">

</xml_diff>

<commit_message>
Add overview sequence diagram in ppt
</commit_message>
<xml_diff>
--- a/docs/assets/DG Diagrams.pptx
+++ b/docs/assets/DG Diagrams.pptx
@@ -5,14 +5,16 @@
     <p:sldMasterId id="2147483648" r:id="rId1"/>
   </p:sldMasterIdLst>
   <p:notesMasterIdLst>
-    <p:notesMasterId r:id="rId7"/>
+    <p:notesMasterId r:id="rId9"/>
   </p:notesMasterIdLst>
   <p:sldIdLst>
     <p:sldId id="256" r:id="rId2"/>
-    <p:sldId id="260" r:id="rId3"/>
-    <p:sldId id="261" r:id="rId4"/>
-    <p:sldId id="262" r:id="rId5"/>
-    <p:sldId id="263" r:id="rId6"/>
+    <p:sldId id="265" r:id="rId3"/>
+    <p:sldId id="264" r:id="rId4"/>
+    <p:sldId id="260" r:id="rId5"/>
+    <p:sldId id="261" r:id="rId6"/>
+    <p:sldId id="262" r:id="rId7"/>
+    <p:sldId id="263" r:id="rId8"/>
   </p:sldIdLst>
   <p:sldSz cx="9144000" cy="6858000" type="screen4x3"/>
   <p:notesSz cx="6858000" cy="9144000"/>
@@ -545,7 +547,7 @@
           <a:p>
             <a:fld id="{8FC7C363-02C1-0D4B-B7C2-AACF0B0B3D8D}" type="slidenum">
               <a:rPr lang="en-US" smtClean="0"/>
-              <a:t>3</a:t>
+              <a:t>5</a:t>
             </a:fld>
             <a:endParaRPr lang="en-US" dirty="0"/>
           </a:p>
@@ -3607,54 +3609,10 @@
       </p:grpSpPr>
       <p:sp>
         <p:nvSpPr>
-          <p:cNvPr id="36" name="Rectangle 35">
-            <a:extLst>
-              <a:ext uri="{FF2B5EF4-FFF2-40B4-BE49-F238E27FC236}">
-                <a16:creationId xmlns:a16="http://schemas.microsoft.com/office/drawing/2014/main" id="{CE29C451-5CBE-6A42-A635-6048DE0F2F0E}"/>
-              </a:ext>
-            </a:extLst>
-          </p:cNvPr>
-          <p:cNvSpPr/>
-          <p:nvPr/>
-        </p:nvSpPr>
-        <p:spPr>
-          <a:xfrm>
-            <a:off x="533400" y="1344386"/>
-            <a:ext cx="8305800" cy="2618014"/>
-          </a:xfrm>
-          <a:prstGeom prst="rect">
-            <a:avLst/>
-          </a:prstGeom>
-        </p:spPr>
-        <p:style>
-          <a:lnRef idx="2">
-            <a:schemeClr val="dk1"/>
-          </a:lnRef>
-          <a:fillRef idx="1">
-            <a:schemeClr val="lt1"/>
-          </a:fillRef>
-          <a:effectRef idx="0">
-            <a:schemeClr val="dk1"/>
-          </a:effectRef>
-          <a:fontRef idx="minor">
-            <a:schemeClr val="dk1"/>
-          </a:fontRef>
-        </p:style>
-        <p:txBody>
-          <a:bodyPr rtlCol="0" anchor="ctr"/>
-          <a:lstStyle/>
-          <a:p>
-            <a:pPr algn="ctr"/>
-            <a:endParaRPr lang="en-US" dirty="0"/>
-          </a:p>
-        </p:txBody>
-      </p:sp>
-      <p:sp>
-        <p:nvSpPr>
-          <p:cNvPr id="38" name="TextBox 37">
-            <a:extLst>
-              <a:ext uri="{FF2B5EF4-FFF2-40B4-BE49-F238E27FC236}">
-                <a16:creationId xmlns:a16="http://schemas.microsoft.com/office/drawing/2014/main" id="{9131A343-C1BE-204F-953B-7258B0D65B88}"/>
+          <p:cNvPr id="4" name="TextBox 3">
+            <a:extLst>
+              <a:ext uri="{FF2B5EF4-FFF2-40B4-BE49-F238E27FC236}">
+                <a16:creationId xmlns:a16="http://schemas.microsoft.com/office/drawing/2014/main" id="{6C6FA32C-B981-4250-8DDB-AE0AA72029C7}"/>
               </a:ext>
             </a:extLst>
           </p:cNvPr>
@@ -3663,320 +3621,8 @@
         </p:nvSpPr>
         <p:spPr>
           <a:xfrm>
-            <a:off x="3886200" y="1447800"/>
-            <a:ext cx="1600200" cy="369332"/>
-          </a:xfrm>
-          <a:prstGeom prst="rect">
-            <a:avLst/>
-          </a:prstGeom>
-          <a:noFill/>
-        </p:spPr>
-        <p:txBody>
-          <a:bodyPr wrap="square" rtlCol="0">
-            <a:spAutoFit/>
-          </a:bodyPr>
-          <a:lstStyle/>
-          <a:p>
-            <a:r>
-              <a:rPr lang="en-US" dirty="0"/>
-              <a:t>Lesson Storage</a:t>
-            </a:r>
-          </a:p>
-        </p:txBody>
-      </p:sp>
-      <p:sp>
-        <p:nvSpPr>
-          <p:cNvPr id="39" name="Rectangle 38">
-            <a:extLst>
-              <a:ext uri="{FF2B5EF4-FFF2-40B4-BE49-F238E27FC236}">
-                <a16:creationId xmlns:a16="http://schemas.microsoft.com/office/drawing/2014/main" id="{BB6C14F9-4498-4647-8AF4-63A8DF4F2C08}"/>
-              </a:ext>
-            </a:extLst>
-          </p:cNvPr>
-          <p:cNvSpPr/>
-          <p:nvPr/>
-        </p:nvSpPr>
-        <p:spPr>
-          <a:xfrm>
-            <a:off x="762000" y="2743200"/>
-            <a:ext cx="1524000" cy="685800"/>
-          </a:xfrm>
-          <a:prstGeom prst="rect">
-            <a:avLst/>
-          </a:prstGeom>
-          <a:solidFill>
-            <a:srgbClr val="FFD609"/>
-          </a:solidFill>
-          <a:ln>
-            <a:noFill/>
-          </a:ln>
-        </p:spPr>
-        <p:style>
-          <a:lnRef idx="2">
-            <a:schemeClr val="accent1">
-              <a:shade val="50000"/>
-            </a:schemeClr>
-          </a:lnRef>
-          <a:fillRef idx="1">
-            <a:schemeClr val="accent1"/>
-          </a:fillRef>
-          <a:effectRef idx="0">
-            <a:schemeClr val="accent1"/>
-          </a:effectRef>
-          <a:fontRef idx="minor">
-            <a:schemeClr val="lt1"/>
-          </a:fontRef>
-        </p:style>
-        <p:txBody>
-          <a:bodyPr rtlCol="0" anchor="ctr"/>
-          <a:lstStyle/>
-          <a:p>
-            <a:pPr algn="ctr"/>
-            <a:r>
-              <a:rPr lang="en-US" sz="1200" u="sng" dirty="0">
-                <a:solidFill>
-                  <a:schemeClr val="tx1"/>
-                </a:solidFill>
-              </a:rPr>
-              <a:t>tutorial:Tutorial</a:t>
-            </a:r>
-          </a:p>
-        </p:txBody>
-      </p:sp>
-      <p:cxnSp>
-        <p:nvCxnSpPr>
-          <p:cNvPr id="43" name="Straight Arrow Connector 42">
-            <a:extLst>
-              <a:ext uri="{FF2B5EF4-FFF2-40B4-BE49-F238E27FC236}">
-                <a16:creationId xmlns:a16="http://schemas.microsoft.com/office/drawing/2014/main" id="{74383B7F-DDF8-5846-894C-F3FD9DA006D1}"/>
-              </a:ext>
-            </a:extLst>
-          </p:cNvPr>
-          <p:cNvCxnSpPr/>
-          <p:nvPr/>
-        </p:nvCxnSpPr>
-        <p:spPr>
-          <a:xfrm flipV="1">
-            <a:off x="7848600" y="3399064"/>
-            <a:ext cx="0" cy="1371600"/>
-          </a:xfrm>
-          <a:prstGeom prst="straightConnector1">
-            <a:avLst/>
-          </a:prstGeom>
-          <a:ln>
-            <a:tailEnd type="triangle"/>
-          </a:ln>
-        </p:spPr>
-        <p:style>
-          <a:lnRef idx="2">
-            <a:schemeClr val="accent2"/>
-          </a:lnRef>
-          <a:fillRef idx="0">
-            <a:schemeClr val="accent2"/>
-          </a:fillRef>
-          <a:effectRef idx="1">
-            <a:schemeClr val="accent2"/>
-          </a:effectRef>
-          <a:fontRef idx="minor">
-            <a:schemeClr val="tx1"/>
-          </a:fontRef>
-        </p:style>
-      </p:cxnSp>
-      <p:sp>
-        <p:nvSpPr>
-          <p:cNvPr id="56" name="Rectangle 55">
-            <a:extLst>
-              <a:ext uri="{FF2B5EF4-FFF2-40B4-BE49-F238E27FC236}">
-                <a16:creationId xmlns:a16="http://schemas.microsoft.com/office/drawing/2014/main" id="{9A2A4E4F-D2B3-C44E-AB94-AFCFC4105CDA}"/>
-              </a:ext>
-            </a:extLst>
-          </p:cNvPr>
-          <p:cNvSpPr/>
-          <p:nvPr/>
-        </p:nvSpPr>
-        <p:spPr>
-          <a:xfrm>
-            <a:off x="7200900" y="4767942"/>
-            <a:ext cx="1295400" cy="609600"/>
-          </a:xfrm>
-          <a:prstGeom prst="rect">
-            <a:avLst/>
-          </a:prstGeom>
-          <a:solidFill>
-            <a:schemeClr val="bg1"/>
-          </a:solidFill>
-          <a:ln>
-            <a:solidFill>
-              <a:schemeClr val="tx1"/>
-            </a:solidFill>
-          </a:ln>
-        </p:spPr>
-        <p:style>
-          <a:lnRef idx="2">
-            <a:schemeClr val="accent1">
-              <a:shade val="50000"/>
-            </a:schemeClr>
-          </a:lnRef>
-          <a:fillRef idx="1">
-            <a:schemeClr val="accent1"/>
-          </a:fillRef>
-          <a:effectRef idx="0">
-            <a:schemeClr val="accent1"/>
-          </a:effectRef>
-          <a:fontRef idx="minor">
-            <a:schemeClr val="lt1"/>
-          </a:fontRef>
-        </p:style>
-        <p:txBody>
-          <a:bodyPr rtlCol="0" anchor="ctr"/>
-          <a:lstStyle/>
-          <a:p>
-            <a:pPr algn="ctr"/>
-            <a:r>
-              <a:rPr lang="en-US" sz="1200" dirty="0">
-                <a:solidFill>
-                  <a:schemeClr val="tx1"/>
-                </a:solidFill>
-              </a:rPr>
-              <a:t>User adding lesson of type LAB</a:t>
-            </a:r>
-          </a:p>
-        </p:txBody>
-      </p:sp>
-      <p:sp>
-        <p:nvSpPr>
-          <p:cNvPr id="60" name="Rectangle 59">
-            <a:extLst>
-              <a:ext uri="{FF2B5EF4-FFF2-40B4-BE49-F238E27FC236}">
-                <a16:creationId xmlns:a16="http://schemas.microsoft.com/office/drawing/2014/main" id="{B2DB9B21-0081-F44F-8F1F-8A97F0CCB525}"/>
-              </a:ext>
-            </a:extLst>
-          </p:cNvPr>
-          <p:cNvSpPr/>
-          <p:nvPr/>
-        </p:nvSpPr>
-        <p:spPr>
-          <a:xfrm>
-            <a:off x="3810000" y="2743200"/>
-            <a:ext cx="1524000" cy="685800"/>
-          </a:xfrm>
-          <a:prstGeom prst="rect">
-            <a:avLst/>
-          </a:prstGeom>
-          <a:solidFill>
-            <a:srgbClr val="FFD609"/>
-          </a:solidFill>
-          <a:ln>
-            <a:noFill/>
-          </a:ln>
-        </p:spPr>
-        <p:style>
-          <a:lnRef idx="2">
-            <a:schemeClr val="accent1">
-              <a:shade val="50000"/>
-            </a:schemeClr>
-          </a:lnRef>
-          <a:fillRef idx="1">
-            <a:schemeClr val="accent1"/>
-          </a:fillRef>
-          <a:effectRef idx="0">
-            <a:schemeClr val="accent1"/>
-          </a:effectRef>
-          <a:fontRef idx="minor">
-            <a:schemeClr val="lt1"/>
-          </a:fontRef>
-        </p:style>
-        <p:txBody>
-          <a:bodyPr rtlCol="0" anchor="ctr"/>
-          <a:lstStyle/>
-          <a:p>
-            <a:pPr algn="ctr"/>
-            <a:r>
-              <a:rPr lang="en-US" sz="1200" u="sng" dirty="0">
-                <a:solidFill>
-                  <a:schemeClr val="tx1"/>
-                </a:solidFill>
-              </a:rPr>
-              <a:t>lecture:Lecture</a:t>
-            </a:r>
-          </a:p>
-        </p:txBody>
-      </p:sp>
-      <p:sp>
-        <p:nvSpPr>
-          <p:cNvPr id="61" name="Rectangle 60">
-            <a:extLst>
-              <a:ext uri="{FF2B5EF4-FFF2-40B4-BE49-F238E27FC236}">
-                <a16:creationId xmlns:a16="http://schemas.microsoft.com/office/drawing/2014/main" id="{8D2D0FE3-3C89-F14F-87AE-0DD371D6A0B6}"/>
-              </a:ext>
-            </a:extLst>
-          </p:cNvPr>
-          <p:cNvSpPr/>
-          <p:nvPr/>
-        </p:nvSpPr>
-        <p:spPr>
-          <a:xfrm>
-            <a:off x="7086600" y="2713264"/>
-            <a:ext cx="1524000" cy="685800"/>
-          </a:xfrm>
-          <a:prstGeom prst="rect">
-            <a:avLst/>
-          </a:prstGeom>
-          <a:solidFill>
-            <a:srgbClr val="FFD609"/>
-          </a:solidFill>
-          <a:ln>
-            <a:noFill/>
-          </a:ln>
-        </p:spPr>
-        <p:style>
-          <a:lnRef idx="2">
-            <a:schemeClr val="accent1">
-              <a:shade val="50000"/>
-            </a:schemeClr>
-          </a:lnRef>
-          <a:fillRef idx="1">
-            <a:schemeClr val="accent1"/>
-          </a:fillRef>
-          <a:effectRef idx="0">
-            <a:schemeClr val="accent1"/>
-          </a:effectRef>
-          <a:fontRef idx="minor">
-            <a:schemeClr val="lt1"/>
-          </a:fontRef>
-        </p:style>
-        <p:txBody>
-          <a:bodyPr rtlCol="0" anchor="ctr"/>
-          <a:lstStyle/>
-          <a:p>
-            <a:pPr algn="ctr"/>
-            <a:r>
-              <a:rPr lang="en-US" sz="1200" u="sng" dirty="0">
-                <a:solidFill>
-                  <a:schemeClr val="tx1"/>
-                </a:solidFill>
-              </a:rPr>
-              <a:t>lab:Lab</a:t>
-            </a:r>
-          </a:p>
-        </p:txBody>
-      </p:sp>
-      <p:sp>
-        <p:nvSpPr>
-          <p:cNvPr id="62" name="TextBox 61">
-            <a:extLst>
-              <a:ext uri="{FF2B5EF4-FFF2-40B4-BE49-F238E27FC236}">
-                <a16:creationId xmlns:a16="http://schemas.microsoft.com/office/drawing/2014/main" id="{5F8626F6-E151-2948-8567-81C7EB835F07}"/>
-              </a:ext>
-            </a:extLst>
-          </p:cNvPr>
-          <p:cNvSpPr txBox="1"/>
-          <p:nvPr/>
-        </p:nvSpPr>
-        <p:spPr>
-          <a:xfrm>
-            <a:off x="3676308" y="411966"/>
-            <a:ext cx="1530355" cy="369332"/>
+            <a:off x="4035474" y="22860"/>
+            <a:ext cx="1073051" cy="369332"/>
           </a:xfrm>
           <a:prstGeom prst="rect">
             <a:avLst/>
@@ -3991,7 +3637,7 @@
           <a:p>
             <a:r>
               <a:rPr lang="en-US" dirty="0"/>
-              <a:t>Timetable add</a:t>
+              <a:t>Overview</a:t>
             </a:r>
           </a:p>
         </p:txBody>
@@ -3999,7 +3645,7 @@
     </p:spTree>
     <p:extLst>
       <p:ext uri="{BB962C8B-B14F-4D97-AF65-F5344CB8AC3E}">
-        <p14:creationId xmlns:p14="http://schemas.microsoft.com/office/powerpoint/2010/main" val="3654226981"/>
+        <p14:creationId xmlns:p14="http://schemas.microsoft.com/office/powerpoint/2010/main" val="3560462433"/>
       </p:ext>
     </p:extLst>
   </p:cSld>
@@ -4028,6 +3674,3341 @@
       </p:grpSpPr>
       <p:sp>
         <p:nvSpPr>
+          <p:cNvPr id="34" name="Rectangle 33">
+            <a:extLst>
+              <a:ext uri="{FF2B5EF4-FFF2-40B4-BE49-F238E27FC236}">
+                <a16:creationId xmlns:a16="http://schemas.microsoft.com/office/drawing/2014/main" id="{59488DBF-9CA3-41EA-82BF-CAA83A79BCD0}"/>
+              </a:ext>
+            </a:extLst>
+          </p:cNvPr>
+          <p:cNvSpPr/>
+          <p:nvPr/>
+        </p:nvSpPr>
+        <p:spPr>
+          <a:xfrm>
+            <a:off x="152400" y="1625516"/>
+            <a:ext cx="8686798" cy="4127584"/>
+          </a:xfrm>
+          <a:prstGeom prst="rect">
+            <a:avLst/>
+          </a:prstGeom>
+          <a:solidFill>
+            <a:schemeClr val="bg1"/>
+          </a:solidFill>
+        </p:spPr>
+        <p:style>
+          <a:lnRef idx="2">
+            <a:schemeClr val="accent6">
+              <a:shade val="50000"/>
+            </a:schemeClr>
+          </a:lnRef>
+          <a:fillRef idx="1">
+            <a:schemeClr val="accent6"/>
+          </a:fillRef>
+          <a:effectRef idx="0">
+            <a:schemeClr val="accent6"/>
+          </a:effectRef>
+          <a:fontRef idx="minor">
+            <a:schemeClr val="lt1"/>
+          </a:fontRef>
+        </p:style>
+        <p:txBody>
+          <a:bodyPr rtlCol="0" anchor="ctr"/>
+          <a:lstStyle/>
+          <a:p>
+            <a:pPr algn="ctr"/>
+            <a:endParaRPr lang="en-SG" dirty="0">
+              <a:solidFill>
+                <a:schemeClr val="bg1"/>
+              </a:solidFill>
+            </a:endParaRPr>
+          </a:p>
+        </p:txBody>
+      </p:sp>
+      <p:sp>
+        <p:nvSpPr>
+          <p:cNvPr id="4" name="TextBox 3">
+            <a:extLst>
+              <a:ext uri="{FF2B5EF4-FFF2-40B4-BE49-F238E27FC236}">
+                <a16:creationId xmlns:a16="http://schemas.microsoft.com/office/drawing/2014/main" id="{AB01398A-E7D3-4AFF-AF7C-CE283AA3DB74}"/>
+              </a:ext>
+            </a:extLst>
+          </p:cNvPr>
+          <p:cNvSpPr txBox="1"/>
+          <p:nvPr/>
+        </p:nvSpPr>
+        <p:spPr>
+          <a:xfrm>
+            <a:off x="4035474" y="22860"/>
+            <a:ext cx="1073051" cy="369332"/>
+          </a:xfrm>
+          <a:prstGeom prst="rect">
+            <a:avLst/>
+          </a:prstGeom>
+          <a:noFill/>
+        </p:spPr>
+        <p:txBody>
+          <a:bodyPr wrap="none" rtlCol="0">
+            <a:spAutoFit/>
+          </a:bodyPr>
+          <a:lstStyle/>
+          <a:p>
+            <a:r>
+              <a:rPr lang="en-US" dirty="0"/>
+              <a:t>Overview</a:t>
+            </a:r>
+          </a:p>
+        </p:txBody>
+      </p:sp>
+      <p:grpSp>
+        <p:nvGrpSpPr>
+          <p:cNvPr id="20" name="Group 19">
+            <a:extLst>
+              <a:ext uri="{FF2B5EF4-FFF2-40B4-BE49-F238E27FC236}">
+                <a16:creationId xmlns:a16="http://schemas.microsoft.com/office/drawing/2014/main" id="{13668CAD-A79C-4539-873D-916CEB77161C}"/>
+              </a:ext>
+            </a:extLst>
+          </p:cNvPr>
+          <p:cNvGrpSpPr/>
+          <p:nvPr/>
+        </p:nvGrpSpPr>
+        <p:grpSpPr>
+          <a:xfrm>
+            <a:off x="1337203" y="516136"/>
+            <a:ext cx="539097" cy="939716"/>
+            <a:chOff x="278130" y="457200"/>
+            <a:chExt cx="539097" cy="939716"/>
+          </a:xfrm>
+        </p:grpSpPr>
+        <p:sp>
+          <p:nvSpPr>
+            <p:cNvPr id="5" name="Oval 4">
+              <a:extLst>
+                <a:ext uri="{FF2B5EF4-FFF2-40B4-BE49-F238E27FC236}">
+                  <a16:creationId xmlns:a16="http://schemas.microsoft.com/office/drawing/2014/main" id="{DD022FD8-EB40-4A63-BDFA-501A427334DC}"/>
+                </a:ext>
+              </a:extLst>
+            </p:cNvPr>
+            <p:cNvSpPr/>
+            <p:nvPr/>
+          </p:nvSpPr>
+          <p:spPr>
+            <a:xfrm>
+              <a:off x="365760" y="457200"/>
+              <a:ext cx="228600" cy="228600"/>
+            </a:xfrm>
+            <a:prstGeom prst="ellipse">
+              <a:avLst/>
+            </a:prstGeom>
+          </p:spPr>
+          <p:style>
+            <a:lnRef idx="2">
+              <a:schemeClr val="dk1">
+                <a:shade val="50000"/>
+              </a:schemeClr>
+            </a:lnRef>
+            <a:fillRef idx="1">
+              <a:schemeClr val="dk1"/>
+            </a:fillRef>
+            <a:effectRef idx="0">
+              <a:schemeClr val="dk1"/>
+            </a:effectRef>
+            <a:fontRef idx="minor">
+              <a:schemeClr val="lt1"/>
+            </a:fontRef>
+          </p:style>
+          <p:txBody>
+            <a:bodyPr rtlCol="0" anchor="ctr"/>
+            <a:lstStyle/>
+            <a:p>
+              <a:pPr algn="ctr"/>
+              <a:endParaRPr lang="en-SG"/>
+            </a:p>
+          </p:txBody>
+        </p:sp>
+        <p:cxnSp>
+          <p:nvCxnSpPr>
+            <p:cNvPr id="7" name="Straight Connector 6">
+              <a:extLst>
+                <a:ext uri="{FF2B5EF4-FFF2-40B4-BE49-F238E27FC236}">
+                  <a16:creationId xmlns:a16="http://schemas.microsoft.com/office/drawing/2014/main" id="{D1ECCEDF-9AE0-4019-A374-E70AA4F9C1C1}"/>
+                </a:ext>
+              </a:extLst>
+            </p:cNvPr>
+            <p:cNvCxnSpPr>
+              <a:cxnSpLocks/>
+              <a:stCxn id="5" idx="4"/>
+            </p:cNvCxnSpPr>
+            <p:nvPr/>
+          </p:nvCxnSpPr>
+          <p:spPr>
+            <a:xfrm>
+              <a:off x="480060" y="685800"/>
+              <a:ext cx="0" cy="304800"/>
+            </a:xfrm>
+            <a:prstGeom prst="line">
+              <a:avLst/>
+            </a:prstGeom>
+          </p:spPr>
+          <p:style>
+            <a:lnRef idx="2">
+              <a:schemeClr val="dk1"/>
+            </a:lnRef>
+            <a:fillRef idx="0">
+              <a:schemeClr val="dk1"/>
+            </a:fillRef>
+            <a:effectRef idx="1">
+              <a:schemeClr val="dk1"/>
+            </a:effectRef>
+            <a:fontRef idx="minor">
+              <a:schemeClr val="tx1"/>
+            </a:fontRef>
+          </p:style>
+        </p:cxnSp>
+        <p:cxnSp>
+          <p:nvCxnSpPr>
+            <p:cNvPr id="10" name="Straight Connector 9">
+              <a:extLst>
+                <a:ext uri="{FF2B5EF4-FFF2-40B4-BE49-F238E27FC236}">
+                  <a16:creationId xmlns:a16="http://schemas.microsoft.com/office/drawing/2014/main" id="{756DDFFC-444A-4392-A9CC-0A7099348F43}"/>
+                </a:ext>
+              </a:extLst>
+            </p:cNvPr>
+            <p:cNvCxnSpPr>
+              <a:cxnSpLocks/>
+            </p:cNvCxnSpPr>
+            <p:nvPr/>
+          </p:nvCxnSpPr>
+          <p:spPr>
+            <a:xfrm flipH="1">
+              <a:off x="321945" y="838200"/>
+              <a:ext cx="316230" cy="0"/>
+            </a:xfrm>
+            <a:prstGeom prst="line">
+              <a:avLst/>
+            </a:prstGeom>
+          </p:spPr>
+          <p:style>
+            <a:lnRef idx="2">
+              <a:schemeClr val="dk1"/>
+            </a:lnRef>
+            <a:fillRef idx="0">
+              <a:schemeClr val="dk1"/>
+            </a:fillRef>
+            <a:effectRef idx="1">
+              <a:schemeClr val="dk1"/>
+            </a:effectRef>
+            <a:fontRef idx="minor">
+              <a:schemeClr val="tx1"/>
+            </a:fontRef>
+          </p:style>
+        </p:cxnSp>
+        <p:cxnSp>
+          <p:nvCxnSpPr>
+            <p:cNvPr id="13" name="Straight Connector 12">
+              <a:extLst>
+                <a:ext uri="{FF2B5EF4-FFF2-40B4-BE49-F238E27FC236}">
+                  <a16:creationId xmlns:a16="http://schemas.microsoft.com/office/drawing/2014/main" id="{100985B1-3239-4C19-9DA8-7FBC3790E71A}"/>
+                </a:ext>
+              </a:extLst>
+            </p:cNvPr>
+            <p:cNvCxnSpPr>
+              <a:cxnSpLocks/>
+            </p:cNvCxnSpPr>
+            <p:nvPr/>
+          </p:nvCxnSpPr>
+          <p:spPr>
+            <a:xfrm flipH="1">
+              <a:off x="335280" y="971550"/>
+              <a:ext cx="152400" cy="190500"/>
+            </a:xfrm>
+            <a:prstGeom prst="line">
+              <a:avLst/>
+            </a:prstGeom>
+          </p:spPr>
+          <p:style>
+            <a:lnRef idx="2">
+              <a:schemeClr val="dk1"/>
+            </a:lnRef>
+            <a:fillRef idx="0">
+              <a:schemeClr val="dk1"/>
+            </a:fillRef>
+            <a:effectRef idx="1">
+              <a:schemeClr val="dk1"/>
+            </a:effectRef>
+            <a:fontRef idx="minor">
+              <a:schemeClr val="tx1"/>
+            </a:fontRef>
+          </p:style>
+        </p:cxnSp>
+        <p:cxnSp>
+          <p:nvCxnSpPr>
+            <p:cNvPr id="16" name="Straight Connector 15">
+              <a:extLst>
+                <a:ext uri="{FF2B5EF4-FFF2-40B4-BE49-F238E27FC236}">
+                  <a16:creationId xmlns:a16="http://schemas.microsoft.com/office/drawing/2014/main" id="{6233D31B-D15C-45F4-917F-7FD73822949F}"/>
+                </a:ext>
+              </a:extLst>
+            </p:cNvPr>
+            <p:cNvCxnSpPr>
+              <a:cxnSpLocks/>
+            </p:cNvCxnSpPr>
+            <p:nvPr/>
+          </p:nvCxnSpPr>
+          <p:spPr>
+            <a:xfrm>
+              <a:off x="480060" y="971550"/>
+              <a:ext cx="165735" cy="190500"/>
+            </a:xfrm>
+            <a:prstGeom prst="line">
+              <a:avLst/>
+            </a:prstGeom>
+          </p:spPr>
+          <p:style>
+            <a:lnRef idx="2">
+              <a:schemeClr val="dk1"/>
+            </a:lnRef>
+            <a:fillRef idx="0">
+              <a:schemeClr val="dk1"/>
+            </a:fillRef>
+            <a:effectRef idx="1">
+              <a:schemeClr val="dk1"/>
+            </a:effectRef>
+            <a:fontRef idx="minor">
+              <a:schemeClr val="tx1"/>
+            </a:fontRef>
+          </p:style>
+        </p:cxnSp>
+        <p:sp>
+          <p:nvSpPr>
+            <p:cNvPr id="19" name="TextBox 18">
+              <a:extLst>
+                <a:ext uri="{FF2B5EF4-FFF2-40B4-BE49-F238E27FC236}">
+                  <a16:creationId xmlns:a16="http://schemas.microsoft.com/office/drawing/2014/main" id="{EDFBDA48-1B3C-456D-8116-0D53BAFC6C39}"/>
+                </a:ext>
+              </a:extLst>
+            </p:cNvPr>
+            <p:cNvSpPr txBox="1"/>
+            <p:nvPr/>
+          </p:nvSpPr>
+          <p:spPr>
+            <a:xfrm>
+              <a:off x="278130" y="1143000"/>
+              <a:ext cx="539097" cy="253916"/>
+            </a:xfrm>
+            <a:prstGeom prst="rect">
+              <a:avLst/>
+            </a:prstGeom>
+            <a:noFill/>
+          </p:spPr>
+          <p:txBody>
+            <a:bodyPr wrap="square" rtlCol="0">
+              <a:spAutoFit/>
+            </a:bodyPr>
+            <a:lstStyle/>
+            <a:p>
+              <a:r>
+                <a:rPr lang="en-US" sz="1050" dirty="0"/>
+                <a:t>User</a:t>
+              </a:r>
+            </a:p>
+          </p:txBody>
+        </p:sp>
+      </p:grpSp>
+      <p:cxnSp>
+        <p:nvCxnSpPr>
+          <p:cNvPr id="22" name="Straight Connector 21">
+            <a:extLst>
+              <a:ext uri="{FF2B5EF4-FFF2-40B4-BE49-F238E27FC236}">
+                <a16:creationId xmlns:a16="http://schemas.microsoft.com/office/drawing/2014/main" id="{5AB19DF7-456C-4B9F-AA35-D57CB05255E5}"/>
+              </a:ext>
+            </a:extLst>
+          </p:cNvPr>
+          <p:cNvCxnSpPr>
+            <a:cxnSpLocks/>
+          </p:cNvCxnSpPr>
+          <p:nvPr/>
+        </p:nvCxnSpPr>
+        <p:spPr>
+          <a:xfrm>
+            <a:off x="1546753" y="1455852"/>
+            <a:ext cx="0" cy="5384884"/>
+          </a:xfrm>
+          <a:prstGeom prst="line">
+            <a:avLst/>
+          </a:prstGeom>
+          <a:ln w="9525" cap="flat" cmpd="sng" algn="ctr">
+            <a:solidFill>
+              <a:schemeClr val="accent2"/>
+            </a:solidFill>
+            <a:prstDash val="dash"/>
+            <a:round/>
+            <a:headEnd type="none" w="med" len="med"/>
+            <a:tailEnd type="none" w="med" len="med"/>
+          </a:ln>
+        </p:spPr>
+        <p:style>
+          <a:lnRef idx="0">
+            <a:scrgbClr r="0" g="0" b="0"/>
+          </a:lnRef>
+          <a:fillRef idx="0">
+            <a:scrgbClr r="0" g="0" b="0"/>
+          </a:fillRef>
+          <a:effectRef idx="0">
+            <a:scrgbClr r="0" g="0" b="0"/>
+          </a:effectRef>
+          <a:fontRef idx="minor">
+            <a:schemeClr val="tx1"/>
+          </a:fontRef>
+        </p:style>
+      </p:cxnSp>
+      <p:sp>
+        <p:nvSpPr>
+          <p:cNvPr id="25" name="Rectangle 24">
+            <a:extLst>
+              <a:ext uri="{FF2B5EF4-FFF2-40B4-BE49-F238E27FC236}">
+                <a16:creationId xmlns:a16="http://schemas.microsoft.com/office/drawing/2014/main" id="{144CD229-95BF-473D-9B41-8E50F4D515BC}"/>
+              </a:ext>
+            </a:extLst>
+          </p:cNvPr>
+          <p:cNvSpPr/>
+          <p:nvPr/>
+        </p:nvSpPr>
+        <p:spPr>
+          <a:xfrm>
+            <a:off x="2384107" y="800100"/>
+            <a:ext cx="1143000" cy="304800"/>
+          </a:xfrm>
+          <a:prstGeom prst="rect">
+            <a:avLst/>
+          </a:prstGeom>
+          <a:solidFill>
+            <a:schemeClr val="accent1">
+              <a:lumMod val="50000"/>
+            </a:schemeClr>
+          </a:solidFill>
+          <a:ln w="12700">
+            <a:solidFill>
+              <a:schemeClr val="accent2"/>
+            </a:solidFill>
+          </a:ln>
+        </p:spPr>
+        <p:style>
+          <a:lnRef idx="2">
+            <a:schemeClr val="accent1">
+              <a:shade val="50000"/>
+            </a:schemeClr>
+          </a:lnRef>
+          <a:fillRef idx="1">
+            <a:schemeClr val="accent1"/>
+          </a:fillRef>
+          <a:effectRef idx="0">
+            <a:schemeClr val="accent1"/>
+          </a:effectRef>
+          <a:fontRef idx="minor">
+            <a:schemeClr val="lt1"/>
+          </a:fontRef>
+        </p:style>
+        <p:txBody>
+          <a:bodyPr rtlCol="0" anchor="ctr"/>
+          <a:lstStyle/>
+          <a:p>
+            <a:pPr algn="ctr"/>
+            <a:r>
+              <a:rPr lang="en-US" sz="1050" dirty="0"/>
+              <a:t>:Kolinux</a:t>
+            </a:r>
+          </a:p>
+        </p:txBody>
+      </p:sp>
+      <p:sp>
+        <p:nvSpPr>
+          <p:cNvPr id="26" name="Rectangle 25">
+            <a:extLst>
+              <a:ext uri="{FF2B5EF4-FFF2-40B4-BE49-F238E27FC236}">
+                <a16:creationId xmlns:a16="http://schemas.microsoft.com/office/drawing/2014/main" id="{80277277-71BF-405C-8DCE-87EC7C437CFF}"/>
+              </a:ext>
+            </a:extLst>
+          </p:cNvPr>
+          <p:cNvSpPr/>
+          <p:nvPr/>
+        </p:nvSpPr>
+        <p:spPr>
+          <a:xfrm>
+            <a:off x="3803808" y="800099"/>
+            <a:ext cx="1143000" cy="304800"/>
+          </a:xfrm>
+          <a:prstGeom prst="rect">
+            <a:avLst/>
+          </a:prstGeom>
+          <a:solidFill>
+            <a:schemeClr val="accent1">
+              <a:lumMod val="50000"/>
+            </a:schemeClr>
+          </a:solidFill>
+          <a:ln w="12700">
+            <a:solidFill>
+              <a:schemeClr val="accent2"/>
+            </a:solidFill>
+          </a:ln>
+        </p:spPr>
+        <p:style>
+          <a:lnRef idx="2">
+            <a:schemeClr val="accent1">
+              <a:shade val="50000"/>
+            </a:schemeClr>
+          </a:lnRef>
+          <a:fillRef idx="1">
+            <a:schemeClr val="accent1"/>
+          </a:fillRef>
+          <a:effectRef idx="0">
+            <a:schemeClr val="accent1"/>
+          </a:effectRef>
+          <a:fontRef idx="minor">
+            <a:schemeClr val="lt1"/>
+          </a:fontRef>
+        </p:style>
+        <p:txBody>
+          <a:bodyPr rtlCol="0" anchor="ctr"/>
+          <a:lstStyle/>
+          <a:p>
+            <a:pPr algn="ctr"/>
+            <a:r>
+              <a:rPr lang="en-US" sz="1050" dirty="0"/>
+              <a:t>:Parser</a:t>
+            </a:r>
+          </a:p>
+        </p:txBody>
+      </p:sp>
+      <p:sp>
+        <p:nvSpPr>
+          <p:cNvPr id="27" name="Rectangle 26">
+            <a:extLst>
+              <a:ext uri="{FF2B5EF4-FFF2-40B4-BE49-F238E27FC236}">
+                <a16:creationId xmlns:a16="http://schemas.microsoft.com/office/drawing/2014/main" id="{8C4218FB-FCA0-4587-AE0F-79A8B70972BA}"/>
+              </a:ext>
+            </a:extLst>
+          </p:cNvPr>
+          <p:cNvSpPr/>
+          <p:nvPr/>
+        </p:nvSpPr>
+        <p:spPr>
+          <a:xfrm>
+            <a:off x="5492797" y="2362200"/>
+            <a:ext cx="1143000" cy="304800"/>
+          </a:xfrm>
+          <a:prstGeom prst="rect">
+            <a:avLst/>
+          </a:prstGeom>
+          <a:solidFill>
+            <a:schemeClr val="accent1">
+              <a:lumMod val="50000"/>
+            </a:schemeClr>
+          </a:solidFill>
+          <a:ln w="12700">
+            <a:solidFill>
+              <a:schemeClr val="accent2"/>
+            </a:solidFill>
+          </a:ln>
+        </p:spPr>
+        <p:style>
+          <a:lnRef idx="2">
+            <a:schemeClr val="accent1">
+              <a:shade val="50000"/>
+            </a:schemeClr>
+          </a:lnRef>
+          <a:fillRef idx="1">
+            <a:schemeClr val="accent1"/>
+          </a:fillRef>
+          <a:effectRef idx="0">
+            <a:schemeClr val="accent1"/>
+          </a:effectRef>
+          <a:fontRef idx="minor">
+            <a:schemeClr val="lt1"/>
+          </a:fontRef>
+        </p:style>
+        <p:txBody>
+          <a:bodyPr rtlCol="0" anchor="ctr"/>
+          <a:lstStyle/>
+          <a:p>
+            <a:pPr algn="ctr"/>
+            <a:r>
+              <a:rPr lang="en-US" sz="1050" dirty="0"/>
+              <a:t>:</a:t>
+            </a:r>
+            <a:r>
+              <a:rPr lang="en-US" sz="1050" dirty="0" err="1"/>
+              <a:t>XYZCommand</a:t>
+            </a:r>
+            <a:endParaRPr lang="en-US" sz="1050" dirty="0"/>
+          </a:p>
+        </p:txBody>
+      </p:sp>
+      <p:sp>
+        <p:nvSpPr>
+          <p:cNvPr id="28" name="Rectangle 27">
+            <a:extLst>
+              <a:ext uri="{FF2B5EF4-FFF2-40B4-BE49-F238E27FC236}">
+                <a16:creationId xmlns:a16="http://schemas.microsoft.com/office/drawing/2014/main" id="{DCF5AEAE-D9E5-410F-91A9-96890825B18F}"/>
+              </a:ext>
+            </a:extLst>
+          </p:cNvPr>
+          <p:cNvSpPr/>
+          <p:nvPr/>
+        </p:nvSpPr>
+        <p:spPr>
+          <a:xfrm>
+            <a:off x="7233078" y="3376137"/>
+            <a:ext cx="1143000" cy="304800"/>
+          </a:xfrm>
+          <a:prstGeom prst="rect">
+            <a:avLst/>
+          </a:prstGeom>
+          <a:solidFill>
+            <a:schemeClr val="accent1">
+              <a:lumMod val="50000"/>
+            </a:schemeClr>
+          </a:solidFill>
+          <a:ln w="12700">
+            <a:solidFill>
+              <a:schemeClr val="accent2"/>
+            </a:solidFill>
+          </a:ln>
+        </p:spPr>
+        <p:style>
+          <a:lnRef idx="2">
+            <a:schemeClr val="accent1">
+              <a:shade val="50000"/>
+            </a:schemeClr>
+          </a:lnRef>
+          <a:fillRef idx="1">
+            <a:schemeClr val="accent1"/>
+          </a:fillRef>
+          <a:effectRef idx="0">
+            <a:schemeClr val="accent1"/>
+          </a:effectRef>
+          <a:fontRef idx="minor">
+            <a:schemeClr val="lt1"/>
+          </a:fontRef>
+        </p:style>
+        <p:txBody>
+          <a:bodyPr rtlCol="0" anchor="ctr"/>
+          <a:lstStyle/>
+          <a:p>
+            <a:pPr algn="ctr"/>
+            <a:r>
+              <a:rPr lang="en-US" sz="1050" dirty="0"/>
+              <a:t>:</a:t>
+            </a:r>
+            <a:r>
+              <a:rPr lang="en-US" sz="1050" dirty="0" err="1"/>
+              <a:t>CommandResult</a:t>
+            </a:r>
+            <a:endParaRPr lang="en-US" sz="1050" dirty="0"/>
+          </a:p>
+        </p:txBody>
+      </p:sp>
+      <p:cxnSp>
+        <p:nvCxnSpPr>
+          <p:cNvPr id="29" name="Straight Connector 28">
+            <a:extLst>
+              <a:ext uri="{FF2B5EF4-FFF2-40B4-BE49-F238E27FC236}">
+                <a16:creationId xmlns:a16="http://schemas.microsoft.com/office/drawing/2014/main" id="{3F1773EC-4635-4141-8F60-F437ED0B3445}"/>
+              </a:ext>
+            </a:extLst>
+          </p:cNvPr>
+          <p:cNvCxnSpPr>
+            <a:cxnSpLocks/>
+          </p:cNvCxnSpPr>
+          <p:nvPr/>
+        </p:nvCxnSpPr>
+        <p:spPr>
+          <a:xfrm>
+            <a:off x="2955607" y="1104900"/>
+            <a:ext cx="0" cy="5715000"/>
+          </a:xfrm>
+          <a:prstGeom prst="line">
+            <a:avLst/>
+          </a:prstGeom>
+          <a:ln w="9525" cap="flat" cmpd="sng" algn="ctr">
+            <a:solidFill>
+              <a:schemeClr val="accent2"/>
+            </a:solidFill>
+            <a:prstDash val="dash"/>
+            <a:round/>
+            <a:headEnd type="none" w="med" len="med"/>
+            <a:tailEnd type="none" w="med" len="med"/>
+          </a:ln>
+        </p:spPr>
+        <p:style>
+          <a:lnRef idx="0">
+            <a:scrgbClr r="0" g="0" b="0"/>
+          </a:lnRef>
+          <a:fillRef idx="0">
+            <a:scrgbClr r="0" g="0" b="0"/>
+          </a:fillRef>
+          <a:effectRef idx="0">
+            <a:scrgbClr r="0" g="0" b="0"/>
+          </a:effectRef>
+          <a:fontRef idx="minor">
+            <a:schemeClr val="tx1"/>
+          </a:fontRef>
+        </p:style>
+      </p:cxnSp>
+      <p:sp>
+        <p:nvSpPr>
+          <p:cNvPr id="35" name="Rectangle: Single Corner Snipped 34">
+            <a:extLst>
+              <a:ext uri="{FF2B5EF4-FFF2-40B4-BE49-F238E27FC236}">
+                <a16:creationId xmlns:a16="http://schemas.microsoft.com/office/drawing/2014/main" id="{EBB89939-4BD8-49D6-835A-7C058C45297F}"/>
+              </a:ext>
+            </a:extLst>
+          </p:cNvPr>
+          <p:cNvSpPr/>
+          <p:nvPr/>
+        </p:nvSpPr>
+        <p:spPr>
+          <a:xfrm rot="10800000" flipH="1">
+            <a:off x="152399" y="1625515"/>
+            <a:ext cx="457197" cy="279484"/>
+          </a:xfrm>
+          <a:prstGeom prst="snip1Rect">
+            <a:avLst>
+              <a:gd name="adj" fmla="val 50000"/>
+            </a:avLst>
+          </a:prstGeom>
+        </p:spPr>
+        <p:style>
+          <a:lnRef idx="2">
+            <a:schemeClr val="accent1">
+              <a:shade val="50000"/>
+            </a:schemeClr>
+          </a:lnRef>
+          <a:fillRef idx="1">
+            <a:schemeClr val="accent1"/>
+          </a:fillRef>
+          <a:effectRef idx="0">
+            <a:schemeClr val="accent1"/>
+          </a:effectRef>
+          <a:fontRef idx="minor">
+            <a:schemeClr val="lt1"/>
+          </a:fontRef>
+        </p:style>
+        <p:txBody>
+          <a:bodyPr rtlCol="0" anchor="ctr"/>
+          <a:lstStyle/>
+          <a:p>
+            <a:pPr algn="ctr"/>
+            <a:endParaRPr lang="en-SG" dirty="0"/>
+          </a:p>
+        </p:txBody>
+      </p:sp>
+      <p:sp>
+        <p:nvSpPr>
+          <p:cNvPr id="36" name="TextBox 35">
+            <a:extLst>
+              <a:ext uri="{FF2B5EF4-FFF2-40B4-BE49-F238E27FC236}">
+                <a16:creationId xmlns:a16="http://schemas.microsoft.com/office/drawing/2014/main" id="{645229FB-EFD6-447B-91B2-D88921A05CCC}"/>
+              </a:ext>
+            </a:extLst>
+          </p:cNvPr>
+          <p:cNvSpPr txBox="1"/>
+          <p:nvPr/>
+        </p:nvSpPr>
+        <p:spPr>
+          <a:xfrm>
+            <a:off x="136628" y="1625514"/>
+            <a:ext cx="784755" cy="253916"/>
+          </a:xfrm>
+          <a:prstGeom prst="rect">
+            <a:avLst/>
+          </a:prstGeom>
+          <a:noFill/>
+        </p:spPr>
+        <p:txBody>
+          <a:bodyPr wrap="square" rtlCol="0">
+            <a:spAutoFit/>
+          </a:bodyPr>
+          <a:lstStyle/>
+          <a:p>
+            <a:r>
+              <a:rPr lang="en-US" sz="1050" b="1" dirty="0">
+                <a:solidFill>
+                  <a:schemeClr val="bg1"/>
+                </a:solidFill>
+              </a:rPr>
+              <a:t>loop</a:t>
+            </a:r>
+          </a:p>
+        </p:txBody>
+      </p:sp>
+      <p:sp>
+        <p:nvSpPr>
+          <p:cNvPr id="37" name="TextBox 36">
+            <a:extLst>
+              <a:ext uri="{FF2B5EF4-FFF2-40B4-BE49-F238E27FC236}">
+                <a16:creationId xmlns:a16="http://schemas.microsoft.com/office/drawing/2014/main" id="{AA18B9BA-E8E0-4EDA-A877-8944C27C31FA}"/>
+              </a:ext>
+            </a:extLst>
+          </p:cNvPr>
+          <p:cNvSpPr txBox="1"/>
+          <p:nvPr/>
+        </p:nvSpPr>
+        <p:spPr>
+          <a:xfrm>
+            <a:off x="574625" y="1626201"/>
+            <a:ext cx="918258" cy="507831"/>
+          </a:xfrm>
+          <a:prstGeom prst="rect">
+            <a:avLst/>
+          </a:prstGeom>
+          <a:noFill/>
+        </p:spPr>
+        <p:txBody>
+          <a:bodyPr wrap="square" rtlCol="0">
+            <a:spAutoFit/>
+          </a:bodyPr>
+          <a:lstStyle/>
+          <a:p>
+            <a:r>
+              <a:rPr lang="en-US" sz="900" b="1" dirty="0"/>
+              <a:t>[Command not instance of ExitCommand]</a:t>
+            </a:r>
+          </a:p>
+        </p:txBody>
+      </p:sp>
+      <p:cxnSp>
+        <p:nvCxnSpPr>
+          <p:cNvPr id="38" name="Straight Arrow Connector 37">
+            <a:extLst>
+              <a:ext uri="{FF2B5EF4-FFF2-40B4-BE49-F238E27FC236}">
+                <a16:creationId xmlns:a16="http://schemas.microsoft.com/office/drawing/2014/main" id="{97C1A165-CF2D-496C-A80C-8B0188B18570}"/>
+              </a:ext>
+            </a:extLst>
+          </p:cNvPr>
+          <p:cNvCxnSpPr>
+            <a:cxnSpLocks/>
+          </p:cNvCxnSpPr>
+          <p:nvPr/>
+        </p:nvCxnSpPr>
+        <p:spPr>
+          <a:xfrm>
+            <a:off x="1546753" y="1879430"/>
+            <a:ext cx="1408854" cy="0"/>
+          </a:xfrm>
+          <a:prstGeom prst="straightConnector1">
+            <a:avLst/>
+          </a:prstGeom>
+          <a:ln w="9525" cap="flat" cmpd="sng" algn="ctr">
+            <a:solidFill>
+              <a:schemeClr val="accent2"/>
+            </a:solidFill>
+            <a:prstDash val="solid"/>
+            <a:round/>
+            <a:headEnd type="none" w="med" len="med"/>
+            <a:tailEnd type="arrow" w="med" len="med"/>
+          </a:ln>
+        </p:spPr>
+        <p:style>
+          <a:lnRef idx="0">
+            <a:scrgbClr r="0" g="0" b="0"/>
+          </a:lnRef>
+          <a:fillRef idx="0">
+            <a:scrgbClr r="0" g="0" b="0"/>
+          </a:fillRef>
+          <a:effectRef idx="0">
+            <a:scrgbClr r="0" g="0" b="0"/>
+          </a:effectRef>
+          <a:fontRef idx="minor">
+            <a:schemeClr val="tx1"/>
+          </a:fontRef>
+        </p:style>
+      </p:cxnSp>
+      <p:sp>
+        <p:nvSpPr>
+          <p:cNvPr id="40" name="TextBox 39">
+            <a:extLst>
+              <a:ext uri="{FF2B5EF4-FFF2-40B4-BE49-F238E27FC236}">
+                <a16:creationId xmlns:a16="http://schemas.microsoft.com/office/drawing/2014/main" id="{DA4E47EA-5AB2-4252-AD4D-0D9A8CE1AE45}"/>
+              </a:ext>
+            </a:extLst>
+          </p:cNvPr>
+          <p:cNvSpPr txBox="1"/>
+          <p:nvPr/>
+        </p:nvSpPr>
+        <p:spPr>
+          <a:xfrm>
+            <a:off x="1907603" y="1687741"/>
+            <a:ext cx="740199" cy="230832"/>
+          </a:xfrm>
+          <a:prstGeom prst="rect">
+            <a:avLst/>
+          </a:prstGeom>
+          <a:noFill/>
+        </p:spPr>
+        <p:txBody>
+          <a:bodyPr wrap="square" rtlCol="0">
+            <a:spAutoFit/>
+          </a:bodyPr>
+          <a:lstStyle/>
+          <a:p>
+            <a:r>
+              <a:rPr lang="en-US" sz="900" dirty="0"/>
+              <a:t>User input</a:t>
+            </a:r>
+          </a:p>
+        </p:txBody>
+      </p:sp>
+      <p:cxnSp>
+        <p:nvCxnSpPr>
+          <p:cNvPr id="41" name="Straight Connector 40">
+            <a:extLst>
+              <a:ext uri="{FF2B5EF4-FFF2-40B4-BE49-F238E27FC236}">
+                <a16:creationId xmlns:a16="http://schemas.microsoft.com/office/drawing/2014/main" id="{245AB5E6-11DE-4214-928B-CC50B8C93EFB}"/>
+              </a:ext>
+            </a:extLst>
+          </p:cNvPr>
+          <p:cNvCxnSpPr>
+            <a:cxnSpLocks/>
+          </p:cNvCxnSpPr>
+          <p:nvPr/>
+        </p:nvCxnSpPr>
+        <p:spPr>
+          <a:xfrm>
+            <a:off x="4375308" y="1104900"/>
+            <a:ext cx="0" cy="2171700"/>
+          </a:xfrm>
+          <a:prstGeom prst="line">
+            <a:avLst/>
+          </a:prstGeom>
+          <a:ln w="9525" cap="flat" cmpd="sng" algn="ctr">
+            <a:solidFill>
+              <a:schemeClr val="accent2"/>
+            </a:solidFill>
+            <a:prstDash val="dash"/>
+            <a:round/>
+            <a:headEnd type="none" w="med" len="med"/>
+            <a:tailEnd type="none" w="med" len="med"/>
+          </a:ln>
+        </p:spPr>
+        <p:style>
+          <a:lnRef idx="0">
+            <a:scrgbClr r="0" g="0" b="0"/>
+          </a:lnRef>
+          <a:fillRef idx="0">
+            <a:scrgbClr r="0" g="0" b="0"/>
+          </a:fillRef>
+          <a:effectRef idx="0">
+            <a:scrgbClr r="0" g="0" b="0"/>
+          </a:effectRef>
+          <a:fontRef idx="minor">
+            <a:schemeClr val="tx1"/>
+          </a:fontRef>
+        </p:style>
+      </p:cxnSp>
+      <p:sp>
+        <p:nvSpPr>
+          <p:cNvPr id="42" name="Rectangle 41">
+            <a:extLst>
+              <a:ext uri="{FF2B5EF4-FFF2-40B4-BE49-F238E27FC236}">
+                <a16:creationId xmlns:a16="http://schemas.microsoft.com/office/drawing/2014/main" id="{DB54E3FB-F1ED-4BD6-9502-BCD12368B1A6}"/>
+              </a:ext>
+            </a:extLst>
+          </p:cNvPr>
+          <p:cNvSpPr/>
+          <p:nvPr/>
+        </p:nvSpPr>
+        <p:spPr>
+          <a:xfrm>
+            <a:off x="4318159" y="2057401"/>
+            <a:ext cx="114237" cy="1080150"/>
+          </a:xfrm>
+          <a:prstGeom prst="rect">
+            <a:avLst/>
+          </a:prstGeom>
+          <a:ln w="12700">
+            <a:solidFill>
+              <a:schemeClr val="accent2"/>
+            </a:solidFill>
+          </a:ln>
+        </p:spPr>
+        <p:style>
+          <a:lnRef idx="2">
+            <a:schemeClr val="accent6"/>
+          </a:lnRef>
+          <a:fillRef idx="1">
+            <a:schemeClr val="lt1"/>
+          </a:fillRef>
+          <a:effectRef idx="0">
+            <a:schemeClr val="accent6"/>
+          </a:effectRef>
+          <a:fontRef idx="minor">
+            <a:schemeClr val="dk1"/>
+          </a:fontRef>
+        </p:style>
+        <p:txBody>
+          <a:bodyPr rtlCol="0" anchor="ctr"/>
+          <a:lstStyle/>
+          <a:p>
+            <a:pPr algn="ctr"/>
+            <a:endParaRPr lang="en-US" dirty="0"/>
+          </a:p>
+        </p:txBody>
+      </p:sp>
+      <p:cxnSp>
+        <p:nvCxnSpPr>
+          <p:cNvPr id="43" name="Straight Arrow Connector 42">
+            <a:extLst>
+              <a:ext uri="{FF2B5EF4-FFF2-40B4-BE49-F238E27FC236}">
+                <a16:creationId xmlns:a16="http://schemas.microsoft.com/office/drawing/2014/main" id="{3A5E7BDA-A290-4D16-B733-9481F4A9053E}"/>
+              </a:ext>
+            </a:extLst>
+          </p:cNvPr>
+          <p:cNvCxnSpPr>
+            <a:cxnSpLocks/>
+          </p:cNvCxnSpPr>
+          <p:nvPr/>
+        </p:nvCxnSpPr>
+        <p:spPr>
+          <a:xfrm>
+            <a:off x="2955607" y="2057400"/>
+            <a:ext cx="1362552" cy="0"/>
+          </a:xfrm>
+          <a:prstGeom prst="straightConnector1">
+            <a:avLst/>
+          </a:prstGeom>
+          <a:ln w="9525" cap="flat" cmpd="sng" algn="ctr">
+            <a:solidFill>
+              <a:schemeClr val="accent2"/>
+            </a:solidFill>
+            <a:prstDash val="solid"/>
+            <a:round/>
+            <a:headEnd type="none" w="med" len="med"/>
+            <a:tailEnd type="arrow" w="med" len="med"/>
+          </a:ln>
+        </p:spPr>
+        <p:style>
+          <a:lnRef idx="0">
+            <a:scrgbClr r="0" g="0" b="0"/>
+          </a:lnRef>
+          <a:fillRef idx="0">
+            <a:scrgbClr r="0" g="0" b="0"/>
+          </a:fillRef>
+          <a:effectRef idx="0">
+            <a:scrgbClr r="0" g="0" b="0"/>
+          </a:effectRef>
+          <a:fontRef idx="minor">
+            <a:schemeClr val="tx1"/>
+          </a:fontRef>
+        </p:style>
+      </p:cxnSp>
+      <p:sp>
+        <p:nvSpPr>
+          <p:cNvPr id="45" name="TextBox 44">
+            <a:extLst>
+              <a:ext uri="{FF2B5EF4-FFF2-40B4-BE49-F238E27FC236}">
+                <a16:creationId xmlns:a16="http://schemas.microsoft.com/office/drawing/2014/main" id="{79F4A63C-B942-4433-B776-10CD0012D4CC}"/>
+              </a:ext>
+            </a:extLst>
+          </p:cNvPr>
+          <p:cNvSpPr txBox="1"/>
+          <p:nvPr/>
+        </p:nvSpPr>
+        <p:spPr>
+          <a:xfrm>
+            <a:off x="2910096" y="1857152"/>
+            <a:ext cx="1585704" cy="230832"/>
+          </a:xfrm>
+          <a:prstGeom prst="rect">
+            <a:avLst/>
+          </a:prstGeom>
+          <a:noFill/>
+        </p:spPr>
+        <p:txBody>
+          <a:bodyPr wrap="square" rtlCol="0">
+            <a:spAutoFit/>
+          </a:bodyPr>
+          <a:lstStyle/>
+          <a:p>
+            <a:r>
+              <a:rPr lang="en-US" sz="900" dirty="0" err="1"/>
+              <a:t>parseCommand</a:t>
+            </a:r>
+            <a:r>
+              <a:rPr lang="en-US" sz="900" dirty="0"/>
+              <a:t>(“User input”)</a:t>
+            </a:r>
+          </a:p>
+        </p:txBody>
+      </p:sp>
+      <p:cxnSp>
+        <p:nvCxnSpPr>
+          <p:cNvPr id="46" name="Straight Arrow Connector 45">
+            <a:extLst>
+              <a:ext uri="{FF2B5EF4-FFF2-40B4-BE49-F238E27FC236}">
+                <a16:creationId xmlns:a16="http://schemas.microsoft.com/office/drawing/2014/main" id="{0E76B5DD-0095-4D9A-A0E4-CB7C06938976}"/>
+              </a:ext>
+            </a:extLst>
+          </p:cNvPr>
+          <p:cNvCxnSpPr>
+            <a:cxnSpLocks/>
+          </p:cNvCxnSpPr>
+          <p:nvPr/>
+        </p:nvCxnSpPr>
+        <p:spPr>
+          <a:xfrm>
+            <a:off x="4432396" y="2514600"/>
+            <a:ext cx="1054004" cy="0"/>
+          </a:xfrm>
+          <a:prstGeom prst="straightConnector1">
+            <a:avLst/>
+          </a:prstGeom>
+          <a:ln w="9525" cap="flat" cmpd="sng" algn="ctr">
+            <a:solidFill>
+              <a:schemeClr val="accent2"/>
+            </a:solidFill>
+            <a:prstDash val="solid"/>
+            <a:round/>
+            <a:headEnd type="none" w="med" len="med"/>
+            <a:tailEnd type="arrow" w="med" len="med"/>
+          </a:ln>
+        </p:spPr>
+        <p:style>
+          <a:lnRef idx="0">
+            <a:scrgbClr r="0" g="0" b="0"/>
+          </a:lnRef>
+          <a:fillRef idx="0">
+            <a:scrgbClr r="0" g="0" b="0"/>
+          </a:fillRef>
+          <a:effectRef idx="0">
+            <a:scrgbClr r="0" g="0" b="0"/>
+          </a:effectRef>
+          <a:fontRef idx="minor">
+            <a:schemeClr val="tx1"/>
+          </a:fontRef>
+        </p:style>
+      </p:cxnSp>
+      <p:sp>
+        <p:nvSpPr>
+          <p:cNvPr id="49" name="Rectangle 48">
+            <a:extLst>
+              <a:ext uri="{FF2B5EF4-FFF2-40B4-BE49-F238E27FC236}">
+                <a16:creationId xmlns:a16="http://schemas.microsoft.com/office/drawing/2014/main" id="{3359C4D4-7638-490E-9396-F3A822D2784A}"/>
+              </a:ext>
+            </a:extLst>
+          </p:cNvPr>
+          <p:cNvSpPr/>
+          <p:nvPr/>
+        </p:nvSpPr>
+        <p:spPr>
+          <a:xfrm>
+            <a:off x="6007178" y="2667000"/>
+            <a:ext cx="114237" cy="304801"/>
+          </a:xfrm>
+          <a:prstGeom prst="rect">
+            <a:avLst/>
+          </a:prstGeom>
+          <a:ln w="12700">
+            <a:solidFill>
+              <a:schemeClr val="accent2"/>
+            </a:solidFill>
+          </a:ln>
+        </p:spPr>
+        <p:style>
+          <a:lnRef idx="2">
+            <a:schemeClr val="accent6"/>
+          </a:lnRef>
+          <a:fillRef idx="1">
+            <a:schemeClr val="lt1"/>
+          </a:fillRef>
+          <a:effectRef idx="0">
+            <a:schemeClr val="accent6"/>
+          </a:effectRef>
+          <a:fontRef idx="minor">
+            <a:schemeClr val="dk1"/>
+          </a:fontRef>
+        </p:style>
+        <p:txBody>
+          <a:bodyPr rtlCol="0" anchor="ctr"/>
+          <a:lstStyle/>
+          <a:p>
+            <a:pPr algn="ctr"/>
+            <a:endParaRPr lang="en-US" dirty="0"/>
+          </a:p>
+        </p:txBody>
+      </p:sp>
+      <p:sp>
+        <p:nvSpPr>
+          <p:cNvPr id="50" name="TextBox 49">
+            <a:extLst>
+              <a:ext uri="{FF2B5EF4-FFF2-40B4-BE49-F238E27FC236}">
+                <a16:creationId xmlns:a16="http://schemas.microsoft.com/office/drawing/2014/main" id="{1C042083-385E-4679-842E-F813E9B984B9}"/>
+              </a:ext>
+            </a:extLst>
+          </p:cNvPr>
+          <p:cNvSpPr txBox="1"/>
+          <p:nvPr/>
+        </p:nvSpPr>
+        <p:spPr>
+          <a:xfrm>
+            <a:off x="4391097" y="2289155"/>
+            <a:ext cx="1143000" cy="230831"/>
+          </a:xfrm>
+          <a:prstGeom prst="rect">
+            <a:avLst/>
+          </a:prstGeom>
+          <a:noFill/>
+        </p:spPr>
+        <p:txBody>
+          <a:bodyPr wrap="square" rtlCol="0">
+            <a:spAutoFit/>
+          </a:bodyPr>
+          <a:lstStyle/>
+          <a:p>
+            <a:r>
+              <a:rPr lang="en-US" sz="900" dirty="0"/>
+              <a:t>new </a:t>
+            </a:r>
+            <a:r>
+              <a:rPr lang="en-US" sz="900" dirty="0" err="1"/>
+              <a:t>XYZCommand</a:t>
+            </a:r>
+            <a:r>
+              <a:rPr lang="en-US" sz="900" dirty="0"/>
+              <a:t>()</a:t>
+            </a:r>
+          </a:p>
+        </p:txBody>
+      </p:sp>
+      <p:grpSp>
+        <p:nvGrpSpPr>
+          <p:cNvPr id="51" name="Group 50">
+            <a:extLst>
+              <a:ext uri="{FF2B5EF4-FFF2-40B4-BE49-F238E27FC236}">
+                <a16:creationId xmlns:a16="http://schemas.microsoft.com/office/drawing/2014/main" id="{BB704B06-FC2C-4148-AF87-6D8D9E3B0C54}"/>
+              </a:ext>
+            </a:extLst>
+          </p:cNvPr>
+          <p:cNvGrpSpPr/>
+          <p:nvPr/>
+        </p:nvGrpSpPr>
+        <p:grpSpPr>
+          <a:xfrm>
+            <a:off x="2968851" y="4005150"/>
+            <a:ext cx="3117924" cy="123697"/>
+            <a:chOff x="381004" y="4960393"/>
+            <a:chExt cx="2449891" cy="143144"/>
+          </a:xfrm>
+        </p:grpSpPr>
+        <p:cxnSp>
+          <p:nvCxnSpPr>
+            <p:cNvPr id="52" name="Straight Arrow Connector 51">
+              <a:extLst>
+                <a:ext uri="{FF2B5EF4-FFF2-40B4-BE49-F238E27FC236}">
+                  <a16:creationId xmlns:a16="http://schemas.microsoft.com/office/drawing/2014/main" id="{79332140-1E7E-4DF6-8F35-8309891058A5}"/>
+                </a:ext>
+              </a:extLst>
+            </p:cNvPr>
+            <p:cNvCxnSpPr>
+              <a:cxnSpLocks/>
+            </p:cNvCxnSpPr>
+            <p:nvPr/>
+          </p:nvCxnSpPr>
+          <p:spPr>
+            <a:xfrm flipH="1">
+              <a:off x="392550" y="5024005"/>
+              <a:ext cx="2438345" cy="4276"/>
+            </a:xfrm>
+            <a:prstGeom prst="straightConnector1">
+              <a:avLst/>
+            </a:prstGeom>
+            <a:ln w="9525" cap="flat" cmpd="sng" algn="ctr">
+              <a:solidFill>
+                <a:schemeClr val="accent2"/>
+              </a:solidFill>
+              <a:prstDash val="dash"/>
+              <a:round/>
+              <a:headEnd type="none" w="med" len="med"/>
+              <a:tailEnd type="none" w="med" len="med"/>
+            </a:ln>
+          </p:spPr>
+          <p:style>
+            <a:lnRef idx="0">
+              <a:scrgbClr r="0" g="0" b="0"/>
+            </a:lnRef>
+            <a:fillRef idx="0">
+              <a:scrgbClr r="0" g="0" b="0"/>
+            </a:fillRef>
+            <a:effectRef idx="0">
+              <a:scrgbClr r="0" g="0" b="0"/>
+            </a:effectRef>
+            <a:fontRef idx="minor">
+              <a:schemeClr val="tx1"/>
+            </a:fontRef>
+          </p:style>
+        </p:cxnSp>
+        <p:cxnSp>
+          <p:nvCxnSpPr>
+            <p:cNvPr id="53" name="Straight Connector 52">
+              <a:extLst>
+                <a:ext uri="{FF2B5EF4-FFF2-40B4-BE49-F238E27FC236}">
+                  <a16:creationId xmlns:a16="http://schemas.microsoft.com/office/drawing/2014/main" id="{230A15BF-6611-4731-A67F-43FA9708952F}"/>
+                </a:ext>
+              </a:extLst>
+            </p:cNvPr>
+            <p:cNvCxnSpPr>
+              <a:cxnSpLocks/>
+            </p:cNvCxnSpPr>
+            <p:nvPr/>
+          </p:nvCxnSpPr>
+          <p:spPr>
+            <a:xfrm flipV="1">
+              <a:off x="381004" y="4960393"/>
+              <a:ext cx="118077" cy="70186"/>
+            </a:xfrm>
+            <a:prstGeom prst="line">
+              <a:avLst/>
+            </a:prstGeom>
+            <a:ln>
+              <a:solidFill>
+                <a:schemeClr val="accent2"/>
+              </a:solidFill>
+            </a:ln>
+          </p:spPr>
+          <p:style>
+            <a:lnRef idx="1">
+              <a:schemeClr val="accent1"/>
+            </a:lnRef>
+            <a:fillRef idx="0">
+              <a:schemeClr val="accent1"/>
+            </a:fillRef>
+            <a:effectRef idx="0">
+              <a:schemeClr val="accent1"/>
+            </a:effectRef>
+            <a:fontRef idx="minor">
+              <a:schemeClr val="tx1"/>
+            </a:fontRef>
+          </p:style>
+        </p:cxnSp>
+        <p:cxnSp>
+          <p:nvCxnSpPr>
+            <p:cNvPr id="54" name="Straight Connector 53">
+              <a:extLst>
+                <a:ext uri="{FF2B5EF4-FFF2-40B4-BE49-F238E27FC236}">
+                  <a16:creationId xmlns:a16="http://schemas.microsoft.com/office/drawing/2014/main" id="{DAB99D3B-00FA-4BBA-90F7-EDF15CCB81A6}"/>
+                </a:ext>
+              </a:extLst>
+            </p:cNvPr>
+            <p:cNvCxnSpPr>
+              <a:cxnSpLocks/>
+            </p:cNvCxnSpPr>
+            <p:nvPr/>
+          </p:nvCxnSpPr>
+          <p:spPr>
+            <a:xfrm>
+              <a:off x="383823" y="5030580"/>
+              <a:ext cx="117898" cy="72957"/>
+            </a:xfrm>
+            <a:prstGeom prst="line">
+              <a:avLst/>
+            </a:prstGeom>
+            <a:ln>
+              <a:solidFill>
+                <a:schemeClr val="accent2"/>
+              </a:solidFill>
+            </a:ln>
+          </p:spPr>
+          <p:style>
+            <a:lnRef idx="1">
+              <a:schemeClr val="accent1"/>
+            </a:lnRef>
+            <a:fillRef idx="0">
+              <a:schemeClr val="accent1"/>
+            </a:fillRef>
+            <a:effectRef idx="0">
+              <a:schemeClr val="accent1"/>
+            </a:effectRef>
+            <a:fontRef idx="minor">
+              <a:schemeClr val="tx1"/>
+            </a:fontRef>
+          </p:style>
+        </p:cxnSp>
+      </p:grpSp>
+      <p:grpSp>
+        <p:nvGrpSpPr>
+          <p:cNvPr id="55" name="Group 54">
+            <a:extLst>
+              <a:ext uri="{FF2B5EF4-FFF2-40B4-BE49-F238E27FC236}">
+                <a16:creationId xmlns:a16="http://schemas.microsoft.com/office/drawing/2014/main" id="{0A0AF894-01CE-48A2-887D-72ADE6AF06FE}"/>
+              </a:ext>
+            </a:extLst>
+          </p:cNvPr>
+          <p:cNvGrpSpPr/>
+          <p:nvPr/>
+        </p:nvGrpSpPr>
+        <p:grpSpPr>
+          <a:xfrm>
+            <a:off x="4425521" y="2892445"/>
+            <a:ext cx="1581657" cy="142771"/>
+            <a:chOff x="381004" y="4960393"/>
+            <a:chExt cx="2449891" cy="143144"/>
+          </a:xfrm>
+        </p:grpSpPr>
+        <p:cxnSp>
+          <p:nvCxnSpPr>
+            <p:cNvPr id="56" name="Straight Arrow Connector 55">
+              <a:extLst>
+                <a:ext uri="{FF2B5EF4-FFF2-40B4-BE49-F238E27FC236}">
+                  <a16:creationId xmlns:a16="http://schemas.microsoft.com/office/drawing/2014/main" id="{0D92276F-1AB1-4211-9922-738E383992A4}"/>
+                </a:ext>
+              </a:extLst>
+            </p:cNvPr>
+            <p:cNvCxnSpPr>
+              <a:cxnSpLocks/>
+            </p:cNvCxnSpPr>
+            <p:nvPr/>
+          </p:nvCxnSpPr>
+          <p:spPr>
+            <a:xfrm flipH="1">
+              <a:off x="392550" y="5024005"/>
+              <a:ext cx="2438345" cy="4276"/>
+            </a:xfrm>
+            <a:prstGeom prst="straightConnector1">
+              <a:avLst/>
+            </a:prstGeom>
+            <a:ln w="9525" cap="flat" cmpd="sng" algn="ctr">
+              <a:solidFill>
+                <a:schemeClr val="accent2"/>
+              </a:solidFill>
+              <a:prstDash val="dash"/>
+              <a:round/>
+              <a:headEnd type="none" w="med" len="med"/>
+              <a:tailEnd type="none" w="med" len="med"/>
+            </a:ln>
+          </p:spPr>
+          <p:style>
+            <a:lnRef idx="0">
+              <a:scrgbClr r="0" g="0" b="0"/>
+            </a:lnRef>
+            <a:fillRef idx="0">
+              <a:scrgbClr r="0" g="0" b="0"/>
+            </a:fillRef>
+            <a:effectRef idx="0">
+              <a:scrgbClr r="0" g="0" b="0"/>
+            </a:effectRef>
+            <a:fontRef idx="minor">
+              <a:schemeClr val="tx1"/>
+            </a:fontRef>
+          </p:style>
+        </p:cxnSp>
+        <p:cxnSp>
+          <p:nvCxnSpPr>
+            <p:cNvPr id="57" name="Straight Connector 56">
+              <a:extLst>
+                <a:ext uri="{FF2B5EF4-FFF2-40B4-BE49-F238E27FC236}">
+                  <a16:creationId xmlns:a16="http://schemas.microsoft.com/office/drawing/2014/main" id="{6F4AD48A-C2FA-4252-8B71-B7078F4AE7C7}"/>
+                </a:ext>
+              </a:extLst>
+            </p:cNvPr>
+            <p:cNvCxnSpPr>
+              <a:cxnSpLocks/>
+            </p:cNvCxnSpPr>
+            <p:nvPr/>
+          </p:nvCxnSpPr>
+          <p:spPr>
+            <a:xfrm flipV="1">
+              <a:off x="381004" y="4960393"/>
+              <a:ext cx="118077" cy="70186"/>
+            </a:xfrm>
+            <a:prstGeom prst="line">
+              <a:avLst/>
+            </a:prstGeom>
+            <a:ln>
+              <a:solidFill>
+                <a:schemeClr val="accent2"/>
+              </a:solidFill>
+            </a:ln>
+          </p:spPr>
+          <p:style>
+            <a:lnRef idx="1">
+              <a:schemeClr val="accent1"/>
+            </a:lnRef>
+            <a:fillRef idx="0">
+              <a:schemeClr val="accent1"/>
+            </a:fillRef>
+            <a:effectRef idx="0">
+              <a:schemeClr val="accent1"/>
+            </a:effectRef>
+            <a:fontRef idx="minor">
+              <a:schemeClr val="tx1"/>
+            </a:fontRef>
+          </p:style>
+        </p:cxnSp>
+        <p:cxnSp>
+          <p:nvCxnSpPr>
+            <p:cNvPr id="58" name="Straight Connector 57">
+              <a:extLst>
+                <a:ext uri="{FF2B5EF4-FFF2-40B4-BE49-F238E27FC236}">
+                  <a16:creationId xmlns:a16="http://schemas.microsoft.com/office/drawing/2014/main" id="{E8FA4192-446A-4D0C-87E4-1A28023BD940}"/>
+                </a:ext>
+              </a:extLst>
+            </p:cNvPr>
+            <p:cNvCxnSpPr>
+              <a:cxnSpLocks/>
+            </p:cNvCxnSpPr>
+            <p:nvPr/>
+          </p:nvCxnSpPr>
+          <p:spPr>
+            <a:xfrm>
+              <a:off x="383823" y="5030580"/>
+              <a:ext cx="117898" cy="72957"/>
+            </a:xfrm>
+            <a:prstGeom prst="line">
+              <a:avLst/>
+            </a:prstGeom>
+            <a:ln>
+              <a:solidFill>
+                <a:schemeClr val="accent2"/>
+              </a:solidFill>
+            </a:ln>
+          </p:spPr>
+          <p:style>
+            <a:lnRef idx="1">
+              <a:schemeClr val="accent1"/>
+            </a:lnRef>
+            <a:fillRef idx="0">
+              <a:schemeClr val="accent1"/>
+            </a:fillRef>
+            <a:effectRef idx="0">
+              <a:schemeClr val="accent1"/>
+            </a:effectRef>
+            <a:fontRef idx="minor">
+              <a:schemeClr val="tx1"/>
+            </a:fontRef>
+          </p:style>
+        </p:cxnSp>
+      </p:grpSp>
+      <p:sp>
+        <p:nvSpPr>
+          <p:cNvPr id="59" name="TextBox 58">
+            <a:extLst>
+              <a:ext uri="{FF2B5EF4-FFF2-40B4-BE49-F238E27FC236}">
+                <a16:creationId xmlns:a16="http://schemas.microsoft.com/office/drawing/2014/main" id="{93294309-4037-454C-B94F-DD70DC66AD16}"/>
+              </a:ext>
+            </a:extLst>
+          </p:cNvPr>
+          <p:cNvSpPr txBox="1"/>
+          <p:nvPr/>
+        </p:nvSpPr>
+        <p:spPr>
+          <a:xfrm>
+            <a:off x="4921125" y="2740969"/>
+            <a:ext cx="698594" cy="230832"/>
+          </a:xfrm>
+          <a:prstGeom prst="rect">
+            <a:avLst/>
+          </a:prstGeom>
+          <a:noFill/>
+        </p:spPr>
+        <p:txBody>
+          <a:bodyPr wrap="square" rtlCol="0">
+            <a:spAutoFit/>
+          </a:bodyPr>
+          <a:lstStyle/>
+          <a:p>
+            <a:r>
+              <a:rPr lang="en-US" sz="900" dirty="0"/>
+              <a:t>command</a:t>
+            </a:r>
+          </a:p>
+        </p:txBody>
+      </p:sp>
+      <p:grpSp>
+        <p:nvGrpSpPr>
+          <p:cNvPr id="60" name="Group 59">
+            <a:extLst>
+              <a:ext uri="{FF2B5EF4-FFF2-40B4-BE49-F238E27FC236}">
+                <a16:creationId xmlns:a16="http://schemas.microsoft.com/office/drawing/2014/main" id="{858ADFF6-8F63-4671-B084-D8F375AE2726}"/>
+              </a:ext>
+            </a:extLst>
+          </p:cNvPr>
+          <p:cNvGrpSpPr/>
+          <p:nvPr/>
+        </p:nvGrpSpPr>
+        <p:grpSpPr>
+          <a:xfrm>
+            <a:off x="2962325" y="3084747"/>
+            <a:ext cx="1384408" cy="105607"/>
+            <a:chOff x="381004" y="4960393"/>
+            <a:chExt cx="2449891" cy="143144"/>
+          </a:xfrm>
+        </p:grpSpPr>
+        <p:cxnSp>
+          <p:nvCxnSpPr>
+            <p:cNvPr id="61" name="Straight Arrow Connector 60">
+              <a:extLst>
+                <a:ext uri="{FF2B5EF4-FFF2-40B4-BE49-F238E27FC236}">
+                  <a16:creationId xmlns:a16="http://schemas.microsoft.com/office/drawing/2014/main" id="{3FD9590C-F0C9-4FD5-B1DA-05FFFAF382E1}"/>
+                </a:ext>
+              </a:extLst>
+            </p:cNvPr>
+            <p:cNvCxnSpPr>
+              <a:cxnSpLocks/>
+            </p:cNvCxnSpPr>
+            <p:nvPr/>
+          </p:nvCxnSpPr>
+          <p:spPr>
+            <a:xfrm flipH="1">
+              <a:off x="392550" y="5024005"/>
+              <a:ext cx="2438345" cy="4276"/>
+            </a:xfrm>
+            <a:prstGeom prst="straightConnector1">
+              <a:avLst/>
+            </a:prstGeom>
+            <a:ln w="9525" cap="flat" cmpd="sng" algn="ctr">
+              <a:solidFill>
+                <a:schemeClr val="accent2"/>
+              </a:solidFill>
+              <a:prstDash val="dash"/>
+              <a:round/>
+              <a:headEnd type="none" w="med" len="med"/>
+              <a:tailEnd type="none" w="med" len="med"/>
+            </a:ln>
+          </p:spPr>
+          <p:style>
+            <a:lnRef idx="0">
+              <a:scrgbClr r="0" g="0" b="0"/>
+            </a:lnRef>
+            <a:fillRef idx="0">
+              <a:scrgbClr r="0" g="0" b="0"/>
+            </a:fillRef>
+            <a:effectRef idx="0">
+              <a:scrgbClr r="0" g="0" b="0"/>
+            </a:effectRef>
+            <a:fontRef idx="minor">
+              <a:schemeClr val="tx1"/>
+            </a:fontRef>
+          </p:style>
+        </p:cxnSp>
+        <p:cxnSp>
+          <p:nvCxnSpPr>
+            <p:cNvPr id="62" name="Straight Connector 61">
+              <a:extLst>
+                <a:ext uri="{FF2B5EF4-FFF2-40B4-BE49-F238E27FC236}">
+                  <a16:creationId xmlns:a16="http://schemas.microsoft.com/office/drawing/2014/main" id="{EDC90237-E3CB-4E9D-A5C3-778FB185E7E2}"/>
+                </a:ext>
+              </a:extLst>
+            </p:cNvPr>
+            <p:cNvCxnSpPr>
+              <a:cxnSpLocks/>
+            </p:cNvCxnSpPr>
+            <p:nvPr/>
+          </p:nvCxnSpPr>
+          <p:spPr>
+            <a:xfrm flipV="1">
+              <a:off x="381004" y="4960393"/>
+              <a:ext cx="118077" cy="70186"/>
+            </a:xfrm>
+            <a:prstGeom prst="line">
+              <a:avLst/>
+            </a:prstGeom>
+            <a:ln>
+              <a:solidFill>
+                <a:schemeClr val="accent2"/>
+              </a:solidFill>
+            </a:ln>
+          </p:spPr>
+          <p:style>
+            <a:lnRef idx="1">
+              <a:schemeClr val="accent1"/>
+            </a:lnRef>
+            <a:fillRef idx="0">
+              <a:schemeClr val="accent1"/>
+            </a:fillRef>
+            <a:effectRef idx="0">
+              <a:schemeClr val="accent1"/>
+            </a:effectRef>
+            <a:fontRef idx="minor">
+              <a:schemeClr val="tx1"/>
+            </a:fontRef>
+          </p:style>
+        </p:cxnSp>
+        <p:cxnSp>
+          <p:nvCxnSpPr>
+            <p:cNvPr id="63" name="Straight Connector 62">
+              <a:extLst>
+                <a:ext uri="{FF2B5EF4-FFF2-40B4-BE49-F238E27FC236}">
+                  <a16:creationId xmlns:a16="http://schemas.microsoft.com/office/drawing/2014/main" id="{9CA6D234-5B87-43B8-8EF5-4CFC2CAE2194}"/>
+                </a:ext>
+              </a:extLst>
+            </p:cNvPr>
+            <p:cNvCxnSpPr>
+              <a:cxnSpLocks/>
+            </p:cNvCxnSpPr>
+            <p:nvPr/>
+          </p:nvCxnSpPr>
+          <p:spPr>
+            <a:xfrm>
+              <a:off x="383823" y="5030580"/>
+              <a:ext cx="117898" cy="72957"/>
+            </a:xfrm>
+            <a:prstGeom prst="line">
+              <a:avLst/>
+            </a:prstGeom>
+            <a:ln>
+              <a:solidFill>
+                <a:schemeClr val="accent2"/>
+              </a:solidFill>
+            </a:ln>
+          </p:spPr>
+          <p:style>
+            <a:lnRef idx="1">
+              <a:schemeClr val="accent1"/>
+            </a:lnRef>
+            <a:fillRef idx="0">
+              <a:schemeClr val="accent1"/>
+            </a:fillRef>
+            <a:effectRef idx="0">
+              <a:schemeClr val="accent1"/>
+            </a:effectRef>
+            <a:fontRef idx="minor">
+              <a:schemeClr val="tx1"/>
+            </a:fontRef>
+          </p:style>
+        </p:cxnSp>
+      </p:grpSp>
+      <p:sp>
+        <p:nvSpPr>
+          <p:cNvPr id="64" name="TextBox 63">
+            <a:extLst>
+              <a:ext uri="{FF2B5EF4-FFF2-40B4-BE49-F238E27FC236}">
+                <a16:creationId xmlns:a16="http://schemas.microsoft.com/office/drawing/2014/main" id="{F3BAE961-0EC7-49C6-BE48-19058E7DC766}"/>
+              </a:ext>
+            </a:extLst>
+          </p:cNvPr>
+          <p:cNvSpPr txBox="1"/>
+          <p:nvPr/>
+        </p:nvSpPr>
+        <p:spPr>
+          <a:xfrm>
+            <a:off x="3358413" y="2940232"/>
+            <a:ext cx="698594" cy="230832"/>
+          </a:xfrm>
+          <a:prstGeom prst="rect">
+            <a:avLst/>
+          </a:prstGeom>
+          <a:noFill/>
+        </p:spPr>
+        <p:txBody>
+          <a:bodyPr wrap="square" rtlCol="0">
+            <a:spAutoFit/>
+          </a:bodyPr>
+          <a:lstStyle/>
+          <a:p>
+            <a:r>
+              <a:rPr lang="en-US" sz="900" dirty="0"/>
+              <a:t>command</a:t>
+            </a:r>
+          </a:p>
+        </p:txBody>
+      </p:sp>
+      <p:cxnSp>
+        <p:nvCxnSpPr>
+          <p:cNvPr id="65" name="Straight Arrow Connector 64">
+            <a:extLst>
+              <a:ext uri="{FF2B5EF4-FFF2-40B4-BE49-F238E27FC236}">
+                <a16:creationId xmlns:a16="http://schemas.microsoft.com/office/drawing/2014/main" id="{9050B839-2423-4665-B0CB-AC28AC6F57B6}"/>
+              </a:ext>
+            </a:extLst>
+          </p:cNvPr>
+          <p:cNvCxnSpPr>
+            <a:cxnSpLocks/>
+          </p:cNvCxnSpPr>
+          <p:nvPr/>
+        </p:nvCxnSpPr>
+        <p:spPr>
+          <a:xfrm>
+            <a:off x="2937879" y="3411050"/>
+            <a:ext cx="3069299" cy="0"/>
+          </a:xfrm>
+          <a:prstGeom prst="straightConnector1">
+            <a:avLst/>
+          </a:prstGeom>
+          <a:ln w="9525" cap="flat" cmpd="sng" algn="ctr">
+            <a:solidFill>
+              <a:schemeClr val="accent2"/>
+            </a:solidFill>
+            <a:prstDash val="solid"/>
+            <a:round/>
+            <a:headEnd type="none" w="med" len="med"/>
+            <a:tailEnd type="arrow" w="med" len="med"/>
+          </a:ln>
+        </p:spPr>
+        <p:style>
+          <a:lnRef idx="0">
+            <a:scrgbClr r="0" g="0" b="0"/>
+          </a:lnRef>
+          <a:fillRef idx="0">
+            <a:scrgbClr r="0" g="0" b="0"/>
+          </a:fillRef>
+          <a:effectRef idx="0">
+            <a:scrgbClr r="0" g="0" b="0"/>
+          </a:effectRef>
+          <a:fontRef idx="minor">
+            <a:schemeClr val="tx1"/>
+          </a:fontRef>
+        </p:style>
+      </p:cxnSp>
+      <p:cxnSp>
+        <p:nvCxnSpPr>
+          <p:cNvPr id="68" name="Straight Connector 67">
+            <a:extLst>
+              <a:ext uri="{FF2B5EF4-FFF2-40B4-BE49-F238E27FC236}">
+                <a16:creationId xmlns:a16="http://schemas.microsoft.com/office/drawing/2014/main" id="{33044EE3-05DE-4CC2-8942-D75E5A2A2745}"/>
+              </a:ext>
+            </a:extLst>
+          </p:cNvPr>
+          <p:cNvCxnSpPr>
+            <a:cxnSpLocks/>
+            <a:stCxn id="49" idx="2"/>
+          </p:cNvCxnSpPr>
+          <p:nvPr/>
+        </p:nvCxnSpPr>
+        <p:spPr>
+          <a:xfrm>
+            <a:off x="6064297" y="2971801"/>
+            <a:ext cx="0" cy="1523999"/>
+          </a:xfrm>
+          <a:prstGeom prst="line">
+            <a:avLst/>
+          </a:prstGeom>
+          <a:ln w="9525" cap="flat" cmpd="sng" algn="ctr">
+            <a:solidFill>
+              <a:schemeClr val="accent2"/>
+            </a:solidFill>
+            <a:prstDash val="dash"/>
+            <a:round/>
+            <a:headEnd type="none" w="med" len="med"/>
+            <a:tailEnd type="none" w="med" len="med"/>
+          </a:ln>
+        </p:spPr>
+        <p:style>
+          <a:lnRef idx="0">
+            <a:scrgbClr r="0" g="0" b="0"/>
+          </a:lnRef>
+          <a:fillRef idx="0">
+            <a:scrgbClr r="0" g="0" b="0"/>
+          </a:fillRef>
+          <a:effectRef idx="0">
+            <a:scrgbClr r="0" g="0" b="0"/>
+          </a:effectRef>
+          <a:fontRef idx="minor">
+            <a:schemeClr val="tx1"/>
+          </a:fontRef>
+        </p:style>
+      </p:cxnSp>
+      <p:sp>
+        <p:nvSpPr>
+          <p:cNvPr id="71" name="Rectangle 70">
+            <a:extLst>
+              <a:ext uri="{FF2B5EF4-FFF2-40B4-BE49-F238E27FC236}">
+                <a16:creationId xmlns:a16="http://schemas.microsoft.com/office/drawing/2014/main" id="{1D742B22-7B3A-4ADF-923E-FE288C8FE973}"/>
+              </a:ext>
+            </a:extLst>
+          </p:cNvPr>
+          <p:cNvSpPr/>
+          <p:nvPr/>
+        </p:nvSpPr>
+        <p:spPr>
+          <a:xfrm>
+            <a:off x="6007178" y="3403684"/>
+            <a:ext cx="132945" cy="670994"/>
+          </a:xfrm>
+          <a:prstGeom prst="rect">
+            <a:avLst/>
+          </a:prstGeom>
+          <a:ln w="12700">
+            <a:solidFill>
+              <a:schemeClr val="accent2"/>
+            </a:solidFill>
+          </a:ln>
+        </p:spPr>
+        <p:style>
+          <a:lnRef idx="2">
+            <a:schemeClr val="accent6"/>
+          </a:lnRef>
+          <a:fillRef idx="1">
+            <a:schemeClr val="lt1"/>
+          </a:fillRef>
+          <a:effectRef idx="0">
+            <a:schemeClr val="accent6"/>
+          </a:effectRef>
+          <a:fontRef idx="minor">
+            <a:schemeClr val="dk1"/>
+          </a:fontRef>
+        </p:style>
+        <p:txBody>
+          <a:bodyPr rtlCol="0" anchor="ctr"/>
+          <a:lstStyle/>
+          <a:p>
+            <a:pPr algn="ctr"/>
+            <a:endParaRPr lang="en-US" dirty="0"/>
+          </a:p>
+        </p:txBody>
+      </p:sp>
+      <p:sp>
+        <p:nvSpPr>
+          <p:cNvPr id="72" name="TextBox 71">
+            <a:extLst>
+              <a:ext uri="{FF2B5EF4-FFF2-40B4-BE49-F238E27FC236}">
+                <a16:creationId xmlns:a16="http://schemas.microsoft.com/office/drawing/2014/main" id="{43CD051A-9D91-4F47-AED2-707876DBCBB1}"/>
+              </a:ext>
+            </a:extLst>
+          </p:cNvPr>
+          <p:cNvSpPr txBox="1"/>
+          <p:nvPr/>
+        </p:nvSpPr>
+        <p:spPr>
+          <a:xfrm>
+            <a:off x="6772416" y="3805790"/>
+            <a:ext cx="948743" cy="230832"/>
+          </a:xfrm>
+          <a:prstGeom prst="rect">
+            <a:avLst/>
+          </a:prstGeom>
+          <a:noFill/>
+        </p:spPr>
+        <p:txBody>
+          <a:bodyPr wrap="square" rtlCol="0">
+            <a:spAutoFit/>
+          </a:bodyPr>
+          <a:lstStyle/>
+          <a:p>
+            <a:r>
+              <a:rPr lang="en-US" sz="900" dirty="0"/>
+              <a:t>result</a:t>
+            </a:r>
+          </a:p>
+        </p:txBody>
+      </p:sp>
+      <p:cxnSp>
+        <p:nvCxnSpPr>
+          <p:cNvPr id="73" name="Straight Arrow Connector 72">
+            <a:extLst>
+              <a:ext uri="{FF2B5EF4-FFF2-40B4-BE49-F238E27FC236}">
+                <a16:creationId xmlns:a16="http://schemas.microsoft.com/office/drawing/2014/main" id="{05C12AC7-69C9-4353-90CD-500F7821E7DB}"/>
+              </a:ext>
+            </a:extLst>
+          </p:cNvPr>
+          <p:cNvCxnSpPr>
+            <a:cxnSpLocks/>
+            <a:endCxn id="28" idx="1"/>
+          </p:cNvCxnSpPr>
+          <p:nvPr/>
+        </p:nvCxnSpPr>
+        <p:spPr>
+          <a:xfrm>
+            <a:off x="6121415" y="3528537"/>
+            <a:ext cx="1111663" cy="0"/>
+          </a:xfrm>
+          <a:prstGeom prst="straightConnector1">
+            <a:avLst/>
+          </a:prstGeom>
+          <a:ln w="9525" cap="flat" cmpd="sng" algn="ctr">
+            <a:solidFill>
+              <a:schemeClr val="accent2"/>
+            </a:solidFill>
+            <a:prstDash val="solid"/>
+            <a:round/>
+            <a:headEnd type="none" w="med" len="med"/>
+            <a:tailEnd type="arrow" w="med" len="med"/>
+          </a:ln>
+        </p:spPr>
+        <p:style>
+          <a:lnRef idx="0">
+            <a:scrgbClr r="0" g="0" b="0"/>
+          </a:lnRef>
+          <a:fillRef idx="0">
+            <a:scrgbClr r="0" g="0" b="0"/>
+          </a:fillRef>
+          <a:effectRef idx="0">
+            <a:scrgbClr r="0" g="0" b="0"/>
+          </a:effectRef>
+          <a:fontRef idx="minor">
+            <a:schemeClr val="tx1"/>
+          </a:fontRef>
+        </p:style>
+      </p:cxnSp>
+      <p:sp>
+        <p:nvSpPr>
+          <p:cNvPr id="76" name="Rectangle 75">
+            <a:extLst>
+              <a:ext uri="{FF2B5EF4-FFF2-40B4-BE49-F238E27FC236}">
+                <a16:creationId xmlns:a16="http://schemas.microsoft.com/office/drawing/2014/main" id="{57F8D2CA-2105-48CC-9472-E2AB4490C4A0}"/>
+              </a:ext>
+            </a:extLst>
+          </p:cNvPr>
+          <p:cNvSpPr/>
+          <p:nvPr/>
+        </p:nvSpPr>
+        <p:spPr>
+          <a:xfrm>
+            <a:off x="7740733" y="3680937"/>
+            <a:ext cx="139340" cy="169664"/>
+          </a:xfrm>
+          <a:prstGeom prst="rect">
+            <a:avLst/>
+          </a:prstGeom>
+          <a:ln w="12700">
+            <a:solidFill>
+              <a:schemeClr val="accent2"/>
+            </a:solidFill>
+          </a:ln>
+        </p:spPr>
+        <p:style>
+          <a:lnRef idx="2">
+            <a:schemeClr val="accent6"/>
+          </a:lnRef>
+          <a:fillRef idx="1">
+            <a:schemeClr val="lt1"/>
+          </a:fillRef>
+          <a:effectRef idx="0">
+            <a:schemeClr val="accent6"/>
+          </a:effectRef>
+          <a:fontRef idx="minor">
+            <a:schemeClr val="dk1"/>
+          </a:fontRef>
+        </p:style>
+        <p:txBody>
+          <a:bodyPr rtlCol="0" anchor="ctr"/>
+          <a:lstStyle/>
+          <a:p>
+            <a:pPr algn="ctr"/>
+            <a:endParaRPr lang="en-US" dirty="0"/>
+          </a:p>
+        </p:txBody>
+      </p:sp>
+      <p:sp>
+        <p:nvSpPr>
+          <p:cNvPr id="77" name="TextBox 76">
+            <a:extLst>
+              <a:ext uri="{FF2B5EF4-FFF2-40B4-BE49-F238E27FC236}">
+                <a16:creationId xmlns:a16="http://schemas.microsoft.com/office/drawing/2014/main" id="{A9DA4FFA-E9E8-48D8-9146-EEEB46FE3FAE}"/>
+              </a:ext>
+            </a:extLst>
+          </p:cNvPr>
+          <p:cNvSpPr txBox="1"/>
+          <p:nvPr/>
+        </p:nvSpPr>
+        <p:spPr>
+          <a:xfrm>
+            <a:off x="6063085" y="3313584"/>
+            <a:ext cx="1250737" cy="230832"/>
+          </a:xfrm>
+          <a:prstGeom prst="rect">
+            <a:avLst/>
+          </a:prstGeom>
+          <a:noFill/>
+        </p:spPr>
+        <p:txBody>
+          <a:bodyPr wrap="square" rtlCol="0">
+            <a:spAutoFit/>
+          </a:bodyPr>
+          <a:lstStyle/>
+          <a:p>
+            <a:r>
+              <a:rPr lang="en-US" sz="900" dirty="0"/>
+              <a:t>new </a:t>
+            </a:r>
+            <a:r>
+              <a:rPr lang="en-US" sz="900" dirty="0" err="1"/>
+              <a:t>CommandResult</a:t>
+            </a:r>
+            <a:r>
+              <a:rPr lang="en-US" sz="900" dirty="0"/>
+              <a:t>()</a:t>
+            </a:r>
+          </a:p>
+        </p:txBody>
+      </p:sp>
+      <p:cxnSp>
+        <p:nvCxnSpPr>
+          <p:cNvPr id="79" name="Straight Connector 78">
+            <a:extLst>
+              <a:ext uri="{FF2B5EF4-FFF2-40B4-BE49-F238E27FC236}">
+                <a16:creationId xmlns:a16="http://schemas.microsoft.com/office/drawing/2014/main" id="{A70FE46F-5922-457C-9C2B-46C06D3B9FC6}"/>
+              </a:ext>
+            </a:extLst>
+          </p:cNvPr>
+          <p:cNvCxnSpPr>
+            <a:cxnSpLocks/>
+            <a:stCxn id="76" idx="2"/>
+          </p:cNvCxnSpPr>
+          <p:nvPr/>
+        </p:nvCxnSpPr>
+        <p:spPr>
+          <a:xfrm>
+            <a:off x="7810403" y="3850601"/>
+            <a:ext cx="0" cy="568999"/>
+          </a:xfrm>
+          <a:prstGeom prst="line">
+            <a:avLst/>
+          </a:prstGeom>
+          <a:ln w="9525" cap="flat" cmpd="sng" algn="ctr">
+            <a:solidFill>
+              <a:schemeClr val="accent2"/>
+            </a:solidFill>
+            <a:prstDash val="dash"/>
+            <a:round/>
+            <a:headEnd type="none" w="med" len="med"/>
+            <a:tailEnd type="none" w="med" len="med"/>
+          </a:ln>
+        </p:spPr>
+        <p:style>
+          <a:lnRef idx="0">
+            <a:scrgbClr r="0" g="0" b="0"/>
+          </a:lnRef>
+          <a:fillRef idx="0">
+            <a:scrgbClr r="0" g="0" b="0"/>
+          </a:fillRef>
+          <a:effectRef idx="0">
+            <a:scrgbClr r="0" g="0" b="0"/>
+          </a:effectRef>
+          <a:fontRef idx="minor">
+            <a:schemeClr val="tx1"/>
+          </a:fontRef>
+        </p:style>
+      </p:cxnSp>
+      <p:grpSp>
+        <p:nvGrpSpPr>
+          <p:cNvPr id="84" name="Group 83">
+            <a:extLst>
+              <a:ext uri="{FF2B5EF4-FFF2-40B4-BE49-F238E27FC236}">
+                <a16:creationId xmlns:a16="http://schemas.microsoft.com/office/drawing/2014/main" id="{E68002EA-0135-4CF5-B016-E7B2E96D1390}"/>
+              </a:ext>
+            </a:extLst>
+          </p:cNvPr>
+          <p:cNvGrpSpPr/>
+          <p:nvPr/>
+        </p:nvGrpSpPr>
+        <p:grpSpPr>
+          <a:xfrm>
+            <a:off x="6141869" y="3796799"/>
+            <a:ext cx="1618104" cy="107603"/>
+            <a:chOff x="381004" y="4960393"/>
+            <a:chExt cx="2449891" cy="143144"/>
+          </a:xfrm>
+        </p:grpSpPr>
+        <p:cxnSp>
+          <p:nvCxnSpPr>
+            <p:cNvPr id="85" name="Straight Arrow Connector 84">
+              <a:extLst>
+                <a:ext uri="{FF2B5EF4-FFF2-40B4-BE49-F238E27FC236}">
+                  <a16:creationId xmlns:a16="http://schemas.microsoft.com/office/drawing/2014/main" id="{4DCB91E2-EC5C-4E6A-83F7-8557CCE095DB}"/>
+                </a:ext>
+              </a:extLst>
+            </p:cNvPr>
+            <p:cNvCxnSpPr>
+              <a:cxnSpLocks/>
+            </p:cNvCxnSpPr>
+            <p:nvPr/>
+          </p:nvCxnSpPr>
+          <p:spPr>
+            <a:xfrm flipH="1">
+              <a:off x="392550" y="5024005"/>
+              <a:ext cx="2438345" cy="4276"/>
+            </a:xfrm>
+            <a:prstGeom prst="straightConnector1">
+              <a:avLst/>
+            </a:prstGeom>
+            <a:ln w="9525" cap="flat" cmpd="sng" algn="ctr">
+              <a:solidFill>
+                <a:schemeClr val="accent2"/>
+              </a:solidFill>
+              <a:prstDash val="dash"/>
+              <a:round/>
+              <a:headEnd type="none" w="med" len="med"/>
+              <a:tailEnd type="none" w="med" len="med"/>
+            </a:ln>
+          </p:spPr>
+          <p:style>
+            <a:lnRef idx="0">
+              <a:scrgbClr r="0" g="0" b="0"/>
+            </a:lnRef>
+            <a:fillRef idx="0">
+              <a:scrgbClr r="0" g="0" b="0"/>
+            </a:fillRef>
+            <a:effectRef idx="0">
+              <a:scrgbClr r="0" g="0" b="0"/>
+            </a:effectRef>
+            <a:fontRef idx="minor">
+              <a:schemeClr val="tx1"/>
+            </a:fontRef>
+          </p:style>
+        </p:cxnSp>
+        <p:cxnSp>
+          <p:nvCxnSpPr>
+            <p:cNvPr id="86" name="Straight Connector 85">
+              <a:extLst>
+                <a:ext uri="{FF2B5EF4-FFF2-40B4-BE49-F238E27FC236}">
+                  <a16:creationId xmlns:a16="http://schemas.microsoft.com/office/drawing/2014/main" id="{4DF22377-E6AE-4F5D-88E2-EF778F1C6F7C}"/>
+                </a:ext>
+              </a:extLst>
+            </p:cNvPr>
+            <p:cNvCxnSpPr>
+              <a:cxnSpLocks/>
+            </p:cNvCxnSpPr>
+            <p:nvPr/>
+          </p:nvCxnSpPr>
+          <p:spPr>
+            <a:xfrm flipV="1">
+              <a:off x="381004" y="4960393"/>
+              <a:ext cx="118077" cy="70186"/>
+            </a:xfrm>
+            <a:prstGeom prst="line">
+              <a:avLst/>
+            </a:prstGeom>
+            <a:ln>
+              <a:solidFill>
+                <a:schemeClr val="accent2"/>
+              </a:solidFill>
+            </a:ln>
+          </p:spPr>
+          <p:style>
+            <a:lnRef idx="1">
+              <a:schemeClr val="accent1"/>
+            </a:lnRef>
+            <a:fillRef idx="0">
+              <a:schemeClr val="accent1"/>
+            </a:fillRef>
+            <a:effectRef idx="0">
+              <a:schemeClr val="accent1"/>
+            </a:effectRef>
+            <a:fontRef idx="minor">
+              <a:schemeClr val="tx1"/>
+            </a:fontRef>
+          </p:style>
+        </p:cxnSp>
+        <p:cxnSp>
+          <p:nvCxnSpPr>
+            <p:cNvPr id="87" name="Straight Connector 86">
+              <a:extLst>
+                <a:ext uri="{FF2B5EF4-FFF2-40B4-BE49-F238E27FC236}">
+                  <a16:creationId xmlns:a16="http://schemas.microsoft.com/office/drawing/2014/main" id="{22DD3DEF-D03B-45B2-990B-B114DB18297E}"/>
+                </a:ext>
+              </a:extLst>
+            </p:cNvPr>
+            <p:cNvCxnSpPr>
+              <a:cxnSpLocks/>
+            </p:cNvCxnSpPr>
+            <p:nvPr/>
+          </p:nvCxnSpPr>
+          <p:spPr>
+            <a:xfrm>
+              <a:off x="383823" y="5030580"/>
+              <a:ext cx="117898" cy="72957"/>
+            </a:xfrm>
+            <a:prstGeom prst="line">
+              <a:avLst/>
+            </a:prstGeom>
+            <a:ln>
+              <a:solidFill>
+                <a:schemeClr val="accent2"/>
+              </a:solidFill>
+            </a:ln>
+          </p:spPr>
+          <p:style>
+            <a:lnRef idx="1">
+              <a:schemeClr val="accent1"/>
+            </a:lnRef>
+            <a:fillRef idx="0">
+              <a:schemeClr val="accent1"/>
+            </a:fillRef>
+            <a:effectRef idx="0">
+              <a:schemeClr val="accent1"/>
+            </a:effectRef>
+            <a:fontRef idx="minor">
+              <a:schemeClr val="tx1"/>
+            </a:fontRef>
+          </p:style>
+        </p:cxnSp>
+      </p:grpSp>
+      <p:sp>
+        <p:nvSpPr>
+          <p:cNvPr id="88" name="TextBox 87">
+            <a:extLst>
+              <a:ext uri="{FF2B5EF4-FFF2-40B4-BE49-F238E27FC236}">
+                <a16:creationId xmlns:a16="http://schemas.microsoft.com/office/drawing/2014/main" id="{A9A53AD3-BFF2-405D-B74A-D9E4FDC3E7C4}"/>
+              </a:ext>
+            </a:extLst>
+          </p:cNvPr>
+          <p:cNvSpPr txBox="1"/>
+          <p:nvPr/>
+        </p:nvSpPr>
+        <p:spPr>
+          <a:xfrm>
+            <a:off x="3969488" y="3368778"/>
+            <a:ext cx="1105178" cy="230832"/>
+          </a:xfrm>
+          <a:prstGeom prst="rect">
+            <a:avLst/>
+          </a:prstGeom>
+          <a:noFill/>
+        </p:spPr>
+        <p:txBody>
+          <a:bodyPr wrap="square" rtlCol="0">
+            <a:spAutoFit/>
+          </a:bodyPr>
+          <a:lstStyle/>
+          <a:p>
+            <a:r>
+              <a:rPr lang="en-US" sz="900" dirty="0" err="1"/>
+              <a:t>executeCommand</a:t>
+            </a:r>
+            <a:r>
+              <a:rPr lang="en-US" sz="900" dirty="0"/>
+              <a:t>()</a:t>
+            </a:r>
+          </a:p>
+        </p:txBody>
+      </p:sp>
+      <p:sp>
+        <p:nvSpPr>
+          <p:cNvPr id="89" name="TextBox 88">
+            <a:extLst>
+              <a:ext uri="{FF2B5EF4-FFF2-40B4-BE49-F238E27FC236}">
+                <a16:creationId xmlns:a16="http://schemas.microsoft.com/office/drawing/2014/main" id="{E3F0CFE0-E352-4820-B02E-C30F7F8AD472}"/>
+              </a:ext>
+            </a:extLst>
+          </p:cNvPr>
+          <p:cNvSpPr txBox="1"/>
+          <p:nvPr/>
+        </p:nvSpPr>
+        <p:spPr>
+          <a:xfrm>
+            <a:off x="4153594" y="3855147"/>
+            <a:ext cx="948743" cy="230832"/>
+          </a:xfrm>
+          <a:prstGeom prst="rect">
+            <a:avLst/>
+          </a:prstGeom>
+          <a:noFill/>
+        </p:spPr>
+        <p:txBody>
+          <a:bodyPr wrap="square" rtlCol="0">
+            <a:spAutoFit/>
+          </a:bodyPr>
+          <a:lstStyle/>
+          <a:p>
+            <a:r>
+              <a:rPr lang="en-US" sz="900" dirty="0"/>
+              <a:t>result</a:t>
+            </a:r>
+          </a:p>
+        </p:txBody>
+      </p:sp>
+      <p:sp>
+        <p:nvSpPr>
+          <p:cNvPr id="90" name="Rectangle 89">
+            <a:extLst>
+              <a:ext uri="{FF2B5EF4-FFF2-40B4-BE49-F238E27FC236}">
+                <a16:creationId xmlns:a16="http://schemas.microsoft.com/office/drawing/2014/main" id="{B5486438-BE7E-4970-A46C-233EB02CCDDE}"/>
+              </a:ext>
+            </a:extLst>
+          </p:cNvPr>
+          <p:cNvSpPr/>
+          <p:nvPr/>
+        </p:nvSpPr>
+        <p:spPr>
+          <a:xfrm>
+            <a:off x="7832010" y="800099"/>
+            <a:ext cx="1143000" cy="304800"/>
+          </a:xfrm>
+          <a:prstGeom prst="rect">
+            <a:avLst/>
+          </a:prstGeom>
+          <a:solidFill>
+            <a:schemeClr val="accent1">
+              <a:lumMod val="50000"/>
+            </a:schemeClr>
+          </a:solidFill>
+          <a:ln w="12700">
+            <a:solidFill>
+              <a:schemeClr val="accent2"/>
+            </a:solidFill>
+          </a:ln>
+        </p:spPr>
+        <p:style>
+          <a:lnRef idx="2">
+            <a:schemeClr val="accent1">
+              <a:shade val="50000"/>
+            </a:schemeClr>
+          </a:lnRef>
+          <a:fillRef idx="1">
+            <a:schemeClr val="accent1"/>
+          </a:fillRef>
+          <a:effectRef idx="0">
+            <a:schemeClr val="accent1"/>
+          </a:effectRef>
+          <a:fontRef idx="minor">
+            <a:schemeClr val="lt1"/>
+          </a:fontRef>
+        </p:style>
+        <p:txBody>
+          <a:bodyPr rtlCol="0" anchor="ctr"/>
+          <a:lstStyle/>
+          <a:p>
+            <a:pPr algn="ctr"/>
+            <a:r>
+              <a:rPr lang="en-US" sz="1050" dirty="0"/>
+              <a:t>:Ui</a:t>
+            </a:r>
+          </a:p>
+        </p:txBody>
+      </p:sp>
+      <p:cxnSp>
+        <p:nvCxnSpPr>
+          <p:cNvPr id="91" name="Straight Connector 90">
+            <a:extLst>
+              <a:ext uri="{FF2B5EF4-FFF2-40B4-BE49-F238E27FC236}">
+                <a16:creationId xmlns:a16="http://schemas.microsoft.com/office/drawing/2014/main" id="{70CA54FD-1B01-4BCE-9F57-098EA28529A1}"/>
+              </a:ext>
+            </a:extLst>
+          </p:cNvPr>
+          <p:cNvCxnSpPr>
+            <a:cxnSpLocks/>
+          </p:cNvCxnSpPr>
+          <p:nvPr/>
+        </p:nvCxnSpPr>
+        <p:spPr>
+          <a:xfrm>
+            <a:off x="8420845" y="1104900"/>
+            <a:ext cx="0" cy="5715000"/>
+          </a:xfrm>
+          <a:prstGeom prst="line">
+            <a:avLst/>
+          </a:prstGeom>
+          <a:ln w="9525" cap="flat" cmpd="sng" algn="ctr">
+            <a:solidFill>
+              <a:schemeClr val="accent2"/>
+            </a:solidFill>
+            <a:prstDash val="dash"/>
+            <a:round/>
+            <a:headEnd type="none" w="med" len="med"/>
+            <a:tailEnd type="none" w="med" len="med"/>
+          </a:ln>
+        </p:spPr>
+        <p:style>
+          <a:lnRef idx="0">
+            <a:scrgbClr r="0" g="0" b="0"/>
+          </a:lnRef>
+          <a:fillRef idx="0">
+            <a:scrgbClr r="0" g="0" b="0"/>
+          </a:fillRef>
+          <a:effectRef idx="0">
+            <a:scrgbClr r="0" g="0" b="0"/>
+          </a:effectRef>
+          <a:fontRef idx="minor">
+            <a:schemeClr val="tx1"/>
+          </a:fontRef>
+        </p:style>
+      </p:cxnSp>
+      <p:cxnSp>
+        <p:nvCxnSpPr>
+          <p:cNvPr id="92" name="Straight Arrow Connector 91">
+            <a:extLst>
+              <a:ext uri="{FF2B5EF4-FFF2-40B4-BE49-F238E27FC236}">
+                <a16:creationId xmlns:a16="http://schemas.microsoft.com/office/drawing/2014/main" id="{6FFA846A-75CD-4F7C-9DEA-4D6C5CB0DBAB}"/>
+              </a:ext>
+            </a:extLst>
+          </p:cNvPr>
+          <p:cNvCxnSpPr>
+            <a:cxnSpLocks/>
+          </p:cNvCxnSpPr>
+          <p:nvPr/>
+        </p:nvCxnSpPr>
+        <p:spPr>
+          <a:xfrm flipV="1">
+            <a:off x="2962325" y="4710753"/>
+            <a:ext cx="5374712" cy="13648"/>
+          </a:xfrm>
+          <a:prstGeom prst="straightConnector1">
+            <a:avLst/>
+          </a:prstGeom>
+          <a:ln w="9525" cap="flat" cmpd="sng" algn="ctr">
+            <a:solidFill>
+              <a:schemeClr val="accent2"/>
+            </a:solidFill>
+            <a:prstDash val="solid"/>
+            <a:round/>
+            <a:headEnd type="none" w="med" len="med"/>
+            <a:tailEnd type="arrow" w="med" len="med"/>
+          </a:ln>
+        </p:spPr>
+        <p:style>
+          <a:lnRef idx="0">
+            <a:scrgbClr r="0" g="0" b="0"/>
+          </a:lnRef>
+          <a:fillRef idx="0">
+            <a:scrgbClr r="0" g="0" b="0"/>
+          </a:fillRef>
+          <a:effectRef idx="0">
+            <a:scrgbClr r="0" g="0" b="0"/>
+          </a:effectRef>
+          <a:fontRef idx="minor">
+            <a:schemeClr val="tx1"/>
+          </a:fontRef>
+        </p:style>
+      </p:cxnSp>
+      <p:sp>
+        <p:nvSpPr>
+          <p:cNvPr id="93" name="TextBox 92">
+            <a:extLst>
+              <a:ext uri="{FF2B5EF4-FFF2-40B4-BE49-F238E27FC236}">
+                <a16:creationId xmlns:a16="http://schemas.microsoft.com/office/drawing/2014/main" id="{97782E96-24C6-4036-B74A-6E3621160661}"/>
+              </a:ext>
+            </a:extLst>
+          </p:cNvPr>
+          <p:cNvSpPr txBox="1"/>
+          <p:nvPr/>
+        </p:nvSpPr>
+        <p:spPr>
+          <a:xfrm>
+            <a:off x="4975570" y="4505237"/>
+            <a:ext cx="1387261" cy="230832"/>
+          </a:xfrm>
+          <a:prstGeom prst="rect">
+            <a:avLst/>
+          </a:prstGeom>
+          <a:noFill/>
+        </p:spPr>
+        <p:txBody>
+          <a:bodyPr wrap="square" rtlCol="0">
+            <a:spAutoFit/>
+          </a:bodyPr>
+          <a:lstStyle/>
+          <a:p>
+            <a:r>
+              <a:rPr lang="en-US" sz="900" dirty="0" err="1"/>
+              <a:t>showResultToUser</a:t>
+            </a:r>
+            <a:r>
+              <a:rPr lang="en-US" sz="900" dirty="0"/>
+              <a:t>(result)</a:t>
+            </a:r>
+          </a:p>
+        </p:txBody>
+      </p:sp>
+      <p:sp>
+        <p:nvSpPr>
+          <p:cNvPr id="95" name="Rectangle 94">
+            <a:extLst>
+              <a:ext uri="{FF2B5EF4-FFF2-40B4-BE49-F238E27FC236}">
+                <a16:creationId xmlns:a16="http://schemas.microsoft.com/office/drawing/2014/main" id="{07D619CD-969B-4E36-8E79-C9A54DB51AB9}"/>
+              </a:ext>
+            </a:extLst>
+          </p:cNvPr>
+          <p:cNvSpPr/>
+          <p:nvPr/>
+        </p:nvSpPr>
+        <p:spPr>
+          <a:xfrm>
+            <a:off x="8348119" y="4710753"/>
+            <a:ext cx="132945" cy="670994"/>
+          </a:xfrm>
+          <a:prstGeom prst="rect">
+            <a:avLst/>
+          </a:prstGeom>
+          <a:ln w="12700">
+            <a:solidFill>
+              <a:schemeClr val="accent2"/>
+            </a:solidFill>
+          </a:ln>
+        </p:spPr>
+        <p:style>
+          <a:lnRef idx="2">
+            <a:schemeClr val="accent6"/>
+          </a:lnRef>
+          <a:fillRef idx="1">
+            <a:schemeClr val="lt1"/>
+          </a:fillRef>
+          <a:effectRef idx="0">
+            <a:schemeClr val="accent6"/>
+          </a:effectRef>
+          <a:fontRef idx="minor">
+            <a:schemeClr val="dk1"/>
+          </a:fontRef>
+        </p:style>
+        <p:txBody>
+          <a:bodyPr rtlCol="0" anchor="ctr"/>
+          <a:lstStyle/>
+          <a:p>
+            <a:pPr algn="ctr"/>
+            <a:endParaRPr lang="en-US" dirty="0"/>
+          </a:p>
+        </p:txBody>
+      </p:sp>
+      <p:grpSp>
+        <p:nvGrpSpPr>
+          <p:cNvPr id="111" name="Group 110">
+            <a:extLst>
+              <a:ext uri="{FF2B5EF4-FFF2-40B4-BE49-F238E27FC236}">
+                <a16:creationId xmlns:a16="http://schemas.microsoft.com/office/drawing/2014/main" id="{F98A6097-CC95-4CCF-AE55-FCDA4B69B10A}"/>
+              </a:ext>
+            </a:extLst>
+          </p:cNvPr>
+          <p:cNvGrpSpPr/>
+          <p:nvPr/>
+        </p:nvGrpSpPr>
+        <p:grpSpPr>
+          <a:xfrm>
+            <a:off x="2947297" y="5317975"/>
+            <a:ext cx="5400823" cy="104145"/>
+            <a:chOff x="2947297" y="5317975"/>
+            <a:chExt cx="5400823" cy="104145"/>
+          </a:xfrm>
+        </p:grpSpPr>
+        <p:cxnSp>
+          <p:nvCxnSpPr>
+            <p:cNvPr id="102" name="Straight Arrow Connector 101">
+              <a:extLst>
+                <a:ext uri="{FF2B5EF4-FFF2-40B4-BE49-F238E27FC236}">
+                  <a16:creationId xmlns:a16="http://schemas.microsoft.com/office/drawing/2014/main" id="{3E5B0080-AF06-4988-B7C6-60C69C1325F1}"/>
+                </a:ext>
+              </a:extLst>
+            </p:cNvPr>
+            <p:cNvCxnSpPr>
+              <a:cxnSpLocks/>
+            </p:cNvCxnSpPr>
+            <p:nvPr/>
+          </p:nvCxnSpPr>
+          <p:spPr>
+            <a:xfrm flipH="1">
+              <a:off x="2972750" y="5370322"/>
+              <a:ext cx="5375370" cy="3519"/>
+            </a:xfrm>
+            <a:prstGeom prst="straightConnector1">
+              <a:avLst/>
+            </a:prstGeom>
+            <a:ln w="9525" cap="flat" cmpd="sng" algn="ctr">
+              <a:solidFill>
+                <a:schemeClr val="accent2"/>
+              </a:solidFill>
+              <a:prstDash val="dash"/>
+              <a:round/>
+              <a:headEnd type="none" w="med" len="med"/>
+              <a:tailEnd type="none" w="med" len="med"/>
+            </a:ln>
+          </p:spPr>
+          <p:style>
+            <a:lnRef idx="0">
+              <a:scrgbClr r="0" g="0" b="0"/>
+            </a:lnRef>
+            <a:fillRef idx="0">
+              <a:scrgbClr r="0" g="0" b="0"/>
+            </a:fillRef>
+            <a:effectRef idx="0">
+              <a:scrgbClr r="0" g="0" b="0"/>
+            </a:effectRef>
+            <a:fontRef idx="minor">
+              <a:schemeClr val="tx1"/>
+            </a:fontRef>
+          </p:style>
+        </p:cxnSp>
+        <p:cxnSp>
+          <p:nvCxnSpPr>
+            <p:cNvPr id="103" name="Straight Connector 102">
+              <a:extLst>
+                <a:ext uri="{FF2B5EF4-FFF2-40B4-BE49-F238E27FC236}">
+                  <a16:creationId xmlns:a16="http://schemas.microsoft.com/office/drawing/2014/main" id="{39DAE210-D23D-46DC-B701-2B2DD258C96E}"/>
+                </a:ext>
+              </a:extLst>
+            </p:cNvPr>
+            <p:cNvCxnSpPr>
+              <a:cxnSpLocks/>
+            </p:cNvCxnSpPr>
+            <p:nvPr/>
+          </p:nvCxnSpPr>
+          <p:spPr>
+            <a:xfrm flipV="1">
+              <a:off x="2947297" y="5317975"/>
+              <a:ext cx="132945" cy="57758"/>
+            </a:xfrm>
+            <a:prstGeom prst="line">
+              <a:avLst/>
+            </a:prstGeom>
+            <a:ln>
+              <a:solidFill>
+                <a:schemeClr val="accent2"/>
+              </a:solidFill>
+            </a:ln>
+          </p:spPr>
+          <p:style>
+            <a:lnRef idx="1">
+              <a:schemeClr val="accent1"/>
+            </a:lnRef>
+            <a:fillRef idx="0">
+              <a:schemeClr val="accent1"/>
+            </a:fillRef>
+            <a:effectRef idx="0">
+              <a:schemeClr val="accent1"/>
+            </a:effectRef>
+            <a:fontRef idx="minor">
+              <a:schemeClr val="tx1"/>
+            </a:fontRef>
+          </p:style>
+        </p:cxnSp>
+        <p:cxnSp>
+          <p:nvCxnSpPr>
+            <p:cNvPr id="104" name="Straight Connector 103">
+              <a:extLst>
+                <a:ext uri="{FF2B5EF4-FFF2-40B4-BE49-F238E27FC236}">
+                  <a16:creationId xmlns:a16="http://schemas.microsoft.com/office/drawing/2014/main" id="{CEF04CFC-1538-45A9-B154-39CF9202023A}"/>
+                </a:ext>
+              </a:extLst>
+            </p:cNvPr>
+            <p:cNvCxnSpPr>
+              <a:cxnSpLocks/>
+            </p:cNvCxnSpPr>
+            <p:nvPr/>
+          </p:nvCxnSpPr>
+          <p:spPr>
+            <a:xfrm>
+              <a:off x="2953512" y="5375732"/>
+              <a:ext cx="126730" cy="46388"/>
+            </a:xfrm>
+            <a:prstGeom prst="line">
+              <a:avLst/>
+            </a:prstGeom>
+            <a:ln>
+              <a:solidFill>
+                <a:schemeClr val="accent2"/>
+              </a:solidFill>
+            </a:ln>
+          </p:spPr>
+          <p:style>
+            <a:lnRef idx="1">
+              <a:schemeClr val="accent1"/>
+            </a:lnRef>
+            <a:fillRef idx="0">
+              <a:schemeClr val="accent1"/>
+            </a:fillRef>
+            <a:effectRef idx="0">
+              <a:schemeClr val="accent1"/>
+            </a:effectRef>
+            <a:fontRef idx="minor">
+              <a:schemeClr val="tx1"/>
+            </a:fontRef>
+          </p:style>
+        </p:cxnSp>
+      </p:grpSp>
+      <p:grpSp>
+        <p:nvGrpSpPr>
+          <p:cNvPr id="112" name="Group 111">
+            <a:extLst>
+              <a:ext uri="{FF2B5EF4-FFF2-40B4-BE49-F238E27FC236}">
+                <a16:creationId xmlns:a16="http://schemas.microsoft.com/office/drawing/2014/main" id="{665C0D62-6775-45DF-A1F9-77D6D5524CDB}"/>
+              </a:ext>
+            </a:extLst>
+          </p:cNvPr>
+          <p:cNvGrpSpPr/>
+          <p:nvPr/>
+        </p:nvGrpSpPr>
+        <p:grpSpPr>
+          <a:xfrm>
+            <a:off x="1553471" y="5550457"/>
+            <a:ext cx="1384408" cy="105607"/>
+            <a:chOff x="381004" y="4960393"/>
+            <a:chExt cx="2449891" cy="143144"/>
+          </a:xfrm>
+        </p:grpSpPr>
+        <p:cxnSp>
+          <p:nvCxnSpPr>
+            <p:cNvPr id="113" name="Straight Arrow Connector 112">
+              <a:extLst>
+                <a:ext uri="{FF2B5EF4-FFF2-40B4-BE49-F238E27FC236}">
+                  <a16:creationId xmlns:a16="http://schemas.microsoft.com/office/drawing/2014/main" id="{73FF4C9D-B210-440F-B56B-778ECD5CC795}"/>
+                </a:ext>
+              </a:extLst>
+            </p:cNvPr>
+            <p:cNvCxnSpPr>
+              <a:cxnSpLocks/>
+            </p:cNvCxnSpPr>
+            <p:nvPr/>
+          </p:nvCxnSpPr>
+          <p:spPr>
+            <a:xfrm flipH="1">
+              <a:off x="392550" y="5024005"/>
+              <a:ext cx="2438345" cy="4276"/>
+            </a:xfrm>
+            <a:prstGeom prst="straightConnector1">
+              <a:avLst/>
+            </a:prstGeom>
+            <a:ln w="9525" cap="flat" cmpd="sng" algn="ctr">
+              <a:solidFill>
+                <a:schemeClr val="accent2"/>
+              </a:solidFill>
+              <a:prstDash val="dash"/>
+              <a:round/>
+              <a:headEnd type="none" w="med" len="med"/>
+              <a:tailEnd type="none" w="med" len="med"/>
+            </a:ln>
+          </p:spPr>
+          <p:style>
+            <a:lnRef idx="0">
+              <a:scrgbClr r="0" g="0" b="0"/>
+            </a:lnRef>
+            <a:fillRef idx="0">
+              <a:scrgbClr r="0" g="0" b="0"/>
+            </a:fillRef>
+            <a:effectRef idx="0">
+              <a:scrgbClr r="0" g="0" b="0"/>
+            </a:effectRef>
+            <a:fontRef idx="minor">
+              <a:schemeClr val="tx1"/>
+            </a:fontRef>
+          </p:style>
+        </p:cxnSp>
+        <p:cxnSp>
+          <p:nvCxnSpPr>
+            <p:cNvPr id="114" name="Straight Connector 113">
+              <a:extLst>
+                <a:ext uri="{FF2B5EF4-FFF2-40B4-BE49-F238E27FC236}">
+                  <a16:creationId xmlns:a16="http://schemas.microsoft.com/office/drawing/2014/main" id="{C2B521E5-2929-4B55-BEC2-29081E36A520}"/>
+                </a:ext>
+              </a:extLst>
+            </p:cNvPr>
+            <p:cNvCxnSpPr>
+              <a:cxnSpLocks/>
+            </p:cNvCxnSpPr>
+            <p:nvPr/>
+          </p:nvCxnSpPr>
+          <p:spPr>
+            <a:xfrm flipV="1">
+              <a:off x="381004" y="4960393"/>
+              <a:ext cx="118077" cy="70186"/>
+            </a:xfrm>
+            <a:prstGeom prst="line">
+              <a:avLst/>
+            </a:prstGeom>
+            <a:ln>
+              <a:solidFill>
+                <a:schemeClr val="accent2"/>
+              </a:solidFill>
+            </a:ln>
+          </p:spPr>
+          <p:style>
+            <a:lnRef idx="1">
+              <a:schemeClr val="accent1"/>
+            </a:lnRef>
+            <a:fillRef idx="0">
+              <a:schemeClr val="accent1"/>
+            </a:fillRef>
+            <a:effectRef idx="0">
+              <a:schemeClr val="accent1"/>
+            </a:effectRef>
+            <a:fontRef idx="minor">
+              <a:schemeClr val="tx1"/>
+            </a:fontRef>
+          </p:style>
+        </p:cxnSp>
+        <p:cxnSp>
+          <p:nvCxnSpPr>
+            <p:cNvPr id="115" name="Straight Connector 114">
+              <a:extLst>
+                <a:ext uri="{FF2B5EF4-FFF2-40B4-BE49-F238E27FC236}">
+                  <a16:creationId xmlns:a16="http://schemas.microsoft.com/office/drawing/2014/main" id="{C02A1DDA-68C7-4A51-BCCD-6B2858B2BECE}"/>
+                </a:ext>
+              </a:extLst>
+            </p:cNvPr>
+            <p:cNvCxnSpPr>
+              <a:cxnSpLocks/>
+            </p:cNvCxnSpPr>
+            <p:nvPr/>
+          </p:nvCxnSpPr>
+          <p:spPr>
+            <a:xfrm>
+              <a:off x="383823" y="5030580"/>
+              <a:ext cx="117898" cy="72957"/>
+            </a:xfrm>
+            <a:prstGeom prst="line">
+              <a:avLst/>
+            </a:prstGeom>
+            <a:ln>
+              <a:solidFill>
+                <a:schemeClr val="accent2"/>
+              </a:solidFill>
+            </a:ln>
+          </p:spPr>
+          <p:style>
+            <a:lnRef idx="1">
+              <a:schemeClr val="accent1"/>
+            </a:lnRef>
+            <a:fillRef idx="0">
+              <a:schemeClr val="accent1"/>
+            </a:fillRef>
+            <a:effectRef idx="0">
+              <a:schemeClr val="accent1"/>
+            </a:effectRef>
+            <a:fontRef idx="minor">
+              <a:schemeClr val="tx1"/>
+            </a:fontRef>
+          </p:style>
+        </p:cxnSp>
+      </p:grpSp>
+    </p:spTree>
+    <p:extLst>
+      <p:ext uri="{BB962C8B-B14F-4D97-AF65-F5344CB8AC3E}">
+        <p14:creationId xmlns:p14="http://schemas.microsoft.com/office/powerpoint/2010/main" val="3838594281"/>
+      </p:ext>
+    </p:extLst>
+  </p:cSld>
+  <p:clrMapOvr>
+    <a:masterClrMapping/>
+  </p:clrMapOvr>
+</p:sld>
+</file>
+
+<file path=ppt/slides/slide4.xml><?xml version="1.0" encoding="utf-8"?>
+<p:sld xmlns:a="http://schemas.openxmlformats.org/drawingml/2006/main" xmlns:r="http://schemas.openxmlformats.org/officeDocument/2006/relationships" xmlns:p="http://schemas.openxmlformats.org/presentationml/2006/main">
+  <p:cSld>
+    <p:spTree>
+      <p:nvGrpSpPr>
+        <p:cNvPr id="1" name=""/>
+        <p:cNvGrpSpPr/>
+        <p:nvPr/>
+      </p:nvGrpSpPr>
+      <p:grpSpPr>
+        <a:xfrm>
+          <a:off x="0" y="0"/>
+          <a:ext cx="0" cy="0"/>
+          <a:chOff x="0" y="0"/>
+          <a:chExt cx="0" cy="0"/>
+        </a:xfrm>
+      </p:grpSpPr>
+      <p:sp>
+        <p:nvSpPr>
+          <p:cNvPr id="36" name="Rectangle 35">
+            <a:extLst>
+              <a:ext uri="{FF2B5EF4-FFF2-40B4-BE49-F238E27FC236}">
+                <a16:creationId xmlns:a16="http://schemas.microsoft.com/office/drawing/2014/main" id="{CE29C451-5CBE-6A42-A635-6048DE0F2F0E}"/>
+              </a:ext>
+            </a:extLst>
+          </p:cNvPr>
+          <p:cNvSpPr/>
+          <p:nvPr/>
+        </p:nvSpPr>
+        <p:spPr>
+          <a:xfrm>
+            <a:off x="533400" y="1344386"/>
+            <a:ext cx="8305800" cy="2618014"/>
+          </a:xfrm>
+          <a:prstGeom prst="rect">
+            <a:avLst/>
+          </a:prstGeom>
+        </p:spPr>
+        <p:style>
+          <a:lnRef idx="2">
+            <a:schemeClr val="dk1"/>
+          </a:lnRef>
+          <a:fillRef idx="1">
+            <a:schemeClr val="lt1"/>
+          </a:fillRef>
+          <a:effectRef idx="0">
+            <a:schemeClr val="dk1"/>
+          </a:effectRef>
+          <a:fontRef idx="minor">
+            <a:schemeClr val="dk1"/>
+          </a:fontRef>
+        </p:style>
+        <p:txBody>
+          <a:bodyPr rtlCol="0" anchor="ctr"/>
+          <a:lstStyle/>
+          <a:p>
+            <a:pPr algn="ctr"/>
+            <a:endParaRPr lang="en-US" dirty="0"/>
+          </a:p>
+        </p:txBody>
+      </p:sp>
+      <p:sp>
+        <p:nvSpPr>
+          <p:cNvPr id="38" name="TextBox 37">
+            <a:extLst>
+              <a:ext uri="{FF2B5EF4-FFF2-40B4-BE49-F238E27FC236}">
+                <a16:creationId xmlns:a16="http://schemas.microsoft.com/office/drawing/2014/main" id="{9131A343-C1BE-204F-953B-7258B0D65B88}"/>
+              </a:ext>
+            </a:extLst>
+          </p:cNvPr>
+          <p:cNvSpPr txBox="1"/>
+          <p:nvPr/>
+        </p:nvSpPr>
+        <p:spPr>
+          <a:xfrm>
+            <a:off x="3886200" y="1447800"/>
+            <a:ext cx="1600200" cy="369332"/>
+          </a:xfrm>
+          <a:prstGeom prst="rect">
+            <a:avLst/>
+          </a:prstGeom>
+          <a:noFill/>
+        </p:spPr>
+        <p:txBody>
+          <a:bodyPr wrap="square" rtlCol="0">
+            <a:spAutoFit/>
+          </a:bodyPr>
+          <a:lstStyle/>
+          <a:p>
+            <a:r>
+              <a:rPr lang="en-US" dirty="0"/>
+              <a:t>Lesson Storage</a:t>
+            </a:r>
+          </a:p>
+        </p:txBody>
+      </p:sp>
+      <p:sp>
+        <p:nvSpPr>
+          <p:cNvPr id="39" name="Rectangle 38">
+            <a:extLst>
+              <a:ext uri="{FF2B5EF4-FFF2-40B4-BE49-F238E27FC236}">
+                <a16:creationId xmlns:a16="http://schemas.microsoft.com/office/drawing/2014/main" id="{BB6C14F9-4498-4647-8AF4-63A8DF4F2C08}"/>
+              </a:ext>
+            </a:extLst>
+          </p:cNvPr>
+          <p:cNvSpPr/>
+          <p:nvPr/>
+        </p:nvSpPr>
+        <p:spPr>
+          <a:xfrm>
+            <a:off x="762000" y="2743200"/>
+            <a:ext cx="1524000" cy="685800"/>
+          </a:xfrm>
+          <a:prstGeom prst="rect">
+            <a:avLst/>
+          </a:prstGeom>
+          <a:solidFill>
+            <a:srgbClr val="FFD609"/>
+          </a:solidFill>
+          <a:ln>
+            <a:noFill/>
+          </a:ln>
+        </p:spPr>
+        <p:style>
+          <a:lnRef idx="2">
+            <a:schemeClr val="accent1">
+              <a:shade val="50000"/>
+            </a:schemeClr>
+          </a:lnRef>
+          <a:fillRef idx="1">
+            <a:schemeClr val="accent1"/>
+          </a:fillRef>
+          <a:effectRef idx="0">
+            <a:schemeClr val="accent1"/>
+          </a:effectRef>
+          <a:fontRef idx="minor">
+            <a:schemeClr val="lt1"/>
+          </a:fontRef>
+        </p:style>
+        <p:txBody>
+          <a:bodyPr rtlCol="0" anchor="ctr"/>
+          <a:lstStyle/>
+          <a:p>
+            <a:pPr algn="ctr"/>
+            <a:r>
+              <a:rPr lang="en-US" sz="1200" u="sng" dirty="0">
+                <a:solidFill>
+                  <a:schemeClr val="tx1"/>
+                </a:solidFill>
+              </a:rPr>
+              <a:t>tutorial:Tutorial</a:t>
+            </a:r>
+          </a:p>
+        </p:txBody>
+      </p:sp>
+      <p:cxnSp>
+        <p:nvCxnSpPr>
+          <p:cNvPr id="43" name="Straight Arrow Connector 42">
+            <a:extLst>
+              <a:ext uri="{FF2B5EF4-FFF2-40B4-BE49-F238E27FC236}">
+                <a16:creationId xmlns:a16="http://schemas.microsoft.com/office/drawing/2014/main" id="{74383B7F-DDF8-5846-894C-F3FD9DA006D1}"/>
+              </a:ext>
+            </a:extLst>
+          </p:cNvPr>
+          <p:cNvCxnSpPr/>
+          <p:nvPr/>
+        </p:nvCxnSpPr>
+        <p:spPr>
+          <a:xfrm flipV="1">
+            <a:off x="7848600" y="3399064"/>
+            <a:ext cx="0" cy="1371600"/>
+          </a:xfrm>
+          <a:prstGeom prst="straightConnector1">
+            <a:avLst/>
+          </a:prstGeom>
+          <a:ln>
+            <a:tailEnd type="triangle"/>
+          </a:ln>
+        </p:spPr>
+        <p:style>
+          <a:lnRef idx="2">
+            <a:schemeClr val="accent2"/>
+          </a:lnRef>
+          <a:fillRef idx="0">
+            <a:schemeClr val="accent2"/>
+          </a:fillRef>
+          <a:effectRef idx="1">
+            <a:schemeClr val="accent2"/>
+          </a:effectRef>
+          <a:fontRef idx="minor">
+            <a:schemeClr val="tx1"/>
+          </a:fontRef>
+        </p:style>
+      </p:cxnSp>
+      <p:sp>
+        <p:nvSpPr>
+          <p:cNvPr id="56" name="Rectangle 55">
+            <a:extLst>
+              <a:ext uri="{FF2B5EF4-FFF2-40B4-BE49-F238E27FC236}">
+                <a16:creationId xmlns:a16="http://schemas.microsoft.com/office/drawing/2014/main" id="{9A2A4E4F-D2B3-C44E-AB94-AFCFC4105CDA}"/>
+              </a:ext>
+            </a:extLst>
+          </p:cNvPr>
+          <p:cNvSpPr/>
+          <p:nvPr/>
+        </p:nvSpPr>
+        <p:spPr>
+          <a:xfrm>
+            <a:off x="7200900" y="4767942"/>
+            <a:ext cx="1295400" cy="609600"/>
+          </a:xfrm>
+          <a:prstGeom prst="rect">
+            <a:avLst/>
+          </a:prstGeom>
+          <a:solidFill>
+            <a:schemeClr val="bg1"/>
+          </a:solidFill>
+          <a:ln>
+            <a:solidFill>
+              <a:schemeClr val="tx1"/>
+            </a:solidFill>
+          </a:ln>
+        </p:spPr>
+        <p:style>
+          <a:lnRef idx="2">
+            <a:schemeClr val="accent1">
+              <a:shade val="50000"/>
+            </a:schemeClr>
+          </a:lnRef>
+          <a:fillRef idx="1">
+            <a:schemeClr val="accent1"/>
+          </a:fillRef>
+          <a:effectRef idx="0">
+            <a:schemeClr val="accent1"/>
+          </a:effectRef>
+          <a:fontRef idx="minor">
+            <a:schemeClr val="lt1"/>
+          </a:fontRef>
+        </p:style>
+        <p:txBody>
+          <a:bodyPr rtlCol="0" anchor="ctr"/>
+          <a:lstStyle/>
+          <a:p>
+            <a:pPr algn="ctr"/>
+            <a:r>
+              <a:rPr lang="en-US" sz="1200" dirty="0">
+                <a:solidFill>
+                  <a:schemeClr val="tx1"/>
+                </a:solidFill>
+              </a:rPr>
+              <a:t>User adding lesson of type LAB</a:t>
+            </a:r>
+          </a:p>
+        </p:txBody>
+      </p:sp>
+      <p:sp>
+        <p:nvSpPr>
+          <p:cNvPr id="60" name="Rectangle 59">
+            <a:extLst>
+              <a:ext uri="{FF2B5EF4-FFF2-40B4-BE49-F238E27FC236}">
+                <a16:creationId xmlns:a16="http://schemas.microsoft.com/office/drawing/2014/main" id="{B2DB9B21-0081-F44F-8F1F-8A97F0CCB525}"/>
+              </a:ext>
+            </a:extLst>
+          </p:cNvPr>
+          <p:cNvSpPr/>
+          <p:nvPr/>
+        </p:nvSpPr>
+        <p:spPr>
+          <a:xfrm>
+            <a:off x="3810000" y="2743200"/>
+            <a:ext cx="1524000" cy="685800"/>
+          </a:xfrm>
+          <a:prstGeom prst="rect">
+            <a:avLst/>
+          </a:prstGeom>
+          <a:solidFill>
+            <a:srgbClr val="FFD609"/>
+          </a:solidFill>
+          <a:ln>
+            <a:noFill/>
+          </a:ln>
+        </p:spPr>
+        <p:style>
+          <a:lnRef idx="2">
+            <a:schemeClr val="accent1">
+              <a:shade val="50000"/>
+            </a:schemeClr>
+          </a:lnRef>
+          <a:fillRef idx="1">
+            <a:schemeClr val="accent1"/>
+          </a:fillRef>
+          <a:effectRef idx="0">
+            <a:schemeClr val="accent1"/>
+          </a:effectRef>
+          <a:fontRef idx="minor">
+            <a:schemeClr val="lt1"/>
+          </a:fontRef>
+        </p:style>
+        <p:txBody>
+          <a:bodyPr rtlCol="0" anchor="ctr"/>
+          <a:lstStyle/>
+          <a:p>
+            <a:pPr algn="ctr"/>
+            <a:r>
+              <a:rPr lang="en-US" sz="1200" u="sng" dirty="0">
+                <a:solidFill>
+                  <a:schemeClr val="tx1"/>
+                </a:solidFill>
+              </a:rPr>
+              <a:t>lecture:Lecture</a:t>
+            </a:r>
+          </a:p>
+        </p:txBody>
+      </p:sp>
+      <p:sp>
+        <p:nvSpPr>
+          <p:cNvPr id="61" name="Rectangle 60">
+            <a:extLst>
+              <a:ext uri="{FF2B5EF4-FFF2-40B4-BE49-F238E27FC236}">
+                <a16:creationId xmlns:a16="http://schemas.microsoft.com/office/drawing/2014/main" id="{8D2D0FE3-3C89-F14F-87AE-0DD371D6A0B6}"/>
+              </a:ext>
+            </a:extLst>
+          </p:cNvPr>
+          <p:cNvSpPr/>
+          <p:nvPr/>
+        </p:nvSpPr>
+        <p:spPr>
+          <a:xfrm>
+            <a:off x="7086600" y="2713264"/>
+            <a:ext cx="1524000" cy="685800"/>
+          </a:xfrm>
+          <a:prstGeom prst="rect">
+            <a:avLst/>
+          </a:prstGeom>
+          <a:solidFill>
+            <a:srgbClr val="FFD609"/>
+          </a:solidFill>
+          <a:ln>
+            <a:noFill/>
+          </a:ln>
+        </p:spPr>
+        <p:style>
+          <a:lnRef idx="2">
+            <a:schemeClr val="accent1">
+              <a:shade val="50000"/>
+            </a:schemeClr>
+          </a:lnRef>
+          <a:fillRef idx="1">
+            <a:schemeClr val="accent1"/>
+          </a:fillRef>
+          <a:effectRef idx="0">
+            <a:schemeClr val="accent1"/>
+          </a:effectRef>
+          <a:fontRef idx="minor">
+            <a:schemeClr val="lt1"/>
+          </a:fontRef>
+        </p:style>
+        <p:txBody>
+          <a:bodyPr rtlCol="0" anchor="ctr"/>
+          <a:lstStyle/>
+          <a:p>
+            <a:pPr algn="ctr"/>
+            <a:r>
+              <a:rPr lang="en-US" sz="1200" u="sng" dirty="0">
+                <a:solidFill>
+                  <a:schemeClr val="tx1"/>
+                </a:solidFill>
+              </a:rPr>
+              <a:t>lab:Lab</a:t>
+            </a:r>
+          </a:p>
+        </p:txBody>
+      </p:sp>
+      <p:sp>
+        <p:nvSpPr>
+          <p:cNvPr id="62" name="TextBox 61">
+            <a:extLst>
+              <a:ext uri="{FF2B5EF4-FFF2-40B4-BE49-F238E27FC236}">
+                <a16:creationId xmlns:a16="http://schemas.microsoft.com/office/drawing/2014/main" id="{5F8626F6-E151-2948-8567-81C7EB835F07}"/>
+              </a:ext>
+            </a:extLst>
+          </p:cNvPr>
+          <p:cNvSpPr txBox="1"/>
+          <p:nvPr/>
+        </p:nvSpPr>
+        <p:spPr>
+          <a:xfrm>
+            <a:off x="3676308" y="411966"/>
+            <a:ext cx="1530355" cy="369332"/>
+          </a:xfrm>
+          <a:prstGeom prst="rect">
+            <a:avLst/>
+          </a:prstGeom>
+          <a:noFill/>
+        </p:spPr>
+        <p:txBody>
+          <a:bodyPr wrap="none" rtlCol="0">
+            <a:spAutoFit/>
+          </a:bodyPr>
+          <a:lstStyle/>
+          <a:p>
+            <a:r>
+              <a:rPr lang="en-US" dirty="0"/>
+              <a:t>Timetable add</a:t>
+            </a:r>
+          </a:p>
+        </p:txBody>
+      </p:sp>
+    </p:spTree>
+    <p:extLst>
+      <p:ext uri="{BB962C8B-B14F-4D97-AF65-F5344CB8AC3E}">
+        <p14:creationId xmlns:p14="http://schemas.microsoft.com/office/powerpoint/2010/main" val="3654226981"/>
+      </p:ext>
+    </p:extLst>
+  </p:cSld>
+  <p:clrMapOvr>
+    <a:masterClrMapping/>
+  </p:clrMapOvr>
+</p:sld>
+</file>
+
+<file path=ppt/slides/slide5.xml><?xml version="1.0" encoding="utf-8"?>
+<p:sld xmlns:a="http://schemas.openxmlformats.org/drawingml/2006/main" xmlns:r="http://schemas.openxmlformats.org/officeDocument/2006/relationships" xmlns:p="http://schemas.openxmlformats.org/presentationml/2006/main">
+  <p:cSld>
+    <p:spTree>
+      <p:nvGrpSpPr>
+        <p:cNvPr id="1" name=""/>
+        <p:cNvGrpSpPr/>
+        <p:nvPr/>
+      </p:nvGrpSpPr>
+      <p:grpSpPr>
+        <a:xfrm>
+          <a:off x="0" y="0"/>
+          <a:ext cx="0" cy="0"/>
+          <a:chOff x="0" y="0"/>
+          <a:chExt cx="0" cy="0"/>
+        </a:xfrm>
+      </p:grpSpPr>
+      <p:sp>
+        <p:nvSpPr>
           <p:cNvPr id="2" name="Rectangle 1">
             <a:extLst>
               <a:ext uri="{FF2B5EF4-FFF2-40B4-BE49-F238E27FC236}">
@@ -6404,7 +9385,7 @@
 </p:sld>
 </file>
 
-<file path=ppt/slides/slide4.xml><?xml version="1.0" encoding="utf-8"?>
+<file path=ppt/slides/slide6.xml><?xml version="1.0" encoding="utf-8"?>
 <p:sld xmlns:a="http://schemas.openxmlformats.org/drawingml/2006/main" xmlns:r="http://schemas.openxmlformats.org/officeDocument/2006/relationships" xmlns:p="http://schemas.openxmlformats.org/presentationml/2006/main">
   <p:cSld>
     <p:spTree>
@@ -9869,7 +12850,7 @@
 </p:sld>
 </file>
 
-<file path=ppt/slides/slide5.xml><?xml version="1.0" encoding="utf-8"?>
+<file path=ppt/slides/slide7.xml><?xml version="1.0" encoding="utf-8"?>
 <p:sld xmlns:a="http://schemas.openxmlformats.org/drawingml/2006/main" xmlns:r="http://schemas.openxmlformats.org/officeDocument/2006/relationships" xmlns:p="http://schemas.openxmlformats.org/presentationml/2006/main">
   <p:cSld>
     <p:spTree>

</xml_diff>

<commit_message>
Add remaining example object diagrams to DG
</commit_message>
<xml_diff>
--- a/docs/assets/DG Diagrams.pptx
+++ b/docs/assets/DG Diagrams.pptx
@@ -5,7 +5,7 @@
     <p:sldMasterId id="2147483648" r:id="rId1"/>
   </p:sldMasterIdLst>
   <p:notesMasterIdLst>
-    <p:notesMasterId r:id="rId8"/>
+    <p:notesMasterId r:id="rId10"/>
   </p:notesMasterIdLst>
   <p:sldIdLst>
     <p:sldId id="256" r:id="rId2"/>
@@ -14,6 +14,8 @@
     <p:sldId id="262" r:id="rId5"/>
     <p:sldId id="263" r:id="rId6"/>
     <p:sldId id="264" r:id="rId7"/>
+    <p:sldId id="265" r:id="rId8"/>
+    <p:sldId id="266" r:id="rId9"/>
   </p:sldIdLst>
   <p:sldSz cx="9144000" cy="6858000" type="screen4x3"/>
   <p:notesSz cx="6858000" cy="9144000"/>
@@ -556,6 +558,174 @@
     <p:extLst>
       <p:ext uri="{BB962C8B-B14F-4D97-AF65-F5344CB8AC3E}">
         <p14:creationId xmlns:p14="http://schemas.microsoft.com/office/powerpoint/2010/main" val="3951499403"/>
+      </p:ext>
+    </p:extLst>
+  </p:cSld>
+  <p:clrMapOvr>
+    <a:masterClrMapping/>
+  </p:clrMapOvr>
+</p:notes>
+</file>
+
+<file path=ppt/notesSlides/notesSlide2.xml><?xml version="1.0" encoding="utf-8"?>
+<p:notes xmlns:a="http://schemas.openxmlformats.org/drawingml/2006/main" xmlns:r="http://schemas.openxmlformats.org/officeDocument/2006/relationships" xmlns:p="http://schemas.openxmlformats.org/presentationml/2006/main">
+  <p:cSld>
+    <p:spTree>
+      <p:nvGrpSpPr>
+        <p:cNvPr id="1" name=""/>
+        <p:cNvGrpSpPr/>
+        <p:nvPr/>
+      </p:nvGrpSpPr>
+      <p:grpSpPr>
+        <a:xfrm>
+          <a:off x="0" y="0"/>
+          <a:ext cx="0" cy="0"/>
+          <a:chOff x="0" y="0"/>
+          <a:chExt cx="0" cy="0"/>
+        </a:xfrm>
+      </p:grpSpPr>
+      <p:sp>
+        <p:nvSpPr>
+          <p:cNvPr id="2" name="Slide Image Placeholder 1"/>
+          <p:cNvSpPr>
+            <a:spLocks noGrp="1" noRot="1" noChangeAspect="1"/>
+          </p:cNvSpPr>
+          <p:nvPr>
+            <p:ph type="sldImg"/>
+          </p:nvPr>
+        </p:nvSpPr>
+        <p:spPr/>
+      </p:sp>
+      <p:sp>
+        <p:nvSpPr>
+          <p:cNvPr id="3" name="Notes Placeholder 2"/>
+          <p:cNvSpPr>
+            <a:spLocks noGrp="1"/>
+          </p:cNvSpPr>
+          <p:nvPr>
+            <p:ph type="body" idx="1"/>
+          </p:nvPr>
+        </p:nvSpPr>
+        <p:spPr/>
+        <p:txBody>
+          <a:bodyPr/>
+          <a:lstStyle/>
+          <a:p>
+            <a:endParaRPr lang="en-SG" dirty="0"/>
+          </a:p>
+        </p:txBody>
+      </p:sp>
+      <p:sp>
+        <p:nvSpPr>
+          <p:cNvPr id="4" name="Slide Number Placeholder 3"/>
+          <p:cNvSpPr>
+            <a:spLocks noGrp="1"/>
+          </p:cNvSpPr>
+          <p:nvPr>
+            <p:ph type="sldNum" sz="quarter" idx="5"/>
+          </p:nvPr>
+        </p:nvSpPr>
+        <p:spPr/>
+        <p:txBody>
+          <a:bodyPr/>
+          <a:lstStyle/>
+          <a:p>
+            <a:fld id="{8FC7C363-02C1-0D4B-B7C2-AACF0B0B3D8D}" type="slidenum">
+              <a:rPr lang="en-US" smtClean="0"/>
+              <a:t>7</a:t>
+            </a:fld>
+            <a:endParaRPr lang="en-US" dirty="0"/>
+          </a:p>
+        </p:txBody>
+      </p:sp>
+    </p:spTree>
+    <p:extLst>
+      <p:ext uri="{BB962C8B-B14F-4D97-AF65-F5344CB8AC3E}">
+        <p14:creationId xmlns:p14="http://schemas.microsoft.com/office/powerpoint/2010/main" val="1485721730"/>
+      </p:ext>
+    </p:extLst>
+  </p:cSld>
+  <p:clrMapOvr>
+    <a:masterClrMapping/>
+  </p:clrMapOvr>
+</p:notes>
+</file>
+
+<file path=ppt/notesSlides/notesSlide3.xml><?xml version="1.0" encoding="utf-8"?>
+<p:notes xmlns:a="http://schemas.openxmlformats.org/drawingml/2006/main" xmlns:r="http://schemas.openxmlformats.org/officeDocument/2006/relationships" xmlns:p="http://schemas.openxmlformats.org/presentationml/2006/main">
+  <p:cSld>
+    <p:spTree>
+      <p:nvGrpSpPr>
+        <p:cNvPr id="1" name=""/>
+        <p:cNvGrpSpPr/>
+        <p:nvPr/>
+      </p:nvGrpSpPr>
+      <p:grpSpPr>
+        <a:xfrm>
+          <a:off x="0" y="0"/>
+          <a:ext cx="0" cy="0"/>
+          <a:chOff x="0" y="0"/>
+          <a:chExt cx="0" cy="0"/>
+        </a:xfrm>
+      </p:grpSpPr>
+      <p:sp>
+        <p:nvSpPr>
+          <p:cNvPr id="2" name="Slide Image Placeholder 1"/>
+          <p:cNvSpPr>
+            <a:spLocks noGrp="1" noRot="1" noChangeAspect="1"/>
+          </p:cNvSpPr>
+          <p:nvPr>
+            <p:ph type="sldImg"/>
+          </p:nvPr>
+        </p:nvSpPr>
+        <p:spPr/>
+      </p:sp>
+      <p:sp>
+        <p:nvSpPr>
+          <p:cNvPr id="3" name="Notes Placeholder 2"/>
+          <p:cNvSpPr>
+            <a:spLocks noGrp="1"/>
+          </p:cNvSpPr>
+          <p:nvPr>
+            <p:ph type="body" idx="1"/>
+          </p:nvPr>
+        </p:nvSpPr>
+        <p:spPr/>
+        <p:txBody>
+          <a:bodyPr/>
+          <a:lstStyle/>
+          <a:p>
+            <a:endParaRPr lang="en-US" dirty="0"/>
+          </a:p>
+        </p:txBody>
+      </p:sp>
+      <p:sp>
+        <p:nvSpPr>
+          <p:cNvPr id="4" name="Slide Number Placeholder 3"/>
+          <p:cNvSpPr>
+            <a:spLocks noGrp="1"/>
+          </p:cNvSpPr>
+          <p:nvPr>
+            <p:ph type="sldNum" sz="quarter" idx="5"/>
+          </p:nvPr>
+        </p:nvSpPr>
+        <p:spPr/>
+        <p:txBody>
+          <a:bodyPr/>
+          <a:lstStyle/>
+          <a:p>
+            <a:fld id="{8FC7C363-02C1-0D4B-B7C2-AACF0B0B3D8D}" type="slidenum">
+              <a:rPr lang="en-US" smtClean="0"/>
+              <a:t>8</a:t>
+            </a:fld>
+            <a:endParaRPr lang="en-US" dirty="0"/>
+          </a:p>
+        </p:txBody>
+      </p:sp>
+    </p:spTree>
+    <p:extLst>
+      <p:ext uri="{BB962C8B-B14F-4D97-AF65-F5344CB8AC3E}">
+        <p14:creationId xmlns:p14="http://schemas.microsoft.com/office/powerpoint/2010/main" val="525843459"/>
       </p:ext>
     </p:extLst>
   </p:cSld>
@@ -12706,6 +12876,2881 @@
     <p:extLst>
       <p:ext uri="{BB962C8B-B14F-4D97-AF65-F5344CB8AC3E}">
         <p14:creationId xmlns:p14="http://schemas.microsoft.com/office/powerpoint/2010/main" val="679709631"/>
+      </p:ext>
+    </p:extLst>
+  </p:cSld>
+  <p:clrMapOvr>
+    <a:masterClrMapping/>
+  </p:clrMapOvr>
+</p:sld>
+</file>
+
+<file path=ppt/slides/slide7.xml><?xml version="1.0" encoding="utf-8"?>
+<p:sld xmlns:a="http://schemas.openxmlformats.org/drawingml/2006/main" xmlns:r="http://schemas.openxmlformats.org/officeDocument/2006/relationships" xmlns:p="http://schemas.openxmlformats.org/presentationml/2006/main">
+  <p:cSld>
+    <p:spTree>
+      <p:nvGrpSpPr>
+        <p:cNvPr id="1" name=""/>
+        <p:cNvGrpSpPr/>
+        <p:nvPr/>
+      </p:nvGrpSpPr>
+      <p:grpSpPr>
+        <a:xfrm>
+          <a:off x="0" y="0"/>
+          <a:ext cx="0" cy="0"/>
+          <a:chOff x="0" y="0"/>
+          <a:chExt cx="0" cy="0"/>
+        </a:xfrm>
+      </p:grpSpPr>
+      <p:sp>
+        <p:nvSpPr>
+          <p:cNvPr id="3" name="Rectangle 2">
+            <a:extLst>
+              <a:ext uri="{FF2B5EF4-FFF2-40B4-BE49-F238E27FC236}">
+                <a16:creationId xmlns:a16="http://schemas.microsoft.com/office/drawing/2014/main" id="{53632FB0-4F9E-40DF-ABFB-05B8BC406088}"/>
+              </a:ext>
+            </a:extLst>
+          </p:cNvPr>
+          <p:cNvSpPr/>
+          <p:nvPr/>
+        </p:nvSpPr>
+        <p:spPr>
+          <a:xfrm>
+            <a:off x="533400" y="1344386"/>
+            <a:ext cx="5791200" cy="2618014"/>
+          </a:xfrm>
+          <a:prstGeom prst="rect">
+            <a:avLst/>
+          </a:prstGeom>
+        </p:spPr>
+        <p:style>
+          <a:lnRef idx="2">
+            <a:schemeClr val="dk1"/>
+          </a:lnRef>
+          <a:fillRef idx="1">
+            <a:schemeClr val="lt1"/>
+          </a:fillRef>
+          <a:effectRef idx="0">
+            <a:schemeClr val="dk1"/>
+          </a:effectRef>
+          <a:fontRef idx="minor">
+            <a:schemeClr val="dk1"/>
+          </a:fontRef>
+        </p:style>
+        <p:txBody>
+          <a:bodyPr rtlCol="0" anchor="ctr"/>
+          <a:lstStyle/>
+          <a:p>
+            <a:pPr algn="ctr"/>
+            <a:endParaRPr lang="en-US" dirty="0"/>
+          </a:p>
+        </p:txBody>
+      </p:sp>
+      <p:sp>
+        <p:nvSpPr>
+          <p:cNvPr id="2" name="TextBox 1">
+            <a:extLst>
+              <a:ext uri="{FF2B5EF4-FFF2-40B4-BE49-F238E27FC236}">
+                <a16:creationId xmlns:a16="http://schemas.microsoft.com/office/drawing/2014/main" id="{21452296-FBEB-4D89-B41B-3F43774FE795}"/>
+              </a:ext>
+            </a:extLst>
+          </p:cNvPr>
+          <p:cNvSpPr txBox="1"/>
+          <p:nvPr/>
+        </p:nvSpPr>
+        <p:spPr>
+          <a:xfrm>
+            <a:off x="762000" y="533400"/>
+            <a:ext cx="6096000" cy="369332"/>
+          </a:xfrm>
+          <a:prstGeom prst="rect">
+            <a:avLst/>
+          </a:prstGeom>
+          <a:noFill/>
+        </p:spPr>
+        <p:txBody>
+          <a:bodyPr wrap="square" rtlCol="0">
+            <a:spAutoFit/>
+          </a:bodyPr>
+          <a:lstStyle/>
+          <a:p>
+            <a:r>
+              <a:rPr lang="en-US" dirty="0"/>
+              <a:t>module store</a:t>
+            </a:r>
+            <a:endParaRPr lang="en-SG" dirty="0"/>
+          </a:p>
+        </p:txBody>
+      </p:sp>
+      <p:sp>
+        <p:nvSpPr>
+          <p:cNvPr id="4" name="TextBox 3">
+            <a:extLst>
+              <a:ext uri="{FF2B5EF4-FFF2-40B4-BE49-F238E27FC236}">
+                <a16:creationId xmlns:a16="http://schemas.microsoft.com/office/drawing/2014/main" id="{6B05802F-B501-4C3C-B92F-3248AB80D8FA}"/>
+              </a:ext>
+            </a:extLst>
+          </p:cNvPr>
+          <p:cNvSpPr txBox="1"/>
+          <p:nvPr/>
+        </p:nvSpPr>
+        <p:spPr>
+          <a:xfrm>
+            <a:off x="2628900" y="1524000"/>
+            <a:ext cx="1600200" cy="369332"/>
+          </a:xfrm>
+          <a:prstGeom prst="rect">
+            <a:avLst/>
+          </a:prstGeom>
+          <a:noFill/>
+        </p:spPr>
+        <p:txBody>
+          <a:bodyPr wrap="square" rtlCol="0">
+            <a:spAutoFit/>
+          </a:bodyPr>
+          <a:lstStyle/>
+          <a:p>
+            <a:r>
+              <a:rPr lang="en-US" dirty="0" err="1"/>
+              <a:t>myModules</a:t>
+            </a:r>
+            <a:endParaRPr lang="en-US" dirty="0"/>
+          </a:p>
+        </p:txBody>
+      </p:sp>
+      <p:grpSp>
+        <p:nvGrpSpPr>
+          <p:cNvPr id="19" name="Group 18">
+            <a:extLst>
+              <a:ext uri="{FF2B5EF4-FFF2-40B4-BE49-F238E27FC236}">
+                <a16:creationId xmlns:a16="http://schemas.microsoft.com/office/drawing/2014/main" id="{173C52E6-578D-453B-8154-D47C3B453D54}"/>
+              </a:ext>
+            </a:extLst>
+          </p:cNvPr>
+          <p:cNvGrpSpPr/>
+          <p:nvPr/>
+        </p:nvGrpSpPr>
+        <p:grpSpPr>
+          <a:xfrm>
+            <a:off x="990600" y="2438400"/>
+            <a:ext cx="1761067" cy="1127454"/>
+            <a:chOff x="990600" y="2438400"/>
+            <a:chExt cx="1761067" cy="1127454"/>
+          </a:xfrm>
+        </p:grpSpPr>
+        <p:sp>
+          <p:nvSpPr>
+            <p:cNvPr id="18" name="Rectangle 17">
+              <a:extLst>
+                <a:ext uri="{FF2B5EF4-FFF2-40B4-BE49-F238E27FC236}">
+                  <a16:creationId xmlns:a16="http://schemas.microsoft.com/office/drawing/2014/main" id="{377CE7E3-8B5D-4934-9CE8-E98E862A151E}"/>
+                </a:ext>
+              </a:extLst>
+            </p:cNvPr>
+            <p:cNvSpPr/>
+            <p:nvPr/>
+          </p:nvSpPr>
+          <p:spPr>
+            <a:xfrm>
+              <a:off x="999067" y="3124200"/>
+              <a:ext cx="1752600" cy="441654"/>
+            </a:xfrm>
+            <a:prstGeom prst="rect">
+              <a:avLst/>
+            </a:prstGeom>
+            <a:noFill/>
+            <a:ln>
+              <a:noFill/>
+            </a:ln>
+          </p:spPr>
+          <p:style>
+            <a:lnRef idx="2">
+              <a:schemeClr val="accent1">
+                <a:shade val="50000"/>
+              </a:schemeClr>
+            </a:lnRef>
+            <a:fillRef idx="1">
+              <a:schemeClr val="accent1"/>
+            </a:fillRef>
+            <a:effectRef idx="0">
+              <a:schemeClr val="accent1"/>
+            </a:effectRef>
+            <a:fontRef idx="minor">
+              <a:schemeClr val="lt1"/>
+            </a:fontRef>
+          </p:style>
+          <p:txBody>
+            <a:bodyPr rtlCol="0" anchor="ctr"/>
+            <a:lstStyle/>
+            <a:p>
+              <a:pPr algn="ctr"/>
+              <a:r>
+                <a:rPr lang="en-US" sz="1200" dirty="0">
+                  <a:solidFill>
+                    <a:schemeClr val="tx1"/>
+                  </a:solidFill>
+                </a:rPr>
+                <a:t>- </a:t>
+              </a:r>
+              <a:r>
+                <a:rPr lang="en-US" sz="1200" dirty="0" err="1">
+                  <a:solidFill>
+                    <a:schemeClr val="tx1"/>
+                  </a:solidFill>
+                </a:rPr>
+                <a:t>moduleCode</a:t>
+              </a:r>
+              <a:r>
+                <a:rPr lang="en-US" sz="1200" dirty="0">
+                  <a:solidFill>
+                    <a:schemeClr val="tx1"/>
+                  </a:solidFill>
+                </a:rPr>
+                <a:t> = CS2113T</a:t>
+              </a:r>
+            </a:p>
+          </p:txBody>
+        </p:sp>
+        <p:grpSp>
+          <p:nvGrpSpPr>
+            <p:cNvPr id="15" name="Group 14">
+              <a:extLst>
+                <a:ext uri="{FF2B5EF4-FFF2-40B4-BE49-F238E27FC236}">
+                  <a16:creationId xmlns:a16="http://schemas.microsoft.com/office/drawing/2014/main" id="{82A0F735-37D2-4516-8217-0235DA6616DF}"/>
+                </a:ext>
+              </a:extLst>
+            </p:cNvPr>
+            <p:cNvGrpSpPr/>
+            <p:nvPr/>
+          </p:nvGrpSpPr>
+          <p:grpSpPr>
+            <a:xfrm>
+              <a:off x="990600" y="2438400"/>
+              <a:ext cx="1752600" cy="1127454"/>
+              <a:chOff x="1104900" y="4648200"/>
+              <a:chExt cx="1524000" cy="1127454"/>
+            </a:xfrm>
+          </p:grpSpPr>
+          <p:grpSp>
+            <p:nvGrpSpPr>
+              <p:cNvPr id="14" name="Group 13">
+                <a:extLst>
+                  <a:ext uri="{FF2B5EF4-FFF2-40B4-BE49-F238E27FC236}">
+                    <a16:creationId xmlns:a16="http://schemas.microsoft.com/office/drawing/2014/main" id="{7A9BCFC1-0196-49C9-92A2-44D22BDDDCD6}"/>
+                  </a:ext>
+                </a:extLst>
+              </p:cNvPr>
+              <p:cNvGrpSpPr/>
+              <p:nvPr/>
+            </p:nvGrpSpPr>
+            <p:grpSpPr>
+              <a:xfrm>
+                <a:off x="1104900" y="4648200"/>
+                <a:ext cx="1524000" cy="1127454"/>
+                <a:chOff x="762000" y="2743200"/>
+                <a:chExt cx="1524000" cy="1127454"/>
+              </a:xfrm>
+            </p:grpSpPr>
+            <p:sp>
+              <p:nvSpPr>
+                <p:cNvPr id="5" name="Rectangle 4">
+                  <a:extLst>
+                    <a:ext uri="{FF2B5EF4-FFF2-40B4-BE49-F238E27FC236}">
+                      <a16:creationId xmlns:a16="http://schemas.microsoft.com/office/drawing/2014/main" id="{BB9CCD1D-046D-49C4-99E8-1189E8DD6514}"/>
+                    </a:ext>
+                  </a:extLst>
+                </p:cNvPr>
+                <p:cNvSpPr/>
+                <p:nvPr/>
+              </p:nvSpPr>
+              <p:spPr>
+                <a:xfrm>
+                  <a:off x="762000" y="2743200"/>
+                  <a:ext cx="1524000" cy="685800"/>
+                </a:xfrm>
+                <a:prstGeom prst="rect">
+                  <a:avLst/>
+                </a:prstGeom>
+                <a:solidFill>
+                  <a:srgbClr val="FFD609"/>
+                </a:solidFill>
+                <a:ln>
+                  <a:noFill/>
+                </a:ln>
+              </p:spPr>
+              <p:style>
+                <a:lnRef idx="2">
+                  <a:schemeClr val="accent1">
+                    <a:shade val="50000"/>
+                  </a:schemeClr>
+                </a:lnRef>
+                <a:fillRef idx="1">
+                  <a:schemeClr val="accent1"/>
+                </a:fillRef>
+                <a:effectRef idx="0">
+                  <a:schemeClr val="accent1"/>
+                </a:effectRef>
+                <a:fontRef idx="minor">
+                  <a:schemeClr val="lt1"/>
+                </a:fontRef>
+              </p:style>
+              <p:txBody>
+                <a:bodyPr rtlCol="0" anchor="ctr"/>
+                <a:lstStyle/>
+                <a:p>
+                  <a:pPr algn="ctr"/>
+                  <a:r>
+                    <a:rPr lang="en-US" sz="1200" u="sng" dirty="0">
+                      <a:solidFill>
+                        <a:schemeClr val="tx1"/>
+                      </a:solidFill>
+                    </a:rPr>
+                    <a:t>:</a:t>
+                  </a:r>
+                  <a:r>
+                    <a:rPr lang="en-US" sz="1200" u="sng" dirty="0" err="1">
+                      <a:solidFill>
+                        <a:schemeClr val="tx1"/>
+                      </a:solidFill>
+                    </a:rPr>
+                    <a:t>ModuleDetails</a:t>
+                  </a:r>
+                  <a:endParaRPr lang="en-US" sz="1200" u="sng" dirty="0">
+                    <a:solidFill>
+                      <a:schemeClr val="tx1"/>
+                    </a:solidFill>
+                  </a:endParaRPr>
+                </a:p>
+              </p:txBody>
+            </p:sp>
+            <p:sp>
+              <p:nvSpPr>
+                <p:cNvPr id="13" name="Rectangle 12">
+                  <a:extLst>
+                    <a:ext uri="{FF2B5EF4-FFF2-40B4-BE49-F238E27FC236}">
+                      <a16:creationId xmlns:a16="http://schemas.microsoft.com/office/drawing/2014/main" id="{B2A89E8E-87D9-418B-BBA0-443EF775A21A}"/>
+                    </a:ext>
+                  </a:extLst>
+                </p:cNvPr>
+                <p:cNvSpPr/>
+                <p:nvPr/>
+              </p:nvSpPr>
+              <p:spPr>
+                <a:xfrm>
+                  <a:off x="762000" y="3429000"/>
+                  <a:ext cx="1524000" cy="441654"/>
+                </a:xfrm>
+                <a:prstGeom prst="rect">
+                  <a:avLst/>
+                </a:prstGeom>
+                <a:noFill/>
+                <a:ln>
+                  <a:solidFill>
+                    <a:schemeClr val="tx1"/>
+                  </a:solidFill>
+                </a:ln>
+              </p:spPr>
+              <p:style>
+                <a:lnRef idx="2">
+                  <a:schemeClr val="accent1">
+                    <a:shade val="50000"/>
+                  </a:schemeClr>
+                </a:lnRef>
+                <a:fillRef idx="1">
+                  <a:schemeClr val="accent1"/>
+                </a:fillRef>
+                <a:effectRef idx="0">
+                  <a:schemeClr val="accent1"/>
+                </a:effectRef>
+                <a:fontRef idx="minor">
+                  <a:schemeClr val="lt1"/>
+                </a:fontRef>
+              </p:style>
+              <p:txBody>
+                <a:bodyPr rtlCol="0" anchor="ctr"/>
+                <a:lstStyle/>
+                <a:p>
+                  <a:pPr algn="ctr"/>
+                  <a:endParaRPr lang="en-SG"/>
+                </a:p>
+              </p:txBody>
+            </p:sp>
+          </p:grpSp>
+          <p:sp>
+            <p:nvSpPr>
+              <p:cNvPr id="12" name="Rectangle 11">
+                <a:extLst>
+                  <a:ext uri="{FF2B5EF4-FFF2-40B4-BE49-F238E27FC236}">
+                    <a16:creationId xmlns:a16="http://schemas.microsoft.com/office/drawing/2014/main" id="{7F1CD3B3-F068-41E5-90BA-D96BC6359C41}"/>
+                  </a:ext>
+                </a:extLst>
+              </p:cNvPr>
+              <p:cNvSpPr/>
+              <p:nvPr/>
+            </p:nvSpPr>
+            <p:spPr>
+              <a:xfrm>
+                <a:off x="1104900" y="4648200"/>
+                <a:ext cx="1524000" cy="685800"/>
+              </a:xfrm>
+              <a:prstGeom prst="rect">
+                <a:avLst/>
+              </a:prstGeom>
+              <a:noFill/>
+              <a:ln>
+                <a:solidFill>
+                  <a:schemeClr val="tx1"/>
+                </a:solidFill>
+              </a:ln>
+            </p:spPr>
+            <p:style>
+              <a:lnRef idx="2">
+                <a:schemeClr val="accent1">
+                  <a:shade val="50000"/>
+                </a:schemeClr>
+              </a:lnRef>
+              <a:fillRef idx="1">
+                <a:schemeClr val="accent1"/>
+              </a:fillRef>
+              <a:effectRef idx="0">
+                <a:schemeClr val="accent1"/>
+              </a:effectRef>
+              <a:fontRef idx="minor">
+                <a:schemeClr val="lt1"/>
+              </a:fontRef>
+            </p:style>
+            <p:txBody>
+              <a:bodyPr rtlCol="0" anchor="ctr"/>
+              <a:lstStyle/>
+              <a:p>
+                <a:pPr algn="ctr"/>
+                <a:endParaRPr lang="en-SG"/>
+              </a:p>
+            </p:txBody>
+          </p:sp>
+        </p:grpSp>
+      </p:grpSp>
+      <p:grpSp>
+        <p:nvGrpSpPr>
+          <p:cNvPr id="16" name="Group 15">
+            <a:extLst>
+              <a:ext uri="{FF2B5EF4-FFF2-40B4-BE49-F238E27FC236}">
+                <a16:creationId xmlns:a16="http://schemas.microsoft.com/office/drawing/2014/main" id="{43BC531E-ED5D-4BA0-96E6-1AFB9994DDA1}"/>
+              </a:ext>
+            </a:extLst>
+          </p:cNvPr>
+          <p:cNvGrpSpPr/>
+          <p:nvPr/>
+        </p:nvGrpSpPr>
+        <p:grpSpPr>
+          <a:xfrm>
+            <a:off x="3429000" y="2429933"/>
+            <a:ext cx="1761067" cy="1127454"/>
+            <a:chOff x="990600" y="2438400"/>
+            <a:chExt cx="1761067" cy="1127454"/>
+          </a:xfrm>
+        </p:grpSpPr>
+        <p:sp>
+          <p:nvSpPr>
+            <p:cNvPr id="17" name="Rectangle 16">
+              <a:extLst>
+                <a:ext uri="{FF2B5EF4-FFF2-40B4-BE49-F238E27FC236}">
+                  <a16:creationId xmlns:a16="http://schemas.microsoft.com/office/drawing/2014/main" id="{2B39F82F-028C-4819-9308-C17FEC627390}"/>
+                </a:ext>
+              </a:extLst>
+            </p:cNvPr>
+            <p:cNvSpPr/>
+            <p:nvPr/>
+          </p:nvSpPr>
+          <p:spPr>
+            <a:xfrm>
+              <a:off x="999067" y="3124200"/>
+              <a:ext cx="1752600" cy="441654"/>
+            </a:xfrm>
+            <a:prstGeom prst="rect">
+              <a:avLst/>
+            </a:prstGeom>
+            <a:noFill/>
+            <a:ln>
+              <a:noFill/>
+            </a:ln>
+          </p:spPr>
+          <p:style>
+            <a:lnRef idx="2">
+              <a:schemeClr val="accent1">
+                <a:shade val="50000"/>
+              </a:schemeClr>
+            </a:lnRef>
+            <a:fillRef idx="1">
+              <a:schemeClr val="accent1"/>
+            </a:fillRef>
+            <a:effectRef idx="0">
+              <a:schemeClr val="accent1"/>
+            </a:effectRef>
+            <a:fontRef idx="minor">
+              <a:schemeClr val="lt1"/>
+            </a:fontRef>
+          </p:style>
+          <p:txBody>
+            <a:bodyPr rtlCol="0" anchor="ctr"/>
+            <a:lstStyle/>
+            <a:p>
+              <a:pPr algn="ctr"/>
+              <a:r>
+                <a:rPr lang="en-US" sz="1200" dirty="0">
+                  <a:solidFill>
+                    <a:schemeClr val="tx1"/>
+                  </a:solidFill>
+                </a:rPr>
+                <a:t>- </a:t>
+              </a:r>
+              <a:r>
+                <a:rPr lang="en-US" sz="1200" dirty="0" err="1">
+                  <a:solidFill>
+                    <a:schemeClr val="tx1"/>
+                  </a:solidFill>
+                </a:rPr>
+                <a:t>moduleCode</a:t>
+              </a:r>
+              <a:r>
+                <a:rPr lang="en-US" sz="1200" dirty="0">
+                  <a:solidFill>
+                    <a:schemeClr val="tx1"/>
+                  </a:solidFill>
+                </a:rPr>
+                <a:t> = CS2101</a:t>
+              </a:r>
+            </a:p>
+          </p:txBody>
+        </p:sp>
+        <p:grpSp>
+          <p:nvGrpSpPr>
+            <p:cNvPr id="20" name="Group 19">
+              <a:extLst>
+                <a:ext uri="{FF2B5EF4-FFF2-40B4-BE49-F238E27FC236}">
+                  <a16:creationId xmlns:a16="http://schemas.microsoft.com/office/drawing/2014/main" id="{318FD7A3-DBBE-463D-BF60-61AA983B11CC}"/>
+                </a:ext>
+              </a:extLst>
+            </p:cNvPr>
+            <p:cNvGrpSpPr/>
+            <p:nvPr/>
+          </p:nvGrpSpPr>
+          <p:grpSpPr>
+            <a:xfrm>
+              <a:off x="990600" y="2438400"/>
+              <a:ext cx="1752600" cy="1127454"/>
+              <a:chOff x="1104900" y="4648200"/>
+              <a:chExt cx="1524000" cy="1127454"/>
+            </a:xfrm>
+          </p:grpSpPr>
+          <p:grpSp>
+            <p:nvGrpSpPr>
+              <p:cNvPr id="21" name="Group 20">
+                <a:extLst>
+                  <a:ext uri="{FF2B5EF4-FFF2-40B4-BE49-F238E27FC236}">
+                    <a16:creationId xmlns:a16="http://schemas.microsoft.com/office/drawing/2014/main" id="{68295369-FA88-4764-9663-007566B515DC}"/>
+                  </a:ext>
+                </a:extLst>
+              </p:cNvPr>
+              <p:cNvGrpSpPr/>
+              <p:nvPr/>
+            </p:nvGrpSpPr>
+            <p:grpSpPr>
+              <a:xfrm>
+                <a:off x="1104900" y="4648200"/>
+                <a:ext cx="1524000" cy="1127454"/>
+                <a:chOff x="762000" y="2743200"/>
+                <a:chExt cx="1524000" cy="1127454"/>
+              </a:xfrm>
+            </p:grpSpPr>
+            <p:sp>
+              <p:nvSpPr>
+                <p:cNvPr id="23" name="Rectangle 22">
+                  <a:extLst>
+                    <a:ext uri="{FF2B5EF4-FFF2-40B4-BE49-F238E27FC236}">
+                      <a16:creationId xmlns:a16="http://schemas.microsoft.com/office/drawing/2014/main" id="{CA9E0D64-3683-4277-99C8-23237609218C}"/>
+                    </a:ext>
+                  </a:extLst>
+                </p:cNvPr>
+                <p:cNvSpPr/>
+                <p:nvPr/>
+              </p:nvSpPr>
+              <p:spPr>
+                <a:xfrm>
+                  <a:off x="762000" y="2743200"/>
+                  <a:ext cx="1524000" cy="685800"/>
+                </a:xfrm>
+                <a:prstGeom prst="rect">
+                  <a:avLst/>
+                </a:prstGeom>
+                <a:solidFill>
+                  <a:srgbClr val="FFD609"/>
+                </a:solidFill>
+                <a:ln>
+                  <a:noFill/>
+                </a:ln>
+              </p:spPr>
+              <p:style>
+                <a:lnRef idx="2">
+                  <a:schemeClr val="accent1">
+                    <a:shade val="50000"/>
+                  </a:schemeClr>
+                </a:lnRef>
+                <a:fillRef idx="1">
+                  <a:schemeClr val="accent1"/>
+                </a:fillRef>
+                <a:effectRef idx="0">
+                  <a:schemeClr val="accent1"/>
+                </a:effectRef>
+                <a:fontRef idx="minor">
+                  <a:schemeClr val="lt1"/>
+                </a:fontRef>
+              </p:style>
+              <p:txBody>
+                <a:bodyPr rtlCol="0" anchor="ctr"/>
+                <a:lstStyle/>
+                <a:p>
+                  <a:pPr algn="ctr"/>
+                  <a:r>
+                    <a:rPr lang="en-US" sz="1200" u="sng" dirty="0">
+                      <a:solidFill>
+                        <a:schemeClr val="tx1"/>
+                      </a:solidFill>
+                    </a:rPr>
+                    <a:t>:</a:t>
+                  </a:r>
+                  <a:r>
+                    <a:rPr lang="en-US" sz="1200" u="sng" dirty="0" err="1">
+                      <a:solidFill>
+                        <a:schemeClr val="tx1"/>
+                      </a:solidFill>
+                    </a:rPr>
+                    <a:t>ModuleDetails</a:t>
+                  </a:r>
+                  <a:endParaRPr lang="en-US" sz="1200" u="sng" dirty="0">
+                    <a:solidFill>
+                      <a:schemeClr val="tx1"/>
+                    </a:solidFill>
+                  </a:endParaRPr>
+                </a:p>
+              </p:txBody>
+            </p:sp>
+            <p:sp>
+              <p:nvSpPr>
+                <p:cNvPr id="24" name="Rectangle 23">
+                  <a:extLst>
+                    <a:ext uri="{FF2B5EF4-FFF2-40B4-BE49-F238E27FC236}">
+                      <a16:creationId xmlns:a16="http://schemas.microsoft.com/office/drawing/2014/main" id="{02DAB983-1E09-4A19-8AD6-C71B9518C39D}"/>
+                    </a:ext>
+                  </a:extLst>
+                </p:cNvPr>
+                <p:cNvSpPr/>
+                <p:nvPr/>
+              </p:nvSpPr>
+              <p:spPr>
+                <a:xfrm>
+                  <a:off x="762000" y="3429000"/>
+                  <a:ext cx="1524000" cy="441654"/>
+                </a:xfrm>
+                <a:prstGeom prst="rect">
+                  <a:avLst/>
+                </a:prstGeom>
+                <a:noFill/>
+                <a:ln>
+                  <a:solidFill>
+                    <a:schemeClr val="tx1"/>
+                  </a:solidFill>
+                </a:ln>
+              </p:spPr>
+              <p:style>
+                <a:lnRef idx="2">
+                  <a:schemeClr val="accent1">
+                    <a:shade val="50000"/>
+                  </a:schemeClr>
+                </a:lnRef>
+                <a:fillRef idx="1">
+                  <a:schemeClr val="accent1"/>
+                </a:fillRef>
+                <a:effectRef idx="0">
+                  <a:schemeClr val="accent1"/>
+                </a:effectRef>
+                <a:fontRef idx="minor">
+                  <a:schemeClr val="lt1"/>
+                </a:fontRef>
+              </p:style>
+              <p:txBody>
+                <a:bodyPr rtlCol="0" anchor="ctr"/>
+                <a:lstStyle/>
+                <a:p>
+                  <a:pPr algn="ctr"/>
+                  <a:endParaRPr lang="en-SG"/>
+                </a:p>
+              </p:txBody>
+            </p:sp>
+          </p:grpSp>
+          <p:sp>
+            <p:nvSpPr>
+              <p:cNvPr id="22" name="Rectangle 21">
+                <a:extLst>
+                  <a:ext uri="{FF2B5EF4-FFF2-40B4-BE49-F238E27FC236}">
+                    <a16:creationId xmlns:a16="http://schemas.microsoft.com/office/drawing/2014/main" id="{F572D41B-482F-4975-AB1B-CF7C421A80AD}"/>
+                  </a:ext>
+                </a:extLst>
+              </p:cNvPr>
+              <p:cNvSpPr/>
+              <p:nvPr/>
+            </p:nvSpPr>
+            <p:spPr>
+              <a:xfrm>
+                <a:off x="1104900" y="4648200"/>
+                <a:ext cx="1524000" cy="685800"/>
+              </a:xfrm>
+              <a:prstGeom prst="rect">
+                <a:avLst/>
+              </a:prstGeom>
+              <a:noFill/>
+              <a:ln>
+                <a:solidFill>
+                  <a:schemeClr val="tx1"/>
+                </a:solidFill>
+              </a:ln>
+            </p:spPr>
+            <p:style>
+              <a:lnRef idx="2">
+                <a:schemeClr val="accent1">
+                  <a:shade val="50000"/>
+                </a:schemeClr>
+              </a:lnRef>
+              <a:fillRef idx="1">
+                <a:schemeClr val="accent1"/>
+              </a:fillRef>
+              <a:effectRef idx="0">
+                <a:schemeClr val="accent1"/>
+              </a:effectRef>
+              <a:fontRef idx="minor">
+                <a:schemeClr val="lt1"/>
+              </a:fontRef>
+            </p:style>
+            <p:txBody>
+              <a:bodyPr rtlCol="0" anchor="ctr"/>
+              <a:lstStyle/>
+              <a:p>
+                <a:pPr algn="ctr"/>
+                <a:endParaRPr lang="en-SG"/>
+              </a:p>
+            </p:txBody>
+          </p:sp>
+        </p:grpSp>
+      </p:grpSp>
+    </p:spTree>
+    <p:extLst>
+      <p:ext uri="{BB962C8B-B14F-4D97-AF65-F5344CB8AC3E}">
+        <p14:creationId xmlns:p14="http://schemas.microsoft.com/office/powerpoint/2010/main" val="4143885534"/>
+      </p:ext>
+    </p:extLst>
+  </p:cSld>
+  <p:clrMapOvr>
+    <a:masterClrMapping/>
+  </p:clrMapOvr>
+</p:sld>
+</file>
+
+<file path=ppt/slides/slide8.xml><?xml version="1.0" encoding="utf-8"?>
+<p:sld xmlns:a="http://schemas.openxmlformats.org/drawingml/2006/main" xmlns:r="http://schemas.openxmlformats.org/officeDocument/2006/relationships" xmlns:p="http://schemas.openxmlformats.org/presentationml/2006/main">
+  <p:cSld>
+    <p:spTree>
+      <p:nvGrpSpPr>
+        <p:cNvPr id="1" name=""/>
+        <p:cNvGrpSpPr/>
+        <p:nvPr/>
+      </p:nvGrpSpPr>
+      <p:grpSpPr>
+        <a:xfrm>
+          <a:off x="0" y="0"/>
+          <a:ext cx="0" cy="0"/>
+          <a:chOff x="0" y="0"/>
+          <a:chExt cx="0" cy="0"/>
+        </a:xfrm>
+      </p:grpSpPr>
+      <p:sp>
+        <p:nvSpPr>
+          <p:cNvPr id="2" name="Rectangle 1">
+            <a:extLst>
+              <a:ext uri="{FF2B5EF4-FFF2-40B4-BE49-F238E27FC236}">
+                <a16:creationId xmlns:a16="http://schemas.microsoft.com/office/drawing/2014/main" id="{0C5D1DA1-73DB-2B4C-82A1-9724BAD1B1DE}"/>
+              </a:ext>
+            </a:extLst>
+          </p:cNvPr>
+          <p:cNvSpPr/>
+          <p:nvPr/>
+        </p:nvSpPr>
+        <p:spPr>
+          <a:xfrm>
+            <a:off x="381000" y="1379179"/>
+            <a:ext cx="3837765" cy="4343400"/>
+          </a:xfrm>
+          <a:prstGeom prst="rect">
+            <a:avLst/>
+          </a:prstGeom>
+          <a:solidFill>
+            <a:schemeClr val="accent1">
+              <a:lumMod val="60000"/>
+              <a:lumOff val="40000"/>
+            </a:schemeClr>
+          </a:solidFill>
+          <a:ln w="12700">
+            <a:solidFill>
+              <a:schemeClr val="accent2"/>
+            </a:solidFill>
+          </a:ln>
+        </p:spPr>
+        <p:style>
+          <a:lnRef idx="2">
+            <a:schemeClr val="accent1">
+              <a:shade val="50000"/>
+            </a:schemeClr>
+          </a:lnRef>
+          <a:fillRef idx="1">
+            <a:schemeClr val="accent1"/>
+          </a:fillRef>
+          <a:effectRef idx="0">
+            <a:schemeClr val="accent1"/>
+          </a:effectRef>
+          <a:fontRef idx="minor">
+            <a:schemeClr val="lt1"/>
+          </a:fontRef>
+        </p:style>
+        <p:txBody>
+          <a:bodyPr rtlCol="0" anchor="ctr"/>
+          <a:lstStyle/>
+          <a:p>
+            <a:pPr algn="ctr"/>
+            <a:endParaRPr lang="en-US" dirty="0"/>
+          </a:p>
+        </p:txBody>
+      </p:sp>
+      <p:sp>
+        <p:nvSpPr>
+          <p:cNvPr id="3" name="Rectangle 2">
+            <a:extLst>
+              <a:ext uri="{FF2B5EF4-FFF2-40B4-BE49-F238E27FC236}">
+                <a16:creationId xmlns:a16="http://schemas.microsoft.com/office/drawing/2014/main" id="{6D4D3352-CF76-AF4F-92C8-A20064C118FE}"/>
+              </a:ext>
+            </a:extLst>
+          </p:cNvPr>
+          <p:cNvSpPr/>
+          <p:nvPr/>
+        </p:nvSpPr>
+        <p:spPr>
+          <a:xfrm>
+            <a:off x="4413180" y="1379179"/>
+            <a:ext cx="4647812" cy="4343400"/>
+          </a:xfrm>
+          <a:prstGeom prst="rect">
+            <a:avLst/>
+          </a:prstGeom>
+          <a:solidFill>
+            <a:schemeClr val="accent2">
+              <a:lumMod val="60000"/>
+              <a:lumOff val="40000"/>
+            </a:schemeClr>
+          </a:solidFill>
+          <a:ln w="12700">
+            <a:solidFill>
+              <a:schemeClr val="accent2"/>
+            </a:solidFill>
+          </a:ln>
+        </p:spPr>
+        <p:style>
+          <a:lnRef idx="2">
+            <a:schemeClr val="accent1">
+              <a:shade val="50000"/>
+            </a:schemeClr>
+          </a:lnRef>
+          <a:fillRef idx="1">
+            <a:schemeClr val="accent1"/>
+          </a:fillRef>
+          <a:effectRef idx="0">
+            <a:schemeClr val="accent1"/>
+          </a:effectRef>
+          <a:fontRef idx="minor">
+            <a:schemeClr val="lt1"/>
+          </a:fontRef>
+        </p:style>
+        <p:txBody>
+          <a:bodyPr rtlCol="0" anchor="ctr"/>
+          <a:lstStyle/>
+          <a:p>
+            <a:pPr algn="ctr"/>
+            <a:endParaRPr lang="en-US" dirty="0"/>
+          </a:p>
+        </p:txBody>
+      </p:sp>
+      <p:sp>
+        <p:nvSpPr>
+          <p:cNvPr id="4" name="TextBox 3">
+            <a:extLst>
+              <a:ext uri="{FF2B5EF4-FFF2-40B4-BE49-F238E27FC236}">
+                <a16:creationId xmlns:a16="http://schemas.microsoft.com/office/drawing/2014/main" id="{7E5AB0D4-F8DE-E641-8E4B-BAB3A46961CA}"/>
+              </a:ext>
+            </a:extLst>
+          </p:cNvPr>
+          <p:cNvSpPr txBox="1"/>
+          <p:nvPr/>
+        </p:nvSpPr>
+        <p:spPr>
+          <a:xfrm>
+            <a:off x="1890186" y="1394419"/>
+            <a:ext cx="838200" cy="276999"/>
+          </a:xfrm>
+          <a:prstGeom prst="rect">
+            <a:avLst/>
+          </a:prstGeom>
+          <a:noFill/>
+        </p:spPr>
+        <p:txBody>
+          <a:bodyPr wrap="square" rtlCol="0">
+            <a:spAutoFit/>
+          </a:bodyPr>
+          <a:lstStyle/>
+          <a:p>
+            <a:r>
+              <a:rPr lang="en-US" sz="1200" dirty="0"/>
+              <a:t>Command</a:t>
+            </a:r>
+          </a:p>
+        </p:txBody>
+      </p:sp>
+      <p:sp>
+        <p:nvSpPr>
+          <p:cNvPr id="5" name="TextBox 4">
+            <a:extLst>
+              <a:ext uri="{FF2B5EF4-FFF2-40B4-BE49-F238E27FC236}">
+                <a16:creationId xmlns:a16="http://schemas.microsoft.com/office/drawing/2014/main" id="{FC90EC1C-26EF-EA42-A983-4F878F666DD7}"/>
+              </a:ext>
+            </a:extLst>
+          </p:cNvPr>
+          <p:cNvSpPr txBox="1"/>
+          <p:nvPr/>
+        </p:nvSpPr>
+        <p:spPr>
+          <a:xfrm>
+            <a:off x="6269131" y="1476038"/>
+            <a:ext cx="838200" cy="276999"/>
+          </a:xfrm>
+          <a:prstGeom prst="rect">
+            <a:avLst/>
+          </a:prstGeom>
+          <a:noFill/>
+        </p:spPr>
+        <p:txBody>
+          <a:bodyPr wrap="square" rtlCol="0">
+            <a:spAutoFit/>
+          </a:bodyPr>
+          <a:lstStyle/>
+          <a:p>
+            <a:r>
+              <a:rPr lang="en-US" sz="1200" dirty="0"/>
+              <a:t>Timetable</a:t>
+            </a:r>
+          </a:p>
+        </p:txBody>
+      </p:sp>
+      <p:sp>
+        <p:nvSpPr>
+          <p:cNvPr id="6" name="Rectangle 5">
+            <a:extLst>
+              <a:ext uri="{FF2B5EF4-FFF2-40B4-BE49-F238E27FC236}">
+                <a16:creationId xmlns:a16="http://schemas.microsoft.com/office/drawing/2014/main" id="{4B1A462D-5FD0-2745-846B-5E372FECA0CE}"/>
+              </a:ext>
+            </a:extLst>
+          </p:cNvPr>
+          <p:cNvSpPr/>
+          <p:nvPr/>
+        </p:nvSpPr>
+        <p:spPr>
+          <a:xfrm>
+            <a:off x="609600" y="1752600"/>
+            <a:ext cx="1143000" cy="304800"/>
+          </a:xfrm>
+          <a:prstGeom prst="rect">
+            <a:avLst/>
+          </a:prstGeom>
+          <a:solidFill>
+            <a:schemeClr val="accent1">
+              <a:lumMod val="50000"/>
+            </a:schemeClr>
+          </a:solidFill>
+          <a:ln w="12700">
+            <a:solidFill>
+              <a:schemeClr val="accent2"/>
+            </a:solidFill>
+          </a:ln>
+        </p:spPr>
+        <p:style>
+          <a:lnRef idx="2">
+            <a:schemeClr val="accent1">
+              <a:shade val="50000"/>
+            </a:schemeClr>
+          </a:lnRef>
+          <a:fillRef idx="1">
+            <a:schemeClr val="accent1"/>
+          </a:fillRef>
+          <a:effectRef idx="0">
+            <a:schemeClr val="accent1"/>
+          </a:effectRef>
+          <a:fontRef idx="minor">
+            <a:schemeClr val="lt1"/>
+          </a:fontRef>
+        </p:style>
+        <p:txBody>
+          <a:bodyPr rtlCol="0" anchor="ctr"/>
+          <a:lstStyle/>
+          <a:p>
+            <a:pPr algn="ctr"/>
+            <a:r>
+              <a:rPr lang="en-US" sz="800" dirty="0"/>
+              <a:t>:Parser</a:t>
+            </a:r>
+          </a:p>
+        </p:txBody>
+      </p:sp>
+      <p:cxnSp>
+        <p:nvCxnSpPr>
+          <p:cNvPr id="8" name="Straight Connector 7">
+            <a:extLst>
+              <a:ext uri="{FF2B5EF4-FFF2-40B4-BE49-F238E27FC236}">
+                <a16:creationId xmlns:a16="http://schemas.microsoft.com/office/drawing/2014/main" id="{05FDED9C-0535-074D-A76C-F2E927F7EBBC}"/>
+              </a:ext>
+            </a:extLst>
+          </p:cNvPr>
+          <p:cNvCxnSpPr>
+            <a:cxnSpLocks/>
+          </p:cNvCxnSpPr>
+          <p:nvPr/>
+        </p:nvCxnSpPr>
+        <p:spPr>
+          <a:xfrm>
+            <a:off x="1143000" y="2057400"/>
+            <a:ext cx="0" cy="3719912"/>
+          </a:xfrm>
+          <a:prstGeom prst="line">
+            <a:avLst/>
+          </a:prstGeom>
+          <a:ln w="9525" cap="flat" cmpd="sng" algn="ctr">
+            <a:solidFill>
+              <a:schemeClr val="accent2"/>
+            </a:solidFill>
+            <a:prstDash val="dash"/>
+            <a:round/>
+            <a:headEnd type="none" w="med" len="med"/>
+            <a:tailEnd type="none" w="med" len="med"/>
+          </a:ln>
+        </p:spPr>
+        <p:style>
+          <a:lnRef idx="0">
+            <a:scrgbClr r="0" g="0" b="0"/>
+          </a:lnRef>
+          <a:fillRef idx="0">
+            <a:scrgbClr r="0" g="0" b="0"/>
+          </a:fillRef>
+          <a:effectRef idx="0">
+            <a:scrgbClr r="0" g="0" b="0"/>
+          </a:effectRef>
+          <a:fontRef idx="minor">
+            <a:schemeClr val="tx1"/>
+          </a:fontRef>
+        </p:style>
+      </p:cxnSp>
+      <p:sp>
+        <p:nvSpPr>
+          <p:cNvPr id="9" name="Rectangle 8">
+            <a:extLst>
+              <a:ext uri="{FF2B5EF4-FFF2-40B4-BE49-F238E27FC236}">
+                <a16:creationId xmlns:a16="http://schemas.microsoft.com/office/drawing/2014/main" id="{B334A720-FF53-4E46-8BA5-C1C27775B33F}"/>
+              </a:ext>
+            </a:extLst>
+          </p:cNvPr>
+          <p:cNvSpPr/>
+          <p:nvPr/>
+        </p:nvSpPr>
+        <p:spPr>
+          <a:xfrm>
+            <a:off x="1085851" y="2362200"/>
+            <a:ext cx="114298" cy="2895600"/>
+          </a:xfrm>
+          <a:prstGeom prst="rect">
+            <a:avLst/>
+          </a:prstGeom>
+          <a:ln w="12700">
+            <a:solidFill>
+              <a:schemeClr val="accent2"/>
+            </a:solidFill>
+          </a:ln>
+        </p:spPr>
+        <p:style>
+          <a:lnRef idx="2">
+            <a:schemeClr val="accent6"/>
+          </a:lnRef>
+          <a:fillRef idx="1">
+            <a:schemeClr val="lt1"/>
+          </a:fillRef>
+          <a:effectRef idx="0">
+            <a:schemeClr val="accent6"/>
+          </a:effectRef>
+          <a:fontRef idx="minor">
+            <a:schemeClr val="dk1"/>
+          </a:fontRef>
+        </p:style>
+        <p:txBody>
+          <a:bodyPr rtlCol="0" anchor="ctr"/>
+          <a:lstStyle/>
+          <a:p>
+            <a:pPr algn="ctr"/>
+            <a:endParaRPr lang="en-US" dirty="0"/>
+          </a:p>
+        </p:txBody>
+      </p:sp>
+      <p:cxnSp>
+        <p:nvCxnSpPr>
+          <p:cNvPr id="11" name="Straight Arrow Connector 10">
+            <a:extLst>
+              <a:ext uri="{FF2B5EF4-FFF2-40B4-BE49-F238E27FC236}">
+                <a16:creationId xmlns:a16="http://schemas.microsoft.com/office/drawing/2014/main" id="{CF1E55E1-AA14-C34A-90FA-AD200EA06FE0}"/>
+              </a:ext>
+            </a:extLst>
+          </p:cNvPr>
+          <p:cNvCxnSpPr/>
+          <p:nvPr/>
+        </p:nvCxnSpPr>
+        <p:spPr>
+          <a:xfrm>
+            <a:off x="228600" y="2362200"/>
+            <a:ext cx="857251" cy="0"/>
+          </a:xfrm>
+          <a:prstGeom prst="straightConnector1">
+            <a:avLst/>
+          </a:prstGeom>
+          <a:ln w="9525" cap="flat" cmpd="sng" algn="ctr">
+            <a:solidFill>
+              <a:schemeClr val="accent2"/>
+            </a:solidFill>
+            <a:prstDash val="solid"/>
+            <a:round/>
+            <a:headEnd type="none" w="med" len="med"/>
+            <a:tailEnd type="arrow" w="med" len="med"/>
+          </a:ln>
+        </p:spPr>
+        <p:style>
+          <a:lnRef idx="0">
+            <a:scrgbClr r="0" g="0" b="0"/>
+          </a:lnRef>
+          <a:fillRef idx="0">
+            <a:scrgbClr r="0" g="0" b="0"/>
+          </a:fillRef>
+          <a:effectRef idx="0">
+            <a:scrgbClr r="0" g="0" b="0"/>
+          </a:effectRef>
+          <a:fontRef idx="minor">
+            <a:schemeClr val="tx1"/>
+          </a:fontRef>
+        </p:style>
+      </p:cxnSp>
+      <p:sp>
+        <p:nvSpPr>
+          <p:cNvPr id="12" name="TextBox 11">
+            <a:extLst>
+              <a:ext uri="{FF2B5EF4-FFF2-40B4-BE49-F238E27FC236}">
+                <a16:creationId xmlns:a16="http://schemas.microsoft.com/office/drawing/2014/main" id="{D8B1A527-42E6-6A41-8372-32CBD76BA54F}"/>
+              </a:ext>
+            </a:extLst>
+          </p:cNvPr>
+          <p:cNvSpPr txBox="1"/>
+          <p:nvPr/>
+        </p:nvSpPr>
+        <p:spPr>
+          <a:xfrm>
+            <a:off x="55263" y="2124198"/>
+            <a:ext cx="1219197" cy="215444"/>
+          </a:xfrm>
+          <a:prstGeom prst="rect">
+            <a:avLst/>
+          </a:prstGeom>
+          <a:noFill/>
+        </p:spPr>
+        <p:txBody>
+          <a:bodyPr wrap="square" rtlCol="0">
+            <a:spAutoFit/>
+          </a:bodyPr>
+          <a:lstStyle/>
+          <a:p>
+            <a:r>
+              <a:rPr lang="en-US" sz="800" dirty="0"/>
+              <a:t>parseCommand(input)</a:t>
+            </a:r>
+          </a:p>
+        </p:txBody>
+      </p:sp>
+      <p:cxnSp>
+        <p:nvCxnSpPr>
+          <p:cNvPr id="14" name="Straight Arrow Connector 13">
+            <a:extLst>
+              <a:ext uri="{FF2B5EF4-FFF2-40B4-BE49-F238E27FC236}">
+                <a16:creationId xmlns:a16="http://schemas.microsoft.com/office/drawing/2014/main" id="{21158ADE-B6B8-1C47-B186-3AE03536B3BD}"/>
+              </a:ext>
+            </a:extLst>
+          </p:cNvPr>
+          <p:cNvCxnSpPr>
+            <a:cxnSpLocks/>
+          </p:cNvCxnSpPr>
+          <p:nvPr/>
+        </p:nvCxnSpPr>
+        <p:spPr>
+          <a:xfrm flipH="1">
+            <a:off x="228600" y="5257800"/>
+            <a:ext cx="857252" cy="0"/>
+          </a:xfrm>
+          <a:prstGeom prst="straightConnector1">
+            <a:avLst/>
+          </a:prstGeom>
+          <a:ln w="9525" cap="flat" cmpd="sng" algn="ctr">
+            <a:solidFill>
+              <a:schemeClr val="accent2"/>
+            </a:solidFill>
+            <a:prstDash val="dash"/>
+            <a:round/>
+            <a:headEnd type="none" w="med" len="med"/>
+            <a:tailEnd type="none" w="med" len="med"/>
+          </a:ln>
+        </p:spPr>
+        <p:style>
+          <a:lnRef idx="0">
+            <a:scrgbClr r="0" g="0" b="0"/>
+          </a:lnRef>
+          <a:fillRef idx="0">
+            <a:scrgbClr r="0" g="0" b="0"/>
+          </a:fillRef>
+          <a:effectRef idx="0">
+            <a:scrgbClr r="0" g="0" b="0"/>
+          </a:effectRef>
+          <a:fontRef idx="minor">
+            <a:schemeClr val="tx1"/>
+          </a:fontRef>
+        </p:style>
+      </p:cxnSp>
+      <p:cxnSp>
+        <p:nvCxnSpPr>
+          <p:cNvPr id="21" name="Straight Connector 20">
+            <a:extLst>
+              <a:ext uri="{FF2B5EF4-FFF2-40B4-BE49-F238E27FC236}">
+                <a16:creationId xmlns:a16="http://schemas.microsoft.com/office/drawing/2014/main" id="{CD0C96CD-C808-5C4A-9A91-B10059AFEF73}"/>
+              </a:ext>
+            </a:extLst>
+          </p:cNvPr>
+          <p:cNvCxnSpPr>
+            <a:cxnSpLocks/>
+          </p:cNvCxnSpPr>
+          <p:nvPr/>
+        </p:nvCxnSpPr>
+        <p:spPr>
+          <a:xfrm flipV="1">
+            <a:off x="245377" y="5219702"/>
+            <a:ext cx="93742" cy="38097"/>
+          </a:xfrm>
+          <a:prstGeom prst="line">
+            <a:avLst/>
+          </a:prstGeom>
+          <a:ln>
+            <a:solidFill>
+              <a:schemeClr val="accent2"/>
+            </a:solidFill>
+          </a:ln>
+        </p:spPr>
+        <p:style>
+          <a:lnRef idx="1">
+            <a:schemeClr val="accent1"/>
+          </a:lnRef>
+          <a:fillRef idx="0">
+            <a:schemeClr val="accent1"/>
+          </a:fillRef>
+          <a:effectRef idx="0">
+            <a:schemeClr val="accent1"/>
+          </a:effectRef>
+          <a:fontRef idx="minor">
+            <a:schemeClr val="tx1"/>
+          </a:fontRef>
+        </p:style>
+      </p:cxnSp>
+      <p:cxnSp>
+        <p:nvCxnSpPr>
+          <p:cNvPr id="29" name="Straight Connector 28">
+            <a:extLst>
+              <a:ext uri="{FF2B5EF4-FFF2-40B4-BE49-F238E27FC236}">
+                <a16:creationId xmlns:a16="http://schemas.microsoft.com/office/drawing/2014/main" id="{B6DF571A-2068-4D43-AC81-C5F2E60082FD}"/>
+              </a:ext>
+            </a:extLst>
+          </p:cNvPr>
+          <p:cNvCxnSpPr>
+            <a:cxnSpLocks/>
+          </p:cNvCxnSpPr>
+          <p:nvPr/>
+        </p:nvCxnSpPr>
+        <p:spPr>
+          <a:xfrm>
+            <a:off x="247615" y="5257800"/>
+            <a:ext cx="93600" cy="39600"/>
+          </a:xfrm>
+          <a:prstGeom prst="line">
+            <a:avLst/>
+          </a:prstGeom>
+          <a:ln>
+            <a:solidFill>
+              <a:schemeClr val="accent2"/>
+            </a:solidFill>
+          </a:ln>
+        </p:spPr>
+        <p:style>
+          <a:lnRef idx="1">
+            <a:schemeClr val="accent1"/>
+          </a:lnRef>
+          <a:fillRef idx="0">
+            <a:schemeClr val="accent1"/>
+          </a:fillRef>
+          <a:effectRef idx="0">
+            <a:schemeClr val="accent1"/>
+          </a:effectRef>
+          <a:fontRef idx="minor">
+            <a:schemeClr val="tx1"/>
+          </a:fontRef>
+        </p:style>
+      </p:cxnSp>
+      <p:sp>
+        <p:nvSpPr>
+          <p:cNvPr id="44" name="Rectangle 43">
+            <a:extLst>
+              <a:ext uri="{FF2B5EF4-FFF2-40B4-BE49-F238E27FC236}">
+                <a16:creationId xmlns:a16="http://schemas.microsoft.com/office/drawing/2014/main" id="{74CF6D1B-DD69-044F-A2E8-417C0CBDA0C8}"/>
+              </a:ext>
+            </a:extLst>
+          </p:cNvPr>
+          <p:cNvSpPr/>
+          <p:nvPr/>
+        </p:nvSpPr>
+        <p:spPr>
+          <a:xfrm>
+            <a:off x="2630674" y="1785589"/>
+            <a:ext cx="1504929" cy="304800"/>
+          </a:xfrm>
+          <a:prstGeom prst="rect">
+            <a:avLst/>
+          </a:prstGeom>
+          <a:solidFill>
+            <a:schemeClr val="accent1">
+              <a:lumMod val="50000"/>
+            </a:schemeClr>
+          </a:solidFill>
+          <a:ln w="12700">
+            <a:solidFill>
+              <a:schemeClr val="accent2"/>
+            </a:solidFill>
+          </a:ln>
+        </p:spPr>
+        <p:style>
+          <a:lnRef idx="2">
+            <a:schemeClr val="accent1">
+              <a:shade val="50000"/>
+            </a:schemeClr>
+          </a:lnRef>
+          <a:fillRef idx="1">
+            <a:schemeClr val="accent1"/>
+          </a:fillRef>
+          <a:effectRef idx="0">
+            <a:schemeClr val="accent1"/>
+          </a:effectRef>
+          <a:fontRef idx="minor">
+            <a:schemeClr val="lt1"/>
+          </a:fontRef>
+        </p:style>
+        <p:txBody>
+          <a:bodyPr rtlCol="0" anchor="ctr"/>
+          <a:lstStyle/>
+          <a:p>
+            <a:pPr algn="ctr"/>
+            <a:r>
+              <a:rPr lang="en-US" sz="800" dirty="0" err="1"/>
+              <a:t>ModuleCommand</a:t>
+            </a:r>
+            <a:endParaRPr lang="en-US" sz="800" dirty="0"/>
+          </a:p>
+        </p:txBody>
+      </p:sp>
+      <p:cxnSp>
+        <p:nvCxnSpPr>
+          <p:cNvPr id="45" name="Straight Arrow Connector 44">
+            <a:extLst>
+              <a:ext uri="{FF2B5EF4-FFF2-40B4-BE49-F238E27FC236}">
+                <a16:creationId xmlns:a16="http://schemas.microsoft.com/office/drawing/2014/main" id="{E14A224B-FBCF-CB40-8622-7C8BDBC4501F}"/>
+              </a:ext>
+            </a:extLst>
+          </p:cNvPr>
+          <p:cNvCxnSpPr>
+            <a:cxnSpLocks/>
+          </p:cNvCxnSpPr>
+          <p:nvPr/>
+        </p:nvCxnSpPr>
+        <p:spPr>
+          <a:xfrm>
+            <a:off x="1200149" y="2476375"/>
+            <a:ext cx="2126656" cy="2"/>
+          </a:xfrm>
+          <a:prstGeom prst="straightConnector1">
+            <a:avLst/>
+          </a:prstGeom>
+          <a:ln w="9525" cap="flat" cmpd="sng" algn="ctr">
+            <a:solidFill>
+              <a:schemeClr val="accent2"/>
+            </a:solidFill>
+            <a:prstDash val="solid"/>
+            <a:round/>
+            <a:headEnd type="none" w="med" len="med"/>
+            <a:tailEnd type="arrow" w="med" len="med"/>
+          </a:ln>
+        </p:spPr>
+        <p:style>
+          <a:lnRef idx="0">
+            <a:scrgbClr r="0" g="0" b="0"/>
+          </a:lnRef>
+          <a:fillRef idx="0">
+            <a:scrgbClr r="0" g="0" b="0"/>
+          </a:fillRef>
+          <a:effectRef idx="0">
+            <a:scrgbClr r="0" g="0" b="0"/>
+          </a:effectRef>
+          <a:fontRef idx="minor">
+            <a:schemeClr val="tx1"/>
+          </a:fontRef>
+        </p:style>
+      </p:cxnSp>
+      <p:sp>
+        <p:nvSpPr>
+          <p:cNvPr id="48" name="TextBox 47">
+            <a:extLst>
+              <a:ext uri="{FF2B5EF4-FFF2-40B4-BE49-F238E27FC236}">
+                <a16:creationId xmlns:a16="http://schemas.microsoft.com/office/drawing/2014/main" id="{23578EB3-280E-D846-9D34-AE13B6BD8EE8}"/>
+              </a:ext>
+            </a:extLst>
+          </p:cNvPr>
+          <p:cNvSpPr txBox="1"/>
+          <p:nvPr/>
+        </p:nvSpPr>
+        <p:spPr>
+          <a:xfrm>
+            <a:off x="1295401" y="2213525"/>
+            <a:ext cx="2514591" cy="215444"/>
+          </a:xfrm>
+          <a:prstGeom prst="rect">
+            <a:avLst/>
+          </a:prstGeom>
+          <a:noFill/>
+        </p:spPr>
+        <p:txBody>
+          <a:bodyPr wrap="square" rtlCol="0">
+            <a:spAutoFit/>
+          </a:bodyPr>
+          <a:lstStyle/>
+          <a:p>
+            <a:r>
+              <a:rPr lang="en-US" sz="800" dirty="0"/>
+              <a:t>parseSubCommand(subInput, “module”)</a:t>
+            </a:r>
+          </a:p>
+        </p:txBody>
+      </p:sp>
+      <p:cxnSp>
+        <p:nvCxnSpPr>
+          <p:cNvPr id="47" name="Straight Connector 46">
+            <a:extLst>
+              <a:ext uri="{FF2B5EF4-FFF2-40B4-BE49-F238E27FC236}">
+                <a16:creationId xmlns:a16="http://schemas.microsoft.com/office/drawing/2014/main" id="{E272A0C2-0AA5-3D4C-8A36-FA991A735EFE}"/>
+              </a:ext>
+            </a:extLst>
+          </p:cNvPr>
+          <p:cNvCxnSpPr>
+            <a:cxnSpLocks/>
+          </p:cNvCxnSpPr>
+          <p:nvPr/>
+        </p:nvCxnSpPr>
+        <p:spPr>
+          <a:xfrm>
+            <a:off x="3388311" y="2095413"/>
+            <a:ext cx="0" cy="3681899"/>
+          </a:xfrm>
+          <a:prstGeom prst="line">
+            <a:avLst/>
+          </a:prstGeom>
+          <a:ln w="9525" cap="flat" cmpd="sng" algn="ctr">
+            <a:solidFill>
+              <a:schemeClr val="accent2"/>
+            </a:solidFill>
+            <a:prstDash val="dash"/>
+            <a:round/>
+            <a:headEnd type="none" w="med" len="med"/>
+            <a:tailEnd type="none" w="med" len="med"/>
+          </a:ln>
+        </p:spPr>
+        <p:style>
+          <a:lnRef idx="0">
+            <a:scrgbClr r="0" g="0" b="0"/>
+          </a:lnRef>
+          <a:fillRef idx="0">
+            <a:scrgbClr r="0" g="0" b="0"/>
+          </a:fillRef>
+          <a:effectRef idx="0">
+            <a:scrgbClr r="0" g="0" b="0"/>
+          </a:effectRef>
+          <a:fontRef idx="minor">
+            <a:schemeClr val="tx1"/>
+          </a:fontRef>
+        </p:style>
+      </p:cxnSp>
+      <p:sp>
+        <p:nvSpPr>
+          <p:cNvPr id="50" name="Rectangle 49">
+            <a:extLst>
+              <a:ext uri="{FF2B5EF4-FFF2-40B4-BE49-F238E27FC236}">
+                <a16:creationId xmlns:a16="http://schemas.microsoft.com/office/drawing/2014/main" id="{432D5EBF-7635-B44C-AC80-0FCA4C390815}"/>
+              </a:ext>
+            </a:extLst>
+          </p:cNvPr>
+          <p:cNvSpPr/>
+          <p:nvPr/>
+        </p:nvSpPr>
+        <p:spPr>
+          <a:xfrm>
+            <a:off x="3326805" y="2476376"/>
+            <a:ext cx="114298" cy="2248009"/>
+          </a:xfrm>
+          <a:prstGeom prst="rect">
+            <a:avLst/>
+          </a:prstGeom>
+          <a:ln w="12700">
+            <a:solidFill>
+              <a:schemeClr val="accent2"/>
+            </a:solidFill>
+          </a:ln>
+        </p:spPr>
+        <p:style>
+          <a:lnRef idx="2">
+            <a:schemeClr val="accent6"/>
+          </a:lnRef>
+          <a:fillRef idx="1">
+            <a:schemeClr val="lt1"/>
+          </a:fillRef>
+          <a:effectRef idx="0">
+            <a:schemeClr val="accent6"/>
+          </a:effectRef>
+          <a:fontRef idx="minor">
+            <a:schemeClr val="dk1"/>
+          </a:fontRef>
+        </p:style>
+        <p:txBody>
+          <a:bodyPr rtlCol="0" anchor="ctr"/>
+          <a:lstStyle/>
+          <a:p>
+            <a:pPr algn="ctr"/>
+            <a:endParaRPr lang="en-US" dirty="0"/>
+          </a:p>
+        </p:txBody>
+      </p:sp>
+      <p:cxnSp>
+        <p:nvCxnSpPr>
+          <p:cNvPr id="54" name="Straight Arrow Connector 53">
+            <a:extLst>
+              <a:ext uri="{FF2B5EF4-FFF2-40B4-BE49-F238E27FC236}">
+                <a16:creationId xmlns:a16="http://schemas.microsoft.com/office/drawing/2014/main" id="{9495EBD0-A9B2-8F4B-A28A-69B0A1AFFD0D}"/>
+              </a:ext>
+            </a:extLst>
+          </p:cNvPr>
+          <p:cNvCxnSpPr>
+            <a:cxnSpLocks/>
+          </p:cNvCxnSpPr>
+          <p:nvPr/>
+        </p:nvCxnSpPr>
+        <p:spPr>
+          <a:xfrm flipH="1">
+            <a:off x="1225266" y="4724393"/>
+            <a:ext cx="2101539" cy="0"/>
+          </a:xfrm>
+          <a:prstGeom prst="straightConnector1">
+            <a:avLst/>
+          </a:prstGeom>
+          <a:ln w="9525" cap="flat" cmpd="sng" algn="ctr">
+            <a:solidFill>
+              <a:schemeClr val="accent2"/>
+            </a:solidFill>
+            <a:prstDash val="dash"/>
+            <a:round/>
+            <a:headEnd type="none" w="med" len="med"/>
+            <a:tailEnd type="none" w="med" len="med"/>
+          </a:ln>
+        </p:spPr>
+        <p:style>
+          <a:lnRef idx="0">
+            <a:scrgbClr r="0" g="0" b="0"/>
+          </a:lnRef>
+          <a:fillRef idx="0">
+            <a:scrgbClr r="0" g="0" b="0"/>
+          </a:fillRef>
+          <a:effectRef idx="0">
+            <a:scrgbClr r="0" g="0" b="0"/>
+          </a:effectRef>
+          <a:fontRef idx="minor">
+            <a:schemeClr val="tx1"/>
+          </a:fontRef>
+        </p:style>
+      </p:cxnSp>
+      <p:cxnSp>
+        <p:nvCxnSpPr>
+          <p:cNvPr id="55" name="Straight Connector 54">
+            <a:extLst>
+              <a:ext uri="{FF2B5EF4-FFF2-40B4-BE49-F238E27FC236}">
+                <a16:creationId xmlns:a16="http://schemas.microsoft.com/office/drawing/2014/main" id="{46B07D57-F809-FE47-BE1A-F3553BFA72F9}"/>
+              </a:ext>
+            </a:extLst>
+          </p:cNvPr>
+          <p:cNvCxnSpPr>
+            <a:cxnSpLocks/>
+          </p:cNvCxnSpPr>
+          <p:nvPr/>
+        </p:nvCxnSpPr>
+        <p:spPr>
+          <a:xfrm flipV="1">
+            <a:off x="1203648" y="4686297"/>
+            <a:ext cx="93742" cy="38096"/>
+          </a:xfrm>
+          <a:prstGeom prst="line">
+            <a:avLst/>
+          </a:prstGeom>
+          <a:ln>
+            <a:solidFill>
+              <a:schemeClr val="accent2"/>
+            </a:solidFill>
+          </a:ln>
+        </p:spPr>
+        <p:style>
+          <a:lnRef idx="1">
+            <a:schemeClr val="accent1"/>
+          </a:lnRef>
+          <a:fillRef idx="0">
+            <a:schemeClr val="accent1"/>
+          </a:fillRef>
+          <a:effectRef idx="0">
+            <a:schemeClr val="accent1"/>
+          </a:effectRef>
+          <a:fontRef idx="minor">
+            <a:schemeClr val="tx1"/>
+          </a:fontRef>
+        </p:style>
+      </p:cxnSp>
+      <p:cxnSp>
+        <p:nvCxnSpPr>
+          <p:cNvPr id="57" name="Straight Connector 56">
+            <a:extLst>
+              <a:ext uri="{FF2B5EF4-FFF2-40B4-BE49-F238E27FC236}">
+                <a16:creationId xmlns:a16="http://schemas.microsoft.com/office/drawing/2014/main" id="{51266CF5-3B2C-4548-800A-D1EC5C1D399D}"/>
+              </a:ext>
+            </a:extLst>
+          </p:cNvPr>
+          <p:cNvCxnSpPr>
+            <a:cxnSpLocks/>
+          </p:cNvCxnSpPr>
+          <p:nvPr/>
+        </p:nvCxnSpPr>
+        <p:spPr>
+          <a:xfrm>
+            <a:off x="1205886" y="4724394"/>
+            <a:ext cx="93600" cy="39600"/>
+          </a:xfrm>
+          <a:prstGeom prst="line">
+            <a:avLst/>
+          </a:prstGeom>
+          <a:ln>
+            <a:solidFill>
+              <a:schemeClr val="accent2"/>
+            </a:solidFill>
+          </a:ln>
+        </p:spPr>
+        <p:style>
+          <a:lnRef idx="1">
+            <a:schemeClr val="accent1"/>
+          </a:lnRef>
+          <a:fillRef idx="0">
+            <a:schemeClr val="accent1"/>
+          </a:fillRef>
+          <a:effectRef idx="0">
+            <a:schemeClr val="accent1"/>
+          </a:effectRef>
+          <a:fontRef idx="minor">
+            <a:schemeClr val="tx1"/>
+          </a:fontRef>
+        </p:style>
+      </p:cxnSp>
+      <p:sp>
+        <p:nvSpPr>
+          <p:cNvPr id="66" name="Rectangle 65">
+            <a:extLst>
+              <a:ext uri="{FF2B5EF4-FFF2-40B4-BE49-F238E27FC236}">
+                <a16:creationId xmlns:a16="http://schemas.microsoft.com/office/drawing/2014/main" id="{76D174DB-0E83-0147-869A-B1841DF2DDC6}"/>
+              </a:ext>
+            </a:extLst>
+          </p:cNvPr>
+          <p:cNvSpPr/>
+          <p:nvPr/>
+        </p:nvSpPr>
+        <p:spPr>
+          <a:xfrm>
+            <a:off x="4719584" y="1728742"/>
+            <a:ext cx="1121967" cy="374120"/>
+          </a:xfrm>
+          <a:prstGeom prst="rect">
+            <a:avLst/>
+          </a:prstGeom>
+          <a:solidFill>
+            <a:schemeClr val="accent2">
+              <a:lumMod val="75000"/>
+            </a:schemeClr>
+          </a:solidFill>
+          <a:ln w="12700">
+            <a:solidFill>
+              <a:schemeClr val="accent2"/>
+            </a:solidFill>
+          </a:ln>
+        </p:spPr>
+        <p:style>
+          <a:lnRef idx="2">
+            <a:schemeClr val="accent1">
+              <a:shade val="50000"/>
+            </a:schemeClr>
+          </a:lnRef>
+          <a:fillRef idx="1">
+            <a:schemeClr val="accent1"/>
+          </a:fillRef>
+          <a:effectRef idx="0">
+            <a:schemeClr val="accent1"/>
+          </a:effectRef>
+          <a:fontRef idx="minor">
+            <a:schemeClr val="lt1"/>
+          </a:fontRef>
+        </p:style>
+        <p:txBody>
+          <a:bodyPr rtlCol="0" anchor="ctr"/>
+          <a:lstStyle/>
+          <a:p>
+            <a:pPr algn="ctr"/>
+            <a:r>
+              <a:rPr lang="en-US" sz="800" dirty="0">
+                <a:solidFill>
+                  <a:srgbClr val="FF0000"/>
+                </a:solidFill>
+              </a:rPr>
+              <a:t>&lt;&lt;class&gt;&gt;</a:t>
+            </a:r>
+          </a:p>
+          <a:p>
+            <a:pPr algn="ctr"/>
+            <a:r>
+              <a:rPr lang="en-US" sz="800" dirty="0"/>
+              <a:t>Timetable</a:t>
+            </a:r>
+          </a:p>
+        </p:txBody>
+      </p:sp>
+      <p:cxnSp>
+        <p:nvCxnSpPr>
+          <p:cNvPr id="68" name="Straight Connector 67">
+            <a:extLst>
+              <a:ext uri="{FF2B5EF4-FFF2-40B4-BE49-F238E27FC236}">
+                <a16:creationId xmlns:a16="http://schemas.microsoft.com/office/drawing/2014/main" id="{24C89C59-3044-EF49-9A10-A94E538760AB}"/>
+              </a:ext>
+            </a:extLst>
+          </p:cNvPr>
+          <p:cNvCxnSpPr>
+            <a:cxnSpLocks/>
+          </p:cNvCxnSpPr>
+          <p:nvPr/>
+        </p:nvCxnSpPr>
+        <p:spPr>
+          <a:xfrm>
+            <a:off x="5274836" y="2102862"/>
+            <a:ext cx="0" cy="3674450"/>
+          </a:xfrm>
+          <a:prstGeom prst="line">
+            <a:avLst/>
+          </a:prstGeom>
+          <a:ln w="9525" cap="flat" cmpd="sng" algn="ctr">
+            <a:solidFill>
+              <a:schemeClr val="accent2"/>
+            </a:solidFill>
+            <a:prstDash val="dash"/>
+            <a:round/>
+            <a:headEnd type="none" w="med" len="med"/>
+            <a:tailEnd type="none" w="med" len="med"/>
+          </a:ln>
+        </p:spPr>
+        <p:style>
+          <a:lnRef idx="0">
+            <a:scrgbClr r="0" g="0" b="0"/>
+          </a:lnRef>
+          <a:fillRef idx="0">
+            <a:scrgbClr r="0" g="0" b="0"/>
+          </a:fillRef>
+          <a:effectRef idx="0">
+            <a:scrgbClr r="0" g="0" b="0"/>
+          </a:effectRef>
+          <a:fontRef idx="minor">
+            <a:schemeClr val="tx1"/>
+          </a:fontRef>
+        </p:style>
+      </p:cxnSp>
+      <p:sp>
+        <p:nvSpPr>
+          <p:cNvPr id="69" name="Rectangle 68">
+            <a:extLst>
+              <a:ext uri="{FF2B5EF4-FFF2-40B4-BE49-F238E27FC236}">
+                <a16:creationId xmlns:a16="http://schemas.microsoft.com/office/drawing/2014/main" id="{52722C1B-64D1-364B-B9EE-CA832FA69E42}"/>
+              </a:ext>
+            </a:extLst>
+          </p:cNvPr>
+          <p:cNvSpPr/>
+          <p:nvPr/>
+        </p:nvSpPr>
+        <p:spPr>
+          <a:xfrm>
+            <a:off x="5232459" y="2895600"/>
+            <a:ext cx="114298" cy="1524000"/>
+          </a:xfrm>
+          <a:prstGeom prst="rect">
+            <a:avLst/>
+          </a:prstGeom>
+          <a:ln w="12700">
+            <a:solidFill>
+              <a:schemeClr val="accent2"/>
+            </a:solidFill>
+          </a:ln>
+        </p:spPr>
+        <p:style>
+          <a:lnRef idx="2">
+            <a:schemeClr val="accent6"/>
+          </a:lnRef>
+          <a:fillRef idx="1">
+            <a:schemeClr val="lt1"/>
+          </a:fillRef>
+          <a:effectRef idx="0">
+            <a:schemeClr val="accent6"/>
+          </a:effectRef>
+          <a:fontRef idx="minor">
+            <a:schemeClr val="dk1"/>
+          </a:fontRef>
+        </p:style>
+        <p:txBody>
+          <a:bodyPr rtlCol="0" anchor="ctr"/>
+          <a:lstStyle/>
+          <a:p>
+            <a:pPr algn="ctr"/>
+            <a:endParaRPr lang="en-US" dirty="0"/>
+          </a:p>
+        </p:txBody>
+      </p:sp>
+      <p:cxnSp>
+        <p:nvCxnSpPr>
+          <p:cNvPr id="76" name="Straight Arrow Connector 75">
+            <a:extLst>
+              <a:ext uri="{FF2B5EF4-FFF2-40B4-BE49-F238E27FC236}">
+                <a16:creationId xmlns:a16="http://schemas.microsoft.com/office/drawing/2014/main" id="{3EEDF3C7-3C3C-6A4A-9D61-2384A29D77AA}"/>
+              </a:ext>
+            </a:extLst>
+          </p:cNvPr>
+          <p:cNvCxnSpPr>
+            <a:cxnSpLocks/>
+          </p:cNvCxnSpPr>
+          <p:nvPr/>
+        </p:nvCxnSpPr>
+        <p:spPr>
+          <a:xfrm>
+            <a:off x="3438865" y="2895600"/>
+            <a:ext cx="1793594" cy="0"/>
+          </a:xfrm>
+          <a:prstGeom prst="straightConnector1">
+            <a:avLst/>
+          </a:prstGeom>
+          <a:ln w="9525" cap="flat" cmpd="sng" algn="ctr">
+            <a:solidFill>
+              <a:schemeClr val="accent2"/>
+            </a:solidFill>
+            <a:prstDash val="solid"/>
+            <a:round/>
+            <a:headEnd type="none" w="med" len="med"/>
+            <a:tailEnd type="arrow" w="med" len="med"/>
+          </a:ln>
+        </p:spPr>
+        <p:style>
+          <a:lnRef idx="0">
+            <a:scrgbClr r="0" g="0" b="0"/>
+          </a:lnRef>
+          <a:fillRef idx="0">
+            <a:scrgbClr r="0" g="0" b="0"/>
+          </a:fillRef>
+          <a:effectRef idx="0">
+            <a:scrgbClr r="0" g="0" b="0"/>
+          </a:effectRef>
+          <a:fontRef idx="minor">
+            <a:schemeClr val="tx1"/>
+          </a:fontRef>
+        </p:style>
+      </p:cxnSp>
+      <p:sp>
+        <p:nvSpPr>
+          <p:cNvPr id="79" name="TextBox 78">
+            <a:extLst>
+              <a:ext uri="{FF2B5EF4-FFF2-40B4-BE49-F238E27FC236}">
+                <a16:creationId xmlns:a16="http://schemas.microsoft.com/office/drawing/2014/main" id="{AB267F3E-B358-0546-84FF-4EAAAD33400A}"/>
+              </a:ext>
+            </a:extLst>
+          </p:cNvPr>
+          <p:cNvSpPr txBox="1"/>
+          <p:nvPr/>
+        </p:nvSpPr>
+        <p:spPr>
+          <a:xfrm>
+            <a:off x="3992957" y="2690983"/>
+            <a:ext cx="1453253" cy="215444"/>
+          </a:xfrm>
+          <a:prstGeom prst="rect">
+            <a:avLst/>
+          </a:prstGeom>
+          <a:noFill/>
+        </p:spPr>
+        <p:txBody>
+          <a:bodyPr wrap="square" rtlCol="0">
+            <a:spAutoFit/>
+          </a:bodyPr>
+          <a:lstStyle/>
+          <a:p>
+            <a:r>
+              <a:rPr lang="en-US" sz="800" dirty="0" err="1"/>
+              <a:t>inputLesson</a:t>
+            </a:r>
+            <a:r>
+              <a:rPr lang="en-US" sz="800" dirty="0"/>
+              <a:t>(Lesson Details)</a:t>
+            </a:r>
+          </a:p>
+        </p:txBody>
+      </p:sp>
+      <p:cxnSp>
+        <p:nvCxnSpPr>
+          <p:cNvPr id="82" name="Straight Arrow Connector 81">
+            <a:extLst>
+              <a:ext uri="{FF2B5EF4-FFF2-40B4-BE49-F238E27FC236}">
+                <a16:creationId xmlns:a16="http://schemas.microsoft.com/office/drawing/2014/main" id="{10539CDB-DCB7-F242-8293-79C260A0BA19}"/>
+              </a:ext>
+            </a:extLst>
+          </p:cNvPr>
+          <p:cNvCxnSpPr>
+            <a:cxnSpLocks/>
+          </p:cNvCxnSpPr>
+          <p:nvPr/>
+        </p:nvCxnSpPr>
+        <p:spPr>
+          <a:xfrm flipH="1">
+            <a:off x="3441103" y="4419600"/>
+            <a:ext cx="1786353" cy="0"/>
+          </a:xfrm>
+          <a:prstGeom prst="straightConnector1">
+            <a:avLst/>
+          </a:prstGeom>
+          <a:ln w="9525" cap="flat" cmpd="sng" algn="ctr">
+            <a:solidFill>
+              <a:schemeClr val="accent2"/>
+            </a:solidFill>
+            <a:prstDash val="dash"/>
+            <a:round/>
+            <a:headEnd type="none" w="med" len="med"/>
+            <a:tailEnd type="none" w="med" len="med"/>
+          </a:ln>
+        </p:spPr>
+        <p:style>
+          <a:lnRef idx="0">
+            <a:scrgbClr r="0" g="0" b="0"/>
+          </a:lnRef>
+          <a:fillRef idx="0">
+            <a:scrgbClr r="0" g="0" b="0"/>
+          </a:fillRef>
+          <a:effectRef idx="0">
+            <a:scrgbClr r="0" g="0" b="0"/>
+          </a:effectRef>
+          <a:fontRef idx="minor">
+            <a:schemeClr val="tx1"/>
+          </a:fontRef>
+        </p:style>
+      </p:cxnSp>
+      <p:cxnSp>
+        <p:nvCxnSpPr>
+          <p:cNvPr id="83" name="Straight Connector 82">
+            <a:extLst>
+              <a:ext uri="{FF2B5EF4-FFF2-40B4-BE49-F238E27FC236}">
+                <a16:creationId xmlns:a16="http://schemas.microsoft.com/office/drawing/2014/main" id="{E412B2CE-BDA0-2D41-A564-FBCF1F18876A}"/>
+              </a:ext>
+            </a:extLst>
+          </p:cNvPr>
+          <p:cNvCxnSpPr>
+            <a:cxnSpLocks/>
+          </p:cNvCxnSpPr>
+          <p:nvPr/>
+        </p:nvCxnSpPr>
+        <p:spPr>
+          <a:xfrm flipV="1">
+            <a:off x="3438865" y="4381504"/>
+            <a:ext cx="93742" cy="38096"/>
+          </a:xfrm>
+          <a:prstGeom prst="line">
+            <a:avLst/>
+          </a:prstGeom>
+          <a:ln>
+            <a:solidFill>
+              <a:schemeClr val="accent2"/>
+            </a:solidFill>
+          </a:ln>
+        </p:spPr>
+        <p:style>
+          <a:lnRef idx="1">
+            <a:schemeClr val="accent1"/>
+          </a:lnRef>
+          <a:fillRef idx="0">
+            <a:schemeClr val="accent1"/>
+          </a:fillRef>
+          <a:effectRef idx="0">
+            <a:schemeClr val="accent1"/>
+          </a:effectRef>
+          <a:fontRef idx="minor">
+            <a:schemeClr val="tx1"/>
+          </a:fontRef>
+        </p:style>
+      </p:cxnSp>
+      <p:cxnSp>
+        <p:nvCxnSpPr>
+          <p:cNvPr id="84" name="Straight Connector 83">
+            <a:extLst>
+              <a:ext uri="{FF2B5EF4-FFF2-40B4-BE49-F238E27FC236}">
+                <a16:creationId xmlns:a16="http://schemas.microsoft.com/office/drawing/2014/main" id="{ECDBB37E-99E1-FA45-9AA0-4120B2CB0636}"/>
+              </a:ext>
+            </a:extLst>
+          </p:cNvPr>
+          <p:cNvCxnSpPr>
+            <a:cxnSpLocks/>
+          </p:cNvCxnSpPr>
+          <p:nvPr/>
+        </p:nvCxnSpPr>
+        <p:spPr>
+          <a:xfrm>
+            <a:off x="3441103" y="4419601"/>
+            <a:ext cx="93600" cy="39600"/>
+          </a:xfrm>
+          <a:prstGeom prst="line">
+            <a:avLst/>
+          </a:prstGeom>
+          <a:ln>
+            <a:solidFill>
+              <a:schemeClr val="accent2"/>
+            </a:solidFill>
+          </a:ln>
+        </p:spPr>
+        <p:style>
+          <a:lnRef idx="1">
+            <a:schemeClr val="accent1"/>
+          </a:lnRef>
+          <a:fillRef idx="0">
+            <a:schemeClr val="accent1"/>
+          </a:fillRef>
+          <a:effectRef idx="0">
+            <a:schemeClr val="accent1"/>
+          </a:effectRef>
+          <a:fontRef idx="minor">
+            <a:schemeClr val="tx1"/>
+          </a:fontRef>
+        </p:style>
+      </p:cxnSp>
+      <p:sp>
+        <p:nvSpPr>
+          <p:cNvPr id="98" name="Rectangle 97">
+            <a:extLst>
+              <a:ext uri="{FF2B5EF4-FFF2-40B4-BE49-F238E27FC236}">
+                <a16:creationId xmlns:a16="http://schemas.microsoft.com/office/drawing/2014/main" id="{FE873D9D-1E06-3C4F-823B-E32E33EE5B83}"/>
+              </a:ext>
+            </a:extLst>
+          </p:cNvPr>
+          <p:cNvSpPr/>
+          <p:nvPr/>
+        </p:nvSpPr>
+        <p:spPr>
+          <a:xfrm>
+            <a:off x="6772110" y="3125040"/>
+            <a:ext cx="1121967" cy="374120"/>
+          </a:xfrm>
+          <a:prstGeom prst="rect">
+            <a:avLst/>
+          </a:prstGeom>
+          <a:solidFill>
+            <a:schemeClr val="accent2">
+              <a:lumMod val="75000"/>
+            </a:schemeClr>
+          </a:solidFill>
+          <a:ln w="12700">
+            <a:solidFill>
+              <a:schemeClr val="accent2"/>
+            </a:solidFill>
+          </a:ln>
+        </p:spPr>
+        <p:style>
+          <a:lnRef idx="2">
+            <a:schemeClr val="accent1">
+              <a:shade val="50000"/>
+            </a:schemeClr>
+          </a:lnRef>
+          <a:fillRef idx="1">
+            <a:schemeClr val="accent1"/>
+          </a:fillRef>
+          <a:effectRef idx="0">
+            <a:schemeClr val="accent1"/>
+          </a:effectRef>
+          <a:fontRef idx="minor">
+            <a:schemeClr val="lt1"/>
+          </a:fontRef>
+        </p:style>
+        <p:txBody>
+          <a:bodyPr rtlCol="0" anchor="ctr"/>
+          <a:lstStyle/>
+          <a:p>
+            <a:pPr algn="ctr"/>
+            <a:r>
+              <a:rPr lang="en-US" sz="800" dirty="0">
+                <a:solidFill>
+                  <a:schemeClr val="bg1"/>
+                </a:solidFill>
+              </a:rPr>
+              <a:t>lesson:Lesson</a:t>
+            </a:r>
+          </a:p>
+        </p:txBody>
+      </p:sp>
+      <p:cxnSp>
+        <p:nvCxnSpPr>
+          <p:cNvPr id="103" name="Straight Connector 102">
+            <a:extLst>
+              <a:ext uri="{FF2B5EF4-FFF2-40B4-BE49-F238E27FC236}">
+                <a16:creationId xmlns:a16="http://schemas.microsoft.com/office/drawing/2014/main" id="{B6BF0837-72BE-F64B-8DFD-D0313A5A9ECA}"/>
+              </a:ext>
+            </a:extLst>
+          </p:cNvPr>
+          <p:cNvCxnSpPr>
+            <a:cxnSpLocks/>
+            <a:stCxn id="102" idx="0"/>
+          </p:cNvCxnSpPr>
+          <p:nvPr/>
+        </p:nvCxnSpPr>
+        <p:spPr>
+          <a:xfrm>
+            <a:off x="7295656" y="3499160"/>
+            <a:ext cx="19260" cy="2278152"/>
+          </a:xfrm>
+          <a:prstGeom prst="line">
+            <a:avLst/>
+          </a:prstGeom>
+          <a:ln w="9525" cap="flat" cmpd="sng" algn="ctr">
+            <a:solidFill>
+              <a:schemeClr val="accent2"/>
+            </a:solidFill>
+            <a:prstDash val="dash"/>
+            <a:round/>
+            <a:headEnd type="none" w="med" len="med"/>
+            <a:tailEnd type="none" w="med" len="med"/>
+          </a:ln>
+        </p:spPr>
+        <p:style>
+          <a:lnRef idx="0">
+            <a:scrgbClr r="0" g="0" b="0"/>
+          </a:lnRef>
+          <a:fillRef idx="0">
+            <a:scrgbClr r="0" g="0" b="0"/>
+          </a:fillRef>
+          <a:effectRef idx="0">
+            <a:scrgbClr r="0" g="0" b="0"/>
+          </a:effectRef>
+          <a:fontRef idx="minor">
+            <a:schemeClr val="tx1"/>
+          </a:fontRef>
+        </p:style>
+      </p:cxnSp>
+      <p:cxnSp>
+        <p:nvCxnSpPr>
+          <p:cNvPr id="99" name="Straight Arrow Connector 98">
+            <a:extLst>
+              <a:ext uri="{FF2B5EF4-FFF2-40B4-BE49-F238E27FC236}">
+                <a16:creationId xmlns:a16="http://schemas.microsoft.com/office/drawing/2014/main" id="{C4EC64CE-0EE4-4941-AB2F-1D7EC3AB49DE}"/>
+              </a:ext>
+            </a:extLst>
+          </p:cNvPr>
+          <p:cNvCxnSpPr>
+            <a:cxnSpLocks/>
+          </p:cNvCxnSpPr>
+          <p:nvPr/>
+        </p:nvCxnSpPr>
+        <p:spPr>
+          <a:xfrm flipV="1">
+            <a:off x="5368968" y="3368277"/>
+            <a:ext cx="1403142" cy="208"/>
+          </a:xfrm>
+          <a:prstGeom prst="straightConnector1">
+            <a:avLst/>
+          </a:prstGeom>
+          <a:ln w="9525" cap="flat" cmpd="sng" algn="ctr">
+            <a:solidFill>
+              <a:schemeClr val="accent2"/>
+            </a:solidFill>
+            <a:prstDash val="solid"/>
+            <a:round/>
+            <a:headEnd type="none" w="med" len="med"/>
+            <a:tailEnd type="arrow" w="med" len="med"/>
+          </a:ln>
+        </p:spPr>
+        <p:style>
+          <a:lnRef idx="0">
+            <a:scrgbClr r="0" g="0" b="0"/>
+          </a:lnRef>
+          <a:fillRef idx="0">
+            <a:scrgbClr r="0" g="0" b="0"/>
+          </a:fillRef>
+          <a:effectRef idx="0">
+            <a:scrgbClr r="0" g="0" b="0"/>
+          </a:effectRef>
+          <a:fontRef idx="minor">
+            <a:schemeClr val="tx1"/>
+          </a:fontRef>
+        </p:style>
+      </p:cxnSp>
+      <p:sp>
+        <p:nvSpPr>
+          <p:cNvPr id="101" name="TextBox 100">
+            <a:extLst>
+              <a:ext uri="{FF2B5EF4-FFF2-40B4-BE49-F238E27FC236}">
+                <a16:creationId xmlns:a16="http://schemas.microsoft.com/office/drawing/2014/main" id="{DD67DB58-55EE-2542-B93A-57F0EEDD45E7}"/>
+              </a:ext>
+            </a:extLst>
+          </p:cNvPr>
+          <p:cNvSpPr txBox="1"/>
+          <p:nvPr/>
+        </p:nvSpPr>
+        <p:spPr>
+          <a:xfrm>
+            <a:off x="5555413" y="2872640"/>
+            <a:ext cx="992650" cy="215444"/>
+          </a:xfrm>
+          <a:prstGeom prst="rect">
+            <a:avLst/>
+          </a:prstGeom>
+          <a:noFill/>
+        </p:spPr>
+        <p:txBody>
+          <a:bodyPr wrap="square" rtlCol="0">
+            <a:spAutoFit/>
+          </a:bodyPr>
+          <a:lstStyle/>
+          <a:p>
+            <a:r>
+              <a:rPr lang="en-US" sz="800" dirty="0"/>
+              <a:t>addLesson(lesson)</a:t>
+            </a:r>
+          </a:p>
+        </p:txBody>
+      </p:sp>
+      <p:sp>
+        <p:nvSpPr>
+          <p:cNvPr id="102" name="Rectangle 101">
+            <a:extLst>
+              <a:ext uri="{FF2B5EF4-FFF2-40B4-BE49-F238E27FC236}">
+                <a16:creationId xmlns:a16="http://schemas.microsoft.com/office/drawing/2014/main" id="{7D66F112-BC28-764A-8343-B2FA41A2A1FB}"/>
+              </a:ext>
+            </a:extLst>
+          </p:cNvPr>
+          <p:cNvSpPr/>
+          <p:nvPr/>
+        </p:nvSpPr>
+        <p:spPr>
+          <a:xfrm>
+            <a:off x="7238507" y="3499160"/>
+            <a:ext cx="114298" cy="625322"/>
+          </a:xfrm>
+          <a:prstGeom prst="rect">
+            <a:avLst/>
+          </a:prstGeom>
+          <a:ln w="12700">
+            <a:solidFill>
+              <a:schemeClr val="accent2"/>
+            </a:solidFill>
+          </a:ln>
+        </p:spPr>
+        <p:style>
+          <a:lnRef idx="2">
+            <a:schemeClr val="accent6"/>
+          </a:lnRef>
+          <a:fillRef idx="1">
+            <a:schemeClr val="lt1"/>
+          </a:fillRef>
+          <a:effectRef idx="0">
+            <a:schemeClr val="accent6"/>
+          </a:effectRef>
+          <a:fontRef idx="minor">
+            <a:schemeClr val="dk1"/>
+          </a:fontRef>
+        </p:style>
+        <p:txBody>
+          <a:bodyPr rtlCol="0" anchor="ctr"/>
+          <a:lstStyle/>
+          <a:p>
+            <a:pPr algn="ctr"/>
+            <a:endParaRPr lang="en-US" dirty="0"/>
+          </a:p>
+        </p:txBody>
+      </p:sp>
+      <p:cxnSp>
+        <p:nvCxnSpPr>
+          <p:cNvPr id="125" name="Straight Arrow Connector 124">
+            <a:extLst>
+              <a:ext uri="{FF2B5EF4-FFF2-40B4-BE49-F238E27FC236}">
+                <a16:creationId xmlns:a16="http://schemas.microsoft.com/office/drawing/2014/main" id="{C5C1D507-E194-6447-8615-7C93E536F484}"/>
+              </a:ext>
+            </a:extLst>
+          </p:cNvPr>
+          <p:cNvCxnSpPr>
+            <a:cxnSpLocks/>
+            <a:stCxn id="102" idx="2"/>
+          </p:cNvCxnSpPr>
+          <p:nvPr/>
+        </p:nvCxnSpPr>
+        <p:spPr>
+          <a:xfrm flipH="1">
+            <a:off x="5368970" y="4124482"/>
+            <a:ext cx="1926686" cy="13783"/>
+          </a:xfrm>
+          <a:prstGeom prst="straightConnector1">
+            <a:avLst/>
+          </a:prstGeom>
+          <a:ln w="9525" cap="flat" cmpd="sng" algn="ctr">
+            <a:solidFill>
+              <a:schemeClr val="accent2"/>
+            </a:solidFill>
+            <a:prstDash val="dash"/>
+            <a:round/>
+            <a:headEnd type="none" w="med" len="med"/>
+            <a:tailEnd type="none" w="med" len="med"/>
+          </a:ln>
+        </p:spPr>
+        <p:style>
+          <a:lnRef idx="0">
+            <a:scrgbClr r="0" g="0" b="0"/>
+          </a:lnRef>
+          <a:fillRef idx="0">
+            <a:scrgbClr r="0" g="0" b="0"/>
+          </a:fillRef>
+          <a:effectRef idx="0">
+            <a:scrgbClr r="0" g="0" b="0"/>
+          </a:effectRef>
+          <a:fontRef idx="minor">
+            <a:schemeClr val="tx1"/>
+          </a:fontRef>
+        </p:style>
+      </p:cxnSp>
+      <p:cxnSp>
+        <p:nvCxnSpPr>
+          <p:cNvPr id="126" name="Straight Connector 125">
+            <a:extLst>
+              <a:ext uri="{FF2B5EF4-FFF2-40B4-BE49-F238E27FC236}">
+                <a16:creationId xmlns:a16="http://schemas.microsoft.com/office/drawing/2014/main" id="{F452E062-701C-0E47-8BAE-670C93FFFEE4}"/>
+              </a:ext>
+            </a:extLst>
+          </p:cNvPr>
+          <p:cNvCxnSpPr>
+            <a:cxnSpLocks/>
+          </p:cNvCxnSpPr>
+          <p:nvPr/>
+        </p:nvCxnSpPr>
+        <p:spPr>
+          <a:xfrm flipV="1">
+            <a:off x="5359804" y="4101416"/>
+            <a:ext cx="93742" cy="38096"/>
+          </a:xfrm>
+          <a:prstGeom prst="line">
+            <a:avLst/>
+          </a:prstGeom>
+          <a:ln>
+            <a:solidFill>
+              <a:schemeClr val="accent2"/>
+            </a:solidFill>
+          </a:ln>
+        </p:spPr>
+        <p:style>
+          <a:lnRef idx="1">
+            <a:schemeClr val="accent1"/>
+          </a:lnRef>
+          <a:fillRef idx="0">
+            <a:schemeClr val="accent1"/>
+          </a:fillRef>
+          <a:effectRef idx="0">
+            <a:schemeClr val="accent1"/>
+          </a:effectRef>
+          <a:fontRef idx="minor">
+            <a:schemeClr val="tx1"/>
+          </a:fontRef>
+        </p:style>
+      </p:cxnSp>
+      <p:cxnSp>
+        <p:nvCxnSpPr>
+          <p:cNvPr id="127" name="Straight Connector 126">
+            <a:extLst>
+              <a:ext uri="{FF2B5EF4-FFF2-40B4-BE49-F238E27FC236}">
+                <a16:creationId xmlns:a16="http://schemas.microsoft.com/office/drawing/2014/main" id="{638F40BF-AAD1-7244-8940-B82C07835CD9}"/>
+              </a:ext>
+            </a:extLst>
+          </p:cNvPr>
+          <p:cNvCxnSpPr>
+            <a:cxnSpLocks/>
+          </p:cNvCxnSpPr>
+          <p:nvPr/>
+        </p:nvCxnSpPr>
+        <p:spPr>
+          <a:xfrm>
+            <a:off x="5362042" y="4139513"/>
+            <a:ext cx="93600" cy="39600"/>
+          </a:xfrm>
+          <a:prstGeom prst="line">
+            <a:avLst/>
+          </a:prstGeom>
+          <a:ln>
+            <a:solidFill>
+              <a:schemeClr val="accent2"/>
+            </a:solidFill>
+          </a:ln>
+        </p:spPr>
+        <p:style>
+          <a:lnRef idx="1">
+            <a:schemeClr val="accent1"/>
+          </a:lnRef>
+          <a:fillRef idx="0">
+            <a:schemeClr val="accent1"/>
+          </a:fillRef>
+          <a:effectRef idx="0">
+            <a:schemeClr val="accent1"/>
+          </a:effectRef>
+          <a:fontRef idx="minor">
+            <a:schemeClr val="tx1"/>
+          </a:fontRef>
+        </p:style>
+      </p:cxnSp>
+      <p:cxnSp>
+        <p:nvCxnSpPr>
+          <p:cNvPr id="137" name="Straight Connector 136">
+            <a:extLst>
+              <a:ext uri="{FF2B5EF4-FFF2-40B4-BE49-F238E27FC236}">
+                <a16:creationId xmlns:a16="http://schemas.microsoft.com/office/drawing/2014/main" id="{22CC3FAB-7DFE-9F4D-9127-85AE74940705}"/>
+              </a:ext>
+            </a:extLst>
+          </p:cNvPr>
+          <p:cNvCxnSpPr>
+            <a:cxnSpLocks/>
+          </p:cNvCxnSpPr>
+          <p:nvPr/>
+        </p:nvCxnSpPr>
+        <p:spPr>
+          <a:xfrm flipV="1">
+            <a:off x="7358398" y="4018520"/>
+            <a:ext cx="93742" cy="38096"/>
+          </a:xfrm>
+          <a:prstGeom prst="line">
+            <a:avLst/>
+          </a:prstGeom>
+          <a:ln>
+            <a:solidFill>
+              <a:schemeClr val="accent2"/>
+            </a:solidFill>
+          </a:ln>
+        </p:spPr>
+        <p:style>
+          <a:lnRef idx="1">
+            <a:schemeClr val="accent1"/>
+          </a:lnRef>
+          <a:fillRef idx="0">
+            <a:schemeClr val="accent1"/>
+          </a:fillRef>
+          <a:effectRef idx="0">
+            <a:schemeClr val="accent1"/>
+          </a:effectRef>
+          <a:fontRef idx="minor">
+            <a:schemeClr val="tx1"/>
+          </a:fontRef>
+        </p:style>
+      </p:cxnSp>
+      <p:cxnSp>
+        <p:nvCxnSpPr>
+          <p:cNvPr id="138" name="Straight Connector 137">
+            <a:extLst>
+              <a:ext uri="{FF2B5EF4-FFF2-40B4-BE49-F238E27FC236}">
+                <a16:creationId xmlns:a16="http://schemas.microsoft.com/office/drawing/2014/main" id="{DBFB772D-E317-6148-BEAD-AFAE5B8ADFEB}"/>
+              </a:ext>
+            </a:extLst>
+          </p:cNvPr>
+          <p:cNvCxnSpPr>
+            <a:cxnSpLocks/>
+          </p:cNvCxnSpPr>
+          <p:nvPr/>
+        </p:nvCxnSpPr>
+        <p:spPr>
+          <a:xfrm>
+            <a:off x="7360636" y="4056617"/>
+            <a:ext cx="93600" cy="39600"/>
+          </a:xfrm>
+          <a:prstGeom prst="line">
+            <a:avLst/>
+          </a:prstGeom>
+          <a:ln>
+            <a:solidFill>
+              <a:schemeClr val="accent2"/>
+            </a:solidFill>
+          </a:ln>
+        </p:spPr>
+        <p:style>
+          <a:lnRef idx="1">
+            <a:schemeClr val="accent1"/>
+          </a:lnRef>
+          <a:fillRef idx="0">
+            <a:schemeClr val="accent1"/>
+          </a:fillRef>
+          <a:effectRef idx="0">
+            <a:schemeClr val="accent1"/>
+          </a:effectRef>
+          <a:fontRef idx="minor">
+            <a:schemeClr val="tx1"/>
+          </a:fontRef>
+        </p:style>
+      </p:cxnSp>
+      <p:sp>
+        <p:nvSpPr>
+          <p:cNvPr id="157" name="TextBox 156">
+            <a:extLst>
+              <a:ext uri="{FF2B5EF4-FFF2-40B4-BE49-F238E27FC236}">
+                <a16:creationId xmlns:a16="http://schemas.microsoft.com/office/drawing/2014/main" id="{0AA4F582-D7A1-EE4F-8BEE-60AE7E1AFC30}"/>
+              </a:ext>
+            </a:extLst>
+          </p:cNvPr>
+          <p:cNvSpPr txBox="1"/>
+          <p:nvPr/>
+        </p:nvSpPr>
+        <p:spPr>
+          <a:xfrm>
+            <a:off x="3676308" y="411966"/>
+            <a:ext cx="1444819" cy="369332"/>
+          </a:xfrm>
+          <a:prstGeom prst="rect">
+            <a:avLst/>
+          </a:prstGeom>
+          <a:noFill/>
+        </p:spPr>
+        <p:txBody>
+          <a:bodyPr wrap="none" rtlCol="0">
+            <a:spAutoFit/>
+          </a:bodyPr>
+          <a:lstStyle/>
+          <a:p>
+            <a:r>
+              <a:rPr lang="en-US" dirty="0"/>
+              <a:t>module store</a:t>
+            </a:r>
+          </a:p>
+        </p:txBody>
+      </p:sp>
+      <p:sp>
+        <p:nvSpPr>
+          <p:cNvPr id="51" name="Rectangle 50">
+            <a:extLst>
+              <a:ext uri="{FF2B5EF4-FFF2-40B4-BE49-F238E27FC236}">
+                <a16:creationId xmlns:a16="http://schemas.microsoft.com/office/drawing/2014/main" id="{81B1B538-744C-9344-905D-C7654BA4560D}"/>
+              </a:ext>
+            </a:extLst>
+          </p:cNvPr>
+          <p:cNvSpPr/>
+          <p:nvPr/>
+        </p:nvSpPr>
+        <p:spPr>
+          <a:xfrm>
+            <a:off x="5299690" y="3085805"/>
+            <a:ext cx="114298" cy="106450"/>
+          </a:xfrm>
+          <a:prstGeom prst="rect">
+            <a:avLst/>
+          </a:prstGeom>
+          <a:ln w="12700">
+            <a:solidFill>
+              <a:schemeClr val="accent2"/>
+            </a:solidFill>
+          </a:ln>
+        </p:spPr>
+        <p:style>
+          <a:lnRef idx="2">
+            <a:schemeClr val="accent6"/>
+          </a:lnRef>
+          <a:fillRef idx="1">
+            <a:schemeClr val="lt1"/>
+          </a:fillRef>
+          <a:effectRef idx="0">
+            <a:schemeClr val="accent6"/>
+          </a:effectRef>
+          <a:fontRef idx="minor">
+            <a:schemeClr val="dk1"/>
+          </a:fontRef>
+        </p:style>
+        <p:txBody>
+          <a:bodyPr rtlCol="0" anchor="ctr"/>
+          <a:lstStyle/>
+          <a:p>
+            <a:pPr algn="ctr"/>
+            <a:endParaRPr lang="en-US" dirty="0"/>
+          </a:p>
+        </p:txBody>
+      </p:sp>
+      <p:cxnSp>
+        <p:nvCxnSpPr>
+          <p:cNvPr id="17" name="Curved Connector 16">
+            <a:extLst>
+              <a:ext uri="{FF2B5EF4-FFF2-40B4-BE49-F238E27FC236}">
+                <a16:creationId xmlns:a16="http://schemas.microsoft.com/office/drawing/2014/main" id="{7A0E6004-29F4-E041-AD62-68F3E9DEEBA4}"/>
+              </a:ext>
+            </a:extLst>
+          </p:cNvPr>
+          <p:cNvCxnSpPr>
+            <a:cxnSpLocks/>
+          </p:cNvCxnSpPr>
+          <p:nvPr/>
+        </p:nvCxnSpPr>
+        <p:spPr>
+          <a:xfrm rot="16200000" flipH="1">
+            <a:off x="5289762" y="2996007"/>
+            <a:ext cx="162613" cy="57149"/>
+          </a:xfrm>
+          <a:prstGeom prst="curvedConnector4">
+            <a:avLst>
+              <a:gd name="adj1" fmla="val 6204"/>
+              <a:gd name="adj2" fmla="val 500007"/>
+            </a:avLst>
+          </a:prstGeom>
+          <a:ln w="9525" cap="flat" cmpd="sng" algn="ctr">
+            <a:solidFill>
+              <a:schemeClr val="accent2"/>
+            </a:solidFill>
+            <a:prstDash val="solid"/>
+            <a:round/>
+            <a:headEnd type="none" w="med" len="med"/>
+            <a:tailEnd type="arrow" w="med" len="med"/>
+          </a:ln>
+        </p:spPr>
+        <p:style>
+          <a:lnRef idx="0">
+            <a:scrgbClr r="0" g="0" b="0"/>
+          </a:lnRef>
+          <a:fillRef idx="0">
+            <a:scrgbClr r="0" g="0" b="0"/>
+          </a:fillRef>
+          <a:effectRef idx="0">
+            <a:scrgbClr r="0" g="0" b="0"/>
+          </a:effectRef>
+          <a:fontRef idx="minor">
+            <a:schemeClr val="tx1"/>
+          </a:fontRef>
+        </p:style>
+      </p:cxnSp>
+      <p:cxnSp>
+        <p:nvCxnSpPr>
+          <p:cNvPr id="95" name="Elbow Connector 94">
+            <a:extLst>
+              <a:ext uri="{FF2B5EF4-FFF2-40B4-BE49-F238E27FC236}">
+                <a16:creationId xmlns:a16="http://schemas.microsoft.com/office/drawing/2014/main" id="{32BE6738-A16F-7E48-9972-9547383140CD}"/>
+              </a:ext>
+            </a:extLst>
+          </p:cNvPr>
+          <p:cNvCxnSpPr>
+            <a:cxnSpLocks/>
+          </p:cNvCxnSpPr>
+          <p:nvPr/>
+        </p:nvCxnSpPr>
+        <p:spPr>
+          <a:xfrm flipH="1">
+            <a:off x="5361488" y="3189330"/>
+            <a:ext cx="62228" cy="167124"/>
+          </a:xfrm>
+          <a:prstGeom prst="bentConnector4">
+            <a:avLst>
+              <a:gd name="adj1" fmla="val -202494"/>
+              <a:gd name="adj2" fmla="val 65924"/>
+            </a:avLst>
+          </a:prstGeom>
+          <a:ln w="9525" cap="flat" cmpd="sng" algn="ctr">
+            <a:solidFill>
+              <a:schemeClr val="accent2"/>
+            </a:solidFill>
+            <a:prstDash val="dash"/>
+            <a:round/>
+            <a:headEnd type="none" w="med" len="med"/>
+            <a:tailEnd type="none" w="med" len="med"/>
+          </a:ln>
+        </p:spPr>
+        <p:style>
+          <a:lnRef idx="0">
+            <a:scrgbClr r="0" g="0" b="0"/>
+          </a:lnRef>
+          <a:fillRef idx="0">
+            <a:scrgbClr r="0" g="0" b="0"/>
+          </a:fillRef>
+          <a:effectRef idx="0">
+            <a:scrgbClr r="0" g="0" b="0"/>
+          </a:effectRef>
+          <a:fontRef idx="minor">
+            <a:schemeClr val="tx1"/>
+          </a:fontRef>
+        </p:style>
+      </p:cxnSp>
+      <p:cxnSp>
+        <p:nvCxnSpPr>
+          <p:cNvPr id="120" name="Straight Connector 119">
+            <a:extLst>
+              <a:ext uri="{FF2B5EF4-FFF2-40B4-BE49-F238E27FC236}">
+                <a16:creationId xmlns:a16="http://schemas.microsoft.com/office/drawing/2014/main" id="{2710091E-4F5A-4D45-9A38-8D752CC98518}"/>
+              </a:ext>
+            </a:extLst>
+          </p:cNvPr>
+          <p:cNvCxnSpPr>
+            <a:cxnSpLocks/>
+          </p:cNvCxnSpPr>
+          <p:nvPr/>
+        </p:nvCxnSpPr>
+        <p:spPr>
+          <a:xfrm flipV="1">
+            <a:off x="5338749" y="3264333"/>
+            <a:ext cx="93742" cy="38096"/>
+          </a:xfrm>
+          <a:prstGeom prst="line">
+            <a:avLst/>
+          </a:prstGeom>
+          <a:ln>
+            <a:solidFill>
+              <a:schemeClr val="accent2"/>
+            </a:solidFill>
+          </a:ln>
+        </p:spPr>
+        <p:style>
+          <a:lnRef idx="1">
+            <a:schemeClr val="accent1"/>
+          </a:lnRef>
+          <a:fillRef idx="0">
+            <a:schemeClr val="accent1"/>
+          </a:fillRef>
+          <a:effectRef idx="0">
+            <a:schemeClr val="accent1"/>
+          </a:effectRef>
+          <a:fontRef idx="minor">
+            <a:schemeClr val="tx1"/>
+          </a:fontRef>
+        </p:style>
+      </p:cxnSp>
+      <p:cxnSp>
+        <p:nvCxnSpPr>
+          <p:cNvPr id="121" name="Straight Connector 120">
+            <a:extLst>
+              <a:ext uri="{FF2B5EF4-FFF2-40B4-BE49-F238E27FC236}">
+                <a16:creationId xmlns:a16="http://schemas.microsoft.com/office/drawing/2014/main" id="{93B062F3-D947-2745-9C86-EB1D2828E3E5}"/>
+              </a:ext>
+            </a:extLst>
+          </p:cNvPr>
+          <p:cNvCxnSpPr>
+            <a:cxnSpLocks/>
+          </p:cNvCxnSpPr>
+          <p:nvPr/>
+        </p:nvCxnSpPr>
+        <p:spPr>
+          <a:xfrm>
+            <a:off x="5340987" y="3302430"/>
+            <a:ext cx="93600" cy="39600"/>
+          </a:xfrm>
+          <a:prstGeom prst="line">
+            <a:avLst/>
+          </a:prstGeom>
+          <a:ln>
+            <a:solidFill>
+              <a:schemeClr val="accent2"/>
+            </a:solidFill>
+          </a:ln>
+        </p:spPr>
+        <p:style>
+          <a:lnRef idx="1">
+            <a:schemeClr val="accent1"/>
+          </a:lnRef>
+          <a:fillRef idx="0">
+            <a:schemeClr val="accent1"/>
+          </a:fillRef>
+          <a:effectRef idx="0">
+            <a:schemeClr val="accent1"/>
+          </a:effectRef>
+          <a:fontRef idx="minor">
+            <a:schemeClr val="tx1"/>
+          </a:fontRef>
+        </p:style>
+      </p:cxnSp>
+      <p:sp>
+        <p:nvSpPr>
+          <p:cNvPr id="109" name="TextBox 108">
+            <a:extLst>
+              <a:ext uri="{FF2B5EF4-FFF2-40B4-BE49-F238E27FC236}">
+                <a16:creationId xmlns:a16="http://schemas.microsoft.com/office/drawing/2014/main" id="{9276B4C0-2EBD-314E-B34A-F6E33FE3F7E4}"/>
+              </a:ext>
+            </a:extLst>
+          </p:cNvPr>
+          <p:cNvSpPr txBox="1"/>
+          <p:nvPr/>
+        </p:nvSpPr>
+        <p:spPr>
+          <a:xfrm>
+            <a:off x="5490947" y="3154473"/>
+            <a:ext cx="1397052" cy="215444"/>
+          </a:xfrm>
+          <a:prstGeom prst="rect">
+            <a:avLst/>
+          </a:prstGeom>
+          <a:noFill/>
+        </p:spPr>
+        <p:txBody>
+          <a:bodyPr wrap="square" rtlCol="0">
+            <a:spAutoFit/>
+          </a:bodyPr>
+          <a:lstStyle/>
+          <a:p>
+            <a:r>
+              <a:rPr lang="en-US" sz="800" dirty="0"/>
+              <a:t>new Lesson(Lesson Details)</a:t>
+            </a:r>
+          </a:p>
+        </p:txBody>
+      </p:sp>
+    </p:spTree>
+    <p:extLst>
+      <p:ext uri="{BB962C8B-B14F-4D97-AF65-F5344CB8AC3E}">
+        <p14:creationId xmlns:p14="http://schemas.microsoft.com/office/powerpoint/2010/main" val="4026747122"/>
       </p:ext>
     </p:extLst>
   </p:cSld>

</xml_diff>

<commit_message>
Update DG with planner CD, overview SD
</commit_message>
<xml_diff>
--- a/docs/assets/DG Diagrams.pptx
+++ b/docs/assets/DG Diagrams.pptx
@@ -9,12 +9,12 @@
   </p:notesMasterIdLst>
   <p:sldIdLst>
     <p:sldId id="256" r:id="rId2"/>
-    <p:sldId id="265" r:id="rId3"/>
-    <p:sldId id="264" r:id="rId4"/>
-    <p:sldId id="260" r:id="rId5"/>
-    <p:sldId id="261" r:id="rId6"/>
-    <p:sldId id="262" r:id="rId7"/>
-    <p:sldId id="263" r:id="rId8"/>
+    <p:sldId id="264" r:id="rId3"/>
+    <p:sldId id="260" r:id="rId4"/>
+    <p:sldId id="261" r:id="rId5"/>
+    <p:sldId id="262" r:id="rId6"/>
+    <p:sldId id="263" r:id="rId7"/>
+    <p:sldId id="265" r:id="rId8"/>
   </p:sldIdLst>
   <p:sldSz cx="9144000" cy="6858000" type="screen4x3"/>
   <p:notesSz cx="6858000" cy="9144000"/>
@@ -547,7 +547,7 @@
           <a:p>
             <a:fld id="{8FC7C363-02C1-0D4B-B7C2-AACF0B0B3D8D}" type="slidenum">
               <a:rPr lang="en-US" smtClean="0"/>
-              <a:t>5</a:t>
+              <a:t>4</a:t>
             </a:fld>
             <a:endParaRPr lang="en-US" dirty="0"/>
           </a:p>
@@ -3609,71 +3609,6 @@
       </p:grpSpPr>
       <p:sp>
         <p:nvSpPr>
-          <p:cNvPr id="4" name="TextBox 3">
-            <a:extLst>
-              <a:ext uri="{FF2B5EF4-FFF2-40B4-BE49-F238E27FC236}">
-                <a16:creationId xmlns:a16="http://schemas.microsoft.com/office/drawing/2014/main" id="{6C6FA32C-B981-4250-8DDB-AE0AA72029C7}"/>
-              </a:ext>
-            </a:extLst>
-          </p:cNvPr>
-          <p:cNvSpPr txBox="1"/>
-          <p:nvPr/>
-        </p:nvSpPr>
-        <p:spPr>
-          <a:xfrm>
-            <a:off x="4035474" y="22860"/>
-            <a:ext cx="1073051" cy="369332"/>
-          </a:xfrm>
-          <a:prstGeom prst="rect">
-            <a:avLst/>
-          </a:prstGeom>
-          <a:noFill/>
-        </p:spPr>
-        <p:txBody>
-          <a:bodyPr wrap="none" rtlCol="0">
-            <a:spAutoFit/>
-          </a:bodyPr>
-          <a:lstStyle/>
-          <a:p>
-            <a:r>
-              <a:rPr lang="en-US" dirty="0"/>
-              <a:t>Overview</a:t>
-            </a:r>
-          </a:p>
-        </p:txBody>
-      </p:sp>
-    </p:spTree>
-    <p:extLst>
-      <p:ext uri="{BB962C8B-B14F-4D97-AF65-F5344CB8AC3E}">
-        <p14:creationId xmlns:p14="http://schemas.microsoft.com/office/powerpoint/2010/main" val="3560462433"/>
-      </p:ext>
-    </p:extLst>
-  </p:cSld>
-  <p:clrMapOvr>
-    <a:masterClrMapping/>
-  </p:clrMapOvr>
-</p:sld>
-</file>
-
-<file path=ppt/slides/slide3.xml><?xml version="1.0" encoding="utf-8"?>
-<p:sld xmlns:a="http://schemas.openxmlformats.org/drawingml/2006/main" xmlns:r="http://schemas.openxmlformats.org/officeDocument/2006/relationships" xmlns:p="http://schemas.openxmlformats.org/presentationml/2006/main">
-  <p:cSld>
-    <p:spTree>
-      <p:nvGrpSpPr>
-        <p:cNvPr id="1" name=""/>
-        <p:cNvGrpSpPr/>
-        <p:nvPr/>
-      </p:nvGrpSpPr>
-      <p:grpSpPr>
-        <a:xfrm>
-          <a:off x="0" y="0"/>
-          <a:ext cx="0" cy="0"/>
-          <a:chOff x="0" y="0"/>
-          <a:chExt cx="0" cy="0"/>
-        </a:xfrm>
-      </p:grpSpPr>
-      <p:sp>
-        <p:nvSpPr>
           <p:cNvPr id="34" name="Rectangle 33">
             <a:extLst>
               <a:ext uri="{FF2B5EF4-FFF2-40B4-BE49-F238E27FC236}">
@@ -6569,7 +6504,7 @@
 </p:sld>
 </file>
 
-<file path=ppt/slides/slide4.xml><?xml version="1.0" encoding="utf-8"?>
+<file path=ppt/slides/slide3.xml><?xml version="1.0" encoding="utf-8"?>
 <p:sld xmlns:a="http://schemas.openxmlformats.org/drawingml/2006/main" xmlns:r="http://schemas.openxmlformats.org/officeDocument/2006/relationships" xmlns:p="http://schemas.openxmlformats.org/presentationml/2006/main">
   <p:cSld>
     <p:spTree>
@@ -6990,7 +6925,7 @@
 </p:sld>
 </file>
 
-<file path=ppt/slides/slide5.xml><?xml version="1.0" encoding="utf-8"?>
+<file path=ppt/slides/slide4.xml><?xml version="1.0" encoding="utf-8"?>
 <p:sld xmlns:a="http://schemas.openxmlformats.org/drawingml/2006/main" xmlns:r="http://schemas.openxmlformats.org/officeDocument/2006/relationships" xmlns:p="http://schemas.openxmlformats.org/presentationml/2006/main">
   <p:cSld>
     <p:spTree>
@@ -9385,7 +9320,7 @@
 </p:sld>
 </file>
 
-<file path=ppt/slides/slide6.xml><?xml version="1.0" encoding="utf-8"?>
+<file path=ppt/slides/slide5.xml><?xml version="1.0" encoding="utf-8"?>
 <p:sld xmlns:a="http://schemas.openxmlformats.org/drawingml/2006/main" xmlns:r="http://schemas.openxmlformats.org/officeDocument/2006/relationships" xmlns:p="http://schemas.openxmlformats.org/presentationml/2006/main">
   <p:cSld>
     <p:spTree>
@@ -12850,7 +12785,7 @@
 </p:sld>
 </file>
 
-<file path=ppt/slides/slide7.xml><?xml version="1.0" encoding="utf-8"?>
+<file path=ppt/slides/slide6.xml><?xml version="1.0" encoding="utf-8"?>
 <p:sld xmlns:a="http://schemas.openxmlformats.org/drawingml/2006/main" xmlns:r="http://schemas.openxmlformats.org/officeDocument/2006/relationships" xmlns:p="http://schemas.openxmlformats.org/presentationml/2006/main">
   <p:cSld>
     <p:spTree>
@@ -15444,6 +15379,2013 @@
     <p:extLst>
       <p:ext uri="{BB962C8B-B14F-4D97-AF65-F5344CB8AC3E}">
         <p14:creationId xmlns:p14="http://schemas.microsoft.com/office/powerpoint/2010/main" val="183787022"/>
+      </p:ext>
+    </p:extLst>
+  </p:cSld>
+  <p:clrMapOvr>
+    <a:masterClrMapping/>
+  </p:clrMapOvr>
+</p:sld>
+</file>
+
+<file path=ppt/slides/slide7.xml><?xml version="1.0" encoding="utf-8"?>
+<p:sld xmlns:a="http://schemas.openxmlformats.org/drawingml/2006/main" xmlns:r="http://schemas.openxmlformats.org/officeDocument/2006/relationships" xmlns:p="http://schemas.openxmlformats.org/presentationml/2006/main">
+  <p:cSld>
+    <p:spTree>
+      <p:nvGrpSpPr>
+        <p:cNvPr id="1" name=""/>
+        <p:cNvGrpSpPr/>
+        <p:nvPr/>
+      </p:nvGrpSpPr>
+      <p:grpSpPr>
+        <a:xfrm>
+          <a:off x="0" y="0"/>
+          <a:ext cx="0" cy="0"/>
+          <a:chOff x="0" y="0"/>
+          <a:chExt cx="0" cy="0"/>
+        </a:xfrm>
+      </p:grpSpPr>
+      <p:sp>
+        <p:nvSpPr>
+          <p:cNvPr id="2" name="TextBox 1">
+            <a:extLst>
+              <a:ext uri="{FF2B5EF4-FFF2-40B4-BE49-F238E27FC236}">
+                <a16:creationId xmlns:a16="http://schemas.microsoft.com/office/drawing/2014/main" id="{02DCA885-18E2-428F-8593-CFA450082204}"/>
+              </a:ext>
+            </a:extLst>
+          </p:cNvPr>
+          <p:cNvSpPr txBox="1"/>
+          <p:nvPr/>
+        </p:nvSpPr>
+        <p:spPr>
+          <a:xfrm>
+            <a:off x="3810000" y="12444"/>
+            <a:ext cx="1313180" cy="369332"/>
+          </a:xfrm>
+          <a:prstGeom prst="rect">
+            <a:avLst/>
+          </a:prstGeom>
+          <a:noFill/>
+        </p:spPr>
+        <p:txBody>
+          <a:bodyPr wrap="none" rtlCol="0">
+            <a:spAutoFit/>
+          </a:bodyPr>
+          <a:lstStyle/>
+          <a:p>
+            <a:r>
+              <a:rPr lang="en-US" dirty="0"/>
+              <a:t>Planner add</a:t>
+            </a:r>
+          </a:p>
+        </p:txBody>
+      </p:sp>
+      <p:grpSp>
+        <p:nvGrpSpPr>
+          <p:cNvPr id="7" name="Group 6">
+            <a:extLst>
+              <a:ext uri="{FF2B5EF4-FFF2-40B4-BE49-F238E27FC236}">
+                <a16:creationId xmlns:a16="http://schemas.microsoft.com/office/drawing/2014/main" id="{5E8B8C70-7EFD-4E97-A7D4-54CFAA6BCDBC}"/>
+              </a:ext>
+            </a:extLst>
+          </p:cNvPr>
+          <p:cNvGrpSpPr/>
+          <p:nvPr/>
+        </p:nvGrpSpPr>
+        <p:grpSpPr>
+          <a:xfrm>
+            <a:off x="2828290" y="5352050"/>
+            <a:ext cx="3276600" cy="1295400"/>
+            <a:chOff x="3556928" y="2514600"/>
+            <a:chExt cx="2539072" cy="1828800"/>
+          </a:xfrm>
+        </p:grpSpPr>
+        <p:sp>
+          <p:nvSpPr>
+            <p:cNvPr id="3" name="Rectangle 2">
+              <a:extLst>
+                <a:ext uri="{FF2B5EF4-FFF2-40B4-BE49-F238E27FC236}">
+                  <a16:creationId xmlns:a16="http://schemas.microsoft.com/office/drawing/2014/main" id="{7EF819EB-BEDD-48E0-905B-41982292804A}"/>
+                </a:ext>
+              </a:extLst>
+            </p:cNvPr>
+            <p:cNvSpPr/>
+            <p:nvPr/>
+          </p:nvSpPr>
+          <p:spPr>
+            <a:xfrm>
+              <a:off x="3556928" y="2514600"/>
+              <a:ext cx="2539072" cy="457200"/>
+            </a:xfrm>
+            <a:prstGeom prst="rect">
+              <a:avLst/>
+            </a:prstGeom>
+          </p:spPr>
+          <p:style>
+            <a:lnRef idx="2">
+              <a:schemeClr val="accent2">
+                <a:shade val="50000"/>
+              </a:schemeClr>
+            </a:lnRef>
+            <a:fillRef idx="1">
+              <a:schemeClr val="accent2"/>
+            </a:fillRef>
+            <a:effectRef idx="0">
+              <a:schemeClr val="accent2"/>
+            </a:effectRef>
+            <a:fontRef idx="minor">
+              <a:schemeClr val="lt1"/>
+            </a:fontRef>
+          </p:style>
+          <p:txBody>
+            <a:bodyPr rtlCol="0" anchor="ctr"/>
+            <a:lstStyle/>
+            <a:p>
+              <a:pPr algn="ctr"/>
+              <a:r>
+                <a:rPr lang="en-SG" sz="1400" dirty="0"/>
+                <a:t>Planner</a:t>
+              </a:r>
+            </a:p>
+          </p:txBody>
+        </p:sp>
+        <p:sp>
+          <p:nvSpPr>
+            <p:cNvPr id="4" name="Rectangle 3">
+              <a:extLst>
+                <a:ext uri="{FF2B5EF4-FFF2-40B4-BE49-F238E27FC236}">
+                  <a16:creationId xmlns:a16="http://schemas.microsoft.com/office/drawing/2014/main" id="{D5D8C525-92CC-42DB-B113-BAC0CF257CD6}"/>
+                </a:ext>
+              </a:extLst>
+            </p:cNvPr>
+            <p:cNvSpPr/>
+            <p:nvPr/>
+          </p:nvSpPr>
+          <p:spPr>
+            <a:xfrm>
+              <a:off x="3556928" y="2971800"/>
+              <a:ext cx="2539072" cy="381000"/>
+            </a:xfrm>
+            <a:prstGeom prst="rect">
+              <a:avLst/>
+            </a:prstGeom>
+          </p:spPr>
+          <p:style>
+            <a:lnRef idx="2">
+              <a:schemeClr val="accent2"/>
+            </a:lnRef>
+            <a:fillRef idx="1">
+              <a:schemeClr val="lt1"/>
+            </a:fillRef>
+            <a:effectRef idx="0">
+              <a:schemeClr val="accent2"/>
+            </a:effectRef>
+            <a:fontRef idx="minor">
+              <a:schemeClr val="dk1"/>
+            </a:fontRef>
+          </p:style>
+          <p:txBody>
+            <a:bodyPr rtlCol="0" anchor="ctr"/>
+            <a:lstStyle/>
+            <a:p>
+              <a:pPr marL="171450" indent="-171450" algn="ctr">
+                <a:buFontTx/>
+                <a:buChar char="-"/>
+              </a:pPr>
+              <a:r>
+                <a:rPr lang="en-SG" sz="1100" u="sng" dirty="0" err="1"/>
+                <a:t>scheduleOfAllDates</a:t>
+              </a:r>
+              <a:r>
+                <a:rPr lang="en-SG" sz="1100" u="sng" dirty="0"/>
+                <a:t>: </a:t>
+              </a:r>
+              <a:r>
+                <a:rPr lang="en-SG" sz="1100" u="sng" dirty="0" err="1"/>
+                <a:t>ArrayList</a:t>
+              </a:r>
+              <a:r>
+                <a:rPr lang="en-SG" sz="1100" u="sng" dirty="0"/>
+                <a:t>&lt;Event&gt;</a:t>
+              </a:r>
+            </a:p>
+          </p:txBody>
+        </p:sp>
+        <p:sp>
+          <p:nvSpPr>
+            <p:cNvPr id="6" name="Rectangle 5">
+              <a:extLst>
+                <a:ext uri="{FF2B5EF4-FFF2-40B4-BE49-F238E27FC236}">
+                  <a16:creationId xmlns:a16="http://schemas.microsoft.com/office/drawing/2014/main" id="{7954EBB5-8D0A-4997-AE33-658317E23FC3}"/>
+                </a:ext>
+              </a:extLst>
+            </p:cNvPr>
+            <p:cNvSpPr/>
+            <p:nvPr/>
+          </p:nvSpPr>
+          <p:spPr>
+            <a:xfrm>
+              <a:off x="3556928" y="3352800"/>
+              <a:ext cx="2539072" cy="990600"/>
+            </a:xfrm>
+            <a:prstGeom prst="rect">
+              <a:avLst/>
+            </a:prstGeom>
+          </p:spPr>
+          <p:style>
+            <a:lnRef idx="2">
+              <a:schemeClr val="accent2"/>
+            </a:lnRef>
+            <a:fillRef idx="1">
+              <a:schemeClr val="lt1"/>
+            </a:fillRef>
+            <a:effectRef idx="0">
+              <a:schemeClr val="accent2"/>
+            </a:effectRef>
+            <a:fontRef idx="minor">
+              <a:schemeClr val="dk1"/>
+            </a:fontRef>
+          </p:style>
+          <p:txBody>
+            <a:bodyPr rtlCol="0" anchor="ctr"/>
+            <a:lstStyle/>
+            <a:p>
+              <a:pPr algn="ctr"/>
+              <a:r>
+                <a:rPr lang="en-SG" sz="1100" dirty="0"/>
+                <a:t>+ Planner(</a:t>
+              </a:r>
+              <a:r>
+                <a:rPr lang="en-SG" sz="1100" dirty="0" err="1"/>
+                <a:t>moduleList</a:t>
+              </a:r>
+              <a:r>
+                <a:rPr lang="en-SG" sz="1100" dirty="0"/>
+                <a:t>: </a:t>
+              </a:r>
+              <a:r>
+                <a:rPr lang="en-SG" sz="1100" dirty="0" err="1"/>
+                <a:t>ModuleList</a:t>
+              </a:r>
+              <a:r>
+                <a:rPr lang="en-SG" sz="1100" dirty="0"/>
+                <a:t>)</a:t>
+              </a:r>
+            </a:p>
+            <a:p>
+              <a:pPr marL="171450" indent="-171450" algn="ctr">
+                <a:buFontTx/>
+                <a:buChar char="-"/>
+              </a:pPr>
+              <a:r>
+                <a:rPr lang="en-SG" sz="1100" dirty="0" err="1"/>
+                <a:t>hasTimeConflict</a:t>
+              </a:r>
+              <a:r>
+                <a:rPr lang="en-SG" sz="1100" dirty="0"/>
+                <a:t>(</a:t>
+              </a:r>
+              <a:r>
+                <a:rPr lang="en-SG" sz="1100" dirty="0" err="1"/>
+                <a:t>eventToBeAdded</a:t>
+              </a:r>
+              <a:r>
+                <a:rPr lang="en-SG" sz="1100" dirty="0"/>
+                <a:t>: Event): Boolean</a:t>
+              </a:r>
+            </a:p>
+            <a:p>
+              <a:pPr marL="171450" indent="-171450" algn="ctr">
+                <a:buFontTx/>
+                <a:buChar char="-"/>
+              </a:pPr>
+              <a:r>
+                <a:rPr lang="en-SG" sz="1100" dirty="0" err="1"/>
+                <a:t>filterPlanner</a:t>
+              </a:r>
+              <a:r>
+                <a:rPr lang="en-SG" sz="1100" dirty="0"/>
+                <a:t>(date: String): </a:t>
+              </a:r>
+              <a:r>
+                <a:rPr lang="en-SG" sz="1100" dirty="0" err="1"/>
+                <a:t>ArrayList</a:t>
+              </a:r>
+              <a:r>
+                <a:rPr lang="en-SG" sz="1100" dirty="0"/>
+                <a:t>&lt;Event&gt;</a:t>
+              </a:r>
+            </a:p>
+          </p:txBody>
+        </p:sp>
+      </p:grpSp>
+      <p:grpSp>
+        <p:nvGrpSpPr>
+          <p:cNvPr id="8" name="Group 7">
+            <a:extLst>
+              <a:ext uri="{FF2B5EF4-FFF2-40B4-BE49-F238E27FC236}">
+                <a16:creationId xmlns:a16="http://schemas.microsoft.com/office/drawing/2014/main" id="{A946C47D-67E7-44AB-9E76-6B4F50EA2052}"/>
+              </a:ext>
+            </a:extLst>
+          </p:cNvPr>
+          <p:cNvGrpSpPr/>
+          <p:nvPr/>
+        </p:nvGrpSpPr>
+        <p:grpSpPr>
+          <a:xfrm>
+            <a:off x="507900" y="3007143"/>
+            <a:ext cx="1752600" cy="842962"/>
+            <a:chOff x="3556928" y="2514600"/>
+            <a:chExt cx="2539072" cy="1828798"/>
+          </a:xfrm>
+        </p:grpSpPr>
+        <p:sp>
+          <p:nvSpPr>
+            <p:cNvPr id="9" name="Rectangle 8">
+              <a:extLst>
+                <a:ext uri="{FF2B5EF4-FFF2-40B4-BE49-F238E27FC236}">
+                  <a16:creationId xmlns:a16="http://schemas.microsoft.com/office/drawing/2014/main" id="{5B7FF853-F8FF-48AB-852C-E052CE275601}"/>
+                </a:ext>
+              </a:extLst>
+            </p:cNvPr>
+            <p:cNvSpPr/>
+            <p:nvPr/>
+          </p:nvSpPr>
+          <p:spPr>
+            <a:xfrm>
+              <a:off x="3556928" y="2514600"/>
+              <a:ext cx="2539072" cy="457200"/>
+            </a:xfrm>
+            <a:prstGeom prst="rect">
+              <a:avLst/>
+            </a:prstGeom>
+            <a:solidFill>
+              <a:schemeClr val="accent1"/>
+            </a:solidFill>
+          </p:spPr>
+          <p:style>
+            <a:lnRef idx="2">
+              <a:schemeClr val="accent2">
+                <a:shade val="50000"/>
+              </a:schemeClr>
+            </a:lnRef>
+            <a:fillRef idx="1">
+              <a:schemeClr val="accent2"/>
+            </a:fillRef>
+            <a:effectRef idx="0">
+              <a:schemeClr val="accent2"/>
+            </a:effectRef>
+            <a:fontRef idx="minor">
+              <a:schemeClr val="lt1"/>
+            </a:fontRef>
+          </p:style>
+          <p:txBody>
+            <a:bodyPr rtlCol="0" anchor="ctr"/>
+            <a:lstStyle/>
+            <a:p>
+              <a:pPr algn="ctr"/>
+              <a:r>
+                <a:rPr lang="en-SG" sz="1400" dirty="0" err="1"/>
+                <a:t>ModuleList</a:t>
+              </a:r>
+              <a:endParaRPr lang="en-SG" sz="1400" dirty="0"/>
+            </a:p>
+          </p:txBody>
+        </p:sp>
+        <p:sp>
+          <p:nvSpPr>
+            <p:cNvPr id="10" name="Rectangle 9">
+              <a:extLst>
+                <a:ext uri="{FF2B5EF4-FFF2-40B4-BE49-F238E27FC236}">
+                  <a16:creationId xmlns:a16="http://schemas.microsoft.com/office/drawing/2014/main" id="{A5630C40-D885-4133-865C-16B1DEF04D1F}"/>
+                </a:ext>
+              </a:extLst>
+            </p:cNvPr>
+            <p:cNvSpPr/>
+            <p:nvPr/>
+          </p:nvSpPr>
+          <p:spPr>
+            <a:xfrm>
+              <a:off x="3556928" y="2971801"/>
+              <a:ext cx="2539072" cy="282836"/>
+            </a:xfrm>
+            <a:prstGeom prst="rect">
+              <a:avLst/>
+            </a:prstGeom>
+          </p:spPr>
+          <p:style>
+            <a:lnRef idx="2">
+              <a:schemeClr val="accent2"/>
+            </a:lnRef>
+            <a:fillRef idx="1">
+              <a:schemeClr val="lt1"/>
+            </a:fillRef>
+            <a:effectRef idx="0">
+              <a:schemeClr val="accent2"/>
+            </a:effectRef>
+            <a:fontRef idx="minor">
+              <a:schemeClr val="dk1"/>
+            </a:fontRef>
+          </p:style>
+          <p:txBody>
+            <a:bodyPr rtlCol="0" anchor="ctr"/>
+            <a:lstStyle/>
+            <a:p>
+              <a:pPr algn="ctr"/>
+              <a:endParaRPr lang="en-SG" sz="1100" u="sng" dirty="0"/>
+            </a:p>
+          </p:txBody>
+        </p:sp>
+        <p:sp>
+          <p:nvSpPr>
+            <p:cNvPr id="11" name="Rectangle 10">
+              <a:extLst>
+                <a:ext uri="{FF2B5EF4-FFF2-40B4-BE49-F238E27FC236}">
+                  <a16:creationId xmlns:a16="http://schemas.microsoft.com/office/drawing/2014/main" id="{DAC92803-E43F-4F3C-A041-37E8EC73E2A6}"/>
+                </a:ext>
+              </a:extLst>
+            </p:cNvPr>
+            <p:cNvSpPr/>
+            <p:nvPr/>
+          </p:nvSpPr>
+          <p:spPr>
+            <a:xfrm>
+              <a:off x="3556928" y="3254636"/>
+              <a:ext cx="2539072" cy="1088762"/>
+            </a:xfrm>
+            <a:prstGeom prst="rect">
+              <a:avLst/>
+            </a:prstGeom>
+          </p:spPr>
+          <p:style>
+            <a:lnRef idx="2">
+              <a:schemeClr val="accent2"/>
+            </a:lnRef>
+            <a:fillRef idx="1">
+              <a:schemeClr val="lt1"/>
+            </a:fillRef>
+            <a:effectRef idx="0">
+              <a:schemeClr val="accent2"/>
+            </a:effectRef>
+            <a:fontRef idx="minor">
+              <a:schemeClr val="dk1"/>
+            </a:fontRef>
+          </p:style>
+          <p:txBody>
+            <a:bodyPr rtlCol="0" anchor="ctr"/>
+            <a:lstStyle/>
+            <a:p>
+              <a:pPr algn="ctr"/>
+              <a:r>
+                <a:rPr lang="en-SG" sz="1100" dirty="0"/>
+                <a:t>+ </a:t>
+              </a:r>
+              <a:r>
+                <a:rPr lang="en-SG" sz="1100" dirty="0" err="1"/>
+                <a:t>getMyModules</a:t>
+              </a:r>
+              <a:r>
+                <a:rPr lang="en-SG" sz="1100" dirty="0"/>
+                <a:t>(): </a:t>
+              </a:r>
+              <a:r>
+                <a:rPr lang="en-SG" sz="1100" dirty="0" err="1"/>
+                <a:t>ArrayList</a:t>
+              </a:r>
+              <a:r>
+                <a:rPr lang="en-SG" sz="1100" dirty="0"/>
+                <a:t>&lt;</a:t>
+              </a:r>
+              <a:r>
+                <a:rPr lang="en-SG" sz="1100" dirty="0" err="1"/>
+                <a:t>ModuleDetails</a:t>
+              </a:r>
+              <a:r>
+                <a:rPr lang="en-SG" sz="1100" dirty="0"/>
+                <a:t>&gt;</a:t>
+              </a:r>
+            </a:p>
+          </p:txBody>
+        </p:sp>
+      </p:grpSp>
+      <p:grpSp>
+        <p:nvGrpSpPr>
+          <p:cNvPr id="16" name="Group 15">
+            <a:extLst>
+              <a:ext uri="{FF2B5EF4-FFF2-40B4-BE49-F238E27FC236}">
+                <a16:creationId xmlns:a16="http://schemas.microsoft.com/office/drawing/2014/main" id="{0FCD6477-9DF8-4328-9F36-28760E1AAF81}"/>
+              </a:ext>
+            </a:extLst>
+          </p:cNvPr>
+          <p:cNvGrpSpPr/>
+          <p:nvPr/>
+        </p:nvGrpSpPr>
+        <p:grpSpPr>
+          <a:xfrm>
+            <a:off x="5077560" y="2789332"/>
+            <a:ext cx="3581400" cy="1394818"/>
+            <a:chOff x="3556928" y="2514600"/>
+            <a:chExt cx="2539072" cy="1828800"/>
+          </a:xfrm>
+        </p:grpSpPr>
+        <p:sp>
+          <p:nvSpPr>
+            <p:cNvPr id="17" name="Rectangle 16">
+              <a:extLst>
+                <a:ext uri="{FF2B5EF4-FFF2-40B4-BE49-F238E27FC236}">
+                  <a16:creationId xmlns:a16="http://schemas.microsoft.com/office/drawing/2014/main" id="{2469D8E9-95B6-474F-A8AC-FDF0D416331A}"/>
+                </a:ext>
+              </a:extLst>
+            </p:cNvPr>
+            <p:cNvSpPr/>
+            <p:nvPr/>
+          </p:nvSpPr>
+          <p:spPr>
+            <a:xfrm>
+              <a:off x="3556928" y="2514600"/>
+              <a:ext cx="2539072" cy="457200"/>
+            </a:xfrm>
+            <a:prstGeom prst="rect">
+              <a:avLst/>
+            </a:prstGeom>
+          </p:spPr>
+          <p:style>
+            <a:lnRef idx="2">
+              <a:schemeClr val="accent2">
+                <a:shade val="50000"/>
+              </a:schemeClr>
+            </a:lnRef>
+            <a:fillRef idx="1">
+              <a:schemeClr val="accent2"/>
+            </a:fillRef>
+            <a:effectRef idx="0">
+              <a:schemeClr val="accent2"/>
+            </a:effectRef>
+            <a:fontRef idx="minor">
+              <a:schemeClr val="lt1"/>
+            </a:fontRef>
+          </p:style>
+          <p:txBody>
+            <a:bodyPr rtlCol="0" anchor="ctr"/>
+            <a:lstStyle/>
+            <a:p>
+              <a:pPr algn="ctr"/>
+              <a:r>
+                <a:rPr lang="en-SG" sz="1400" dirty="0" err="1"/>
+                <a:t>ModuleSyncer</a:t>
+              </a:r>
+              <a:endParaRPr lang="en-SG" sz="1400" dirty="0"/>
+            </a:p>
+          </p:txBody>
+        </p:sp>
+        <p:sp>
+          <p:nvSpPr>
+            <p:cNvPr id="18" name="Rectangle 17">
+              <a:extLst>
+                <a:ext uri="{FF2B5EF4-FFF2-40B4-BE49-F238E27FC236}">
+                  <a16:creationId xmlns:a16="http://schemas.microsoft.com/office/drawing/2014/main" id="{5418CE76-1DAD-407B-8850-C6C9D20D425E}"/>
+                </a:ext>
+              </a:extLst>
+            </p:cNvPr>
+            <p:cNvSpPr/>
+            <p:nvPr/>
+          </p:nvSpPr>
+          <p:spPr>
+            <a:xfrm>
+              <a:off x="3556928" y="2971800"/>
+              <a:ext cx="2539072" cy="381000"/>
+            </a:xfrm>
+            <a:prstGeom prst="rect">
+              <a:avLst/>
+            </a:prstGeom>
+          </p:spPr>
+          <p:style>
+            <a:lnRef idx="2">
+              <a:schemeClr val="accent2"/>
+            </a:lnRef>
+            <a:fillRef idx="1">
+              <a:schemeClr val="lt1"/>
+            </a:fillRef>
+            <a:effectRef idx="0">
+              <a:schemeClr val="accent2"/>
+            </a:effectRef>
+            <a:fontRef idx="minor">
+              <a:schemeClr val="dk1"/>
+            </a:fontRef>
+          </p:style>
+          <p:txBody>
+            <a:bodyPr rtlCol="0" anchor="ctr"/>
+            <a:lstStyle/>
+            <a:p>
+              <a:pPr algn="ctr"/>
+              <a:endParaRPr lang="en-SG" sz="1100" u="sng" dirty="0"/>
+            </a:p>
+          </p:txBody>
+        </p:sp>
+        <p:sp>
+          <p:nvSpPr>
+            <p:cNvPr id="19" name="Rectangle 18">
+              <a:extLst>
+                <a:ext uri="{FF2B5EF4-FFF2-40B4-BE49-F238E27FC236}">
+                  <a16:creationId xmlns:a16="http://schemas.microsoft.com/office/drawing/2014/main" id="{6F88E672-0B6A-42D3-BC69-7793765E98F2}"/>
+                </a:ext>
+              </a:extLst>
+            </p:cNvPr>
+            <p:cNvSpPr/>
+            <p:nvPr/>
+          </p:nvSpPr>
+          <p:spPr>
+            <a:xfrm>
+              <a:off x="3556928" y="3165566"/>
+              <a:ext cx="2539072" cy="1177834"/>
+            </a:xfrm>
+            <a:prstGeom prst="rect">
+              <a:avLst/>
+            </a:prstGeom>
+          </p:spPr>
+          <p:style>
+            <a:lnRef idx="2">
+              <a:schemeClr val="accent2"/>
+            </a:lnRef>
+            <a:fillRef idx="1">
+              <a:schemeClr val="lt1"/>
+            </a:fillRef>
+            <a:effectRef idx="0">
+              <a:schemeClr val="accent2"/>
+            </a:effectRef>
+            <a:fontRef idx="minor">
+              <a:schemeClr val="dk1"/>
+            </a:fontRef>
+          </p:style>
+          <p:txBody>
+            <a:bodyPr rtlCol="0" anchor="ctr"/>
+            <a:lstStyle/>
+            <a:p>
+              <a:pPr algn="ctr"/>
+              <a:r>
+                <a:rPr lang="en-SG" sz="1100" dirty="0"/>
+                <a:t>+ </a:t>
+              </a:r>
+              <a:r>
+                <a:rPr lang="en-SG" sz="1100" dirty="0" err="1"/>
+                <a:t>ModuleSyncer</a:t>
+              </a:r>
+              <a:r>
+                <a:rPr lang="en-SG" sz="1100" dirty="0"/>
+                <a:t>(</a:t>
+              </a:r>
+              <a:r>
+                <a:rPr lang="en-SG" sz="1100" dirty="0" err="1"/>
+                <a:t>moduleList</a:t>
+              </a:r>
+              <a:r>
+                <a:rPr lang="en-SG" sz="1100" dirty="0"/>
+                <a:t>: </a:t>
+              </a:r>
+              <a:r>
+                <a:rPr lang="en-SG" sz="1100" dirty="0" err="1"/>
+                <a:t>ModuleList</a:t>
+              </a:r>
+              <a:r>
+                <a:rPr lang="en-SG" sz="1100" dirty="0"/>
+                <a:t>, date: String)</a:t>
+              </a:r>
+            </a:p>
+            <a:p>
+              <a:pPr algn="ctr"/>
+              <a:r>
+                <a:rPr lang="en-SG" sz="1100" dirty="0"/>
+                <a:t>+ </a:t>
+              </a:r>
+              <a:r>
+                <a:rPr lang="en-SG" sz="1100" dirty="0" err="1"/>
+                <a:t>getLessonsAndExamsAsEventsOnDate</a:t>
+              </a:r>
+              <a:r>
+                <a:rPr lang="en-SG" sz="1100" dirty="0"/>
+                <a:t>(): </a:t>
+              </a:r>
+              <a:r>
+                <a:rPr lang="en-SG" sz="1100" dirty="0" err="1"/>
+                <a:t>ArrayList</a:t>
+              </a:r>
+              <a:r>
+                <a:rPr lang="en-SG" sz="1100" dirty="0"/>
+                <a:t>&lt;Event&gt;</a:t>
+              </a:r>
+            </a:p>
+            <a:p>
+              <a:pPr marL="171450" indent="-171450" algn="ctr">
+                <a:buFontTx/>
+                <a:buChar char="-"/>
+              </a:pPr>
+              <a:r>
+                <a:rPr lang="en-SG" sz="1100" dirty="0" err="1"/>
+                <a:t>getLessonsOnDate</a:t>
+              </a:r>
+              <a:r>
+                <a:rPr lang="en-SG" sz="1100" dirty="0"/>
+                <a:t>()</a:t>
+              </a:r>
+            </a:p>
+            <a:p>
+              <a:pPr marL="171450" indent="-171450" algn="ctr">
+                <a:buFontTx/>
+                <a:buChar char="-"/>
+              </a:pPr>
+              <a:r>
+                <a:rPr lang="en-SG" sz="1100" dirty="0" err="1"/>
+                <a:t>getExamsOnDate</a:t>
+              </a:r>
+              <a:r>
+                <a:rPr lang="en-SG" sz="1100" dirty="0"/>
+                <a:t>(</a:t>
+              </a:r>
+              <a:r>
+                <a:rPr lang="en-SG" sz="1100" dirty="0" err="1"/>
+                <a:t>moduleList</a:t>
+              </a:r>
+              <a:r>
+                <a:rPr lang="en-SG" sz="1100" dirty="0"/>
+                <a:t>: </a:t>
+              </a:r>
+              <a:r>
+                <a:rPr lang="en-SG" sz="1100" dirty="0" err="1"/>
+                <a:t>ModuleList</a:t>
+              </a:r>
+              <a:r>
+                <a:rPr lang="en-SG" sz="1100" dirty="0"/>
+                <a:t>)</a:t>
+              </a:r>
+            </a:p>
+          </p:txBody>
+        </p:sp>
+      </p:grpSp>
+      <p:grpSp>
+        <p:nvGrpSpPr>
+          <p:cNvPr id="20" name="Group 19">
+            <a:extLst>
+              <a:ext uri="{FF2B5EF4-FFF2-40B4-BE49-F238E27FC236}">
+                <a16:creationId xmlns:a16="http://schemas.microsoft.com/office/drawing/2014/main" id="{AD9B0248-D9C3-4F3F-A186-503971EAA5E9}"/>
+              </a:ext>
+            </a:extLst>
+          </p:cNvPr>
+          <p:cNvGrpSpPr/>
+          <p:nvPr/>
+        </p:nvGrpSpPr>
+        <p:grpSpPr>
+          <a:xfrm>
+            <a:off x="6019800" y="810784"/>
+            <a:ext cx="2209800" cy="792053"/>
+            <a:chOff x="3556928" y="2514600"/>
+            <a:chExt cx="2539072" cy="1828800"/>
+          </a:xfrm>
+        </p:grpSpPr>
+        <p:sp>
+          <p:nvSpPr>
+            <p:cNvPr id="21" name="Rectangle 20">
+              <a:extLst>
+                <a:ext uri="{FF2B5EF4-FFF2-40B4-BE49-F238E27FC236}">
+                  <a16:creationId xmlns:a16="http://schemas.microsoft.com/office/drawing/2014/main" id="{1F04C4F2-C197-488E-BB88-53037BF2686F}"/>
+                </a:ext>
+              </a:extLst>
+            </p:cNvPr>
+            <p:cNvSpPr/>
+            <p:nvPr/>
+          </p:nvSpPr>
+          <p:spPr>
+            <a:xfrm>
+              <a:off x="3556928" y="2514600"/>
+              <a:ext cx="2539072" cy="457200"/>
+            </a:xfrm>
+            <a:prstGeom prst="rect">
+              <a:avLst/>
+            </a:prstGeom>
+            <a:solidFill>
+              <a:schemeClr val="accent6"/>
+            </a:solidFill>
+          </p:spPr>
+          <p:style>
+            <a:lnRef idx="2">
+              <a:schemeClr val="accent2">
+                <a:shade val="50000"/>
+              </a:schemeClr>
+            </a:lnRef>
+            <a:fillRef idx="1">
+              <a:schemeClr val="accent2"/>
+            </a:fillRef>
+            <a:effectRef idx="0">
+              <a:schemeClr val="accent2"/>
+            </a:effectRef>
+            <a:fontRef idx="minor">
+              <a:schemeClr val="lt1"/>
+            </a:fontRef>
+          </p:style>
+          <p:txBody>
+            <a:bodyPr rtlCol="0" anchor="ctr"/>
+            <a:lstStyle/>
+            <a:p>
+              <a:pPr algn="ctr"/>
+              <a:r>
+                <a:rPr lang="en-SG" sz="1400" dirty="0"/>
+                <a:t>Timetable</a:t>
+              </a:r>
+            </a:p>
+          </p:txBody>
+        </p:sp>
+        <p:sp>
+          <p:nvSpPr>
+            <p:cNvPr id="22" name="Rectangle 21">
+              <a:extLst>
+                <a:ext uri="{FF2B5EF4-FFF2-40B4-BE49-F238E27FC236}">
+                  <a16:creationId xmlns:a16="http://schemas.microsoft.com/office/drawing/2014/main" id="{BE2DD9EA-28A4-4277-AB2F-F9E3AAF52227}"/>
+                </a:ext>
+              </a:extLst>
+            </p:cNvPr>
+            <p:cNvSpPr/>
+            <p:nvPr/>
+          </p:nvSpPr>
+          <p:spPr>
+            <a:xfrm>
+              <a:off x="3556928" y="2971799"/>
+              <a:ext cx="2539072" cy="838202"/>
+            </a:xfrm>
+            <a:prstGeom prst="rect">
+              <a:avLst/>
+            </a:prstGeom>
+          </p:spPr>
+          <p:style>
+            <a:lnRef idx="2">
+              <a:schemeClr val="accent2"/>
+            </a:lnRef>
+            <a:fillRef idx="1">
+              <a:schemeClr val="lt1"/>
+            </a:fillRef>
+            <a:effectRef idx="0">
+              <a:schemeClr val="accent2"/>
+            </a:effectRef>
+            <a:fontRef idx="minor">
+              <a:schemeClr val="dk1"/>
+            </a:fontRef>
+          </p:style>
+          <p:txBody>
+            <a:bodyPr rtlCol="0" anchor="ctr"/>
+            <a:lstStyle/>
+            <a:p>
+              <a:pPr algn="ctr"/>
+              <a:r>
+                <a:rPr lang="en-SG" sz="1100" u="sng" dirty="0"/>
+                <a:t>+ </a:t>
+              </a:r>
+              <a:r>
+                <a:rPr lang="en-SG" sz="1100" u="sng" dirty="0" err="1"/>
+                <a:t>lessonStorage</a:t>
+              </a:r>
+              <a:r>
+                <a:rPr lang="en-SG" sz="1100" u="sng" dirty="0"/>
+                <a:t>: </a:t>
+              </a:r>
+              <a:r>
+                <a:rPr lang="en-SG" sz="1100" u="sng" dirty="0" err="1"/>
+                <a:t>ArrayList</a:t>
+              </a:r>
+              <a:r>
+                <a:rPr lang="en-SG" sz="1100" u="sng" dirty="0"/>
+                <a:t>&lt;Lesson&gt;</a:t>
+              </a:r>
+            </a:p>
+          </p:txBody>
+        </p:sp>
+        <p:sp>
+          <p:nvSpPr>
+            <p:cNvPr id="23" name="Rectangle 22">
+              <a:extLst>
+                <a:ext uri="{FF2B5EF4-FFF2-40B4-BE49-F238E27FC236}">
+                  <a16:creationId xmlns:a16="http://schemas.microsoft.com/office/drawing/2014/main" id="{C9099F3C-AD65-41D8-8B7A-63274F9BDDBE}"/>
+                </a:ext>
+              </a:extLst>
+            </p:cNvPr>
+            <p:cNvSpPr/>
+            <p:nvPr/>
+          </p:nvSpPr>
+          <p:spPr>
+            <a:xfrm>
+              <a:off x="3556928" y="3810001"/>
+              <a:ext cx="2539072" cy="533399"/>
+            </a:xfrm>
+            <a:prstGeom prst="rect">
+              <a:avLst/>
+            </a:prstGeom>
+          </p:spPr>
+          <p:style>
+            <a:lnRef idx="2">
+              <a:schemeClr val="accent2"/>
+            </a:lnRef>
+            <a:fillRef idx="1">
+              <a:schemeClr val="lt1"/>
+            </a:fillRef>
+            <a:effectRef idx="0">
+              <a:schemeClr val="accent2"/>
+            </a:effectRef>
+            <a:fontRef idx="minor">
+              <a:schemeClr val="dk1"/>
+            </a:fontRef>
+          </p:style>
+          <p:txBody>
+            <a:bodyPr rtlCol="0" anchor="ctr"/>
+            <a:lstStyle/>
+            <a:p>
+              <a:pPr algn="ctr"/>
+              <a:endParaRPr lang="en-SG" sz="1100" dirty="0"/>
+            </a:p>
+          </p:txBody>
+        </p:sp>
+      </p:grpSp>
+      <p:grpSp>
+        <p:nvGrpSpPr>
+          <p:cNvPr id="24" name="Group 23">
+            <a:extLst>
+              <a:ext uri="{FF2B5EF4-FFF2-40B4-BE49-F238E27FC236}">
+                <a16:creationId xmlns:a16="http://schemas.microsoft.com/office/drawing/2014/main" id="{79FEE6CB-0912-4690-818D-A97DD869D225}"/>
+              </a:ext>
+            </a:extLst>
+          </p:cNvPr>
+          <p:cNvGrpSpPr/>
+          <p:nvPr/>
+        </p:nvGrpSpPr>
+        <p:grpSpPr>
+          <a:xfrm>
+            <a:off x="2594517" y="420084"/>
+            <a:ext cx="2689860" cy="1165470"/>
+            <a:chOff x="3556928" y="2514600"/>
+            <a:chExt cx="2539072" cy="1828800"/>
+          </a:xfrm>
+        </p:grpSpPr>
+        <p:sp>
+          <p:nvSpPr>
+            <p:cNvPr id="25" name="Rectangle 24">
+              <a:extLst>
+                <a:ext uri="{FF2B5EF4-FFF2-40B4-BE49-F238E27FC236}">
+                  <a16:creationId xmlns:a16="http://schemas.microsoft.com/office/drawing/2014/main" id="{6DEEB6D2-655E-4C80-B10A-2EED6A451682}"/>
+                </a:ext>
+              </a:extLst>
+            </p:cNvPr>
+            <p:cNvSpPr/>
+            <p:nvPr/>
+          </p:nvSpPr>
+          <p:spPr>
+            <a:xfrm>
+              <a:off x="3556928" y="2514600"/>
+              <a:ext cx="2539072" cy="457200"/>
+            </a:xfrm>
+            <a:prstGeom prst="rect">
+              <a:avLst/>
+            </a:prstGeom>
+          </p:spPr>
+          <p:style>
+            <a:lnRef idx="2">
+              <a:schemeClr val="accent2">
+                <a:shade val="50000"/>
+              </a:schemeClr>
+            </a:lnRef>
+            <a:fillRef idx="1">
+              <a:schemeClr val="accent2"/>
+            </a:fillRef>
+            <a:effectRef idx="0">
+              <a:schemeClr val="accent2"/>
+            </a:effectRef>
+            <a:fontRef idx="minor">
+              <a:schemeClr val="lt1"/>
+            </a:fontRef>
+          </p:style>
+          <p:txBody>
+            <a:bodyPr rtlCol="0" anchor="ctr"/>
+            <a:lstStyle/>
+            <a:p>
+              <a:pPr algn="ctr"/>
+              <a:r>
+                <a:rPr lang="en-SG" sz="1400" dirty="0" err="1"/>
+                <a:t>ExamsGetter</a:t>
+              </a:r>
+              <a:endParaRPr lang="en-SG" sz="1400" dirty="0"/>
+            </a:p>
+          </p:txBody>
+        </p:sp>
+        <p:sp>
+          <p:nvSpPr>
+            <p:cNvPr id="26" name="Rectangle 25">
+              <a:extLst>
+                <a:ext uri="{FF2B5EF4-FFF2-40B4-BE49-F238E27FC236}">
+                  <a16:creationId xmlns:a16="http://schemas.microsoft.com/office/drawing/2014/main" id="{F643EF8E-329E-4DCE-AAD5-1C3EDE021C87}"/>
+                </a:ext>
+              </a:extLst>
+            </p:cNvPr>
+            <p:cNvSpPr/>
+            <p:nvPr/>
+          </p:nvSpPr>
+          <p:spPr>
+            <a:xfrm>
+              <a:off x="3556928" y="2971800"/>
+              <a:ext cx="2539072" cy="533400"/>
+            </a:xfrm>
+            <a:prstGeom prst="rect">
+              <a:avLst/>
+            </a:prstGeom>
+          </p:spPr>
+          <p:style>
+            <a:lnRef idx="2">
+              <a:schemeClr val="accent2"/>
+            </a:lnRef>
+            <a:fillRef idx="1">
+              <a:schemeClr val="lt1"/>
+            </a:fillRef>
+            <a:effectRef idx="0">
+              <a:schemeClr val="accent2"/>
+            </a:effectRef>
+            <a:fontRef idx="minor">
+              <a:schemeClr val="dk1"/>
+            </a:fontRef>
+          </p:style>
+          <p:txBody>
+            <a:bodyPr rtlCol="0" anchor="ctr"/>
+            <a:lstStyle/>
+            <a:p>
+              <a:pPr marL="171450" indent="-171450" algn="ctr">
+                <a:buFontTx/>
+                <a:buChar char="-"/>
+              </a:pPr>
+              <a:r>
+                <a:rPr lang="en-SG" sz="1100" dirty="0"/>
+                <a:t>exams: </a:t>
+              </a:r>
+              <a:r>
+                <a:rPr lang="en-SG" sz="1100" dirty="0" err="1"/>
+                <a:t>ArrayList</a:t>
+              </a:r>
+              <a:r>
+                <a:rPr lang="en-SG" sz="1100" dirty="0"/>
+                <a:t>&lt;Event&gt;</a:t>
+              </a:r>
+            </a:p>
+          </p:txBody>
+        </p:sp>
+        <p:sp>
+          <p:nvSpPr>
+            <p:cNvPr id="27" name="Rectangle 26">
+              <a:extLst>
+                <a:ext uri="{FF2B5EF4-FFF2-40B4-BE49-F238E27FC236}">
+                  <a16:creationId xmlns:a16="http://schemas.microsoft.com/office/drawing/2014/main" id="{7038E247-AECF-4FA2-885C-103CFC3A72B7}"/>
+                </a:ext>
+              </a:extLst>
+            </p:cNvPr>
+            <p:cNvSpPr/>
+            <p:nvPr/>
+          </p:nvSpPr>
+          <p:spPr>
+            <a:xfrm>
+              <a:off x="3556928" y="3505200"/>
+              <a:ext cx="2539072" cy="838200"/>
+            </a:xfrm>
+            <a:prstGeom prst="rect">
+              <a:avLst/>
+            </a:prstGeom>
+          </p:spPr>
+          <p:style>
+            <a:lnRef idx="2">
+              <a:schemeClr val="accent2"/>
+            </a:lnRef>
+            <a:fillRef idx="1">
+              <a:schemeClr val="lt1"/>
+            </a:fillRef>
+            <a:effectRef idx="0">
+              <a:schemeClr val="accent2"/>
+            </a:effectRef>
+            <a:fontRef idx="minor">
+              <a:schemeClr val="dk1"/>
+            </a:fontRef>
+          </p:style>
+          <p:txBody>
+            <a:bodyPr rtlCol="0" anchor="ctr"/>
+            <a:lstStyle/>
+            <a:p>
+              <a:pPr algn="ctr"/>
+              <a:r>
+                <a:rPr lang="en-SG" sz="1100" dirty="0"/>
+                <a:t>+ </a:t>
+              </a:r>
+              <a:r>
+                <a:rPr lang="en-SG" sz="1100" dirty="0" err="1"/>
+                <a:t>ExamsGetter</a:t>
+              </a:r>
+              <a:r>
+                <a:rPr lang="en-SG" sz="1100" dirty="0"/>
+                <a:t>(</a:t>
+              </a:r>
+              <a:r>
+                <a:rPr lang="en-SG" sz="1100" dirty="0" err="1"/>
+                <a:t>moduleList</a:t>
+              </a:r>
+              <a:r>
+                <a:rPr lang="en-SG" sz="1100" dirty="0"/>
+                <a:t>: </a:t>
+              </a:r>
+              <a:r>
+                <a:rPr lang="en-SG" sz="1100" dirty="0" err="1"/>
+                <a:t>ModuleList</a:t>
+              </a:r>
+              <a:r>
+                <a:rPr lang="en-SG" sz="1100" dirty="0"/>
+                <a:t>)</a:t>
+              </a:r>
+            </a:p>
+            <a:p>
+              <a:pPr marL="171450" indent="-171450" algn="ctr">
+                <a:buFontTx/>
+                <a:buChar char="-"/>
+              </a:pPr>
+              <a:r>
+                <a:rPr lang="en-SG" sz="1100" dirty="0" err="1"/>
+                <a:t>retrieveModuleExams</a:t>
+              </a:r>
+              <a:r>
+                <a:rPr lang="en-SG" sz="1100" dirty="0"/>
+                <a:t>(): void</a:t>
+              </a:r>
+            </a:p>
+            <a:p>
+              <a:pPr algn="ctr"/>
+              <a:r>
+                <a:rPr lang="en-SG" sz="1100" dirty="0"/>
+                <a:t>+ </a:t>
+              </a:r>
+              <a:r>
+                <a:rPr lang="en-SG" sz="1100" dirty="0" err="1"/>
+                <a:t>getExams</a:t>
+              </a:r>
+              <a:r>
+                <a:rPr lang="en-SG" sz="1100" dirty="0"/>
+                <a:t>(): </a:t>
+              </a:r>
+              <a:r>
+                <a:rPr lang="en-SG" sz="1100" dirty="0" err="1"/>
+                <a:t>ArrayList</a:t>
+              </a:r>
+              <a:r>
+                <a:rPr lang="en-SG" sz="1100" dirty="0"/>
+                <a:t>&lt;Event&gt;</a:t>
+              </a:r>
+            </a:p>
+          </p:txBody>
+        </p:sp>
+      </p:grpSp>
+      <p:cxnSp>
+        <p:nvCxnSpPr>
+          <p:cNvPr id="29" name="Straight Arrow Connector 28">
+            <a:extLst>
+              <a:ext uri="{FF2B5EF4-FFF2-40B4-BE49-F238E27FC236}">
+                <a16:creationId xmlns:a16="http://schemas.microsoft.com/office/drawing/2014/main" id="{7CB79E48-01EE-4DE1-8AC6-7E194610D2B5}"/>
+              </a:ext>
+            </a:extLst>
+          </p:cNvPr>
+          <p:cNvCxnSpPr>
+            <a:cxnSpLocks/>
+            <a:stCxn id="3" idx="1"/>
+            <a:endCxn id="11" idx="2"/>
+          </p:cNvCxnSpPr>
+          <p:nvPr/>
+        </p:nvCxnSpPr>
+        <p:spPr>
+          <a:xfrm flipH="1" flipV="1">
+            <a:off x="1384200" y="3850105"/>
+            <a:ext cx="1444090" cy="1663870"/>
+          </a:xfrm>
+          <a:prstGeom prst="straightConnector1">
+            <a:avLst/>
+          </a:prstGeom>
+          <a:ln>
+            <a:tailEnd type="triangle"/>
+          </a:ln>
+        </p:spPr>
+        <p:style>
+          <a:lnRef idx="1">
+            <a:schemeClr val="dk1"/>
+          </a:lnRef>
+          <a:fillRef idx="0">
+            <a:schemeClr val="dk1"/>
+          </a:fillRef>
+          <a:effectRef idx="0">
+            <a:schemeClr val="dk1"/>
+          </a:effectRef>
+          <a:fontRef idx="minor">
+            <a:schemeClr val="tx1"/>
+          </a:fontRef>
+        </p:style>
+      </p:cxnSp>
+      <p:grpSp>
+        <p:nvGrpSpPr>
+          <p:cNvPr id="39" name="Group 38">
+            <a:extLst>
+              <a:ext uri="{FF2B5EF4-FFF2-40B4-BE49-F238E27FC236}">
+                <a16:creationId xmlns:a16="http://schemas.microsoft.com/office/drawing/2014/main" id="{122BD7FB-7D96-4CEA-BDC3-4E0CEFCE6774}"/>
+              </a:ext>
+            </a:extLst>
+          </p:cNvPr>
+          <p:cNvGrpSpPr/>
+          <p:nvPr/>
+        </p:nvGrpSpPr>
+        <p:grpSpPr>
+          <a:xfrm rot="21319929">
+            <a:off x="2257405" y="3294798"/>
+            <a:ext cx="2823249" cy="207237"/>
+            <a:chOff x="2406400" y="1168669"/>
+            <a:chExt cx="2479021" cy="184647"/>
+          </a:xfrm>
+        </p:grpSpPr>
+        <p:cxnSp>
+          <p:nvCxnSpPr>
+            <p:cNvPr id="35" name="Straight Arrow Connector 34">
+              <a:extLst>
+                <a:ext uri="{FF2B5EF4-FFF2-40B4-BE49-F238E27FC236}">
+                  <a16:creationId xmlns:a16="http://schemas.microsoft.com/office/drawing/2014/main" id="{DE0D3AC9-FD2A-4778-9489-9F652BBA6D96}"/>
+                </a:ext>
+              </a:extLst>
+            </p:cNvPr>
+            <p:cNvCxnSpPr>
+              <a:cxnSpLocks/>
+            </p:cNvCxnSpPr>
+            <p:nvPr/>
+          </p:nvCxnSpPr>
+          <p:spPr>
+            <a:xfrm rot="343553" flipH="1">
+              <a:off x="2413320" y="1349141"/>
+              <a:ext cx="2472101" cy="4175"/>
+            </a:xfrm>
+            <a:prstGeom prst="straightConnector1">
+              <a:avLst/>
+            </a:prstGeom>
+            <a:ln w="9525" cap="flat" cmpd="sng" algn="ctr">
+              <a:solidFill>
+                <a:schemeClr val="tx1"/>
+              </a:solidFill>
+              <a:prstDash val="dash"/>
+              <a:round/>
+              <a:headEnd type="none" w="med" len="med"/>
+              <a:tailEnd type="none" w="med" len="med"/>
+            </a:ln>
+          </p:spPr>
+          <p:style>
+            <a:lnRef idx="0">
+              <a:scrgbClr r="0" g="0" b="0"/>
+            </a:lnRef>
+            <a:fillRef idx="0">
+              <a:scrgbClr r="0" g="0" b="0"/>
+            </a:fillRef>
+            <a:effectRef idx="0">
+              <a:scrgbClr r="0" g="0" b="0"/>
+            </a:effectRef>
+            <a:fontRef idx="minor">
+              <a:schemeClr val="tx1"/>
+            </a:fontRef>
+          </p:style>
+        </p:cxnSp>
+        <p:cxnSp>
+          <p:nvCxnSpPr>
+            <p:cNvPr id="36" name="Straight Connector 35">
+              <a:extLst>
+                <a:ext uri="{FF2B5EF4-FFF2-40B4-BE49-F238E27FC236}">
+                  <a16:creationId xmlns:a16="http://schemas.microsoft.com/office/drawing/2014/main" id="{F9BBCD1F-593F-4602-A7C8-696B2DEA0A5F}"/>
+                </a:ext>
+              </a:extLst>
+            </p:cNvPr>
+            <p:cNvCxnSpPr>
+              <a:cxnSpLocks/>
+            </p:cNvCxnSpPr>
+            <p:nvPr/>
+          </p:nvCxnSpPr>
+          <p:spPr>
+            <a:xfrm rot="343553" flipV="1">
+              <a:off x="2410527" y="1168669"/>
+              <a:ext cx="119712" cy="68524"/>
+            </a:xfrm>
+            <a:prstGeom prst="line">
+              <a:avLst/>
+            </a:prstGeom>
+            <a:ln>
+              <a:solidFill>
+                <a:schemeClr val="tx1"/>
+              </a:solidFill>
+            </a:ln>
+          </p:spPr>
+          <p:style>
+            <a:lnRef idx="1">
+              <a:schemeClr val="accent1"/>
+            </a:lnRef>
+            <a:fillRef idx="0">
+              <a:schemeClr val="accent1"/>
+            </a:fillRef>
+            <a:effectRef idx="0">
+              <a:schemeClr val="accent1"/>
+            </a:effectRef>
+            <a:fontRef idx="minor">
+              <a:schemeClr val="tx1"/>
+            </a:fontRef>
+          </p:style>
+        </p:cxnSp>
+        <p:cxnSp>
+          <p:nvCxnSpPr>
+            <p:cNvPr id="37" name="Straight Connector 36">
+              <a:extLst>
+                <a:ext uri="{FF2B5EF4-FFF2-40B4-BE49-F238E27FC236}">
+                  <a16:creationId xmlns:a16="http://schemas.microsoft.com/office/drawing/2014/main" id="{D24B6758-6841-46AE-B37D-535C157C01C3}"/>
+                </a:ext>
+              </a:extLst>
+            </p:cNvPr>
+            <p:cNvCxnSpPr>
+              <a:cxnSpLocks/>
+            </p:cNvCxnSpPr>
+            <p:nvPr/>
+          </p:nvCxnSpPr>
+          <p:spPr>
+            <a:xfrm rot="343553">
+              <a:off x="2406400" y="1237121"/>
+              <a:ext cx="119530" cy="71230"/>
+            </a:xfrm>
+            <a:prstGeom prst="line">
+              <a:avLst/>
+            </a:prstGeom>
+            <a:ln>
+              <a:solidFill>
+                <a:schemeClr val="tx1"/>
+              </a:solidFill>
+            </a:ln>
+          </p:spPr>
+          <p:style>
+            <a:lnRef idx="1">
+              <a:schemeClr val="accent1"/>
+            </a:lnRef>
+            <a:fillRef idx="0">
+              <a:schemeClr val="accent1"/>
+            </a:fillRef>
+            <a:effectRef idx="0">
+              <a:schemeClr val="accent1"/>
+            </a:effectRef>
+            <a:fontRef idx="minor">
+              <a:schemeClr val="tx1"/>
+            </a:fontRef>
+          </p:style>
+        </p:cxnSp>
+      </p:grpSp>
+      <p:cxnSp>
+        <p:nvCxnSpPr>
+          <p:cNvPr id="40" name="Straight Arrow Connector 39">
+            <a:extLst>
+              <a:ext uri="{FF2B5EF4-FFF2-40B4-BE49-F238E27FC236}">
+                <a16:creationId xmlns:a16="http://schemas.microsoft.com/office/drawing/2014/main" id="{FBBEA516-997F-4E04-A2EE-217DCC132559}"/>
+              </a:ext>
+            </a:extLst>
+          </p:cNvPr>
+          <p:cNvCxnSpPr>
+            <a:cxnSpLocks/>
+            <a:stCxn id="27" idx="1"/>
+            <a:endCxn id="9" idx="0"/>
+          </p:cNvCxnSpPr>
+          <p:nvPr/>
+        </p:nvCxnSpPr>
+        <p:spPr>
+          <a:xfrm flipH="1">
+            <a:off x="1384200" y="1318467"/>
+            <a:ext cx="1210317" cy="1688676"/>
+          </a:xfrm>
+          <a:prstGeom prst="straightConnector1">
+            <a:avLst/>
+          </a:prstGeom>
+          <a:ln>
+            <a:tailEnd type="triangle"/>
+          </a:ln>
+        </p:spPr>
+        <p:style>
+          <a:lnRef idx="1">
+            <a:schemeClr val="dk1"/>
+          </a:lnRef>
+          <a:fillRef idx="0">
+            <a:schemeClr val="dk1"/>
+          </a:fillRef>
+          <a:effectRef idx="0">
+            <a:schemeClr val="dk1"/>
+          </a:effectRef>
+          <a:fontRef idx="minor">
+            <a:schemeClr val="tx1"/>
+          </a:fontRef>
+        </p:style>
+      </p:cxnSp>
+      <p:grpSp>
+        <p:nvGrpSpPr>
+          <p:cNvPr id="72" name="Group 71">
+            <a:extLst>
+              <a:ext uri="{FF2B5EF4-FFF2-40B4-BE49-F238E27FC236}">
+                <a16:creationId xmlns:a16="http://schemas.microsoft.com/office/drawing/2014/main" id="{8C3AEEA1-3308-4ECE-81F1-6591E73CA242}"/>
+              </a:ext>
+            </a:extLst>
+          </p:cNvPr>
+          <p:cNvGrpSpPr/>
+          <p:nvPr/>
+        </p:nvGrpSpPr>
+        <p:grpSpPr>
+          <a:xfrm>
+            <a:off x="6934200" y="1622352"/>
+            <a:ext cx="329617" cy="1173992"/>
+            <a:chOff x="6934200" y="1622352"/>
+            <a:chExt cx="329617" cy="1173992"/>
+          </a:xfrm>
+        </p:grpSpPr>
+        <p:cxnSp>
+          <p:nvCxnSpPr>
+            <p:cNvPr id="62" name="Straight Arrow Connector 61">
+              <a:extLst>
+                <a:ext uri="{FF2B5EF4-FFF2-40B4-BE49-F238E27FC236}">
+                  <a16:creationId xmlns:a16="http://schemas.microsoft.com/office/drawing/2014/main" id="{ABB3DD21-F326-4FAE-81B4-C62A8C5F204A}"/>
+                </a:ext>
+              </a:extLst>
+            </p:cNvPr>
+            <p:cNvCxnSpPr>
+              <a:cxnSpLocks/>
+            </p:cNvCxnSpPr>
+            <p:nvPr/>
+          </p:nvCxnSpPr>
+          <p:spPr>
+            <a:xfrm flipH="1" flipV="1">
+              <a:off x="7100446" y="1625590"/>
+              <a:ext cx="16472" cy="1170754"/>
+            </a:xfrm>
+            <a:prstGeom prst="straightConnector1">
+              <a:avLst/>
+            </a:prstGeom>
+            <a:ln w="9525" cap="flat" cmpd="sng" algn="ctr">
+              <a:solidFill>
+                <a:schemeClr val="tx1"/>
+              </a:solidFill>
+              <a:prstDash val="dash"/>
+              <a:round/>
+              <a:headEnd type="none" w="med" len="med"/>
+              <a:tailEnd type="none" w="med" len="med"/>
+            </a:ln>
+          </p:spPr>
+          <p:style>
+            <a:lnRef idx="0">
+              <a:scrgbClr r="0" g="0" b="0"/>
+            </a:lnRef>
+            <a:fillRef idx="0">
+              <a:scrgbClr r="0" g="0" b="0"/>
+            </a:fillRef>
+            <a:effectRef idx="0">
+              <a:scrgbClr r="0" g="0" b="0"/>
+            </a:effectRef>
+            <a:fontRef idx="minor">
+              <a:schemeClr val="tx1"/>
+            </a:fontRef>
+          </p:style>
+        </p:cxnSp>
+        <p:cxnSp>
+          <p:nvCxnSpPr>
+            <p:cNvPr id="63" name="Straight Connector 62">
+              <a:extLst>
+                <a:ext uri="{FF2B5EF4-FFF2-40B4-BE49-F238E27FC236}">
+                  <a16:creationId xmlns:a16="http://schemas.microsoft.com/office/drawing/2014/main" id="{D4895E5D-5D73-457D-B71C-52863B55AC03}"/>
+                </a:ext>
+              </a:extLst>
+            </p:cNvPr>
+            <p:cNvCxnSpPr>
+              <a:cxnSpLocks/>
+            </p:cNvCxnSpPr>
+            <p:nvPr/>
+          </p:nvCxnSpPr>
+          <p:spPr>
+            <a:xfrm>
+              <a:off x="7100446" y="1622352"/>
+              <a:ext cx="163371" cy="189798"/>
+            </a:xfrm>
+            <a:prstGeom prst="line">
+              <a:avLst/>
+            </a:prstGeom>
+            <a:ln>
+              <a:solidFill>
+                <a:schemeClr val="tx1"/>
+              </a:solidFill>
+            </a:ln>
+          </p:spPr>
+          <p:style>
+            <a:lnRef idx="1">
+              <a:schemeClr val="accent1"/>
+            </a:lnRef>
+            <a:fillRef idx="0">
+              <a:schemeClr val="accent1"/>
+            </a:fillRef>
+            <a:effectRef idx="0">
+              <a:schemeClr val="accent1"/>
+            </a:effectRef>
+            <a:fontRef idx="minor">
+              <a:schemeClr val="tx1"/>
+            </a:fontRef>
+          </p:style>
+        </p:cxnSp>
+        <p:cxnSp>
+          <p:nvCxnSpPr>
+            <p:cNvPr id="64" name="Straight Connector 63">
+              <a:extLst>
+                <a:ext uri="{FF2B5EF4-FFF2-40B4-BE49-F238E27FC236}">
+                  <a16:creationId xmlns:a16="http://schemas.microsoft.com/office/drawing/2014/main" id="{CC05A7B2-7E59-4855-82F7-19632891E5F4}"/>
+                </a:ext>
+              </a:extLst>
+            </p:cNvPr>
+            <p:cNvCxnSpPr>
+              <a:cxnSpLocks/>
+            </p:cNvCxnSpPr>
+            <p:nvPr/>
+          </p:nvCxnSpPr>
+          <p:spPr>
+            <a:xfrm flipH="1">
+              <a:off x="6934200" y="1625634"/>
+              <a:ext cx="166246" cy="182578"/>
+            </a:xfrm>
+            <a:prstGeom prst="line">
+              <a:avLst/>
+            </a:prstGeom>
+            <a:ln>
+              <a:solidFill>
+                <a:schemeClr val="tx1"/>
+              </a:solidFill>
+            </a:ln>
+          </p:spPr>
+          <p:style>
+            <a:lnRef idx="1">
+              <a:schemeClr val="accent1"/>
+            </a:lnRef>
+            <a:fillRef idx="0">
+              <a:schemeClr val="accent1"/>
+            </a:fillRef>
+            <a:effectRef idx="0">
+              <a:schemeClr val="accent1"/>
+            </a:effectRef>
+            <a:fontRef idx="minor">
+              <a:schemeClr val="tx1"/>
+            </a:fontRef>
+          </p:style>
+        </p:cxnSp>
+      </p:grpSp>
+      <p:grpSp>
+        <p:nvGrpSpPr>
+          <p:cNvPr id="73" name="Group 72">
+            <a:extLst>
+              <a:ext uri="{FF2B5EF4-FFF2-40B4-BE49-F238E27FC236}">
+                <a16:creationId xmlns:a16="http://schemas.microsoft.com/office/drawing/2014/main" id="{2268CD02-C844-4221-B0F3-625EC7AAD9DD}"/>
+              </a:ext>
+            </a:extLst>
+          </p:cNvPr>
+          <p:cNvGrpSpPr/>
+          <p:nvPr/>
+        </p:nvGrpSpPr>
+        <p:grpSpPr>
+          <a:xfrm rot="2100429">
+            <a:off x="3990359" y="2067996"/>
+            <a:ext cx="1784589" cy="134480"/>
+            <a:chOff x="2406400" y="1168669"/>
+            <a:chExt cx="2479021" cy="184647"/>
+          </a:xfrm>
+        </p:grpSpPr>
+        <p:cxnSp>
+          <p:nvCxnSpPr>
+            <p:cNvPr id="74" name="Straight Arrow Connector 73">
+              <a:extLst>
+                <a:ext uri="{FF2B5EF4-FFF2-40B4-BE49-F238E27FC236}">
+                  <a16:creationId xmlns:a16="http://schemas.microsoft.com/office/drawing/2014/main" id="{18598095-8AF8-4974-B8FA-1BDD444BD72F}"/>
+                </a:ext>
+              </a:extLst>
+            </p:cNvPr>
+            <p:cNvCxnSpPr>
+              <a:cxnSpLocks/>
+            </p:cNvCxnSpPr>
+            <p:nvPr/>
+          </p:nvCxnSpPr>
+          <p:spPr>
+            <a:xfrm rot="343553" flipH="1">
+              <a:off x="2413320" y="1349141"/>
+              <a:ext cx="2472101" cy="4175"/>
+            </a:xfrm>
+            <a:prstGeom prst="straightConnector1">
+              <a:avLst/>
+            </a:prstGeom>
+            <a:ln w="9525" cap="flat" cmpd="sng" algn="ctr">
+              <a:solidFill>
+                <a:schemeClr val="tx1"/>
+              </a:solidFill>
+              <a:prstDash val="dash"/>
+              <a:round/>
+              <a:headEnd type="none" w="med" len="med"/>
+              <a:tailEnd type="none" w="med" len="med"/>
+            </a:ln>
+          </p:spPr>
+          <p:style>
+            <a:lnRef idx="0">
+              <a:scrgbClr r="0" g="0" b="0"/>
+            </a:lnRef>
+            <a:fillRef idx="0">
+              <a:scrgbClr r="0" g="0" b="0"/>
+            </a:fillRef>
+            <a:effectRef idx="0">
+              <a:scrgbClr r="0" g="0" b="0"/>
+            </a:effectRef>
+            <a:fontRef idx="minor">
+              <a:schemeClr val="tx1"/>
+            </a:fontRef>
+          </p:style>
+        </p:cxnSp>
+        <p:cxnSp>
+          <p:nvCxnSpPr>
+            <p:cNvPr id="75" name="Straight Connector 74">
+              <a:extLst>
+                <a:ext uri="{FF2B5EF4-FFF2-40B4-BE49-F238E27FC236}">
+                  <a16:creationId xmlns:a16="http://schemas.microsoft.com/office/drawing/2014/main" id="{79F6E70F-705D-4726-B9F0-4F9CEC28C3B9}"/>
+                </a:ext>
+              </a:extLst>
+            </p:cNvPr>
+            <p:cNvCxnSpPr>
+              <a:cxnSpLocks/>
+            </p:cNvCxnSpPr>
+            <p:nvPr/>
+          </p:nvCxnSpPr>
+          <p:spPr>
+            <a:xfrm rot="343553" flipV="1">
+              <a:off x="2410527" y="1168669"/>
+              <a:ext cx="119712" cy="68524"/>
+            </a:xfrm>
+            <a:prstGeom prst="line">
+              <a:avLst/>
+            </a:prstGeom>
+            <a:ln>
+              <a:solidFill>
+                <a:schemeClr val="tx1"/>
+              </a:solidFill>
+            </a:ln>
+          </p:spPr>
+          <p:style>
+            <a:lnRef idx="1">
+              <a:schemeClr val="accent1"/>
+            </a:lnRef>
+            <a:fillRef idx="0">
+              <a:schemeClr val="accent1"/>
+            </a:fillRef>
+            <a:effectRef idx="0">
+              <a:schemeClr val="accent1"/>
+            </a:effectRef>
+            <a:fontRef idx="minor">
+              <a:schemeClr val="tx1"/>
+            </a:fontRef>
+          </p:style>
+        </p:cxnSp>
+        <p:cxnSp>
+          <p:nvCxnSpPr>
+            <p:cNvPr id="76" name="Straight Connector 75">
+              <a:extLst>
+                <a:ext uri="{FF2B5EF4-FFF2-40B4-BE49-F238E27FC236}">
+                  <a16:creationId xmlns:a16="http://schemas.microsoft.com/office/drawing/2014/main" id="{48ED79CD-7AC5-4A14-AD6B-B45028F3FC9F}"/>
+                </a:ext>
+              </a:extLst>
+            </p:cNvPr>
+            <p:cNvCxnSpPr>
+              <a:cxnSpLocks/>
+            </p:cNvCxnSpPr>
+            <p:nvPr/>
+          </p:nvCxnSpPr>
+          <p:spPr>
+            <a:xfrm rot="343553">
+              <a:off x="2406400" y="1237121"/>
+              <a:ext cx="119530" cy="71230"/>
+            </a:xfrm>
+            <a:prstGeom prst="line">
+              <a:avLst/>
+            </a:prstGeom>
+            <a:ln>
+              <a:solidFill>
+                <a:schemeClr val="tx1"/>
+              </a:solidFill>
+            </a:ln>
+          </p:spPr>
+          <p:style>
+            <a:lnRef idx="1">
+              <a:schemeClr val="accent1"/>
+            </a:lnRef>
+            <a:fillRef idx="0">
+              <a:schemeClr val="accent1"/>
+            </a:fillRef>
+            <a:effectRef idx="0">
+              <a:schemeClr val="accent1"/>
+            </a:effectRef>
+            <a:fontRef idx="minor">
+              <a:schemeClr val="tx1"/>
+            </a:fontRef>
+          </p:style>
+        </p:cxnSp>
+      </p:grpSp>
+      <p:grpSp>
+        <p:nvGrpSpPr>
+          <p:cNvPr id="77" name="Group 76">
+            <a:extLst>
+              <a:ext uri="{FF2B5EF4-FFF2-40B4-BE49-F238E27FC236}">
+                <a16:creationId xmlns:a16="http://schemas.microsoft.com/office/drawing/2014/main" id="{7A3DC51C-F3E0-4C7C-9A54-AD9BF871EF40}"/>
+              </a:ext>
+            </a:extLst>
+          </p:cNvPr>
+          <p:cNvGrpSpPr/>
+          <p:nvPr/>
+        </p:nvGrpSpPr>
+        <p:grpSpPr>
+          <a:xfrm rot="6992883">
+            <a:off x="5757428" y="4915334"/>
+            <a:ext cx="1784589" cy="134480"/>
+            <a:chOff x="2406400" y="1168669"/>
+            <a:chExt cx="2479021" cy="184647"/>
+          </a:xfrm>
+        </p:grpSpPr>
+        <p:cxnSp>
+          <p:nvCxnSpPr>
+            <p:cNvPr id="78" name="Straight Arrow Connector 77">
+              <a:extLst>
+                <a:ext uri="{FF2B5EF4-FFF2-40B4-BE49-F238E27FC236}">
+                  <a16:creationId xmlns:a16="http://schemas.microsoft.com/office/drawing/2014/main" id="{27FE3B18-DF7C-42C0-B82A-3D34DDBFDE3E}"/>
+                </a:ext>
+              </a:extLst>
+            </p:cNvPr>
+            <p:cNvCxnSpPr>
+              <a:cxnSpLocks/>
+            </p:cNvCxnSpPr>
+            <p:nvPr/>
+          </p:nvCxnSpPr>
+          <p:spPr>
+            <a:xfrm rot="343553" flipH="1">
+              <a:off x="2413320" y="1349141"/>
+              <a:ext cx="2472101" cy="4175"/>
+            </a:xfrm>
+            <a:prstGeom prst="straightConnector1">
+              <a:avLst/>
+            </a:prstGeom>
+            <a:ln w="9525" cap="flat" cmpd="sng" algn="ctr">
+              <a:solidFill>
+                <a:schemeClr val="tx1"/>
+              </a:solidFill>
+              <a:prstDash val="dash"/>
+              <a:round/>
+              <a:headEnd type="none" w="med" len="med"/>
+              <a:tailEnd type="none" w="med" len="med"/>
+            </a:ln>
+          </p:spPr>
+          <p:style>
+            <a:lnRef idx="0">
+              <a:scrgbClr r="0" g="0" b="0"/>
+            </a:lnRef>
+            <a:fillRef idx="0">
+              <a:scrgbClr r="0" g="0" b="0"/>
+            </a:fillRef>
+            <a:effectRef idx="0">
+              <a:scrgbClr r="0" g="0" b="0"/>
+            </a:effectRef>
+            <a:fontRef idx="minor">
+              <a:schemeClr val="tx1"/>
+            </a:fontRef>
+          </p:style>
+        </p:cxnSp>
+        <p:cxnSp>
+          <p:nvCxnSpPr>
+            <p:cNvPr id="79" name="Straight Connector 78">
+              <a:extLst>
+                <a:ext uri="{FF2B5EF4-FFF2-40B4-BE49-F238E27FC236}">
+                  <a16:creationId xmlns:a16="http://schemas.microsoft.com/office/drawing/2014/main" id="{C080DE55-EDBE-41A6-89AD-2BD885C328F3}"/>
+                </a:ext>
+              </a:extLst>
+            </p:cNvPr>
+            <p:cNvCxnSpPr>
+              <a:cxnSpLocks/>
+            </p:cNvCxnSpPr>
+            <p:nvPr/>
+          </p:nvCxnSpPr>
+          <p:spPr>
+            <a:xfrm rot="343553" flipV="1">
+              <a:off x="2410527" y="1168669"/>
+              <a:ext cx="119712" cy="68524"/>
+            </a:xfrm>
+            <a:prstGeom prst="line">
+              <a:avLst/>
+            </a:prstGeom>
+            <a:ln>
+              <a:solidFill>
+                <a:schemeClr val="tx1"/>
+              </a:solidFill>
+            </a:ln>
+          </p:spPr>
+          <p:style>
+            <a:lnRef idx="1">
+              <a:schemeClr val="accent1"/>
+            </a:lnRef>
+            <a:fillRef idx="0">
+              <a:schemeClr val="accent1"/>
+            </a:fillRef>
+            <a:effectRef idx="0">
+              <a:schemeClr val="accent1"/>
+            </a:effectRef>
+            <a:fontRef idx="minor">
+              <a:schemeClr val="tx1"/>
+            </a:fontRef>
+          </p:style>
+        </p:cxnSp>
+        <p:cxnSp>
+          <p:nvCxnSpPr>
+            <p:cNvPr id="80" name="Straight Connector 79">
+              <a:extLst>
+                <a:ext uri="{FF2B5EF4-FFF2-40B4-BE49-F238E27FC236}">
+                  <a16:creationId xmlns:a16="http://schemas.microsoft.com/office/drawing/2014/main" id="{C849D160-5736-456F-852D-95DC4FDA6B3B}"/>
+                </a:ext>
+              </a:extLst>
+            </p:cNvPr>
+            <p:cNvCxnSpPr>
+              <a:cxnSpLocks/>
+            </p:cNvCxnSpPr>
+            <p:nvPr/>
+          </p:nvCxnSpPr>
+          <p:spPr>
+            <a:xfrm rot="343553">
+              <a:off x="2406400" y="1237121"/>
+              <a:ext cx="119530" cy="71230"/>
+            </a:xfrm>
+            <a:prstGeom prst="line">
+              <a:avLst/>
+            </a:prstGeom>
+            <a:ln>
+              <a:solidFill>
+                <a:schemeClr val="tx1"/>
+              </a:solidFill>
+            </a:ln>
+          </p:spPr>
+          <p:style>
+            <a:lnRef idx="1">
+              <a:schemeClr val="accent1"/>
+            </a:lnRef>
+            <a:fillRef idx="0">
+              <a:schemeClr val="accent1"/>
+            </a:fillRef>
+            <a:effectRef idx="0">
+              <a:schemeClr val="accent1"/>
+            </a:effectRef>
+            <a:fontRef idx="minor">
+              <a:schemeClr val="tx1"/>
+            </a:fontRef>
+          </p:style>
+        </p:cxnSp>
+      </p:grpSp>
+      <p:sp>
+        <p:nvSpPr>
+          <p:cNvPr id="81" name="TextBox 80">
+            <a:extLst>
+              <a:ext uri="{FF2B5EF4-FFF2-40B4-BE49-F238E27FC236}">
+                <a16:creationId xmlns:a16="http://schemas.microsoft.com/office/drawing/2014/main" id="{C0ED6350-5ABE-4010-B7C4-0854C2E0E5F5}"/>
+              </a:ext>
+            </a:extLst>
+          </p:cNvPr>
+          <p:cNvSpPr txBox="1"/>
+          <p:nvPr/>
+        </p:nvSpPr>
+        <p:spPr>
+          <a:xfrm rot="2955254">
+            <a:off x="1251691" y="4094978"/>
+            <a:ext cx="641669" cy="246221"/>
+          </a:xfrm>
+          <a:prstGeom prst="rect">
+            <a:avLst/>
+          </a:prstGeom>
+          <a:noFill/>
+        </p:spPr>
+        <p:txBody>
+          <a:bodyPr wrap="square" rtlCol="0">
+            <a:spAutoFit/>
+          </a:bodyPr>
+          <a:lstStyle/>
+          <a:p>
+            <a:r>
+              <a:rPr lang="en-US" sz="1000" dirty="0"/>
+              <a:t>0 .. 1</a:t>
+            </a:r>
+          </a:p>
+        </p:txBody>
+      </p:sp>
+      <p:sp>
+        <p:nvSpPr>
+          <p:cNvPr id="82" name="TextBox 81">
+            <a:extLst>
+              <a:ext uri="{FF2B5EF4-FFF2-40B4-BE49-F238E27FC236}">
+                <a16:creationId xmlns:a16="http://schemas.microsoft.com/office/drawing/2014/main" id="{583D5F98-A1A9-4018-8722-64CEB269D657}"/>
+              </a:ext>
+            </a:extLst>
+          </p:cNvPr>
+          <p:cNvSpPr txBox="1"/>
+          <p:nvPr/>
+        </p:nvSpPr>
+        <p:spPr>
+          <a:xfrm rot="2903372">
+            <a:off x="1409851" y="4014987"/>
+            <a:ext cx="816494" cy="246221"/>
+          </a:xfrm>
+          <a:prstGeom prst="rect">
+            <a:avLst/>
+          </a:prstGeom>
+          <a:noFill/>
+        </p:spPr>
+        <p:txBody>
+          <a:bodyPr wrap="square" rtlCol="0">
+            <a:spAutoFit/>
+          </a:bodyPr>
+          <a:lstStyle/>
+          <a:p>
+            <a:r>
+              <a:rPr lang="en-US" sz="1000" dirty="0" err="1"/>
+              <a:t>moduleList</a:t>
+            </a:r>
+            <a:endParaRPr lang="en-US" sz="1000" dirty="0"/>
+          </a:p>
+        </p:txBody>
+      </p:sp>
+      <p:sp>
+        <p:nvSpPr>
+          <p:cNvPr id="83" name="TextBox 82">
+            <a:extLst>
+              <a:ext uri="{FF2B5EF4-FFF2-40B4-BE49-F238E27FC236}">
+                <a16:creationId xmlns:a16="http://schemas.microsoft.com/office/drawing/2014/main" id="{0431F021-D5F4-4BF1-A170-CF46A56DC3C8}"/>
+              </a:ext>
+            </a:extLst>
+          </p:cNvPr>
+          <p:cNvSpPr txBox="1"/>
+          <p:nvPr/>
+        </p:nvSpPr>
+        <p:spPr>
+          <a:xfrm rot="18415614">
+            <a:off x="1425285" y="2546802"/>
+            <a:ext cx="641669" cy="246221"/>
+          </a:xfrm>
+          <a:prstGeom prst="rect">
+            <a:avLst/>
+          </a:prstGeom>
+          <a:noFill/>
+        </p:spPr>
+        <p:txBody>
+          <a:bodyPr wrap="square" rtlCol="0">
+            <a:spAutoFit/>
+          </a:bodyPr>
+          <a:lstStyle/>
+          <a:p>
+            <a:r>
+              <a:rPr lang="en-US" sz="1000" dirty="0"/>
+              <a:t>1</a:t>
+            </a:r>
+          </a:p>
+        </p:txBody>
+      </p:sp>
+      <p:sp>
+        <p:nvSpPr>
+          <p:cNvPr id="84" name="TextBox 83">
+            <a:extLst>
+              <a:ext uri="{FF2B5EF4-FFF2-40B4-BE49-F238E27FC236}">
+                <a16:creationId xmlns:a16="http://schemas.microsoft.com/office/drawing/2014/main" id="{DBC9E89C-F2A3-4CFD-8840-5652350BB3FE}"/>
+              </a:ext>
+            </a:extLst>
+          </p:cNvPr>
+          <p:cNvSpPr txBox="1"/>
+          <p:nvPr/>
+        </p:nvSpPr>
+        <p:spPr>
+          <a:xfrm rot="18312161">
+            <a:off x="1046701" y="2491602"/>
+            <a:ext cx="816494" cy="246221"/>
+          </a:xfrm>
+          <a:prstGeom prst="rect">
+            <a:avLst/>
+          </a:prstGeom>
+          <a:noFill/>
+        </p:spPr>
+        <p:txBody>
+          <a:bodyPr wrap="square" rtlCol="0">
+            <a:spAutoFit/>
+          </a:bodyPr>
+          <a:lstStyle/>
+          <a:p>
+            <a:r>
+              <a:rPr lang="en-US" sz="1000" dirty="0" err="1"/>
+              <a:t>moduleList</a:t>
+            </a:r>
+            <a:endParaRPr lang="en-US" sz="1000" dirty="0"/>
+          </a:p>
+        </p:txBody>
+      </p:sp>
+    </p:spTree>
+    <p:extLst>
+      <p:ext uri="{BB962C8B-B14F-4D97-AF65-F5344CB8AC3E}">
+        <p14:creationId xmlns:p14="http://schemas.microsoft.com/office/powerpoint/2010/main" val="3653297632"/>
       </p:ext>
     </p:extLst>
   </p:cSld>

</xml_diff>

<commit_message>
Add sequence diagram for module store
</commit_message>
<xml_diff>
--- a/docs/assets/DG Diagrams.pptx
+++ b/docs/assets/DG Diagrams.pptx
@@ -15,7 +15,7 @@
     <p:sldId id="263" r:id="rId6"/>
     <p:sldId id="264" r:id="rId7"/>
     <p:sldId id="265" r:id="rId8"/>
-    <p:sldId id="266" r:id="rId9"/>
+    <p:sldId id="267" r:id="rId9"/>
   </p:sldIdLst>
   <p:sldSz cx="9144000" cy="6858000" type="screen4x3"/>
   <p:notesSz cx="6858000" cy="9144000"/>
@@ -215,7 +215,7 @@
           <a:p>
             <a:fld id="{31B455B7-35F4-3248-9980-DA268DAEE9E9}" type="datetimeFigureOut">
               <a:rPr lang="en-US" smtClean="0"/>
-              <a:t>10/20/2021</a:t>
+              <a:t>10/21/2021</a:t>
             </a:fld>
             <a:endParaRPr lang="en-US" dirty="0"/>
           </a:p>
@@ -695,7 +695,7 @@
           <a:bodyPr/>
           <a:lstStyle/>
           <a:p>
-            <a:endParaRPr lang="en-US" dirty="0"/>
+            <a:endParaRPr lang="en-SG" dirty="0"/>
           </a:p>
         </p:txBody>
       </p:sp>
@@ -725,7 +725,7 @@
     </p:spTree>
     <p:extLst>
       <p:ext uri="{BB962C8B-B14F-4D97-AF65-F5344CB8AC3E}">
-        <p14:creationId xmlns:p14="http://schemas.microsoft.com/office/powerpoint/2010/main" val="525843459"/>
+        <p14:creationId xmlns:p14="http://schemas.microsoft.com/office/powerpoint/2010/main" val="2699160200"/>
       </p:ext>
     </p:extLst>
   </p:cSld>
@@ -914,7 +914,7 @@
           <a:p>
             <a:fld id="{78C97017-6FC3-485B-9764-EAC9E56C1D49}" type="datetimeFigureOut">
               <a:rPr lang="en-US" smtClean="0"/>
-              <a:t>10/20/2021</a:t>
+              <a:t>10/21/2021</a:t>
             </a:fld>
             <a:endParaRPr lang="en-US" dirty="0"/>
           </a:p>
@@ -1082,7 +1082,7 @@
           <a:p>
             <a:fld id="{78C97017-6FC3-485B-9764-EAC9E56C1D49}" type="datetimeFigureOut">
               <a:rPr lang="en-US" smtClean="0"/>
-              <a:t>10/20/2021</a:t>
+              <a:t>10/21/2021</a:t>
             </a:fld>
             <a:endParaRPr lang="en-US" dirty="0"/>
           </a:p>
@@ -1260,7 +1260,7 @@
           <a:p>
             <a:fld id="{78C97017-6FC3-485B-9764-EAC9E56C1D49}" type="datetimeFigureOut">
               <a:rPr lang="en-US" smtClean="0"/>
-              <a:t>10/20/2021</a:t>
+              <a:t>10/21/2021</a:t>
             </a:fld>
             <a:endParaRPr lang="en-US" dirty="0"/>
           </a:p>
@@ -1428,7 +1428,7 @@
           <a:p>
             <a:fld id="{78C97017-6FC3-485B-9764-EAC9E56C1D49}" type="datetimeFigureOut">
               <a:rPr lang="en-US" smtClean="0"/>
-              <a:t>10/20/2021</a:t>
+              <a:t>10/21/2021</a:t>
             </a:fld>
             <a:endParaRPr lang="en-US" dirty="0"/>
           </a:p>
@@ -1673,7 +1673,7 @@
           <a:p>
             <a:fld id="{78C97017-6FC3-485B-9764-EAC9E56C1D49}" type="datetimeFigureOut">
               <a:rPr lang="en-US" smtClean="0"/>
-              <a:t>10/20/2021</a:t>
+              <a:t>10/21/2021</a:t>
             </a:fld>
             <a:endParaRPr lang="en-US" dirty="0"/>
           </a:p>
@@ -1958,7 +1958,7 @@
           <a:p>
             <a:fld id="{78C97017-6FC3-485B-9764-EAC9E56C1D49}" type="datetimeFigureOut">
               <a:rPr lang="en-US" smtClean="0"/>
-              <a:t>10/20/2021</a:t>
+              <a:t>10/21/2021</a:t>
             </a:fld>
             <a:endParaRPr lang="en-US" dirty="0"/>
           </a:p>
@@ -2377,7 +2377,7 @@
           <a:p>
             <a:fld id="{78C97017-6FC3-485B-9764-EAC9E56C1D49}" type="datetimeFigureOut">
               <a:rPr lang="en-US" smtClean="0"/>
-              <a:t>10/20/2021</a:t>
+              <a:t>10/21/2021</a:t>
             </a:fld>
             <a:endParaRPr lang="en-US" dirty="0"/>
           </a:p>
@@ -2494,7 +2494,7 @@
           <a:p>
             <a:fld id="{78C97017-6FC3-485B-9764-EAC9E56C1D49}" type="datetimeFigureOut">
               <a:rPr lang="en-US" smtClean="0"/>
-              <a:t>10/20/2021</a:t>
+              <a:t>10/21/2021</a:t>
             </a:fld>
             <a:endParaRPr lang="en-US" dirty="0"/>
           </a:p>
@@ -2589,7 +2589,7 @@
           <a:p>
             <a:fld id="{78C97017-6FC3-485B-9764-EAC9E56C1D49}" type="datetimeFigureOut">
               <a:rPr lang="en-US" smtClean="0"/>
-              <a:t>10/20/2021</a:t>
+              <a:t>10/21/2021</a:t>
             </a:fld>
             <a:endParaRPr lang="en-US" dirty="0"/>
           </a:p>
@@ -2864,7 +2864,7 @@
           <a:p>
             <a:fld id="{78C97017-6FC3-485B-9764-EAC9E56C1D49}" type="datetimeFigureOut">
               <a:rPr lang="en-US" smtClean="0"/>
-              <a:t>10/20/2021</a:t>
+              <a:t>10/21/2021</a:t>
             </a:fld>
             <a:endParaRPr lang="en-US" dirty="0"/>
           </a:p>
@@ -3116,7 +3116,7 @@
           <a:p>
             <a:fld id="{78C97017-6FC3-485B-9764-EAC9E56C1D49}" type="datetimeFigureOut">
               <a:rPr lang="en-US" smtClean="0"/>
-              <a:t>10/20/2021</a:t>
+              <a:t>10/21/2021</a:t>
             </a:fld>
             <a:endParaRPr lang="en-US" dirty="0"/>
           </a:p>
@@ -3327,7 +3327,7 @@
           <a:p>
             <a:fld id="{78C97017-6FC3-485B-9764-EAC9E56C1D49}" type="datetimeFigureOut">
               <a:rPr lang="en-US" smtClean="0"/>
-              <a:t>10/20/2021</a:t>
+              <a:t>10/21/2021</a:t>
             </a:fld>
             <a:endParaRPr lang="en-US" dirty="0"/>
           </a:p>
@@ -6592,6 +6592,56 @@
           <a:chExt cx="0" cy="0"/>
         </a:xfrm>
       </p:grpSpPr>
+      <p:cxnSp>
+        <p:nvCxnSpPr>
+          <p:cNvPr id="86" name="Curved Connector 16">
+            <a:extLst>
+              <a:ext uri="{FF2B5EF4-FFF2-40B4-BE49-F238E27FC236}">
+                <a16:creationId xmlns:a16="http://schemas.microsoft.com/office/drawing/2014/main" id="{4473865B-1DB0-433F-A8F8-1A209723CF4A}"/>
+              </a:ext>
+            </a:extLst>
+          </p:cNvPr>
+          <p:cNvCxnSpPr>
+            <a:cxnSpLocks/>
+          </p:cNvCxnSpPr>
+          <p:nvPr/>
+        </p:nvCxnSpPr>
+        <p:spPr>
+          <a:xfrm rot="16200000" flipH="1">
+            <a:off x="818431" y="2839900"/>
+            <a:ext cx="162613" cy="57149"/>
+          </a:xfrm>
+          <a:prstGeom prst="curvedConnector4">
+            <a:avLst>
+              <a:gd name="adj1" fmla="val 6204"/>
+              <a:gd name="adj2" fmla="val 544452"/>
+            </a:avLst>
+          </a:prstGeom>
+          <a:ln w="9525" cap="flat" cmpd="sng" algn="ctr">
+            <a:solidFill>
+              <a:schemeClr val="accent2"/>
+            </a:solidFill>
+            <a:prstDash val="solid"/>
+            <a:round/>
+            <a:headEnd type="none" w="med" len="med"/>
+            <a:tailEnd type="arrow" w="med" len="med"/>
+          </a:ln>
+        </p:spPr>
+        <p:style>
+          <a:lnRef idx="0">
+            <a:scrgbClr r="0" g="0" b="0"/>
+          </a:lnRef>
+          <a:fillRef idx="0">
+            <a:scrgbClr r="0" g="0" b="0"/>
+          </a:fillRef>
+          <a:effectRef idx="0">
+            <a:scrgbClr r="0" g="0" b="0"/>
+          </a:effectRef>
+          <a:fontRef idx="minor">
+            <a:schemeClr val="tx1"/>
+          </a:fontRef>
+        </p:style>
+      </p:cxnSp>
       <p:sp>
         <p:nvSpPr>
           <p:cNvPr id="2" name="TextBox 1">
@@ -13674,10 +13724,245 @@
       </p:grpSpPr>
       <p:sp>
         <p:nvSpPr>
-          <p:cNvPr id="2" name="Rectangle 1">
-            <a:extLst>
-              <a:ext uri="{FF2B5EF4-FFF2-40B4-BE49-F238E27FC236}">
-                <a16:creationId xmlns:a16="http://schemas.microsoft.com/office/drawing/2014/main" id="{0C5D1DA1-73DB-2B4C-82A1-9724BAD1B1DE}"/>
+          <p:cNvPr id="118" name="TextBox 117">
+            <a:extLst>
+              <a:ext uri="{FF2B5EF4-FFF2-40B4-BE49-F238E27FC236}">
+                <a16:creationId xmlns:a16="http://schemas.microsoft.com/office/drawing/2014/main" id="{DDEC7809-15FA-494D-9CB2-E50640CD5420}"/>
+              </a:ext>
+            </a:extLst>
+          </p:cNvPr>
+          <p:cNvSpPr txBox="1"/>
+          <p:nvPr/>
+        </p:nvSpPr>
+        <p:spPr>
+          <a:xfrm>
+            <a:off x="3656094" y="3828333"/>
+            <a:ext cx="2176296" cy="215444"/>
+          </a:xfrm>
+          <a:prstGeom prst="rect">
+            <a:avLst/>
+          </a:prstGeom>
+          <a:noFill/>
+        </p:spPr>
+        <p:txBody>
+          <a:bodyPr wrap="square" rtlCol="0">
+            <a:spAutoFit/>
+          </a:bodyPr>
+          <a:lstStyle/>
+          <a:p>
+            <a:r>
+              <a:rPr lang="en-US" sz="800" dirty="0" err="1"/>
+              <a:t>storeModuleByCode</a:t>
+            </a:r>
+            <a:r>
+              <a:rPr lang="en-US" sz="800" dirty="0"/>
+              <a:t>(</a:t>
+            </a:r>
+            <a:r>
+              <a:rPr lang="en-US" sz="800" dirty="0" err="1"/>
+              <a:t>moduleCode</a:t>
+            </a:r>
+            <a:r>
+              <a:rPr lang="en-US" sz="800" dirty="0"/>
+              <a:t>, </a:t>
+            </a:r>
+            <a:r>
+              <a:rPr lang="en-US" sz="800" dirty="0" err="1"/>
+              <a:t>moduleDb</a:t>
+            </a:r>
+            <a:r>
+              <a:rPr lang="en-US" sz="800" dirty="0"/>
+              <a:t>)</a:t>
+            </a:r>
+          </a:p>
+        </p:txBody>
+      </p:sp>
+      <p:cxnSp>
+        <p:nvCxnSpPr>
+          <p:cNvPr id="101" name="Straight Connector 100">
+            <a:extLst>
+              <a:ext uri="{FF2B5EF4-FFF2-40B4-BE49-F238E27FC236}">
+                <a16:creationId xmlns:a16="http://schemas.microsoft.com/office/drawing/2014/main" id="{295A3361-0D18-4A54-B724-ACC40FD0CCB3}"/>
+              </a:ext>
+            </a:extLst>
+          </p:cNvPr>
+          <p:cNvCxnSpPr>
+            <a:cxnSpLocks/>
+            <a:stCxn id="99" idx="2"/>
+          </p:cNvCxnSpPr>
+          <p:nvPr/>
+        </p:nvCxnSpPr>
+        <p:spPr>
+          <a:xfrm flipH="1">
+            <a:off x="5894655" y="3657600"/>
+            <a:ext cx="10846" cy="3048000"/>
+          </a:xfrm>
+          <a:prstGeom prst="line">
+            <a:avLst/>
+          </a:prstGeom>
+          <a:ln w="9525" cap="flat" cmpd="sng" algn="ctr">
+            <a:solidFill>
+              <a:schemeClr val="accent2"/>
+            </a:solidFill>
+            <a:prstDash val="dash"/>
+            <a:round/>
+            <a:headEnd type="none" w="med" len="med"/>
+            <a:tailEnd type="none" w="med" len="med"/>
+          </a:ln>
+        </p:spPr>
+        <p:style>
+          <a:lnRef idx="0">
+            <a:scrgbClr r="0" g="0" b="0"/>
+          </a:lnRef>
+          <a:fillRef idx="0">
+            <a:scrgbClr r="0" g="0" b="0"/>
+          </a:fillRef>
+          <a:effectRef idx="0">
+            <a:scrgbClr r="0" g="0" b="0"/>
+          </a:effectRef>
+          <a:fontRef idx="minor">
+            <a:schemeClr val="tx1"/>
+          </a:fontRef>
+        </p:style>
+      </p:cxnSp>
+      <p:cxnSp>
+        <p:nvCxnSpPr>
+          <p:cNvPr id="103" name="Curved Connector 16">
+            <a:extLst>
+              <a:ext uri="{FF2B5EF4-FFF2-40B4-BE49-F238E27FC236}">
+                <a16:creationId xmlns:a16="http://schemas.microsoft.com/office/drawing/2014/main" id="{3FF8BC15-8400-4895-90F8-60A8F0CCFF9E}"/>
+              </a:ext>
+            </a:extLst>
+          </p:cNvPr>
+          <p:cNvCxnSpPr>
+            <a:cxnSpLocks/>
+          </p:cNvCxnSpPr>
+          <p:nvPr/>
+        </p:nvCxnSpPr>
+        <p:spPr>
+          <a:xfrm rot="16200000" flipH="1">
+            <a:off x="812689" y="2848806"/>
+            <a:ext cx="162613" cy="57149"/>
+          </a:xfrm>
+          <a:prstGeom prst="curvedConnector4">
+            <a:avLst>
+              <a:gd name="adj1" fmla="val 6204"/>
+              <a:gd name="adj2" fmla="val 544452"/>
+            </a:avLst>
+          </a:prstGeom>
+          <a:ln w="9525" cap="flat" cmpd="sng" algn="ctr">
+            <a:solidFill>
+              <a:schemeClr val="accent2"/>
+            </a:solidFill>
+            <a:prstDash val="solid"/>
+            <a:round/>
+            <a:headEnd type="none" w="med" len="med"/>
+            <a:tailEnd type="arrow" w="med" len="med"/>
+          </a:ln>
+        </p:spPr>
+        <p:style>
+          <a:lnRef idx="0">
+            <a:scrgbClr r="0" g="0" b="0"/>
+          </a:lnRef>
+          <a:fillRef idx="0">
+            <a:scrgbClr r="0" g="0" b="0"/>
+          </a:fillRef>
+          <a:effectRef idx="0">
+            <a:scrgbClr r="0" g="0" b="0"/>
+          </a:effectRef>
+          <a:fontRef idx="minor">
+            <a:schemeClr val="tx1"/>
+          </a:fontRef>
+        </p:style>
+      </p:cxnSp>
+      <p:cxnSp>
+        <p:nvCxnSpPr>
+          <p:cNvPr id="88" name="Straight Connector 87">
+            <a:extLst>
+              <a:ext uri="{FF2B5EF4-FFF2-40B4-BE49-F238E27FC236}">
+                <a16:creationId xmlns:a16="http://schemas.microsoft.com/office/drawing/2014/main" id="{0F75A1AB-1A76-4018-813E-0C0390EB506C}"/>
+              </a:ext>
+            </a:extLst>
+          </p:cNvPr>
+          <p:cNvCxnSpPr>
+            <a:cxnSpLocks/>
+          </p:cNvCxnSpPr>
+          <p:nvPr/>
+        </p:nvCxnSpPr>
+        <p:spPr>
+          <a:xfrm>
+            <a:off x="6952207" y="4222587"/>
+            <a:ext cx="0" cy="2483013"/>
+          </a:xfrm>
+          <a:prstGeom prst="line">
+            <a:avLst/>
+          </a:prstGeom>
+          <a:ln w="9525" cap="flat" cmpd="sng" algn="ctr">
+            <a:solidFill>
+              <a:schemeClr val="accent2"/>
+            </a:solidFill>
+            <a:prstDash val="dash"/>
+            <a:round/>
+            <a:headEnd type="none" w="med" len="med"/>
+            <a:tailEnd type="none" w="med" len="med"/>
+          </a:ln>
+        </p:spPr>
+        <p:style>
+          <a:lnRef idx="0">
+            <a:scrgbClr r="0" g="0" b="0"/>
+          </a:lnRef>
+          <a:fillRef idx="0">
+            <a:scrgbClr r="0" g="0" b="0"/>
+          </a:fillRef>
+          <a:effectRef idx="0">
+            <a:scrgbClr r="0" g="0" b="0"/>
+          </a:effectRef>
+          <a:fontRef idx="minor">
+            <a:schemeClr val="tx1"/>
+          </a:fontRef>
+        </p:style>
+      </p:cxnSp>
+      <p:sp>
+        <p:nvSpPr>
+          <p:cNvPr id="2" name="TextBox 1">
+            <a:extLst>
+              <a:ext uri="{FF2B5EF4-FFF2-40B4-BE49-F238E27FC236}">
+                <a16:creationId xmlns:a16="http://schemas.microsoft.com/office/drawing/2014/main" id="{231CEFC0-7A1F-4161-AE29-8E67B66794D4}"/>
+              </a:ext>
+            </a:extLst>
+          </p:cNvPr>
+          <p:cNvSpPr txBox="1"/>
+          <p:nvPr/>
+        </p:nvSpPr>
+        <p:spPr>
+          <a:xfrm>
+            <a:off x="3676308" y="411966"/>
+            <a:ext cx="1444819" cy="369332"/>
+          </a:xfrm>
+          <a:prstGeom prst="rect">
+            <a:avLst/>
+          </a:prstGeom>
+          <a:noFill/>
+        </p:spPr>
+        <p:txBody>
+          <a:bodyPr wrap="none" rtlCol="0">
+            <a:spAutoFit/>
+          </a:bodyPr>
+          <a:lstStyle/>
+          <a:p>
+            <a:r>
+              <a:rPr lang="en-US" dirty="0"/>
+              <a:t>Module store</a:t>
+            </a:r>
+          </a:p>
+        </p:txBody>
+      </p:sp>
+      <p:sp>
+        <p:nvSpPr>
+          <p:cNvPr id="4" name="Rectangle 3">
+            <a:extLst>
+              <a:ext uri="{FF2B5EF4-FFF2-40B4-BE49-F238E27FC236}">
+                <a16:creationId xmlns:a16="http://schemas.microsoft.com/office/drawing/2014/main" id="{1FD98BC2-4A42-4154-8E4E-D4AD5A36EFC7}"/>
               </a:ext>
             </a:extLst>
           </p:cNvPr>
@@ -13686,16 +13971,15 @@
         </p:nvSpPr>
         <p:spPr>
           <a:xfrm>
-            <a:off x="381000" y="1379179"/>
-            <a:ext cx="3837765" cy="4343400"/>
+            <a:off x="304800" y="1143000"/>
+            <a:ext cx="1143000" cy="304800"/>
           </a:xfrm>
           <a:prstGeom prst="rect">
             <a:avLst/>
           </a:prstGeom>
           <a:solidFill>
             <a:schemeClr val="accent1">
-              <a:lumMod val="60000"/>
-              <a:lumOff val="40000"/>
+              <a:lumMod val="50000"/>
             </a:schemeClr>
           </a:solidFill>
           <a:ln w="12700">
@@ -13725,16 +14009,238 @@
           <a:lstStyle/>
           <a:p>
             <a:pPr algn="ctr"/>
+            <a:r>
+              <a:rPr lang="en-US" sz="800" dirty="0"/>
+              <a:t>:Parser</a:t>
+            </a:r>
+          </a:p>
+        </p:txBody>
+      </p:sp>
+      <p:cxnSp>
+        <p:nvCxnSpPr>
+          <p:cNvPr id="5" name="Straight Connector 4">
+            <a:extLst>
+              <a:ext uri="{FF2B5EF4-FFF2-40B4-BE49-F238E27FC236}">
+                <a16:creationId xmlns:a16="http://schemas.microsoft.com/office/drawing/2014/main" id="{6EEC574A-8E61-45DD-8185-FF663D92E959}"/>
+              </a:ext>
+            </a:extLst>
+          </p:cNvPr>
+          <p:cNvCxnSpPr>
+            <a:cxnSpLocks/>
+          </p:cNvCxnSpPr>
+          <p:nvPr/>
+        </p:nvCxnSpPr>
+        <p:spPr>
+          <a:xfrm>
+            <a:off x="876300" y="1447800"/>
+            <a:ext cx="0" cy="1828800"/>
+          </a:xfrm>
+          <a:prstGeom prst="line">
+            <a:avLst/>
+          </a:prstGeom>
+          <a:ln w="9525" cap="flat" cmpd="sng" algn="ctr">
+            <a:solidFill>
+              <a:schemeClr val="accent2"/>
+            </a:solidFill>
+            <a:prstDash val="dash"/>
+            <a:round/>
+            <a:headEnd type="none" w="med" len="med"/>
+            <a:tailEnd type="none" w="med" len="med"/>
+          </a:ln>
+        </p:spPr>
+        <p:style>
+          <a:lnRef idx="0">
+            <a:scrgbClr r="0" g="0" b="0"/>
+          </a:lnRef>
+          <a:fillRef idx="0">
+            <a:scrgbClr r="0" g="0" b="0"/>
+          </a:fillRef>
+          <a:effectRef idx="0">
+            <a:scrgbClr r="0" g="0" b="0"/>
+          </a:effectRef>
+          <a:fontRef idx="minor">
+            <a:schemeClr val="tx1"/>
+          </a:fontRef>
+        </p:style>
+      </p:cxnSp>
+      <p:sp>
+        <p:nvSpPr>
+          <p:cNvPr id="7" name="Rectangle 6">
+            <a:extLst>
+              <a:ext uri="{FF2B5EF4-FFF2-40B4-BE49-F238E27FC236}">
+                <a16:creationId xmlns:a16="http://schemas.microsoft.com/office/drawing/2014/main" id="{C52B6B4A-32C9-4104-BDFB-5C819E0C04C5}"/>
+              </a:ext>
+            </a:extLst>
+          </p:cNvPr>
+          <p:cNvSpPr/>
+          <p:nvPr/>
+        </p:nvSpPr>
+        <p:spPr>
+          <a:xfrm>
+            <a:off x="828676" y="1676400"/>
+            <a:ext cx="94498" cy="1447798"/>
+          </a:xfrm>
+          <a:prstGeom prst="rect">
+            <a:avLst/>
+          </a:prstGeom>
+          <a:ln w="12700">
+            <a:solidFill>
+              <a:schemeClr val="accent2"/>
+            </a:solidFill>
+          </a:ln>
+        </p:spPr>
+        <p:style>
+          <a:lnRef idx="2">
+            <a:schemeClr val="accent6"/>
+          </a:lnRef>
+          <a:fillRef idx="1">
+            <a:schemeClr val="lt1"/>
+          </a:fillRef>
+          <a:effectRef idx="0">
+            <a:schemeClr val="accent6"/>
+          </a:effectRef>
+          <a:fontRef idx="minor">
+            <a:schemeClr val="dk1"/>
+          </a:fontRef>
+        </p:style>
+        <p:txBody>
+          <a:bodyPr rtlCol="0" anchor="ctr"/>
+          <a:lstStyle/>
+          <a:p>
+            <a:pPr algn="ctr"/>
             <a:endParaRPr lang="en-US" dirty="0"/>
           </a:p>
         </p:txBody>
       </p:sp>
-      <p:sp>
-        <p:nvSpPr>
-          <p:cNvPr id="3" name="Rectangle 2">
-            <a:extLst>
-              <a:ext uri="{FF2B5EF4-FFF2-40B4-BE49-F238E27FC236}">
-                <a16:creationId xmlns:a16="http://schemas.microsoft.com/office/drawing/2014/main" id="{6D4D3352-CF76-AF4F-92C8-A20064C118FE}"/>
+      <p:cxnSp>
+        <p:nvCxnSpPr>
+          <p:cNvPr id="8" name="Straight Arrow Connector 7">
+            <a:extLst>
+              <a:ext uri="{FF2B5EF4-FFF2-40B4-BE49-F238E27FC236}">
+                <a16:creationId xmlns:a16="http://schemas.microsoft.com/office/drawing/2014/main" id="{02059A8E-43BA-4FE5-9504-9904338B0653}"/>
+              </a:ext>
+            </a:extLst>
+          </p:cNvPr>
+          <p:cNvCxnSpPr/>
+          <p:nvPr/>
+        </p:nvCxnSpPr>
+        <p:spPr>
+          <a:xfrm>
+            <a:off x="0" y="1673352"/>
+            <a:ext cx="857251" cy="0"/>
+          </a:xfrm>
+          <a:prstGeom prst="straightConnector1">
+            <a:avLst/>
+          </a:prstGeom>
+          <a:ln w="9525" cap="flat" cmpd="sng" algn="ctr">
+            <a:solidFill>
+              <a:schemeClr val="accent2"/>
+            </a:solidFill>
+            <a:prstDash val="solid"/>
+            <a:round/>
+            <a:headEnd type="none" w="med" len="med"/>
+            <a:tailEnd type="arrow" w="med" len="med"/>
+          </a:ln>
+        </p:spPr>
+        <p:style>
+          <a:lnRef idx="0">
+            <a:scrgbClr r="0" g="0" b="0"/>
+          </a:lnRef>
+          <a:fillRef idx="0">
+            <a:scrgbClr r="0" g="0" b="0"/>
+          </a:fillRef>
+          <a:effectRef idx="0">
+            <a:scrgbClr r="0" g="0" b="0"/>
+          </a:effectRef>
+          <a:fontRef idx="minor">
+            <a:schemeClr val="tx1"/>
+          </a:fontRef>
+        </p:style>
+      </p:cxnSp>
+      <p:sp>
+        <p:nvSpPr>
+          <p:cNvPr id="9" name="TextBox 8">
+            <a:extLst>
+              <a:ext uri="{FF2B5EF4-FFF2-40B4-BE49-F238E27FC236}">
+                <a16:creationId xmlns:a16="http://schemas.microsoft.com/office/drawing/2014/main" id="{9835AEB7-63EB-4B1E-B403-B36C8240D6D6}"/>
+              </a:ext>
+            </a:extLst>
+          </p:cNvPr>
+          <p:cNvSpPr txBox="1"/>
+          <p:nvPr/>
+        </p:nvSpPr>
+        <p:spPr>
+          <a:xfrm>
+            <a:off x="-10288" y="1670047"/>
+            <a:ext cx="857251" cy="338554"/>
+          </a:xfrm>
+          <a:prstGeom prst="rect">
+            <a:avLst/>
+          </a:prstGeom>
+          <a:noFill/>
+        </p:spPr>
+        <p:txBody>
+          <a:bodyPr wrap="square" rtlCol="0">
+            <a:spAutoFit/>
+          </a:bodyPr>
+          <a:lstStyle/>
+          <a:p>
+            <a:r>
+              <a:rPr lang="en-US" sz="800" dirty="0"/>
+              <a:t>parseCommand(input)</a:t>
+            </a:r>
+          </a:p>
+        </p:txBody>
+      </p:sp>
+      <p:sp>
+        <p:nvSpPr>
+          <p:cNvPr id="11" name="TextBox 10">
+            <a:extLst>
+              <a:ext uri="{FF2B5EF4-FFF2-40B4-BE49-F238E27FC236}">
+                <a16:creationId xmlns:a16="http://schemas.microsoft.com/office/drawing/2014/main" id="{93C27ADE-B729-426B-9195-BABA12E372B2}"/>
+              </a:ext>
+            </a:extLst>
+          </p:cNvPr>
+          <p:cNvSpPr txBox="1"/>
+          <p:nvPr/>
+        </p:nvSpPr>
+        <p:spPr>
+          <a:xfrm>
+            <a:off x="966783" y="1569720"/>
+            <a:ext cx="1998105" cy="215444"/>
+          </a:xfrm>
+          <a:prstGeom prst="rect">
+            <a:avLst/>
+          </a:prstGeom>
+          <a:noFill/>
+        </p:spPr>
+        <p:txBody>
+          <a:bodyPr wrap="square" rtlCol="0">
+            <a:spAutoFit/>
+          </a:bodyPr>
+          <a:lstStyle/>
+          <a:p>
+            <a:r>
+              <a:rPr lang="en-US" sz="800" dirty="0"/>
+              <a:t>parseSubCommand(</a:t>
+            </a:r>
+            <a:r>
+              <a:rPr lang="en-US" sz="800" dirty="0" err="1"/>
+              <a:t>subInput</a:t>
+            </a:r>
+            <a:r>
+              <a:rPr lang="en-US" sz="800" dirty="0"/>
+              <a:t>, “module”)</a:t>
+            </a:r>
+          </a:p>
+        </p:txBody>
+      </p:sp>
+      <p:sp>
+        <p:nvSpPr>
+          <p:cNvPr id="14" name="Rectangle 13">
+            <a:extLst>
+              <a:ext uri="{FF2B5EF4-FFF2-40B4-BE49-F238E27FC236}">
+                <a16:creationId xmlns:a16="http://schemas.microsoft.com/office/drawing/2014/main" id="{7A0A803C-5D0C-48A5-9D98-3BAC9B952BA7}"/>
               </a:ext>
             </a:extLst>
           </p:cNvPr>
@@ -13743,16 +14249,212 @@
         </p:nvSpPr>
         <p:spPr>
           <a:xfrm>
-            <a:off x="4413180" y="1379179"/>
-            <a:ext cx="4647812" cy="4343400"/>
+            <a:off x="886588" y="2030194"/>
+            <a:ext cx="95232" cy="783814"/>
           </a:xfrm>
           <a:prstGeom prst="rect">
             <a:avLst/>
           </a:prstGeom>
+          <a:ln w="12700">
+            <a:solidFill>
+              <a:schemeClr val="accent2"/>
+            </a:solidFill>
+          </a:ln>
+        </p:spPr>
+        <p:style>
+          <a:lnRef idx="2">
+            <a:schemeClr val="accent6"/>
+          </a:lnRef>
+          <a:fillRef idx="1">
+            <a:schemeClr val="lt1"/>
+          </a:fillRef>
+          <a:effectRef idx="0">
+            <a:schemeClr val="accent6"/>
+          </a:effectRef>
+          <a:fontRef idx="minor">
+            <a:schemeClr val="dk1"/>
+          </a:fontRef>
+        </p:style>
+        <p:txBody>
+          <a:bodyPr rtlCol="0" anchor="ctr"/>
+          <a:lstStyle/>
+          <a:p>
+            <a:pPr algn="ctr"/>
+            <a:endParaRPr lang="en-US" dirty="0"/>
+          </a:p>
+        </p:txBody>
+      </p:sp>
+      <p:cxnSp>
+        <p:nvCxnSpPr>
+          <p:cNvPr id="15" name="Curved Connector 16">
+            <a:extLst>
+              <a:ext uri="{FF2B5EF4-FFF2-40B4-BE49-F238E27FC236}">
+                <a16:creationId xmlns:a16="http://schemas.microsoft.com/office/drawing/2014/main" id="{46663309-2E43-4EA5-92C4-23FD688BF991}"/>
+              </a:ext>
+            </a:extLst>
+          </p:cNvPr>
+          <p:cNvCxnSpPr>
+            <a:cxnSpLocks/>
+          </p:cNvCxnSpPr>
+          <p:nvPr/>
+        </p:nvCxnSpPr>
+        <p:spPr>
+          <a:xfrm rot="16200000" flipH="1">
+            <a:off x="866429" y="1918789"/>
+            <a:ext cx="162613" cy="57149"/>
+          </a:xfrm>
+          <a:prstGeom prst="curvedConnector4">
+            <a:avLst>
+              <a:gd name="adj1" fmla="val 6204"/>
+              <a:gd name="adj2" fmla="val 500007"/>
+            </a:avLst>
+          </a:prstGeom>
+          <a:ln w="9525" cap="flat" cmpd="sng" algn="ctr">
+            <a:solidFill>
+              <a:schemeClr val="accent2"/>
+            </a:solidFill>
+            <a:prstDash val="solid"/>
+            <a:round/>
+            <a:headEnd type="none" w="med" len="med"/>
+            <a:tailEnd type="arrow" w="med" len="med"/>
+          </a:ln>
+        </p:spPr>
+        <p:style>
+          <a:lnRef idx="0">
+            <a:scrgbClr r="0" g="0" b="0"/>
+          </a:lnRef>
+          <a:fillRef idx="0">
+            <a:scrgbClr r="0" g="0" b="0"/>
+          </a:fillRef>
+          <a:effectRef idx="0">
+            <a:scrgbClr r="0" g="0" b="0"/>
+          </a:effectRef>
+          <a:fontRef idx="minor">
+            <a:schemeClr val="tx1"/>
+          </a:fontRef>
+        </p:style>
+      </p:cxnSp>
+      <p:cxnSp>
+        <p:nvCxnSpPr>
+          <p:cNvPr id="16" name="Straight Arrow Connector 15">
+            <a:extLst>
+              <a:ext uri="{FF2B5EF4-FFF2-40B4-BE49-F238E27FC236}">
+                <a16:creationId xmlns:a16="http://schemas.microsoft.com/office/drawing/2014/main" id="{C36A9E4C-D451-4E9F-A8F8-866E30C11318}"/>
+              </a:ext>
+            </a:extLst>
+          </p:cNvPr>
+          <p:cNvCxnSpPr>
+            <a:cxnSpLocks/>
+          </p:cNvCxnSpPr>
+          <p:nvPr/>
+        </p:nvCxnSpPr>
+        <p:spPr>
+          <a:xfrm>
+            <a:off x="976310" y="2209800"/>
+            <a:ext cx="1719263" cy="0"/>
+          </a:xfrm>
+          <a:prstGeom prst="straightConnector1">
+            <a:avLst/>
+          </a:prstGeom>
+          <a:ln w="9525" cap="flat" cmpd="sng" algn="ctr">
+            <a:solidFill>
+              <a:schemeClr val="accent2"/>
+            </a:solidFill>
+            <a:prstDash val="solid"/>
+            <a:round/>
+            <a:headEnd type="none" w="med" len="med"/>
+            <a:tailEnd type="arrow" w="med" len="med"/>
+          </a:ln>
+        </p:spPr>
+        <p:style>
+          <a:lnRef idx="0">
+            <a:scrgbClr r="0" g="0" b="0"/>
+          </a:lnRef>
+          <a:fillRef idx="0">
+            <a:scrgbClr r="0" g="0" b="0"/>
+          </a:fillRef>
+          <a:effectRef idx="0">
+            <a:scrgbClr r="0" g="0" b="0"/>
+          </a:effectRef>
+          <a:fontRef idx="minor">
+            <a:schemeClr val="tx1"/>
+          </a:fontRef>
+        </p:style>
+      </p:cxnSp>
+      <p:sp>
+        <p:nvSpPr>
+          <p:cNvPr id="18" name="TextBox 17">
+            <a:extLst>
+              <a:ext uri="{FF2B5EF4-FFF2-40B4-BE49-F238E27FC236}">
+                <a16:creationId xmlns:a16="http://schemas.microsoft.com/office/drawing/2014/main" id="{7F62D833-DEE1-471A-8777-509E4FF19CCE}"/>
+              </a:ext>
+            </a:extLst>
+          </p:cNvPr>
+          <p:cNvSpPr txBox="1"/>
+          <p:nvPr/>
+        </p:nvSpPr>
+        <p:spPr>
+          <a:xfrm>
+            <a:off x="942079" y="2211325"/>
+            <a:ext cx="1825295" cy="338554"/>
+          </a:xfrm>
+          <a:prstGeom prst="rect">
+            <a:avLst/>
+          </a:prstGeom>
+          <a:noFill/>
+        </p:spPr>
+        <p:txBody>
+          <a:bodyPr wrap="square" rtlCol="0">
+            <a:spAutoFit/>
+          </a:bodyPr>
+          <a:lstStyle/>
+          <a:p>
+            <a:r>
+              <a:rPr lang="en-US" sz="800" dirty="0"/>
+              <a:t>new </a:t>
+            </a:r>
+            <a:r>
+              <a:rPr lang="en-US" sz="800" dirty="0" err="1"/>
+              <a:t>ModuleCommand</a:t>
+            </a:r>
+            <a:r>
+              <a:rPr lang="en-US" sz="800" dirty="0"/>
+              <a:t>(subcommand, </a:t>
+            </a:r>
+            <a:r>
+              <a:rPr lang="en-US" sz="800" dirty="0" err="1"/>
+              <a:t>parsedArguments</a:t>
+            </a:r>
+            <a:r>
+              <a:rPr lang="en-US" sz="800" dirty="0"/>
+              <a:t>)</a:t>
+            </a:r>
+          </a:p>
+        </p:txBody>
+      </p:sp>
+      <p:sp>
+        <p:nvSpPr>
+          <p:cNvPr id="20" name="Rectangle 19">
+            <a:extLst>
+              <a:ext uri="{FF2B5EF4-FFF2-40B4-BE49-F238E27FC236}">
+                <a16:creationId xmlns:a16="http://schemas.microsoft.com/office/drawing/2014/main" id="{1465DAA2-65A0-42CB-9AEA-2AD84C424845}"/>
+              </a:ext>
+            </a:extLst>
+          </p:cNvPr>
+          <p:cNvSpPr/>
+          <p:nvPr/>
+        </p:nvSpPr>
+        <p:spPr>
+          <a:xfrm>
+            <a:off x="2695573" y="2047184"/>
+            <a:ext cx="1504929" cy="304800"/>
+          </a:xfrm>
+          <a:prstGeom prst="rect">
+            <a:avLst/>
+          </a:prstGeom>
           <a:solidFill>
-            <a:schemeClr val="accent2">
-              <a:lumMod val="60000"/>
-              <a:lumOff val="40000"/>
+            <a:schemeClr val="accent1">
+              <a:lumMod val="50000"/>
             </a:schemeClr>
           </a:solidFill>
           <a:ln w="12700">
@@ -13782,16 +14484,275 @@
           <a:lstStyle/>
           <a:p>
             <a:pPr algn="ctr"/>
+            <a:r>
+              <a:rPr lang="en-US" sz="800" dirty="0"/>
+              <a:t>:</a:t>
+            </a:r>
+            <a:r>
+              <a:rPr lang="en-US" sz="800" dirty="0" err="1"/>
+              <a:t>ModuleCommand</a:t>
+            </a:r>
+            <a:endParaRPr lang="en-US" sz="800" dirty="0"/>
+          </a:p>
+        </p:txBody>
+      </p:sp>
+      <p:sp>
+        <p:nvSpPr>
+          <p:cNvPr id="21" name="Rectangle 20">
+            <a:extLst>
+              <a:ext uri="{FF2B5EF4-FFF2-40B4-BE49-F238E27FC236}">
+                <a16:creationId xmlns:a16="http://schemas.microsoft.com/office/drawing/2014/main" id="{EB588744-6C13-4C5E-859F-24B790DF788A}"/>
+              </a:ext>
+            </a:extLst>
+          </p:cNvPr>
+          <p:cNvSpPr/>
+          <p:nvPr/>
+        </p:nvSpPr>
+        <p:spPr>
+          <a:xfrm>
+            <a:off x="3404217" y="2351984"/>
+            <a:ext cx="117301" cy="284655"/>
+          </a:xfrm>
+          <a:prstGeom prst="rect">
+            <a:avLst/>
+          </a:prstGeom>
+          <a:ln w="12700">
+            <a:solidFill>
+              <a:schemeClr val="accent2"/>
+            </a:solidFill>
+          </a:ln>
+        </p:spPr>
+        <p:style>
+          <a:lnRef idx="2">
+            <a:schemeClr val="accent6"/>
+          </a:lnRef>
+          <a:fillRef idx="1">
+            <a:schemeClr val="lt1"/>
+          </a:fillRef>
+          <a:effectRef idx="0">
+            <a:schemeClr val="accent6"/>
+          </a:effectRef>
+          <a:fontRef idx="minor">
+            <a:schemeClr val="dk1"/>
+          </a:fontRef>
+        </p:style>
+        <p:txBody>
+          <a:bodyPr rtlCol="0" anchor="ctr"/>
+          <a:lstStyle/>
+          <a:p>
+            <a:pPr algn="ctr"/>
             <a:endParaRPr lang="en-US" dirty="0"/>
           </a:p>
         </p:txBody>
       </p:sp>
-      <p:sp>
-        <p:nvSpPr>
-          <p:cNvPr id="4" name="TextBox 3">
-            <a:extLst>
-              <a:ext uri="{FF2B5EF4-FFF2-40B4-BE49-F238E27FC236}">
-                <a16:creationId xmlns:a16="http://schemas.microsoft.com/office/drawing/2014/main" id="{7E5AB0D4-F8DE-E641-8E4B-BAB3A46961CA}"/>
+      <p:cxnSp>
+        <p:nvCxnSpPr>
+          <p:cNvPr id="22" name="Straight Connector 21">
+            <a:extLst>
+              <a:ext uri="{FF2B5EF4-FFF2-40B4-BE49-F238E27FC236}">
+                <a16:creationId xmlns:a16="http://schemas.microsoft.com/office/drawing/2014/main" id="{87456D04-AA43-448F-89E1-3C5678E057B4}"/>
+              </a:ext>
+            </a:extLst>
+          </p:cNvPr>
+          <p:cNvCxnSpPr>
+            <a:cxnSpLocks/>
+            <a:stCxn id="21" idx="2"/>
+          </p:cNvCxnSpPr>
+          <p:nvPr/>
+        </p:nvCxnSpPr>
+        <p:spPr>
+          <a:xfrm flipH="1">
+            <a:off x="3459565" y="2636639"/>
+            <a:ext cx="3303" cy="4068961"/>
+          </a:xfrm>
+          <a:prstGeom prst="line">
+            <a:avLst/>
+          </a:prstGeom>
+          <a:ln w="9525" cap="flat" cmpd="sng" algn="ctr">
+            <a:solidFill>
+              <a:schemeClr val="accent2"/>
+            </a:solidFill>
+            <a:prstDash val="dash"/>
+            <a:round/>
+            <a:headEnd type="none" w="med" len="med"/>
+            <a:tailEnd type="none" w="med" len="med"/>
+          </a:ln>
+        </p:spPr>
+        <p:style>
+          <a:lnRef idx="0">
+            <a:scrgbClr r="0" g="0" b="0"/>
+          </a:lnRef>
+          <a:fillRef idx="0">
+            <a:scrgbClr r="0" g="0" b="0"/>
+          </a:fillRef>
+          <a:effectRef idx="0">
+            <a:scrgbClr r="0" g="0" b="0"/>
+          </a:effectRef>
+          <a:fontRef idx="minor">
+            <a:schemeClr val="tx1"/>
+          </a:fontRef>
+        </p:style>
+      </p:cxnSp>
+      <p:grpSp>
+        <p:nvGrpSpPr>
+          <p:cNvPr id="29" name="Group 28">
+            <a:extLst>
+              <a:ext uri="{FF2B5EF4-FFF2-40B4-BE49-F238E27FC236}">
+                <a16:creationId xmlns:a16="http://schemas.microsoft.com/office/drawing/2014/main" id="{8EA99A0A-911A-4A4E-8F2B-852B1C25EFA8}"/>
+              </a:ext>
+            </a:extLst>
+          </p:cNvPr>
+          <p:cNvGrpSpPr/>
+          <p:nvPr/>
+        </p:nvGrpSpPr>
+        <p:grpSpPr>
+          <a:xfrm>
+            <a:off x="981823" y="2604108"/>
+            <a:ext cx="2422393" cy="109578"/>
+            <a:chOff x="5359804" y="4101416"/>
+            <a:chExt cx="1935852" cy="77697"/>
+          </a:xfrm>
+        </p:grpSpPr>
+        <p:cxnSp>
+          <p:nvCxnSpPr>
+            <p:cNvPr id="30" name="Straight Arrow Connector 29">
+              <a:extLst>
+                <a:ext uri="{FF2B5EF4-FFF2-40B4-BE49-F238E27FC236}">
+                  <a16:creationId xmlns:a16="http://schemas.microsoft.com/office/drawing/2014/main" id="{511E4A94-44FE-496E-8365-1B0F84A6319B}"/>
+                </a:ext>
+              </a:extLst>
+            </p:cNvPr>
+            <p:cNvCxnSpPr>
+              <a:cxnSpLocks/>
+            </p:cNvCxnSpPr>
+            <p:nvPr/>
+          </p:nvCxnSpPr>
+          <p:spPr>
+            <a:xfrm flipH="1">
+              <a:off x="5368970" y="4124482"/>
+              <a:ext cx="1926686" cy="13783"/>
+            </a:xfrm>
+            <a:prstGeom prst="straightConnector1">
+              <a:avLst/>
+            </a:prstGeom>
+            <a:ln w="9525" cap="flat" cmpd="sng" algn="ctr">
+              <a:solidFill>
+                <a:schemeClr val="accent2"/>
+              </a:solidFill>
+              <a:prstDash val="dash"/>
+              <a:round/>
+              <a:headEnd type="none" w="med" len="med"/>
+              <a:tailEnd type="none" w="med" len="med"/>
+            </a:ln>
+          </p:spPr>
+          <p:style>
+            <a:lnRef idx="0">
+              <a:scrgbClr r="0" g="0" b="0"/>
+            </a:lnRef>
+            <a:fillRef idx="0">
+              <a:scrgbClr r="0" g="0" b="0"/>
+            </a:fillRef>
+            <a:effectRef idx="0">
+              <a:scrgbClr r="0" g="0" b="0"/>
+            </a:effectRef>
+            <a:fontRef idx="minor">
+              <a:schemeClr val="tx1"/>
+            </a:fontRef>
+          </p:style>
+        </p:cxnSp>
+        <p:cxnSp>
+          <p:nvCxnSpPr>
+            <p:cNvPr id="31" name="Straight Connector 30">
+              <a:extLst>
+                <a:ext uri="{FF2B5EF4-FFF2-40B4-BE49-F238E27FC236}">
+                  <a16:creationId xmlns:a16="http://schemas.microsoft.com/office/drawing/2014/main" id="{F27AFF03-7063-4653-98DD-FB66201B4FA5}"/>
+                </a:ext>
+              </a:extLst>
+            </p:cNvPr>
+            <p:cNvCxnSpPr>
+              <a:cxnSpLocks/>
+            </p:cNvCxnSpPr>
+            <p:nvPr/>
+          </p:nvCxnSpPr>
+          <p:spPr>
+            <a:xfrm flipV="1">
+              <a:off x="5359804" y="4101416"/>
+              <a:ext cx="93742" cy="38096"/>
+            </a:xfrm>
+            <a:prstGeom prst="line">
+              <a:avLst/>
+            </a:prstGeom>
+            <a:ln>
+              <a:solidFill>
+                <a:schemeClr val="accent2"/>
+              </a:solidFill>
+            </a:ln>
+          </p:spPr>
+          <p:style>
+            <a:lnRef idx="1">
+              <a:schemeClr val="accent1"/>
+            </a:lnRef>
+            <a:fillRef idx="0">
+              <a:schemeClr val="accent1"/>
+            </a:fillRef>
+            <a:effectRef idx="0">
+              <a:schemeClr val="accent1"/>
+            </a:effectRef>
+            <a:fontRef idx="minor">
+              <a:schemeClr val="tx1"/>
+            </a:fontRef>
+          </p:style>
+        </p:cxnSp>
+        <p:cxnSp>
+          <p:nvCxnSpPr>
+            <p:cNvPr id="32" name="Straight Connector 31">
+              <a:extLst>
+                <a:ext uri="{FF2B5EF4-FFF2-40B4-BE49-F238E27FC236}">
+                  <a16:creationId xmlns:a16="http://schemas.microsoft.com/office/drawing/2014/main" id="{23CB1B41-54AD-4014-A0A4-26B59C860E86}"/>
+                </a:ext>
+              </a:extLst>
+            </p:cNvPr>
+            <p:cNvCxnSpPr>
+              <a:cxnSpLocks/>
+            </p:cNvCxnSpPr>
+            <p:nvPr/>
+          </p:nvCxnSpPr>
+          <p:spPr>
+            <a:xfrm>
+              <a:off x="5362042" y="4139513"/>
+              <a:ext cx="93600" cy="39600"/>
+            </a:xfrm>
+            <a:prstGeom prst="line">
+              <a:avLst/>
+            </a:prstGeom>
+            <a:ln>
+              <a:solidFill>
+                <a:schemeClr val="accent2"/>
+              </a:solidFill>
+            </a:ln>
+          </p:spPr>
+          <p:style>
+            <a:lnRef idx="1">
+              <a:schemeClr val="accent1"/>
+            </a:lnRef>
+            <a:fillRef idx="0">
+              <a:schemeClr val="accent1"/>
+            </a:fillRef>
+            <a:effectRef idx="0">
+              <a:schemeClr val="accent1"/>
+            </a:effectRef>
+            <a:fontRef idx="minor">
+              <a:schemeClr val="tx1"/>
+            </a:fontRef>
+          </p:style>
+        </p:cxnSp>
+      </p:grpSp>
+      <p:sp>
+        <p:nvSpPr>
+          <p:cNvPr id="34" name="TextBox 33">
+            <a:extLst>
+              <a:ext uri="{FF2B5EF4-FFF2-40B4-BE49-F238E27FC236}">
+                <a16:creationId xmlns:a16="http://schemas.microsoft.com/office/drawing/2014/main" id="{0B927B75-430A-4F7F-9B76-EB7C6B97A450}"/>
               </a:ext>
             </a:extLst>
           </p:cNvPr>
@@ -13800,8 +14761,8 @@
         </p:nvSpPr>
         <p:spPr>
           <a:xfrm>
-            <a:off x="1890186" y="1394419"/>
-            <a:ext cx="838200" cy="276999"/>
+            <a:off x="1887008" y="2618379"/>
+            <a:ext cx="652240" cy="215444"/>
           </a:xfrm>
           <a:prstGeom prst="rect">
             <a:avLst/>
@@ -13815,18 +14776,175 @@
           <a:lstStyle/>
           <a:p>
             <a:r>
-              <a:rPr lang="en-US" sz="1200" dirty="0"/>
-              <a:t>Command</a:t>
-            </a:r>
-          </a:p>
-        </p:txBody>
-      </p:sp>
-      <p:sp>
-        <p:nvSpPr>
-          <p:cNvPr id="5" name="TextBox 4">
-            <a:extLst>
-              <a:ext uri="{FF2B5EF4-FFF2-40B4-BE49-F238E27FC236}">
-                <a16:creationId xmlns:a16="http://schemas.microsoft.com/office/drawing/2014/main" id="{FC90EC1C-26EF-EA42-A983-4F878F666DD7}"/>
+              <a:rPr lang="en-US" sz="800" dirty="0"/>
+              <a:t>command</a:t>
+            </a:r>
+          </a:p>
+        </p:txBody>
+      </p:sp>
+      <p:grpSp>
+        <p:nvGrpSpPr>
+          <p:cNvPr id="214" name="Group 213">
+            <a:extLst>
+              <a:ext uri="{FF2B5EF4-FFF2-40B4-BE49-F238E27FC236}">
+                <a16:creationId xmlns:a16="http://schemas.microsoft.com/office/drawing/2014/main" id="{60E26FD0-3576-471D-B79E-81C79B29B497}"/>
+              </a:ext>
+            </a:extLst>
+          </p:cNvPr>
+          <p:cNvGrpSpPr/>
+          <p:nvPr/>
+        </p:nvGrpSpPr>
+        <p:grpSpPr>
+          <a:xfrm>
+            <a:off x="3485733" y="6003172"/>
+            <a:ext cx="113349" cy="229735"/>
+            <a:chOff x="892968" y="2808822"/>
+            <a:chExt cx="113349" cy="229735"/>
+          </a:xfrm>
+        </p:grpSpPr>
+        <p:cxnSp>
+          <p:nvCxnSpPr>
+            <p:cNvPr id="37" name="Straight Connector 36">
+              <a:extLst>
+                <a:ext uri="{FF2B5EF4-FFF2-40B4-BE49-F238E27FC236}">
+                  <a16:creationId xmlns:a16="http://schemas.microsoft.com/office/drawing/2014/main" id="{183F2BEF-40D2-4955-9040-32B88FE9D9A9}"/>
+                </a:ext>
+              </a:extLst>
+            </p:cNvPr>
+            <p:cNvCxnSpPr>
+              <a:cxnSpLocks/>
+            </p:cNvCxnSpPr>
+            <p:nvPr/>
+          </p:nvCxnSpPr>
+          <p:spPr>
+            <a:xfrm flipV="1">
+              <a:off x="927250" y="2899492"/>
+              <a:ext cx="79067" cy="64572"/>
+            </a:xfrm>
+            <a:prstGeom prst="line">
+              <a:avLst/>
+            </a:prstGeom>
+            <a:ln>
+              <a:solidFill>
+                <a:schemeClr val="accent2"/>
+              </a:solidFill>
+            </a:ln>
+          </p:spPr>
+          <p:style>
+            <a:lnRef idx="1">
+              <a:schemeClr val="accent1"/>
+            </a:lnRef>
+            <a:fillRef idx="0">
+              <a:schemeClr val="accent1"/>
+            </a:fillRef>
+            <a:effectRef idx="0">
+              <a:schemeClr val="accent1"/>
+            </a:effectRef>
+            <a:fontRef idx="minor">
+              <a:schemeClr val="tx1"/>
+            </a:fontRef>
+          </p:style>
+        </p:cxnSp>
+        <p:cxnSp>
+          <p:nvCxnSpPr>
+            <p:cNvPr id="38" name="Straight Connector 37">
+              <a:extLst>
+                <a:ext uri="{FF2B5EF4-FFF2-40B4-BE49-F238E27FC236}">
+                  <a16:creationId xmlns:a16="http://schemas.microsoft.com/office/drawing/2014/main" id="{73F3630B-AC12-4BA1-A2B7-3EC721B370E2}"/>
+                </a:ext>
+              </a:extLst>
+            </p:cNvPr>
+            <p:cNvCxnSpPr>
+              <a:cxnSpLocks/>
+            </p:cNvCxnSpPr>
+            <p:nvPr/>
+          </p:nvCxnSpPr>
+          <p:spPr>
+            <a:xfrm>
+              <a:off x="927310" y="2971435"/>
+              <a:ext cx="78948" cy="67122"/>
+            </a:xfrm>
+            <a:prstGeom prst="line">
+              <a:avLst/>
+            </a:prstGeom>
+            <a:ln>
+              <a:solidFill>
+                <a:schemeClr val="accent2"/>
+              </a:solidFill>
+            </a:ln>
+          </p:spPr>
+          <p:style>
+            <a:lnRef idx="1">
+              <a:schemeClr val="accent1"/>
+            </a:lnRef>
+            <a:fillRef idx="0">
+              <a:schemeClr val="accent1"/>
+            </a:fillRef>
+            <a:effectRef idx="0">
+              <a:schemeClr val="accent1"/>
+            </a:effectRef>
+            <a:fontRef idx="minor">
+              <a:schemeClr val="tx1"/>
+            </a:fontRef>
+          </p:style>
+        </p:cxnSp>
+        <p:cxnSp>
+          <p:nvCxnSpPr>
+            <p:cNvPr id="69" name="Curved Connector 16">
+              <a:extLst>
+                <a:ext uri="{FF2B5EF4-FFF2-40B4-BE49-F238E27FC236}">
+                  <a16:creationId xmlns:a16="http://schemas.microsoft.com/office/drawing/2014/main" id="{5DB44956-D500-404F-99AD-9FB7E1A6B429}"/>
+                </a:ext>
+              </a:extLst>
+            </p:cNvPr>
+            <p:cNvCxnSpPr>
+              <a:cxnSpLocks/>
+            </p:cNvCxnSpPr>
+            <p:nvPr/>
+          </p:nvCxnSpPr>
+          <p:spPr>
+            <a:xfrm rot="16200000" flipH="1">
+              <a:off x="840236" y="2861554"/>
+              <a:ext cx="162613" cy="57149"/>
+            </a:xfrm>
+            <a:prstGeom prst="curvedConnector4">
+              <a:avLst>
+                <a:gd name="adj1" fmla="val 6204"/>
+                <a:gd name="adj2" fmla="val 500007"/>
+              </a:avLst>
+            </a:prstGeom>
+            <a:ln w="9525" cap="flat" cmpd="sng" algn="ctr">
+              <a:solidFill>
+                <a:schemeClr val="accent2"/>
+              </a:solidFill>
+              <a:prstDash val="dash"/>
+              <a:round/>
+              <a:headEnd type="none" w="med" len="med"/>
+              <a:tailEnd type="none" w="med" len="med"/>
+            </a:ln>
+          </p:spPr>
+          <p:style>
+            <a:lnRef idx="0">
+              <a:scrgbClr r="0" g="0" b="0"/>
+            </a:lnRef>
+            <a:fillRef idx="0">
+              <a:scrgbClr r="0" g="0" b="0"/>
+            </a:fillRef>
+            <a:effectRef idx="0">
+              <a:scrgbClr r="0" g="0" b="0"/>
+            </a:effectRef>
+            <a:fontRef idx="minor">
+              <a:schemeClr val="tx1"/>
+            </a:fontRef>
+          </p:style>
+        </p:cxnSp>
+      </p:grpSp>
+      <p:sp>
+        <p:nvSpPr>
+          <p:cNvPr id="73" name="TextBox 72">
+            <a:extLst>
+              <a:ext uri="{FF2B5EF4-FFF2-40B4-BE49-F238E27FC236}">
+                <a16:creationId xmlns:a16="http://schemas.microsoft.com/office/drawing/2014/main" id="{41BDDB96-6C07-45EB-80F9-4694663E3C3E}"/>
               </a:ext>
             </a:extLst>
           </p:cNvPr>
@@ -13835,8 +14953,8 @@
         </p:nvSpPr>
         <p:spPr>
           <a:xfrm>
-            <a:off x="6269131" y="1476038"/>
-            <a:ext cx="838200" cy="276999"/>
+            <a:off x="1131588" y="2808822"/>
+            <a:ext cx="652240" cy="215444"/>
           </a:xfrm>
           <a:prstGeom prst="rect">
             <a:avLst/>
@@ -13850,18 +14968,290 @@
           <a:lstStyle/>
           <a:p>
             <a:r>
-              <a:rPr lang="en-US" sz="1200" dirty="0"/>
-              <a:t>Timetable</a:t>
-            </a:r>
-          </a:p>
-        </p:txBody>
-      </p:sp>
-      <p:sp>
-        <p:nvSpPr>
-          <p:cNvPr id="6" name="Rectangle 5">
-            <a:extLst>
-              <a:ext uri="{FF2B5EF4-FFF2-40B4-BE49-F238E27FC236}">
-                <a16:creationId xmlns:a16="http://schemas.microsoft.com/office/drawing/2014/main" id="{4B1A462D-5FD0-2745-846B-5E372FECA0CE}"/>
+              <a:rPr lang="en-US" sz="800" dirty="0"/>
+              <a:t>command</a:t>
+            </a:r>
+          </a:p>
+        </p:txBody>
+      </p:sp>
+      <p:cxnSp>
+        <p:nvCxnSpPr>
+          <p:cNvPr id="78" name="Straight Arrow Connector 77">
+            <a:extLst>
+              <a:ext uri="{FF2B5EF4-FFF2-40B4-BE49-F238E27FC236}">
+                <a16:creationId xmlns:a16="http://schemas.microsoft.com/office/drawing/2014/main" id="{33052DB0-5977-4E84-97A7-3B376ABD9A00}"/>
+              </a:ext>
+            </a:extLst>
+          </p:cNvPr>
+          <p:cNvCxnSpPr>
+            <a:cxnSpLocks/>
+            <a:stCxn id="7" idx="2"/>
+          </p:cNvCxnSpPr>
+          <p:nvPr/>
+        </p:nvCxnSpPr>
+        <p:spPr>
+          <a:xfrm flipH="1">
+            <a:off x="24049" y="3124198"/>
+            <a:ext cx="851876" cy="0"/>
+          </a:xfrm>
+          <a:prstGeom prst="straightConnector1">
+            <a:avLst/>
+          </a:prstGeom>
+          <a:ln w="9525" cap="flat" cmpd="sng" algn="ctr">
+            <a:solidFill>
+              <a:schemeClr val="accent2"/>
+            </a:solidFill>
+            <a:prstDash val="dash"/>
+            <a:round/>
+            <a:headEnd type="none" w="med" len="med"/>
+            <a:tailEnd type="none" w="med" len="med"/>
+          </a:ln>
+        </p:spPr>
+        <p:style>
+          <a:lnRef idx="0">
+            <a:scrgbClr r="0" g="0" b="0"/>
+          </a:lnRef>
+          <a:fillRef idx="0">
+            <a:scrgbClr r="0" g="0" b="0"/>
+          </a:fillRef>
+          <a:effectRef idx="0">
+            <a:scrgbClr r="0" g="0" b="0"/>
+          </a:effectRef>
+          <a:fontRef idx="minor">
+            <a:schemeClr val="tx1"/>
+          </a:fontRef>
+        </p:style>
+      </p:cxnSp>
+      <p:grpSp>
+        <p:nvGrpSpPr>
+          <p:cNvPr id="82" name="Group 81">
+            <a:extLst>
+              <a:ext uri="{FF2B5EF4-FFF2-40B4-BE49-F238E27FC236}">
+                <a16:creationId xmlns:a16="http://schemas.microsoft.com/office/drawing/2014/main" id="{CEB34F2A-B69B-42B4-A5CB-52E96B018E80}"/>
+              </a:ext>
+            </a:extLst>
+          </p:cNvPr>
+          <p:cNvGrpSpPr/>
+          <p:nvPr/>
+        </p:nvGrpSpPr>
+        <p:grpSpPr>
+          <a:xfrm>
+            <a:off x="23674" y="3085349"/>
+            <a:ext cx="95838" cy="77697"/>
+            <a:chOff x="3438865" y="4381504"/>
+            <a:chExt cx="95838" cy="77697"/>
+          </a:xfrm>
+        </p:grpSpPr>
+        <p:cxnSp>
+          <p:nvCxnSpPr>
+            <p:cNvPr id="83" name="Straight Connector 82">
+              <a:extLst>
+                <a:ext uri="{FF2B5EF4-FFF2-40B4-BE49-F238E27FC236}">
+                  <a16:creationId xmlns:a16="http://schemas.microsoft.com/office/drawing/2014/main" id="{1B085482-1A64-4765-9731-E9FD1638E250}"/>
+                </a:ext>
+              </a:extLst>
+            </p:cNvPr>
+            <p:cNvCxnSpPr>
+              <a:cxnSpLocks/>
+            </p:cNvCxnSpPr>
+            <p:nvPr/>
+          </p:nvCxnSpPr>
+          <p:spPr>
+            <a:xfrm flipV="1">
+              <a:off x="3438865" y="4381504"/>
+              <a:ext cx="93742" cy="38096"/>
+            </a:xfrm>
+            <a:prstGeom prst="line">
+              <a:avLst/>
+            </a:prstGeom>
+            <a:ln>
+              <a:solidFill>
+                <a:schemeClr val="accent2"/>
+              </a:solidFill>
+            </a:ln>
+          </p:spPr>
+          <p:style>
+            <a:lnRef idx="1">
+              <a:schemeClr val="accent1"/>
+            </a:lnRef>
+            <a:fillRef idx="0">
+              <a:schemeClr val="accent1"/>
+            </a:fillRef>
+            <a:effectRef idx="0">
+              <a:schemeClr val="accent1"/>
+            </a:effectRef>
+            <a:fontRef idx="minor">
+              <a:schemeClr val="tx1"/>
+            </a:fontRef>
+          </p:style>
+        </p:cxnSp>
+        <p:cxnSp>
+          <p:nvCxnSpPr>
+            <p:cNvPr id="84" name="Straight Connector 83">
+              <a:extLst>
+                <a:ext uri="{FF2B5EF4-FFF2-40B4-BE49-F238E27FC236}">
+                  <a16:creationId xmlns:a16="http://schemas.microsoft.com/office/drawing/2014/main" id="{AE81B9FD-ADB3-489F-8A73-4924EDC7E4FA}"/>
+                </a:ext>
+              </a:extLst>
+            </p:cNvPr>
+            <p:cNvCxnSpPr>
+              <a:cxnSpLocks/>
+            </p:cNvCxnSpPr>
+            <p:nvPr/>
+          </p:nvCxnSpPr>
+          <p:spPr>
+            <a:xfrm>
+              <a:off x="3441103" y="4419601"/>
+              <a:ext cx="93600" cy="39600"/>
+            </a:xfrm>
+            <a:prstGeom prst="line">
+              <a:avLst/>
+            </a:prstGeom>
+            <a:ln>
+              <a:solidFill>
+                <a:schemeClr val="accent2"/>
+              </a:solidFill>
+            </a:ln>
+          </p:spPr>
+          <p:style>
+            <a:lnRef idx="1">
+              <a:schemeClr val="accent1"/>
+            </a:lnRef>
+            <a:fillRef idx="0">
+              <a:schemeClr val="accent1"/>
+            </a:fillRef>
+            <a:effectRef idx="0">
+              <a:schemeClr val="accent1"/>
+            </a:effectRef>
+            <a:fontRef idx="minor">
+              <a:schemeClr val="tx1"/>
+            </a:fontRef>
+          </p:style>
+        </p:cxnSp>
+      </p:grpSp>
+      <p:sp>
+        <p:nvSpPr>
+          <p:cNvPr id="85" name="TextBox 84">
+            <a:extLst>
+              <a:ext uri="{FF2B5EF4-FFF2-40B4-BE49-F238E27FC236}">
+                <a16:creationId xmlns:a16="http://schemas.microsoft.com/office/drawing/2014/main" id="{57092EA9-5445-4F8C-AA7A-A514A1AD8521}"/>
+              </a:ext>
+            </a:extLst>
+          </p:cNvPr>
+          <p:cNvSpPr txBox="1"/>
+          <p:nvPr/>
+        </p:nvSpPr>
+        <p:spPr>
+          <a:xfrm>
+            <a:off x="143399" y="2930835"/>
+            <a:ext cx="652240" cy="215444"/>
+          </a:xfrm>
+          <a:prstGeom prst="rect">
+            <a:avLst/>
+          </a:prstGeom>
+          <a:noFill/>
+        </p:spPr>
+        <p:txBody>
+          <a:bodyPr wrap="square" rtlCol="0">
+            <a:spAutoFit/>
+          </a:bodyPr>
+          <a:lstStyle/>
+          <a:p>
+            <a:r>
+              <a:rPr lang="en-US" sz="800" dirty="0"/>
+              <a:t>command</a:t>
+            </a:r>
+          </a:p>
+        </p:txBody>
+      </p:sp>
+      <p:cxnSp>
+        <p:nvCxnSpPr>
+          <p:cNvPr id="87" name="Straight Arrow Connector 86">
+            <a:extLst>
+              <a:ext uri="{FF2B5EF4-FFF2-40B4-BE49-F238E27FC236}">
+                <a16:creationId xmlns:a16="http://schemas.microsoft.com/office/drawing/2014/main" id="{DE978A6A-75A8-4869-A83B-C66D6D40EEBD}"/>
+              </a:ext>
+            </a:extLst>
+          </p:cNvPr>
+          <p:cNvCxnSpPr>
+            <a:cxnSpLocks/>
+          </p:cNvCxnSpPr>
+          <p:nvPr/>
+        </p:nvCxnSpPr>
+        <p:spPr>
+          <a:xfrm flipV="1">
+            <a:off x="23674" y="3451017"/>
+            <a:ext cx="3372386" cy="7161"/>
+          </a:xfrm>
+          <a:prstGeom prst="straightConnector1">
+            <a:avLst/>
+          </a:prstGeom>
+          <a:ln w="9525" cap="flat" cmpd="sng" algn="ctr">
+            <a:solidFill>
+              <a:schemeClr val="accent2"/>
+            </a:solidFill>
+            <a:prstDash val="solid"/>
+            <a:round/>
+            <a:headEnd type="none" w="med" len="med"/>
+            <a:tailEnd type="arrow" w="med" len="med"/>
+          </a:ln>
+        </p:spPr>
+        <p:style>
+          <a:lnRef idx="0">
+            <a:scrgbClr r="0" g="0" b="0"/>
+          </a:lnRef>
+          <a:fillRef idx="0">
+            <a:scrgbClr r="0" g="0" b="0"/>
+          </a:fillRef>
+          <a:effectRef idx="0">
+            <a:scrgbClr r="0" g="0" b="0"/>
+          </a:effectRef>
+          <a:fontRef idx="minor">
+            <a:schemeClr val="tx1"/>
+          </a:fontRef>
+        </p:style>
+      </p:cxnSp>
+      <p:sp>
+        <p:nvSpPr>
+          <p:cNvPr id="89" name="TextBox 88">
+            <a:extLst>
+              <a:ext uri="{FF2B5EF4-FFF2-40B4-BE49-F238E27FC236}">
+                <a16:creationId xmlns:a16="http://schemas.microsoft.com/office/drawing/2014/main" id="{CBCF2D11-4CE4-44BD-A1F8-19A590E8D881}"/>
+              </a:ext>
+            </a:extLst>
+          </p:cNvPr>
+          <p:cNvSpPr txBox="1"/>
+          <p:nvPr/>
+        </p:nvSpPr>
+        <p:spPr>
+          <a:xfrm>
+            <a:off x="1192929" y="3246999"/>
+            <a:ext cx="1033876" cy="215444"/>
+          </a:xfrm>
+          <a:prstGeom prst="rect">
+            <a:avLst/>
+          </a:prstGeom>
+          <a:noFill/>
+        </p:spPr>
+        <p:txBody>
+          <a:bodyPr wrap="square" rtlCol="0">
+            <a:spAutoFit/>
+          </a:bodyPr>
+          <a:lstStyle/>
+          <a:p>
+            <a:r>
+              <a:rPr lang="en-US" sz="800" dirty="0"/>
+              <a:t>executeCommand()</a:t>
+            </a:r>
+          </a:p>
+        </p:txBody>
+      </p:sp>
+      <p:sp>
+        <p:nvSpPr>
+          <p:cNvPr id="90" name="Rectangle 89">
+            <a:extLst>
+              <a:ext uri="{FF2B5EF4-FFF2-40B4-BE49-F238E27FC236}">
+                <a16:creationId xmlns:a16="http://schemas.microsoft.com/office/drawing/2014/main" id="{331281C3-02A9-4438-87C6-D32D558CBAB0}"/>
               </a:ext>
             </a:extLst>
           </p:cNvPr>
@@ -13870,8 +15260,242 @@
         </p:nvSpPr>
         <p:spPr>
           <a:xfrm>
-            <a:off x="609600" y="1752600"/>
-            <a:ext cx="1143000" cy="304800"/>
+            <a:off x="3397079" y="3451017"/>
+            <a:ext cx="124439" cy="2774344"/>
+          </a:xfrm>
+          <a:prstGeom prst="rect">
+            <a:avLst/>
+          </a:prstGeom>
+          <a:ln w="12700">
+            <a:solidFill>
+              <a:schemeClr val="accent2"/>
+            </a:solidFill>
+          </a:ln>
+        </p:spPr>
+        <p:style>
+          <a:lnRef idx="2">
+            <a:schemeClr val="accent6"/>
+          </a:lnRef>
+          <a:fillRef idx="1">
+            <a:schemeClr val="lt1"/>
+          </a:fillRef>
+          <a:effectRef idx="0">
+            <a:schemeClr val="accent6"/>
+          </a:effectRef>
+          <a:fontRef idx="minor">
+            <a:schemeClr val="dk1"/>
+          </a:fontRef>
+        </p:style>
+        <p:txBody>
+          <a:bodyPr rtlCol="0" anchor="ctr"/>
+          <a:lstStyle/>
+          <a:p>
+            <a:pPr algn="ctr"/>
+            <a:endParaRPr lang="en-US" dirty="0"/>
+          </a:p>
+        </p:txBody>
+      </p:sp>
+      <p:sp>
+        <p:nvSpPr>
+          <p:cNvPr id="94" name="TextBox 93">
+            <a:extLst>
+              <a:ext uri="{FF2B5EF4-FFF2-40B4-BE49-F238E27FC236}">
+                <a16:creationId xmlns:a16="http://schemas.microsoft.com/office/drawing/2014/main" id="{9B0B3B15-9199-4924-A07A-6F325752C751}"/>
+              </a:ext>
+            </a:extLst>
+          </p:cNvPr>
+          <p:cNvSpPr txBox="1"/>
+          <p:nvPr/>
+        </p:nvSpPr>
+        <p:spPr>
+          <a:xfrm>
+            <a:off x="3518809" y="3386887"/>
+            <a:ext cx="1158415" cy="215444"/>
+          </a:xfrm>
+          <a:prstGeom prst="rect">
+            <a:avLst/>
+          </a:prstGeom>
+          <a:noFill/>
+        </p:spPr>
+        <p:txBody>
+          <a:bodyPr wrap="square" rtlCol="0">
+            <a:spAutoFit/>
+          </a:bodyPr>
+          <a:lstStyle/>
+          <a:p>
+            <a:r>
+              <a:rPr lang="en-US" sz="800" dirty="0" err="1"/>
+              <a:t>storeModule</a:t>
+            </a:r>
+            <a:r>
+              <a:rPr lang="en-US" sz="800" dirty="0"/>
+              <a:t>()</a:t>
+            </a:r>
+          </a:p>
+        </p:txBody>
+      </p:sp>
+      <p:cxnSp>
+        <p:nvCxnSpPr>
+          <p:cNvPr id="95" name="Curved Connector 16">
+            <a:extLst>
+              <a:ext uri="{FF2B5EF4-FFF2-40B4-BE49-F238E27FC236}">
+                <a16:creationId xmlns:a16="http://schemas.microsoft.com/office/drawing/2014/main" id="{4071B015-A036-4E89-B37B-60A8A58F8853}"/>
+              </a:ext>
+            </a:extLst>
+          </p:cNvPr>
+          <p:cNvCxnSpPr>
+            <a:cxnSpLocks/>
+          </p:cNvCxnSpPr>
+          <p:nvPr/>
+        </p:nvCxnSpPr>
+        <p:spPr>
+          <a:xfrm rot="16200000" flipH="1">
+            <a:off x="3466221" y="3636934"/>
+            <a:ext cx="162613" cy="57149"/>
+          </a:xfrm>
+          <a:prstGeom prst="curvedConnector4">
+            <a:avLst>
+              <a:gd name="adj1" fmla="val 6204"/>
+              <a:gd name="adj2" fmla="val 500007"/>
+            </a:avLst>
+          </a:prstGeom>
+          <a:ln w="9525" cap="flat" cmpd="sng" algn="ctr">
+            <a:solidFill>
+              <a:schemeClr val="accent2"/>
+            </a:solidFill>
+            <a:prstDash val="solid"/>
+            <a:round/>
+            <a:headEnd type="none" w="med" len="med"/>
+            <a:tailEnd type="arrow" w="med" len="med"/>
+          </a:ln>
+        </p:spPr>
+        <p:style>
+          <a:lnRef idx="0">
+            <a:scrgbClr r="0" g="0" b="0"/>
+          </a:lnRef>
+          <a:fillRef idx="0">
+            <a:scrgbClr r="0" g="0" b="0"/>
+          </a:fillRef>
+          <a:effectRef idx="0">
+            <a:scrgbClr r="0" g="0" b="0"/>
+          </a:effectRef>
+          <a:fontRef idx="minor">
+            <a:schemeClr val="tx1"/>
+          </a:fontRef>
+        </p:style>
+      </p:cxnSp>
+      <p:sp>
+        <p:nvSpPr>
+          <p:cNvPr id="96" name="Rectangle 95">
+            <a:extLst>
+              <a:ext uri="{FF2B5EF4-FFF2-40B4-BE49-F238E27FC236}">
+                <a16:creationId xmlns:a16="http://schemas.microsoft.com/office/drawing/2014/main" id="{519BD547-D24B-475F-B0B8-3F7ADDE4A8C2}"/>
+              </a:ext>
+            </a:extLst>
+          </p:cNvPr>
+          <p:cNvSpPr/>
+          <p:nvPr/>
+        </p:nvSpPr>
+        <p:spPr>
+          <a:xfrm>
+            <a:off x="3464653" y="3746815"/>
+            <a:ext cx="124439" cy="2277106"/>
+          </a:xfrm>
+          <a:prstGeom prst="rect">
+            <a:avLst/>
+          </a:prstGeom>
+          <a:ln w="12700">
+            <a:solidFill>
+              <a:schemeClr val="accent2"/>
+            </a:solidFill>
+          </a:ln>
+        </p:spPr>
+        <p:style>
+          <a:lnRef idx="2">
+            <a:schemeClr val="accent6"/>
+          </a:lnRef>
+          <a:fillRef idx="1">
+            <a:schemeClr val="lt1"/>
+          </a:fillRef>
+          <a:effectRef idx="0">
+            <a:schemeClr val="accent6"/>
+          </a:effectRef>
+          <a:fontRef idx="minor">
+            <a:schemeClr val="dk1"/>
+          </a:fontRef>
+        </p:style>
+        <p:txBody>
+          <a:bodyPr rtlCol="0" anchor="ctr"/>
+          <a:lstStyle/>
+          <a:p>
+            <a:pPr algn="ctr"/>
+            <a:endParaRPr lang="en-US" dirty="0"/>
+          </a:p>
+        </p:txBody>
+      </p:sp>
+      <p:cxnSp>
+        <p:nvCxnSpPr>
+          <p:cNvPr id="97" name="Straight Arrow Connector 96">
+            <a:extLst>
+              <a:ext uri="{FF2B5EF4-FFF2-40B4-BE49-F238E27FC236}">
+                <a16:creationId xmlns:a16="http://schemas.microsoft.com/office/drawing/2014/main" id="{07561EAB-B760-409A-A8CD-99EE2E2F251C}"/>
+              </a:ext>
+            </a:extLst>
+          </p:cNvPr>
+          <p:cNvCxnSpPr>
+            <a:cxnSpLocks/>
+          </p:cNvCxnSpPr>
+          <p:nvPr/>
+        </p:nvCxnSpPr>
+        <p:spPr>
+          <a:xfrm>
+            <a:off x="3595026" y="4038600"/>
+            <a:ext cx="2246933" cy="0"/>
+          </a:xfrm>
+          <a:prstGeom prst="straightConnector1">
+            <a:avLst/>
+          </a:prstGeom>
+          <a:ln w="9525" cap="flat" cmpd="sng" algn="ctr">
+            <a:solidFill>
+              <a:schemeClr val="accent2"/>
+            </a:solidFill>
+            <a:prstDash val="solid"/>
+            <a:round/>
+            <a:headEnd type="none" w="med" len="med"/>
+            <a:tailEnd type="arrow" w="med" len="med"/>
+          </a:ln>
+        </p:spPr>
+        <p:style>
+          <a:lnRef idx="0">
+            <a:scrgbClr r="0" g="0" b="0"/>
+          </a:lnRef>
+          <a:fillRef idx="0">
+            <a:scrgbClr r="0" g="0" b="0"/>
+          </a:fillRef>
+          <a:effectRef idx="0">
+            <a:scrgbClr r="0" g="0" b="0"/>
+          </a:effectRef>
+          <a:fontRef idx="minor">
+            <a:schemeClr val="tx1"/>
+          </a:fontRef>
+        </p:style>
+      </p:cxnSp>
+      <p:sp>
+        <p:nvSpPr>
+          <p:cNvPr id="99" name="Rectangle 98">
+            <a:extLst>
+              <a:ext uri="{FF2B5EF4-FFF2-40B4-BE49-F238E27FC236}">
+                <a16:creationId xmlns:a16="http://schemas.microsoft.com/office/drawing/2014/main" id="{43E610C6-C037-4545-9EEC-A1FE22811C4A}"/>
+              </a:ext>
+            </a:extLst>
+          </p:cNvPr>
+          <p:cNvSpPr/>
+          <p:nvPr/>
+        </p:nvSpPr>
+        <p:spPr>
+          <a:xfrm>
+            <a:off x="5334001" y="3360715"/>
+            <a:ext cx="1143000" cy="296885"/>
           </a:xfrm>
           <a:prstGeom prst="rect">
             <a:avLst/>
@@ -13909,65 +15533,19 @@
           <a:p>
             <a:pPr algn="ctr"/>
             <a:r>
-              <a:rPr lang="en-US" sz="800" dirty="0"/>
-              <a:t>:Parser</a:t>
-            </a:r>
-          </a:p>
-        </p:txBody>
-      </p:sp>
-      <p:cxnSp>
-        <p:nvCxnSpPr>
-          <p:cNvPr id="8" name="Straight Connector 7">
-            <a:extLst>
-              <a:ext uri="{FF2B5EF4-FFF2-40B4-BE49-F238E27FC236}">
-                <a16:creationId xmlns:a16="http://schemas.microsoft.com/office/drawing/2014/main" id="{05FDED9C-0535-074D-A76C-F2E927F7EBBC}"/>
-              </a:ext>
-            </a:extLst>
-          </p:cNvPr>
-          <p:cNvCxnSpPr>
-            <a:cxnSpLocks/>
-          </p:cNvCxnSpPr>
-          <p:nvPr/>
-        </p:nvCxnSpPr>
-        <p:spPr>
-          <a:xfrm>
-            <a:off x="1143000" y="2057400"/>
-            <a:ext cx="0" cy="3719912"/>
-          </a:xfrm>
-          <a:prstGeom prst="line">
-            <a:avLst/>
-          </a:prstGeom>
-          <a:ln w="9525" cap="flat" cmpd="sng" algn="ctr">
-            <a:solidFill>
-              <a:schemeClr val="accent2"/>
-            </a:solidFill>
-            <a:prstDash val="dash"/>
-            <a:round/>
-            <a:headEnd type="none" w="med" len="med"/>
-            <a:tailEnd type="none" w="med" len="med"/>
-          </a:ln>
-        </p:spPr>
-        <p:style>
-          <a:lnRef idx="0">
-            <a:scrgbClr r="0" g="0" b="0"/>
-          </a:lnRef>
-          <a:fillRef idx="0">
-            <a:scrgbClr r="0" g="0" b="0"/>
-          </a:fillRef>
-          <a:effectRef idx="0">
-            <a:scrgbClr r="0" g="0" b="0"/>
-          </a:effectRef>
-          <a:fontRef idx="minor">
-            <a:schemeClr val="tx1"/>
-          </a:fontRef>
-        </p:style>
-      </p:cxnSp>
-      <p:sp>
-        <p:nvSpPr>
-          <p:cNvPr id="9" name="Rectangle 8">
-            <a:extLst>
-              <a:ext uri="{FF2B5EF4-FFF2-40B4-BE49-F238E27FC236}">
-                <a16:creationId xmlns:a16="http://schemas.microsoft.com/office/drawing/2014/main" id="{B334A720-FF53-4E46-8BA5-C1C27775B33F}"/>
+              <a:rPr lang="en-US" sz="800" dirty="0" err="1"/>
+              <a:t>moduleList:ModuleList</a:t>
+            </a:r>
+            <a:endParaRPr lang="en-US" sz="800" dirty="0"/>
+          </a:p>
+        </p:txBody>
+      </p:sp>
+      <p:sp>
+        <p:nvSpPr>
+          <p:cNvPr id="100" name="Rectangle 99">
+            <a:extLst>
+              <a:ext uri="{FF2B5EF4-FFF2-40B4-BE49-F238E27FC236}">
+                <a16:creationId xmlns:a16="http://schemas.microsoft.com/office/drawing/2014/main" id="{385A11EA-FE17-4897-B074-CD4202D067CD}"/>
               </a:ext>
             </a:extLst>
           </p:cNvPr>
@@ -13976,8 +15554,8 @@
         </p:nvSpPr>
         <p:spPr>
           <a:xfrm>
-            <a:off x="1085851" y="2362200"/>
-            <a:ext cx="114298" cy="2895600"/>
+            <a:off x="5841738" y="4040476"/>
+            <a:ext cx="124433" cy="233986"/>
           </a:xfrm>
           <a:prstGeom prst="rect">
             <a:avLst/>
@@ -14011,22 +15589,213 @@
           </a:p>
         </p:txBody>
       </p:sp>
+      <p:grpSp>
+        <p:nvGrpSpPr>
+          <p:cNvPr id="112" name="Group 111">
+            <a:extLst>
+              <a:ext uri="{FF2B5EF4-FFF2-40B4-BE49-F238E27FC236}">
+                <a16:creationId xmlns:a16="http://schemas.microsoft.com/office/drawing/2014/main" id="{552C1515-6772-4ED8-A810-3FFD3F8922F3}"/>
+              </a:ext>
+            </a:extLst>
+          </p:cNvPr>
+          <p:cNvGrpSpPr/>
+          <p:nvPr/>
+        </p:nvGrpSpPr>
+        <p:grpSpPr>
+          <a:xfrm>
+            <a:off x="3590877" y="4249713"/>
+            <a:ext cx="2295535" cy="85111"/>
+            <a:chOff x="5359804" y="4101416"/>
+            <a:chExt cx="2548643" cy="77697"/>
+          </a:xfrm>
+        </p:grpSpPr>
+        <p:cxnSp>
+          <p:nvCxnSpPr>
+            <p:cNvPr id="113" name="Straight Arrow Connector 112">
+              <a:extLst>
+                <a:ext uri="{FF2B5EF4-FFF2-40B4-BE49-F238E27FC236}">
+                  <a16:creationId xmlns:a16="http://schemas.microsoft.com/office/drawing/2014/main" id="{8EF26139-4DA5-4E8A-BADE-200EC267CEC4}"/>
+                </a:ext>
+              </a:extLst>
+            </p:cNvPr>
+            <p:cNvCxnSpPr>
+              <a:cxnSpLocks/>
+            </p:cNvCxnSpPr>
+            <p:nvPr/>
+          </p:nvCxnSpPr>
+          <p:spPr>
+            <a:xfrm flipH="1">
+              <a:off x="5418310" y="4126711"/>
+              <a:ext cx="2490137" cy="12440"/>
+            </a:xfrm>
+            <a:prstGeom prst="straightConnector1">
+              <a:avLst/>
+            </a:prstGeom>
+            <a:ln w="9525" cap="flat" cmpd="sng" algn="ctr">
+              <a:solidFill>
+                <a:schemeClr val="accent2"/>
+              </a:solidFill>
+              <a:prstDash val="dash"/>
+              <a:round/>
+              <a:headEnd type="none" w="med" len="med"/>
+              <a:tailEnd type="none" w="med" len="med"/>
+            </a:ln>
+          </p:spPr>
+          <p:style>
+            <a:lnRef idx="0">
+              <a:scrgbClr r="0" g="0" b="0"/>
+            </a:lnRef>
+            <a:fillRef idx="0">
+              <a:scrgbClr r="0" g="0" b="0"/>
+            </a:fillRef>
+            <a:effectRef idx="0">
+              <a:scrgbClr r="0" g="0" b="0"/>
+            </a:effectRef>
+            <a:fontRef idx="minor">
+              <a:schemeClr val="tx1"/>
+            </a:fontRef>
+          </p:style>
+        </p:cxnSp>
+        <p:cxnSp>
+          <p:nvCxnSpPr>
+            <p:cNvPr id="114" name="Straight Connector 113">
+              <a:extLst>
+                <a:ext uri="{FF2B5EF4-FFF2-40B4-BE49-F238E27FC236}">
+                  <a16:creationId xmlns:a16="http://schemas.microsoft.com/office/drawing/2014/main" id="{F0084B4B-87FE-427C-B978-D9EC1C059F91}"/>
+                </a:ext>
+              </a:extLst>
+            </p:cNvPr>
+            <p:cNvCxnSpPr>
+              <a:cxnSpLocks/>
+            </p:cNvCxnSpPr>
+            <p:nvPr/>
+          </p:nvCxnSpPr>
+          <p:spPr>
+            <a:xfrm flipV="1">
+              <a:off x="5359804" y="4101416"/>
+              <a:ext cx="93742" cy="38096"/>
+            </a:xfrm>
+            <a:prstGeom prst="line">
+              <a:avLst/>
+            </a:prstGeom>
+            <a:ln>
+              <a:solidFill>
+                <a:schemeClr val="accent2"/>
+              </a:solidFill>
+            </a:ln>
+          </p:spPr>
+          <p:style>
+            <a:lnRef idx="1">
+              <a:schemeClr val="accent1"/>
+            </a:lnRef>
+            <a:fillRef idx="0">
+              <a:schemeClr val="accent1"/>
+            </a:fillRef>
+            <a:effectRef idx="0">
+              <a:schemeClr val="accent1"/>
+            </a:effectRef>
+            <a:fontRef idx="minor">
+              <a:schemeClr val="tx1"/>
+            </a:fontRef>
+          </p:style>
+        </p:cxnSp>
+        <p:cxnSp>
+          <p:nvCxnSpPr>
+            <p:cNvPr id="115" name="Straight Connector 114">
+              <a:extLst>
+                <a:ext uri="{FF2B5EF4-FFF2-40B4-BE49-F238E27FC236}">
+                  <a16:creationId xmlns:a16="http://schemas.microsoft.com/office/drawing/2014/main" id="{4F9761F2-5C68-45BD-BAF3-6EBEAFF1DE32}"/>
+                </a:ext>
+              </a:extLst>
+            </p:cNvPr>
+            <p:cNvCxnSpPr>
+              <a:cxnSpLocks/>
+            </p:cNvCxnSpPr>
+            <p:nvPr/>
+          </p:nvCxnSpPr>
+          <p:spPr>
+            <a:xfrm>
+              <a:off x="5362042" y="4139513"/>
+              <a:ext cx="93600" cy="39600"/>
+            </a:xfrm>
+            <a:prstGeom prst="line">
+              <a:avLst/>
+            </a:prstGeom>
+            <a:ln>
+              <a:solidFill>
+                <a:schemeClr val="accent2"/>
+              </a:solidFill>
+            </a:ln>
+          </p:spPr>
+          <p:style>
+            <a:lnRef idx="1">
+              <a:schemeClr val="accent1"/>
+            </a:lnRef>
+            <a:fillRef idx="0">
+              <a:schemeClr val="accent1"/>
+            </a:fillRef>
+            <a:effectRef idx="0">
+              <a:schemeClr val="accent1"/>
+            </a:effectRef>
+            <a:fontRef idx="minor">
+              <a:schemeClr val="tx1"/>
+            </a:fontRef>
+          </p:style>
+        </p:cxnSp>
+      </p:grpSp>
+      <p:sp>
+        <p:nvSpPr>
+          <p:cNvPr id="116" name="TextBox 115">
+            <a:extLst>
+              <a:ext uri="{FF2B5EF4-FFF2-40B4-BE49-F238E27FC236}">
+                <a16:creationId xmlns:a16="http://schemas.microsoft.com/office/drawing/2014/main" id="{A03ED92C-1948-4857-9E28-448CF478036F}"/>
+              </a:ext>
+            </a:extLst>
+          </p:cNvPr>
+          <p:cNvSpPr txBox="1"/>
+          <p:nvPr/>
+        </p:nvSpPr>
+        <p:spPr>
+          <a:xfrm>
+            <a:off x="4377725" y="4222587"/>
+            <a:ext cx="585969" cy="215444"/>
+          </a:xfrm>
+          <a:prstGeom prst="rect">
+            <a:avLst/>
+          </a:prstGeom>
+          <a:noFill/>
+        </p:spPr>
+        <p:txBody>
+          <a:bodyPr wrap="square" rtlCol="0">
+            <a:spAutoFit/>
+          </a:bodyPr>
+          <a:lstStyle/>
+          <a:p>
+            <a:r>
+              <a:rPr lang="en-US" sz="800" dirty="0"/>
+              <a:t>message</a:t>
+            </a:r>
+          </a:p>
+        </p:txBody>
+      </p:sp>
       <p:cxnSp>
         <p:nvCxnSpPr>
-          <p:cNvPr id="11" name="Straight Arrow Connector 10">
-            <a:extLst>
-              <a:ext uri="{FF2B5EF4-FFF2-40B4-BE49-F238E27FC236}">
-                <a16:creationId xmlns:a16="http://schemas.microsoft.com/office/drawing/2014/main" id="{CF1E55E1-AA14-C34A-90FA-AD200EA06FE0}"/>
-              </a:ext>
-            </a:extLst>
-          </p:cNvPr>
-          <p:cNvCxnSpPr/>
+          <p:cNvPr id="149" name="Straight Arrow Connector 148">
+            <a:extLst>
+              <a:ext uri="{FF2B5EF4-FFF2-40B4-BE49-F238E27FC236}">
+                <a16:creationId xmlns:a16="http://schemas.microsoft.com/office/drawing/2014/main" id="{2D6890F5-78EE-4E20-BCB8-2D7D5A520DC3}"/>
+              </a:ext>
+            </a:extLst>
+          </p:cNvPr>
+          <p:cNvCxnSpPr>
+            <a:cxnSpLocks/>
+          </p:cNvCxnSpPr>
           <p:nvPr/>
         </p:nvCxnSpPr>
         <p:spPr>
           <a:xfrm>
-            <a:off x="228600" y="2362200"/>
-            <a:ext cx="857251" cy="0"/>
+            <a:off x="3590964" y="4600565"/>
+            <a:ext cx="3307244" cy="4883"/>
           </a:xfrm>
           <a:prstGeom prst="straightConnector1">
             <a:avLst/>
@@ -14058,10 +15827,59 @@
       </p:cxnSp>
       <p:sp>
         <p:nvSpPr>
-          <p:cNvPr id="12" name="TextBox 11">
-            <a:extLst>
-              <a:ext uri="{FF2B5EF4-FFF2-40B4-BE49-F238E27FC236}">
-                <a16:creationId xmlns:a16="http://schemas.microsoft.com/office/drawing/2014/main" id="{D8B1A527-42E6-6A41-8372-32CBD76BA54F}"/>
+          <p:cNvPr id="155" name="Rectangle 154">
+            <a:extLst>
+              <a:ext uri="{FF2B5EF4-FFF2-40B4-BE49-F238E27FC236}">
+                <a16:creationId xmlns:a16="http://schemas.microsoft.com/office/drawing/2014/main" id="{47783DE4-670B-42E8-AC7A-82BFEBF9F05F}"/>
+              </a:ext>
+            </a:extLst>
+          </p:cNvPr>
+          <p:cNvSpPr/>
+          <p:nvPr/>
+        </p:nvSpPr>
+        <p:spPr>
+          <a:xfrm>
+            <a:off x="6894014" y="4600564"/>
+            <a:ext cx="116386" cy="428635"/>
+          </a:xfrm>
+          <a:prstGeom prst="rect">
+            <a:avLst/>
+          </a:prstGeom>
+          <a:ln w="12700">
+            <a:solidFill>
+              <a:schemeClr val="accent2"/>
+            </a:solidFill>
+          </a:ln>
+        </p:spPr>
+        <p:style>
+          <a:lnRef idx="2">
+            <a:schemeClr val="accent6"/>
+          </a:lnRef>
+          <a:fillRef idx="1">
+            <a:schemeClr val="lt1"/>
+          </a:fillRef>
+          <a:effectRef idx="0">
+            <a:schemeClr val="accent6"/>
+          </a:effectRef>
+          <a:fontRef idx="minor">
+            <a:schemeClr val="dk1"/>
+          </a:fontRef>
+        </p:style>
+        <p:txBody>
+          <a:bodyPr rtlCol="0" anchor="ctr"/>
+          <a:lstStyle/>
+          <a:p>
+            <a:pPr algn="ctr"/>
+            <a:endParaRPr lang="en-US" dirty="0"/>
+          </a:p>
+        </p:txBody>
+      </p:sp>
+      <p:sp>
+        <p:nvSpPr>
+          <p:cNvPr id="161" name="TextBox 160">
+            <a:extLst>
+              <a:ext uri="{FF2B5EF4-FFF2-40B4-BE49-F238E27FC236}">
+                <a16:creationId xmlns:a16="http://schemas.microsoft.com/office/drawing/2014/main" id="{2286318C-7674-48AB-9F63-935D6F818837}"/>
               </a:ext>
             </a:extLst>
           </p:cNvPr>
@@ -14070,8 +15888,8 @@
         </p:nvSpPr>
         <p:spPr>
           <a:xfrm>
-            <a:off x="55263" y="2124198"/>
-            <a:ext cx="1219197" cy="215444"/>
+            <a:off x="4197737" y="4586998"/>
+            <a:ext cx="2168916" cy="215444"/>
           </a:xfrm>
           <a:prstGeom prst="rect">
             <a:avLst/>
@@ -14085,30 +15903,35 @@
           <a:lstStyle/>
           <a:p>
             <a:r>
+              <a:rPr lang="en-US" sz="800" dirty="0" err="1"/>
+              <a:t>writeToFile</a:t>
+            </a:r>
+            <a:r>
               <a:rPr lang="en-US" sz="800" dirty="0"/>
-              <a:t>parseCommand(input)</a:t>
+              <a:t>(data : String)</a:t>
             </a:r>
           </a:p>
         </p:txBody>
       </p:sp>
       <p:cxnSp>
         <p:nvCxnSpPr>
-          <p:cNvPr id="14" name="Straight Arrow Connector 13">
-            <a:extLst>
-              <a:ext uri="{FF2B5EF4-FFF2-40B4-BE49-F238E27FC236}">
-                <a16:creationId xmlns:a16="http://schemas.microsoft.com/office/drawing/2014/main" id="{21158ADE-B6B8-1C47-B186-3AE03536B3BD}"/>
+          <p:cNvPr id="186" name="Straight Arrow Connector 185">
+            <a:extLst>
+              <a:ext uri="{FF2B5EF4-FFF2-40B4-BE49-F238E27FC236}">
+                <a16:creationId xmlns:a16="http://schemas.microsoft.com/office/drawing/2014/main" id="{069F6679-006B-47E0-942A-F622E3FB6DBB}"/>
               </a:ext>
             </a:extLst>
           </p:cNvPr>
           <p:cNvCxnSpPr>
             <a:cxnSpLocks/>
+            <a:endCxn id="188" idx="1"/>
           </p:cNvCxnSpPr>
           <p:nvPr/>
         </p:nvCxnSpPr>
         <p:spPr>
-          <a:xfrm flipH="1">
-            <a:off x="228600" y="5257800"/>
-            <a:ext cx="857252" cy="0"/>
+          <a:xfrm>
+            <a:off x="3595026" y="5565718"/>
+            <a:ext cx="4260952" cy="0"/>
           </a:xfrm>
           <a:prstGeom prst="straightConnector1">
             <a:avLst/>
@@ -14117,10 +15940,10 @@
             <a:solidFill>
               <a:schemeClr val="accent2"/>
             </a:solidFill>
-            <a:prstDash val="dash"/>
+            <a:prstDash val="solid"/>
             <a:round/>
             <a:headEnd type="none" w="med" len="med"/>
-            <a:tailEnd type="none" w="med" len="med"/>
+            <a:tailEnd type="arrow" w="med" len="med"/>
           </a:ln>
         </p:spPr>
         <p:style>
@@ -14138,98 +15961,12 @@
           </a:fontRef>
         </p:style>
       </p:cxnSp>
-      <p:cxnSp>
-        <p:nvCxnSpPr>
-          <p:cNvPr id="21" name="Straight Connector 20">
-            <a:extLst>
-              <a:ext uri="{FF2B5EF4-FFF2-40B4-BE49-F238E27FC236}">
-                <a16:creationId xmlns:a16="http://schemas.microsoft.com/office/drawing/2014/main" id="{CD0C96CD-C808-5C4A-9A91-B10059AFEF73}"/>
-              </a:ext>
-            </a:extLst>
-          </p:cNvPr>
-          <p:cNvCxnSpPr>
-            <a:cxnSpLocks/>
-          </p:cNvCxnSpPr>
-          <p:nvPr/>
-        </p:nvCxnSpPr>
-        <p:spPr>
-          <a:xfrm flipV="1">
-            <a:off x="245377" y="5219702"/>
-            <a:ext cx="93742" cy="38097"/>
-          </a:xfrm>
-          <a:prstGeom prst="line">
-            <a:avLst/>
-          </a:prstGeom>
-          <a:ln>
-            <a:solidFill>
-              <a:schemeClr val="accent2"/>
-            </a:solidFill>
-          </a:ln>
-        </p:spPr>
-        <p:style>
-          <a:lnRef idx="1">
-            <a:schemeClr val="accent1"/>
-          </a:lnRef>
-          <a:fillRef idx="0">
-            <a:schemeClr val="accent1"/>
-          </a:fillRef>
-          <a:effectRef idx="0">
-            <a:schemeClr val="accent1"/>
-          </a:effectRef>
-          <a:fontRef idx="minor">
-            <a:schemeClr val="tx1"/>
-          </a:fontRef>
-        </p:style>
-      </p:cxnSp>
-      <p:cxnSp>
-        <p:nvCxnSpPr>
-          <p:cNvPr id="29" name="Straight Connector 28">
-            <a:extLst>
-              <a:ext uri="{FF2B5EF4-FFF2-40B4-BE49-F238E27FC236}">
-                <a16:creationId xmlns:a16="http://schemas.microsoft.com/office/drawing/2014/main" id="{B6DF571A-2068-4D43-AC81-C5F2E60082FD}"/>
-              </a:ext>
-            </a:extLst>
-          </p:cNvPr>
-          <p:cNvCxnSpPr>
-            <a:cxnSpLocks/>
-          </p:cNvCxnSpPr>
-          <p:nvPr/>
-        </p:nvCxnSpPr>
-        <p:spPr>
-          <a:xfrm>
-            <a:off x="247615" y="5257800"/>
-            <a:ext cx="93600" cy="39600"/>
-          </a:xfrm>
-          <a:prstGeom prst="line">
-            <a:avLst/>
-          </a:prstGeom>
-          <a:ln>
-            <a:solidFill>
-              <a:schemeClr val="accent2"/>
-            </a:solidFill>
-          </a:ln>
-        </p:spPr>
-        <p:style>
-          <a:lnRef idx="1">
-            <a:schemeClr val="accent1"/>
-          </a:lnRef>
-          <a:fillRef idx="0">
-            <a:schemeClr val="accent1"/>
-          </a:fillRef>
-          <a:effectRef idx="0">
-            <a:schemeClr val="accent1"/>
-          </a:effectRef>
-          <a:fontRef idx="minor">
-            <a:schemeClr val="tx1"/>
-          </a:fontRef>
-        </p:style>
-      </p:cxnSp>
-      <p:sp>
-        <p:nvSpPr>
-          <p:cNvPr id="44" name="Rectangle 43">
-            <a:extLst>
-              <a:ext uri="{FF2B5EF4-FFF2-40B4-BE49-F238E27FC236}">
-                <a16:creationId xmlns:a16="http://schemas.microsoft.com/office/drawing/2014/main" id="{74CF6D1B-DD69-044F-A2E8-417C0CBDA0C8}"/>
+      <p:sp>
+        <p:nvSpPr>
+          <p:cNvPr id="188" name="Rectangle 187">
+            <a:extLst>
+              <a:ext uri="{FF2B5EF4-FFF2-40B4-BE49-F238E27FC236}">
+                <a16:creationId xmlns:a16="http://schemas.microsoft.com/office/drawing/2014/main" id="{80C966DA-73B0-4070-B317-E313144BA720}"/>
               </a:ext>
             </a:extLst>
           </p:cNvPr>
@@ -14238,8 +15975,8 @@
         </p:nvSpPr>
         <p:spPr>
           <a:xfrm>
-            <a:off x="2630674" y="1785589"/>
-            <a:ext cx="1504929" cy="304800"/>
+            <a:off x="7855978" y="5457996"/>
+            <a:ext cx="900520" cy="215444"/>
           </a:xfrm>
           <a:prstGeom prst="rect">
             <a:avLst/>
@@ -14277,148 +16014,18 @@
           <a:p>
             <a:pPr algn="ctr"/>
             <a:r>
-              <a:rPr lang="en-US" sz="800" dirty="0" err="1"/>
-              <a:t>ModuleCommand</a:t>
-            </a:r>
-            <a:endParaRPr lang="en-US" sz="800" dirty="0"/>
-          </a:p>
-        </p:txBody>
-      </p:sp>
-      <p:cxnSp>
-        <p:nvCxnSpPr>
-          <p:cNvPr id="45" name="Straight Arrow Connector 44">
-            <a:extLst>
-              <a:ext uri="{FF2B5EF4-FFF2-40B4-BE49-F238E27FC236}">
-                <a16:creationId xmlns:a16="http://schemas.microsoft.com/office/drawing/2014/main" id="{E14A224B-FBCF-CB40-8622-7C8BDBC4501F}"/>
-              </a:ext>
-            </a:extLst>
-          </p:cNvPr>
-          <p:cNvCxnSpPr>
-            <a:cxnSpLocks/>
-          </p:cNvCxnSpPr>
-          <p:nvPr/>
-        </p:nvCxnSpPr>
-        <p:spPr>
-          <a:xfrm>
-            <a:off x="1200149" y="2476375"/>
-            <a:ext cx="2126656" cy="2"/>
-          </a:xfrm>
-          <a:prstGeom prst="straightConnector1">
-            <a:avLst/>
-          </a:prstGeom>
-          <a:ln w="9525" cap="flat" cmpd="sng" algn="ctr">
-            <a:solidFill>
-              <a:schemeClr val="accent2"/>
-            </a:solidFill>
-            <a:prstDash val="solid"/>
-            <a:round/>
-            <a:headEnd type="none" w="med" len="med"/>
-            <a:tailEnd type="arrow" w="med" len="med"/>
-          </a:ln>
-        </p:spPr>
-        <p:style>
-          <a:lnRef idx="0">
-            <a:scrgbClr r="0" g="0" b="0"/>
-          </a:lnRef>
-          <a:fillRef idx="0">
-            <a:scrgbClr r="0" g="0" b="0"/>
-          </a:fillRef>
-          <a:effectRef idx="0">
-            <a:scrgbClr r="0" g="0" b="0"/>
-          </a:effectRef>
-          <a:fontRef idx="minor">
-            <a:schemeClr val="tx1"/>
-          </a:fontRef>
-        </p:style>
-      </p:cxnSp>
-      <p:sp>
-        <p:nvSpPr>
-          <p:cNvPr id="48" name="TextBox 47">
-            <a:extLst>
-              <a:ext uri="{FF2B5EF4-FFF2-40B4-BE49-F238E27FC236}">
-                <a16:creationId xmlns:a16="http://schemas.microsoft.com/office/drawing/2014/main" id="{23578EB3-280E-D846-9D34-AE13B6BD8EE8}"/>
-              </a:ext>
-            </a:extLst>
-          </p:cNvPr>
-          <p:cNvSpPr txBox="1"/>
-          <p:nvPr/>
-        </p:nvSpPr>
-        <p:spPr>
-          <a:xfrm>
-            <a:off x="1295401" y="2213525"/>
-            <a:ext cx="2514591" cy="215444"/>
-          </a:xfrm>
-          <a:prstGeom prst="rect">
-            <a:avLst/>
-          </a:prstGeom>
-          <a:noFill/>
-        </p:spPr>
-        <p:txBody>
-          <a:bodyPr wrap="square" rtlCol="0">
-            <a:spAutoFit/>
-          </a:bodyPr>
-          <a:lstStyle/>
-          <a:p>
-            <a:r>
               <a:rPr lang="en-US" sz="800" dirty="0"/>
-              <a:t>parseSubCommand(subInput, “module”)</a:t>
-            </a:r>
-          </a:p>
-        </p:txBody>
-      </p:sp>
-      <p:cxnSp>
-        <p:nvCxnSpPr>
-          <p:cNvPr id="47" name="Straight Connector 46">
-            <a:extLst>
-              <a:ext uri="{FF2B5EF4-FFF2-40B4-BE49-F238E27FC236}">
-                <a16:creationId xmlns:a16="http://schemas.microsoft.com/office/drawing/2014/main" id="{E272A0C2-0AA5-3D4C-8A36-FA991A735EFE}"/>
-              </a:ext>
-            </a:extLst>
-          </p:cNvPr>
-          <p:cNvCxnSpPr>
-            <a:cxnSpLocks/>
-          </p:cNvCxnSpPr>
-          <p:nvPr/>
-        </p:nvCxnSpPr>
-        <p:spPr>
-          <a:xfrm>
-            <a:off x="3388311" y="2095413"/>
-            <a:ext cx="0" cy="3681899"/>
-          </a:xfrm>
-          <a:prstGeom prst="line">
-            <a:avLst/>
-          </a:prstGeom>
-          <a:ln w="9525" cap="flat" cmpd="sng" algn="ctr">
-            <a:solidFill>
-              <a:schemeClr val="accent2"/>
-            </a:solidFill>
-            <a:prstDash val="dash"/>
-            <a:round/>
-            <a:headEnd type="none" w="med" len="med"/>
-            <a:tailEnd type="none" w="med" len="med"/>
-          </a:ln>
-        </p:spPr>
-        <p:style>
-          <a:lnRef idx="0">
-            <a:scrgbClr r="0" g="0" b="0"/>
-          </a:lnRef>
-          <a:fillRef idx="0">
-            <a:scrgbClr r="0" g="0" b="0"/>
-          </a:fillRef>
-          <a:effectRef idx="0">
-            <a:scrgbClr r="0" g="0" b="0"/>
-          </a:effectRef>
-          <a:fontRef idx="minor">
-            <a:schemeClr val="tx1"/>
-          </a:fontRef>
-        </p:style>
-      </p:cxnSp>
-      <p:sp>
-        <p:nvSpPr>
-          <p:cNvPr id="50" name="Rectangle 49">
-            <a:extLst>
-              <a:ext uri="{FF2B5EF4-FFF2-40B4-BE49-F238E27FC236}">
-                <a16:creationId xmlns:a16="http://schemas.microsoft.com/office/drawing/2014/main" id="{432D5EBF-7635-B44C-AC80-0FCA4C390815}"/>
+              <a:t>:CommandResult</a:t>
+            </a:r>
+          </a:p>
+        </p:txBody>
+      </p:sp>
+      <p:sp>
+        <p:nvSpPr>
+          <p:cNvPr id="189" name="Rectangle 188">
+            <a:extLst>
+              <a:ext uri="{FF2B5EF4-FFF2-40B4-BE49-F238E27FC236}">
+                <a16:creationId xmlns:a16="http://schemas.microsoft.com/office/drawing/2014/main" id="{6661E8E7-423B-45AD-8331-3ADF47DDB951}"/>
               </a:ext>
             </a:extLst>
           </p:cNvPr>
@@ -14427,8 +16034,8 @@
         </p:nvSpPr>
         <p:spPr>
           <a:xfrm>
-            <a:off x="3326805" y="2476376"/>
-            <a:ext cx="114298" cy="2248009"/>
+            <a:off x="8238026" y="5673439"/>
+            <a:ext cx="126384" cy="181273"/>
           </a:xfrm>
           <a:prstGeom prst="rect">
             <a:avLst/>
@@ -14462,12 +16069,55 @@
           </a:p>
         </p:txBody>
       </p:sp>
+      <p:sp>
+        <p:nvSpPr>
+          <p:cNvPr id="195" name="TextBox 194">
+            <a:extLst>
+              <a:ext uri="{FF2B5EF4-FFF2-40B4-BE49-F238E27FC236}">
+                <a16:creationId xmlns:a16="http://schemas.microsoft.com/office/drawing/2014/main" id="{7D13F901-06F0-4D2C-89A4-4E2BB0C15672}"/>
+              </a:ext>
+            </a:extLst>
+          </p:cNvPr>
+          <p:cNvSpPr txBox="1"/>
+          <p:nvPr/>
+        </p:nvSpPr>
+        <p:spPr>
+          <a:xfrm>
+            <a:off x="3930080" y="5352178"/>
+            <a:ext cx="2165920" cy="215444"/>
+          </a:xfrm>
+          <a:prstGeom prst="rect">
+            <a:avLst/>
+          </a:prstGeom>
+          <a:noFill/>
+        </p:spPr>
+        <p:txBody>
+          <a:bodyPr wrap="square" rtlCol="0">
+            <a:spAutoFit/>
+          </a:bodyPr>
+          <a:lstStyle/>
+          <a:p>
+            <a:r>
+              <a:rPr lang="en-US" sz="800" dirty="0"/>
+              <a:t>new </a:t>
+            </a:r>
+            <a:r>
+              <a:rPr lang="en-US" sz="800" dirty="0" err="1"/>
+              <a:t>CommandResult</a:t>
+            </a:r>
+            <a:r>
+              <a:rPr lang="en-US" sz="800" dirty="0"/>
+              <a:t>(message)</a:t>
+            </a:r>
+          </a:p>
+        </p:txBody>
+      </p:sp>
       <p:cxnSp>
         <p:nvCxnSpPr>
-          <p:cNvPr id="54" name="Straight Arrow Connector 53">
-            <a:extLst>
-              <a:ext uri="{FF2B5EF4-FFF2-40B4-BE49-F238E27FC236}">
-                <a16:creationId xmlns:a16="http://schemas.microsoft.com/office/drawing/2014/main" id="{9495EBD0-A9B2-8F4B-A28A-69B0A1AFFD0D}"/>
+          <p:cNvPr id="196" name="Straight Connector 195">
+            <a:extLst>
+              <a:ext uri="{FF2B5EF4-FFF2-40B4-BE49-F238E27FC236}">
+                <a16:creationId xmlns:a16="http://schemas.microsoft.com/office/drawing/2014/main" id="{BEA52D25-14FA-42A5-83E5-D8C563323617}"/>
               </a:ext>
             </a:extLst>
           </p:cNvPr>
@@ -14478,10 +16128,10 @@
         </p:nvCxnSpPr>
         <p:spPr>
           <a:xfrm flipH="1">
-            <a:off x="1225266" y="4724393"/>
-            <a:ext cx="2101539" cy="0"/>
-          </a:xfrm>
-          <a:prstGeom prst="straightConnector1">
+            <a:off x="8296970" y="5854712"/>
+            <a:ext cx="8255" cy="850888"/>
+          </a:xfrm>
+          <a:prstGeom prst="line">
             <a:avLst/>
           </a:prstGeom>
           <a:ln w="9525" cap="flat" cmpd="sng" algn="ctr">
@@ -14509,98 +16159,425 @@
           </a:fontRef>
         </p:style>
       </p:cxnSp>
-      <p:cxnSp>
-        <p:nvCxnSpPr>
-          <p:cNvPr id="55" name="Straight Connector 54">
-            <a:extLst>
-              <a:ext uri="{FF2B5EF4-FFF2-40B4-BE49-F238E27FC236}">
-                <a16:creationId xmlns:a16="http://schemas.microsoft.com/office/drawing/2014/main" id="{46B07D57-F809-FE47-BE1A-F3553BFA72F9}"/>
-              </a:ext>
-            </a:extLst>
-          </p:cNvPr>
-          <p:cNvCxnSpPr>
-            <a:cxnSpLocks/>
-          </p:cNvCxnSpPr>
-          <p:nvPr/>
-        </p:nvCxnSpPr>
-        <p:spPr>
-          <a:xfrm flipV="1">
-            <a:off x="1203648" y="4686297"/>
-            <a:ext cx="93742" cy="38096"/>
-          </a:xfrm>
-          <a:prstGeom prst="line">
-            <a:avLst/>
-          </a:prstGeom>
-          <a:ln>
-            <a:solidFill>
-              <a:schemeClr val="accent2"/>
-            </a:solidFill>
-          </a:ln>
-        </p:spPr>
-        <p:style>
-          <a:lnRef idx="1">
-            <a:schemeClr val="accent1"/>
-          </a:lnRef>
-          <a:fillRef idx="0">
-            <a:schemeClr val="accent1"/>
-          </a:fillRef>
-          <a:effectRef idx="0">
-            <a:schemeClr val="accent1"/>
-          </a:effectRef>
-          <a:fontRef idx="minor">
-            <a:schemeClr val="tx1"/>
-          </a:fontRef>
-        </p:style>
-      </p:cxnSp>
-      <p:cxnSp>
-        <p:nvCxnSpPr>
-          <p:cNvPr id="57" name="Straight Connector 56">
-            <a:extLst>
-              <a:ext uri="{FF2B5EF4-FFF2-40B4-BE49-F238E27FC236}">
-                <a16:creationId xmlns:a16="http://schemas.microsoft.com/office/drawing/2014/main" id="{51266CF5-3B2C-4548-800A-D1EC5C1D399D}"/>
-              </a:ext>
-            </a:extLst>
-          </p:cNvPr>
-          <p:cNvCxnSpPr>
-            <a:cxnSpLocks/>
-          </p:cNvCxnSpPr>
-          <p:nvPr/>
-        </p:nvCxnSpPr>
-        <p:spPr>
-          <a:xfrm>
-            <a:off x="1205886" y="4724394"/>
-            <a:ext cx="93600" cy="39600"/>
-          </a:xfrm>
-          <a:prstGeom prst="line">
-            <a:avLst/>
-          </a:prstGeom>
-          <a:ln>
-            <a:solidFill>
-              <a:schemeClr val="accent2"/>
-            </a:solidFill>
-          </a:ln>
-        </p:spPr>
-        <p:style>
-          <a:lnRef idx="1">
-            <a:schemeClr val="accent1"/>
-          </a:lnRef>
-          <a:fillRef idx="0">
-            <a:schemeClr val="accent1"/>
-          </a:fillRef>
-          <a:effectRef idx="0">
-            <a:schemeClr val="accent1"/>
-          </a:effectRef>
-          <a:fontRef idx="minor">
-            <a:schemeClr val="tx1"/>
-          </a:fontRef>
-        </p:style>
-      </p:cxnSp>
-      <p:sp>
-        <p:nvSpPr>
-          <p:cNvPr id="66" name="Rectangle 65">
-            <a:extLst>
-              <a:ext uri="{FF2B5EF4-FFF2-40B4-BE49-F238E27FC236}">
-                <a16:creationId xmlns:a16="http://schemas.microsoft.com/office/drawing/2014/main" id="{76D174DB-0E83-0147-869A-B1841DF2DDC6}"/>
+      <p:grpSp>
+        <p:nvGrpSpPr>
+          <p:cNvPr id="210" name="Group 209">
+            <a:extLst>
+              <a:ext uri="{FF2B5EF4-FFF2-40B4-BE49-F238E27FC236}">
+                <a16:creationId xmlns:a16="http://schemas.microsoft.com/office/drawing/2014/main" id="{2FCD730F-F986-46F5-9F12-953DAD5EB69A}"/>
+              </a:ext>
+            </a:extLst>
+          </p:cNvPr>
+          <p:cNvGrpSpPr/>
+          <p:nvPr/>
+        </p:nvGrpSpPr>
+        <p:grpSpPr>
+          <a:xfrm>
+            <a:off x="3586770" y="5834497"/>
+            <a:ext cx="4710200" cy="76014"/>
+            <a:chOff x="3586770" y="5834497"/>
+            <a:chExt cx="4710200" cy="76014"/>
+          </a:xfrm>
+        </p:grpSpPr>
+        <p:cxnSp>
+          <p:nvCxnSpPr>
+            <p:cNvPr id="199" name="Straight Arrow Connector 198">
+              <a:extLst>
+                <a:ext uri="{FF2B5EF4-FFF2-40B4-BE49-F238E27FC236}">
+                  <a16:creationId xmlns:a16="http://schemas.microsoft.com/office/drawing/2014/main" id="{837C101A-6E61-4090-9625-44B002B040A4}"/>
+                </a:ext>
+              </a:extLst>
+            </p:cNvPr>
+            <p:cNvCxnSpPr>
+              <a:cxnSpLocks/>
+            </p:cNvCxnSpPr>
+            <p:nvPr/>
+          </p:nvCxnSpPr>
+          <p:spPr>
+            <a:xfrm flipH="1">
+              <a:off x="3609072" y="5857427"/>
+              <a:ext cx="4687898" cy="20306"/>
+            </a:xfrm>
+            <a:prstGeom prst="straightConnector1">
+              <a:avLst/>
+            </a:prstGeom>
+            <a:ln w="9525" cap="flat" cmpd="sng" algn="ctr">
+              <a:solidFill>
+                <a:schemeClr val="accent2"/>
+              </a:solidFill>
+              <a:prstDash val="dash"/>
+              <a:round/>
+              <a:headEnd type="none" w="med" len="med"/>
+              <a:tailEnd type="none" w="med" len="med"/>
+            </a:ln>
+          </p:spPr>
+          <p:style>
+            <a:lnRef idx="0">
+              <a:scrgbClr r="0" g="0" b="0"/>
+            </a:lnRef>
+            <a:fillRef idx="0">
+              <a:scrgbClr r="0" g="0" b="0"/>
+            </a:fillRef>
+            <a:effectRef idx="0">
+              <a:scrgbClr r="0" g="0" b="0"/>
+            </a:effectRef>
+            <a:fontRef idx="minor">
+              <a:schemeClr val="tx1"/>
+            </a:fontRef>
+          </p:style>
+        </p:cxnSp>
+        <p:cxnSp>
+          <p:nvCxnSpPr>
+            <p:cNvPr id="200" name="Straight Connector 199">
+              <a:extLst>
+                <a:ext uri="{FF2B5EF4-FFF2-40B4-BE49-F238E27FC236}">
+                  <a16:creationId xmlns:a16="http://schemas.microsoft.com/office/drawing/2014/main" id="{68A7A3A7-8331-4027-A8B4-6272DB6E52BF}"/>
+                </a:ext>
+              </a:extLst>
+            </p:cNvPr>
+            <p:cNvCxnSpPr>
+              <a:cxnSpLocks/>
+            </p:cNvCxnSpPr>
+            <p:nvPr/>
+          </p:nvCxnSpPr>
+          <p:spPr>
+            <a:xfrm flipV="1">
+              <a:off x="3586770" y="5834497"/>
+              <a:ext cx="84432" cy="45074"/>
+            </a:xfrm>
+            <a:prstGeom prst="line">
+              <a:avLst/>
+            </a:prstGeom>
+            <a:ln>
+              <a:solidFill>
+                <a:schemeClr val="accent2"/>
+              </a:solidFill>
+            </a:ln>
+          </p:spPr>
+          <p:style>
+            <a:lnRef idx="1">
+              <a:schemeClr val="accent1"/>
+            </a:lnRef>
+            <a:fillRef idx="0">
+              <a:schemeClr val="accent1"/>
+            </a:fillRef>
+            <a:effectRef idx="0">
+              <a:schemeClr val="accent1"/>
+            </a:effectRef>
+            <a:fontRef idx="minor">
+              <a:schemeClr val="tx1"/>
+            </a:fontRef>
+          </p:style>
+        </p:cxnSp>
+        <p:cxnSp>
+          <p:nvCxnSpPr>
+            <p:cNvPr id="201" name="Straight Connector 200">
+              <a:extLst>
+                <a:ext uri="{FF2B5EF4-FFF2-40B4-BE49-F238E27FC236}">
+                  <a16:creationId xmlns:a16="http://schemas.microsoft.com/office/drawing/2014/main" id="{E4AE8481-889B-4986-8853-CB30B33A2F9B}"/>
+                </a:ext>
+              </a:extLst>
+            </p:cNvPr>
+            <p:cNvCxnSpPr>
+              <a:cxnSpLocks/>
+            </p:cNvCxnSpPr>
+            <p:nvPr/>
+          </p:nvCxnSpPr>
+          <p:spPr>
+            <a:xfrm>
+              <a:off x="3592215" y="5879572"/>
+              <a:ext cx="78987" cy="30939"/>
+            </a:xfrm>
+            <a:prstGeom prst="line">
+              <a:avLst/>
+            </a:prstGeom>
+            <a:ln>
+              <a:solidFill>
+                <a:schemeClr val="accent2"/>
+              </a:solidFill>
+            </a:ln>
+          </p:spPr>
+          <p:style>
+            <a:lnRef idx="1">
+              <a:schemeClr val="accent1"/>
+            </a:lnRef>
+            <a:fillRef idx="0">
+              <a:schemeClr val="accent1"/>
+            </a:fillRef>
+            <a:effectRef idx="0">
+              <a:schemeClr val="accent1"/>
+            </a:effectRef>
+            <a:fontRef idx="minor">
+              <a:schemeClr val="tx1"/>
+            </a:fontRef>
+          </p:style>
+        </p:cxnSp>
+      </p:grpSp>
+      <p:sp>
+        <p:nvSpPr>
+          <p:cNvPr id="202" name="TextBox 201">
+            <a:extLst>
+              <a:ext uri="{FF2B5EF4-FFF2-40B4-BE49-F238E27FC236}">
+                <a16:creationId xmlns:a16="http://schemas.microsoft.com/office/drawing/2014/main" id="{B8337A21-3AE6-401D-8358-BB9B8C63A643}"/>
+              </a:ext>
+            </a:extLst>
+          </p:cNvPr>
+          <p:cNvSpPr txBox="1"/>
+          <p:nvPr/>
+        </p:nvSpPr>
+        <p:spPr>
+          <a:xfrm>
+            <a:off x="4687948" y="5688796"/>
+            <a:ext cx="453640" cy="215444"/>
+          </a:xfrm>
+          <a:prstGeom prst="rect">
+            <a:avLst/>
+          </a:prstGeom>
+          <a:noFill/>
+        </p:spPr>
+        <p:txBody>
+          <a:bodyPr wrap="square" rtlCol="0">
+            <a:spAutoFit/>
+          </a:bodyPr>
+          <a:lstStyle/>
+          <a:p>
+            <a:r>
+              <a:rPr lang="en-US" sz="800" dirty="0"/>
+              <a:t>result</a:t>
+            </a:r>
+          </a:p>
+        </p:txBody>
+      </p:sp>
+      <p:sp>
+        <p:nvSpPr>
+          <p:cNvPr id="215" name="TextBox 214">
+            <a:extLst>
+              <a:ext uri="{FF2B5EF4-FFF2-40B4-BE49-F238E27FC236}">
+                <a16:creationId xmlns:a16="http://schemas.microsoft.com/office/drawing/2014/main" id="{694BEE43-111F-482D-BD07-2C06E4F5CAFA}"/>
+              </a:ext>
+            </a:extLst>
+          </p:cNvPr>
+          <p:cNvSpPr txBox="1"/>
+          <p:nvPr/>
+        </p:nvSpPr>
+        <p:spPr>
+          <a:xfrm>
+            <a:off x="3745585" y="5950341"/>
+            <a:ext cx="453640" cy="215444"/>
+          </a:xfrm>
+          <a:prstGeom prst="rect">
+            <a:avLst/>
+          </a:prstGeom>
+          <a:noFill/>
+        </p:spPr>
+        <p:txBody>
+          <a:bodyPr wrap="square" rtlCol="0">
+            <a:spAutoFit/>
+          </a:bodyPr>
+          <a:lstStyle/>
+          <a:p>
+            <a:r>
+              <a:rPr lang="en-US" sz="800" dirty="0"/>
+              <a:t>result</a:t>
+            </a:r>
+          </a:p>
+        </p:txBody>
+      </p:sp>
+      <p:grpSp>
+        <p:nvGrpSpPr>
+          <p:cNvPr id="216" name="Group 215">
+            <a:extLst>
+              <a:ext uri="{FF2B5EF4-FFF2-40B4-BE49-F238E27FC236}">
+                <a16:creationId xmlns:a16="http://schemas.microsoft.com/office/drawing/2014/main" id="{FB46356C-7BB3-47F1-BA7E-1EDB61880F78}"/>
+              </a:ext>
+            </a:extLst>
+          </p:cNvPr>
+          <p:cNvGrpSpPr/>
+          <p:nvPr/>
+        </p:nvGrpSpPr>
+        <p:grpSpPr>
+          <a:xfrm>
+            <a:off x="-1060" y="6175565"/>
+            <a:ext cx="3453895" cy="146888"/>
+            <a:chOff x="3586770" y="5834497"/>
+            <a:chExt cx="4710200" cy="76014"/>
+          </a:xfrm>
+        </p:grpSpPr>
+        <p:cxnSp>
+          <p:nvCxnSpPr>
+            <p:cNvPr id="217" name="Straight Arrow Connector 216">
+              <a:extLst>
+                <a:ext uri="{FF2B5EF4-FFF2-40B4-BE49-F238E27FC236}">
+                  <a16:creationId xmlns:a16="http://schemas.microsoft.com/office/drawing/2014/main" id="{9E1E46D9-B7BC-4FB8-8F48-BAEB4367C531}"/>
+                </a:ext>
+              </a:extLst>
+            </p:cNvPr>
+            <p:cNvCxnSpPr>
+              <a:cxnSpLocks/>
+            </p:cNvCxnSpPr>
+            <p:nvPr/>
+          </p:nvCxnSpPr>
+          <p:spPr>
+            <a:xfrm flipH="1">
+              <a:off x="3609072" y="5857427"/>
+              <a:ext cx="4687898" cy="20306"/>
+            </a:xfrm>
+            <a:prstGeom prst="straightConnector1">
+              <a:avLst/>
+            </a:prstGeom>
+            <a:ln w="9525" cap="flat" cmpd="sng" algn="ctr">
+              <a:solidFill>
+                <a:schemeClr val="accent2"/>
+              </a:solidFill>
+              <a:prstDash val="dash"/>
+              <a:round/>
+              <a:headEnd type="none" w="med" len="med"/>
+              <a:tailEnd type="none" w="med" len="med"/>
+            </a:ln>
+          </p:spPr>
+          <p:style>
+            <a:lnRef idx="0">
+              <a:scrgbClr r="0" g="0" b="0"/>
+            </a:lnRef>
+            <a:fillRef idx="0">
+              <a:scrgbClr r="0" g="0" b="0"/>
+            </a:fillRef>
+            <a:effectRef idx="0">
+              <a:scrgbClr r="0" g="0" b="0"/>
+            </a:effectRef>
+            <a:fontRef idx="minor">
+              <a:schemeClr val="tx1"/>
+            </a:fontRef>
+          </p:style>
+        </p:cxnSp>
+        <p:cxnSp>
+          <p:nvCxnSpPr>
+            <p:cNvPr id="218" name="Straight Connector 217">
+              <a:extLst>
+                <a:ext uri="{FF2B5EF4-FFF2-40B4-BE49-F238E27FC236}">
+                  <a16:creationId xmlns:a16="http://schemas.microsoft.com/office/drawing/2014/main" id="{BF91D808-47EC-443D-8A7C-F9BB8EEE492A}"/>
+                </a:ext>
+              </a:extLst>
+            </p:cNvPr>
+            <p:cNvCxnSpPr>
+              <a:cxnSpLocks/>
+            </p:cNvCxnSpPr>
+            <p:nvPr/>
+          </p:nvCxnSpPr>
+          <p:spPr>
+            <a:xfrm flipV="1">
+              <a:off x="3586770" y="5834497"/>
+              <a:ext cx="84432" cy="45074"/>
+            </a:xfrm>
+            <a:prstGeom prst="line">
+              <a:avLst/>
+            </a:prstGeom>
+            <a:ln>
+              <a:solidFill>
+                <a:schemeClr val="accent2"/>
+              </a:solidFill>
+            </a:ln>
+          </p:spPr>
+          <p:style>
+            <a:lnRef idx="1">
+              <a:schemeClr val="accent1"/>
+            </a:lnRef>
+            <a:fillRef idx="0">
+              <a:schemeClr val="accent1"/>
+            </a:fillRef>
+            <a:effectRef idx="0">
+              <a:schemeClr val="accent1"/>
+            </a:effectRef>
+            <a:fontRef idx="minor">
+              <a:schemeClr val="tx1"/>
+            </a:fontRef>
+          </p:style>
+        </p:cxnSp>
+        <p:cxnSp>
+          <p:nvCxnSpPr>
+            <p:cNvPr id="219" name="Straight Connector 218">
+              <a:extLst>
+                <a:ext uri="{FF2B5EF4-FFF2-40B4-BE49-F238E27FC236}">
+                  <a16:creationId xmlns:a16="http://schemas.microsoft.com/office/drawing/2014/main" id="{C72D3995-E974-44B2-BA3F-9DC98C9B21B6}"/>
+                </a:ext>
+              </a:extLst>
+            </p:cNvPr>
+            <p:cNvCxnSpPr>
+              <a:cxnSpLocks/>
+            </p:cNvCxnSpPr>
+            <p:nvPr/>
+          </p:nvCxnSpPr>
+          <p:spPr>
+            <a:xfrm>
+              <a:off x="3592215" y="5879572"/>
+              <a:ext cx="78987" cy="30939"/>
+            </a:xfrm>
+            <a:prstGeom prst="line">
+              <a:avLst/>
+            </a:prstGeom>
+            <a:ln>
+              <a:solidFill>
+                <a:schemeClr val="accent2"/>
+              </a:solidFill>
+            </a:ln>
+          </p:spPr>
+          <p:style>
+            <a:lnRef idx="1">
+              <a:schemeClr val="accent1"/>
+            </a:lnRef>
+            <a:fillRef idx="0">
+              <a:schemeClr val="accent1"/>
+            </a:fillRef>
+            <a:effectRef idx="0">
+              <a:schemeClr val="accent1"/>
+            </a:effectRef>
+            <a:fontRef idx="minor">
+              <a:schemeClr val="tx1"/>
+            </a:fontRef>
+          </p:style>
+        </p:cxnSp>
+      </p:grpSp>
+      <p:sp>
+        <p:nvSpPr>
+          <p:cNvPr id="220" name="TextBox 219">
+            <a:extLst>
+              <a:ext uri="{FF2B5EF4-FFF2-40B4-BE49-F238E27FC236}">
+                <a16:creationId xmlns:a16="http://schemas.microsoft.com/office/drawing/2014/main" id="{27E07F9D-1144-4CA6-910F-88430DB0164C}"/>
+              </a:ext>
+            </a:extLst>
+          </p:cNvPr>
+          <p:cNvSpPr txBox="1"/>
+          <p:nvPr/>
+        </p:nvSpPr>
+        <p:spPr>
+          <a:xfrm>
+            <a:off x="1246510" y="6043669"/>
+            <a:ext cx="453640" cy="215444"/>
+          </a:xfrm>
+          <a:prstGeom prst="rect">
+            <a:avLst/>
+          </a:prstGeom>
+          <a:noFill/>
+        </p:spPr>
+        <p:txBody>
+          <a:bodyPr wrap="square" rtlCol="0">
+            <a:spAutoFit/>
+          </a:bodyPr>
+          <a:lstStyle/>
+          <a:p>
+            <a:r>
+              <a:rPr lang="en-US" sz="800" dirty="0"/>
+              <a:t>result</a:t>
+            </a:r>
+          </a:p>
+        </p:txBody>
+      </p:sp>
+      <p:sp>
+        <p:nvSpPr>
+          <p:cNvPr id="86" name="Rectangle 85">
+            <a:extLst>
+              <a:ext uri="{FF2B5EF4-FFF2-40B4-BE49-F238E27FC236}">
+                <a16:creationId xmlns:a16="http://schemas.microsoft.com/office/drawing/2014/main" id="{ABBAB923-E2C7-481E-B628-4053B81C7052}"/>
               </a:ext>
             </a:extLst>
           </p:cNvPr>
@@ -14609,15 +16586,15 @@
         </p:nvSpPr>
         <p:spPr>
           <a:xfrm>
-            <a:off x="4719584" y="1728742"/>
-            <a:ext cx="1121967" cy="374120"/>
+            <a:off x="6400800" y="4114800"/>
+            <a:ext cx="1143000" cy="304800"/>
           </a:xfrm>
           <a:prstGeom prst="rect">
             <a:avLst/>
           </a:prstGeom>
           <a:solidFill>
-            <a:schemeClr val="accent2">
-              <a:lumMod val="75000"/>
+            <a:schemeClr val="accent1">
+              <a:lumMod val="50000"/>
             </a:schemeClr>
           </a:solidFill>
           <a:ln w="12700">
@@ -14648,1109 +16625,179 @@
           <a:p>
             <a:pPr algn="ctr"/>
             <a:r>
-              <a:rPr lang="en-US" sz="800" dirty="0">
-                <a:solidFill>
-                  <a:srgbClr val="FF0000"/>
-                </a:solidFill>
-              </a:rPr>
+              <a:rPr lang="en-US" sz="800" dirty="0"/>
               <a:t>&lt;&lt;class&gt;&gt;</a:t>
             </a:r>
           </a:p>
           <a:p>
             <a:pPr algn="ctr"/>
             <a:r>
-              <a:rPr lang="en-US" sz="800" dirty="0"/>
-              <a:t>Timetable</a:t>
-            </a:r>
-          </a:p>
-        </p:txBody>
-      </p:sp>
-      <p:cxnSp>
-        <p:nvCxnSpPr>
-          <p:cNvPr id="68" name="Straight Connector 67">
-            <a:extLst>
-              <a:ext uri="{FF2B5EF4-FFF2-40B4-BE49-F238E27FC236}">
-                <a16:creationId xmlns:a16="http://schemas.microsoft.com/office/drawing/2014/main" id="{24C89C59-3044-EF49-9A10-A94E538760AB}"/>
-              </a:ext>
-            </a:extLst>
-          </p:cNvPr>
-          <p:cNvCxnSpPr>
-            <a:cxnSpLocks/>
-          </p:cNvCxnSpPr>
-          <p:nvPr/>
-        </p:nvCxnSpPr>
-        <p:spPr>
-          <a:xfrm>
-            <a:off x="5274836" y="2102862"/>
-            <a:ext cx="0" cy="3674450"/>
-          </a:xfrm>
-          <a:prstGeom prst="line">
-            <a:avLst/>
-          </a:prstGeom>
-          <a:ln w="9525" cap="flat" cmpd="sng" algn="ctr">
-            <a:solidFill>
-              <a:schemeClr val="accent2"/>
-            </a:solidFill>
-            <a:prstDash val="dash"/>
-            <a:round/>
-            <a:headEnd type="none" w="med" len="med"/>
-            <a:tailEnd type="none" w="med" len="med"/>
-          </a:ln>
-        </p:spPr>
-        <p:style>
-          <a:lnRef idx="0">
-            <a:scrgbClr r="0" g="0" b="0"/>
-          </a:lnRef>
-          <a:fillRef idx="0">
-            <a:scrgbClr r="0" g="0" b="0"/>
-          </a:fillRef>
-          <a:effectRef idx="0">
-            <a:scrgbClr r="0" g="0" b="0"/>
-          </a:effectRef>
-          <a:fontRef idx="minor">
-            <a:schemeClr val="tx1"/>
-          </a:fontRef>
-        </p:style>
-      </p:cxnSp>
-      <p:sp>
-        <p:nvSpPr>
-          <p:cNvPr id="69" name="Rectangle 68">
-            <a:extLst>
-              <a:ext uri="{FF2B5EF4-FFF2-40B4-BE49-F238E27FC236}">
-                <a16:creationId xmlns:a16="http://schemas.microsoft.com/office/drawing/2014/main" id="{52722C1B-64D1-364B-B9EE-CA832FA69E42}"/>
-              </a:ext>
-            </a:extLst>
-          </p:cNvPr>
-          <p:cNvSpPr/>
-          <p:nvPr/>
-        </p:nvSpPr>
-        <p:spPr>
-          <a:xfrm>
-            <a:off x="5232459" y="2895600"/>
-            <a:ext cx="114298" cy="1524000"/>
-          </a:xfrm>
-          <a:prstGeom prst="rect">
-            <a:avLst/>
-          </a:prstGeom>
-          <a:ln w="12700">
-            <a:solidFill>
-              <a:schemeClr val="accent2"/>
-            </a:solidFill>
-          </a:ln>
-        </p:spPr>
-        <p:style>
-          <a:lnRef idx="2">
-            <a:schemeClr val="accent6"/>
-          </a:lnRef>
-          <a:fillRef idx="1">
-            <a:schemeClr val="lt1"/>
-          </a:fillRef>
-          <a:effectRef idx="0">
-            <a:schemeClr val="accent6"/>
-          </a:effectRef>
-          <a:fontRef idx="minor">
-            <a:schemeClr val="dk1"/>
-          </a:fontRef>
-        </p:style>
-        <p:txBody>
-          <a:bodyPr rtlCol="0" anchor="ctr"/>
-          <a:lstStyle/>
-          <a:p>
-            <a:pPr algn="ctr"/>
-            <a:endParaRPr lang="en-US" dirty="0"/>
-          </a:p>
-        </p:txBody>
-      </p:sp>
-      <p:cxnSp>
-        <p:nvCxnSpPr>
-          <p:cNvPr id="76" name="Straight Arrow Connector 75">
-            <a:extLst>
-              <a:ext uri="{FF2B5EF4-FFF2-40B4-BE49-F238E27FC236}">
-                <a16:creationId xmlns:a16="http://schemas.microsoft.com/office/drawing/2014/main" id="{3EEDF3C7-3C3C-6A4A-9D61-2384A29D77AA}"/>
-              </a:ext>
-            </a:extLst>
-          </p:cNvPr>
-          <p:cNvCxnSpPr>
-            <a:cxnSpLocks/>
-          </p:cNvCxnSpPr>
-          <p:nvPr/>
-        </p:nvCxnSpPr>
-        <p:spPr>
-          <a:xfrm>
-            <a:off x="3438865" y="2895600"/>
-            <a:ext cx="1793594" cy="0"/>
-          </a:xfrm>
-          <a:prstGeom prst="straightConnector1">
-            <a:avLst/>
-          </a:prstGeom>
-          <a:ln w="9525" cap="flat" cmpd="sng" algn="ctr">
-            <a:solidFill>
-              <a:schemeClr val="accent2"/>
-            </a:solidFill>
-            <a:prstDash val="solid"/>
-            <a:round/>
-            <a:headEnd type="none" w="med" len="med"/>
-            <a:tailEnd type="arrow" w="med" len="med"/>
-          </a:ln>
-        </p:spPr>
-        <p:style>
-          <a:lnRef idx="0">
-            <a:scrgbClr r="0" g="0" b="0"/>
-          </a:lnRef>
-          <a:fillRef idx="0">
-            <a:scrgbClr r="0" g="0" b="0"/>
-          </a:fillRef>
-          <a:effectRef idx="0">
-            <a:scrgbClr r="0" g="0" b="0"/>
-          </a:effectRef>
-          <a:fontRef idx="minor">
-            <a:schemeClr val="tx1"/>
-          </a:fontRef>
-        </p:style>
-      </p:cxnSp>
-      <p:sp>
-        <p:nvSpPr>
-          <p:cNvPr id="79" name="TextBox 78">
-            <a:extLst>
-              <a:ext uri="{FF2B5EF4-FFF2-40B4-BE49-F238E27FC236}">
-                <a16:creationId xmlns:a16="http://schemas.microsoft.com/office/drawing/2014/main" id="{AB267F3E-B358-0546-84FF-4EAAAD33400A}"/>
-              </a:ext>
-            </a:extLst>
-          </p:cNvPr>
-          <p:cNvSpPr txBox="1"/>
-          <p:nvPr/>
-        </p:nvSpPr>
-        <p:spPr>
-          <a:xfrm>
-            <a:off x="3992957" y="2690983"/>
-            <a:ext cx="1453253" cy="215444"/>
-          </a:xfrm>
-          <a:prstGeom prst="rect">
-            <a:avLst/>
-          </a:prstGeom>
-          <a:noFill/>
-        </p:spPr>
-        <p:txBody>
-          <a:bodyPr wrap="square" rtlCol="0">
-            <a:spAutoFit/>
-          </a:bodyPr>
-          <a:lstStyle/>
-          <a:p>
-            <a:r>
               <a:rPr lang="en-US" sz="800" dirty="0" err="1"/>
-              <a:t>inputLesson</a:t>
-            </a:r>
-            <a:r>
-              <a:rPr lang="en-US" sz="800" dirty="0"/>
-              <a:t>(Lesson Details)</a:t>
-            </a:r>
-          </a:p>
-        </p:txBody>
-      </p:sp>
-      <p:cxnSp>
-        <p:nvCxnSpPr>
-          <p:cNvPr id="82" name="Straight Arrow Connector 81">
-            <a:extLst>
-              <a:ext uri="{FF2B5EF4-FFF2-40B4-BE49-F238E27FC236}">
-                <a16:creationId xmlns:a16="http://schemas.microsoft.com/office/drawing/2014/main" id="{10539CDB-DCB7-F242-8293-79C260A0BA19}"/>
-              </a:ext>
-            </a:extLst>
-          </p:cNvPr>
-          <p:cNvCxnSpPr>
-            <a:cxnSpLocks/>
-          </p:cNvCxnSpPr>
-          <p:nvPr/>
-        </p:nvCxnSpPr>
-        <p:spPr>
-          <a:xfrm flipH="1">
-            <a:off x="3441103" y="4419600"/>
-            <a:ext cx="1786353" cy="0"/>
-          </a:xfrm>
-          <a:prstGeom prst="straightConnector1">
-            <a:avLst/>
-          </a:prstGeom>
-          <a:ln w="9525" cap="flat" cmpd="sng" algn="ctr">
-            <a:solidFill>
-              <a:schemeClr val="accent2"/>
-            </a:solidFill>
-            <a:prstDash val="dash"/>
-            <a:round/>
-            <a:headEnd type="none" w="med" len="med"/>
-            <a:tailEnd type="none" w="med" len="med"/>
-          </a:ln>
-        </p:spPr>
-        <p:style>
-          <a:lnRef idx="0">
-            <a:scrgbClr r="0" g="0" b="0"/>
-          </a:lnRef>
-          <a:fillRef idx="0">
-            <a:scrgbClr r="0" g="0" b="0"/>
-          </a:fillRef>
-          <a:effectRef idx="0">
-            <a:scrgbClr r="0" g="0" b="0"/>
-          </a:effectRef>
-          <a:fontRef idx="minor">
-            <a:schemeClr val="tx1"/>
-          </a:fontRef>
-        </p:style>
-      </p:cxnSp>
-      <p:cxnSp>
-        <p:nvCxnSpPr>
-          <p:cNvPr id="83" name="Straight Connector 82">
-            <a:extLst>
-              <a:ext uri="{FF2B5EF4-FFF2-40B4-BE49-F238E27FC236}">
-                <a16:creationId xmlns:a16="http://schemas.microsoft.com/office/drawing/2014/main" id="{E412B2CE-BDA0-2D41-A564-FBCF1F18876A}"/>
-              </a:ext>
-            </a:extLst>
-          </p:cNvPr>
-          <p:cNvCxnSpPr>
-            <a:cxnSpLocks/>
-          </p:cNvCxnSpPr>
-          <p:nvPr/>
-        </p:nvCxnSpPr>
-        <p:spPr>
-          <a:xfrm flipV="1">
-            <a:off x="3438865" y="4381504"/>
-            <a:ext cx="93742" cy="38096"/>
-          </a:xfrm>
-          <a:prstGeom prst="line">
-            <a:avLst/>
-          </a:prstGeom>
-          <a:ln>
-            <a:solidFill>
-              <a:schemeClr val="accent2"/>
-            </a:solidFill>
-          </a:ln>
-        </p:spPr>
-        <p:style>
-          <a:lnRef idx="1">
-            <a:schemeClr val="accent1"/>
-          </a:lnRef>
-          <a:fillRef idx="0">
-            <a:schemeClr val="accent1"/>
-          </a:fillRef>
-          <a:effectRef idx="0">
-            <a:schemeClr val="accent1"/>
-          </a:effectRef>
-          <a:fontRef idx="minor">
-            <a:schemeClr val="tx1"/>
-          </a:fontRef>
-        </p:style>
-      </p:cxnSp>
-      <p:cxnSp>
-        <p:nvCxnSpPr>
-          <p:cNvPr id="84" name="Straight Connector 83">
-            <a:extLst>
-              <a:ext uri="{FF2B5EF4-FFF2-40B4-BE49-F238E27FC236}">
-                <a16:creationId xmlns:a16="http://schemas.microsoft.com/office/drawing/2014/main" id="{ECDBB37E-99E1-FA45-9AA0-4120B2CB0636}"/>
-              </a:ext>
-            </a:extLst>
-          </p:cNvPr>
-          <p:cNvCxnSpPr>
-            <a:cxnSpLocks/>
-          </p:cNvCxnSpPr>
-          <p:nvPr/>
-        </p:nvCxnSpPr>
-        <p:spPr>
-          <a:xfrm>
-            <a:off x="3441103" y="4419601"/>
-            <a:ext cx="93600" cy="39600"/>
-          </a:xfrm>
-          <a:prstGeom prst="line">
-            <a:avLst/>
-          </a:prstGeom>
-          <a:ln>
-            <a:solidFill>
-              <a:schemeClr val="accent2"/>
-            </a:solidFill>
-          </a:ln>
-        </p:spPr>
-        <p:style>
-          <a:lnRef idx="1">
-            <a:schemeClr val="accent1"/>
-          </a:lnRef>
-          <a:fillRef idx="0">
-            <a:schemeClr val="accent1"/>
-          </a:fillRef>
-          <a:effectRef idx="0">
-            <a:schemeClr val="accent1"/>
-          </a:effectRef>
-          <a:fontRef idx="minor">
-            <a:schemeClr val="tx1"/>
-          </a:fontRef>
-        </p:style>
-      </p:cxnSp>
-      <p:sp>
-        <p:nvSpPr>
-          <p:cNvPr id="98" name="Rectangle 97">
-            <a:extLst>
-              <a:ext uri="{FF2B5EF4-FFF2-40B4-BE49-F238E27FC236}">
-                <a16:creationId xmlns:a16="http://schemas.microsoft.com/office/drawing/2014/main" id="{FE873D9D-1E06-3C4F-823B-E32E33EE5B83}"/>
-              </a:ext>
-            </a:extLst>
-          </p:cNvPr>
-          <p:cNvSpPr/>
-          <p:nvPr/>
-        </p:nvSpPr>
-        <p:spPr>
-          <a:xfrm>
-            <a:off x="6772110" y="3125040"/>
-            <a:ext cx="1121967" cy="374120"/>
-          </a:xfrm>
-          <a:prstGeom prst="rect">
-            <a:avLst/>
-          </a:prstGeom>
-          <a:solidFill>
-            <a:schemeClr val="accent2">
-              <a:lumMod val="75000"/>
-            </a:schemeClr>
-          </a:solidFill>
-          <a:ln w="12700">
-            <a:solidFill>
-              <a:schemeClr val="accent2"/>
-            </a:solidFill>
-          </a:ln>
-        </p:spPr>
-        <p:style>
-          <a:lnRef idx="2">
-            <a:schemeClr val="accent1">
-              <a:shade val="50000"/>
-            </a:schemeClr>
-          </a:lnRef>
-          <a:fillRef idx="1">
-            <a:schemeClr val="accent1"/>
-          </a:fillRef>
-          <a:effectRef idx="0">
-            <a:schemeClr val="accent1"/>
-          </a:effectRef>
-          <a:fontRef idx="minor">
-            <a:schemeClr val="lt1"/>
-          </a:fontRef>
-        </p:style>
-        <p:txBody>
-          <a:bodyPr rtlCol="0" anchor="ctr"/>
-          <a:lstStyle/>
-          <a:p>
-            <a:pPr algn="ctr"/>
-            <a:r>
-              <a:rPr lang="en-US" sz="800" dirty="0">
-                <a:solidFill>
-                  <a:schemeClr val="bg1"/>
-                </a:solidFill>
-              </a:rPr>
-              <a:t>lesson:Lesson</a:t>
-            </a:r>
-          </a:p>
-        </p:txBody>
-      </p:sp>
-      <p:cxnSp>
-        <p:nvCxnSpPr>
-          <p:cNvPr id="103" name="Straight Connector 102">
-            <a:extLst>
-              <a:ext uri="{FF2B5EF4-FFF2-40B4-BE49-F238E27FC236}">
-                <a16:creationId xmlns:a16="http://schemas.microsoft.com/office/drawing/2014/main" id="{B6BF0837-72BE-F64B-8DFD-D0313A5A9ECA}"/>
-              </a:ext>
-            </a:extLst>
-          </p:cNvPr>
-          <p:cNvCxnSpPr>
-            <a:cxnSpLocks/>
-            <a:stCxn id="102" idx="0"/>
-          </p:cNvCxnSpPr>
-          <p:nvPr/>
-        </p:nvCxnSpPr>
-        <p:spPr>
-          <a:xfrm>
-            <a:off x="7295656" y="3499160"/>
-            <a:ext cx="19260" cy="2278152"/>
-          </a:xfrm>
-          <a:prstGeom prst="line">
-            <a:avLst/>
-          </a:prstGeom>
-          <a:ln w="9525" cap="flat" cmpd="sng" algn="ctr">
-            <a:solidFill>
-              <a:schemeClr val="accent2"/>
-            </a:solidFill>
-            <a:prstDash val="dash"/>
-            <a:round/>
-            <a:headEnd type="none" w="med" len="med"/>
-            <a:tailEnd type="none" w="med" len="med"/>
-          </a:ln>
-        </p:spPr>
-        <p:style>
-          <a:lnRef idx="0">
-            <a:scrgbClr r="0" g="0" b="0"/>
-          </a:lnRef>
-          <a:fillRef idx="0">
-            <a:scrgbClr r="0" g="0" b="0"/>
-          </a:fillRef>
-          <a:effectRef idx="0">
-            <a:scrgbClr r="0" g="0" b="0"/>
-          </a:effectRef>
-          <a:fontRef idx="minor">
-            <a:schemeClr val="tx1"/>
-          </a:fontRef>
-        </p:style>
-      </p:cxnSp>
-      <p:cxnSp>
-        <p:nvCxnSpPr>
-          <p:cNvPr id="99" name="Straight Arrow Connector 98">
-            <a:extLst>
-              <a:ext uri="{FF2B5EF4-FFF2-40B4-BE49-F238E27FC236}">
-                <a16:creationId xmlns:a16="http://schemas.microsoft.com/office/drawing/2014/main" id="{C4EC64CE-0EE4-4941-AB2F-1D7EC3AB49DE}"/>
-              </a:ext>
-            </a:extLst>
-          </p:cNvPr>
-          <p:cNvCxnSpPr>
-            <a:cxnSpLocks/>
-          </p:cNvCxnSpPr>
-          <p:nvPr/>
-        </p:nvCxnSpPr>
-        <p:spPr>
-          <a:xfrm flipV="1">
-            <a:off x="5368968" y="3368277"/>
-            <a:ext cx="1403142" cy="208"/>
-          </a:xfrm>
-          <a:prstGeom prst="straightConnector1">
-            <a:avLst/>
-          </a:prstGeom>
-          <a:ln w="9525" cap="flat" cmpd="sng" algn="ctr">
-            <a:solidFill>
-              <a:schemeClr val="accent2"/>
-            </a:solidFill>
-            <a:prstDash val="solid"/>
-            <a:round/>
-            <a:headEnd type="none" w="med" len="med"/>
-            <a:tailEnd type="arrow" w="med" len="med"/>
-          </a:ln>
-        </p:spPr>
-        <p:style>
-          <a:lnRef idx="0">
-            <a:scrgbClr r="0" g="0" b="0"/>
-          </a:lnRef>
-          <a:fillRef idx="0">
-            <a:scrgbClr r="0" g="0" b="0"/>
-          </a:fillRef>
-          <a:effectRef idx="0">
-            <a:scrgbClr r="0" g="0" b="0"/>
-          </a:effectRef>
-          <a:fontRef idx="minor">
-            <a:schemeClr val="tx1"/>
-          </a:fontRef>
-        </p:style>
-      </p:cxnSp>
-      <p:sp>
-        <p:nvSpPr>
-          <p:cNvPr id="101" name="TextBox 100">
-            <a:extLst>
-              <a:ext uri="{FF2B5EF4-FFF2-40B4-BE49-F238E27FC236}">
-                <a16:creationId xmlns:a16="http://schemas.microsoft.com/office/drawing/2014/main" id="{DD67DB58-55EE-2542-B93A-57F0EEDD45E7}"/>
-              </a:ext>
-            </a:extLst>
-          </p:cNvPr>
-          <p:cNvSpPr txBox="1"/>
-          <p:nvPr/>
-        </p:nvSpPr>
-        <p:spPr>
-          <a:xfrm>
-            <a:off x="5555413" y="2872640"/>
-            <a:ext cx="992650" cy="215444"/>
-          </a:xfrm>
-          <a:prstGeom prst="rect">
-            <a:avLst/>
-          </a:prstGeom>
-          <a:noFill/>
-        </p:spPr>
-        <p:txBody>
-          <a:bodyPr wrap="square" rtlCol="0">
-            <a:spAutoFit/>
-          </a:bodyPr>
-          <a:lstStyle/>
-          <a:p>
-            <a:r>
-              <a:rPr lang="en-US" sz="800" dirty="0"/>
-              <a:t>addLesson(lesson)</a:t>
-            </a:r>
-          </a:p>
-        </p:txBody>
-      </p:sp>
-      <p:sp>
-        <p:nvSpPr>
-          <p:cNvPr id="102" name="Rectangle 101">
-            <a:extLst>
-              <a:ext uri="{FF2B5EF4-FFF2-40B4-BE49-F238E27FC236}">
-                <a16:creationId xmlns:a16="http://schemas.microsoft.com/office/drawing/2014/main" id="{7D66F112-BC28-764A-8343-B2FA41A2A1FB}"/>
-              </a:ext>
-            </a:extLst>
-          </p:cNvPr>
-          <p:cNvSpPr/>
-          <p:nvPr/>
-        </p:nvSpPr>
-        <p:spPr>
-          <a:xfrm>
-            <a:off x="7238507" y="3499160"/>
-            <a:ext cx="114298" cy="625322"/>
-          </a:xfrm>
-          <a:prstGeom prst="rect">
-            <a:avLst/>
-          </a:prstGeom>
-          <a:ln w="12700">
-            <a:solidFill>
-              <a:schemeClr val="accent2"/>
-            </a:solidFill>
-          </a:ln>
-        </p:spPr>
-        <p:style>
-          <a:lnRef idx="2">
-            <a:schemeClr val="accent6"/>
-          </a:lnRef>
-          <a:fillRef idx="1">
-            <a:schemeClr val="lt1"/>
-          </a:fillRef>
-          <a:effectRef idx="0">
-            <a:schemeClr val="accent6"/>
-          </a:effectRef>
-          <a:fontRef idx="minor">
-            <a:schemeClr val="dk1"/>
-          </a:fontRef>
-        </p:style>
-        <p:txBody>
-          <a:bodyPr rtlCol="0" anchor="ctr"/>
-          <a:lstStyle/>
-          <a:p>
-            <a:pPr algn="ctr"/>
-            <a:endParaRPr lang="en-US" dirty="0"/>
-          </a:p>
-        </p:txBody>
-      </p:sp>
-      <p:cxnSp>
-        <p:nvCxnSpPr>
-          <p:cNvPr id="125" name="Straight Arrow Connector 124">
-            <a:extLst>
-              <a:ext uri="{FF2B5EF4-FFF2-40B4-BE49-F238E27FC236}">
-                <a16:creationId xmlns:a16="http://schemas.microsoft.com/office/drawing/2014/main" id="{C5C1D507-E194-6447-8615-7C93E536F484}"/>
-              </a:ext>
-            </a:extLst>
-          </p:cNvPr>
-          <p:cNvCxnSpPr>
-            <a:cxnSpLocks/>
-            <a:stCxn id="102" idx="2"/>
-          </p:cNvCxnSpPr>
-          <p:nvPr/>
-        </p:nvCxnSpPr>
-        <p:spPr>
-          <a:xfrm flipH="1">
-            <a:off x="5368970" y="4124482"/>
-            <a:ext cx="1926686" cy="13783"/>
-          </a:xfrm>
-          <a:prstGeom prst="straightConnector1">
-            <a:avLst/>
-          </a:prstGeom>
-          <a:ln w="9525" cap="flat" cmpd="sng" algn="ctr">
-            <a:solidFill>
-              <a:schemeClr val="accent2"/>
-            </a:solidFill>
-            <a:prstDash val="dash"/>
-            <a:round/>
-            <a:headEnd type="none" w="med" len="med"/>
-            <a:tailEnd type="none" w="med" len="med"/>
-          </a:ln>
-        </p:spPr>
-        <p:style>
-          <a:lnRef idx="0">
-            <a:scrgbClr r="0" g="0" b="0"/>
-          </a:lnRef>
-          <a:fillRef idx="0">
-            <a:scrgbClr r="0" g="0" b="0"/>
-          </a:fillRef>
-          <a:effectRef idx="0">
-            <a:scrgbClr r="0" g="0" b="0"/>
-          </a:effectRef>
-          <a:fontRef idx="minor">
-            <a:schemeClr val="tx1"/>
-          </a:fontRef>
-        </p:style>
-      </p:cxnSp>
-      <p:cxnSp>
-        <p:nvCxnSpPr>
-          <p:cNvPr id="126" name="Straight Connector 125">
-            <a:extLst>
-              <a:ext uri="{FF2B5EF4-FFF2-40B4-BE49-F238E27FC236}">
-                <a16:creationId xmlns:a16="http://schemas.microsoft.com/office/drawing/2014/main" id="{F452E062-701C-0E47-8BAE-670C93FFFEE4}"/>
-              </a:ext>
-            </a:extLst>
-          </p:cNvPr>
-          <p:cNvCxnSpPr>
-            <a:cxnSpLocks/>
-          </p:cNvCxnSpPr>
-          <p:nvPr/>
-        </p:nvCxnSpPr>
-        <p:spPr>
-          <a:xfrm flipV="1">
-            <a:off x="5359804" y="4101416"/>
-            <a:ext cx="93742" cy="38096"/>
-          </a:xfrm>
-          <a:prstGeom prst="line">
-            <a:avLst/>
-          </a:prstGeom>
-          <a:ln>
-            <a:solidFill>
-              <a:schemeClr val="accent2"/>
-            </a:solidFill>
-          </a:ln>
-        </p:spPr>
-        <p:style>
-          <a:lnRef idx="1">
-            <a:schemeClr val="accent1"/>
-          </a:lnRef>
-          <a:fillRef idx="0">
-            <a:schemeClr val="accent1"/>
-          </a:fillRef>
-          <a:effectRef idx="0">
-            <a:schemeClr val="accent1"/>
-          </a:effectRef>
-          <a:fontRef idx="minor">
-            <a:schemeClr val="tx1"/>
-          </a:fontRef>
-        </p:style>
-      </p:cxnSp>
-      <p:cxnSp>
-        <p:nvCxnSpPr>
-          <p:cNvPr id="127" name="Straight Connector 126">
-            <a:extLst>
-              <a:ext uri="{FF2B5EF4-FFF2-40B4-BE49-F238E27FC236}">
-                <a16:creationId xmlns:a16="http://schemas.microsoft.com/office/drawing/2014/main" id="{638F40BF-AAD1-7244-8940-B82C07835CD9}"/>
-              </a:ext>
-            </a:extLst>
-          </p:cNvPr>
-          <p:cNvCxnSpPr>
-            <a:cxnSpLocks/>
-          </p:cNvCxnSpPr>
-          <p:nvPr/>
-        </p:nvCxnSpPr>
-        <p:spPr>
-          <a:xfrm>
-            <a:off x="5362042" y="4139513"/>
-            <a:ext cx="93600" cy="39600"/>
-          </a:xfrm>
-          <a:prstGeom prst="line">
-            <a:avLst/>
-          </a:prstGeom>
-          <a:ln>
-            <a:solidFill>
-              <a:schemeClr val="accent2"/>
-            </a:solidFill>
-          </a:ln>
-        </p:spPr>
-        <p:style>
-          <a:lnRef idx="1">
-            <a:schemeClr val="accent1"/>
-          </a:lnRef>
-          <a:fillRef idx="0">
-            <a:schemeClr val="accent1"/>
-          </a:fillRef>
-          <a:effectRef idx="0">
-            <a:schemeClr val="accent1"/>
-          </a:effectRef>
-          <a:fontRef idx="minor">
-            <a:schemeClr val="tx1"/>
-          </a:fontRef>
-        </p:style>
-      </p:cxnSp>
-      <p:cxnSp>
-        <p:nvCxnSpPr>
-          <p:cNvPr id="137" name="Straight Connector 136">
-            <a:extLst>
-              <a:ext uri="{FF2B5EF4-FFF2-40B4-BE49-F238E27FC236}">
-                <a16:creationId xmlns:a16="http://schemas.microsoft.com/office/drawing/2014/main" id="{22CC3FAB-7DFE-9F4D-9127-85AE74940705}"/>
-              </a:ext>
-            </a:extLst>
-          </p:cNvPr>
-          <p:cNvCxnSpPr>
-            <a:cxnSpLocks/>
-          </p:cNvCxnSpPr>
-          <p:nvPr/>
-        </p:nvCxnSpPr>
-        <p:spPr>
-          <a:xfrm flipV="1">
-            <a:off x="7358398" y="4018520"/>
-            <a:ext cx="93742" cy="38096"/>
-          </a:xfrm>
-          <a:prstGeom prst="line">
-            <a:avLst/>
-          </a:prstGeom>
-          <a:ln>
-            <a:solidFill>
-              <a:schemeClr val="accent2"/>
-            </a:solidFill>
-          </a:ln>
-        </p:spPr>
-        <p:style>
-          <a:lnRef idx="1">
-            <a:schemeClr val="accent1"/>
-          </a:lnRef>
-          <a:fillRef idx="0">
-            <a:schemeClr val="accent1"/>
-          </a:fillRef>
-          <a:effectRef idx="0">
-            <a:schemeClr val="accent1"/>
-          </a:effectRef>
-          <a:fontRef idx="minor">
-            <a:schemeClr val="tx1"/>
-          </a:fontRef>
-        </p:style>
-      </p:cxnSp>
-      <p:cxnSp>
-        <p:nvCxnSpPr>
-          <p:cNvPr id="138" name="Straight Connector 137">
-            <a:extLst>
-              <a:ext uri="{FF2B5EF4-FFF2-40B4-BE49-F238E27FC236}">
-                <a16:creationId xmlns:a16="http://schemas.microsoft.com/office/drawing/2014/main" id="{DBFB772D-E317-6148-BEAD-AFAE5B8ADFEB}"/>
-              </a:ext>
-            </a:extLst>
-          </p:cNvPr>
-          <p:cNvCxnSpPr>
-            <a:cxnSpLocks/>
-          </p:cNvCxnSpPr>
-          <p:nvPr/>
-        </p:nvCxnSpPr>
-        <p:spPr>
-          <a:xfrm>
-            <a:off x="7360636" y="4056617"/>
-            <a:ext cx="93600" cy="39600"/>
-          </a:xfrm>
-          <a:prstGeom prst="line">
-            <a:avLst/>
-          </a:prstGeom>
-          <a:ln>
-            <a:solidFill>
-              <a:schemeClr val="accent2"/>
-            </a:solidFill>
-          </a:ln>
-        </p:spPr>
-        <p:style>
-          <a:lnRef idx="1">
-            <a:schemeClr val="accent1"/>
-          </a:lnRef>
-          <a:fillRef idx="0">
-            <a:schemeClr val="accent1"/>
-          </a:fillRef>
-          <a:effectRef idx="0">
-            <a:schemeClr val="accent1"/>
-          </a:effectRef>
-          <a:fontRef idx="minor">
-            <a:schemeClr val="tx1"/>
-          </a:fontRef>
-        </p:style>
-      </p:cxnSp>
-      <p:sp>
-        <p:nvSpPr>
-          <p:cNvPr id="157" name="TextBox 156">
-            <a:extLst>
-              <a:ext uri="{FF2B5EF4-FFF2-40B4-BE49-F238E27FC236}">
-                <a16:creationId xmlns:a16="http://schemas.microsoft.com/office/drawing/2014/main" id="{0AA4F582-D7A1-EE4F-8BEE-60AE7E1AFC30}"/>
-              </a:ext>
-            </a:extLst>
-          </p:cNvPr>
-          <p:cNvSpPr txBox="1"/>
-          <p:nvPr/>
-        </p:nvSpPr>
-        <p:spPr>
-          <a:xfrm>
-            <a:off x="3676308" y="411966"/>
-            <a:ext cx="1444819" cy="369332"/>
-          </a:xfrm>
-          <a:prstGeom prst="rect">
-            <a:avLst/>
-          </a:prstGeom>
-          <a:noFill/>
-        </p:spPr>
-        <p:txBody>
-          <a:bodyPr wrap="none" rtlCol="0">
-            <a:spAutoFit/>
-          </a:bodyPr>
-          <a:lstStyle/>
-          <a:p>
-            <a:r>
-              <a:rPr lang="en-US" dirty="0"/>
-              <a:t>module store</a:t>
-            </a:r>
-          </a:p>
-        </p:txBody>
-      </p:sp>
-      <p:sp>
-        <p:nvSpPr>
-          <p:cNvPr id="51" name="Rectangle 50">
-            <a:extLst>
-              <a:ext uri="{FF2B5EF4-FFF2-40B4-BE49-F238E27FC236}">
-                <a16:creationId xmlns:a16="http://schemas.microsoft.com/office/drawing/2014/main" id="{81B1B538-744C-9344-905D-C7654BA4560D}"/>
-              </a:ext>
-            </a:extLst>
-          </p:cNvPr>
-          <p:cNvSpPr/>
-          <p:nvPr/>
-        </p:nvSpPr>
-        <p:spPr>
-          <a:xfrm>
-            <a:off x="5299690" y="3085805"/>
-            <a:ext cx="114298" cy="106450"/>
-          </a:xfrm>
-          <a:prstGeom prst="rect">
-            <a:avLst/>
-          </a:prstGeom>
-          <a:ln w="12700">
-            <a:solidFill>
-              <a:schemeClr val="accent2"/>
-            </a:solidFill>
-          </a:ln>
-        </p:spPr>
-        <p:style>
-          <a:lnRef idx="2">
-            <a:schemeClr val="accent6"/>
-          </a:lnRef>
-          <a:fillRef idx="1">
-            <a:schemeClr val="lt1"/>
-          </a:fillRef>
-          <a:effectRef idx="0">
-            <a:schemeClr val="accent6"/>
-          </a:effectRef>
-          <a:fontRef idx="minor">
-            <a:schemeClr val="dk1"/>
-          </a:fontRef>
-        </p:style>
-        <p:txBody>
-          <a:bodyPr rtlCol="0" anchor="ctr"/>
-          <a:lstStyle/>
-          <a:p>
-            <a:pPr algn="ctr"/>
-            <a:endParaRPr lang="en-US" dirty="0"/>
-          </a:p>
-        </p:txBody>
-      </p:sp>
-      <p:cxnSp>
-        <p:nvCxnSpPr>
-          <p:cNvPr id="17" name="Curved Connector 16">
-            <a:extLst>
-              <a:ext uri="{FF2B5EF4-FFF2-40B4-BE49-F238E27FC236}">
-                <a16:creationId xmlns:a16="http://schemas.microsoft.com/office/drawing/2014/main" id="{7A0E6004-29F4-E041-AD62-68F3E9DEEBA4}"/>
-              </a:ext>
-            </a:extLst>
-          </p:cNvPr>
-          <p:cNvCxnSpPr>
-            <a:cxnSpLocks/>
-          </p:cNvCxnSpPr>
-          <p:nvPr/>
-        </p:nvCxnSpPr>
-        <p:spPr>
-          <a:xfrm rot="16200000" flipH="1">
-            <a:off x="5289762" y="2996007"/>
-            <a:ext cx="162613" cy="57149"/>
-          </a:xfrm>
-          <a:prstGeom prst="curvedConnector4">
-            <a:avLst>
-              <a:gd name="adj1" fmla="val 6204"/>
-              <a:gd name="adj2" fmla="val 500007"/>
-            </a:avLst>
-          </a:prstGeom>
-          <a:ln w="9525" cap="flat" cmpd="sng" algn="ctr">
-            <a:solidFill>
-              <a:schemeClr val="accent2"/>
-            </a:solidFill>
-            <a:prstDash val="solid"/>
-            <a:round/>
-            <a:headEnd type="none" w="med" len="med"/>
-            <a:tailEnd type="arrow" w="med" len="med"/>
-          </a:ln>
-        </p:spPr>
-        <p:style>
-          <a:lnRef idx="0">
-            <a:scrgbClr r="0" g="0" b="0"/>
-          </a:lnRef>
-          <a:fillRef idx="0">
-            <a:scrgbClr r="0" g="0" b="0"/>
-          </a:fillRef>
-          <a:effectRef idx="0">
-            <a:scrgbClr r="0" g="0" b="0"/>
-          </a:effectRef>
-          <a:fontRef idx="minor">
-            <a:schemeClr val="tx1"/>
-          </a:fontRef>
-        </p:style>
-      </p:cxnSp>
-      <p:cxnSp>
-        <p:nvCxnSpPr>
-          <p:cNvPr id="95" name="Elbow Connector 94">
-            <a:extLst>
-              <a:ext uri="{FF2B5EF4-FFF2-40B4-BE49-F238E27FC236}">
-                <a16:creationId xmlns:a16="http://schemas.microsoft.com/office/drawing/2014/main" id="{32BE6738-A16F-7E48-9972-9547383140CD}"/>
-              </a:ext>
-            </a:extLst>
-          </p:cNvPr>
-          <p:cNvCxnSpPr>
-            <a:cxnSpLocks/>
-          </p:cNvCxnSpPr>
-          <p:nvPr/>
-        </p:nvCxnSpPr>
-        <p:spPr>
-          <a:xfrm flipH="1">
-            <a:off x="5361488" y="3189330"/>
-            <a:ext cx="62228" cy="167124"/>
-          </a:xfrm>
-          <a:prstGeom prst="bentConnector4">
-            <a:avLst>
-              <a:gd name="adj1" fmla="val -202494"/>
-              <a:gd name="adj2" fmla="val 65924"/>
-            </a:avLst>
-          </a:prstGeom>
-          <a:ln w="9525" cap="flat" cmpd="sng" algn="ctr">
-            <a:solidFill>
-              <a:schemeClr val="accent2"/>
-            </a:solidFill>
-            <a:prstDash val="dash"/>
-            <a:round/>
-            <a:headEnd type="none" w="med" len="med"/>
-            <a:tailEnd type="none" w="med" len="med"/>
-          </a:ln>
-        </p:spPr>
-        <p:style>
-          <a:lnRef idx="0">
-            <a:scrgbClr r="0" g="0" b="0"/>
-          </a:lnRef>
-          <a:fillRef idx="0">
-            <a:scrgbClr r="0" g="0" b="0"/>
-          </a:fillRef>
-          <a:effectRef idx="0">
-            <a:scrgbClr r="0" g="0" b="0"/>
-          </a:effectRef>
-          <a:fontRef idx="minor">
-            <a:schemeClr val="tx1"/>
-          </a:fontRef>
-        </p:style>
-      </p:cxnSp>
-      <p:cxnSp>
-        <p:nvCxnSpPr>
-          <p:cNvPr id="120" name="Straight Connector 119">
-            <a:extLst>
-              <a:ext uri="{FF2B5EF4-FFF2-40B4-BE49-F238E27FC236}">
-                <a16:creationId xmlns:a16="http://schemas.microsoft.com/office/drawing/2014/main" id="{2710091E-4F5A-4D45-9A38-8D752CC98518}"/>
-              </a:ext>
-            </a:extLst>
-          </p:cNvPr>
-          <p:cNvCxnSpPr>
-            <a:cxnSpLocks/>
-          </p:cNvCxnSpPr>
-          <p:nvPr/>
-        </p:nvCxnSpPr>
-        <p:spPr>
-          <a:xfrm flipV="1">
-            <a:off x="5338749" y="3264333"/>
-            <a:ext cx="93742" cy="38096"/>
-          </a:xfrm>
-          <a:prstGeom prst="line">
-            <a:avLst/>
-          </a:prstGeom>
-          <a:ln>
-            <a:solidFill>
-              <a:schemeClr val="accent2"/>
-            </a:solidFill>
-          </a:ln>
-        </p:spPr>
-        <p:style>
-          <a:lnRef idx="1">
-            <a:schemeClr val="accent1"/>
-          </a:lnRef>
-          <a:fillRef idx="0">
-            <a:schemeClr val="accent1"/>
-          </a:fillRef>
-          <a:effectRef idx="0">
-            <a:schemeClr val="accent1"/>
-          </a:effectRef>
-          <a:fontRef idx="minor">
-            <a:schemeClr val="tx1"/>
-          </a:fontRef>
-        </p:style>
-      </p:cxnSp>
-      <p:cxnSp>
-        <p:nvCxnSpPr>
-          <p:cNvPr id="121" name="Straight Connector 120">
-            <a:extLst>
-              <a:ext uri="{FF2B5EF4-FFF2-40B4-BE49-F238E27FC236}">
-                <a16:creationId xmlns:a16="http://schemas.microsoft.com/office/drawing/2014/main" id="{93B062F3-D947-2745-9C86-EB1D2828E3E5}"/>
-              </a:ext>
-            </a:extLst>
-          </p:cNvPr>
-          <p:cNvCxnSpPr>
-            <a:cxnSpLocks/>
-          </p:cNvCxnSpPr>
-          <p:nvPr/>
-        </p:nvCxnSpPr>
-        <p:spPr>
-          <a:xfrm>
-            <a:off x="5340987" y="3302430"/>
-            <a:ext cx="93600" cy="39600"/>
-          </a:xfrm>
-          <a:prstGeom prst="line">
-            <a:avLst/>
-          </a:prstGeom>
-          <a:ln>
-            <a:solidFill>
-              <a:schemeClr val="accent2"/>
-            </a:solidFill>
-          </a:ln>
-        </p:spPr>
-        <p:style>
-          <a:lnRef idx="1">
-            <a:schemeClr val="accent1"/>
-          </a:lnRef>
-          <a:fillRef idx="0">
-            <a:schemeClr val="accent1"/>
-          </a:fillRef>
-          <a:effectRef idx="0">
-            <a:schemeClr val="accent1"/>
-          </a:effectRef>
-          <a:fontRef idx="minor">
-            <a:schemeClr val="tx1"/>
-          </a:fontRef>
-        </p:style>
-      </p:cxnSp>
-      <p:sp>
-        <p:nvSpPr>
-          <p:cNvPr id="109" name="TextBox 108">
-            <a:extLst>
-              <a:ext uri="{FF2B5EF4-FFF2-40B4-BE49-F238E27FC236}">
-                <a16:creationId xmlns:a16="http://schemas.microsoft.com/office/drawing/2014/main" id="{9276B4C0-2EBD-314E-B34A-F6E33FE3F7E4}"/>
-              </a:ext>
-            </a:extLst>
-          </p:cNvPr>
-          <p:cNvSpPr txBox="1"/>
-          <p:nvPr/>
-        </p:nvSpPr>
-        <p:spPr>
-          <a:xfrm>
-            <a:off x="5490947" y="3154473"/>
-            <a:ext cx="1397052" cy="215444"/>
-          </a:xfrm>
-          <a:prstGeom prst="rect">
-            <a:avLst/>
-          </a:prstGeom>
-          <a:noFill/>
-        </p:spPr>
-        <p:txBody>
-          <a:bodyPr wrap="square" rtlCol="0">
-            <a:spAutoFit/>
-          </a:bodyPr>
-          <a:lstStyle/>
-          <a:p>
-            <a:r>
-              <a:rPr lang="en-US" sz="800" dirty="0"/>
-              <a:t>new Lesson(Lesson Details)</a:t>
-            </a:r>
-          </a:p>
-        </p:txBody>
-      </p:sp>
+              <a:t>ModuleStorage</a:t>
+            </a:r>
+            <a:endParaRPr lang="en-US" sz="800" dirty="0"/>
+          </a:p>
+        </p:txBody>
+      </p:sp>
+      <p:grpSp>
+        <p:nvGrpSpPr>
+          <p:cNvPr id="92" name="Group 91">
+            <a:extLst>
+              <a:ext uri="{FF2B5EF4-FFF2-40B4-BE49-F238E27FC236}">
+                <a16:creationId xmlns:a16="http://schemas.microsoft.com/office/drawing/2014/main" id="{5ECAFB00-5DBE-46EA-B547-C778AD4A92AD}"/>
+              </a:ext>
+            </a:extLst>
+          </p:cNvPr>
+          <p:cNvGrpSpPr/>
+          <p:nvPr/>
+        </p:nvGrpSpPr>
+        <p:grpSpPr>
+          <a:xfrm>
+            <a:off x="3589604" y="4991049"/>
+            <a:ext cx="3362603" cy="76014"/>
+            <a:chOff x="3586770" y="5834497"/>
+            <a:chExt cx="3362603" cy="76014"/>
+          </a:xfrm>
+        </p:grpSpPr>
+        <p:cxnSp>
+          <p:nvCxnSpPr>
+            <p:cNvPr id="93" name="Straight Arrow Connector 92">
+              <a:extLst>
+                <a:ext uri="{FF2B5EF4-FFF2-40B4-BE49-F238E27FC236}">
+                  <a16:creationId xmlns:a16="http://schemas.microsoft.com/office/drawing/2014/main" id="{8C40E31B-9974-4B4C-A2ED-1161603BB3E7}"/>
+                </a:ext>
+              </a:extLst>
+            </p:cNvPr>
+            <p:cNvCxnSpPr>
+              <a:cxnSpLocks/>
+              <a:stCxn id="155" idx="2"/>
+            </p:cNvCxnSpPr>
+            <p:nvPr/>
+          </p:nvCxnSpPr>
+          <p:spPr>
+            <a:xfrm flipH="1">
+              <a:off x="3609073" y="5872647"/>
+              <a:ext cx="3340300" cy="5086"/>
+            </a:xfrm>
+            <a:prstGeom prst="straightConnector1">
+              <a:avLst/>
+            </a:prstGeom>
+            <a:ln w="9525" cap="flat" cmpd="sng" algn="ctr">
+              <a:solidFill>
+                <a:schemeClr val="accent2"/>
+              </a:solidFill>
+              <a:prstDash val="dash"/>
+              <a:round/>
+              <a:headEnd type="none" w="med" len="med"/>
+              <a:tailEnd type="none" w="med" len="med"/>
+            </a:ln>
+          </p:spPr>
+          <p:style>
+            <a:lnRef idx="0">
+              <a:scrgbClr r="0" g="0" b="0"/>
+            </a:lnRef>
+            <a:fillRef idx="0">
+              <a:scrgbClr r="0" g="0" b="0"/>
+            </a:fillRef>
+            <a:effectRef idx="0">
+              <a:scrgbClr r="0" g="0" b="0"/>
+            </a:effectRef>
+            <a:fontRef idx="minor">
+              <a:schemeClr val="tx1"/>
+            </a:fontRef>
+          </p:style>
+        </p:cxnSp>
+        <p:cxnSp>
+          <p:nvCxnSpPr>
+            <p:cNvPr id="98" name="Straight Connector 97">
+              <a:extLst>
+                <a:ext uri="{FF2B5EF4-FFF2-40B4-BE49-F238E27FC236}">
+                  <a16:creationId xmlns:a16="http://schemas.microsoft.com/office/drawing/2014/main" id="{ACD087CD-35D0-4825-857B-F557CB685AE7}"/>
+                </a:ext>
+              </a:extLst>
+            </p:cNvPr>
+            <p:cNvCxnSpPr>
+              <a:cxnSpLocks/>
+            </p:cNvCxnSpPr>
+            <p:nvPr/>
+          </p:nvCxnSpPr>
+          <p:spPr>
+            <a:xfrm flipV="1">
+              <a:off x="3586770" y="5834497"/>
+              <a:ext cx="84432" cy="45074"/>
+            </a:xfrm>
+            <a:prstGeom prst="line">
+              <a:avLst/>
+            </a:prstGeom>
+            <a:ln>
+              <a:solidFill>
+                <a:schemeClr val="accent2"/>
+              </a:solidFill>
+            </a:ln>
+          </p:spPr>
+          <p:style>
+            <a:lnRef idx="1">
+              <a:schemeClr val="accent1"/>
+            </a:lnRef>
+            <a:fillRef idx="0">
+              <a:schemeClr val="accent1"/>
+            </a:fillRef>
+            <a:effectRef idx="0">
+              <a:schemeClr val="accent1"/>
+            </a:effectRef>
+            <a:fontRef idx="minor">
+              <a:schemeClr val="tx1"/>
+            </a:fontRef>
+          </p:style>
+        </p:cxnSp>
+        <p:cxnSp>
+          <p:nvCxnSpPr>
+            <p:cNvPr id="102" name="Straight Connector 101">
+              <a:extLst>
+                <a:ext uri="{FF2B5EF4-FFF2-40B4-BE49-F238E27FC236}">
+                  <a16:creationId xmlns:a16="http://schemas.microsoft.com/office/drawing/2014/main" id="{DC2DE6CF-A907-441B-99D6-CB81ACDE5B27}"/>
+                </a:ext>
+              </a:extLst>
+            </p:cNvPr>
+            <p:cNvCxnSpPr>
+              <a:cxnSpLocks/>
+            </p:cNvCxnSpPr>
+            <p:nvPr/>
+          </p:nvCxnSpPr>
+          <p:spPr>
+            <a:xfrm>
+              <a:off x="3592215" y="5879572"/>
+              <a:ext cx="78987" cy="30939"/>
+            </a:xfrm>
+            <a:prstGeom prst="line">
+              <a:avLst/>
+            </a:prstGeom>
+            <a:ln>
+              <a:solidFill>
+                <a:schemeClr val="accent2"/>
+              </a:solidFill>
+            </a:ln>
+          </p:spPr>
+          <p:style>
+            <a:lnRef idx="1">
+              <a:schemeClr val="accent1"/>
+            </a:lnRef>
+            <a:fillRef idx="0">
+              <a:schemeClr val="accent1"/>
+            </a:fillRef>
+            <a:effectRef idx="0">
+              <a:schemeClr val="accent1"/>
+            </a:effectRef>
+            <a:fontRef idx="minor">
+              <a:schemeClr val="tx1"/>
+            </a:fontRef>
+          </p:style>
+        </p:cxnSp>
+      </p:grpSp>
     </p:spTree>
     <p:extLst>
       <p:ext uri="{BB962C8B-B14F-4D97-AF65-F5344CB8AC3E}">
-        <p14:creationId xmlns:p14="http://schemas.microsoft.com/office/powerpoint/2010/main" val="4026747122"/>
+        <p14:creationId xmlns:p14="http://schemas.microsoft.com/office/powerpoint/2010/main" val="998205708"/>
       </p:ext>
     </p:extLst>
   </p:cSld>

</xml_diff>

<commit_message>
Edit plannerAddSeq1 and moduleStoreSequence
</commit_message>
<xml_diff>
--- a/docs/assets/DG Diagrams.pptx
+++ b/docs/assets/DG Diagrams.pptx
@@ -3778,6 +3778,163 @@
           <a:chExt cx="0" cy="0"/>
         </a:xfrm>
       </p:grpSpPr>
+      <p:grpSp>
+        <p:nvGrpSpPr>
+          <p:cNvPr id="74" name="Group 73">
+            <a:extLst>
+              <a:ext uri="{FF2B5EF4-FFF2-40B4-BE49-F238E27FC236}">
+                <a16:creationId xmlns:a16="http://schemas.microsoft.com/office/drawing/2014/main" id="{F9AAEDC3-9DC8-4E39-9EB3-D5203C53C01C}"/>
+              </a:ext>
+            </a:extLst>
+          </p:cNvPr>
+          <p:cNvGrpSpPr/>
+          <p:nvPr/>
+        </p:nvGrpSpPr>
+        <p:grpSpPr>
+          <a:xfrm>
+            <a:off x="892423" y="2791203"/>
+            <a:ext cx="113349" cy="229735"/>
+            <a:chOff x="892968" y="2808822"/>
+            <a:chExt cx="113349" cy="229735"/>
+          </a:xfrm>
+        </p:grpSpPr>
+        <p:cxnSp>
+          <p:nvCxnSpPr>
+            <p:cNvPr id="75" name="Straight Connector 74">
+              <a:extLst>
+                <a:ext uri="{FF2B5EF4-FFF2-40B4-BE49-F238E27FC236}">
+                  <a16:creationId xmlns:a16="http://schemas.microsoft.com/office/drawing/2014/main" id="{29AA62FB-9132-4D06-B0E8-72CD31EC8AD1}"/>
+                </a:ext>
+              </a:extLst>
+            </p:cNvPr>
+            <p:cNvCxnSpPr>
+              <a:cxnSpLocks/>
+            </p:cNvCxnSpPr>
+            <p:nvPr/>
+          </p:nvCxnSpPr>
+          <p:spPr>
+            <a:xfrm flipV="1">
+              <a:off x="927250" y="2899492"/>
+              <a:ext cx="79067" cy="64572"/>
+            </a:xfrm>
+            <a:prstGeom prst="line">
+              <a:avLst/>
+            </a:prstGeom>
+            <a:ln>
+              <a:solidFill>
+                <a:schemeClr val="accent2"/>
+              </a:solidFill>
+            </a:ln>
+          </p:spPr>
+          <p:style>
+            <a:lnRef idx="1">
+              <a:schemeClr val="accent1"/>
+            </a:lnRef>
+            <a:fillRef idx="0">
+              <a:schemeClr val="accent1"/>
+            </a:fillRef>
+            <a:effectRef idx="0">
+              <a:schemeClr val="accent1"/>
+            </a:effectRef>
+            <a:fontRef idx="minor">
+              <a:schemeClr val="tx1"/>
+            </a:fontRef>
+          </p:style>
+        </p:cxnSp>
+        <p:cxnSp>
+          <p:nvCxnSpPr>
+            <p:cNvPr id="76" name="Straight Connector 75">
+              <a:extLst>
+                <a:ext uri="{FF2B5EF4-FFF2-40B4-BE49-F238E27FC236}">
+                  <a16:creationId xmlns:a16="http://schemas.microsoft.com/office/drawing/2014/main" id="{ABB312E1-2BFE-4645-8FA2-6119CC5A6D02}"/>
+                </a:ext>
+              </a:extLst>
+            </p:cNvPr>
+            <p:cNvCxnSpPr>
+              <a:cxnSpLocks/>
+            </p:cNvCxnSpPr>
+            <p:nvPr/>
+          </p:nvCxnSpPr>
+          <p:spPr>
+            <a:xfrm>
+              <a:off x="927310" y="2971435"/>
+              <a:ext cx="78948" cy="67122"/>
+            </a:xfrm>
+            <a:prstGeom prst="line">
+              <a:avLst/>
+            </a:prstGeom>
+            <a:ln>
+              <a:solidFill>
+                <a:schemeClr val="accent2"/>
+              </a:solidFill>
+            </a:ln>
+          </p:spPr>
+          <p:style>
+            <a:lnRef idx="1">
+              <a:schemeClr val="accent1"/>
+            </a:lnRef>
+            <a:fillRef idx="0">
+              <a:schemeClr val="accent1"/>
+            </a:fillRef>
+            <a:effectRef idx="0">
+              <a:schemeClr val="accent1"/>
+            </a:effectRef>
+            <a:fontRef idx="minor">
+              <a:schemeClr val="tx1"/>
+            </a:fontRef>
+          </p:style>
+        </p:cxnSp>
+        <p:cxnSp>
+          <p:nvCxnSpPr>
+            <p:cNvPr id="77" name="Curved Connector 16">
+              <a:extLst>
+                <a:ext uri="{FF2B5EF4-FFF2-40B4-BE49-F238E27FC236}">
+                  <a16:creationId xmlns:a16="http://schemas.microsoft.com/office/drawing/2014/main" id="{24A7CFB5-8441-4698-B6C5-21FF42EF085F}"/>
+                </a:ext>
+              </a:extLst>
+            </p:cNvPr>
+            <p:cNvCxnSpPr>
+              <a:cxnSpLocks/>
+            </p:cNvCxnSpPr>
+            <p:nvPr/>
+          </p:nvCxnSpPr>
+          <p:spPr>
+            <a:xfrm rot="16200000" flipH="1">
+              <a:off x="840236" y="2861554"/>
+              <a:ext cx="162613" cy="57149"/>
+            </a:xfrm>
+            <a:prstGeom prst="curvedConnector4">
+              <a:avLst>
+                <a:gd name="adj1" fmla="val 6204"/>
+                <a:gd name="adj2" fmla="val 500007"/>
+              </a:avLst>
+            </a:prstGeom>
+            <a:ln w="9525" cap="flat" cmpd="sng" algn="ctr">
+              <a:solidFill>
+                <a:schemeClr val="accent2"/>
+              </a:solidFill>
+              <a:prstDash val="dash"/>
+              <a:round/>
+              <a:headEnd type="none" w="med" len="med"/>
+              <a:tailEnd type="none" w="med" len="med"/>
+            </a:ln>
+          </p:spPr>
+          <p:style>
+            <a:lnRef idx="0">
+              <a:scrgbClr r="0" g="0" b="0"/>
+            </a:lnRef>
+            <a:fillRef idx="0">
+              <a:scrgbClr r="0" g="0" b="0"/>
+            </a:fillRef>
+            <a:effectRef idx="0">
+              <a:scrgbClr r="0" g="0" b="0"/>
+            </a:effectRef>
+            <a:fontRef idx="minor">
+              <a:schemeClr val="tx1"/>
+            </a:fontRef>
+          </p:style>
+        </p:cxnSp>
+      </p:grpSp>
       <p:sp>
         <p:nvSpPr>
           <p:cNvPr id="118" name="TextBox 117">
@@ -3864,56 +4021,6 @@
             <a:round/>
             <a:headEnd type="none" w="med" len="med"/>
             <a:tailEnd type="none" w="med" len="med"/>
-          </a:ln>
-        </p:spPr>
-        <p:style>
-          <a:lnRef idx="0">
-            <a:scrgbClr r="0" g="0" b="0"/>
-          </a:lnRef>
-          <a:fillRef idx="0">
-            <a:scrgbClr r="0" g="0" b="0"/>
-          </a:fillRef>
-          <a:effectRef idx="0">
-            <a:scrgbClr r="0" g="0" b="0"/>
-          </a:effectRef>
-          <a:fontRef idx="minor">
-            <a:schemeClr val="tx1"/>
-          </a:fontRef>
-        </p:style>
-      </p:cxnSp>
-      <p:cxnSp>
-        <p:nvCxnSpPr>
-          <p:cNvPr id="103" name="Curved Connector 16">
-            <a:extLst>
-              <a:ext uri="{FF2B5EF4-FFF2-40B4-BE49-F238E27FC236}">
-                <a16:creationId xmlns:a16="http://schemas.microsoft.com/office/drawing/2014/main" id="{3FF8BC15-8400-4895-90F8-60A8F0CCFF9E}"/>
-              </a:ext>
-            </a:extLst>
-          </p:cNvPr>
-          <p:cNvCxnSpPr>
-            <a:cxnSpLocks/>
-          </p:cNvCxnSpPr>
-          <p:nvPr/>
-        </p:nvCxnSpPr>
-        <p:spPr>
-          <a:xfrm rot="16200000" flipH="1">
-            <a:off x="812689" y="2848806"/>
-            <a:ext cx="162613" cy="57149"/>
-          </a:xfrm>
-          <a:prstGeom prst="curvedConnector4">
-            <a:avLst>
-              <a:gd name="adj1" fmla="val 6204"/>
-              <a:gd name="adj2" fmla="val 544452"/>
-            </a:avLst>
-          </a:prstGeom>
-          <a:ln w="9525" cap="flat" cmpd="sng" algn="ctr">
-            <a:solidFill>
-              <a:schemeClr val="accent2"/>
-            </a:solidFill>
-            <a:prstDash val="solid"/>
-            <a:round/>
-            <a:headEnd type="none" w="med" len="med"/>
-            <a:tailEnd type="arrow" w="med" len="med"/>
           </a:ln>
         </p:spPr>
         <p:style>
@@ -13533,6 +13640,163 @@
           <a:chExt cx="0" cy="0"/>
         </a:xfrm>
       </p:grpSpPr>
+      <p:grpSp>
+        <p:nvGrpSpPr>
+          <p:cNvPr id="86" name="Group 85">
+            <a:extLst>
+              <a:ext uri="{FF2B5EF4-FFF2-40B4-BE49-F238E27FC236}">
+                <a16:creationId xmlns:a16="http://schemas.microsoft.com/office/drawing/2014/main" id="{1664C5A1-423E-40B4-9E97-058D7412819B}"/>
+              </a:ext>
+            </a:extLst>
+          </p:cNvPr>
+          <p:cNvGrpSpPr/>
+          <p:nvPr/>
+        </p:nvGrpSpPr>
+        <p:grpSpPr>
+          <a:xfrm>
+            <a:off x="905638" y="2799839"/>
+            <a:ext cx="113349" cy="229735"/>
+            <a:chOff x="892968" y="2808822"/>
+            <a:chExt cx="113349" cy="229735"/>
+          </a:xfrm>
+        </p:grpSpPr>
+        <p:cxnSp>
+          <p:nvCxnSpPr>
+            <p:cNvPr id="88" name="Straight Connector 87">
+              <a:extLst>
+                <a:ext uri="{FF2B5EF4-FFF2-40B4-BE49-F238E27FC236}">
+                  <a16:creationId xmlns:a16="http://schemas.microsoft.com/office/drawing/2014/main" id="{2A8E107C-0875-4249-A48C-702F2940B751}"/>
+                </a:ext>
+              </a:extLst>
+            </p:cNvPr>
+            <p:cNvCxnSpPr>
+              <a:cxnSpLocks/>
+            </p:cNvCxnSpPr>
+            <p:nvPr/>
+          </p:nvCxnSpPr>
+          <p:spPr>
+            <a:xfrm flipV="1">
+              <a:off x="927250" y="2899492"/>
+              <a:ext cx="79067" cy="64572"/>
+            </a:xfrm>
+            <a:prstGeom prst="line">
+              <a:avLst/>
+            </a:prstGeom>
+            <a:ln>
+              <a:solidFill>
+                <a:schemeClr val="accent2"/>
+              </a:solidFill>
+            </a:ln>
+          </p:spPr>
+          <p:style>
+            <a:lnRef idx="1">
+              <a:schemeClr val="accent1"/>
+            </a:lnRef>
+            <a:fillRef idx="0">
+              <a:schemeClr val="accent1"/>
+            </a:fillRef>
+            <a:effectRef idx="0">
+              <a:schemeClr val="accent1"/>
+            </a:effectRef>
+            <a:fontRef idx="minor">
+              <a:schemeClr val="tx1"/>
+            </a:fontRef>
+          </p:style>
+        </p:cxnSp>
+        <p:cxnSp>
+          <p:nvCxnSpPr>
+            <p:cNvPr id="91" name="Straight Connector 90">
+              <a:extLst>
+                <a:ext uri="{FF2B5EF4-FFF2-40B4-BE49-F238E27FC236}">
+                  <a16:creationId xmlns:a16="http://schemas.microsoft.com/office/drawing/2014/main" id="{39239D9D-63FC-4E42-9ECA-8EB536D46D56}"/>
+                </a:ext>
+              </a:extLst>
+            </p:cNvPr>
+            <p:cNvCxnSpPr>
+              <a:cxnSpLocks/>
+            </p:cNvCxnSpPr>
+            <p:nvPr/>
+          </p:nvCxnSpPr>
+          <p:spPr>
+            <a:xfrm>
+              <a:off x="927310" y="2971435"/>
+              <a:ext cx="78948" cy="67122"/>
+            </a:xfrm>
+            <a:prstGeom prst="line">
+              <a:avLst/>
+            </a:prstGeom>
+            <a:ln>
+              <a:solidFill>
+                <a:schemeClr val="accent2"/>
+              </a:solidFill>
+            </a:ln>
+          </p:spPr>
+          <p:style>
+            <a:lnRef idx="1">
+              <a:schemeClr val="accent1"/>
+            </a:lnRef>
+            <a:fillRef idx="0">
+              <a:schemeClr val="accent1"/>
+            </a:fillRef>
+            <a:effectRef idx="0">
+              <a:schemeClr val="accent1"/>
+            </a:effectRef>
+            <a:fontRef idx="minor">
+              <a:schemeClr val="tx1"/>
+            </a:fontRef>
+          </p:style>
+        </p:cxnSp>
+        <p:cxnSp>
+          <p:nvCxnSpPr>
+            <p:cNvPr id="92" name="Curved Connector 16">
+              <a:extLst>
+                <a:ext uri="{FF2B5EF4-FFF2-40B4-BE49-F238E27FC236}">
+                  <a16:creationId xmlns:a16="http://schemas.microsoft.com/office/drawing/2014/main" id="{EC3DA632-1C8E-46BF-8F8F-E90921BF43D9}"/>
+                </a:ext>
+              </a:extLst>
+            </p:cNvPr>
+            <p:cNvCxnSpPr>
+              <a:cxnSpLocks/>
+            </p:cNvCxnSpPr>
+            <p:nvPr/>
+          </p:nvCxnSpPr>
+          <p:spPr>
+            <a:xfrm rot="16200000" flipH="1">
+              <a:off x="840236" y="2861554"/>
+              <a:ext cx="162613" cy="57149"/>
+            </a:xfrm>
+            <a:prstGeom prst="curvedConnector4">
+              <a:avLst>
+                <a:gd name="adj1" fmla="val 6204"/>
+                <a:gd name="adj2" fmla="val 500007"/>
+              </a:avLst>
+            </a:prstGeom>
+            <a:ln w="9525" cap="flat" cmpd="sng" algn="ctr">
+              <a:solidFill>
+                <a:schemeClr val="accent2"/>
+              </a:solidFill>
+              <a:prstDash val="dash"/>
+              <a:round/>
+              <a:headEnd type="none" w="med" len="med"/>
+              <a:tailEnd type="none" w="med" len="med"/>
+            </a:ln>
+          </p:spPr>
+          <p:style>
+            <a:lnRef idx="0">
+              <a:scrgbClr r="0" g="0" b="0"/>
+            </a:lnRef>
+            <a:fillRef idx="0">
+              <a:scrgbClr r="0" g="0" b="0"/>
+            </a:fillRef>
+            <a:effectRef idx="0">
+              <a:scrgbClr r="0" g="0" b="0"/>
+            </a:effectRef>
+            <a:fontRef idx="minor">
+              <a:schemeClr val="tx1"/>
+            </a:fontRef>
+          </p:style>
+        </p:cxnSp>
+      </p:grpSp>
       <p:sp>
         <p:nvSpPr>
           <p:cNvPr id="2" name="TextBox 1">

</xml_diff>

<commit_message>
refactor image file name
images weren't showing because incorrect references
</commit_message>
<xml_diff>
--- a/docs/assets/DG Diagrams.pptx
+++ b/docs/assets/DG Diagrams.pptx
@@ -219,7 +219,7 @@
           <a:p>
             <a:fld id="{31B455B7-35F4-3248-9980-DA268DAEE9E9}" type="datetimeFigureOut">
               <a:rPr lang="en-US" smtClean="0"/>
-              <a:t>21-Oct-21</a:t>
+              <a:t>10/21/2021</a:t>
             </a:fld>
             <a:endParaRPr lang="en-US" dirty="0"/>
           </a:p>
@@ -806,7 +806,7 @@
               <a:rPr lang="en-US" smtClean="0"/>
               <a:t>12</a:t>
             </a:fld>
-            <a:endParaRPr lang="en-US"/>
+            <a:endParaRPr lang="en-US" dirty="0"/>
           </a:p>
         </p:txBody>
       </p:sp>
@@ -1002,7 +1002,7 @@
           <a:p>
             <a:fld id="{78C97017-6FC3-485B-9764-EAC9E56C1D49}" type="datetimeFigureOut">
               <a:rPr lang="en-US" smtClean="0"/>
-              <a:t>21-Oct-21</a:t>
+              <a:t>10/21/2021</a:t>
             </a:fld>
             <a:endParaRPr lang="en-US" dirty="0"/>
           </a:p>
@@ -1170,7 +1170,7 @@
           <a:p>
             <a:fld id="{78C97017-6FC3-485B-9764-EAC9E56C1D49}" type="datetimeFigureOut">
               <a:rPr lang="en-US" smtClean="0"/>
-              <a:t>21-Oct-21</a:t>
+              <a:t>10/21/2021</a:t>
             </a:fld>
             <a:endParaRPr lang="en-US" dirty="0"/>
           </a:p>
@@ -1348,7 +1348,7 @@
           <a:p>
             <a:fld id="{78C97017-6FC3-485B-9764-EAC9E56C1D49}" type="datetimeFigureOut">
               <a:rPr lang="en-US" smtClean="0"/>
-              <a:t>21-Oct-21</a:t>
+              <a:t>10/21/2021</a:t>
             </a:fld>
             <a:endParaRPr lang="en-US" dirty="0"/>
           </a:p>
@@ -1516,7 +1516,7 @@
           <a:p>
             <a:fld id="{78C97017-6FC3-485B-9764-EAC9E56C1D49}" type="datetimeFigureOut">
               <a:rPr lang="en-US" smtClean="0"/>
-              <a:t>21-Oct-21</a:t>
+              <a:t>10/21/2021</a:t>
             </a:fld>
             <a:endParaRPr lang="en-US" dirty="0"/>
           </a:p>
@@ -1761,7 +1761,7 @@
           <a:p>
             <a:fld id="{78C97017-6FC3-485B-9764-EAC9E56C1D49}" type="datetimeFigureOut">
               <a:rPr lang="en-US" smtClean="0"/>
-              <a:t>21-Oct-21</a:t>
+              <a:t>10/21/2021</a:t>
             </a:fld>
             <a:endParaRPr lang="en-US" dirty="0"/>
           </a:p>
@@ -2046,7 +2046,7 @@
           <a:p>
             <a:fld id="{78C97017-6FC3-485B-9764-EAC9E56C1D49}" type="datetimeFigureOut">
               <a:rPr lang="en-US" smtClean="0"/>
-              <a:t>21-Oct-21</a:t>
+              <a:t>10/21/2021</a:t>
             </a:fld>
             <a:endParaRPr lang="en-US" dirty="0"/>
           </a:p>
@@ -2465,7 +2465,7 @@
           <a:p>
             <a:fld id="{78C97017-6FC3-485B-9764-EAC9E56C1D49}" type="datetimeFigureOut">
               <a:rPr lang="en-US" smtClean="0"/>
-              <a:t>21-Oct-21</a:t>
+              <a:t>10/21/2021</a:t>
             </a:fld>
             <a:endParaRPr lang="en-US" dirty="0"/>
           </a:p>
@@ -2582,7 +2582,7 @@
           <a:p>
             <a:fld id="{78C97017-6FC3-485B-9764-EAC9E56C1D49}" type="datetimeFigureOut">
               <a:rPr lang="en-US" smtClean="0"/>
-              <a:t>21-Oct-21</a:t>
+              <a:t>10/21/2021</a:t>
             </a:fld>
             <a:endParaRPr lang="en-US" dirty="0"/>
           </a:p>
@@ -2677,7 +2677,7 @@
           <a:p>
             <a:fld id="{78C97017-6FC3-485B-9764-EAC9E56C1D49}" type="datetimeFigureOut">
               <a:rPr lang="en-US" smtClean="0"/>
-              <a:t>21-Oct-21</a:t>
+              <a:t>10/21/2021</a:t>
             </a:fld>
             <a:endParaRPr lang="en-US" dirty="0"/>
           </a:p>
@@ -2952,7 +2952,7 @@
           <a:p>
             <a:fld id="{78C97017-6FC3-485B-9764-EAC9E56C1D49}" type="datetimeFigureOut">
               <a:rPr lang="en-US" smtClean="0"/>
-              <a:t>21-Oct-21</a:t>
+              <a:t>10/21/2021</a:t>
             </a:fld>
             <a:endParaRPr lang="en-US" dirty="0"/>
           </a:p>
@@ -3204,7 +3204,7 @@
           <a:p>
             <a:fld id="{78C97017-6FC3-485B-9764-EAC9E56C1D49}" type="datetimeFigureOut">
               <a:rPr lang="en-US" smtClean="0"/>
-              <a:t>21-Oct-21</a:t>
+              <a:t>10/21/2021</a:t>
             </a:fld>
             <a:endParaRPr lang="en-US" dirty="0"/>
           </a:p>
@@ -3415,7 +3415,7 @@
           <a:p>
             <a:fld id="{78C97017-6FC3-485B-9764-EAC9E56C1D49}" type="datetimeFigureOut">
               <a:rPr lang="en-US" smtClean="0"/>
-              <a:t>21-Oct-21</a:t>
+              <a:t>10/21/2021</a:t>
             </a:fld>
             <a:endParaRPr lang="en-US" dirty="0"/>
           </a:p>
@@ -4050,28 +4050,8 @@
           <a:lstStyle/>
           <a:p>
             <a:r>
-              <a:rPr lang="en-US" sz="800" dirty="0" err="1"/>
-              <a:t>storeModuleByCode</a:t>
-            </a:r>
-            <a:r>
               <a:rPr lang="en-US" sz="800" dirty="0"/>
-              <a:t>(</a:t>
-            </a:r>
-            <a:r>
-              <a:rPr lang="en-US" sz="800" dirty="0" err="1"/>
-              <a:t>moduleCode</a:t>
-            </a:r>
-            <a:r>
-              <a:rPr lang="en-US" sz="800" dirty="0"/>
-              <a:t>, </a:t>
-            </a:r>
-            <a:r>
-              <a:rPr lang="en-US" sz="800" dirty="0" err="1"/>
-              <a:t>moduleDb</a:t>
-            </a:r>
-            <a:r>
-              <a:rPr lang="en-US" sz="800" dirty="0"/>
-              <a:t>)</a:t>
+              <a:t>storeModuleByCode(moduleCode, moduleDb)</a:t>
             </a:r>
           </a:p>
         </p:txBody>
@@ -4471,15 +4451,7 @@
           <a:p>
             <a:r>
               <a:rPr lang="en-US" sz="800" dirty="0"/>
-              <a:t>parseSubCommand(</a:t>
-            </a:r>
-            <a:r>
-              <a:rPr lang="en-US" sz="800" dirty="0" err="1"/>
-              <a:t>subInput</a:t>
-            </a:r>
-            <a:r>
-              <a:rPr lang="en-US" sz="800" dirty="0"/>
-              <a:t>, “module”)</a:t>
+              <a:t>parseSubCommand(subInput, “module”)</a:t>
             </a:r>
           </a:p>
         </p:txBody>
@@ -4660,23 +4632,7 @@
           <a:p>
             <a:r>
               <a:rPr lang="en-US" sz="800" dirty="0"/>
-              <a:t>new </a:t>
-            </a:r>
-            <a:r>
-              <a:rPr lang="en-US" sz="800" dirty="0" err="1"/>
-              <a:t>ModuleCommand</a:t>
-            </a:r>
-            <a:r>
-              <a:rPr lang="en-US" sz="800" dirty="0"/>
-              <a:t>(subcommand, </a:t>
-            </a:r>
-            <a:r>
-              <a:rPr lang="en-US" sz="800" dirty="0" err="1"/>
-              <a:t>parsedArguments</a:t>
-            </a:r>
-            <a:r>
-              <a:rPr lang="en-US" sz="800" dirty="0"/>
-              <a:t>)</a:t>
+              <a:t>new ModuleCommand(subcommand, parsedArguments)</a:t>
             </a:r>
           </a:p>
         </p:txBody>
@@ -4735,13 +4691,8 @@
             <a:pPr algn="ctr"/>
             <a:r>
               <a:rPr lang="en-US" sz="800" dirty="0"/>
-              <a:t>:</a:t>
+              <a:t>:ModuleCommand</a:t>
             </a:r>
-            <a:r>
-              <a:rPr lang="en-US" sz="800" dirty="0" err="1"/>
-              <a:t>ModuleCommand</a:t>
-            </a:r>
-            <a:endParaRPr lang="en-US" sz="800" dirty="0"/>
           </a:p>
         </p:txBody>
       </p:sp>
@@ -5573,12 +5524,8 @@
           <a:lstStyle/>
           <a:p>
             <a:r>
-              <a:rPr lang="en-US" sz="800" dirty="0" err="1"/>
-              <a:t>storeModule</a:t>
-            </a:r>
-            <a:r>
               <a:rPr lang="en-US" sz="800" dirty="0"/>
-              <a:t>()</a:t>
+              <a:t>storeModule()</a:t>
             </a:r>
           </a:p>
         </p:txBody>
@@ -5782,10 +5729,9 @@
           <a:p>
             <a:pPr algn="ctr"/>
             <a:r>
-              <a:rPr lang="en-US" sz="800" dirty="0" err="1"/>
+              <a:rPr lang="en-US" sz="800" dirty="0"/>
               <a:t>moduleList:ModuleList</a:t>
             </a:r>
-            <a:endParaRPr lang="en-US" sz="800" dirty="0"/>
           </a:p>
         </p:txBody>
       </p:sp>
@@ -6152,12 +6098,8 @@
           <a:lstStyle/>
           <a:p>
             <a:r>
-              <a:rPr lang="en-US" sz="800" dirty="0" err="1"/>
-              <a:t>writeToFile</a:t>
-            </a:r>
-            <a:r>
               <a:rPr lang="en-US" sz="800" dirty="0"/>
-              <a:t>(data : String)</a:t>
+              <a:t>writeToFile(data : String)</a:t>
             </a:r>
           </a:p>
         </p:txBody>
@@ -6348,15 +6290,7 @@
           <a:p>
             <a:r>
               <a:rPr lang="en-US" sz="800" dirty="0"/>
-              <a:t>new </a:t>
-            </a:r>
-            <a:r>
-              <a:rPr lang="en-US" sz="800" dirty="0" err="1"/>
-              <a:t>CommandResult</a:t>
-            </a:r>
-            <a:r>
-              <a:rPr lang="en-US" sz="800" dirty="0"/>
-              <a:t>(message)</a:t>
+              <a:t>new CommandResult(message)</a:t>
             </a:r>
           </a:p>
         </p:txBody>
@@ -6881,10 +6815,9 @@
           <a:p>
             <a:pPr algn="ctr"/>
             <a:r>
-              <a:rPr lang="en-US" sz="800" dirty="0" err="1"/>
+              <a:rPr lang="en-US" sz="800" dirty="0"/>
               <a:t>ModuleStorage</a:t>
             </a:r>
-            <a:endParaRPr lang="en-US" sz="800" dirty="0"/>
           </a:p>
         </p:txBody>
       </p:sp>
@@ -7180,21 +7113,8 @@
                   <a:schemeClr val="bg1"/>
                 </a:solidFill>
               </a:rPr>
-              <a:t>:</a:t>
+              <a:t>:CapCalculatorByCode</a:t>
             </a:r>
-            <a:r>
-              <a:rPr lang="en-US" sz="800" dirty="0" err="1">
-                <a:solidFill>
-                  <a:schemeClr val="bg1"/>
-                </a:solidFill>
-              </a:rPr>
-              <a:t>CapCalculatorByCode</a:t>
-            </a:r>
-            <a:endParaRPr lang="en-US" sz="800" dirty="0">
-              <a:solidFill>
-                <a:schemeClr val="bg1"/>
-              </a:solidFill>
-            </a:endParaRPr>
           </a:p>
         </p:txBody>
       </p:sp>
@@ -7505,7 +7425,7 @@
           <a:lstStyle/>
           <a:p>
             <a:pPr algn="ctr"/>
-            <a:endParaRPr lang="en-US"/>
+            <a:endParaRPr lang="en-US" dirty="0"/>
           </a:p>
         </p:txBody>
       </p:sp>
@@ -7769,7 +7689,7 @@
           <a:lstStyle/>
           <a:p>
             <a:pPr algn="ctr"/>
-            <a:endParaRPr lang="en-US"/>
+            <a:endParaRPr lang="en-US" dirty="0"/>
           </a:p>
         </p:txBody>
       </p:sp>
@@ -7802,12 +7722,8 @@
           <a:lstStyle/>
           <a:p>
             <a:r>
-              <a:rPr lang="en-US" sz="800" dirty="0" err="1"/>
-              <a:t>getInputModules</a:t>
-            </a:r>
-            <a:r>
               <a:rPr lang="en-US" sz="800" dirty="0"/>
-              <a:t>(input : String)</a:t>
+              <a:t>getInputModules(input : String)</a:t>
             </a:r>
           </a:p>
         </p:txBody>
@@ -7841,12 +7757,8 @@
           <a:lstStyle/>
           <a:p>
             <a:r>
-              <a:rPr lang="en-US" sz="800" dirty="0" err="1"/>
-              <a:t>checkModulesNotEmpty</a:t>
-            </a:r>
-            <a:r>
               <a:rPr lang="en-US" sz="800" dirty="0"/>
-              <a:t>()</a:t>
+              <a:t>checkModulesNotEmpty()</a:t>
             </a:r>
           </a:p>
         </p:txBody>
@@ -7965,15 +7877,7 @@
           <a:p>
             <a:r>
               <a:rPr lang="en-US" sz="800" dirty="0"/>
-              <a:t>[modules and </a:t>
-            </a:r>
-            <a:r>
-              <a:rPr lang="en-US" sz="800" dirty="0" err="1"/>
-              <a:t>invalidModules</a:t>
-            </a:r>
-            <a:r>
-              <a:rPr lang="en-US" sz="800" dirty="0"/>
-              <a:t> are empty]</a:t>
+              <a:t>[modules and invalidModules are empty]</a:t>
             </a:r>
           </a:p>
         </p:txBody>
@@ -8175,12 +8079,8 @@
           <a:lstStyle/>
           <a:p>
             <a:r>
-              <a:rPr lang="en-US" sz="800" dirty="0" err="1"/>
-              <a:t>checkInvalidModules</a:t>
-            </a:r>
-            <a:r>
               <a:rPr lang="en-US" sz="800" dirty="0"/>
-              <a:t>()</a:t>
+              <a:t>checkInvalidModules()</a:t>
             </a:r>
           </a:p>
         </p:txBody>
@@ -8299,15 +8199,7 @@
           <a:p>
             <a:r>
               <a:rPr lang="en-US" sz="800" dirty="0"/>
-              <a:t>[</a:t>
-            </a:r>
-            <a:r>
-              <a:rPr lang="en-US" sz="800" dirty="0" err="1"/>
-              <a:t>invalidModules</a:t>
-            </a:r>
-            <a:r>
-              <a:rPr lang="en-US" sz="800" dirty="0"/>
-              <a:t> is not empty]</a:t>
+              <a:t>[invalidModules is not empty]</a:t>
             </a:r>
           </a:p>
         </p:txBody>
@@ -8985,7 +8877,7 @@
           <a:lstStyle/>
           <a:p>
             <a:pPr algn="ctr"/>
-            <a:endParaRPr lang="en-US"/>
+            <a:endParaRPr lang="en-US" dirty="0"/>
           </a:p>
         </p:txBody>
       </p:sp>
@@ -9288,7 +9180,7 @@
           <a:lstStyle/>
           <a:p>
             <a:pPr algn="ctr"/>
-            <a:endParaRPr lang="en-US"/>
+            <a:endParaRPr lang="en-US" dirty="0"/>
           </a:p>
         </p:txBody>
       </p:sp>
@@ -9321,12 +9213,8 @@
           <a:lstStyle/>
           <a:p>
             <a:r>
-              <a:rPr lang="en-US" sz="800" dirty="0" err="1"/>
-              <a:t>getCap</a:t>
-            </a:r>
-            <a:r>
               <a:rPr lang="en-US" sz="800" dirty="0"/>
-              <a:t>()</a:t>
+              <a:t>getCap()</a:t>
             </a:r>
           </a:p>
         </p:txBody>
@@ -9630,7 +9518,7 @@
           <a:lstStyle/>
           <a:p>
             <a:pPr algn="ctr"/>
-            <a:endParaRPr lang="en-US"/>
+            <a:endParaRPr lang="en-US" dirty="0"/>
           </a:p>
         </p:txBody>
       </p:sp>
@@ -9896,7 +9784,7 @@
           <a:lstStyle/>
           <a:p>
             <a:pPr algn="ctr"/>
-            <a:endParaRPr lang="en-US"/>
+            <a:endParaRPr lang="en-US" dirty="0"/>
           </a:p>
         </p:txBody>
       </p:sp>
@@ -10037,18 +9925,13 @@
           <a:p>
             <a:pPr algn="ctr"/>
             <a:r>
-              <a:rPr lang="en-US" sz="800" dirty="0" err="1">
+              <a:rPr lang="en-US" sz="800" dirty="0">
                 <a:solidFill>
                   <a:schemeClr val="bg1"/>
                 </a:solidFill>
               </a:rPr>
               <a:t>module:ModuleDetails</a:t>
             </a:r>
-            <a:endParaRPr lang="en-US" sz="800" dirty="0">
-              <a:solidFill>
-                <a:schemeClr val="bg1"/>
-              </a:solidFill>
-            </a:endParaRPr>
           </a:p>
         </p:txBody>
       </p:sp>
@@ -10152,18 +10035,13 @@
           <a:p>
             <a:pPr algn="ctr"/>
             <a:r>
-              <a:rPr lang="en-US" sz="800" dirty="0" err="1">
+              <a:rPr lang="en-US" sz="800" dirty="0">
                 <a:solidFill>
                   <a:schemeClr val="bg1"/>
                 </a:solidFill>
               </a:rPr>
               <a:t>moduleInfo:ModuleDetails</a:t>
             </a:r>
-            <a:endParaRPr lang="en-US" sz="800" dirty="0">
-              <a:solidFill>
-                <a:schemeClr val="bg1"/>
-              </a:solidFill>
-            </a:endParaRPr>
           </a:p>
         </p:txBody>
       </p:sp>
@@ -10273,21 +10151,8 @@
                   <a:schemeClr val="bg1"/>
                 </a:solidFill>
               </a:rPr>
-              <a:t>:</a:t>
+              <a:t>:CapCalculatorByCode</a:t>
             </a:r>
-            <a:r>
-              <a:rPr lang="en-US" sz="800" dirty="0" err="1">
-                <a:solidFill>
-                  <a:schemeClr val="bg1"/>
-                </a:solidFill>
-              </a:rPr>
-              <a:t>CapCalculatorByCode</a:t>
-            </a:r>
-            <a:endParaRPr lang="en-US" sz="800" dirty="0">
-              <a:solidFill>
-                <a:schemeClr val="bg1"/>
-              </a:solidFill>
-            </a:endParaRPr>
           </a:p>
         </p:txBody>
       </p:sp>
@@ -10383,7 +10248,7 @@
           <a:lstStyle/>
           <a:p>
             <a:pPr algn="ctr"/>
-            <a:endParaRPr lang="en-US"/>
+            <a:endParaRPr lang="en-US" dirty="0"/>
           </a:p>
         </p:txBody>
       </p:sp>
@@ -10465,12 +10330,8 @@
           <a:lstStyle/>
           <a:p>
             <a:r>
-              <a:rPr lang="en-US" sz="800" dirty="0" err="1"/>
-              <a:t>sd</a:t>
-            </a:r>
-            <a:r>
               <a:rPr lang="en-US" sz="800" dirty="0"/>
-              <a:t> cap calculation</a:t>
+              <a:t>sd cap calculation</a:t>
             </a:r>
           </a:p>
         </p:txBody>
@@ -10586,12 +10447,8 @@
           <a:lstStyle/>
           <a:p>
             <a:r>
-              <a:rPr lang="en-US" sz="800" dirty="0" err="1"/>
-              <a:t>getModuleCode</a:t>
-            </a:r>
-            <a:r>
               <a:rPr lang="en-US" sz="800" dirty="0"/>
-              <a:t>()</a:t>
+              <a:t>getModuleCode()</a:t>
             </a:r>
           </a:p>
         </p:txBody>
@@ -10758,10 +10615,9 @@
           <a:lstStyle/>
           <a:p>
             <a:r>
-              <a:rPr lang="en-US" sz="800" dirty="0" err="1"/>
+              <a:rPr lang="en-US" sz="800" dirty="0"/>
               <a:t>moduleCode</a:t>
             </a:r>
-            <a:endParaRPr lang="en-US" sz="800" dirty="0"/>
           </a:p>
         </p:txBody>
       </p:sp>
@@ -10937,12 +10793,8 @@
           <a:lstStyle/>
           <a:p>
             <a:r>
-              <a:rPr lang="en-US" sz="800" dirty="0" err="1"/>
-              <a:t>getGradePoint</a:t>
-            </a:r>
-            <a:r>
               <a:rPr lang="en-US" sz="800" dirty="0"/>
-              <a:t>()</a:t>
+              <a:t>getGradePoint()</a:t>
             </a:r>
           </a:p>
         </p:txBody>
@@ -11138,21 +10990,8 @@
                   <a:schemeClr val="bg1"/>
                 </a:solidFill>
               </a:rPr>
-              <a:t>:</a:t>
+              <a:t>:ModuleDb</a:t>
             </a:r>
-            <a:r>
-              <a:rPr lang="en-US" sz="800" dirty="0" err="1">
-                <a:solidFill>
-                  <a:schemeClr val="bg1"/>
-                </a:solidFill>
-              </a:rPr>
-              <a:t>ModuleDb</a:t>
-            </a:r>
-            <a:endParaRPr lang="en-US" sz="800" dirty="0">
-              <a:solidFill>
-                <a:schemeClr val="bg1"/>
-              </a:solidFill>
-            </a:endParaRPr>
           </a:p>
         </p:txBody>
       </p:sp>
@@ -11280,20 +11119,8 @@
           <a:lstStyle/>
           <a:p>
             <a:r>
-              <a:rPr lang="en-US" sz="800" dirty="0" err="1"/>
-              <a:t>getModuleInfo</a:t>
-            </a:r>
-            <a:r>
               <a:rPr lang="en-US" sz="800" dirty="0"/>
-              <a:t>  (</a:t>
-            </a:r>
-            <a:r>
-              <a:rPr lang="en-US" sz="800" dirty="0" err="1"/>
-              <a:t>moduleCode</a:t>
-            </a:r>
-            <a:r>
-              <a:rPr lang="en-US" sz="800" dirty="0"/>
-              <a:t> : String)</a:t>
+              <a:t>getModuleInfo  (moduleCode : String)</a:t>
             </a:r>
           </a:p>
         </p:txBody>
@@ -11474,7 +11301,7 @@
           <a:lstStyle/>
           <a:p>
             <a:pPr algn="ctr"/>
-            <a:endParaRPr lang="en-US"/>
+            <a:endParaRPr lang="en-US" dirty="0"/>
           </a:p>
         </p:txBody>
       </p:sp>
@@ -11641,15 +11468,7 @@
           <a:p>
             <a:r>
               <a:rPr lang="en-US" sz="800" dirty="0"/>
-              <a:t>[</a:t>
-            </a:r>
-            <a:r>
-              <a:rPr lang="en-US" sz="800" dirty="0" err="1"/>
-              <a:t>moduleInfo</a:t>
-            </a:r>
-            <a:r>
-              <a:rPr lang="en-US" sz="800" dirty="0"/>
-              <a:t> is not null]</a:t>
+              <a:t>[moduleInfo is not null]</a:t>
             </a:r>
           </a:p>
         </p:txBody>
@@ -11912,12 +11731,8 @@
           <a:lstStyle/>
           <a:p>
             <a:r>
-              <a:rPr lang="en-US" sz="800" dirty="0" err="1"/>
-              <a:t>getModuleCredit</a:t>
-            </a:r>
-            <a:r>
               <a:rPr lang="en-US" sz="800" dirty="0"/>
-              <a:t>()</a:t>
+              <a:t>getModuleCredit()</a:t>
             </a:r>
           </a:p>
         </p:txBody>
@@ -11965,7 +11780,7 @@
           <a:lstStyle/>
           <a:p>
             <a:pPr algn="ctr"/>
-            <a:endParaRPr lang="en-US"/>
+            <a:endParaRPr lang="en-US" dirty="0"/>
           </a:p>
         </p:txBody>
       </p:sp>
@@ -12141,20 +11956,12 @@
           <a:p>
             <a:pPr algn="ctr"/>
             <a:r>
-              <a:rPr lang="en-US" sz="800" dirty="0" err="1">
-                <a:solidFill>
-                  <a:schemeClr val="bg1"/>
-                </a:solidFill>
-              </a:rPr>
-              <a:t>invalidModules:ArrayList</a:t>
-            </a:r>
-            <a:r>
               <a:rPr lang="en-US" sz="800" dirty="0">
                 <a:solidFill>
                   <a:schemeClr val="bg1"/>
                 </a:solidFill>
               </a:rPr>
-              <a:t>&lt;String&gt;</a:t>
+              <a:t>invalidModules:ArrayList&lt;String&gt;</a:t>
             </a:r>
           </a:p>
         </p:txBody>
@@ -12283,23 +12090,7 @@
           <a:p>
             <a:r>
               <a:rPr lang="en-US" sz="800" dirty="0"/>
-              <a:t>add(</a:t>
-            </a:r>
-            <a:r>
-              <a:rPr lang="en-US" sz="800" dirty="0" err="1"/>
-              <a:t>module.getModuleCode</a:t>
-            </a:r>
-            <a:r>
-              <a:rPr lang="en-US" sz="800" dirty="0"/>
-              <a:t>() + DIVIDER + </a:t>
-            </a:r>
-            <a:r>
-              <a:rPr lang="en-US" sz="800" dirty="0" err="1"/>
-              <a:t>module.getGrade</a:t>
-            </a:r>
-            <a:r>
-              <a:rPr lang="en-US" sz="800" dirty="0"/>
-              <a:t>())</a:t>
+              <a:t>add(module.getModuleCode() + DIVIDER + module.getGrade())</a:t>
             </a:r>
           </a:p>
         </p:txBody>
@@ -12519,7 +12310,7 @@
             <a:lstStyle/>
             <a:p>
               <a:pPr algn="ctr"/>
-              <a:endParaRPr lang="en-SG"/>
+              <a:endParaRPr lang="en-SG" dirty="0"/>
             </a:p>
           </p:txBody>
         </p:sp>
@@ -12931,13 +12722,8 @@
             <a:pPr algn="ctr"/>
             <a:r>
               <a:rPr lang="en-US" sz="1050" dirty="0"/>
-              <a:t>:</a:t>
+              <a:t>:XYZCommand</a:t>
             </a:r>
-            <a:r>
-              <a:rPr lang="en-US" sz="1050" dirty="0" err="1"/>
-              <a:t>XYZCommand</a:t>
-            </a:r>
-            <a:endParaRPr lang="en-US" sz="1050" dirty="0"/>
           </a:p>
         </p:txBody>
       </p:sp>
@@ -12995,13 +12781,8 @@
             <a:pPr algn="ctr"/>
             <a:r>
               <a:rPr lang="en-US" sz="1050" dirty="0"/>
-              <a:t>:</a:t>
+              <a:t>:CommandResult</a:t>
             </a:r>
-            <a:r>
-              <a:rPr lang="en-US" sz="1050" dirty="0" err="1"/>
-              <a:t>CommandResult</a:t>
-            </a:r>
-            <a:endParaRPr lang="en-US" sz="1050" dirty="0"/>
           </a:p>
         </p:txBody>
       </p:sp>
@@ -13428,12 +13209,8 @@
           <a:lstStyle/>
           <a:p>
             <a:r>
-              <a:rPr lang="en-US" sz="900" dirty="0" err="1"/>
-              <a:t>parseCommand</a:t>
-            </a:r>
-            <a:r>
               <a:rPr lang="en-US" sz="900" dirty="0"/>
-              <a:t>(“User input”)</a:t>
+              <a:t>parseCommand(“User input”)</a:t>
             </a:r>
           </a:p>
         </p:txBody>
@@ -13564,15 +13341,7 @@
           <a:p>
             <a:r>
               <a:rPr lang="en-US" sz="900" dirty="0"/>
-              <a:t>new </a:t>
-            </a:r>
-            <a:r>
-              <a:rPr lang="en-US" sz="900" dirty="0" err="1"/>
-              <a:t>XYZCommand</a:t>
-            </a:r>
-            <a:r>
-              <a:rPr lang="en-US" sz="900" dirty="0"/>
-              <a:t>()</a:t>
+              <a:t>new XYZCommand()</a:t>
             </a:r>
           </a:p>
         </p:txBody>
@@ -14415,15 +14184,7 @@
           <a:p>
             <a:r>
               <a:rPr lang="en-US" sz="900" dirty="0"/>
-              <a:t>new </a:t>
-            </a:r>
-            <a:r>
-              <a:rPr lang="en-US" sz="900" dirty="0" err="1"/>
-              <a:t>CommandResult</a:t>
-            </a:r>
-            <a:r>
-              <a:rPr lang="en-US" sz="900" dirty="0"/>
-              <a:t>()</a:t>
+              <a:t>new CommandResult()</a:t>
             </a:r>
           </a:p>
         </p:txBody>
@@ -14659,12 +14420,8 @@
           <a:lstStyle/>
           <a:p>
             <a:r>
-              <a:rPr lang="en-US" sz="900" dirty="0" err="1"/>
-              <a:t>executeCommand</a:t>
-            </a:r>
-            <a:r>
               <a:rPr lang="en-US" sz="900" dirty="0"/>
-              <a:t>()</a:t>
+              <a:t>executeCommand()</a:t>
             </a:r>
           </a:p>
         </p:txBody>
@@ -14886,12 +14643,8 @@
           <a:lstStyle/>
           <a:p>
             <a:r>
-              <a:rPr lang="en-US" sz="900" dirty="0" err="1"/>
-              <a:t>showResultToUser</a:t>
-            </a:r>
-            <a:r>
               <a:rPr lang="en-US" sz="900" dirty="0"/>
-              <a:t>(result)</a:t>
+              <a:t>showResultToUser(result)</a:t>
             </a:r>
           </a:p>
         </p:txBody>
@@ -15853,7 +15606,7 @@
           <a:lstStyle/>
           <a:p>
             <a:pPr algn="ctr"/>
-            <a:endParaRPr lang="en-US"/>
+            <a:endParaRPr lang="en-US" dirty="0"/>
           </a:p>
         </p:txBody>
       </p:sp>
@@ -16272,7 +16025,7 @@
           <a:lstStyle/>
           <a:p>
             <a:pPr algn="ctr"/>
-            <a:endParaRPr lang="en-US"/>
+            <a:endParaRPr lang="en-US" dirty="0"/>
           </a:p>
         </p:txBody>
       </p:sp>
@@ -16564,7 +16317,7 @@
           <a:lstStyle/>
           <a:p>
             <a:pPr algn="ctr"/>
-            <a:endParaRPr lang="en-US"/>
+            <a:endParaRPr lang="en-US" dirty="0"/>
           </a:p>
         </p:txBody>
       </p:sp>
@@ -17080,7 +16833,7 @@
           <a:lstStyle/>
           <a:p>
             <a:pPr algn="ctr"/>
-            <a:endParaRPr lang="en-US"/>
+            <a:endParaRPr lang="en-US" dirty="0"/>
           </a:p>
         </p:txBody>
       </p:sp>
@@ -17493,7 +17246,7 @@
           <a:lstStyle/>
           <a:p>
             <a:pPr algn="ctr"/>
-            <a:endParaRPr lang="en-US"/>
+            <a:endParaRPr lang="en-US" dirty="0"/>
           </a:p>
         </p:txBody>
       </p:sp>
@@ -17612,7 +17365,7 @@
           <a:lstStyle/>
           <a:p>
             <a:pPr algn="ctr"/>
-            <a:endParaRPr lang="en-US"/>
+            <a:endParaRPr lang="en-US" dirty="0"/>
           </a:p>
         </p:txBody>
       </p:sp>
@@ -17882,7 +17635,7 @@
           <a:lstStyle/>
           <a:p>
             <a:pPr algn="ctr"/>
-            <a:endParaRPr lang="en-US"/>
+            <a:endParaRPr lang="en-US" dirty="0"/>
           </a:p>
         </p:txBody>
       </p:sp>
@@ -18125,7 +17878,7 @@
           <a:lstStyle/>
           <a:p>
             <a:pPr algn="ctr"/>
-            <a:endParaRPr lang="en-US"/>
+            <a:endParaRPr lang="en-US" dirty="0"/>
           </a:p>
         </p:txBody>
       </p:sp>
@@ -18356,7 +18109,7 @@
           <a:lstStyle/>
           <a:p>
             <a:pPr algn="ctr"/>
-            <a:endParaRPr lang="en-US"/>
+            <a:endParaRPr lang="en-US" dirty="0"/>
           </a:p>
         </p:txBody>
       </p:sp>
@@ -18405,7 +18158,7 @@
           <a:lstStyle/>
           <a:p>
             <a:pPr algn="ctr"/>
-            <a:endParaRPr lang="en-US"/>
+            <a:endParaRPr lang="en-US" dirty="0"/>
           </a:p>
         </p:txBody>
       </p:sp>
@@ -25395,20 +25148,8 @@
                 <a:buChar char="-"/>
               </a:pPr>
               <a:r>
-                <a:rPr lang="en-SG" sz="1100" u="sng" dirty="0" err="1"/>
-                <a:t>scheduleOfAllDates</a:t>
-              </a:r>
-              <a:r>
                 <a:rPr lang="en-SG" sz="1100" u="sng" dirty="0"/>
-                <a:t>: </a:t>
-              </a:r>
-              <a:r>
-                <a:rPr lang="en-SG" sz="1100" u="sng" dirty="0" err="1"/>
-                <a:t>ArrayList</a:t>
-              </a:r>
-              <a:r>
-                <a:rPr lang="en-SG" sz="1100" u="sng" dirty="0"/>
-                <a:t>&lt;Event&gt;</a:t>
+                <a:t>scheduleOfAllDates: ArrayList&lt;Event&gt;</a:t>
               </a:r>
             </a:p>
           </p:txBody>
@@ -25455,23 +25196,7 @@
               <a:pPr algn="ctr"/>
               <a:r>
                 <a:rPr lang="en-SG" sz="1100" dirty="0"/>
-                <a:t>+ Planner(</a:t>
-              </a:r>
-              <a:r>
-                <a:rPr lang="en-SG" sz="1100" dirty="0" err="1"/>
-                <a:t>moduleList</a:t>
-              </a:r>
-              <a:r>
-                <a:rPr lang="en-SG" sz="1100" dirty="0"/>
-                <a:t>: </a:t>
-              </a:r>
-              <a:r>
-                <a:rPr lang="en-SG" sz="1100" dirty="0" err="1"/>
-                <a:t>ModuleList</a:t>
-              </a:r>
-              <a:r>
-                <a:rPr lang="en-SG" sz="1100" dirty="0"/>
-                <a:t>)</a:t>
+                <a:t>+ Planner(moduleList: ModuleList)</a:t>
               </a:r>
             </a:p>
             <a:p>
@@ -25480,20 +25205,8 @@
                 <a:buChar char="-"/>
               </a:pPr>
               <a:r>
-                <a:rPr lang="en-SG" sz="1100" dirty="0" err="1"/>
-                <a:t>hasTimeConflict</a:t>
-              </a:r>
-              <a:r>
                 <a:rPr lang="en-SG" sz="1100" dirty="0"/>
-                <a:t>(</a:t>
-              </a:r>
-              <a:r>
-                <a:rPr lang="en-SG" sz="1100" dirty="0" err="1"/>
-                <a:t>eventToBeAdded</a:t>
-              </a:r>
-              <a:r>
-                <a:rPr lang="en-SG" sz="1100" dirty="0"/>
-                <a:t>: Event): Boolean</a:t>
+                <a:t>hasTimeConflict(eventToBeAdded: Event): Boolean</a:t>
               </a:r>
             </a:p>
             <a:p>
@@ -25502,20 +25215,8 @@
                 <a:buChar char="-"/>
               </a:pPr>
               <a:r>
-                <a:rPr lang="en-SG" sz="1100" dirty="0" err="1"/>
-                <a:t>filterPlanner</a:t>
-              </a:r>
-              <a:r>
                 <a:rPr lang="en-SG" sz="1100" dirty="0"/>
-                <a:t>(date: String): </a:t>
-              </a:r>
-              <a:r>
-                <a:rPr lang="en-SG" sz="1100" dirty="0" err="1"/>
-                <a:t>ArrayList</a:t>
-              </a:r>
-              <a:r>
-                <a:rPr lang="en-SG" sz="1100" dirty="0"/>
-                <a:t>&lt;Event&gt;</a:t>
+                <a:t>filterPlanner(date: String): ArrayList&lt;Event&gt;</a:t>
               </a:r>
             </a:p>
           </p:txBody>
@@ -25587,10 +25288,9 @@
             <a:p>
               <a:pPr algn="ctr"/>
               <a:r>
-                <a:rPr lang="en-SG" sz="1400" dirty="0" err="1"/>
+                <a:rPr lang="en-SG" sz="1400" dirty="0"/>
                 <a:t>ModuleList</a:t>
               </a:r>
-              <a:endParaRPr lang="en-SG" sz="1400" dirty="0"/>
             </a:p>
           </p:txBody>
         </p:sp>
@@ -25680,31 +25380,7 @@
               <a:pPr algn="ctr"/>
               <a:r>
                 <a:rPr lang="en-SG" sz="1100" dirty="0"/>
-                <a:t>+ </a:t>
-              </a:r>
-              <a:r>
-                <a:rPr lang="en-SG" sz="1100" dirty="0" err="1"/>
-                <a:t>getMyModules</a:t>
-              </a:r>
-              <a:r>
-                <a:rPr lang="en-SG" sz="1100" dirty="0"/>
-                <a:t>(): </a:t>
-              </a:r>
-              <a:r>
-                <a:rPr lang="en-SG" sz="1100" dirty="0" err="1"/>
-                <a:t>ArrayList</a:t>
-              </a:r>
-              <a:r>
-                <a:rPr lang="en-SG" sz="1100" dirty="0"/>
-                <a:t>&lt;</a:t>
-              </a:r>
-              <a:r>
-                <a:rPr lang="en-SG" sz="1100" dirty="0" err="1"/>
-                <a:t>ModuleDetails</a:t>
-              </a:r>
-              <a:r>
-                <a:rPr lang="en-SG" sz="1100" dirty="0"/>
-                <a:t>&gt;</a:t>
+                <a:t>+ getMyModules(): ArrayList&lt;ModuleDetails&gt;</a:t>
               </a:r>
             </a:p>
           </p:txBody>
@@ -25773,10 +25449,9 @@
             <a:p>
               <a:pPr algn="ctr"/>
               <a:r>
-                <a:rPr lang="en-SG" sz="1400" dirty="0" err="1"/>
+                <a:rPr lang="en-SG" sz="1400" dirty="0"/>
                 <a:t>ModuleSyncer</a:t>
               </a:r>
-              <a:endParaRPr lang="en-SG" sz="1400" dirty="0"/>
             </a:p>
           </p:txBody>
         </p:sp>
@@ -25866,54 +25541,14 @@
               <a:pPr algn="ctr"/>
               <a:r>
                 <a:rPr lang="en-SG" sz="1100" dirty="0"/>
-                <a:t>+ </a:t>
-              </a:r>
-              <a:r>
-                <a:rPr lang="en-SG" sz="1100" dirty="0" err="1"/>
-                <a:t>ModuleSyncer</a:t>
-              </a:r>
-              <a:r>
-                <a:rPr lang="en-SG" sz="1100" dirty="0"/>
-                <a:t>(</a:t>
-              </a:r>
-              <a:r>
-                <a:rPr lang="en-SG" sz="1100" dirty="0" err="1"/>
-                <a:t>moduleList</a:t>
-              </a:r>
-              <a:r>
-                <a:rPr lang="en-SG" sz="1100" dirty="0"/>
-                <a:t>: </a:t>
-              </a:r>
-              <a:r>
-                <a:rPr lang="en-SG" sz="1100" dirty="0" err="1"/>
-                <a:t>ModuleList</a:t>
-              </a:r>
-              <a:r>
-                <a:rPr lang="en-SG" sz="1100" dirty="0"/>
-                <a:t>, date: String)</a:t>
+                <a:t>+ ModuleSyncer(moduleList: ModuleList, date: String)</a:t>
               </a:r>
             </a:p>
             <a:p>
               <a:pPr algn="ctr"/>
               <a:r>
                 <a:rPr lang="en-SG" sz="1100" dirty="0"/>
-                <a:t>+ </a:t>
-              </a:r>
-              <a:r>
-                <a:rPr lang="en-SG" sz="1100" dirty="0" err="1"/>
-                <a:t>getLessonsAndExamsAsEventsOnDate</a:t>
-              </a:r>
-              <a:r>
-                <a:rPr lang="en-SG" sz="1100" dirty="0"/>
-                <a:t>(): </a:t>
-              </a:r>
-              <a:r>
-                <a:rPr lang="en-SG" sz="1100" dirty="0" err="1"/>
-                <a:t>ArrayList</a:t>
-              </a:r>
-              <a:r>
-                <a:rPr lang="en-SG" sz="1100" dirty="0"/>
-                <a:t>&lt;Event&gt;</a:t>
+                <a:t>+ getLessonsAndExamsAsEventsOnDate(): ArrayList&lt;Event&gt;</a:t>
               </a:r>
             </a:p>
             <a:p>
@@ -25922,12 +25557,8 @@
                 <a:buChar char="-"/>
               </a:pPr>
               <a:r>
-                <a:rPr lang="en-SG" sz="1100" dirty="0" err="1"/>
-                <a:t>getLessonsOnDate</a:t>
-              </a:r>
-              <a:r>
                 <a:rPr lang="en-SG" sz="1100" dirty="0"/>
-                <a:t>()</a:t>
+                <a:t>getLessonsOnDate()</a:t>
               </a:r>
             </a:p>
             <a:p>
@@ -25936,28 +25567,8 @@
                 <a:buChar char="-"/>
               </a:pPr>
               <a:r>
-                <a:rPr lang="en-SG" sz="1100" dirty="0" err="1"/>
-                <a:t>getExamsOnDate</a:t>
-              </a:r>
-              <a:r>
                 <a:rPr lang="en-SG" sz="1100" dirty="0"/>
-                <a:t>(</a:t>
-              </a:r>
-              <a:r>
-                <a:rPr lang="en-SG" sz="1100" dirty="0" err="1"/>
-                <a:t>moduleList</a:t>
-              </a:r>
-              <a:r>
-                <a:rPr lang="en-SG" sz="1100" dirty="0"/>
-                <a:t>: </a:t>
-              </a:r>
-              <a:r>
-                <a:rPr lang="en-SG" sz="1100" dirty="0" err="1"/>
-                <a:t>ModuleList</a:t>
-              </a:r>
-              <a:r>
-                <a:rPr lang="en-SG" sz="1100" dirty="0"/>
-                <a:t>)</a:t>
+                <a:t>getExamsOnDate(moduleList: ModuleList)</a:t>
               </a:r>
             </a:p>
           </p:txBody>
@@ -26077,23 +25688,7 @@
               <a:pPr algn="ctr"/>
               <a:r>
                 <a:rPr lang="en-SG" sz="1100" u="sng" dirty="0"/>
-                <a:t>+ </a:t>
-              </a:r>
-              <a:r>
-                <a:rPr lang="en-SG" sz="1100" u="sng" dirty="0" err="1"/>
-                <a:t>lessonStorage</a:t>
-              </a:r>
-              <a:r>
-                <a:rPr lang="en-SG" sz="1100" u="sng" dirty="0"/>
-                <a:t>: </a:t>
-              </a:r>
-              <a:r>
-                <a:rPr lang="en-SG" sz="1100" u="sng" dirty="0" err="1"/>
-                <a:t>ArrayList</a:t>
-              </a:r>
-              <a:r>
-                <a:rPr lang="en-SG" sz="1100" u="sng" dirty="0"/>
-                <a:t>&lt;Lesson&gt;</a:t>
+                <a:t>+ lessonStorage: ArrayList&lt;Lesson&gt;</a:t>
               </a:r>
             </a:p>
           </p:txBody>
@@ -26206,10 +25801,9 @@
             <a:p>
               <a:pPr algn="ctr"/>
               <a:r>
-                <a:rPr lang="en-SG" sz="1400" dirty="0" err="1"/>
+                <a:rPr lang="en-SG" sz="1400" dirty="0"/>
                 <a:t>ExamsGetter</a:t>
               </a:r>
-              <a:endParaRPr lang="en-SG" sz="1400" dirty="0"/>
             </a:p>
           </p:txBody>
         </p:sp>
@@ -26258,15 +25852,7 @@
               </a:pPr>
               <a:r>
                 <a:rPr lang="en-SG" sz="1100" dirty="0"/>
-                <a:t>exams: </a:t>
-              </a:r>
-              <a:r>
-                <a:rPr lang="en-SG" sz="1100" dirty="0" err="1"/>
-                <a:t>ArrayList</a:t>
-              </a:r>
-              <a:r>
-                <a:rPr lang="en-SG" sz="1100" dirty="0"/>
-                <a:t>&lt;Event&gt;</a:t>
+                <a:t>exams: ArrayList&lt;Event&gt;</a:t>
               </a:r>
             </a:p>
           </p:txBody>
@@ -26313,31 +25899,7 @@
               <a:pPr algn="ctr"/>
               <a:r>
                 <a:rPr lang="en-SG" sz="1100" dirty="0"/>
-                <a:t>+ </a:t>
-              </a:r>
-              <a:r>
-                <a:rPr lang="en-SG" sz="1100" dirty="0" err="1"/>
-                <a:t>ExamsGetter</a:t>
-              </a:r>
-              <a:r>
-                <a:rPr lang="en-SG" sz="1100" dirty="0"/>
-                <a:t>(</a:t>
-              </a:r>
-              <a:r>
-                <a:rPr lang="en-SG" sz="1100" dirty="0" err="1"/>
-                <a:t>moduleList</a:t>
-              </a:r>
-              <a:r>
-                <a:rPr lang="en-SG" sz="1100" dirty="0"/>
-                <a:t>: </a:t>
-              </a:r>
-              <a:r>
-                <a:rPr lang="en-SG" sz="1100" dirty="0" err="1"/>
-                <a:t>ModuleList</a:t>
-              </a:r>
-              <a:r>
-                <a:rPr lang="en-SG" sz="1100" dirty="0"/>
-                <a:t>)</a:t>
+                <a:t>+ ExamsGetter(moduleList: ModuleList)</a:t>
               </a:r>
             </a:p>
             <a:p>
@@ -26346,35 +25908,15 @@
                 <a:buChar char="-"/>
               </a:pPr>
               <a:r>
-                <a:rPr lang="en-SG" sz="1100" dirty="0" err="1"/>
-                <a:t>retrieveModuleExams</a:t>
-              </a:r>
-              <a:r>
                 <a:rPr lang="en-SG" sz="1100" dirty="0"/>
-                <a:t>(): void</a:t>
+                <a:t>retrieveModuleExams(): void</a:t>
               </a:r>
             </a:p>
             <a:p>
               <a:pPr algn="ctr"/>
               <a:r>
                 <a:rPr lang="en-SG" sz="1100" dirty="0"/>
-                <a:t>+ </a:t>
-              </a:r>
-              <a:r>
-                <a:rPr lang="en-SG" sz="1100" dirty="0" err="1"/>
-                <a:t>getExams</a:t>
-              </a:r>
-              <a:r>
-                <a:rPr lang="en-SG" sz="1100" dirty="0"/>
-                <a:t>(): </a:t>
-              </a:r>
-              <a:r>
-                <a:rPr lang="en-SG" sz="1100" dirty="0" err="1"/>
-                <a:t>ArrayList</a:t>
-              </a:r>
-              <a:r>
-                <a:rPr lang="en-SG" sz="1100" dirty="0"/>
-                <a:t>&lt;Event&gt;</a:t>
+                <a:t>+ getExams(): ArrayList&lt;Event&gt;</a:t>
               </a:r>
             </a:p>
           </p:txBody>
@@ -27146,10 +26688,9 @@
           <a:lstStyle/>
           <a:p>
             <a:r>
-              <a:rPr lang="en-US" sz="1000" dirty="0" err="1"/>
+              <a:rPr lang="en-US" sz="1000" dirty="0"/>
               <a:t>moduleList</a:t>
             </a:r>
-            <a:endParaRPr lang="en-US" sz="1000" dirty="0"/>
           </a:p>
         </p:txBody>
       </p:sp>
@@ -27217,10 +26758,9 @@
           <a:lstStyle/>
           <a:p>
             <a:r>
-              <a:rPr lang="en-US" sz="1000" dirty="0" err="1"/>
+              <a:rPr lang="en-US" sz="1000" dirty="0"/>
               <a:t>moduleList</a:t>
             </a:r>
-            <a:endParaRPr lang="en-US" sz="1000" dirty="0"/>
           </a:p>
         </p:txBody>
       </p:sp>
@@ -27327,16 +26867,8 @@
           <a:lstStyle/>
           <a:p>
             <a:r>
-              <a:rPr lang="en-US" dirty="0" err="1"/>
-              <a:t>ModuleList</a:t>
-            </a:r>
-            <a:r>
               <a:rPr lang="en-US" dirty="0"/>
-              <a:t> </a:t>
-            </a:r>
-            <a:r>
-              <a:rPr lang="en-US" dirty="0" err="1"/>
-              <a:t>init</a:t>
+              <a:t>ModuleList init</a:t>
             </a:r>
             <a:endParaRPr lang="en-SG" dirty="0"/>
           </a:p>
@@ -27371,10 +26903,9 @@
           <a:lstStyle/>
           <a:p>
             <a:r>
-              <a:rPr lang="en-US" dirty="0" err="1"/>
+              <a:rPr lang="en-US" dirty="0"/>
               <a:t>myModules</a:t>
             </a:r>
-            <a:endParaRPr lang="en-US" dirty="0"/>
           </a:p>
         </p:txBody>
       </p:sp>
@@ -27450,23 +26981,7 @@
                     <a:schemeClr val="tx1"/>
                   </a:solidFill>
                 </a:rPr>
-                <a:t>- </a:t>
-              </a:r>
-              <a:r>
-                <a:rPr lang="en-US" sz="1200" dirty="0" err="1">
-                  <a:solidFill>
-                    <a:schemeClr val="tx1"/>
-                  </a:solidFill>
-                </a:rPr>
-                <a:t>moduleCode</a:t>
-              </a:r>
-              <a:r>
-                <a:rPr lang="en-US" sz="1200" dirty="0">
-                  <a:solidFill>
-                    <a:schemeClr val="tx1"/>
-                  </a:solidFill>
-                </a:rPr>
-                <a:t> = CS2113T</a:t>
+                <a:t>- moduleCode = CS2113T</a:t>
               </a:r>
             </a:p>
           </p:txBody>
@@ -27565,21 +27080,8 @@
                         <a:schemeClr val="tx1"/>
                       </a:solidFill>
                     </a:rPr>
-                    <a:t>:</a:t>
+                    <a:t>:ModuleDetails</a:t>
                   </a:r>
-                  <a:r>
-                    <a:rPr lang="en-US" sz="1200" u="sng" dirty="0" err="1">
-                      <a:solidFill>
-                        <a:schemeClr val="tx1"/>
-                      </a:solidFill>
-                    </a:rPr>
-                    <a:t>ModuleDetails</a:t>
-                  </a:r>
-                  <a:endParaRPr lang="en-US" sz="1200" u="sng" dirty="0">
-                    <a:solidFill>
-                      <a:schemeClr val="tx1"/>
-                    </a:solidFill>
-                  </a:endParaRPr>
                 </a:p>
               </p:txBody>
             </p:sp>
@@ -27631,7 +27133,7 @@
                 <a:lstStyle/>
                 <a:p>
                   <a:pPr algn="ctr"/>
-                  <a:endParaRPr lang="en-SG"/>
+                  <a:endParaRPr lang="en-SG" dirty="0"/>
                 </a:p>
               </p:txBody>
             </p:sp>
@@ -27684,7 +27186,7 @@
               <a:lstStyle/>
               <a:p>
                 <a:pPr algn="ctr"/>
-                <a:endParaRPr lang="en-SG"/>
+                <a:endParaRPr lang="en-SG" dirty="0"/>
               </a:p>
             </p:txBody>
           </p:sp>
@@ -27829,10 +27331,9 @@
           <a:lstStyle/>
           <a:p>
             <a:r>
-              <a:rPr lang="en-US" dirty="0" err="1"/>
+              <a:rPr lang="en-US" dirty="0"/>
               <a:t>myModules</a:t>
             </a:r>
-            <a:endParaRPr lang="en-US" dirty="0"/>
           </a:p>
         </p:txBody>
       </p:sp>
@@ -27908,23 +27409,7 @@
                     <a:schemeClr val="tx1"/>
                   </a:solidFill>
                 </a:rPr>
-                <a:t>- </a:t>
-              </a:r>
-              <a:r>
-                <a:rPr lang="en-US" sz="1200" dirty="0" err="1">
-                  <a:solidFill>
-                    <a:schemeClr val="tx1"/>
-                  </a:solidFill>
-                </a:rPr>
-                <a:t>moduleCode</a:t>
-              </a:r>
-              <a:r>
-                <a:rPr lang="en-US" sz="1200" dirty="0">
-                  <a:solidFill>
-                    <a:schemeClr val="tx1"/>
-                  </a:solidFill>
-                </a:rPr>
-                <a:t> = CS2113T</a:t>
+                <a:t>- moduleCode = CS2113T</a:t>
               </a:r>
             </a:p>
           </p:txBody>
@@ -28023,21 +27508,8 @@
                         <a:schemeClr val="tx1"/>
                       </a:solidFill>
                     </a:rPr>
-                    <a:t>:</a:t>
+                    <a:t>:ModuleDetails</a:t>
                   </a:r>
-                  <a:r>
-                    <a:rPr lang="en-US" sz="1200" u="sng" dirty="0" err="1">
-                      <a:solidFill>
-                        <a:schemeClr val="tx1"/>
-                      </a:solidFill>
-                    </a:rPr>
-                    <a:t>ModuleDetails</a:t>
-                  </a:r>
-                  <a:endParaRPr lang="en-US" sz="1200" u="sng" dirty="0">
-                    <a:solidFill>
-                      <a:schemeClr val="tx1"/>
-                    </a:solidFill>
-                  </a:endParaRPr>
                 </a:p>
               </p:txBody>
             </p:sp>
@@ -28089,7 +27561,7 @@
                 <a:lstStyle/>
                 <a:p>
                   <a:pPr algn="ctr"/>
-                  <a:endParaRPr lang="en-SG"/>
+                  <a:endParaRPr lang="en-SG" dirty="0"/>
                 </a:p>
               </p:txBody>
             </p:sp>
@@ -28142,7 +27614,7 @@
               <a:lstStyle/>
               <a:p>
                 <a:pPr algn="ctr"/>
-                <a:endParaRPr lang="en-SG"/>
+                <a:endParaRPr lang="en-SG" dirty="0"/>
               </a:p>
             </p:txBody>
           </p:sp>
@@ -28220,23 +27692,7 @@
                     <a:schemeClr val="tx1"/>
                   </a:solidFill>
                 </a:rPr>
-                <a:t>- </a:t>
-              </a:r>
-              <a:r>
-                <a:rPr lang="en-US" sz="1200" dirty="0" err="1">
-                  <a:solidFill>
-                    <a:schemeClr val="tx1"/>
-                  </a:solidFill>
-                </a:rPr>
-                <a:t>moduleCode</a:t>
-              </a:r>
-              <a:r>
-                <a:rPr lang="en-US" sz="1200" dirty="0">
-                  <a:solidFill>
-                    <a:schemeClr val="tx1"/>
-                  </a:solidFill>
-                </a:rPr>
-                <a:t> = CS2101</a:t>
+                <a:t>- moduleCode = CS2101</a:t>
               </a:r>
             </a:p>
           </p:txBody>
@@ -28335,21 +27791,8 @@
                         <a:schemeClr val="tx1"/>
                       </a:solidFill>
                     </a:rPr>
-                    <a:t>:</a:t>
+                    <a:t>:ModuleDetails</a:t>
                   </a:r>
-                  <a:r>
-                    <a:rPr lang="en-US" sz="1200" u="sng" dirty="0" err="1">
-                      <a:solidFill>
-                        <a:schemeClr val="tx1"/>
-                      </a:solidFill>
-                    </a:rPr>
-                    <a:t>ModuleDetails</a:t>
-                  </a:r>
-                  <a:endParaRPr lang="en-US" sz="1200" u="sng" dirty="0">
-                    <a:solidFill>
-                      <a:schemeClr val="tx1"/>
-                    </a:solidFill>
-                  </a:endParaRPr>
                 </a:p>
               </p:txBody>
             </p:sp>
@@ -28401,7 +27844,7 @@
                 <a:lstStyle/>
                 <a:p>
                   <a:pPr algn="ctr"/>
-                  <a:endParaRPr lang="en-SG"/>
+                  <a:endParaRPr lang="en-SG" dirty="0"/>
                 </a:p>
               </p:txBody>
             </p:sp>
@@ -28454,7 +27897,7 @@
               <a:lstStyle/>
               <a:p>
                 <a:pPr algn="ctr"/>
-                <a:endParaRPr lang="en-SG"/>
+                <a:endParaRPr lang="en-SG" dirty="0"/>
               </a:p>
             </p:txBody>
           </p:sp>

</xml_diff>

<commit_message>
adjust timetable add sequence diagrams
</commit_message>
<xml_diff>
--- a/docs/assets/DG Diagrams.pptx
+++ b/docs/assets/DG Diagrams.pptx
@@ -220,7 +220,7 @@
           <a:p>
             <a:fld id="{31B455B7-35F4-3248-9980-DA268DAEE9E9}" type="datetimeFigureOut">
               <a:rPr lang="en-US" smtClean="0"/>
-              <a:t>10/21/2021</a:t>
+              <a:t>10/23/21</a:t>
             </a:fld>
             <a:endParaRPr lang="en-US" dirty="0"/>
           </a:p>
@@ -1003,7 +1003,7 @@
           <a:p>
             <a:fld id="{78C97017-6FC3-485B-9764-EAC9E56C1D49}" type="datetimeFigureOut">
               <a:rPr lang="en-US" smtClean="0"/>
-              <a:t>10/21/2021</a:t>
+              <a:t>10/23/21</a:t>
             </a:fld>
             <a:endParaRPr lang="en-US" dirty="0"/>
           </a:p>
@@ -1171,7 +1171,7 @@
           <a:p>
             <a:fld id="{78C97017-6FC3-485B-9764-EAC9E56C1D49}" type="datetimeFigureOut">
               <a:rPr lang="en-US" smtClean="0"/>
-              <a:t>10/21/2021</a:t>
+              <a:t>10/23/21</a:t>
             </a:fld>
             <a:endParaRPr lang="en-US" dirty="0"/>
           </a:p>
@@ -1349,7 +1349,7 @@
           <a:p>
             <a:fld id="{78C97017-6FC3-485B-9764-EAC9E56C1D49}" type="datetimeFigureOut">
               <a:rPr lang="en-US" smtClean="0"/>
-              <a:t>10/21/2021</a:t>
+              <a:t>10/23/21</a:t>
             </a:fld>
             <a:endParaRPr lang="en-US" dirty="0"/>
           </a:p>
@@ -1517,7 +1517,7 @@
           <a:p>
             <a:fld id="{78C97017-6FC3-485B-9764-EAC9E56C1D49}" type="datetimeFigureOut">
               <a:rPr lang="en-US" smtClean="0"/>
-              <a:t>10/21/2021</a:t>
+              <a:t>10/23/21</a:t>
             </a:fld>
             <a:endParaRPr lang="en-US" dirty="0"/>
           </a:p>
@@ -1762,7 +1762,7 @@
           <a:p>
             <a:fld id="{78C97017-6FC3-485B-9764-EAC9E56C1D49}" type="datetimeFigureOut">
               <a:rPr lang="en-US" smtClean="0"/>
-              <a:t>10/21/2021</a:t>
+              <a:t>10/23/21</a:t>
             </a:fld>
             <a:endParaRPr lang="en-US" dirty="0"/>
           </a:p>
@@ -2047,7 +2047,7 @@
           <a:p>
             <a:fld id="{78C97017-6FC3-485B-9764-EAC9E56C1D49}" type="datetimeFigureOut">
               <a:rPr lang="en-US" smtClean="0"/>
-              <a:t>10/21/2021</a:t>
+              <a:t>10/23/21</a:t>
             </a:fld>
             <a:endParaRPr lang="en-US" dirty="0"/>
           </a:p>
@@ -2466,7 +2466,7 @@
           <a:p>
             <a:fld id="{78C97017-6FC3-485B-9764-EAC9E56C1D49}" type="datetimeFigureOut">
               <a:rPr lang="en-US" smtClean="0"/>
-              <a:t>10/21/2021</a:t>
+              <a:t>10/23/21</a:t>
             </a:fld>
             <a:endParaRPr lang="en-US" dirty="0"/>
           </a:p>
@@ -2583,7 +2583,7 @@
           <a:p>
             <a:fld id="{78C97017-6FC3-485B-9764-EAC9E56C1D49}" type="datetimeFigureOut">
               <a:rPr lang="en-US" smtClean="0"/>
-              <a:t>10/21/2021</a:t>
+              <a:t>10/23/21</a:t>
             </a:fld>
             <a:endParaRPr lang="en-US" dirty="0"/>
           </a:p>
@@ -2678,7 +2678,7 @@
           <a:p>
             <a:fld id="{78C97017-6FC3-485B-9764-EAC9E56C1D49}" type="datetimeFigureOut">
               <a:rPr lang="en-US" smtClean="0"/>
-              <a:t>10/21/2021</a:t>
+              <a:t>10/23/21</a:t>
             </a:fld>
             <a:endParaRPr lang="en-US" dirty="0"/>
           </a:p>
@@ -2953,7 +2953,7 @@
           <a:p>
             <a:fld id="{78C97017-6FC3-485B-9764-EAC9E56C1D49}" type="datetimeFigureOut">
               <a:rPr lang="en-US" smtClean="0"/>
-              <a:t>10/21/2021</a:t>
+              <a:t>10/23/21</a:t>
             </a:fld>
             <a:endParaRPr lang="en-US" dirty="0"/>
           </a:p>
@@ -3205,7 +3205,7 @@
           <a:p>
             <a:fld id="{78C97017-6FC3-485B-9764-EAC9E56C1D49}" type="datetimeFigureOut">
               <a:rPr lang="en-US" smtClean="0"/>
-              <a:t>10/21/2021</a:t>
+              <a:t>10/23/21</a:t>
             </a:fld>
             <a:endParaRPr lang="en-US" dirty="0"/>
           </a:p>
@@ -3416,7 +3416,7 @@
           <a:p>
             <a:fld id="{78C97017-6FC3-485B-9764-EAC9E56C1D49}" type="datetimeFigureOut">
               <a:rPr lang="en-US" smtClean="0"/>
-              <a:t>10/21/2021</a:t>
+              <a:t>10/23/21</a:t>
             </a:fld>
             <a:endParaRPr lang="en-US" dirty="0"/>
           </a:p>
@@ -19162,224 +19162,6 @@
                 </a:solidFill>
               </a:rPr>
               <a:t>tutorial:Tutorial</a:t>
-            </a:r>
-          </a:p>
-        </p:txBody>
-      </p:sp>
-      <p:cxnSp>
-        <p:nvCxnSpPr>
-          <p:cNvPr id="43" name="Straight Arrow Connector 42">
-            <a:extLst>
-              <a:ext uri="{FF2B5EF4-FFF2-40B4-BE49-F238E27FC236}">
-                <a16:creationId xmlns:a16="http://schemas.microsoft.com/office/drawing/2014/main" id="{74383B7F-DDF8-5846-894C-F3FD9DA006D1}"/>
-              </a:ext>
-            </a:extLst>
-          </p:cNvPr>
-          <p:cNvCxnSpPr/>
-          <p:nvPr/>
-        </p:nvCxnSpPr>
-        <p:spPr>
-          <a:xfrm flipV="1">
-            <a:off x="7848600" y="3399064"/>
-            <a:ext cx="0" cy="1371600"/>
-          </a:xfrm>
-          <a:prstGeom prst="straightConnector1">
-            <a:avLst/>
-          </a:prstGeom>
-          <a:ln>
-            <a:tailEnd type="triangle"/>
-          </a:ln>
-        </p:spPr>
-        <p:style>
-          <a:lnRef idx="2">
-            <a:schemeClr val="accent2"/>
-          </a:lnRef>
-          <a:fillRef idx="0">
-            <a:schemeClr val="accent2"/>
-          </a:fillRef>
-          <a:effectRef idx="1">
-            <a:schemeClr val="accent2"/>
-          </a:effectRef>
-          <a:fontRef idx="minor">
-            <a:schemeClr val="tx1"/>
-          </a:fontRef>
-        </p:style>
-      </p:cxnSp>
-      <p:sp>
-        <p:nvSpPr>
-          <p:cNvPr id="56" name="Rectangle 55">
-            <a:extLst>
-              <a:ext uri="{FF2B5EF4-FFF2-40B4-BE49-F238E27FC236}">
-                <a16:creationId xmlns:a16="http://schemas.microsoft.com/office/drawing/2014/main" id="{9A2A4E4F-D2B3-C44E-AB94-AFCFC4105CDA}"/>
-              </a:ext>
-            </a:extLst>
-          </p:cNvPr>
-          <p:cNvSpPr/>
-          <p:nvPr/>
-        </p:nvSpPr>
-        <p:spPr>
-          <a:xfrm>
-            <a:off x="7200900" y="4767942"/>
-            <a:ext cx="1295400" cy="609600"/>
-          </a:xfrm>
-          <a:prstGeom prst="rect">
-            <a:avLst/>
-          </a:prstGeom>
-          <a:solidFill>
-            <a:schemeClr val="bg1"/>
-          </a:solidFill>
-          <a:ln>
-            <a:solidFill>
-              <a:schemeClr val="tx1"/>
-            </a:solidFill>
-          </a:ln>
-        </p:spPr>
-        <p:style>
-          <a:lnRef idx="2">
-            <a:schemeClr val="accent1">
-              <a:shade val="50000"/>
-            </a:schemeClr>
-          </a:lnRef>
-          <a:fillRef idx="1">
-            <a:schemeClr val="accent1"/>
-          </a:fillRef>
-          <a:effectRef idx="0">
-            <a:schemeClr val="accent1"/>
-          </a:effectRef>
-          <a:fontRef idx="minor">
-            <a:schemeClr val="lt1"/>
-          </a:fontRef>
-        </p:style>
-        <p:txBody>
-          <a:bodyPr rtlCol="0" anchor="ctr"/>
-          <a:lstStyle/>
-          <a:p>
-            <a:pPr algn="ctr"/>
-            <a:r>
-              <a:rPr lang="en-US" sz="1200" dirty="0">
-                <a:solidFill>
-                  <a:schemeClr val="tx1"/>
-                </a:solidFill>
-              </a:rPr>
-              <a:t>User adding lesson of type LAB</a:t>
-            </a:r>
-          </a:p>
-        </p:txBody>
-      </p:sp>
-      <p:sp>
-        <p:nvSpPr>
-          <p:cNvPr id="60" name="Rectangle 59">
-            <a:extLst>
-              <a:ext uri="{FF2B5EF4-FFF2-40B4-BE49-F238E27FC236}">
-                <a16:creationId xmlns:a16="http://schemas.microsoft.com/office/drawing/2014/main" id="{B2DB9B21-0081-F44F-8F1F-8A97F0CCB525}"/>
-              </a:ext>
-            </a:extLst>
-          </p:cNvPr>
-          <p:cNvSpPr/>
-          <p:nvPr/>
-        </p:nvSpPr>
-        <p:spPr>
-          <a:xfrm>
-            <a:off x="3810000" y="2743200"/>
-            <a:ext cx="1524000" cy="685800"/>
-          </a:xfrm>
-          <a:prstGeom prst="rect">
-            <a:avLst/>
-          </a:prstGeom>
-          <a:solidFill>
-            <a:srgbClr val="FFD609"/>
-          </a:solidFill>
-          <a:ln>
-            <a:noFill/>
-          </a:ln>
-        </p:spPr>
-        <p:style>
-          <a:lnRef idx="2">
-            <a:schemeClr val="accent1">
-              <a:shade val="50000"/>
-            </a:schemeClr>
-          </a:lnRef>
-          <a:fillRef idx="1">
-            <a:schemeClr val="accent1"/>
-          </a:fillRef>
-          <a:effectRef idx="0">
-            <a:schemeClr val="accent1"/>
-          </a:effectRef>
-          <a:fontRef idx="minor">
-            <a:schemeClr val="lt1"/>
-          </a:fontRef>
-        </p:style>
-        <p:txBody>
-          <a:bodyPr rtlCol="0" anchor="ctr"/>
-          <a:lstStyle/>
-          <a:p>
-            <a:pPr algn="ctr"/>
-            <a:r>
-              <a:rPr lang="en-US" sz="1200" u="sng" dirty="0">
-                <a:solidFill>
-                  <a:schemeClr val="tx1"/>
-                </a:solidFill>
-              </a:rPr>
-              <a:t>lecture:Lecture</a:t>
-            </a:r>
-          </a:p>
-        </p:txBody>
-      </p:sp>
-      <p:sp>
-        <p:nvSpPr>
-          <p:cNvPr id="61" name="Rectangle 60">
-            <a:extLst>
-              <a:ext uri="{FF2B5EF4-FFF2-40B4-BE49-F238E27FC236}">
-                <a16:creationId xmlns:a16="http://schemas.microsoft.com/office/drawing/2014/main" id="{8D2D0FE3-3C89-F14F-87AE-0DD371D6A0B6}"/>
-              </a:ext>
-            </a:extLst>
-          </p:cNvPr>
-          <p:cNvSpPr/>
-          <p:nvPr/>
-        </p:nvSpPr>
-        <p:spPr>
-          <a:xfrm>
-            <a:off x="7086600" y="2713264"/>
-            <a:ext cx="1524000" cy="685800"/>
-          </a:xfrm>
-          <a:prstGeom prst="rect">
-            <a:avLst/>
-          </a:prstGeom>
-          <a:solidFill>
-            <a:srgbClr val="FFD609"/>
-          </a:solidFill>
-          <a:ln>
-            <a:noFill/>
-          </a:ln>
-        </p:spPr>
-        <p:style>
-          <a:lnRef idx="2">
-            <a:schemeClr val="accent1">
-              <a:shade val="50000"/>
-            </a:schemeClr>
-          </a:lnRef>
-          <a:fillRef idx="1">
-            <a:schemeClr val="accent1"/>
-          </a:fillRef>
-          <a:effectRef idx="0">
-            <a:schemeClr val="accent1"/>
-          </a:effectRef>
-          <a:fontRef idx="minor">
-            <a:schemeClr val="lt1"/>
-          </a:fontRef>
-        </p:style>
-        <p:txBody>
-          <a:bodyPr rtlCol="0" anchor="ctr"/>
-          <a:lstStyle/>
-          <a:p>
-            <a:pPr algn="ctr"/>
-            <a:r>
-              <a:rPr lang="en-US" sz="1200" u="sng" dirty="0">
-                <a:solidFill>
-                  <a:schemeClr val="tx1"/>
-                </a:solidFill>
-              </a:rPr>
-              <a:t>lab:Lab</a:t>
             </a:r>
           </a:p>
         </p:txBody>

</xml_diff>

<commit_message>
Resize object diagrams for module store
</commit_message>
<xml_diff>
--- a/docs/assets/DG Diagrams.pptx
+++ b/docs/assets/DG Diagrams.pptx
@@ -220,7 +220,7 @@
           <a:p>
             <a:fld id="{31B455B7-35F4-3248-9980-DA268DAEE9E9}" type="datetimeFigureOut">
               <a:rPr lang="en-US" smtClean="0"/>
-              <a:t>10/23/21</a:t>
+              <a:t>10/25/2021</a:t>
             </a:fld>
             <a:endParaRPr lang="en-US" dirty="0"/>
           </a:p>
@@ -1003,7 +1003,7 @@
           <a:p>
             <a:fld id="{78C97017-6FC3-485B-9764-EAC9E56C1D49}" type="datetimeFigureOut">
               <a:rPr lang="en-US" smtClean="0"/>
-              <a:t>10/23/21</a:t>
+              <a:t>10/25/2021</a:t>
             </a:fld>
             <a:endParaRPr lang="en-US" dirty="0"/>
           </a:p>
@@ -1171,7 +1171,7 @@
           <a:p>
             <a:fld id="{78C97017-6FC3-485B-9764-EAC9E56C1D49}" type="datetimeFigureOut">
               <a:rPr lang="en-US" smtClean="0"/>
-              <a:t>10/23/21</a:t>
+              <a:t>10/25/2021</a:t>
             </a:fld>
             <a:endParaRPr lang="en-US" dirty="0"/>
           </a:p>
@@ -1349,7 +1349,7 @@
           <a:p>
             <a:fld id="{78C97017-6FC3-485B-9764-EAC9E56C1D49}" type="datetimeFigureOut">
               <a:rPr lang="en-US" smtClean="0"/>
-              <a:t>10/23/21</a:t>
+              <a:t>10/25/2021</a:t>
             </a:fld>
             <a:endParaRPr lang="en-US" dirty="0"/>
           </a:p>
@@ -1517,7 +1517,7 @@
           <a:p>
             <a:fld id="{78C97017-6FC3-485B-9764-EAC9E56C1D49}" type="datetimeFigureOut">
               <a:rPr lang="en-US" smtClean="0"/>
-              <a:t>10/23/21</a:t>
+              <a:t>10/25/2021</a:t>
             </a:fld>
             <a:endParaRPr lang="en-US" dirty="0"/>
           </a:p>
@@ -1762,7 +1762,7 @@
           <a:p>
             <a:fld id="{78C97017-6FC3-485B-9764-EAC9E56C1D49}" type="datetimeFigureOut">
               <a:rPr lang="en-US" smtClean="0"/>
-              <a:t>10/23/21</a:t>
+              <a:t>10/25/2021</a:t>
             </a:fld>
             <a:endParaRPr lang="en-US" dirty="0"/>
           </a:p>
@@ -2047,7 +2047,7 @@
           <a:p>
             <a:fld id="{78C97017-6FC3-485B-9764-EAC9E56C1D49}" type="datetimeFigureOut">
               <a:rPr lang="en-US" smtClean="0"/>
-              <a:t>10/23/21</a:t>
+              <a:t>10/25/2021</a:t>
             </a:fld>
             <a:endParaRPr lang="en-US" dirty="0"/>
           </a:p>
@@ -2466,7 +2466,7 @@
           <a:p>
             <a:fld id="{78C97017-6FC3-485B-9764-EAC9E56C1D49}" type="datetimeFigureOut">
               <a:rPr lang="en-US" smtClean="0"/>
-              <a:t>10/23/21</a:t>
+              <a:t>10/25/2021</a:t>
             </a:fld>
             <a:endParaRPr lang="en-US" dirty="0"/>
           </a:p>
@@ -2583,7 +2583,7 @@
           <a:p>
             <a:fld id="{78C97017-6FC3-485B-9764-EAC9E56C1D49}" type="datetimeFigureOut">
               <a:rPr lang="en-US" smtClean="0"/>
-              <a:t>10/23/21</a:t>
+              <a:t>10/25/2021</a:t>
             </a:fld>
             <a:endParaRPr lang="en-US" dirty="0"/>
           </a:p>
@@ -2678,7 +2678,7 @@
           <a:p>
             <a:fld id="{78C97017-6FC3-485B-9764-EAC9E56C1D49}" type="datetimeFigureOut">
               <a:rPr lang="en-US" smtClean="0"/>
-              <a:t>10/23/21</a:t>
+              <a:t>10/25/2021</a:t>
             </a:fld>
             <a:endParaRPr lang="en-US" dirty="0"/>
           </a:p>
@@ -2953,7 +2953,7 @@
           <a:p>
             <a:fld id="{78C97017-6FC3-485B-9764-EAC9E56C1D49}" type="datetimeFigureOut">
               <a:rPr lang="en-US" smtClean="0"/>
-              <a:t>10/23/21</a:t>
+              <a:t>10/25/2021</a:t>
             </a:fld>
             <a:endParaRPr lang="en-US" dirty="0"/>
           </a:p>
@@ -3205,7 +3205,7 @@
           <a:p>
             <a:fld id="{78C97017-6FC3-485B-9764-EAC9E56C1D49}" type="datetimeFigureOut">
               <a:rPr lang="en-US" smtClean="0"/>
-              <a:t>10/23/21</a:t>
+              <a:t>10/25/2021</a:t>
             </a:fld>
             <a:endParaRPr lang="en-US" dirty="0"/>
           </a:p>
@@ -3416,7 +3416,7 @@
           <a:p>
             <a:fld id="{78C97017-6FC3-485B-9764-EAC9E56C1D49}" type="datetimeFigureOut">
               <a:rPr lang="en-US" smtClean="0"/>
-              <a:t>10/23/21</a:t>
+              <a:t>10/25/2021</a:t>
             </a:fld>
             <a:endParaRPr lang="en-US" dirty="0"/>
           </a:p>
@@ -3880,7 +3880,7 @@
         <p:spPr>
           <a:xfrm>
             <a:off x="533400" y="1344386"/>
-            <a:ext cx="5791200" cy="2618014"/>
+            <a:ext cx="5181600" cy="2618014"/>
           </a:xfrm>
           <a:prstGeom prst="rect">
             <a:avLst/>
@@ -3911,10 +3911,10 @@
       </p:sp>
       <p:sp>
         <p:nvSpPr>
-          <p:cNvPr id="2" name="TextBox 1">
-            <a:extLst>
-              <a:ext uri="{FF2B5EF4-FFF2-40B4-BE49-F238E27FC236}">
-                <a16:creationId xmlns:a16="http://schemas.microsoft.com/office/drawing/2014/main" id="{21452296-FBEB-4D89-B41B-3F43774FE795}"/>
+          <p:cNvPr id="4" name="TextBox 3">
+            <a:extLst>
+              <a:ext uri="{FF2B5EF4-FFF2-40B4-BE49-F238E27FC236}">
+                <a16:creationId xmlns:a16="http://schemas.microsoft.com/office/drawing/2014/main" id="{6B05802F-B501-4C3C-B92F-3248AB80D8FA}"/>
               </a:ext>
             </a:extLst>
           </p:cNvPr>
@@ -3923,8 +3923,8 @@
         </p:nvSpPr>
         <p:spPr>
           <a:xfrm>
-            <a:off x="762000" y="533400"/>
-            <a:ext cx="6096000" cy="369332"/>
+            <a:off x="2687296" y="1605927"/>
+            <a:ext cx="1600200" cy="276999"/>
           </a:xfrm>
           <a:prstGeom prst="rect">
             <a:avLst/>
@@ -3938,43 +3938,7 @@
           <a:lstStyle/>
           <a:p>
             <a:r>
-              <a:rPr lang="en-US" dirty="0"/>
-              <a:t>module store</a:t>
-            </a:r>
-            <a:endParaRPr lang="en-SG" dirty="0"/>
-          </a:p>
-        </p:txBody>
-      </p:sp>
-      <p:sp>
-        <p:nvSpPr>
-          <p:cNvPr id="4" name="TextBox 3">
-            <a:extLst>
-              <a:ext uri="{FF2B5EF4-FFF2-40B4-BE49-F238E27FC236}">
-                <a16:creationId xmlns:a16="http://schemas.microsoft.com/office/drawing/2014/main" id="{6B05802F-B501-4C3C-B92F-3248AB80D8FA}"/>
-              </a:ext>
-            </a:extLst>
-          </p:cNvPr>
-          <p:cNvSpPr txBox="1"/>
-          <p:nvPr/>
-        </p:nvSpPr>
-        <p:spPr>
-          <a:xfrm>
-            <a:off x="2628900" y="1524000"/>
-            <a:ext cx="1600200" cy="369332"/>
-          </a:xfrm>
-          <a:prstGeom prst="rect">
-            <a:avLst/>
-          </a:prstGeom>
-          <a:noFill/>
-        </p:spPr>
-        <p:txBody>
-          <a:bodyPr wrap="square" rtlCol="0">
-            <a:spAutoFit/>
-          </a:bodyPr>
-          <a:lstStyle/>
-          <a:p>
-            <a:r>
-              <a:rPr lang="en-US" dirty="0"/>
+              <a:rPr lang="en-US" sz="1200" dirty="0"/>
               <a:t>myModules</a:t>
             </a:r>
           </a:p>
@@ -30583,7 +30547,7 @@
         <p:spPr>
           <a:xfrm>
             <a:off x="533400" y="1344386"/>
-            <a:ext cx="5791200" cy="2618014"/>
+            <a:ext cx="5181600" cy="2618014"/>
           </a:xfrm>
           <a:prstGeom prst="rect">
             <a:avLst/>
@@ -30614,10 +30578,10 @@
       </p:sp>
       <p:sp>
         <p:nvSpPr>
-          <p:cNvPr id="2" name="TextBox 1">
-            <a:extLst>
-              <a:ext uri="{FF2B5EF4-FFF2-40B4-BE49-F238E27FC236}">
-                <a16:creationId xmlns:a16="http://schemas.microsoft.com/office/drawing/2014/main" id="{21452296-FBEB-4D89-B41B-3F43774FE795}"/>
+          <p:cNvPr id="4" name="TextBox 3">
+            <a:extLst>
+              <a:ext uri="{FF2B5EF4-FFF2-40B4-BE49-F238E27FC236}">
+                <a16:creationId xmlns:a16="http://schemas.microsoft.com/office/drawing/2014/main" id="{6B05802F-B501-4C3C-B92F-3248AB80D8FA}"/>
               </a:ext>
             </a:extLst>
           </p:cNvPr>
@@ -30626,8 +30590,8 @@
         </p:nvSpPr>
         <p:spPr>
           <a:xfrm>
-            <a:off x="762000" y="533400"/>
-            <a:ext cx="6096000" cy="369332"/>
+            <a:off x="2726108" y="1614394"/>
+            <a:ext cx="1600200" cy="276999"/>
           </a:xfrm>
           <a:prstGeom prst="rect">
             <a:avLst/>
@@ -30641,43 +30605,7 @@
           <a:lstStyle/>
           <a:p>
             <a:r>
-              <a:rPr lang="en-US" dirty="0"/>
-              <a:t>ModuleList init</a:t>
-            </a:r>
-            <a:endParaRPr lang="en-SG" dirty="0"/>
-          </a:p>
-        </p:txBody>
-      </p:sp>
-      <p:sp>
-        <p:nvSpPr>
-          <p:cNvPr id="4" name="TextBox 3">
-            <a:extLst>
-              <a:ext uri="{FF2B5EF4-FFF2-40B4-BE49-F238E27FC236}">
-                <a16:creationId xmlns:a16="http://schemas.microsoft.com/office/drawing/2014/main" id="{6B05802F-B501-4C3C-B92F-3248AB80D8FA}"/>
-              </a:ext>
-            </a:extLst>
-          </p:cNvPr>
-          <p:cNvSpPr txBox="1"/>
-          <p:nvPr/>
-        </p:nvSpPr>
-        <p:spPr>
-          <a:xfrm>
-            <a:off x="2628900" y="1524000"/>
-            <a:ext cx="1600200" cy="369332"/>
-          </a:xfrm>
-          <a:prstGeom prst="rect">
-            <a:avLst/>
-          </a:prstGeom>
-          <a:noFill/>
-        </p:spPr>
-        <p:txBody>
-          <a:bodyPr wrap="square" rtlCol="0">
-            <a:spAutoFit/>
-          </a:bodyPr>
-          <a:lstStyle/>
-          <a:p>
-            <a:r>
-              <a:rPr lang="en-US" dirty="0"/>
+              <a:rPr lang="en-US" sz="1200" dirty="0"/>
               <a:t>myModules</a:t>
             </a:r>
           </a:p>

</xml_diff>